<commit_message>
Corrections to fastq ppt plus removal of "stupid"
 Changes to be committed:
	modified:   Flip Presentations/NGS_Intro/00-FASTA_FASTQ_PHRED_ASCII/00-FASTQ_PHRED_ASCII.pptx
</commit_message>
<xml_diff>
--- a/Flip Presentations/NGS_Intro/00-FASTA_FASTQ_PHRED_ASCII/00-FASTQ_PHRED_ASCII.pptx
+++ b/Flip Presentations/NGS_Intro/00-FASTA_FASTQ_PHRED_ASCII/00-FASTQ_PHRED_ASCII.pptx
@@ -125,7 +125,7 @@
   </p:defaultTextStyle>
   <p:extLst>
     <p:ext uri="{EFAFB233-063F-42B5-8137-9DF3F51BA10A}">
-      <p15:sldGuideLst xmlns:p15="http://schemas.microsoft.com/office/powerpoint/2012/main" xmlns=""/>
+      <p15:sldGuideLst xmlns="" xmlns:p15="http://schemas.microsoft.com/office/powerpoint/2012/main"/>
     </p:ext>
   </p:extLst>
 </p:presentation>
@@ -217,7 +217,7 @@
           <a:p>
             <a:fld id="{A1A0514D-38CC-49F5-A912-2794DAAF3AC3}" type="datetimeFigureOut">
               <a:rPr lang="en-GB" smtClean="0"/>
-              <a:t>2017-12-14</a:t>
+              <a:t>2018-02-20</a:t>
             </a:fld>
             <a:endParaRPr lang="en-GB"/>
           </a:p>
@@ -539,11 +539,7 @@
             </a:r>
             <a:r>
               <a:rPr lang="en-GB" b="1" dirty="0" smtClean="0"/>
-              <a:t>Sequence </a:t>
-            </a:r>
-            <a:r>
-              <a:rPr lang="en-GB" b="1" dirty="0" smtClean="0"/>
-              <a:t>Formats </a:t>
+              <a:t>Sequence Formats </a:t>
             </a:r>
             <a:r>
               <a:rPr lang="en-GB" dirty="0" smtClean="0"/>
@@ -563,11 +559,7 @@
             </a:r>
             <a:r>
               <a:rPr lang="en-GB" baseline="0" dirty="0" smtClean="0"/>
-              <a:t>prerequisite </a:t>
-            </a:r>
-            <a:r>
-              <a:rPr lang="en-GB" baseline="0" dirty="0" smtClean="0"/>
-              <a:t>for understanding </a:t>
+              <a:t>prerequisite for understanding </a:t>
             </a:r>
             <a:r>
               <a:rPr lang="en-GB" b="1" baseline="0" dirty="0" smtClean="0"/>
@@ -1476,6 +1468,90 @@
 </p:notes>
 </file>
 
+<file path=ppt/notesSlides/notesSlide6.xml><?xml version="1.0" encoding="utf-8"?>
+<p:notes xmlns:a="http://schemas.openxmlformats.org/drawingml/2006/main" xmlns:r="http://schemas.openxmlformats.org/officeDocument/2006/relationships" xmlns:p="http://schemas.openxmlformats.org/presentationml/2006/main">
+  <p:cSld>
+    <p:spTree>
+      <p:nvGrpSpPr>
+        <p:cNvPr id="1" name=""/>
+        <p:cNvGrpSpPr/>
+        <p:nvPr/>
+      </p:nvGrpSpPr>
+      <p:grpSpPr>
+        <a:xfrm>
+          <a:off x="0" y="0"/>
+          <a:ext cx="0" cy="0"/>
+          <a:chOff x="0" y="0"/>
+          <a:chExt cx="0" cy="0"/>
+        </a:xfrm>
+      </p:grpSpPr>
+      <p:sp>
+        <p:nvSpPr>
+          <p:cNvPr id="2" name="Slide Image Placeholder 1"/>
+          <p:cNvSpPr>
+            <a:spLocks noGrp="1" noRot="1" noChangeAspect="1"/>
+          </p:cNvSpPr>
+          <p:nvPr>
+            <p:ph type="sldImg"/>
+          </p:nvPr>
+        </p:nvSpPr>
+        <p:spPr/>
+      </p:sp>
+      <p:sp>
+        <p:nvSpPr>
+          <p:cNvPr id="3" name="Notes Placeholder 2"/>
+          <p:cNvSpPr>
+            <a:spLocks noGrp="1"/>
+          </p:cNvSpPr>
+          <p:nvPr>
+            <p:ph type="body" idx="1"/>
+          </p:nvPr>
+        </p:nvSpPr>
+        <p:spPr/>
+        <p:txBody>
+          <a:bodyPr/>
+          <a:lstStyle/>
+          <a:p>
+            <a:endParaRPr lang="en-GB"/>
+          </a:p>
+        </p:txBody>
+      </p:sp>
+      <p:sp>
+        <p:nvSpPr>
+          <p:cNvPr id="4" name="Slide Number Placeholder 3"/>
+          <p:cNvSpPr>
+            <a:spLocks noGrp="1"/>
+          </p:cNvSpPr>
+          <p:nvPr>
+            <p:ph type="sldNum" sz="quarter" idx="10"/>
+          </p:nvPr>
+        </p:nvSpPr>
+        <p:spPr/>
+        <p:txBody>
+          <a:bodyPr/>
+          <a:lstStyle/>
+          <a:p>
+            <a:fld id="{783B116A-7CF9-49FA-B73A-46949A776ECC}" type="slidenum">
+              <a:rPr lang="en-GB" smtClean="0"/>
+              <a:t>15</a:t>
+            </a:fld>
+            <a:endParaRPr lang="en-GB"/>
+          </a:p>
+        </p:txBody>
+      </p:sp>
+    </p:spTree>
+    <p:extLst>
+      <p:ext uri="{BB962C8B-B14F-4D97-AF65-F5344CB8AC3E}">
+        <p14:creationId xmlns:p14="http://schemas.microsoft.com/office/powerpoint/2010/main" val="3528280740"/>
+      </p:ext>
+    </p:extLst>
+  </p:cSld>
+  <p:clrMapOvr>
+    <a:masterClrMapping/>
+  </p:clrMapOvr>
+</p:notes>
+</file>
+
 <file path=ppt/slideLayouts/slideLayout1.xml><?xml version="1.0" encoding="utf-8"?>
 <p:sldLayout xmlns:a="http://schemas.openxmlformats.org/drawingml/2006/main" xmlns:r="http://schemas.openxmlformats.org/officeDocument/2006/relationships" xmlns:p="http://schemas.openxmlformats.org/presentationml/2006/main" type="title" preserve="1">
   <p:cSld name="Title Slide">
@@ -1498,7 +1574,7 @@
           <p:cNvPr id="2" name="Title 1">
             <a:extLst>
               <a:ext uri="{FF2B5EF4-FFF2-40B4-BE49-F238E27FC236}">
-                <a16:creationId xmlns:a16="http://schemas.microsoft.com/office/drawing/2014/main" xmlns="" id="{032A3615-1B4F-418D-B0BB-CBD54E1C819E}"/>
+                <a16:creationId xmlns="" xmlns:a16="http://schemas.microsoft.com/office/drawing/2014/main" id="{032A3615-1B4F-418D-B0BB-CBD54E1C819E}"/>
               </a:ext>
             </a:extLst>
           </p:cNvPr>
@@ -1536,7 +1612,7 @@
           <p:cNvPr id="3" name="Subtitle 2">
             <a:extLst>
               <a:ext uri="{FF2B5EF4-FFF2-40B4-BE49-F238E27FC236}">
-                <a16:creationId xmlns:a16="http://schemas.microsoft.com/office/drawing/2014/main" xmlns="" id="{5178CFA0-D280-4CD5-A213-7111D5B1C049}"/>
+                <a16:creationId xmlns="" xmlns:a16="http://schemas.microsoft.com/office/drawing/2014/main" id="{5178CFA0-D280-4CD5-A213-7111D5B1C049}"/>
               </a:ext>
             </a:extLst>
           </p:cNvPr>
@@ -1607,7 +1683,7 @@
           <p:cNvPr id="4" name="Date Placeholder 3">
             <a:extLst>
               <a:ext uri="{FF2B5EF4-FFF2-40B4-BE49-F238E27FC236}">
-                <a16:creationId xmlns:a16="http://schemas.microsoft.com/office/drawing/2014/main" xmlns="" id="{6437010A-E880-4C2E-8F4F-2C9DE975306A}"/>
+                <a16:creationId xmlns="" xmlns:a16="http://schemas.microsoft.com/office/drawing/2014/main" id="{6437010A-E880-4C2E-8F4F-2C9DE975306A}"/>
               </a:ext>
             </a:extLst>
           </p:cNvPr>
@@ -1625,7 +1701,7 @@
           <a:p>
             <a:fld id="{AEC09C50-853A-420B-8C26-7439C86401C0}" type="datetimeFigureOut">
               <a:rPr lang="en-GB" smtClean="0"/>
-              <a:t>2017-12-14</a:t>
+              <a:t>2018-02-20</a:t>
             </a:fld>
             <a:endParaRPr lang="en-GB"/>
           </a:p>
@@ -1636,7 +1712,7 @@
           <p:cNvPr id="5" name="Footer Placeholder 4">
             <a:extLst>
               <a:ext uri="{FF2B5EF4-FFF2-40B4-BE49-F238E27FC236}">
-                <a16:creationId xmlns:a16="http://schemas.microsoft.com/office/drawing/2014/main" xmlns="" id="{9F643F16-915B-4F04-8319-7D1C8C69C781}"/>
+                <a16:creationId xmlns="" xmlns:a16="http://schemas.microsoft.com/office/drawing/2014/main" id="{9F643F16-915B-4F04-8319-7D1C8C69C781}"/>
               </a:ext>
             </a:extLst>
           </p:cNvPr>
@@ -1661,7 +1737,7 @@
           <p:cNvPr id="6" name="Slide Number Placeholder 5">
             <a:extLst>
               <a:ext uri="{FF2B5EF4-FFF2-40B4-BE49-F238E27FC236}">
-                <a16:creationId xmlns:a16="http://schemas.microsoft.com/office/drawing/2014/main" xmlns="" id="{A5A1F72C-9F07-4EFA-8E45-090190D59EFA}"/>
+                <a16:creationId xmlns="" xmlns:a16="http://schemas.microsoft.com/office/drawing/2014/main" id="{A5A1F72C-9F07-4EFA-8E45-090190D59EFA}"/>
               </a:ext>
             </a:extLst>
           </p:cNvPr>
@@ -1720,7 +1796,7 @@
           <p:cNvPr id="2" name="Title 1">
             <a:extLst>
               <a:ext uri="{FF2B5EF4-FFF2-40B4-BE49-F238E27FC236}">
-                <a16:creationId xmlns:a16="http://schemas.microsoft.com/office/drawing/2014/main" xmlns="" id="{DF0ADA25-4CDF-4246-9CC9-8AE3380619F1}"/>
+                <a16:creationId xmlns="" xmlns:a16="http://schemas.microsoft.com/office/drawing/2014/main" id="{DF0ADA25-4CDF-4246-9CC9-8AE3380619F1}"/>
               </a:ext>
             </a:extLst>
           </p:cNvPr>
@@ -1749,7 +1825,7 @@
           <p:cNvPr id="3" name="Vertical Text Placeholder 2">
             <a:extLst>
               <a:ext uri="{FF2B5EF4-FFF2-40B4-BE49-F238E27FC236}">
-                <a16:creationId xmlns:a16="http://schemas.microsoft.com/office/drawing/2014/main" xmlns="" id="{A73B0C6F-4850-4D10-91DC-61668DE50E5A}"/>
+                <a16:creationId xmlns="" xmlns:a16="http://schemas.microsoft.com/office/drawing/2014/main" id="{A73B0C6F-4850-4D10-91DC-61668DE50E5A}"/>
               </a:ext>
             </a:extLst>
           </p:cNvPr>
@@ -1807,7 +1883,7 @@
           <p:cNvPr id="4" name="Date Placeholder 3">
             <a:extLst>
               <a:ext uri="{FF2B5EF4-FFF2-40B4-BE49-F238E27FC236}">
-                <a16:creationId xmlns:a16="http://schemas.microsoft.com/office/drawing/2014/main" xmlns="" id="{28816B05-7093-4142-B374-DFA2171DFDA7}"/>
+                <a16:creationId xmlns="" xmlns:a16="http://schemas.microsoft.com/office/drawing/2014/main" id="{28816B05-7093-4142-B374-DFA2171DFDA7}"/>
               </a:ext>
             </a:extLst>
           </p:cNvPr>
@@ -1825,7 +1901,7 @@
           <a:p>
             <a:fld id="{AEC09C50-853A-420B-8C26-7439C86401C0}" type="datetimeFigureOut">
               <a:rPr lang="en-GB" smtClean="0"/>
-              <a:t>2017-12-14</a:t>
+              <a:t>2018-02-20</a:t>
             </a:fld>
             <a:endParaRPr lang="en-GB"/>
           </a:p>
@@ -1836,7 +1912,7 @@
           <p:cNvPr id="5" name="Footer Placeholder 4">
             <a:extLst>
               <a:ext uri="{FF2B5EF4-FFF2-40B4-BE49-F238E27FC236}">
-                <a16:creationId xmlns:a16="http://schemas.microsoft.com/office/drawing/2014/main" xmlns="" id="{F8D052D6-AC53-4967-A0E2-E4E4AB61FF09}"/>
+                <a16:creationId xmlns="" xmlns:a16="http://schemas.microsoft.com/office/drawing/2014/main" id="{F8D052D6-AC53-4967-A0E2-E4E4AB61FF09}"/>
               </a:ext>
             </a:extLst>
           </p:cNvPr>
@@ -1861,7 +1937,7 @@
           <p:cNvPr id="6" name="Slide Number Placeholder 5">
             <a:extLst>
               <a:ext uri="{FF2B5EF4-FFF2-40B4-BE49-F238E27FC236}">
-                <a16:creationId xmlns:a16="http://schemas.microsoft.com/office/drawing/2014/main" xmlns="" id="{209C7226-9CDD-405A-B9DA-D5ED9561A32C}"/>
+                <a16:creationId xmlns="" xmlns:a16="http://schemas.microsoft.com/office/drawing/2014/main" id="{209C7226-9CDD-405A-B9DA-D5ED9561A32C}"/>
               </a:ext>
             </a:extLst>
           </p:cNvPr>
@@ -1920,7 +1996,7 @@
           <p:cNvPr id="2" name="Vertical Title 1">
             <a:extLst>
               <a:ext uri="{FF2B5EF4-FFF2-40B4-BE49-F238E27FC236}">
-                <a16:creationId xmlns:a16="http://schemas.microsoft.com/office/drawing/2014/main" xmlns="" id="{AC8F15DC-2850-4805-BE66-C8A705279A00}"/>
+                <a16:creationId xmlns="" xmlns:a16="http://schemas.microsoft.com/office/drawing/2014/main" id="{AC8F15DC-2850-4805-BE66-C8A705279A00}"/>
               </a:ext>
             </a:extLst>
           </p:cNvPr>
@@ -1954,7 +2030,7 @@
           <p:cNvPr id="3" name="Vertical Text Placeholder 2">
             <a:extLst>
               <a:ext uri="{FF2B5EF4-FFF2-40B4-BE49-F238E27FC236}">
-                <a16:creationId xmlns:a16="http://schemas.microsoft.com/office/drawing/2014/main" xmlns="" id="{C357DFB2-B690-4D71-9FB8-516ED75975FD}"/>
+                <a16:creationId xmlns="" xmlns:a16="http://schemas.microsoft.com/office/drawing/2014/main" id="{C357DFB2-B690-4D71-9FB8-516ED75975FD}"/>
               </a:ext>
             </a:extLst>
           </p:cNvPr>
@@ -2017,7 +2093,7 @@
           <p:cNvPr id="4" name="Date Placeholder 3">
             <a:extLst>
               <a:ext uri="{FF2B5EF4-FFF2-40B4-BE49-F238E27FC236}">
-                <a16:creationId xmlns:a16="http://schemas.microsoft.com/office/drawing/2014/main" xmlns="" id="{6CA1D11A-42DD-417D-AC4D-52096BB89234}"/>
+                <a16:creationId xmlns="" xmlns:a16="http://schemas.microsoft.com/office/drawing/2014/main" id="{6CA1D11A-42DD-417D-AC4D-52096BB89234}"/>
               </a:ext>
             </a:extLst>
           </p:cNvPr>
@@ -2035,7 +2111,7 @@
           <a:p>
             <a:fld id="{AEC09C50-853A-420B-8C26-7439C86401C0}" type="datetimeFigureOut">
               <a:rPr lang="en-GB" smtClean="0"/>
-              <a:t>2017-12-14</a:t>
+              <a:t>2018-02-20</a:t>
             </a:fld>
             <a:endParaRPr lang="en-GB"/>
           </a:p>
@@ -2046,7 +2122,7 @@
           <p:cNvPr id="5" name="Footer Placeholder 4">
             <a:extLst>
               <a:ext uri="{FF2B5EF4-FFF2-40B4-BE49-F238E27FC236}">
-                <a16:creationId xmlns:a16="http://schemas.microsoft.com/office/drawing/2014/main" xmlns="" id="{24E0F641-8F99-48B8-8C2B-0535E04FC772}"/>
+                <a16:creationId xmlns="" xmlns:a16="http://schemas.microsoft.com/office/drawing/2014/main" id="{24E0F641-8F99-48B8-8C2B-0535E04FC772}"/>
               </a:ext>
             </a:extLst>
           </p:cNvPr>
@@ -2071,7 +2147,7 @@
           <p:cNvPr id="6" name="Slide Number Placeholder 5">
             <a:extLst>
               <a:ext uri="{FF2B5EF4-FFF2-40B4-BE49-F238E27FC236}">
-                <a16:creationId xmlns:a16="http://schemas.microsoft.com/office/drawing/2014/main" xmlns="" id="{F5D90570-5593-43EA-ADD8-E7B87D770333}"/>
+                <a16:creationId xmlns="" xmlns:a16="http://schemas.microsoft.com/office/drawing/2014/main" id="{F5D90570-5593-43EA-ADD8-E7B87D770333}"/>
               </a:ext>
             </a:extLst>
           </p:cNvPr>
@@ -2130,7 +2206,7 @@
           <p:cNvPr id="2" name="Title 1">
             <a:extLst>
               <a:ext uri="{FF2B5EF4-FFF2-40B4-BE49-F238E27FC236}">
-                <a16:creationId xmlns:a16="http://schemas.microsoft.com/office/drawing/2014/main" xmlns="" id="{B98979EE-87BC-427F-94CA-2C281566B09A}"/>
+                <a16:creationId xmlns="" xmlns:a16="http://schemas.microsoft.com/office/drawing/2014/main" id="{B98979EE-87BC-427F-94CA-2C281566B09A}"/>
               </a:ext>
             </a:extLst>
           </p:cNvPr>
@@ -2159,7 +2235,7 @@
           <p:cNvPr id="3" name="Content Placeholder 2">
             <a:extLst>
               <a:ext uri="{FF2B5EF4-FFF2-40B4-BE49-F238E27FC236}">
-                <a16:creationId xmlns:a16="http://schemas.microsoft.com/office/drawing/2014/main" xmlns="" id="{08E844DF-4E79-432A-89FF-B27AE73F8DFC}"/>
+                <a16:creationId xmlns="" xmlns:a16="http://schemas.microsoft.com/office/drawing/2014/main" id="{08E844DF-4E79-432A-89FF-B27AE73F8DFC}"/>
               </a:ext>
             </a:extLst>
           </p:cNvPr>
@@ -2217,7 +2293,7 @@
           <p:cNvPr id="4" name="Date Placeholder 3">
             <a:extLst>
               <a:ext uri="{FF2B5EF4-FFF2-40B4-BE49-F238E27FC236}">
-                <a16:creationId xmlns:a16="http://schemas.microsoft.com/office/drawing/2014/main" xmlns="" id="{8B91852C-926C-48F7-8D30-64C8DA09313F}"/>
+                <a16:creationId xmlns="" xmlns:a16="http://schemas.microsoft.com/office/drawing/2014/main" id="{8B91852C-926C-48F7-8D30-64C8DA09313F}"/>
               </a:ext>
             </a:extLst>
           </p:cNvPr>
@@ -2235,7 +2311,7 @@
           <a:p>
             <a:fld id="{AEC09C50-853A-420B-8C26-7439C86401C0}" type="datetimeFigureOut">
               <a:rPr lang="en-GB" smtClean="0"/>
-              <a:t>2017-12-14</a:t>
+              <a:t>2018-02-20</a:t>
             </a:fld>
             <a:endParaRPr lang="en-GB"/>
           </a:p>
@@ -2246,7 +2322,7 @@
           <p:cNvPr id="5" name="Footer Placeholder 4">
             <a:extLst>
               <a:ext uri="{FF2B5EF4-FFF2-40B4-BE49-F238E27FC236}">
-                <a16:creationId xmlns:a16="http://schemas.microsoft.com/office/drawing/2014/main" xmlns="" id="{546A3794-73BB-4394-B312-0810CC8D282B}"/>
+                <a16:creationId xmlns="" xmlns:a16="http://schemas.microsoft.com/office/drawing/2014/main" id="{546A3794-73BB-4394-B312-0810CC8D282B}"/>
               </a:ext>
             </a:extLst>
           </p:cNvPr>
@@ -2271,7 +2347,7 @@
           <p:cNvPr id="6" name="Slide Number Placeholder 5">
             <a:extLst>
               <a:ext uri="{FF2B5EF4-FFF2-40B4-BE49-F238E27FC236}">
-                <a16:creationId xmlns:a16="http://schemas.microsoft.com/office/drawing/2014/main" xmlns="" id="{07786F77-2E2A-4620-93A8-BA28C7D5968E}"/>
+                <a16:creationId xmlns="" xmlns:a16="http://schemas.microsoft.com/office/drawing/2014/main" id="{07786F77-2E2A-4620-93A8-BA28C7D5968E}"/>
               </a:ext>
             </a:extLst>
           </p:cNvPr>
@@ -2330,7 +2406,7 @@
           <p:cNvPr id="2" name="Title 1">
             <a:extLst>
               <a:ext uri="{FF2B5EF4-FFF2-40B4-BE49-F238E27FC236}">
-                <a16:creationId xmlns:a16="http://schemas.microsoft.com/office/drawing/2014/main" xmlns="" id="{AAAC300C-DDCD-4815-A851-D27410C002C4}"/>
+                <a16:creationId xmlns="" xmlns:a16="http://schemas.microsoft.com/office/drawing/2014/main" id="{AAAC300C-DDCD-4815-A851-D27410C002C4}"/>
               </a:ext>
             </a:extLst>
           </p:cNvPr>
@@ -2368,7 +2444,7 @@
           <p:cNvPr id="3" name="Text Placeholder 2">
             <a:extLst>
               <a:ext uri="{FF2B5EF4-FFF2-40B4-BE49-F238E27FC236}">
-                <a16:creationId xmlns:a16="http://schemas.microsoft.com/office/drawing/2014/main" xmlns="" id="{71D70F57-38B3-443C-8310-1B6EF0186E83}"/>
+                <a16:creationId xmlns="" xmlns:a16="http://schemas.microsoft.com/office/drawing/2014/main" id="{71D70F57-38B3-443C-8310-1B6EF0186E83}"/>
               </a:ext>
             </a:extLst>
           </p:cNvPr>
@@ -2493,7 +2569,7 @@
           <p:cNvPr id="4" name="Date Placeholder 3">
             <a:extLst>
               <a:ext uri="{FF2B5EF4-FFF2-40B4-BE49-F238E27FC236}">
-                <a16:creationId xmlns:a16="http://schemas.microsoft.com/office/drawing/2014/main" xmlns="" id="{CEE46B92-1656-4AB0-B92C-41936E9B09B4}"/>
+                <a16:creationId xmlns="" xmlns:a16="http://schemas.microsoft.com/office/drawing/2014/main" id="{CEE46B92-1656-4AB0-B92C-41936E9B09B4}"/>
               </a:ext>
             </a:extLst>
           </p:cNvPr>
@@ -2511,7 +2587,7 @@
           <a:p>
             <a:fld id="{AEC09C50-853A-420B-8C26-7439C86401C0}" type="datetimeFigureOut">
               <a:rPr lang="en-GB" smtClean="0"/>
-              <a:t>2017-12-14</a:t>
+              <a:t>2018-02-20</a:t>
             </a:fld>
             <a:endParaRPr lang="en-GB"/>
           </a:p>
@@ -2522,7 +2598,7 @@
           <p:cNvPr id="5" name="Footer Placeholder 4">
             <a:extLst>
               <a:ext uri="{FF2B5EF4-FFF2-40B4-BE49-F238E27FC236}">
-                <a16:creationId xmlns:a16="http://schemas.microsoft.com/office/drawing/2014/main" xmlns="" id="{7DC8305A-64D0-4AFB-8642-6845BCEBBD8E}"/>
+                <a16:creationId xmlns="" xmlns:a16="http://schemas.microsoft.com/office/drawing/2014/main" id="{7DC8305A-64D0-4AFB-8642-6845BCEBBD8E}"/>
               </a:ext>
             </a:extLst>
           </p:cNvPr>
@@ -2547,7 +2623,7 @@
           <p:cNvPr id="6" name="Slide Number Placeholder 5">
             <a:extLst>
               <a:ext uri="{FF2B5EF4-FFF2-40B4-BE49-F238E27FC236}">
-                <a16:creationId xmlns:a16="http://schemas.microsoft.com/office/drawing/2014/main" xmlns="" id="{5CD65ACC-878F-4FFE-8CA3-4D11A4DF969D}"/>
+                <a16:creationId xmlns="" xmlns:a16="http://schemas.microsoft.com/office/drawing/2014/main" id="{5CD65ACC-878F-4FFE-8CA3-4D11A4DF969D}"/>
               </a:ext>
             </a:extLst>
           </p:cNvPr>
@@ -2606,7 +2682,7 @@
           <p:cNvPr id="2" name="Title 1">
             <a:extLst>
               <a:ext uri="{FF2B5EF4-FFF2-40B4-BE49-F238E27FC236}">
-                <a16:creationId xmlns:a16="http://schemas.microsoft.com/office/drawing/2014/main" xmlns="" id="{C22E1C61-B0A3-4D79-87F0-D3FE72B442EC}"/>
+                <a16:creationId xmlns="" xmlns:a16="http://schemas.microsoft.com/office/drawing/2014/main" id="{C22E1C61-B0A3-4D79-87F0-D3FE72B442EC}"/>
               </a:ext>
             </a:extLst>
           </p:cNvPr>
@@ -2635,7 +2711,7 @@
           <p:cNvPr id="3" name="Content Placeholder 2">
             <a:extLst>
               <a:ext uri="{FF2B5EF4-FFF2-40B4-BE49-F238E27FC236}">
-                <a16:creationId xmlns:a16="http://schemas.microsoft.com/office/drawing/2014/main" xmlns="" id="{8CF6C057-BBB5-4F28-A87E-105844231C32}"/>
+                <a16:creationId xmlns="" xmlns:a16="http://schemas.microsoft.com/office/drawing/2014/main" id="{8CF6C057-BBB5-4F28-A87E-105844231C32}"/>
               </a:ext>
             </a:extLst>
           </p:cNvPr>
@@ -2698,7 +2774,7 @@
           <p:cNvPr id="4" name="Content Placeholder 3">
             <a:extLst>
               <a:ext uri="{FF2B5EF4-FFF2-40B4-BE49-F238E27FC236}">
-                <a16:creationId xmlns:a16="http://schemas.microsoft.com/office/drawing/2014/main" xmlns="" id="{8C9AE18C-33A9-443E-928F-81EC04DF5738}"/>
+                <a16:creationId xmlns="" xmlns:a16="http://schemas.microsoft.com/office/drawing/2014/main" id="{8C9AE18C-33A9-443E-928F-81EC04DF5738}"/>
               </a:ext>
             </a:extLst>
           </p:cNvPr>
@@ -2761,7 +2837,7 @@
           <p:cNvPr id="5" name="Date Placeholder 4">
             <a:extLst>
               <a:ext uri="{FF2B5EF4-FFF2-40B4-BE49-F238E27FC236}">
-                <a16:creationId xmlns:a16="http://schemas.microsoft.com/office/drawing/2014/main" xmlns="" id="{41107389-B4BB-487C-995E-6E58CFAF6E9D}"/>
+                <a16:creationId xmlns="" xmlns:a16="http://schemas.microsoft.com/office/drawing/2014/main" id="{41107389-B4BB-487C-995E-6E58CFAF6E9D}"/>
               </a:ext>
             </a:extLst>
           </p:cNvPr>
@@ -2779,7 +2855,7 @@
           <a:p>
             <a:fld id="{AEC09C50-853A-420B-8C26-7439C86401C0}" type="datetimeFigureOut">
               <a:rPr lang="en-GB" smtClean="0"/>
-              <a:t>2017-12-14</a:t>
+              <a:t>2018-02-20</a:t>
             </a:fld>
             <a:endParaRPr lang="en-GB"/>
           </a:p>
@@ -2790,7 +2866,7 @@
           <p:cNvPr id="6" name="Footer Placeholder 5">
             <a:extLst>
               <a:ext uri="{FF2B5EF4-FFF2-40B4-BE49-F238E27FC236}">
-                <a16:creationId xmlns:a16="http://schemas.microsoft.com/office/drawing/2014/main" xmlns="" id="{3E9CD8BB-3986-4FA9-834F-317E88D998F2}"/>
+                <a16:creationId xmlns="" xmlns:a16="http://schemas.microsoft.com/office/drawing/2014/main" id="{3E9CD8BB-3986-4FA9-834F-317E88D998F2}"/>
               </a:ext>
             </a:extLst>
           </p:cNvPr>
@@ -2815,7 +2891,7 @@
           <p:cNvPr id="7" name="Slide Number Placeholder 6">
             <a:extLst>
               <a:ext uri="{FF2B5EF4-FFF2-40B4-BE49-F238E27FC236}">
-                <a16:creationId xmlns:a16="http://schemas.microsoft.com/office/drawing/2014/main" xmlns="" id="{8D5B0155-25C5-4F31-B914-54F60CD5DEBF}"/>
+                <a16:creationId xmlns="" xmlns:a16="http://schemas.microsoft.com/office/drawing/2014/main" id="{8D5B0155-25C5-4F31-B914-54F60CD5DEBF}"/>
               </a:ext>
             </a:extLst>
           </p:cNvPr>
@@ -2874,7 +2950,7 @@
           <p:cNvPr id="2" name="Title 1">
             <a:extLst>
               <a:ext uri="{FF2B5EF4-FFF2-40B4-BE49-F238E27FC236}">
-                <a16:creationId xmlns:a16="http://schemas.microsoft.com/office/drawing/2014/main" xmlns="" id="{2661A003-2765-44CA-9145-AB1528F4C2E9}"/>
+                <a16:creationId xmlns="" xmlns:a16="http://schemas.microsoft.com/office/drawing/2014/main" id="{2661A003-2765-44CA-9145-AB1528F4C2E9}"/>
               </a:ext>
             </a:extLst>
           </p:cNvPr>
@@ -2908,7 +2984,7 @@
           <p:cNvPr id="3" name="Text Placeholder 2">
             <a:extLst>
               <a:ext uri="{FF2B5EF4-FFF2-40B4-BE49-F238E27FC236}">
-                <a16:creationId xmlns:a16="http://schemas.microsoft.com/office/drawing/2014/main" xmlns="" id="{E9329458-CFA5-4FC5-83BF-8DEED1663F67}"/>
+                <a16:creationId xmlns="" xmlns:a16="http://schemas.microsoft.com/office/drawing/2014/main" id="{E9329458-CFA5-4FC5-83BF-8DEED1663F67}"/>
               </a:ext>
             </a:extLst>
           </p:cNvPr>
@@ -2979,7 +3055,7 @@
           <p:cNvPr id="4" name="Content Placeholder 3">
             <a:extLst>
               <a:ext uri="{FF2B5EF4-FFF2-40B4-BE49-F238E27FC236}">
-                <a16:creationId xmlns:a16="http://schemas.microsoft.com/office/drawing/2014/main" xmlns="" id="{00973E35-5790-4541-A9E9-6EAD8746298F}"/>
+                <a16:creationId xmlns="" xmlns:a16="http://schemas.microsoft.com/office/drawing/2014/main" id="{00973E35-5790-4541-A9E9-6EAD8746298F}"/>
               </a:ext>
             </a:extLst>
           </p:cNvPr>
@@ -3042,7 +3118,7 @@
           <p:cNvPr id="5" name="Text Placeholder 4">
             <a:extLst>
               <a:ext uri="{FF2B5EF4-FFF2-40B4-BE49-F238E27FC236}">
-                <a16:creationId xmlns:a16="http://schemas.microsoft.com/office/drawing/2014/main" xmlns="" id="{A79D0B04-D124-4DE1-8DDA-4298E11D9543}"/>
+                <a16:creationId xmlns="" xmlns:a16="http://schemas.microsoft.com/office/drawing/2014/main" id="{A79D0B04-D124-4DE1-8DDA-4298E11D9543}"/>
               </a:ext>
             </a:extLst>
           </p:cNvPr>
@@ -3113,7 +3189,7 @@
           <p:cNvPr id="6" name="Content Placeholder 5">
             <a:extLst>
               <a:ext uri="{FF2B5EF4-FFF2-40B4-BE49-F238E27FC236}">
-                <a16:creationId xmlns:a16="http://schemas.microsoft.com/office/drawing/2014/main" xmlns="" id="{B6A6F19A-1257-47E9-B4A0-44A2F7E94FF1}"/>
+                <a16:creationId xmlns="" xmlns:a16="http://schemas.microsoft.com/office/drawing/2014/main" id="{B6A6F19A-1257-47E9-B4A0-44A2F7E94FF1}"/>
               </a:ext>
             </a:extLst>
           </p:cNvPr>
@@ -3176,7 +3252,7 @@
           <p:cNvPr id="7" name="Date Placeholder 6">
             <a:extLst>
               <a:ext uri="{FF2B5EF4-FFF2-40B4-BE49-F238E27FC236}">
-                <a16:creationId xmlns:a16="http://schemas.microsoft.com/office/drawing/2014/main" xmlns="" id="{72AE3A17-5374-467D-86C2-C645B787C384}"/>
+                <a16:creationId xmlns="" xmlns:a16="http://schemas.microsoft.com/office/drawing/2014/main" id="{72AE3A17-5374-467D-86C2-C645B787C384}"/>
               </a:ext>
             </a:extLst>
           </p:cNvPr>
@@ -3194,7 +3270,7 @@
           <a:p>
             <a:fld id="{AEC09C50-853A-420B-8C26-7439C86401C0}" type="datetimeFigureOut">
               <a:rPr lang="en-GB" smtClean="0"/>
-              <a:t>2017-12-14</a:t>
+              <a:t>2018-02-20</a:t>
             </a:fld>
             <a:endParaRPr lang="en-GB"/>
           </a:p>
@@ -3205,7 +3281,7 @@
           <p:cNvPr id="8" name="Footer Placeholder 7">
             <a:extLst>
               <a:ext uri="{FF2B5EF4-FFF2-40B4-BE49-F238E27FC236}">
-                <a16:creationId xmlns:a16="http://schemas.microsoft.com/office/drawing/2014/main" xmlns="" id="{5283F0D5-8638-49FD-89DB-01F6EE922328}"/>
+                <a16:creationId xmlns="" xmlns:a16="http://schemas.microsoft.com/office/drawing/2014/main" id="{5283F0D5-8638-49FD-89DB-01F6EE922328}"/>
               </a:ext>
             </a:extLst>
           </p:cNvPr>
@@ -3230,7 +3306,7 @@
           <p:cNvPr id="9" name="Slide Number Placeholder 8">
             <a:extLst>
               <a:ext uri="{FF2B5EF4-FFF2-40B4-BE49-F238E27FC236}">
-                <a16:creationId xmlns:a16="http://schemas.microsoft.com/office/drawing/2014/main" xmlns="" id="{C0267428-4293-4A71-9B75-D565941979E2}"/>
+                <a16:creationId xmlns="" xmlns:a16="http://schemas.microsoft.com/office/drawing/2014/main" id="{C0267428-4293-4A71-9B75-D565941979E2}"/>
               </a:ext>
             </a:extLst>
           </p:cNvPr>
@@ -3289,7 +3365,7 @@
           <p:cNvPr id="2" name="Title 1">
             <a:extLst>
               <a:ext uri="{FF2B5EF4-FFF2-40B4-BE49-F238E27FC236}">
-                <a16:creationId xmlns:a16="http://schemas.microsoft.com/office/drawing/2014/main" xmlns="" id="{83526E88-76D3-4410-8E61-DDEF66B15330}"/>
+                <a16:creationId xmlns="" xmlns:a16="http://schemas.microsoft.com/office/drawing/2014/main" id="{83526E88-76D3-4410-8E61-DDEF66B15330}"/>
               </a:ext>
             </a:extLst>
           </p:cNvPr>
@@ -3318,7 +3394,7 @@
           <p:cNvPr id="3" name="Date Placeholder 2">
             <a:extLst>
               <a:ext uri="{FF2B5EF4-FFF2-40B4-BE49-F238E27FC236}">
-                <a16:creationId xmlns:a16="http://schemas.microsoft.com/office/drawing/2014/main" xmlns="" id="{EB4D1369-8B85-4E73-89D6-76C188B98E13}"/>
+                <a16:creationId xmlns="" xmlns:a16="http://schemas.microsoft.com/office/drawing/2014/main" id="{EB4D1369-8B85-4E73-89D6-76C188B98E13}"/>
               </a:ext>
             </a:extLst>
           </p:cNvPr>
@@ -3336,7 +3412,7 @@
           <a:p>
             <a:fld id="{AEC09C50-853A-420B-8C26-7439C86401C0}" type="datetimeFigureOut">
               <a:rPr lang="en-GB" smtClean="0"/>
-              <a:t>2017-12-14</a:t>
+              <a:t>2018-02-20</a:t>
             </a:fld>
             <a:endParaRPr lang="en-GB"/>
           </a:p>
@@ -3347,7 +3423,7 @@
           <p:cNvPr id="4" name="Footer Placeholder 3">
             <a:extLst>
               <a:ext uri="{FF2B5EF4-FFF2-40B4-BE49-F238E27FC236}">
-                <a16:creationId xmlns:a16="http://schemas.microsoft.com/office/drawing/2014/main" xmlns="" id="{489D4C4A-EE05-4344-A36C-6C671EE5E049}"/>
+                <a16:creationId xmlns="" xmlns:a16="http://schemas.microsoft.com/office/drawing/2014/main" id="{489D4C4A-EE05-4344-A36C-6C671EE5E049}"/>
               </a:ext>
             </a:extLst>
           </p:cNvPr>
@@ -3372,7 +3448,7 @@
           <p:cNvPr id="5" name="Slide Number Placeholder 4">
             <a:extLst>
               <a:ext uri="{FF2B5EF4-FFF2-40B4-BE49-F238E27FC236}">
-                <a16:creationId xmlns:a16="http://schemas.microsoft.com/office/drawing/2014/main" xmlns="" id="{DD1109B2-CB6D-4218-9B3E-14BAEEE90F3E}"/>
+                <a16:creationId xmlns="" xmlns:a16="http://schemas.microsoft.com/office/drawing/2014/main" id="{DD1109B2-CB6D-4218-9B3E-14BAEEE90F3E}"/>
               </a:ext>
             </a:extLst>
           </p:cNvPr>
@@ -3431,7 +3507,7 @@
           <p:cNvPr id="2" name="Date Placeholder 1">
             <a:extLst>
               <a:ext uri="{FF2B5EF4-FFF2-40B4-BE49-F238E27FC236}">
-                <a16:creationId xmlns:a16="http://schemas.microsoft.com/office/drawing/2014/main" xmlns="" id="{F2235B87-6899-48A6-999A-BC97C2BBB929}"/>
+                <a16:creationId xmlns="" xmlns:a16="http://schemas.microsoft.com/office/drawing/2014/main" id="{F2235B87-6899-48A6-999A-BC97C2BBB929}"/>
               </a:ext>
             </a:extLst>
           </p:cNvPr>
@@ -3449,7 +3525,7 @@
           <a:p>
             <a:fld id="{AEC09C50-853A-420B-8C26-7439C86401C0}" type="datetimeFigureOut">
               <a:rPr lang="en-GB" smtClean="0"/>
-              <a:t>2017-12-14</a:t>
+              <a:t>2018-02-20</a:t>
             </a:fld>
             <a:endParaRPr lang="en-GB"/>
           </a:p>
@@ -3460,7 +3536,7 @@
           <p:cNvPr id="3" name="Footer Placeholder 2">
             <a:extLst>
               <a:ext uri="{FF2B5EF4-FFF2-40B4-BE49-F238E27FC236}">
-                <a16:creationId xmlns:a16="http://schemas.microsoft.com/office/drawing/2014/main" xmlns="" id="{C8769E30-B6BB-4F0A-B22F-C95BF219412D}"/>
+                <a16:creationId xmlns="" xmlns:a16="http://schemas.microsoft.com/office/drawing/2014/main" id="{C8769E30-B6BB-4F0A-B22F-C95BF219412D}"/>
               </a:ext>
             </a:extLst>
           </p:cNvPr>
@@ -3485,7 +3561,7 @@
           <p:cNvPr id="4" name="Slide Number Placeholder 3">
             <a:extLst>
               <a:ext uri="{FF2B5EF4-FFF2-40B4-BE49-F238E27FC236}">
-                <a16:creationId xmlns:a16="http://schemas.microsoft.com/office/drawing/2014/main" xmlns="" id="{BC7650B4-2968-4449-A4B1-2C77F10005BB}"/>
+                <a16:creationId xmlns="" xmlns:a16="http://schemas.microsoft.com/office/drawing/2014/main" id="{BC7650B4-2968-4449-A4B1-2C77F10005BB}"/>
               </a:ext>
             </a:extLst>
           </p:cNvPr>
@@ -3544,7 +3620,7 @@
           <p:cNvPr id="2" name="Title 1">
             <a:extLst>
               <a:ext uri="{FF2B5EF4-FFF2-40B4-BE49-F238E27FC236}">
-                <a16:creationId xmlns:a16="http://schemas.microsoft.com/office/drawing/2014/main" xmlns="" id="{8E1ECCE6-D223-4A9C-AE1D-E9A2DFF0FC8E}"/>
+                <a16:creationId xmlns="" xmlns:a16="http://schemas.microsoft.com/office/drawing/2014/main" id="{8E1ECCE6-D223-4A9C-AE1D-E9A2DFF0FC8E}"/>
               </a:ext>
             </a:extLst>
           </p:cNvPr>
@@ -3582,7 +3658,7 @@
           <p:cNvPr id="3" name="Content Placeholder 2">
             <a:extLst>
               <a:ext uri="{FF2B5EF4-FFF2-40B4-BE49-F238E27FC236}">
-                <a16:creationId xmlns:a16="http://schemas.microsoft.com/office/drawing/2014/main" xmlns="" id="{B82EC1F7-6D9E-4A6E-83FA-3A28DA42147B}"/>
+                <a16:creationId xmlns="" xmlns:a16="http://schemas.microsoft.com/office/drawing/2014/main" id="{B82EC1F7-6D9E-4A6E-83FA-3A28DA42147B}"/>
               </a:ext>
             </a:extLst>
           </p:cNvPr>
@@ -3673,7 +3749,7 @@
           <p:cNvPr id="4" name="Text Placeholder 3">
             <a:extLst>
               <a:ext uri="{FF2B5EF4-FFF2-40B4-BE49-F238E27FC236}">
-                <a16:creationId xmlns:a16="http://schemas.microsoft.com/office/drawing/2014/main" xmlns="" id="{AF898F10-245A-48D3-9CBC-6CC749D412AA}"/>
+                <a16:creationId xmlns="" xmlns:a16="http://schemas.microsoft.com/office/drawing/2014/main" id="{AF898F10-245A-48D3-9CBC-6CC749D412AA}"/>
               </a:ext>
             </a:extLst>
           </p:cNvPr>
@@ -3744,7 +3820,7 @@
           <p:cNvPr id="5" name="Date Placeholder 4">
             <a:extLst>
               <a:ext uri="{FF2B5EF4-FFF2-40B4-BE49-F238E27FC236}">
-                <a16:creationId xmlns:a16="http://schemas.microsoft.com/office/drawing/2014/main" xmlns="" id="{32036AB4-92DA-44C3-87E4-1649313632B1}"/>
+                <a16:creationId xmlns="" xmlns:a16="http://schemas.microsoft.com/office/drawing/2014/main" id="{32036AB4-92DA-44C3-87E4-1649313632B1}"/>
               </a:ext>
             </a:extLst>
           </p:cNvPr>
@@ -3762,7 +3838,7 @@
           <a:p>
             <a:fld id="{AEC09C50-853A-420B-8C26-7439C86401C0}" type="datetimeFigureOut">
               <a:rPr lang="en-GB" smtClean="0"/>
-              <a:t>2017-12-14</a:t>
+              <a:t>2018-02-20</a:t>
             </a:fld>
             <a:endParaRPr lang="en-GB"/>
           </a:p>
@@ -3773,7 +3849,7 @@
           <p:cNvPr id="6" name="Footer Placeholder 5">
             <a:extLst>
               <a:ext uri="{FF2B5EF4-FFF2-40B4-BE49-F238E27FC236}">
-                <a16:creationId xmlns:a16="http://schemas.microsoft.com/office/drawing/2014/main" xmlns="" id="{1337DAE8-487C-4D6E-803D-F8F4FA67CA44}"/>
+                <a16:creationId xmlns="" xmlns:a16="http://schemas.microsoft.com/office/drawing/2014/main" id="{1337DAE8-487C-4D6E-803D-F8F4FA67CA44}"/>
               </a:ext>
             </a:extLst>
           </p:cNvPr>
@@ -3798,7 +3874,7 @@
           <p:cNvPr id="7" name="Slide Number Placeholder 6">
             <a:extLst>
               <a:ext uri="{FF2B5EF4-FFF2-40B4-BE49-F238E27FC236}">
-                <a16:creationId xmlns:a16="http://schemas.microsoft.com/office/drawing/2014/main" xmlns="" id="{CC449275-2FF4-4C64-ABAB-142D3BF60EAE}"/>
+                <a16:creationId xmlns="" xmlns:a16="http://schemas.microsoft.com/office/drawing/2014/main" id="{CC449275-2FF4-4C64-ABAB-142D3BF60EAE}"/>
               </a:ext>
             </a:extLst>
           </p:cNvPr>
@@ -3857,7 +3933,7 @@
           <p:cNvPr id="2" name="Title 1">
             <a:extLst>
               <a:ext uri="{FF2B5EF4-FFF2-40B4-BE49-F238E27FC236}">
-                <a16:creationId xmlns:a16="http://schemas.microsoft.com/office/drawing/2014/main" xmlns="" id="{D071AB62-177C-4054-8052-BBE8490E7381}"/>
+                <a16:creationId xmlns="" xmlns:a16="http://schemas.microsoft.com/office/drawing/2014/main" id="{D071AB62-177C-4054-8052-BBE8490E7381}"/>
               </a:ext>
             </a:extLst>
           </p:cNvPr>
@@ -3895,7 +3971,7 @@
           <p:cNvPr id="3" name="Picture Placeholder 2">
             <a:extLst>
               <a:ext uri="{FF2B5EF4-FFF2-40B4-BE49-F238E27FC236}">
-                <a16:creationId xmlns:a16="http://schemas.microsoft.com/office/drawing/2014/main" xmlns="" id="{A0D50678-0335-4865-AE73-1BCBF41E616A}"/>
+                <a16:creationId xmlns="" xmlns:a16="http://schemas.microsoft.com/office/drawing/2014/main" id="{A0D50678-0335-4865-AE73-1BCBF41E616A}"/>
               </a:ext>
             </a:extLst>
           </p:cNvPr>
@@ -3962,7 +4038,7 @@
           <p:cNvPr id="4" name="Text Placeholder 3">
             <a:extLst>
               <a:ext uri="{FF2B5EF4-FFF2-40B4-BE49-F238E27FC236}">
-                <a16:creationId xmlns:a16="http://schemas.microsoft.com/office/drawing/2014/main" xmlns="" id="{73ED4DA1-0F6A-4A5D-B369-9469EF35B96D}"/>
+                <a16:creationId xmlns="" xmlns:a16="http://schemas.microsoft.com/office/drawing/2014/main" id="{73ED4DA1-0F6A-4A5D-B369-9469EF35B96D}"/>
               </a:ext>
             </a:extLst>
           </p:cNvPr>
@@ -4033,7 +4109,7 @@
           <p:cNvPr id="5" name="Date Placeholder 4">
             <a:extLst>
               <a:ext uri="{FF2B5EF4-FFF2-40B4-BE49-F238E27FC236}">
-                <a16:creationId xmlns:a16="http://schemas.microsoft.com/office/drawing/2014/main" xmlns="" id="{092FC3AE-ADA3-4288-A99B-E5F02A2E42C8}"/>
+                <a16:creationId xmlns="" xmlns:a16="http://schemas.microsoft.com/office/drawing/2014/main" id="{092FC3AE-ADA3-4288-A99B-E5F02A2E42C8}"/>
               </a:ext>
             </a:extLst>
           </p:cNvPr>
@@ -4051,7 +4127,7 @@
           <a:p>
             <a:fld id="{AEC09C50-853A-420B-8C26-7439C86401C0}" type="datetimeFigureOut">
               <a:rPr lang="en-GB" smtClean="0"/>
-              <a:t>2017-12-14</a:t>
+              <a:t>2018-02-20</a:t>
             </a:fld>
             <a:endParaRPr lang="en-GB"/>
           </a:p>
@@ -4062,7 +4138,7 @@
           <p:cNvPr id="6" name="Footer Placeholder 5">
             <a:extLst>
               <a:ext uri="{FF2B5EF4-FFF2-40B4-BE49-F238E27FC236}">
-                <a16:creationId xmlns:a16="http://schemas.microsoft.com/office/drawing/2014/main" xmlns="" id="{2893494B-FAB4-440E-AAEB-FFBDB092E663}"/>
+                <a16:creationId xmlns="" xmlns:a16="http://schemas.microsoft.com/office/drawing/2014/main" id="{2893494B-FAB4-440E-AAEB-FFBDB092E663}"/>
               </a:ext>
             </a:extLst>
           </p:cNvPr>
@@ -4087,7 +4163,7 @@
           <p:cNvPr id="7" name="Slide Number Placeholder 6">
             <a:extLst>
               <a:ext uri="{FF2B5EF4-FFF2-40B4-BE49-F238E27FC236}">
-                <a16:creationId xmlns:a16="http://schemas.microsoft.com/office/drawing/2014/main" xmlns="" id="{073F7F22-A5C8-498A-800E-37E463DFAE16}"/>
+                <a16:creationId xmlns="" xmlns:a16="http://schemas.microsoft.com/office/drawing/2014/main" id="{073F7F22-A5C8-498A-800E-37E463DFAE16}"/>
               </a:ext>
             </a:extLst>
           </p:cNvPr>
@@ -4151,7 +4227,7 @@
           <p:cNvPr id="2" name="Title Placeholder 1">
             <a:extLst>
               <a:ext uri="{FF2B5EF4-FFF2-40B4-BE49-F238E27FC236}">
-                <a16:creationId xmlns:a16="http://schemas.microsoft.com/office/drawing/2014/main" xmlns="" id="{F0BB2809-085E-4223-9992-2BB5FBC08E6E}"/>
+                <a16:creationId xmlns="" xmlns:a16="http://schemas.microsoft.com/office/drawing/2014/main" id="{F0BB2809-085E-4223-9992-2BB5FBC08E6E}"/>
               </a:ext>
             </a:extLst>
           </p:cNvPr>
@@ -4190,7 +4266,7 @@
           <p:cNvPr id="3" name="Text Placeholder 2">
             <a:extLst>
               <a:ext uri="{FF2B5EF4-FFF2-40B4-BE49-F238E27FC236}">
-                <a16:creationId xmlns:a16="http://schemas.microsoft.com/office/drawing/2014/main" xmlns="" id="{FEC23C1B-CC61-40EA-905D-95DABCC0D1B8}"/>
+                <a16:creationId xmlns="" xmlns:a16="http://schemas.microsoft.com/office/drawing/2014/main" id="{FEC23C1B-CC61-40EA-905D-95DABCC0D1B8}"/>
               </a:ext>
             </a:extLst>
           </p:cNvPr>
@@ -4258,7 +4334,7 @@
           <p:cNvPr id="4" name="Date Placeholder 3">
             <a:extLst>
               <a:ext uri="{FF2B5EF4-FFF2-40B4-BE49-F238E27FC236}">
-                <a16:creationId xmlns:a16="http://schemas.microsoft.com/office/drawing/2014/main" xmlns="" id="{129CB7B1-CB51-4ACA-B179-C824284E8378}"/>
+                <a16:creationId xmlns="" xmlns:a16="http://schemas.microsoft.com/office/drawing/2014/main" id="{129CB7B1-CB51-4ACA-B179-C824284E8378}"/>
               </a:ext>
             </a:extLst>
           </p:cNvPr>
@@ -4294,7 +4370,7 @@
           <a:p>
             <a:fld id="{AEC09C50-853A-420B-8C26-7439C86401C0}" type="datetimeFigureOut">
               <a:rPr lang="en-GB" smtClean="0"/>
-              <a:t>2017-12-14</a:t>
+              <a:t>2018-02-20</a:t>
             </a:fld>
             <a:endParaRPr lang="en-GB"/>
           </a:p>
@@ -4305,7 +4381,7 @@
           <p:cNvPr id="5" name="Footer Placeholder 4">
             <a:extLst>
               <a:ext uri="{FF2B5EF4-FFF2-40B4-BE49-F238E27FC236}">
-                <a16:creationId xmlns:a16="http://schemas.microsoft.com/office/drawing/2014/main" xmlns="" id="{06C0286E-4114-4920-A399-1E3F7F913343}"/>
+                <a16:creationId xmlns="" xmlns:a16="http://schemas.microsoft.com/office/drawing/2014/main" id="{06C0286E-4114-4920-A399-1E3F7F913343}"/>
               </a:ext>
             </a:extLst>
           </p:cNvPr>
@@ -4348,7 +4424,7 @@
           <p:cNvPr id="6" name="Slide Number Placeholder 5">
             <a:extLst>
               <a:ext uri="{FF2B5EF4-FFF2-40B4-BE49-F238E27FC236}">
-                <a16:creationId xmlns:a16="http://schemas.microsoft.com/office/drawing/2014/main" xmlns="" id="{496FAA64-61A7-4E2F-B9B4-DB069A6171DB}"/>
+                <a16:creationId xmlns="" xmlns:a16="http://schemas.microsoft.com/office/drawing/2014/main" id="{496FAA64-61A7-4E2F-B9B4-DB069A6171DB}"/>
               </a:ext>
             </a:extLst>
           </p:cNvPr>
@@ -4989,7 +5065,7 @@
           <p:cNvPr id="2" name="TextBox 1">
             <a:extLst>
               <a:ext uri="{FF2B5EF4-FFF2-40B4-BE49-F238E27FC236}">
-                <a16:creationId xmlns:a16="http://schemas.microsoft.com/office/drawing/2014/main" xmlns="" id="{E43AF4C5-CF5B-4E7E-B438-83CD70BE1265}"/>
+                <a16:creationId xmlns="" xmlns:a16="http://schemas.microsoft.com/office/drawing/2014/main" id="{E43AF4C5-CF5B-4E7E-B438-83CD70BE1265}"/>
               </a:ext>
             </a:extLst>
           </p:cNvPr>
@@ -5135,7 +5211,7 @@
           <p:cNvPr id="10" name="TextBox 9">
             <a:extLst>
               <a:ext uri="{FF2B5EF4-FFF2-40B4-BE49-F238E27FC236}">
-                <a16:creationId xmlns:a16="http://schemas.microsoft.com/office/drawing/2014/main" xmlns="" id="{438442CF-1B82-4A10-87A1-614331CA498E}"/>
+                <a16:creationId xmlns="" xmlns:a16="http://schemas.microsoft.com/office/drawing/2014/main" id="{438442CF-1B82-4A10-87A1-614331CA498E}"/>
               </a:ext>
             </a:extLst>
           </p:cNvPr>
@@ -7640,7 +7716,7 @@
           <p:cNvPr id="20" name="TextBox 19">
             <a:extLst>
               <a:ext uri="{FF2B5EF4-FFF2-40B4-BE49-F238E27FC236}">
-                <a16:creationId xmlns:a16="http://schemas.microsoft.com/office/drawing/2014/main" xmlns="" id="{E43AF4C5-CF5B-4E7E-B438-83CD70BE1265}"/>
+                <a16:creationId xmlns="" xmlns:a16="http://schemas.microsoft.com/office/drawing/2014/main" id="{E43AF4C5-CF5B-4E7E-B438-83CD70BE1265}"/>
               </a:ext>
             </a:extLst>
           </p:cNvPr>
@@ -8217,7 +8293,7 @@
           <p:cNvPr id="2" name="TextBox 1">
             <a:extLst>
               <a:ext uri="{FF2B5EF4-FFF2-40B4-BE49-F238E27FC236}">
-                <a16:creationId xmlns:a16="http://schemas.microsoft.com/office/drawing/2014/main" xmlns="" id="{E43AF4C5-CF5B-4E7E-B438-83CD70BE1265}"/>
+                <a16:creationId xmlns="" xmlns:a16="http://schemas.microsoft.com/office/drawing/2014/main" id="{E43AF4C5-CF5B-4E7E-B438-83CD70BE1265}"/>
               </a:ext>
             </a:extLst>
           </p:cNvPr>
@@ -8391,7 +8467,7 @@
               <p:cNvPr id="8" name="TextBox 7">
                 <a:extLst>
                   <a:ext uri="{FF2B5EF4-FFF2-40B4-BE49-F238E27FC236}">
-                    <a16:creationId xmlns:a16="http://schemas.microsoft.com/office/drawing/2014/main" xmlns="" id="{EDB442F5-34D7-4300-BA18-4B5BC98BC3D4}"/>
+                    <a16:creationId xmlns="" xmlns:a16="http://schemas.microsoft.com/office/drawing/2014/main" id="{EDB442F5-34D7-4300-BA18-4B5BC98BC3D4}"/>
                   </a:ext>
                 </a:extLst>
               </p:cNvPr>
@@ -8437,7 +8513,7 @@
               <p:cNvPr id="9" name="TextBox 8">
                 <a:extLst>
                   <a:ext uri="{FF2B5EF4-FFF2-40B4-BE49-F238E27FC236}">
-                    <a16:creationId xmlns:a16="http://schemas.microsoft.com/office/drawing/2014/main" xmlns="" id="{1126D985-4D01-49AD-AAA0-F753E895E063}"/>
+                    <a16:creationId xmlns="" xmlns:a16="http://schemas.microsoft.com/office/drawing/2014/main" id="{1126D985-4D01-49AD-AAA0-F753E895E063}"/>
                   </a:ext>
                 </a:extLst>
               </p:cNvPr>
@@ -8483,7 +8559,7 @@
               <p:cNvPr id="10" name="TextBox 9">
                 <a:extLst>
                   <a:ext uri="{FF2B5EF4-FFF2-40B4-BE49-F238E27FC236}">
-                    <a16:creationId xmlns:a16="http://schemas.microsoft.com/office/drawing/2014/main" xmlns="" id="{2F327C8B-A760-45E6-AF3F-CC4F1AE1E652}"/>
+                    <a16:creationId xmlns="" xmlns:a16="http://schemas.microsoft.com/office/drawing/2014/main" id="{2F327C8B-A760-45E6-AF3F-CC4F1AE1E652}"/>
                   </a:ext>
                 </a:extLst>
               </p:cNvPr>
@@ -8529,7 +8605,7 @@
               <p:cNvPr id="11" name="TextBox 10">
                 <a:extLst>
                   <a:ext uri="{FF2B5EF4-FFF2-40B4-BE49-F238E27FC236}">
-                    <a16:creationId xmlns:a16="http://schemas.microsoft.com/office/drawing/2014/main" xmlns="" id="{839ACAD9-74C5-4CC6-8034-5AFF1C74CC80}"/>
+                    <a16:creationId xmlns="" xmlns:a16="http://schemas.microsoft.com/office/drawing/2014/main" id="{839ACAD9-74C5-4CC6-8034-5AFF1C74CC80}"/>
                   </a:ext>
                 </a:extLst>
               </p:cNvPr>
@@ -8573,7 +8649,7 @@
               <p:cNvPr id="12" name="TextBox 11">
                 <a:extLst>
                   <a:ext uri="{FF2B5EF4-FFF2-40B4-BE49-F238E27FC236}">
-                    <a16:creationId xmlns:a16="http://schemas.microsoft.com/office/drawing/2014/main" xmlns="" id="{222D7E88-8744-4298-AB65-66D1802C446A}"/>
+                    <a16:creationId xmlns="" xmlns:a16="http://schemas.microsoft.com/office/drawing/2014/main" id="{222D7E88-8744-4298-AB65-66D1802C446A}"/>
                   </a:ext>
                 </a:extLst>
               </p:cNvPr>
@@ -8617,7 +8693,7 @@
             <p:cNvPr id="5" name="Rectangle 2">
               <a:extLst>
                 <a:ext uri="{FF2B5EF4-FFF2-40B4-BE49-F238E27FC236}">
-                  <a16:creationId xmlns:a16="http://schemas.microsoft.com/office/drawing/2014/main" xmlns="" id="{525E0D96-8099-4601-80D1-0E4DF7CAD69B}"/>
+                  <a16:creationId xmlns="" xmlns:a16="http://schemas.microsoft.com/office/drawing/2014/main" id="{525E0D96-8099-4601-80D1-0E4DF7CAD69B}"/>
                 </a:ext>
               </a:extLst>
             </p:cNvPr>
@@ -8694,7 +8770,7 @@
             <p:cNvPr id="6" name="TextBox 5">
               <a:extLst>
                 <a:ext uri="{FF2B5EF4-FFF2-40B4-BE49-F238E27FC236}">
-                  <a16:creationId xmlns:a16="http://schemas.microsoft.com/office/drawing/2014/main" xmlns="" id="{0FD4CFE0-333E-4BDA-B155-05698DAD0B70}"/>
+                  <a16:creationId xmlns="" xmlns:a16="http://schemas.microsoft.com/office/drawing/2014/main" id="{0FD4CFE0-333E-4BDA-B155-05698DAD0B70}"/>
                 </a:ext>
               </a:extLst>
             </p:cNvPr>
@@ -8737,7 +8813,7 @@
             <p:cNvPr id="7" name="Rectangle 3">
               <a:extLst>
                 <a:ext uri="{FF2B5EF4-FFF2-40B4-BE49-F238E27FC236}">
-                  <a16:creationId xmlns:a16="http://schemas.microsoft.com/office/drawing/2014/main" xmlns="" id="{46ADB3CD-EA06-4C85-A4CE-E0A5AA5A8DFC}"/>
+                  <a16:creationId xmlns="" xmlns:a16="http://schemas.microsoft.com/office/drawing/2014/main" id="{46ADB3CD-EA06-4C85-A4CE-E0A5AA5A8DFC}"/>
                 </a:ext>
               </a:extLst>
             </p:cNvPr>
@@ -10058,7 +10134,7 @@
           <p:cNvPr id="2" name="TextBox 1">
             <a:extLst>
               <a:ext uri="{FF2B5EF4-FFF2-40B4-BE49-F238E27FC236}">
-                <a16:creationId xmlns:a16="http://schemas.microsoft.com/office/drawing/2014/main" xmlns="" id="{E43AF4C5-CF5B-4E7E-B438-83CD70BE1265}"/>
+                <a16:creationId xmlns="" xmlns:a16="http://schemas.microsoft.com/office/drawing/2014/main" id="{E43AF4C5-CF5B-4E7E-B438-83CD70BE1265}"/>
               </a:ext>
             </a:extLst>
           </p:cNvPr>
@@ -10232,7 +10308,7 @@
               <p:cNvPr id="8" name="TextBox 7">
                 <a:extLst>
                   <a:ext uri="{FF2B5EF4-FFF2-40B4-BE49-F238E27FC236}">
-                    <a16:creationId xmlns:a16="http://schemas.microsoft.com/office/drawing/2014/main" xmlns="" id="{EDB442F5-34D7-4300-BA18-4B5BC98BC3D4}"/>
+                    <a16:creationId xmlns="" xmlns:a16="http://schemas.microsoft.com/office/drawing/2014/main" id="{EDB442F5-34D7-4300-BA18-4B5BC98BC3D4}"/>
                   </a:ext>
                 </a:extLst>
               </p:cNvPr>
@@ -10278,7 +10354,7 @@
               <p:cNvPr id="9" name="TextBox 8">
                 <a:extLst>
                   <a:ext uri="{FF2B5EF4-FFF2-40B4-BE49-F238E27FC236}">
-                    <a16:creationId xmlns:a16="http://schemas.microsoft.com/office/drawing/2014/main" xmlns="" id="{1126D985-4D01-49AD-AAA0-F753E895E063}"/>
+                    <a16:creationId xmlns="" xmlns:a16="http://schemas.microsoft.com/office/drawing/2014/main" id="{1126D985-4D01-49AD-AAA0-F753E895E063}"/>
                   </a:ext>
                 </a:extLst>
               </p:cNvPr>
@@ -10324,7 +10400,7 @@
               <p:cNvPr id="10" name="TextBox 9">
                 <a:extLst>
                   <a:ext uri="{FF2B5EF4-FFF2-40B4-BE49-F238E27FC236}">
-                    <a16:creationId xmlns:a16="http://schemas.microsoft.com/office/drawing/2014/main" xmlns="" id="{2F327C8B-A760-45E6-AF3F-CC4F1AE1E652}"/>
+                    <a16:creationId xmlns="" xmlns:a16="http://schemas.microsoft.com/office/drawing/2014/main" id="{2F327C8B-A760-45E6-AF3F-CC4F1AE1E652}"/>
                   </a:ext>
                 </a:extLst>
               </p:cNvPr>
@@ -10370,7 +10446,7 @@
               <p:cNvPr id="11" name="TextBox 10">
                 <a:extLst>
                   <a:ext uri="{FF2B5EF4-FFF2-40B4-BE49-F238E27FC236}">
-                    <a16:creationId xmlns:a16="http://schemas.microsoft.com/office/drawing/2014/main" xmlns="" id="{839ACAD9-74C5-4CC6-8034-5AFF1C74CC80}"/>
+                    <a16:creationId xmlns="" xmlns:a16="http://schemas.microsoft.com/office/drawing/2014/main" id="{839ACAD9-74C5-4CC6-8034-5AFF1C74CC80}"/>
                   </a:ext>
                 </a:extLst>
               </p:cNvPr>
@@ -10414,7 +10490,7 @@
               <p:cNvPr id="12" name="TextBox 11">
                 <a:extLst>
                   <a:ext uri="{FF2B5EF4-FFF2-40B4-BE49-F238E27FC236}">
-                    <a16:creationId xmlns:a16="http://schemas.microsoft.com/office/drawing/2014/main" xmlns="" id="{222D7E88-8744-4298-AB65-66D1802C446A}"/>
+                    <a16:creationId xmlns="" xmlns:a16="http://schemas.microsoft.com/office/drawing/2014/main" id="{222D7E88-8744-4298-AB65-66D1802C446A}"/>
                   </a:ext>
                 </a:extLst>
               </p:cNvPr>
@@ -10458,7 +10534,7 @@
             <p:cNvPr id="5" name="Rectangle 2">
               <a:extLst>
                 <a:ext uri="{FF2B5EF4-FFF2-40B4-BE49-F238E27FC236}">
-                  <a16:creationId xmlns:a16="http://schemas.microsoft.com/office/drawing/2014/main" xmlns="" id="{525E0D96-8099-4601-80D1-0E4DF7CAD69B}"/>
+                  <a16:creationId xmlns="" xmlns:a16="http://schemas.microsoft.com/office/drawing/2014/main" id="{525E0D96-8099-4601-80D1-0E4DF7CAD69B}"/>
                 </a:ext>
               </a:extLst>
             </p:cNvPr>
@@ -10535,7 +10611,7 @@
             <p:cNvPr id="6" name="TextBox 5">
               <a:extLst>
                 <a:ext uri="{FF2B5EF4-FFF2-40B4-BE49-F238E27FC236}">
-                  <a16:creationId xmlns:a16="http://schemas.microsoft.com/office/drawing/2014/main" xmlns="" id="{0FD4CFE0-333E-4BDA-B155-05698DAD0B70}"/>
+                  <a16:creationId xmlns="" xmlns:a16="http://schemas.microsoft.com/office/drawing/2014/main" id="{0FD4CFE0-333E-4BDA-B155-05698DAD0B70}"/>
                 </a:ext>
               </a:extLst>
             </p:cNvPr>
@@ -10578,7 +10654,7 @@
             <p:cNvPr id="7" name="Rectangle 3">
               <a:extLst>
                 <a:ext uri="{FF2B5EF4-FFF2-40B4-BE49-F238E27FC236}">
-                  <a16:creationId xmlns:a16="http://schemas.microsoft.com/office/drawing/2014/main" xmlns="" id="{46ADB3CD-EA06-4C85-A4CE-E0A5AA5A8DFC}"/>
+                  <a16:creationId xmlns="" xmlns:a16="http://schemas.microsoft.com/office/drawing/2014/main" id="{46ADB3CD-EA06-4C85-A4CE-E0A5AA5A8DFC}"/>
                 </a:ext>
               </a:extLst>
             </p:cNvPr>
@@ -11411,7 +11487,7 @@
           <p:cNvPr id="4" name="TextBox 3">
             <a:extLst>
               <a:ext uri="{FF2B5EF4-FFF2-40B4-BE49-F238E27FC236}">
-                <a16:creationId xmlns:a16="http://schemas.microsoft.com/office/drawing/2014/main" xmlns="" id="{E43AF4C5-CF5B-4E7E-B438-83CD70BE1265}"/>
+                <a16:creationId xmlns="" xmlns:a16="http://schemas.microsoft.com/office/drawing/2014/main" id="{E43AF4C5-CF5B-4E7E-B438-83CD70BE1265}"/>
               </a:ext>
             </a:extLst>
           </p:cNvPr>
@@ -12936,7 +13012,7 @@
           <p:cNvPr id="2" name="TextBox 1">
             <a:extLst>
               <a:ext uri="{FF2B5EF4-FFF2-40B4-BE49-F238E27FC236}">
-                <a16:creationId xmlns:a16="http://schemas.microsoft.com/office/drawing/2014/main" xmlns="" id="{E43AF4C5-CF5B-4E7E-B438-83CD70BE1265}"/>
+                <a16:creationId xmlns="" xmlns:a16="http://schemas.microsoft.com/office/drawing/2014/main" id="{E43AF4C5-CF5B-4E7E-B438-83CD70BE1265}"/>
               </a:ext>
             </a:extLst>
           </p:cNvPr>
@@ -13014,7 +13090,7 @@
                 </a:solidFill>
                 <a:latin typeface="Times New Roman" panose="02020603050405020304" pitchFamily="18" charset="0"/>
                 <a:cs typeface="Times New Roman" panose="02020603050405020304" pitchFamily="18" charset="0"/>
-                <a:hlinkClick r:id="rId2"/>
+                <a:hlinkClick r:id="rId3"/>
               </a:rPr>
               <a:t>PHRED</a:t>
             </a:r>
@@ -13110,7 +13186,7 @@
               <p:cNvPr id="9" name="TextBox 8">
                 <a:extLst>
                   <a:ext uri="{FF2B5EF4-FFF2-40B4-BE49-F238E27FC236}">
-                    <a16:creationId xmlns:a16="http://schemas.microsoft.com/office/drawing/2014/main" xmlns="" id="{EDB442F5-34D7-4300-BA18-4B5BC98BC3D4}"/>
+                    <a16:creationId xmlns="" xmlns:a16="http://schemas.microsoft.com/office/drawing/2014/main" id="{EDB442F5-34D7-4300-BA18-4B5BC98BC3D4}"/>
                   </a:ext>
                 </a:extLst>
               </p:cNvPr>
@@ -13156,7 +13232,7 @@
               <p:cNvPr id="10" name="TextBox 9">
                 <a:extLst>
                   <a:ext uri="{FF2B5EF4-FFF2-40B4-BE49-F238E27FC236}">
-                    <a16:creationId xmlns:a16="http://schemas.microsoft.com/office/drawing/2014/main" xmlns="" id="{1126D985-4D01-49AD-AAA0-F753E895E063}"/>
+                    <a16:creationId xmlns="" xmlns:a16="http://schemas.microsoft.com/office/drawing/2014/main" id="{1126D985-4D01-49AD-AAA0-F753E895E063}"/>
                   </a:ext>
                 </a:extLst>
               </p:cNvPr>
@@ -13202,7 +13278,7 @@
               <p:cNvPr id="11" name="TextBox 10">
                 <a:extLst>
                   <a:ext uri="{FF2B5EF4-FFF2-40B4-BE49-F238E27FC236}">
-                    <a16:creationId xmlns:a16="http://schemas.microsoft.com/office/drawing/2014/main" xmlns="" id="{2F327C8B-A760-45E6-AF3F-CC4F1AE1E652}"/>
+                    <a16:creationId xmlns="" xmlns:a16="http://schemas.microsoft.com/office/drawing/2014/main" id="{2F327C8B-A760-45E6-AF3F-CC4F1AE1E652}"/>
                   </a:ext>
                 </a:extLst>
               </p:cNvPr>
@@ -13248,7 +13324,7 @@
               <p:cNvPr id="12" name="TextBox 11">
                 <a:extLst>
                   <a:ext uri="{FF2B5EF4-FFF2-40B4-BE49-F238E27FC236}">
-                    <a16:creationId xmlns:a16="http://schemas.microsoft.com/office/drawing/2014/main" xmlns="" id="{839ACAD9-74C5-4CC6-8034-5AFF1C74CC80}"/>
+                    <a16:creationId xmlns="" xmlns:a16="http://schemas.microsoft.com/office/drawing/2014/main" id="{839ACAD9-74C5-4CC6-8034-5AFF1C74CC80}"/>
                   </a:ext>
                 </a:extLst>
               </p:cNvPr>
@@ -13292,7 +13368,7 @@
               <p:cNvPr id="13" name="TextBox 12">
                 <a:extLst>
                   <a:ext uri="{FF2B5EF4-FFF2-40B4-BE49-F238E27FC236}">
-                    <a16:creationId xmlns:a16="http://schemas.microsoft.com/office/drawing/2014/main" xmlns="" id="{222D7E88-8744-4298-AB65-66D1802C446A}"/>
+                    <a16:creationId xmlns="" xmlns:a16="http://schemas.microsoft.com/office/drawing/2014/main" id="{222D7E88-8744-4298-AB65-66D1802C446A}"/>
                   </a:ext>
                 </a:extLst>
               </p:cNvPr>
@@ -13336,7 +13412,7 @@
             <p:cNvPr id="6" name="Rectangle 2">
               <a:extLst>
                 <a:ext uri="{FF2B5EF4-FFF2-40B4-BE49-F238E27FC236}">
-                  <a16:creationId xmlns:a16="http://schemas.microsoft.com/office/drawing/2014/main" xmlns="" id="{525E0D96-8099-4601-80D1-0E4DF7CAD69B}"/>
+                  <a16:creationId xmlns="" xmlns:a16="http://schemas.microsoft.com/office/drawing/2014/main" id="{525E0D96-8099-4601-80D1-0E4DF7CAD69B}"/>
                 </a:ext>
               </a:extLst>
             </p:cNvPr>
@@ -13413,7 +13489,7 @@
             <p:cNvPr id="7" name="TextBox 6">
               <a:extLst>
                 <a:ext uri="{FF2B5EF4-FFF2-40B4-BE49-F238E27FC236}">
-                  <a16:creationId xmlns:a16="http://schemas.microsoft.com/office/drawing/2014/main" xmlns="" id="{0FD4CFE0-333E-4BDA-B155-05698DAD0B70}"/>
+                  <a16:creationId xmlns="" xmlns:a16="http://schemas.microsoft.com/office/drawing/2014/main" id="{0FD4CFE0-333E-4BDA-B155-05698DAD0B70}"/>
                 </a:ext>
               </a:extLst>
             </p:cNvPr>
@@ -13456,7 +13532,7 @@
             <p:cNvPr id="8" name="Rectangle 3">
               <a:extLst>
                 <a:ext uri="{FF2B5EF4-FFF2-40B4-BE49-F238E27FC236}">
-                  <a16:creationId xmlns:a16="http://schemas.microsoft.com/office/drawing/2014/main" xmlns="" id="{46ADB3CD-EA06-4C85-A4CE-E0A5AA5A8DFC}"/>
+                  <a16:creationId xmlns="" xmlns:a16="http://schemas.microsoft.com/office/drawing/2014/main" id="{46ADB3CD-EA06-4C85-A4CE-E0A5AA5A8DFC}"/>
                 </a:ext>
               </a:extLst>
             </p:cNvPr>
@@ -13752,7 +13828,14 @@
                 <a:latin typeface="Times New Roman" panose="02020603050405020304" pitchFamily="18" charset="0"/>
                 <a:cs typeface="Times New Roman" panose="02020603050405020304" pitchFamily="18" charset="0"/>
               </a:rPr>
-              <a:t>SUBTRACT 32</a:t>
+              <a:t>SUBTRACT </a:t>
+            </a:r>
+            <a:r>
+              <a:rPr lang="en-GB" sz="2000" b="1" i="1" u="sng" dirty="0" smtClean="0">
+                <a:latin typeface="Times New Roman" panose="02020603050405020304" pitchFamily="18" charset="0"/>
+                <a:cs typeface="Times New Roman" panose="02020603050405020304" pitchFamily="18" charset="0"/>
+              </a:rPr>
+              <a:t>33</a:t>
             </a:r>
             <a:r>
               <a:rPr lang="en-GB" sz="2000" dirty="0" smtClean="0">
@@ -14359,7 +14442,7 @@
             <a:p>
               <a:r>
                 <a:rPr lang="en-GB" dirty="0" smtClean="0"/>
-                <a:t>10</a:t>
+                <a:t>09</a:t>
               </a:r>
               <a:endParaRPr lang="en-GB" dirty="0"/>
             </a:p>
@@ -14393,7 +14476,7 @@
             <a:p>
               <a:r>
                 <a:rPr lang="en-GB" dirty="0" smtClean="0"/>
-                <a:t>38</a:t>
+                <a:t>37</a:t>
               </a:r>
               <a:endParaRPr lang="en-GB" dirty="0"/>
             </a:p>
@@ -14427,7 +14510,7 @@
             <a:p>
               <a:r>
                 <a:rPr lang="en-GB" dirty="0" smtClean="0"/>
-                <a:t>30</a:t>
+                <a:t>29</a:t>
               </a:r>
               <a:endParaRPr lang="en-GB" dirty="0"/>
             </a:p>
@@ -14461,7 +14544,7 @@
             <a:p>
               <a:r>
                 <a:rPr lang="en-GB" dirty="0" smtClean="0"/>
-                <a:t>21</a:t>
+                <a:t>20</a:t>
               </a:r>
               <a:endParaRPr lang="en-GB" dirty="0"/>
             </a:p>
@@ -14495,7 +14578,7 @@
             <a:p>
               <a:r>
                 <a:rPr lang="en-GB" dirty="0" smtClean="0"/>
-                <a:t>46</a:t>
+                <a:t>45</a:t>
               </a:r>
               <a:endParaRPr lang="en-GB" dirty="0"/>
             </a:p>
@@ -14918,7 +15001,7 @@
           <p:cNvPr id="2" name="TextBox 1">
             <a:extLst>
               <a:ext uri="{FF2B5EF4-FFF2-40B4-BE49-F238E27FC236}">
-                <a16:creationId xmlns:a16="http://schemas.microsoft.com/office/drawing/2014/main" xmlns="" id="{E43AF4C5-CF5B-4E7E-B438-83CD70BE1265}"/>
+                <a16:creationId xmlns="" xmlns:a16="http://schemas.microsoft.com/office/drawing/2014/main" id="{E43AF4C5-CF5B-4E7E-B438-83CD70BE1265}"/>
               </a:ext>
             </a:extLst>
           </p:cNvPr>
@@ -15127,12 +15210,27 @@
           </a:bodyPr>
           <a:lstStyle/>
           <a:p>
+            <a:pPr algn="just"/>
             <a:r>
               <a:rPr lang="en-GB" dirty="0" smtClean="0">
                 <a:latin typeface="Times New Roman" panose="02020603050405020304" pitchFamily="18" charset="0"/>
                 <a:cs typeface="Times New Roman" panose="02020603050405020304" pitchFamily="18" charset="0"/>
               </a:rPr>
-              <a:t>Long ago … stupid people at the Sanger Centre coded </a:t>
+              <a:t>Long ago … </a:t>
+            </a:r>
+            <a:r>
+              <a:rPr lang="en-GB" dirty="0" smtClean="0">
+                <a:latin typeface="Times New Roman" panose="02020603050405020304" pitchFamily="18" charset="0"/>
+                <a:cs typeface="Times New Roman" panose="02020603050405020304" pitchFamily="18" charset="0"/>
+              </a:rPr>
+              <a:t>the </a:t>
+            </a:r>
+            <a:r>
+              <a:rPr lang="en-GB" dirty="0" smtClean="0">
+                <a:latin typeface="Times New Roman" panose="02020603050405020304" pitchFamily="18" charset="0"/>
+                <a:cs typeface="Times New Roman" panose="02020603050405020304" pitchFamily="18" charset="0"/>
+              </a:rPr>
+              <a:t>Sanger Centre coded </a:t>
             </a:r>
             <a:r>
               <a:rPr lang="en-GB" b="1" dirty="0" smtClean="0">
@@ -15210,6 +15308,7 @@
           </a:bodyPr>
           <a:lstStyle/>
           <a:p>
+            <a:pPr algn="just"/>
             <a:r>
               <a:rPr lang="en-GB" dirty="0" smtClean="0">
                 <a:latin typeface="Times New Roman" panose="02020603050405020304" pitchFamily="18" charset="0"/>
@@ -15222,24 +15321,31 @@
                 <a:latin typeface="Times New Roman" panose="02020603050405020304" pitchFamily="18" charset="0"/>
                 <a:cs typeface="Times New Roman" panose="02020603050405020304" pitchFamily="18" charset="0"/>
               </a:rPr>
-              <a:t>63</a:t>
+              <a:t>64</a:t>
             </a:r>
             <a:r>
               <a:rPr lang="en-GB" dirty="0" smtClean="0">
                 <a:latin typeface="Times New Roman" panose="02020603050405020304" pitchFamily="18" charset="0"/>
                 <a:cs typeface="Times New Roman" panose="02020603050405020304" pitchFamily="18" charset="0"/>
               </a:rPr>
-              <a:t> instead of </a:t>
+              <a:t> </a:t>
+            </a:r>
+            <a:r>
+              <a:rPr lang="en-GB" dirty="0" smtClean="0">
+                <a:latin typeface="Times New Roman" panose="02020603050405020304" pitchFamily="18" charset="0"/>
+                <a:cs typeface="Times New Roman" panose="02020603050405020304" pitchFamily="18" charset="0"/>
+              </a:rPr>
+              <a:t>instead of </a:t>
             </a:r>
             <a:r>
               <a:rPr lang="en-GB" b="1" dirty="0" smtClean="0">
                 <a:latin typeface="Times New Roman" panose="02020603050405020304" pitchFamily="18" charset="0"/>
                 <a:cs typeface="Times New Roman" panose="02020603050405020304" pitchFamily="18" charset="0"/>
               </a:rPr>
-              <a:t>32</a:t>
-            </a:r>
-            <a:r>
-              <a:rPr lang="en-GB" dirty="0">
+              <a:t>33</a:t>
+            </a:r>
+            <a:r>
+              <a:rPr lang="en-GB" dirty="0" smtClean="0">
                 <a:latin typeface="Times New Roman" panose="02020603050405020304" pitchFamily="18" charset="0"/>
                 <a:cs typeface="Times New Roman" panose="02020603050405020304" pitchFamily="18" charset="0"/>
               </a:rPr>
@@ -15797,8 +15903,8 @@
         </p:nvSpPr>
         <p:spPr>
           <a:xfrm>
-            <a:off x="2888974" y="1152939"/>
-            <a:ext cx="3474028" cy="3416320"/>
+            <a:off x="1594746" y="1757850"/>
+            <a:ext cx="8801278" cy="3785652"/>
           </a:xfrm>
           <a:prstGeom prst="rect">
             <a:avLst/>
@@ -15806,45 +15912,135 @@
           <a:noFill/>
         </p:spPr>
         <p:txBody>
-          <a:bodyPr wrap="none" rtlCol="0">
+          <a:bodyPr wrap="square" rtlCol="0">
             <a:spAutoFit/>
           </a:bodyPr>
           <a:lstStyle/>
           <a:p>
             <a:r>
-              <a:rPr lang="en-GB" sz="5400" dirty="0" smtClean="0">
-                <a:latin typeface="Times New Roman" panose="02020603050405020304" pitchFamily="18" charset="0"/>
-                <a:cs typeface="Times New Roman" panose="02020603050405020304" pitchFamily="18" charset="0"/>
+              <a:rPr lang="en-GB" sz="2400" b="1" u="sng" dirty="0" smtClean="0">
+                <a:latin typeface="Courier New" panose="02070309020205020404" pitchFamily="49" charset="0"/>
+                <a:cs typeface="Courier New" panose="02070309020205020404" pitchFamily="49" charset="0"/>
               </a:rPr>
               <a:t>TO DO:</a:t>
             </a:r>
           </a:p>
           <a:p>
-            <a:endParaRPr lang="en-GB" sz="5400" dirty="0">
-              <a:latin typeface="Times New Roman" panose="02020603050405020304" pitchFamily="18" charset="0"/>
-              <a:cs typeface="Times New Roman" panose="02020603050405020304" pitchFamily="18" charset="0"/>
+            <a:endParaRPr lang="en-GB" sz="2400" b="1" dirty="0" smtClean="0">
+              <a:latin typeface="Courier New" panose="02070309020205020404" pitchFamily="49" charset="0"/>
+              <a:cs typeface="Courier New" panose="02070309020205020404" pitchFamily="49" charset="0"/>
             </a:endParaRPr>
           </a:p>
           <a:p>
             <a:r>
-              <a:rPr lang="en-GB" sz="5400" dirty="0" smtClean="0">
-                <a:latin typeface="Times New Roman" panose="02020603050405020304" pitchFamily="18" charset="0"/>
-                <a:cs typeface="Times New Roman" panose="02020603050405020304" pitchFamily="18" charset="0"/>
-              </a:rPr>
-              <a:t>Add Notes</a:t>
+              <a:rPr lang="en-GB" sz="2400" b="1" dirty="0" smtClean="0">
+                <a:latin typeface="Courier New" panose="02070309020205020404" pitchFamily="49" charset="0"/>
+                <a:cs typeface="Courier New" panose="02070309020205020404" pitchFamily="49" charset="0"/>
+              </a:rPr>
+              <a:t>Explain </a:t>
+            </a:r>
+            <a:r>
+              <a:rPr lang="en-GB" sz="2400" b="1" dirty="0" err="1" smtClean="0">
+                <a:latin typeface="Courier New" panose="02070309020205020404" pitchFamily="49" charset="0"/>
+                <a:cs typeface="Courier New" panose="02070309020205020404" pitchFamily="49" charset="0"/>
+              </a:rPr>
+              <a:t>phred</a:t>
+            </a:r>
+            <a:r>
+              <a:rPr lang="en-GB" sz="2400" b="1" dirty="0" smtClean="0">
+                <a:latin typeface="Courier New" panose="02070309020205020404" pitchFamily="49" charset="0"/>
+                <a:cs typeface="Courier New" panose="02070309020205020404" pitchFamily="49" charset="0"/>
+              </a:rPr>
+              <a:t> formula better:</a:t>
             </a:r>
           </a:p>
           <a:p>
             <a:r>
-              <a:rPr lang="en-GB" sz="5400" dirty="0" smtClean="0">
-                <a:latin typeface="Times New Roman" panose="02020603050405020304" pitchFamily="18" charset="0"/>
-                <a:cs typeface="Times New Roman" panose="02020603050405020304" pitchFamily="18" charset="0"/>
+              <a:rPr lang="en-GB" sz="2400" b="1" dirty="0">
+                <a:latin typeface="Courier New" panose="02070309020205020404" pitchFamily="49" charset="0"/>
+                <a:cs typeface="Courier New" panose="02070309020205020404" pitchFamily="49" charset="0"/>
+              </a:rPr>
+              <a:t> </a:t>
+            </a:r>
+            <a:r>
+              <a:rPr lang="en-GB" sz="2400" b="1" dirty="0" smtClean="0">
+                <a:latin typeface="Courier New" panose="02070309020205020404" pitchFamily="49" charset="0"/>
+                <a:cs typeface="Courier New" panose="02070309020205020404" pitchFamily="49" charset="0"/>
+              </a:rPr>
+              <a:t>  Log -&gt; exponential to linear</a:t>
+            </a:r>
+          </a:p>
+          <a:p>
+            <a:r>
+              <a:rPr lang="en-GB" sz="2400" b="1" dirty="0">
+                <a:latin typeface="Courier New" panose="02070309020205020404" pitchFamily="49" charset="0"/>
+                <a:cs typeface="Courier New" panose="02070309020205020404" pitchFamily="49" charset="0"/>
+              </a:rPr>
+              <a:t> </a:t>
+            </a:r>
+            <a:r>
+              <a:rPr lang="en-GB" sz="2400" b="1" dirty="0" smtClean="0">
+                <a:latin typeface="Courier New" panose="02070309020205020404" pitchFamily="49" charset="0"/>
+                <a:cs typeface="Courier New" panose="02070309020205020404" pitchFamily="49" charset="0"/>
+              </a:rPr>
+              <a:t>  10  -&gt; expand range to avoid floating point</a:t>
+            </a:r>
+          </a:p>
+          <a:p>
+            <a:r>
+              <a:rPr lang="en-GB" sz="2400" b="1" dirty="0">
+                <a:latin typeface="Courier New" panose="02070309020205020404" pitchFamily="49" charset="0"/>
+                <a:cs typeface="Courier New" panose="02070309020205020404" pitchFamily="49" charset="0"/>
+              </a:rPr>
+              <a:t> </a:t>
+            </a:r>
+            <a:r>
+              <a:rPr lang="en-GB" sz="2400" b="1" dirty="0" smtClean="0">
+                <a:latin typeface="Courier New" panose="02070309020205020404" pitchFamily="49" charset="0"/>
+                <a:cs typeface="Courier New" panose="02070309020205020404" pitchFamily="49" charset="0"/>
+              </a:rPr>
+              <a:t>  -1  -&gt; allow unsigned integer</a:t>
+            </a:r>
+          </a:p>
+          <a:p>
+            <a:endParaRPr lang="en-GB" sz="2400" b="1" dirty="0">
+              <a:latin typeface="Courier New" panose="02070309020205020404" pitchFamily="49" charset="0"/>
+              <a:cs typeface="Courier New" panose="02070309020205020404" pitchFamily="49" charset="0"/>
+            </a:endParaRPr>
+          </a:p>
+          <a:p>
+            <a:r>
+              <a:rPr lang="en-GB" sz="2400" b="1" dirty="0" smtClean="0">
+                <a:latin typeface="Courier New" panose="02070309020205020404" pitchFamily="49" charset="0"/>
+                <a:cs typeface="Courier New" panose="02070309020205020404" pitchFamily="49" charset="0"/>
+              </a:rPr>
+              <a:t>Add </a:t>
+            </a:r>
+            <a:r>
+              <a:rPr lang="en-GB" sz="2400" b="1" dirty="0" smtClean="0">
+                <a:latin typeface="Courier New" panose="02070309020205020404" pitchFamily="49" charset="0"/>
+                <a:cs typeface="Courier New" panose="02070309020205020404" pitchFamily="49" charset="0"/>
+              </a:rPr>
+              <a:t>more Notes</a:t>
+            </a:r>
+          </a:p>
+          <a:p>
+            <a:endParaRPr lang="en-GB" sz="2400" b="1" dirty="0" smtClean="0">
+              <a:latin typeface="Courier New" panose="02070309020205020404" pitchFamily="49" charset="0"/>
+              <a:cs typeface="Courier New" panose="02070309020205020404" pitchFamily="49" charset="0"/>
+            </a:endParaRPr>
+          </a:p>
+          <a:p>
+            <a:r>
+              <a:rPr lang="en-GB" sz="2400" b="1" dirty="0" smtClean="0">
+                <a:latin typeface="Courier New" panose="02070309020205020404" pitchFamily="49" charset="0"/>
+                <a:cs typeface="Courier New" panose="02070309020205020404" pitchFamily="49" charset="0"/>
               </a:rPr>
               <a:t>Make video</a:t>
             </a:r>
-            <a:endParaRPr lang="en-GB" sz="5400" dirty="0">
-              <a:latin typeface="Times New Roman" panose="02020603050405020304" pitchFamily="18" charset="0"/>
-              <a:cs typeface="Times New Roman" panose="02020603050405020304" pitchFamily="18" charset="0"/>
+            <a:endParaRPr lang="en-GB" sz="2400" b="1" dirty="0">
+              <a:latin typeface="Courier New" panose="02070309020205020404" pitchFamily="49" charset="0"/>
+              <a:cs typeface="Courier New" panose="02070309020205020404" pitchFamily="49" charset="0"/>
             </a:endParaRPr>
           </a:p>
         </p:txBody>
@@ -15891,7 +16087,7 @@
           <p:cNvPr id="4" name="TextBox 3">
             <a:extLst>
               <a:ext uri="{FF2B5EF4-FFF2-40B4-BE49-F238E27FC236}">
-                <a16:creationId xmlns:a16="http://schemas.microsoft.com/office/drawing/2014/main" xmlns="" id="{6F77B270-35F1-4A5B-875A-9BFD13BC898E}"/>
+                <a16:creationId xmlns="" xmlns:a16="http://schemas.microsoft.com/office/drawing/2014/main" id="{6F77B270-35F1-4A5B-875A-9BFD13BC898E}"/>
               </a:ext>
             </a:extLst>
           </p:cNvPr>
@@ -15946,7 +16142,7 @@
           <p:cNvPr id="2" name="TextBox 1">
             <a:extLst>
               <a:ext uri="{FF2B5EF4-FFF2-40B4-BE49-F238E27FC236}">
-                <a16:creationId xmlns:a16="http://schemas.microsoft.com/office/drawing/2014/main" xmlns="" id="{FF6CBC01-8361-49E5-9581-0C1FE9620EC9}"/>
+                <a16:creationId xmlns="" xmlns:a16="http://schemas.microsoft.com/office/drawing/2014/main" id="{FF6CBC01-8361-49E5-9581-0C1FE9620EC9}"/>
               </a:ext>
             </a:extLst>
           </p:cNvPr>
@@ -15992,7 +16188,7 @@
           <p:cNvPr id="7" name="TextBox 6">
             <a:extLst>
               <a:ext uri="{FF2B5EF4-FFF2-40B4-BE49-F238E27FC236}">
-                <a16:creationId xmlns:a16="http://schemas.microsoft.com/office/drawing/2014/main" xmlns="" id="{E1CD5414-A932-4E07-97C5-AA66923DCEC6}"/>
+                <a16:creationId xmlns="" xmlns:a16="http://schemas.microsoft.com/office/drawing/2014/main" id="{E1CD5414-A932-4E07-97C5-AA66923DCEC6}"/>
               </a:ext>
             </a:extLst>
           </p:cNvPr>
@@ -16038,7 +16234,7 @@
           <p:cNvPr id="12" name="TextBox 11">
             <a:extLst>
               <a:ext uri="{FF2B5EF4-FFF2-40B4-BE49-F238E27FC236}">
-                <a16:creationId xmlns:a16="http://schemas.microsoft.com/office/drawing/2014/main" xmlns="" id="{BAF1D114-340B-40A7-B896-B7E9FF2342D4}"/>
+                <a16:creationId xmlns="" xmlns:a16="http://schemas.microsoft.com/office/drawing/2014/main" id="{BAF1D114-340B-40A7-B896-B7E9FF2342D4}"/>
               </a:ext>
             </a:extLst>
           </p:cNvPr>
@@ -16084,7 +16280,7 @@
           <p:cNvPr id="13" name="TextBox 12">
             <a:extLst>
               <a:ext uri="{FF2B5EF4-FFF2-40B4-BE49-F238E27FC236}">
-                <a16:creationId xmlns:a16="http://schemas.microsoft.com/office/drawing/2014/main" xmlns="" id="{3774D6C2-F684-4C1B-9AF0-CB59B2D6F726}"/>
+                <a16:creationId xmlns="" xmlns:a16="http://schemas.microsoft.com/office/drawing/2014/main" id="{3774D6C2-F684-4C1B-9AF0-CB59B2D6F726}"/>
               </a:ext>
             </a:extLst>
           </p:cNvPr>
@@ -16128,7 +16324,7 @@
           <p:cNvPr id="11" name="Rectangle 2">
             <a:extLst>
               <a:ext uri="{FF2B5EF4-FFF2-40B4-BE49-F238E27FC236}">
-                <a16:creationId xmlns:a16="http://schemas.microsoft.com/office/drawing/2014/main" xmlns="" id="{944DD051-DEF9-4988-A138-45BC09BB4EE1}"/>
+                <a16:creationId xmlns="" xmlns:a16="http://schemas.microsoft.com/office/drawing/2014/main" id="{944DD051-DEF9-4988-A138-45BC09BB4EE1}"/>
               </a:ext>
             </a:extLst>
           </p:cNvPr>
@@ -16226,7 +16422,7 @@
           <p:cNvPr id="33" name="Group 32">
             <a:extLst>
               <a:ext uri="{FF2B5EF4-FFF2-40B4-BE49-F238E27FC236}">
-                <a16:creationId xmlns:a16="http://schemas.microsoft.com/office/drawing/2014/main" xmlns="" id="{ACAC77A1-F6A6-43B9-8C12-056B2BAF5231}"/>
+                <a16:creationId xmlns="" xmlns:a16="http://schemas.microsoft.com/office/drawing/2014/main" id="{ACAC77A1-F6A6-43B9-8C12-056B2BAF5231}"/>
               </a:ext>
             </a:extLst>
           </p:cNvPr>
@@ -16246,7 +16442,7 @@
             <p:cNvPr id="22" name="TextBox 21">
               <a:extLst>
                 <a:ext uri="{FF2B5EF4-FFF2-40B4-BE49-F238E27FC236}">
-                  <a16:creationId xmlns:a16="http://schemas.microsoft.com/office/drawing/2014/main" xmlns="" id="{A90B819B-B576-4062-9E37-50E6B3385861}"/>
+                  <a16:creationId xmlns="" xmlns:a16="http://schemas.microsoft.com/office/drawing/2014/main" id="{A90B819B-B576-4062-9E37-50E6B3385861}"/>
                 </a:ext>
               </a:extLst>
             </p:cNvPr>
@@ -16292,7 +16488,7 @@
             <p:cNvPr id="23" name="TextBox 22">
               <a:extLst>
                 <a:ext uri="{FF2B5EF4-FFF2-40B4-BE49-F238E27FC236}">
-                  <a16:creationId xmlns:a16="http://schemas.microsoft.com/office/drawing/2014/main" xmlns="" id="{38459C3C-DAD7-4A41-9BE2-61F7F5AA117D}"/>
+                  <a16:creationId xmlns="" xmlns:a16="http://schemas.microsoft.com/office/drawing/2014/main" id="{38459C3C-DAD7-4A41-9BE2-61F7F5AA117D}"/>
                 </a:ext>
               </a:extLst>
             </p:cNvPr>
@@ -16338,7 +16534,7 @@
             <p:cNvPr id="24" name="TextBox 23">
               <a:extLst>
                 <a:ext uri="{FF2B5EF4-FFF2-40B4-BE49-F238E27FC236}">
-                  <a16:creationId xmlns:a16="http://schemas.microsoft.com/office/drawing/2014/main" xmlns="" id="{D88A6B0A-C817-495A-9EE2-12393AE7B97D}"/>
+                  <a16:creationId xmlns="" xmlns:a16="http://schemas.microsoft.com/office/drawing/2014/main" id="{D88A6B0A-C817-495A-9EE2-12393AE7B97D}"/>
                 </a:ext>
               </a:extLst>
             </p:cNvPr>
@@ -16384,7 +16580,7 @@
             <p:cNvPr id="25" name="TextBox 24">
               <a:extLst>
                 <a:ext uri="{FF2B5EF4-FFF2-40B4-BE49-F238E27FC236}">
-                  <a16:creationId xmlns:a16="http://schemas.microsoft.com/office/drawing/2014/main" xmlns="" id="{A24FF243-4EE3-4C98-B632-7E7F7BC11E7F}"/>
+                  <a16:creationId xmlns="" xmlns:a16="http://schemas.microsoft.com/office/drawing/2014/main" id="{A24FF243-4EE3-4C98-B632-7E7F7BC11E7F}"/>
                 </a:ext>
               </a:extLst>
             </p:cNvPr>
@@ -16428,7 +16624,7 @@
             <p:cNvPr id="26" name="Rectangle 2">
               <a:extLst>
                 <a:ext uri="{FF2B5EF4-FFF2-40B4-BE49-F238E27FC236}">
-                  <a16:creationId xmlns:a16="http://schemas.microsoft.com/office/drawing/2014/main" xmlns="" id="{BA4FE94C-D898-4962-8131-E4888B1FB3FD}"/>
+                  <a16:creationId xmlns="" xmlns:a16="http://schemas.microsoft.com/office/drawing/2014/main" id="{BA4FE94C-D898-4962-8131-E4888B1FB3FD}"/>
                 </a:ext>
               </a:extLst>
             </p:cNvPr>
@@ -16516,7 +16712,7 @@
           <p:cNvPr id="44" name="Group 43">
             <a:extLst>
               <a:ext uri="{FF2B5EF4-FFF2-40B4-BE49-F238E27FC236}">
-                <a16:creationId xmlns:a16="http://schemas.microsoft.com/office/drawing/2014/main" xmlns="" id="{8B6EC073-FC2C-4D56-BBFD-BAA996D284AC}"/>
+                <a16:creationId xmlns="" xmlns:a16="http://schemas.microsoft.com/office/drawing/2014/main" id="{8B6EC073-FC2C-4D56-BBFD-BAA996D284AC}"/>
               </a:ext>
             </a:extLst>
           </p:cNvPr>
@@ -16536,7 +16732,7 @@
             <p:cNvPr id="35" name="TextBox 34">
               <a:extLst>
                 <a:ext uri="{FF2B5EF4-FFF2-40B4-BE49-F238E27FC236}">
-                  <a16:creationId xmlns:a16="http://schemas.microsoft.com/office/drawing/2014/main" xmlns="" id="{E92E909F-8CEF-4A1B-9E9E-057D4F711B66}"/>
+                  <a16:creationId xmlns="" xmlns:a16="http://schemas.microsoft.com/office/drawing/2014/main" id="{E92E909F-8CEF-4A1B-9E9E-057D4F711B66}"/>
                 </a:ext>
               </a:extLst>
             </p:cNvPr>
@@ -16582,7 +16778,7 @@
             <p:cNvPr id="36" name="TextBox 35">
               <a:extLst>
                 <a:ext uri="{FF2B5EF4-FFF2-40B4-BE49-F238E27FC236}">
-                  <a16:creationId xmlns:a16="http://schemas.microsoft.com/office/drawing/2014/main" xmlns="" id="{EDAAA188-3F7F-4561-A7F9-3DA7D1AA8B67}"/>
+                  <a16:creationId xmlns="" xmlns:a16="http://schemas.microsoft.com/office/drawing/2014/main" id="{EDAAA188-3F7F-4561-A7F9-3DA7D1AA8B67}"/>
                 </a:ext>
               </a:extLst>
             </p:cNvPr>
@@ -16628,7 +16824,7 @@
             <p:cNvPr id="37" name="TextBox 36">
               <a:extLst>
                 <a:ext uri="{FF2B5EF4-FFF2-40B4-BE49-F238E27FC236}">
-                  <a16:creationId xmlns:a16="http://schemas.microsoft.com/office/drawing/2014/main" xmlns="" id="{B3406560-2692-43BD-B3EF-B079A771F89C}"/>
+                  <a16:creationId xmlns="" xmlns:a16="http://schemas.microsoft.com/office/drawing/2014/main" id="{B3406560-2692-43BD-B3EF-B079A771F89C}"/>
                 </a:ext>
               </a:extLst>
             </p:cNvPr>
@@ -16674,7 +16870,7 @@
             <p:cNvPr id="38" name="TextBox 37">
               <a:extLst>
                 <a:ext uri="{FF2B5EF4-FFF2-40B4-BE49-F238E27FC236}">
-                  <a16:creationId xmlns:a16="http://schemas.microsoft.com/office/drawing/2014/main" xmlns="" id="{FB51184F-8749-48B4-AD07-636877C65807}"/>
+                  <a16:creationId xmlns="" xmlns:a16="http://schemas.microsoft.com/office/drawing/2014/main" id="{FB51184F-8749-48B4-AD07-636877C65807}"/>
                 </a:ext>
               </a:extLst>
             </p:cNvPr>
@@ -16718,7 +16914,7 @@
             <p:cNvPr id="39" name="Rectangle 2">
               <a:extLst>
                 <a:ext uri="{FF2B5EF4-FFF2-40B4-BE49-F238E27FC236}">
-                  <a16:creationId xmlns:a16="http://schemas.microsoft.com/office/drawing/2014/main" xmlns="" id="{EF8F38E6-3381-4254-AB6F-D9AC1C9269CE}"/>
+                  <a16:creationId xmlns="" xmlns:a16="http://schemas.microsoft.com/office/drawing/2014/main" id="{EF8F38E6-3381-4254-AB6F-D9AC1C9269CE}"/>
                 </a:ext>
               </a:extLst>
             </p:cNvPr>
@@ -16870,7 +17066,7 @@
           <p:cNvPr id="52" name="Group 51">
             <a:extLst>
               <a:ext uri="{FF2B5EF4-FFF2-40B4-BE49-F238E27FC236}">
-                <a16:creationId xmlns:a16="http://schemas.microsoft.com/office/drawing/2014/main" xmlns="" id="{B010521C-F2F6-4DFD-9F7F-D1CDDE352F4B}"/>
+                <a16:creationId xmlns="" xmlns:a16="http://schemas.microsoft.com/office/drawing/2014/main" id="{B010521C-F2F6-4DFD-9F7F-D1CDDE352F4B}"/>
               </a:ext>
             </a:extLst>
           </p:cNvPr>
@@ -16890,7 +17086,7 @@
             <p:cNvPr id="45" name="TextBox 44">
               <a:extLst>
                 <a:ext uri="{FF2B5EF4-FFF2-40B4-BE49-F238E27FC236}">
-                  <a16:creationId xmlns:a16="http://schemas.microsoft.com/office/drawing/2014/main" xmlns="" id="{3A945157-1FA0-4494-9DF7-E38C4A3E4C3C}"/>
+                  <a16:creationId xmlns="" xmlns:a16="http://schemas.microsoft.com/office/drawing/2014/main" id="{3A945157-1FA0-4494-9DF7-E38C4A3E4C3C}"/>
                 </a:ext>
               </a:extLst>
             </p:cNvPr>
@@ -16943,7 +17139,7 @@
             <p:cNvPr id="47" name="Straight Arrow Connector 46">
               <a:extLst>
                 <a:ext uri="{FF2B5EF4-FFF2-40B4-BE49-F238E27FC236}">
-                  <a16:creationId xmlns:a16="http://schemas.microsoft.com/office/drawing/2014/main" xmlns="" id="{AE58F8BA-228E-4E46-B9EE-FCD07B04AB67}"/>
+                  <a16:creationId xmlns="" xmlns:a16="http://schemas.microsoft.com/office/drawing/2014/main" id="{AE58F8BA-228E-4E46-B9EE-FCD07B04AB67}"/>
                 </a:ext>
               </a:extLst>
             </p:cNvPr>
@@ -17662,7 +17858,7 @@
           <p:cNvPr id="5" name="Picture 4">
             <a:extLst>
               <a:ext uri="{FF2B5EF4-FFF2-40B4-BE49-F238E27FC236}">
-                <a16:creationId xmlns:a16="http://schemas.microsoft.com/office/drawing/2014/main" xmlns="" id="{59AF7D31-2782-4922-8B1C-2A00717E2EF7}"/>
+                <a16:creationId xmlns="" xmlns:a16="http://schemas.microsoft.com/office/drawing/2014/main" id="{59AF7D31-2782-4922-8B1C-2A00717E2EF7}"/>
               </a:ext>
             </a:extLst>
           </p:cNvPr>
@@ -17698,7 +17894,7 @@
           <p:cNvPr id="6" name="Picture 5">
             <a:extLst>
               <a:ext uri="{FF2B5EF4-FFF2-40B4-BE49-F238E27FC236}">
-                <a16:creationId xmlns:a16="http://schemas.microsoft.com/office/drawing/2014/main" xmlns="" id="{0C3D18F3-6970-429A-A025-B63232EE4A09}"/>
+                <a16:creationId xmlns="" xmlns:a16="http://schemas.microsoft.com/office/drawing/2014/main" id="{0C3D18F3-6970-429A-A025-B63232EE4A09}"/>
               </a:ext>
             </a:extLst>
           </p:cNvPr>
@@ -17734,7 +17930,7 @@
           <p:cNvPr id="7" name="Picture 6">
             <a:extLst>
               <a:ext uri="{FF2B5EF4-FFF2-40B4-BE49-F238E27FC236}">
-                <a16:creationId xmlns:a16="http://schemas.microsoft.com/office/drawing/2014/main" xmlns="" id="{0B0629E2-2DA3-4F63-BB3E-641AEA04EAC8}"/>
+                <a16:creationId xmlns="" xmlns:a16="http://schemas.microsoft.com/office/drawing/2014/main" id="{0B0629E2-2DA3-4F63-BB3E-641AEA04EAC8}"/>
               </a:ext>
             </a:extLst>
           </p:cNvPr>
@@ -17770,7 +17966,7 @@
           <p:cNvPr id="52" name="Group 51">
             <a:extLst>
               <a:ext uri="{FF2B5EF4-FFF2-40B4-BE49-F238E27FC236}">
-                <a16:creationId xmlns:a16="http://schemas.microsoft.com/office/drawing/2014/main" xmlns="" id="{107757F1-EED8-4438-B609-40224D9820D5}"/>
+                <a16:creationId xmlns="" xmlns:a16="http://schemas.microsoft.com/office/drawing/2014/main" id="{107757F1-EED8-4438-B609-40224D9820D5}"/>
               </a:ext>
             </a:extLst>
           </p:cNvPr>
@@ -17790,7 +17986,7 @@
             <p:cNvPr id="32" name="TextBox 31">
               <a:extLst>
                 <a:ext uri="{FF2B5EF4-FFF2-40B4-BE49-F238E27FC236}">
-                  <a16:creationId xmlns:a16="http://schemas.microsoft.com/office/drawing/2014/main" xmlns="" id="{6A10D917-EAF5-4C2E-952E-E1B3C0071E1E}"/>
+                  <a16:creationId xmlns="" xmlns:a16="http://schemas.microsoft.com/office/drawing/2014/main" id="{6A10D917-EAF5-4C2E-952E-E1B3C0071E1E}"/>
                 </a:ext>
               </a:extLst>
             </p:cNvPr>
@@ -17836,7 +18032,7 @@
             <p:cNvPr id="33" name="TextBox 32">
               <a:extLst>
                 <a:ext uri="{FF2B5EF4-FFF2-40B4-BE49-F238E27FC236}">
-                  <a16:creationId xmlns:a16="http://schemas.microsoft.com/office/drawing/2014/main" xmlns="" id="{99E78B0A-2A1B-4BFC-A266-0BA95F7599C6}"/>
+                  <a16:creationId xmlns="" xmlns:a16="http://schemas.microsoft.com/office/drawing/2014/main" id="{99E78B0A-2A1B-4BFC-A266-0BA95F7599C6}"/>
                 </a:ext>
               </a:extLst>
             </p:cNvPr>
@@ -17882,7 +18078,7 @@
             <p:cNvPr id="34" name="TextBox 33">
               <a:extLst>
                 <a:ext uri="{FF2B5EF4-FFF2-40B4-BE49-F238E27FC236}">
-                  <a16:creationId xmlns:a16="http://schemas.microsoft.com/office/drawing/2014/main" xmlns="" id="{84C50921-5325-4D09-9C2E-91D84ED4BB07}"/>
+                  <a16:creationId xmlns="" xmlns:a16="http://schemas.microsoft.com/office/drawing/2014/main" id="{84C50921-5325-4D09-9C2E-91D84ED4BB07}"/>
                 </a:ext>
               </a:extLst>
             </p:cNvPr>
@@ -17928,7 +18124,7 @@
             <p:cNvPr id="35" name="TextBox 34">
               <a:extLst>
                 <a:ext uri="{FF2B5EF4-FFF2-40B4-BE49-F238E27FC236}">
-                  <a16:creationId xmlns:a16="http://schemas.microsoft.com/office/drawing/2014/main" xmlns="" id="{FF57C241-9797-4767-82FA-7A49EC79B87F}"/>
+                  <a16:creationId xmlns="" xmlns:a16="http://schemas.microsoft.com/office/drawing/2014/main" id="{FF57C241-9797-4767-82FA-7A49EC79B87F}"/>
                 </a:ext>
               </a:extLst>
             </p:cNvPr>
@@ -17972,7 +18168,7 @@
             <p:cNvPr id="36" name="Rectangle 2">
               <a:extLst>
                 <a:ext uri="{FF2B5EF4-FFF2-40B4-BE49-F238E27FC236}">
-                  <a16:creationId xmlns:a16="http://schemas.microsoft.com/office/drawing/2014/main" xmlns="" id="{48C12E22-BF9A-41DF-9994-EF347B6CCEF3}"/>
+                  <a16:creationId xmlns="" xmlns:a16="http://schemas.microsoft.com/office/drawing/2014/main" id="{48C12E22-BF9A-41DF-9994-EF347B6CCEF3}"/>
                 </a:ext>
               </a:extLst>
             </p:cNvPr>
@@ -18071,7 +18267,7 @@
           <p:cNvPr id="53" name="Group 52">
             <a:extLst>
               <a:ext uri="{FF2B5EF4-FFF2-40B4-BE49-F238E27FC236}">
-                <a16:creationId xmlns:a16="http://schemas.microsoft.com/office/drawing/2014/main" xmlns="" id="{2AF0B01A-621C-4CDE-AA9F-8326F7E3BE19}"/>
+                <a16:creationId xmlns="" xmlns:a16="http://schemas.microsoft.com/office/drawing/2014/main" id="{2AF0B01A-621C-4CDE-AA9F-8326F7E3BE19}"/>
               </a:ext>
             </a:extLst>
           </p:cNvPr>
@@ -18091,7 +18287,7 @@
             <p:cNvPr id="37" name="Group 36">
               <a:extLst>
                 <a:ext uri="{FF2B5EF4-FFF2-40B4-BE49-F238E27FC236}">
-                  <a16:creationId xmlns:a16="http://schemas.microsoft.com/office/drawing/2014/main" xmlns="" id="{A9E14DE8-E76B-4EF3-999F-348EC84EE312}"/>
+                  <a16:creationId xmlns="" xmlns:a16="http://schemas.microsoft.com/office/drawing/2014/main" id="{A9E14DE8-E76B-4EF3-999F-348EC84EE312}"/>
                 </a:ext>
               </a:extLst>
             </p:cNvPr>
@@ -18111,7 +18307,7 @@
               <p:cNvPr id="38" name="TextBox 37">
                 <a:extLst>
                   <a:ext uri="{FF2B5EF4-FFF2-40B4-BE49-F238E27FC236}">
-                    <a16:creationId xmlns:a16="http://schemas.microsoft.com/office/drawing/2014/main" xmlns="" id="{1DD282C7-A99A-435C-8220-DE2FA11BC47F}"/>
+                    <a16:creationId xmlns="" xmlns:a16="http://schemas.microsoft.com/office/drawing/2014/main" id="{1DD282C7-A99A-435C-8220-DE2FA11BC47F}"/>
                   </a:ext>
                 </a:extLst>
               </p:cNvPr>
@@ -18157,7 +18353,7 @@
               <p:cNvPr id="39" name="TextBox 38">
                 <a:extLst>
                   <a:ext uri="{FF2B5EF4-FFF2-40B4-BE49-F238E27FC236}">
-                    <a16:creationId xmlns:a16="http://schemas.microsoft.com/office/drawing/2014/main" xmlns="" id="{AA9423A4-90EF-4168-8D1B-133225A02BEA}"/>
+                    <a16:creationId xmlns="" xmlns:a16="http://schemas.microsoft.com/office/drawing/2014/main" id="{AA9423A4-90EF-4168-8D1B-133225A02BEA}"/>
                   </a:ext>
                 </a:extLst>
               </p:cNvPr>
@@ -18203,7 +18399,7 @@
               <p:cNvPr id="40" name="TextBox 39">
                 <a:extLst>
                   <a:ext uri="{FF2B5EF4-FFF2-40B4-BE49-F238E27FC236}">
-                    <a16:creationId xmlns:a16="http://schemas.microsoft.com/office/drawing/2014/main" xmlns="" id="{C2870B03-65D0-4BCF-9160-632D7651B00D}"/>
+                    <a16:creationId xmlns="" xmlns:a16="http://schemas.microsoft.com/office/drawing/2014/main" id="{C2870B03-65D0-4BCF-9160-632D7651B00D}"/>
                   </a:ext>
                 </a:extLst>
               </p:cNvPr>
@@ -18249,7 +18445,7 @@
               <p:cNvPr id="41" name="TextBox 40">
                 <a:extLst>
                   <a:ext uri="{FF2B5EF4-FFF2-40B4-BE49-F238E27FC236}">
-                    <a16:creationId xmlns:a16="http://schemas.microsoft.com/office/drawing/2014/main" xmlns="" id="{53C0E7CA-7116-42E2-BCAA-0B8B8A38BCFF}"/>
+                    <a16:creationId xmlns="" xmlns:a16="http://schemas.microsoft.com/office/drawing/2014/main" id="{53C0E7CA-7116-42E2-BCAA-0B8B8A38BCFF}"/>
                   </a:ext>
                 </a:extLst>
               </p:cNvPr>
@@ -18293,7 +18489,7 @@
               <p:cNvPr id="42" name="Rectangle 2">
                 <a:extLst>
                   <a:ext uri="{FF2B5EF4-FFF2-40B4-BE49-F238E27FC236}">
-                    <a16:creationId xmlns:a16="http://schemas.microsoft.com/office/drawing/2014/main" xmlns="" id="{18898162-8309-41CC-961B-671BA65997AB}"/>
+                    <a16:creationId xmlns="" xmlns:a16="http://schemas.microsoft.com/office/drawing/2014/main" id="{18898162-8309-41CC-961B-671BA65997AB}"/>
                   </a:ext>
                 </a:extLst>
               </p:cNvPr>
@@ -18381,7 +18577,7 @@
             <p:cNvPr id="43" name="Group 42">
               <a:extLst>
                 <a:ext uri="{FF2B5EF4-FFF2-40B4-BE49-F238E27FC236}">
-                  <a16:creationId xmlns:a16="http://schemas.microsoft.com/office/drawing/2014/main" xmlns="" id="{DBC531E7-693B-4E33-874E-0C6EE5E64C88}"/>
+                  <a16:creationId xmlns="" xmlns:a16="http://schemas.microsoft.com/office/drawing/2014/main" id="{DBC531E7-693B-4E33-874E-0C6EE5E64C88}"/>
                 </a:ext>
               </a:extLst>
             </p:cNvPr>
@@ -18401,7 +18597,7 @@
               <p:cNvPr id="44" name="TextBox 43">
                 <a:extLst>
                   <a:ext uri="{FF2B5EF4-FFF2-40B4-BE49-F238E27FC236}">
-                    <a16:creationId xmlns:a16="http://schemas.microsoft.com/office/drawing/2014/main" xmlns="" id="{8707F2BD-6B65-47EE-AB1B-D3F43448F244}"/>
+                    <a16:creationId xmlns="" xmlns:a16="http://schemas.microsoft.com/office/drawing/2014/main" id="{8707F2BD-6B65-47EE-AB1B-D3F43448F244}"/>
                   </a:ext>
                 </a:extLst>
               </p:cNvPr>
@@ -18447,7 +18643,7 @@
               <p:cNvPr id="45" name="TextBox 44">
                 <a:extLst>
                   <a:ext uri="{FF2B5EF4-FFF2-40B4-BE49-F238E27FC236}">
-                    <a16:creationId xmlns:a16="http://schemas.microsoft.com/office/drawing/2014/main" xmlns="" id="{2F59D818-BF4B-48ED-8342-8BB769CA01AF}"/>
+                    <a16:creationId xmlns="" xmlns:a16="http://schemas.microsoft.com/office/drawing/2014/main" id="{2F59D818-BF4B-48ED-8342-8BB769CA01AF}"/>
                   </a:ext>
                 </a:extLst>
               </p:cNvPr>
@@ -18493,7 +18689,7 @@
               <p:cNvPr id="46" name="TextBox 45">
                 <a:extLst>
                   <a:ext uri="{FF2B5EF4-FFF2-40B4-BE49-F238E27FC236}">
-                    <a16:creationId xmlns:a16="http://schemas.microsoft.com/office/drawing/2014/main" xmlns="" id="{CABF1A39-DFCB-4F66-B61F-8CFDC4A6B7FA}"/>
+                    <a16:creationId xmlns="" xmlns:a16="http://schemas.microsoft.com/office/drawing/2014/main" id="{CABF1A39-DFCB-4F66-B61F-8CFDC4A6B7FA}"/>
                   </a:ext>
                 </a:extLst>
               </p:cNvPr>
@@ -18539,7 +18735,7 @@
               <p:cNvPr id="47" name="TextBox 46">
                 <a:extLst>
                   <a:ext uri="{FF2B5EF4-FFF2-40B4-BE49-F238E27FC236}">
-                    <a16:creationId xmlns:a16="http://schemas.microsoft.com/office/drawing/2014/main" xmlns="" id="{1BC8499D-0BCB-47C3-8005-D0E944DAD3E9}"/>
+                    <a16:creationId xmlns="" xmlns:a16="http://schemas.microsoft.com/office/drawing/2014/main" id="{1BC8499D-0BCB-47C3-8005-D0E944DAD3E9}"/>
                   </a:ext>
                 </a:extLst>
               </p:cNvPr>
@@ -18583,7 +18779,7 @@
               <p:cNvPr id="48" name="Rectangle 2">
                 <a:extLst>
                   <a:ext uri="{FF2B5EF4-FFF2-40B4-BE49-F238E27FC236}">
-                    <a16:creationId xmlns:a16="http://schemas.microsoft.com/office/drawing/2014/main" xmlns="" id="{81019032-0120-43C0-B7BA-BC37EC738C5E}"/>
+                    <a16:creationId xmlns="" xmlns:a16="http://schemas.microsoft.com/office/drawing/2014/main" id="{81019032-0120-43C0-B7BA-BC37EC738C5E}"/>
                   </a:ext>
                 </a:extLst>
               </p:cNvPr>
@@ -18736,7 +18932,7 @@
           <p:cNvPr id="26" name="TextBox 25">
             <a:extLst>
               <a:ext uri="{FF2B5EF4-FFF2-40B4-BE49-F238E27FC236}">
-                <a16:creationId xmlns:a16="http://schemas.microsoft.com/office/drawing/2014/main" xmlns="" id="{E2A25439-4120-4E2D-9032-5CB1B1727334}"/>
+                <a16:creationId xmlns="" xmlns:a16="http://schemas.microsoft.com/office/drawing/2014/main" id="{E2A25439-4120-4E2D-9032-5CB1B1727334}"/>
               </a:ext>
             </a:extLst>
           </p:cNvPr>
@@ -19421,7 +19617,7 @@
           <p:cNvPr id="39" name="TextBox 38">
             <a:extLst>
               <a:ext uri="{FF2B5EF4-FFF2-40B4-BE49-F238E27FC236}">
-                <a16:creationId xmlns:a16="http://schemas.microsoft.com/office/drawing/2014/main" xmlns="" id="{E2A25439-4120-4E2D-9032-5CB1B1727334}"/>
+                <a16:creationId xmlns="" xmlns:a16="http://schemas.microsoft.com/office/drawing/2014/main" id="{E2A25439-4120-4E2D-9032-5CB1B1727334}"/>
               </a:ext>
             </a:extLst>
           </p:cNvPr>
@@ -19476,7 +19672,7 @@
           <p:cNvPr id="2" name="TextBox 1">
             <a:extLst>
               <a:ext uri="{FF2B5EF4-FFF2-40B4-BE49-F238E27FC236}">
-                <a16:creationId xmlns:a16="http://schemas.microsoft.com/office/drawing/2014/main" xmlns="" id="{E2A25439-4120-4E2D-9032-5CB1B1727334}"/>
+                <a16:creationId xmlns="" xmlns:a16="http://schemas.microsoft.com/office/drawing/2014/main" id="{E2A25439-4120-4E2D-9032-5CB1B1727334}"/>
               </a:ext>
             </a:extLst>
           </p:cNvPr>
@@ -19531,7 +19727,7 @@
           <p:cNvPr id="3" name="TextBox 2">
             <a:extLst>
               <a:ext uri="{FF2B5EF4-FFF2-40B4-BE49-F238E27FC236}">
-                <a16:creationId xmlns:a16="http://schemas.microsoft.com/office/drawing/2014/main" xmlns="" id="{9D2172C1-1223-4E50-B7DC-CB37A5D8E7E8}"/>
+                <a16:creationId xmlns="" xmlns:a16="http://schemas.microsoft.com/office/drawing/2014/main" id="{9D2172C1-1223-4E50-B7DC-CB37A5D8E7E8}"/>
               </a:ext>
             </a:extLst>
           </p:cNvPr>
@@ -19586,7 +19782,7 @@
           <p:cNvPr id="4" name="Group 3">
             <a:extLst>
               <a:ext uri="{FF2B5EF4-FFF2-40B4-BE49-F238E27FC236}">
-                <a16:creationId xmlns:a16="http://schemas.microsoft.com/office/drawing/2014/main" xmlns="" id="{990991E8-A6DD-4EBE-BD29-497FD796F56A}"/>
+                <a16:creationId xmlns="" xmlns:a16="http://schemas.microsoft.com/office/drawing/2014/main" id="{990991E8-A6DD-4EBE-BD29-497FD796F56A}"/>
               </a:ext>
             </a:extLst>
           </p:cNvPr>
@@ -19606,7 +19802,7 @@
             <p:cNvPr id="5" name="Group 4">
               <a:extLst>
                 <a:ext uri="{FF2B5EF4-FFF2-40B4-BE49-F238E27FC236}">
-                  <a16:creationId xmlns:a16="http://schemas.microsoft.com/office/drawing/2014/main" xmlns="" id="{44B773F0-BFA8-42CF-913F-8DA6F27B3316}"/>
+                  <a16:creationId xmlns="" xmlns:a16="http://schemas.microsoft.com/office/drawing/2014/main" id="{44B773F0-BFA8-42CF-913F-8DA6F27B3316}"/>
                 </a:ext>
               </a:extLst>
             </p:cNvPr>
@@ -19626,7 +19822,7 @@
               <p:cNvPr id="12" name="TextBox 11">
                 <a:extLst>
                   <a:ext uri="{FF2B5EF4-FFF2-40B4-BE49-F238E27FC236}">
-                    <a16:creationId xmlns:a16="http://schemas.microsoft.com/office/drawing/2014/main" xmlns="" id="{5E7EECD0-7CF5-47EA-8460-5C7C92155E9D}"/>
+                    <a16:creationId xmlns="" xmlns:a16="http://schemas.microsoft.com/office/drawing/2014/main" id="{5E7EECD0-7CF5-47EA-8460-5C7C92155E9D}"/>
                   </a:ext>
                 </a:extLst>
               </p:cNvPr>
@@ -19672,7 +19868,7 @@
               <p:cNvPr id="13" name="TextBox 12">
                 <a:extLst>
                   <a:ext uri="{FF2B5EF4-FFF2-40B4-BE49-F238E27FC236}">
-                    <a16:creationId xmlns:a16="http://schemas.microsoft.com/office/drawing/2014/main" xmlns="" id="{B105CB38-D6FD-4376-AD71-F1C724460C31}"/>
+                    <a16:creationId xmlns="" xmlns:a16="http://schemas.microsoft.com/office/drawing/2014/main" id="{B105CB38-D6FD-4376-AD71-F1C724460C31}"/>
                   </a:ext>
                 </a:extLst>
               </p:cNvPr>
@@ -19718,7 +19914,7 @@
               <p:cNvPr id="14" name="TextBox 13">
                 <a:extLst>
                   <a:ext uri="{FF2B5EF4-FFF2-40B4-BE49-F238E27FC236}">
-                    <a16:creationId xmlns:a16="http://schemas.microsoft.com/office/drawing/2014/main" xmlns="" id="{50C864DB-B022-453A-B48C-346240FB6030}"/>
+                    <a16:creationId xmlns="" xmlns:a16="http://schemas.microsoft.com/office/drawing/2014/main" id="{50C864DB-B022-453A-B48C-346240FB6030}"/>
                   </a:ext>
                 </a:extLst>
               </p:cNvPr>
@@ -19764,7 +19960,7 @@
               <p:cNvPr id="15" name="TextBox 14">
                 <a:extLst>
                   <a:ext uri="{FF2B5EF4-FFF2-40B4-BE49-F238E27FC236}">
-                    <a16:creationId xmlns:a16="http://schemas.microsoft.com/office/drawing/2014/main" xmlns="" id="{DA673339-7248-4DFC-9FFE-48DED464AF25}"/>
+                    <a16:creationId xmlns="" xmlns:a16="http://schemas.microsoft.com/office/drawing/2014/main" id="{DA673339-7248-4DFC-9FFE-48DED464AF25}"/>
                   </a:ext>
                 </a:extLst>
               </p:cNvPr>
@@ -19808,7 +20004,7 @@
               <p:cNvPr id="16" name="Rectangle 2">
                 <a:extLst>
                   <a:ext uri="{FF2B5EF4-FFF2-40B4-BE49-F238E27FC236}">
-                    <a16:creationId xmlns:a16="http://schemas.microsoft.com/office/drawing/2014/main" xmlns="" id="{BDDAD86E-250E-4F2E-94EA-F444784CEEEA}"/>
+                    <a16:creationId xmlns="" xmlns:a16="http://schemas.microsoft.com/office/drawing/2014/main" id="{BDDAD86E-250E-4F2E-94EA-F444784CEEEA}"/>
                   </a:ext>
                 </a:extLst>
               </p:cNvPr>
@@ -19896,7 +20092,7 @@
             <p:cNvPr id="6" name="Group 5">
               <a:extLst>
                 <a:ext uri="{FF2B5EF4-FFF2-40B4-BE49-F238E27FC236}">
-                  <a16:creationId xmlns:a16="http://schemas.microsoft.com/office/drawing/2014/main" xmlns="" id="{FE1924EC-566E-42D3-AF71-64C227DF571F}"/>
+                  <a16:creationId xmlns="" xmlns:a16="http://schemas.microsoft.com/office/drawing/2014/main" id="{FE1924EC-566E-42D3-AF71-64C227DF571F}"/>
                 </a:ext>
               </a:extLst>
             </p:cNvPr>
@@ -19916,7 +20112,7 @@
               <p:cNvPr id="7" name="TextBox 6">
                 <a:extLst>
                   <a:ext uri="{FF2B5EF4-FFF2-40B4-BE49-F238E27FC236}">
-                    <a16:creationId xmlns:a16="http://schemas.microsoft.com/office/drawing/2014/main" xmlns="" id="{17D034B1-AC8C-4A53-AD2E-E1CABA922EF4}"/>
+                    <a16:creationId xmlns="" xmlns:a16="http://schemas.microsoft.com/office/drawing/2014/main" id="{17D034B1-AC8C-4A53-AD2E-E1CABA922EF4}"/>
                   </a:ext>
                 </a:extLst>
               </p:cNvPr>
@@ -19962,7 +20158,7 @@
               <p:cNvPr id="8" name="TextBox 7">
                 <a:extLst>
                   <a:ext uri="{FF2B5EF4-FFF2-40B4-BE49-F238E27FC236}">
-                    <a16:creationId xmlns:a16="http://schemas.microsoft.com/office/drawing/2014/main" xmlns="" id="{00E40E18-CC50-4FD4-8555-68C90A0CA79D}"/>
+                    <a16:creationId xmlns="" xmlns:a16="http://schemas.microsoft.com/office/drawing/2014/main" id="{00E40E18-CC50-4FD4-8555-68C90A0CA79D}"/>
                   </a:ext>
                 </a:extLst>
               </p:cNvPr>
@@ -20008,7 +20204,7 @@
               <p:cNvPr id="9" name="TextBox 8">
                 <a:extLst>
                   <a:ext uri="{FF2B5EF4-FFF2-40B4-BE49-F238E27FC236}">
-                    <a16:creationId xmlns:a16="http://schemas.microsoft.com/office/drawing/2014/main" xmlns="" id="{95D17C04-5968-4A45-B25E-E129440683AC}"/>
+                    <a16:creationId xmlns="" xmlns:a16="http://schemas.microsoft.com/office/drawing/2014/main" id="{95D17C04-5968-4A45-B25E-E129440683AC}"/>
                   </a:ext>
                 </a:extLst>
               </p:cNvPr>
@@ -20054,7 +20250,7 @@
               <p:cNvPr id="10" name="TextBox 9">
                 <a:extLst>
                   <a:ext uri="{FF2B5EF4-FFF2-40B4-BE49-F238E27FC236}">
-                    <a16:creationId xmlns:a16="http://schemas.microsoft.com/office/drawing/2014/main" xmlns="" id="{60E02FDD-C9EF-4072-854D-965CAF2D3D16}"/>
+                    <a16:creationId xmlns="" xmlns:a16="http://schemas.microsoft.com/office/drawing/2014/main" id="{60E02FDD-C9EF-4072-854D-965CAF2D3D16}"/>
                   </a:ext>
                 </a:extLst>
               </p:cNvPr>
@@ -20098,7 +20294,7 @@
               <p:cNvPr id="11" name="Rectangle 2">
                 <a:extLst>
                   <a:ext uri="{FF2B5EF4-FFF2-40B4-BE49-F238E27FC236}">
-                    <a16:creationId xmlns:a16="http://schemas.microsoft.com/office/drawing/2014/main" xmlns="" id="{747FA38B-603B-41F1-8376-D02155CE211C}"/>
+                    <a16:creationId xmlns="" xmlns:a16="http://schemas.microsoft.com/office/drawing/2014/main" id="{747FA38B-603B-41F1-8376-D02155CE211C}"/>
                   </a:ext>
                 </a:extLst>
               </p:cNvPr>
@@ -20251,7 +20447,7 @@
           <p:cNvPr id="17" name="TextBox 16">
             <a:extLst>
               <a:ext uri="{FF2B5EF4-FFF2-40B4-BE49-F238E27FC236}">
-                <a16:creationId xmlns:a16="http://schemas.microsoft.com/office/drawing/2014/main" xmlns="" id="{D0ECDC15-34F5-44FE-8154-DC11077BCB09}"/>
+                <a16:creationId xmlns="" xmlns:a16="http://schemas.microsoft.com/office/drawing/2014/main" id="{D0ECDC15-34F5-44FE-8154-DC11077BCB09}"/>
               </a:ext>
             </a:extLst>
           </p:cNvPr>
@@ -20416,7 +20612,7 @@
           <p:cNvPr id="18" name="Rectangle 2">
             <a:extLst>
               <a:ext uri="{FF2B5EF4-FFF2-40B4-BE49-F238E27FC236}">
-                <a16:creationId xmlns:a16="http://schemas.microsoft.com/office/drawing/2014/main" xmlns="" id="{ACDC168F-4D82-47FD-B69E-72E7A1600102}"/>
+                <a16:creationId xmlns="" xmlns:a16="http://schemas.microsoft.com/office/drawing/2014/main" id="{ACDC168F-4D82-47FD-B69E-72E7A1600102}"/>
               </a:ext>
             </a:extLst>
           </p:cNvPr>
@@ -20514,7 +20710,7 @@
           <p:cNvPr id="20" name="TextBox 19">
             <a:extLst>
               <a:ext uri="{FF2B5EF4-FFF2-40B4-BE49-F238E27FC236}">
-                <a16:creationId xmlns:a16="http://schemas.microsoft.com/office/drawing/2014/main" xmlns="" id="{EDB442F5-34D7-4300-BA18-4B5BC98BC3D4}"/>
+                <a16:creationId xmlns="" xmlns:a16="http://schemas.microsoft.com/office/drawing/2014/main" id="{EDB442F5-34D7-4300-BA18-4B5BC98BC3D4}"/>
               </a:ext>
             </a:extLst>
           </p:cNvPr>
@@ -20560,7 +20756,7 @@
           <p:cNvPr id="21" name="TextBox 20">
             <a:extLst>
               <a:ext uri="{FF2B5EF4-FFF2-40B4-BE49-F238E27FC236}">
-                <a16:creationId xmlns:a16="http://schemas.microsoft.com/office/drawing/2014/main" xmlns="" id="{1126D985-4D01-49AD-AAA0-F753E895E063}"/>
+                <a16:creationId xmlns="" xmlns:a16="http://schemas.microsoft.com/office/drawing/2014/main" id="{1126D985-4D01-49AD-AAA0-F753E895E063}"/>
               </a:ext>
             </a:extLst>
           </p:cNvPr>
@@ -20606,7 +20802,7 @@
           <p:cNvPr id="22" name="TextBox 21">
             <a:extLst>
               <a:ext uri="{FF2B5EF4-FFF2-40B4-BE49-F238E27FC236}">
-                <a16:creationId xmlns:a16="http://schemas.microsoft.com/office/drawing/2014/main" xmlns="" id="{2F327C8B-A760-45E6-AF3F-CC4F1AE1E652}"/>
+                <a16:creationId xmlns="" xmlns:a16="http://schemas.microsoft.com/office/drawing/2014/main" id="{2F327C8B-A760-45E6-AF3F-CC4F1AE1E652}"/>
               </a:ext>
             </a:extLst>
           </p:cNvPr>
@@ -20652,7 +20848,7 @@
           <p:cNvPr id="23" name="TextBox 22">
             <a:extLst>
               <a:ext uri="{FF2B5EF4-FFF2-40B4-BE49-F238E27FC236}">
-                <a16:creationId xmlns:a16="http://schemas.microsoft.com/office/drawing/2014/main" xmlns="" id="{839ACAD9-74C5-4CC6-8034-5AFF1C74CC80}"/>
+                <a16:creationId xmlns="" xmlns:a16="http://schemas.microsoft.com/office/drawing/2014/main" id="{839ACAD9-74C5-4CC6-8034-5AFF1C74CC80}"/>
               </a:ext>
             </a:extLst>
           </p:cNvPr>
@@ -20696,7 +20892,7 @@
           <p:cNvPr id="29" name="TextBox 28">
             <a:extLst>
               <a:ext uri="{FF2B5EF4-FFF2-40B4-BE49-F238E27FC236}">
-                <a16:creationId xmlns:a16="http://schemas.microsoft.com/office/drawing/2014/main" xmlns="" id="{19B7E9EC-DE33-4DEF-A467-B033A05751C7}"/>
+                <a16:creationId xmlns="" xmlns:a16="http://schemas.microsoft.com/office/drawing/2014/main" id="{19B7E9EC-DE33-4DEF-A467-B033A05751C7}"/>
               </a:ext>
             </a:extLst>
           </p:cNvPr>
@@ -20782,7 +20978,7 @@
           <p:cNvPr id="33" name="TextBox 32">
             <a:extLst>
               <a:ext uri="{FF2B5EF4-FFF2-40B4-BE49-F238E27FC236}">
-                <a16:creationId xmlns:a16="http://schemas.microsoft.com/office/drawing/2014/main" xmlns="" id="{C75C1FD0-583B-4E96-BD9A-3DACD2D5A3BF}"/>
+                <a16:creationId xmlns="" xmlns:a16="http://schemas.microsoft.com/office/drawing/2014/main" id="{C75C1FD0-583B-4E96-BD9A-3DACD2D5A3BF}"/>
               </a:ext>
             </a:extLst>
           </p:cNvPr>
@@ -20909,7 +21105,7 @@
           <p:cNvPr id="35" name="TextBox 34">
             <a:extLst>
               <a:ext uri="{FF2B5EF4-FFF2-40B4-BE49-F238E27FC236}">
-                <a16:creationId xmlns:a16="http://schemas.microsoft.com/office/drawing/2014/main" xmlns="" id="{C75C1FD0-583B-4E96-BD9A-3DACD2D5A3BF}"/>
+                <a16:creationId xmlns="" xmlns:a16="http://schemas.microsoft.com/office/drawing/2014/main" id="{C75C1FD0-583B-4E96-BD9A-3DACD2D5A3BF}"/>
               </a:ext>
             </a:extLst>
           </p:cNvPr>
@@ -20975,7 +21171,7 @@
           <p:cNvPr id="36" name="TextBox 35">
             <a:extLst>
               <a:ext uri="{FF2B5EF4-FFF2-40B4-BE49-F238E27FC236}">
-                <a16:creationId xmlns:a16="http://schemas.microsoft.com/office/drawing/2014/main" xmlns="" id="{F11C7FC8-DC9E-479E-A35D-664C720391E0}"/>
+                <a16:creationId xmlns="" xmlns:a16="http://schemas.microsoft.com/office/drawing/2014/main" id="{F11C7FC8-DC9E-479E-A35D-664C720391E0}"/>
               </a:ext>
             </a:extLst>
           </p:cNvPr>
@@ -21069,7 +21265,7 @@
           <p:cNvPr id="37" name="TextBox 36">
             <a:extLst>
               <a:ext uri="{FF2B5EF4-FFF2-40B4-BE49-F238E27FC236}">
-                <a16:creationId xmlns:a16="http://schemas.microsoft.com/office/drawing/2014/main" xmlns="" id="{E0F0A57F-BE52-4D85-8ACC-9FC4EC34E2C8}"/>
+                <a16:creationId xmlns="" xmlns:a16="http://schemas.microsoft.com/office/drawing/2014/main" id="{E0F0A57F-BE52-4D85-8ACC-9FC4EC34E2C8}"/>
               </a:ext>
             </a:extLst>
           </p:cNvPr>
@@ -21183,7 +21379,7 @@
           <p:cNvPr id="38" name="Rectangle 2">
             <a:extLst>
               <a:ext uri="{FF2B5EF4-FFF2-40B4-BE49-F238E27FC236}">
-                <a16:creationId xmlns:a16="http://schemas.microsoft.com/office/drawing/2014/main" xmlns="" id="{E32F358A-5B64-4928-90C5-86786C7C1A50}"/>
+                <a16:creationId xmlns="" xmlns:a16="http://schemas.microsoft.com/office/drawing/2014/main" id="{E32F358A-5B64-4928-90C5-86786C7C1A50}"/>
               </a:ext>
             </a:extLst>
           </p:cNvPr>
@@ -21383,7 +21579,7 @@
           <p:cNvPr id="31" name="TextBox 30">
             <a:extLst>
               <a:ext uri="{FF2B5EF4-FFF2-40B4-BE49-F238E27FC236}">
-                <a16:creationId xmlns:a16="http://schemas.microsoft.com/office/drawing/2014/main" xmlns="" id="{FDE44C33-EA15-4D14-8324-71F27282442F}"/>
+                <a16:creationId xmlns="" xmlns:a16="http://schemas.microsoft.com/office/drawing/2014/main" id="{FDE44C33-EA15-4D14-8324-71F27282442F}"/>
               </a:ext>
             </a:extLst>
           </p:cNvPr>
@@ -21956,7 +22152,7 @@
           <p:cNvPr id="40" name="TextBox 39">
             <a:extLst>
               <a:ext uri="{FF2B5EF4-FFF2-40B4-BE49-F238E27FC236}">
-                <a16:creationId xmlns:a16="http://schemas.microsoft.com/office/drawing/2014/main" xmlns="" id="{FDE44C33-EA15-4D14-8324-71F27282442F}"/>
+                <a16:creationId xmlns="" xmlns:a16="http://schemas.microsoft.com/office/drawing/2014/main" id="{FDE44C33-EA15-4D14-8324-71F27282442F}"/>
               </a:ext>
             </a:extLst>
           </p:cNvPr>
@@ -22013,7 +22209,7 @@
           <p:cNvPr id="5" name="TextBox 4">
             <a:extLst>
               <a:ext uri="{FF2B5EF4-FFF2-40B4-BE49-F238E27FC236}">
-                <a16:creationId xmlns:a16="http://schemas.microsoft.com/office/drawing/2014/main" xmlns="" id="{EDB442F5-34D7-4300-BA18-4B5BC98BC3D4}"/>
+                <a16:creationId xmlns="" xmlns:a16="http://schemas.microsoft.com/office/drawing/2014/main" id="{EDB442F5-34D7-4300-BA18-4B5BC98BC3D4}"/>
               </a:ext>
             </a:extLst>
           </p:cNvPr>
@@ -22059,7 +22255,7 @@
           <p:cNvPr id="6" name="TextBox 5">
             <a:extLst>
               <a:ext uri="{FF2B5EF4-FFF2-40B4-BE49-F238E27FC236}">
-                <a16:creationId xmlns:a16="http://schemas.microsoft.com/office/drawing/2014/main" xmlns="" id="{1126D985-4D01-49AD-AAA0-F753E895E063}"/>
+                <a16:creationId xmlns="" xmlns:a16="http://schemas.microsoft.com/office/drawing/2014/main" id="{1126D985-4D01-49AD-AAA0-F753E895E063}"/>
               </a:ext>
             </a:extLst>
           </p:cNvPr>
@@ -22105,7 +22301,7 @@
           <p:cNvPr id="7" name="TextBox 6">
             <a:extLst>
               <a:ext uri="{FF2B5EF4-FFF2-40B4-BE49-F238E27FC236}">
-                <a16:creationId xmlns:a16="http://schemas.microsoft.com/office/drawing/2014/main" xmlns="" id="{2F327C8B-A760-45E6-AF3F-CC4F1AE1E652}"/>
+                <a16:creationId xmlns="" xmlns:a16="http://schemas.microsoft.com/office/drawing/2014/main" id="{2F327C8B-A760-45E6-AF3F-CC4F1AE1E652}"/>
               </a:ext>
             </a:extLst>
           </p:cNvPr>
@@ -22151,7 +22347,7 @@
           <p:cNvPr id="8" name="TextBox 7">
             <a:extLst>
               <a:ext uri="{FF2B5EF4-FFF2-40B4-BE49-F238E27FC236}">
-                <a16:creationId xmlns:a16="http://schemas.microsoft.com/office/drawing/2014/main" xmlns="" id="{839ACAD9-74C5-4CC6-8034-5AFF1C74CC80}"/>
+                <a16:creationId xmlns="" xmlns:a16="http://schemas.microsoft.com/office/drawing/2014/main" id="{839ACAD9-74C5-4CC6-8034-5AFF1C74CC80}"/>
               </a:ext>
             </a:extLst>
           </p:cNvPr>
@@ -22195,7 +22391,7 @@
           <p:cNvPr id="32" name="TextBox 31">
             <a:extLst>
               <a:ext uri="{FF2B5EF4-FFF2-40B4-BE49-F238E27FC236}">
-                <a16:creationId xmlns:a16="http://schemas.microsoft.com/office/drawing/2014/main" xmlns="" id="{DD7FCEB6-AC10-4AFD-9AFB-406D96C12559}"/>
+                <a16:creationId xmlns="" xmlns:a16="http://schemas.microsoft.com/office/drawing/2014/main" id="{DD7FCEB6-AC10-4AFD-9AFB-406D96C12559}"/>
               </a:ext>
             </a:extLst>
           </p:cNvPr>
@@ -22266,7 +22462,7 @@
           <p:cNvPr id="33" name="TextBox 32">
             <a:extLst>
               <a:ext uri="{FF2B5EF4-FFF2-40B4-BE49-F238E27FC236}">
-                <a16:creationId xmlns:a16="http://schemas.microsoft.com/office/drawing/2014/main" xmlns="" id="{2C7CBAC8-A5FA-45FC-A0EF-4C4308FA0E04}"/>
+                <a16:creationId xmlns="" xmlns:a16="http://schemas.microsoft.com/office/drawing/2014/main" id="{2C7CBAC8-A5FA-45FC-A0EF-4C4308FA0E04}"/>
               </a:ext>
             </a:extLst>
           </p:cNvPr>
@@ -22337,7 +22533,7 @@
           <p:cNvPr id="35" name="TextBox 34">
             <a:extLst>
               <a:ext uri="{FF2B5EF4-FFF2-40B4-BE49-F238E27FC236}">
-                <a16:creationId xmlns:a16="http://schemas.microsoft.com/office/drawing/2014/main" xmlns="" id="{D87C4589-E0F6-4654-9607-5869B2D4C8EE}"/>
+                <a16:creationId xmlns="" xmlns:a16="http://schemas.microsoft.com/office/drawing/2014/main" id="{D87C4589-E0F6-4654-9607-5869B2D4C8EE}"/>
               </a:ext>
             </a:extLst>
           </p:cNvPr>
@@ -22394,7 +22590,7 @@
           <p:cNvPr id="12" name="TextBox 11">
             <a:extLst>
               <a:ext uri="{FF2B5EF4-FFF2-40B4-BE49-F238E27FC236}">
-                <a16:creationId xmlns:a16="http://schemas.microsoft.com/office/drawing/2014/main" xmlns="" id="{222D7E88-8744-4298-AB65-66D1802C446A}"/>
+                <a16:creationId xmlns="" xmlns:a16="http://schemas.microsoft.com/office/drawing/2014/main" id="{222D7E88-8744-4298-AB65-66D1802C446A}"/>
               </a:ext>
             </a:extLst>
           </p:cNvPr>
@@ -22437,7 +22633,7 @@
           <p:cNvPr id="14" name="TextBox 13">
             <a:extLst>
               <a:ext uri="{FF2B5EF4-FFF2-40B4-BE49-F238E27FC236}">
-                <a16:creationId xmlns:a16="http://schemas.microsoft.com/office/drawing/2014/main" xmlns="" id="{ED953CD0-2D4C-4BDF-BC9C-B63030F8BA50}"/>
+                <a16:creationId xmlns="" xmlns:a16="http://schemas.microsoft.com/office/drawing/2014/main" id="{ED953CD0-2D4C-4BDF-BC9C-B63030F8BA50}"/>
               </a:ext>
             </a:extLst>
           </p:cNvPr>
@@ -22487,7 +22683,7 @@
           <p:cNvPr id="19" name="TextBox 18">
             <a:extLst>
               <a:ext uri="{FF2B5EF4-FFF2-40B4-BE49-F238E27FC236}">
-                <a16:creationId xmlns:a16="http://schemas.microsoft.com/office/drawing/2014/main" xmlns="" id="{968E1B19-EEE5-4FDD-8B70-135C6EF31A5C}"/>
+                <a16:creationId xmlns="" xmlns:a16="http://schemas.microsoft.com/office/drawing/2014/main" id="{968E1B19-EEE5-4FDD-8B70-135C6EF31A5C}"/>
               </a:ext>
             </a:extLst>
           </p:cNvPr>
@@ -22529,7 +22725,7 @@
           <p:cNvPr id="41" name="Rectangle 2">
             <a:extLst>
               <a:ext uri="{FF2B5EF4-FFF2-40B4-BE49-F238E27FC236}">
-                <a16:creationId xmlns:a16="http://schemas.microsoft.com/office/drawing/2014/main" xmlns="" id="{E32F358A-5B64-4928-90C5-86786C7C1A50}"/>
+                <a16:creationId xmlns="" xmlns:a16="http://schemas.microsoft.com/office/drawing/2014/main" id="{E32F358A-5B64-4928-90C5-86786C7C1A50}"/>
               </a:ext>
             </a:extLst>
           </p:cNvPr>
@@ -22729,7 +22925,7 @@
           <p:cNvPr id="42" name="Rectangle 2">
             <a:extLst>
               <a:ext uri="{FF2B5EF4-FFF2-40B4-BE49-F238E27FC236}">
-                <a16:creationId xmlns:a16="http://schemas.microsoft.com/office/drawing/2014/main" xmlns="" id="{525E0D96-8099-4601-80D1-0E4DF7CAD69B}"/>
+                <a16:creationId xmlns="" xmlns:a16="http://schemas.microsoft.com/office/drawing/2014/main" id="{525E0D96-8099-4601-80D1-0E4DF7CAD69B}"/>
               </a:ext>
             </a:extLst>
           </p:cNvPr>
@@ -22861,7 +23057,7 @@
           <p:cNvPr id="43" name="TextBox 42">
             <a:extLst>
               <a:ext uri="{FF2B5EF4-FFF2-40B4-BE49-F238E27FC236}">
-                <a16:creationId xmlns:a16="http://schemas.microsoft.com/office/drawing/2014/main" xmlns="" id="{376B4891-E642-468B-9860-2426713A114A}"/>
+                <a16:creationId xmlns="" xmlns:a16="http://schemas.microsoft.com/office/drawing/2014/main" id="{376B4891-E642-468B-9860-2426713A114A}"/>
               </a:ext>
             </a:extLst>
           </p:cNvPr>
@@ -22932,7 +23128,7 @@
           <p:cNvPr id="46" name="TextBox 45">
             <a:extLst>
               <a:ext uri="{FF2B5EF4-FFF2-40B4-BE49-F238E27FC236}">
-                <a16:creationId xmlns:a16="http://schemas.microsoft.com/office/drawing/2014/main" xmlns="" id="{0FD4CFE0-333E-4BDA-B155-05698DAD0B70}"/>
+                <a16:creationId xmlns="" xmlns:a16="http://schemas.microsoft.com/office/drawing/2014/main" id="{0FD4CFE0-333E-4BDA-B155-05698DAD0B70}"/>
               </a:ext>
             </a:extLst>
           </p:cNvPr>
@@ -23795,7 +23991,7 @@
           <p:cNvPr id="15" name="TextBox 14">
             <a:extLst>
               <a:ext uri="{FF2B5EF4-FFF2-40B4-BE49-F238E27FC236}">
-                <a16:creationId xmlns:a16="http://schemas.microsoft.com/office/drawing/2014/main" xmlns="" id="{438442CF-1B82-4A10-87A1-614331CA498E}"/>
+                <a16:creationId xmlns="" xmlns:a16="http://schemas.microsoft.com/office/drawing/2014/main" id="{438442CF-1B82-4A10-87A1-614331CA498E}"/>
               </a:ext>
             </a:extLst>
           </p:cNvPr>
@@ -23923,7 +24119,7 @@
           <p:cNvPr id="18" name="TextBox 17">
             <a:extLst>
               <a:ext uri="{FF2B5EF4-FFF2-40B4-BE49-F238E27FC236}">
-                <a16:creationId xmlns:a16="http://schemas.microsoft.com/office/drawing/2014/main" xmlns="" id="{9DFCBF7F-F24C-4F4A-8434-94B315F04673}"/>
+                <a16:creationId xmlns="" xmlns:a16="http://schemas.microsoft.com/office/drawing/2014/main" id="{9DFCBF7F-F24C-4F4A-8434-94B315F04673}"/>
               </a:ext>
             </a:extLst>
           </p:cNvPr>
@@ -24029,7 +24225,7 @@
           <p:cNvPr id="19" name="Rectangle 3">
             <a:extLst>
               <a:ext uri="{FF2B5EF4-FFF2-40B4-BE49-F238E27FC236}">
-                <a16:creationId xmlns:a16="http://schemas.microsoft.com/office/drawing/2014/main" xmlns="" id="{46ADB3CD-EA06-4C85-A4CE-E0A5AA5A8DFC}"/>
+                <a16:creationId xmlns="" xmlns:a16="http://schemas.microsoft.com/office/drawing/2014/main" id="{46ADB3CD-EA06-4C85-A4CE-E0A5AA5A8DFC}"/>
               </a:ext>
             </a:extLst>
           </p:cNvPr>
@@ -24127,7 +24323,7 @@
           <p:cNvPr id="20" name="TextBox 19">
             <a:extLst>
               <a:ext uri="{FF2B5EF4-FFF2-40B4-BE49-F238E27FC236}">
-                <a16:creationId xmlns:a16="http://schemas.microsoft.com/office/drawing/2014/main" xmlns="" id="{EDB442F5-34D7-4300-BA18-4B5BC98BC3D4}"/>
+                <a16:creationId xmlns="" xmlns:a16="http://schemas.microsoft.com/office/drawing/2014/main" id="{EDB442F5-34D7-4300-BA18-4B5BC98BC3D4}"/>
               </a:ext>
             </a:extLst>
           </p:cNvPr>
@@ -24173,7 +24369,7 @@
           <p:cNvPr id="23" name="TextBox 22">
             <a:extLst>
               <a:ext uri="{FF2B5EF4-FFF2-40B4-BE49-F238E27FC236}">
-                <a16:creationId xmlns:a16="http://schemas.microsoft.com/office/drawing/2014/main" xmlns="" id="{1126D985-4D01-49AD-AAA0-F753E895E063}"/>
+                <a16:creationId xmlns="" xmlns:a16="http://schemas.microsoft.com/office/drawing/2014/main" id="{1126D985-4D01-49AD-AAA0-F753E895E063}"/>
               </a:ext>
             </a:extLst>
           </p:cNvPr>
@@ -24219,7 +24415,7 @@
           <p:cNvPr id="24" name="TextBox 23">
             <a:extLst>
               <a:ext uri="{FF2B5EF4-FFF2-40B4-BE49-F238E27FC236}">
-                <a16:creationId xmlns:a16="http://schemas.microsoft.com/office/drawing/2014/main" xmlns="" id="{2F327C8B-A760-45E6-AF3F-CC4F1AE1E652}"/>
+                <a16:creationId xmlns="" xmlns:a16="http://schemas.microsoft.com/office/drawing/2014/main" id="{2F327C8B-A760-45E6-AF3F-CC4F1AE1E652}"/>
               </a:ext>
             </a:extLst>
           </p:cNvPr>
@@ -24265,7 +24461,7 @@
           <p:cNvPr id="25" name="TextBox 24">
             <a:extLst>
               <a:ext uri="{FF2B5EF4-FFF2-40B4-BE49-F238E27FC236}">
-                <a16:creationId xmlns:a16="http://schemas.microsoft.com/office/drawing/2014/main" xmlns="" id="{839ACAD9-74C5-4CC6-8034-5AFF1C74CC80}"/>
+                <a16:creationId xmlns="" xmlns:a16="http://schemas.microsoft.com/office/drawing/2014/main" id="{839ACAD9-74C5-4CC6-8034-5AFF1C74CC80}"/>
               </a:ext>
             </a:extLst>
           </p:cNvPr>
@@ -24309,7 +24505,7 @@
           <p:cNvPr id="26" name="TextBox 25">
             <a:extLst>
               <a:ext uri="{FF2B5EF4-FFF2-40B4-BE49-F238E27FC236}">
-                <a16:creationId xmlns:a16="http://schemas.microsoft.com/office/drawing/2014/main" xmlns="" id="{222D7E88-8744-4298-AB65-66D1802C446A}"/>
+                <a16:creationId xmlns="" xmlns:a16="http://schemas.microsoft.com/office/drawing/2014/main" id="{222D7E88-8744-4298-AB65-66D1802C446A}"/>
               </a:ext>
             </a:extLst>
           </p:cNvPr>
@@ -24352,7 +24548,7 @@
           <p:cNvPr id="28" name="Rectangle 2">
             <a:extLst>
               <a:ext uri="{FF2B5EF4-FFF2-40B4-BE49-F238E27FC236}">
-                <a16:creationId xmlns:a16="http://schemas.microsoft.com/office/drawing/2014/main" xmlns="" id="{E32F358A-5B64-4928-90C5-86786C7C1A50}"/>
+                <a16:creationId xmlns="" xmlns:a16="http://schemas.microsoft.com/office/drawing/2014/main" id="{E32F358A-5B64-4928-90C5-86786C7C1A50}"/>
               </a:ext>
             </a:extLst>
           </p:cNvPr>
@@ -24552,7 +24748,7 @@
           <p:cNvPr id="29" name="Rectangle 2">
             <a:extLst>
               <a:ext uri="{FF2B5EF4-FFF2-40B4-BE49-F238E27FC236}">
-                <a16:creationId xmlns:a16="http://schemas.microsoft.com/office/drawing/2014/main" xmlns="" id="{525E0D96-8099-4601-80D1-0E4DF7CAD69B}"/>
+                <a16:creationId xmlns="" xmlns:a16="http://schemas.microsoft.com/office/drawing/2014/main" id="{525E0D96-8099-4601-80D1-0E4DF7CAD69B}"/>
               </a:ext>
             </a:extLst>
           </p:cNvPr>
@@ -24684,7 +24880,7 @@
           <p:cNvPr id="30" name="TextBox 29">
             <a:extLst>
               <a:ext uri="{FF2B5EF4-FFF2-40B4-BE49-F238E27FC236}">
-                <a16:creationId xmlns:a16="http://schemas.microsoft.com/office/drawing/2014/main" xmlns="" id="{0FD4CFE0-333E-4BDA-B155-05698DAD0B70}"/>
+                <a16:creationId xmlns="" xmlns:a16="http://schemas.microsoft.com/office/drawing/2014/main" id="{0FD4CFE0-333E-4BDA-B155-05698DAD0B70}"/>
               </a:ext>
             </a:extLst>
           </p:cNvPr>
@@ -24727,7 +24923,7 @@
           <p:cNvPr id="32" name="TextBox 31">
             <a:extLst>
               <a:ext uri="{FF2B5EF4-FFF2-40B4-BE49-F238E27FC236}">
-                <a16:creationId xmlns:a16="http://schemas.microsoft.com/office/drawing/2014/main" xmlns="" id="{FDE44C33-EA15-4D14-8324-71F27282442F}"/>
+                <a16:creationId xmlns="" xmlns:a16="http://schemas.microsoft.com/office/drawing/2014/main" id="{FDE44C33-EA15-4D14-8324-71F27282442F}"/>
               </a:ext>
             </a:extLst>
           </p:cNvPr>
@@ -24784,7 +24980,7 @@
           <p:cNvPr id="35" name="Rectangle 3">
             <a:extLst>
               <a:ext uri="{FF2B5EF4-FFF2-40B4-BE49-F238E27FC236}">
-                <a16:creationId xmlns:a16="http://schemas.microsoft.com/office/drawing/2014/main" xmlns="" id="{46ADB3CD-EA06-4C85-A4CE-E0A5AA5A8DFC}"/>
+                <a16:creationId xmlns="" xmlns:a16="http://schemas.microsoft.com/office/drawing/2014/main" id="{46ADB3CD-EA06-4C85-A4CE-E0A5AA5A8DFC}"/>
               </a:ext>
             </a:extLst>
           </p:cNvPr>
@@ -24795,7 +24991,7 @@
         </p:nvSpPr>
         <p:spPr bwMode="auto">
           <a:xfrm>
-            <a:off x="1260764" y="2391757"/>
+            <a:off x="1108364" y="2391757"/>
             <a:ext cx="10916526" cy="369332"/>
           </a:xfrm>
           <a:prstGeom prst="rect">
@@ -25132,7 +25328,7 @@
           <p:cNvPr id="48" name="Rectangle 3">
             <a:extLst>
               <a:ext uri="{FF2B5EF4-FFF2-40B4-BE49-F238E27FC236}">
-                <a16:creationId xmlns:a16="http://schemas.microsoft.com/office/drawing/2014/main" xmlns="" id="{46ADB3CD-EA06-4C85-A4CE-E0A5AA5A8DFC}"/>
+                <a16:creationId xmlns="" xmlns:a16="http://schemas.microsoft.com/office/drawing/2014/main" id="{46ADB3CD-EA06-4C85-A4CE-E0A5AA5A8DFC}"/>
               </a:ext>
             </a:extLst>
           </p:cNvPr>
@@ -25230,7 +25426,7 @@
           <p:cNvPr id="16" name="TextBox 15">
             <a:extLst>
               <a:ext uri="{FF2B5EF4-FFF2-40B4-BE49-F238E27FC236}">
-                <a16:creationId xmlns:a16="http://schemas.microsoft.com/office/drawing/2014/main" xmlns="" id="{9DFCBF7F-F24C-4F4A-8434-94B315F04673}"/>
+                <a16:creationId xmlns="" xmlns:a16="http://schemas.microsoft.com/office/drawing/2014/main" id="{9DFCBF7F-F24C-4F4A-8434-94B315F04673}"/>
               </a:ext>
             </a:extLst>
           </p:cNvPr>
@@ -25323,7 +25519,7 @@
           <p:cNvPr id="25" name="TextBox 24">
             <a:extLst>
               <a:ext uri="{FF2B5EF4-FFF2-40B4-BE49-F238E27FC236}">
-                <a16:creationId xmlns:a16="http://schemas.microsoft.com/office/drawing/2014/main" xmlns="" id="{9DFCBF7F-F24C-4F4A-8434-94B315F04673}"/>
+                <a16:creationId xmlns="" xmlns:a16="http://schemas.microsoft.com/office/drawing/2014/main" id="{9DFCBF7F-F24C-4F4A-8434-94B315F04673}"/>
               </a:ext>
             </a:extLst>
           </p:cNvPr>
@@ -25456,7 +25652,7 @@
           <p:cNvPr id="26" name="TextBox 25">
             <a:extLst>
               <a:ext uri="{FF2B5EF4-FFF2-40B4-BE49-F238E27FC236}">
-                <a16:creationId xmlns:a16="http://schemas.microsoft.com/office/drawing/2014/main" xmlns="" id="{438442CF-1B82-4A10-87A1-614331CA498E}"/>
+                <a16:creationId xmlns="" xmlns:a16="http://schemas.microsoft.com/office/drawing/2014/main" id="{438442CF-1B82-4A10-87A1-614331CA498E}"/>
               </a:ext>
             </a:extLst>
           </p:cNvPr>
@@ -25615,7 +25811,7 @@
               <p:cNvPr id="11" name="TextBox 10">
                 <a:extLst>
                   <a:ext uri="{FF2B5EF4-FFF2-40B4-BE49-F238E27FC236}">
-                    <a16:creationId xmlns:a16="http://schemas.microsoft.com/office/drawing/2014/main" xmlns="" id="{9E395FCD-95B2-4749-9682-00A0C79CBA13}"/>
+                    <a16:creationId xmlns="" xmlns:a16="http://schemas.microsoft.com/office/drawing/2014/main" id="{9E395FCD-95B2-4749-9682-00A0C79CBA13}"/>
                   </a:ext>
                 </a:extLst>
               </p:cNvPr>
@@ -25661,7 +25857,7 @@
               <p:cNvPr id="12" name="TextBox 11">
                 <a:extLst>
                   <a:ext uri="{FF2B5EF4-FFF2-40B4-BE49-F238E27FC236}">
-                    <a16:creationId xmlns:a16="http://schemas.microsoft.com/office/drawing/2014/main" xmlns="" id="{12162968-8F0F-4D20-A2D5-07F59AA75E60}"/>
+                    <a16:creationId xmlns="" xmlns:a16="http://schemas.microsoft.com/office/drawing/2014/main" id="{12162968-8F0F-4D20-A2D5-07F59AA75E60}"/>
                   </a:ext>
                 </a:extLst>
               </p:cNvPr>
@@ -25707,7 +25903,7 @@
               <p:cNvPr id="13" name="TextBox 12">
                 <a:extLst>
                   <a:ext uri="{FF2B5EF4-FFF2-40B4-BE49-F238E27FC236}">
-                    <a16:creationId xmlns:a16="http://schemas.microsoft.com/office/drawing/2014/main" xmlns="" id="{A1762713-59AE-44F1-84D1-5DACDE124103}"/>
+                    <a16:creationId xmlns="" xmlns:a16="http://schemas.microsoft.com/office/drawing/2014/main" id="{A1762713-59AE-44F1-84D1-5DACDE124103}"/>
                   </a:ext>
                 </a:extLst>
               </p:cNvPr>
@@ -25753,7 +25949,7 @@
               <p:cNvPr id="14" name="TextBox 13">
                 <a:extLst>
                   <a:ext uri="{FF2B5EF4-FFF2-40B4-BE49-F238E27FC236}">
-                    <a16:creationId xmlns:a16="http://schemas.microsoft.com/office/drawing/2014/main" xmlns="" id="{B2F95DB7-0D24-4791-910F-3A95AF58A4B6}"/>
+                    <a16:creationId xmlns="" xmlns:a16="http://schemas.microsoft.com/office/drawing/2014/main" id="{B2F95DB7-0D24-4791-910F-3A95AF58A4B6}"/>
                   </a:ext>
                 </a:extLst>
               </p:cNvPr>
@@ -25800,7 +25996,7 @@
               <p:cNvPr id="15" name="TextBox 14">
                 <a:extLst>
                   <a:ext uri="{FF2B5EF4-FFF2-40B4-BE49-F238E27FC236}">
-                    <a16:creationId xmlns:a16="http://schemas.microsoft.com/office/drawing/2014/main" xmlns="" id="{0A113BEB-51E8-42EE-AF79-D74F55774972}"/>
+                    <a16:creationId xmlns="" xmlns:a16="http://schemas.microsoft.com/office/drawing/2014/main" id="{0A113BEB-51E8-42EE-AF79-D74F55774972}"/>
                   </a:ext>
                 </a:extLst>
               </p:cNvPr>
@@ -25844,7 +26040,7 @@
             <p:cNvPr id="10" name="TextBox 9">
               <a:extLst>
                 <a:ext uri="{FF2B5EF4-FFF2-40B4-BE49-F238E27FC236}">
-                  <a16:creationId xmlns:a16="http://schemas.microsoft.com/office/drawing/2014/main" xmlns="" id="{E43AF4C5-CF5B-4E7E-B438-83CD70BE1265}"/>
+                  <a16:creationId xmlns="" xmlns:a16="http://schemas.microsoft.com/office/drawing/2014/main" id="{E43AF4C5-CF5B-4E7E-B438-83CD70BE1265}"/>
                 </a:ext>
               </a:extLst>
             </p:cNvPr>
@@ -25919,7 +26115,7 @@
             <p:cNvPr id="81" name="Rectangle 2">
               <a:extLst>
                 <a:ext uri="{FF2B5EF4-FFF2-40B4-BE49-F238E27FC236}">
-                  <a16:creationId xmlns:a16="http://schemas.microsoft.com/office/drawing/2014/main" xmlns="" id="{03DC0A66-1F24-4836-83E7-0736D601F324}"/>
+                  <a16:creationId xmlns="" xmlns:a16="http://schemas.microsoft.com/office/drawing/2014/main" id="{03DC0A66-1F24-4836-83E7-0736D601F324}"/>
                 </a:ext>
               </a:extLst>
             </p:cNvPr>
@@ -25980,7 +26176,7 @@
             <p:cNvPr id="82" name="TextBox 81">
               <a:extLst>
                 <a:ext uri="{FF2B5EF4-FFF2-40B4-BE49-F238E27FC236}">
-                  <a16:creationId xmlns:a16="http://schemas.microsoft.com/office/drawing/2014/main" xmlns="" id="{9B5A79D0-5E77-49FE-9E1A-18A741E1FAD1}"/>
+                  <a16:creationId xmlns="" xmlns:a16="http://schemas.microsoft.com/office/drawing/2014/main" id="{9B5A79D0-5E77-49FE-9E1A-18A741E1FAD1}"/>
                 </a:ext>
               </a:extLst>
             </p:cNvPr>
@@ -26495,7 +26691,7 @@
             <p:cNvPr id="106" name="TextBox 105">
               <a:extLst>
                 <a:ext uri="{FF2B5EF4-FFF2-40B4-BE49-F238E27FC236}">
-                  <a16:creationId xmlns:a16="http://schemas.microsoft.com/office/drawing/2014/main" xmlns="" id="{0FD4CFE0-333E-4BDA-B155-05698DAD0B70}"/>
+                  <a16:creationId xmlns="" xmlns:a16="http://schemas.microsoft.com/office/drawing/2014/main" id="{0FD4CFE0-333E-4BDA-B155-05698DAD0B70}"/>
                 </a:ext>
               </a:extLst>
             </p:cNvPr>
@@ -26552,7 +26748,7 @@
               <p:cNvPr id="110" name="Rectangle 109">
                 <a:extLst>
                   <a:ext uri="{FF2B5EF4-FFF2-40B4-BE49-F238E27FC236}">
-                    <a16:creationId xmlns:a16="http://schemas.microsoft.com/office/drawing/2014/main" xmlns="" id="{03DC0A66-1F24-4836-83E7-0736D601F324}"/>
+                    <a16:creationId xmlns="" xmlns:a16="http://schemas.microsoft.com/office/drawing/2014/main" id="{03DC0A66-1F24-4836-83E7-0736D601F324}"/>
                   </a:ext>
                 </a:extLst>
               </p:cNvPr>
@@ -26611,7 +26807,7 @@
               <p:cNvPr id="111" name="Rectangle 110">
                 <a:extLst>
                   <a:ext uri="{FF2B5EF4-FFF2-40B4-BE49-F238E27FC236}">
-                    <a16:creationId xmlns:a16="http://schemas.microsoft.com/office/drawing/2014/main" xmlns="" id="{03DC0A66-1F24-4836-83E7-0736D601F324}"/>
+                    <a16:creationId xmlns="" xmlns:a16="http://schemas.microsoft.com/office/drawing/2014/main" id="{03DC0A66-1F24-4836-83E7-0736D601F324}"/>
                   </a:ext>
                 </a:extLst>
               </p:cNvPr>
@@ -26721,7 +26917,7 @@
           <p:cNvPr id="112" name="Rectangle 3">
             <a:extLst>
               <a:ext uri="{FF2B5EF4-FFF2-40B4-BE49-F238E27FC236}">
-                <a16:creationId xmlns:a16="http://schemas.microsoft.com/office/drawing/2014/main" xmlns="" id="{46ADB3CD-EA06-4C85-A4CE-E0A5AA5A8DFC}"/>
+                <a16:creationId xmlns="" xmlns:a16="http://schemas.microsoft.com/office/drawing/2014/main" id="{46ADB3CD-EA06-4C85-A4CE-E0A5AA5A8DFC}"/>
               </a:ext>
             </a:extLst>
           </p:cNvPr>
@@ -26960,7 +27156,7 @@
           <p:cNvPr id="113" name="TextBox 112">
             <a:extLst>
               <a:ext uri="{FF2B5EF4-FFF2-40B4-BE49-F238E27FC236}">
-                <a16:creationId xmlns:a16="http://schemas.microsoft.com/office/drawing/2014/main" xmlns="" id="{9DFCBF7F-F24C-4F4A-8434-94B315F04673}"/>
+                <a16:creationId xmlns="" xmlns:a16="http://schemas.microsoft.com/office/drawing/2014/main" id="{9DFCBF7F-F24C-4F4A-8434-94B315F04673}"/>
               </a:ext>
             </a:extLst>
           </p:cNvPr>
@@ -27722,7 +27918,7 @@
           <p:cNvPr id="24" name="TextBox 23">
             <a:extLst>
               <a:ext uri="{FF2B5EF4-FFF2-40B4-BE49-F238E27FC236}">
-                <a16:creationId xmlns:a16="http://schemas.microsoft.com/office/drawing/2014/main" xmlns="" id="{FDE44C33-EA15-4D14-8324-71F27282442F}"/>
+                <a16:creationId xmlns="" xmlns:a16="http://schemas.microsoft.com/office/drawing/2014/main" id="{FDE44C33-EA15-4D14-8324-71F27282442F}"/>
               </a:ext>
             </a:extLst>
           </p:cNvPr>
@@ -27807,7 +28003,7 @@
               <p:cNvPr id="16" name="TextBox 15">
                 <a:extLst>
                   <a:ext uri="{FF2B5EF4-FFF2-40B4-BE49-F238E27FC236}">
-                    <a16:creationId xmlns:a16="http://schemas.microsoft.com/office/drawing/2014/main" xmlns="" id="{EDB442F5-34D7-4300-BA18-4B5BC98BC3D4}"/>
+                    <a16:creationId xmlns="" xmlns:a16="http://schemas.microsoft.com/office/drawing/2014/main" id="{EDB442F5-34D7-4300-BA18-4B5BC98BC3D4}"/>
                   </a:ext>
                 </a:extLst>
               </p:cNvPr>
@@ -27853,7 +28049,7 @@
               <p:cNvPr id="17" name="TextBox 16">
                 <a:extLst>
                   <a:ext uri="{FF2B5EF4-FFF2-40B4-BE49-F238E27FC236}">
-                    <a16:creationId xmlns:a16="http://schemas.microsoft.com/office/drawing/2014/main" xmlns="" id="{1126D985-4D01-49AD-AAA0-F753E895E063}"/>
+                    <a16:creationId xmlns="" xmlns:a16="http://schemas.microsoft.com/office/drawing/2014/main" id="{1126D985-4D01-49AD-AAA0-F753E895E063}"/>
                   </a:ext>
                 </a:extLst>
               </p:cNvPr>
@@ -27899,7 +28095,7 @@
               <p:cNvPr id="18" name="TextBox 17">
                 <a:extLst>
                   <a:ext uri="{FF2B5EF4-FFF2-40B4-BE49-F238E27FC236}">
-                    <a16:creationId xmlns:a16="http://schemas.microsoft.com/office/drawing/2014/main" xmlns="" id="{2F327C8B-A760-45E6-AF3F-CC4F1AE1E652}"/>
+                    <a16:creationId xmlns="" xmlns:a16="http://schemas.microsoft.com/office/drawing/2014/main" id="{2F327C8B-A760-45E6-AF3F-CC4F1AE1E652}"/>
                   </a:ext>
                 </a:extLst>
               </p:cNvPr>
@@ -27945,7 +28141,7 @@
               <p:cNvPr id="19" name="TextBox 18">
                 <a:extLst>
                   <a:ext uri="{FF2B5EF4-FFF2-40B4-BE49-F238E27FC236}">
-                    <a16:creationId xmlns:a16="http://schemas.microsoft.com/office/drawing/2014/main" xmlns="" id="{839ACAD9-74C5-4CC6-8034-5AFF1C74CC80}"/>
+                    <a16:creationId xmlns="" xmlns:a16="http://schemas.microsoft.com/office/drawing/2014/main" id="{839ACAD9-74C5-4CC6-8034-5AFF1C74CC80}"/>
                   </a:ext>
                 </a:extLst>
               </p:cNvPr>
@@ -27989,7 +28185,7 @@
               <p:cNvPr id="20" name="TextBox 19">
                 <a:extLst>
                   <a:ext uri="{FF2B5EF4-FFF2-40B4-BE49-F238E27FC236}">
-                    <a16:creationId xmlns:a16="http://schemas.microsoft.com/office/drawing/2014/main" xmlns="" id="{222D7E88-8744-4298-AB65-66D1802C446A}"/>
+                    <a16:creationId xmlns="" xmlns:a16="http://schemas.microsoft.com/office/drawing/2014/main" id="{222D7E88-8744-4298-AB65-66D1802C446A}"/>
                   </a:ext>
                 </a:extLst>
               </p:cNvPr>
@@ -28033,7 +28229,7 @@
             <p:cNvPr id="22" name="Rectangle 2">
               <a:extLst>
                 <a:ext uri="{FF2B5EF4-FFF2-40B4-BE49-F238E27FC236}">
-                  <a16:creationId xmlns:a16="http://schemas.microsoft.com/office/drawing/2014/main" xmlns="" id="{525E0D96-8099-4601-80D1-0E4DF7CAD69B}"/>
+                  <a16:creationId xmlns="" xmlns:a16="http://schemas.microsoft.com/office/drawing/2014/main" id="{525E0D96-8099-4601-80D1-0E4DF7CAD69B}"/>
                 </a:ext>
               </a:extLst>
             </p:cNvPr>
@@ -28110,7 +28306,7 @@
             <p:cNvPr id="23" name="TextBox 22">
               <a:extLst>
                 <a:ext uri="{FF2B5EF4-FFF2-40B4-BE49-F238E27FC236}">
-                  <a16:creationId xmlns:a16="http://schemas.microsoft.com/office/drawing/2014/main" xmlns="" id="{0FD4CFE0-333E-4BDA-B155-05698DAD0B70}"/>
+                  <a16:creationId xmlns="" xmlns:a16="http://schemas.microsoft.com/office/drawing/2014/main" id="{0FD4CFE0-333E-4BDA-B155-05698DAD0B70}"/>
                 </a:ext>
               </a:extLst>
             </p:cNvPr>
@@ -28153,7 +28349,7 @@
             <p:cNvPr id="67" name="Rectangle 3">
               <a:extLst>
                 <a:ext uri="{FF2B5EF4-FFF2-40B4-BE49-F238E27FC236}">
-                  <a16:creationId xmlns:a16="http://schemas.microsoft.com/office/drawing/2014/main" xmlns="" id="{46ADB3CD-EA06-4C85-A4CE-E0A5AA5A8DFC}"/>
+                  <a16:creationId xmlns="" xmlns:a16="http://schemas.microsoft.com/office/drawing/2014/main" id="{46ADB3CD-EA06-4C85-A4CE-E0A5AA5A8DFC}"/>
                 </a:ext>
               </a:extLst>
             </p:cNvPr>
@@ -28308,7 +28504,7 @@
               <p:cNvPr id="43" name="TextBox 42">
                 <a:extLst>
                   <a:ext uri="{FF2B5EF4-FFF2-40B4-BE49-F238E27FC236}">
-                    <a16:creationId xmlns:a16="http://schemas.microsoft.com/office/drawing/2014/main" xmlns="" id="{EDB442F5-34D7-4300-BA18-4B5BC98BC3D4}"/>
+                    <a16:creationId xmlns="" xmlns:a16="http://schemas.microsoft.com/office/drawing/2014/main" id="{EDB442F5-34D7-4300-BA18-4B5BC98BC3D4}"/>
                   </a:ext>
                 </a:extLst>
               </p:cNvPr>
@@ -28361,7 +28557,7 @@
               <p:cNvPr id="44" name="TextBox 43">
                 <a:extLst>
                   <a:ext uri="{FF2B5EF4-FFF2-40B4-BE49-F238E27FC236}">
-                    <a16:creationId xmlns:a16="http://schemas.microsoft.com/office/drawing/2014/main" xmlns="" id="{1126D985-4D01-49AD-AAA0-F753E895E063}"/>
+                    <a16:creationId xmlns="" xmlns:a16="http://schemas.microsoft.com/office/drawing/2014/main" id="{1126D985-4D01-49AD-AAA0-F753E895E063}"/>
                   </a:ext>
                 </a:extLst>
               </p:cNvPr>
@@ -28407,7 +28603,7 @@
               <p:cNvPr id="45" name="TextBox 44">
                 <a:extLst>
                   <a:ext uri="{FF2B5EF4-FFF2-40B4-BE49-F238E27FC236}">
-                    <a16:creationId xmlns:a16="http://schemas.microsoft.com/office/drawing/2014/main" xmlns="" id="{2F327C8B-A760-45E6-AF3F-CC4F1AE1E652}"/>
+                    <a16:creationId xmlns="" xmlns:a16="http://schemas.microsoft.com/office/drawing/2014/main" id="{2F327C8B-A760-45E6-AF3F-CC4F1AE1E652}"/>
                   </a:ext>
                 </a:extLst>
               </p:cNvPr>
@@ -28453,7 +28649,7 @@
               <p:cNvPr id="46" name="TextBox 45">
                 <a:extLst>
                   <a:ext uri="{FF2B5EF4-FFF2-40B4-BE49-F238E27FC236}">
-                    <a16:creationId xmlns:a16="http://schemas.microsoft.com/office/drawing/2014/main" xmlns="" id="{839ACAD9-74C5-4CC6-8034-5AFF1C74CC80}"/>
+                    <a16:creationId xmlns="" xmlns:a16="http://schemas.microsoft.com/office/drawing/2014/main" id="{839ACAD9-74C5-4CC6-8034-5AFF1C74CC80}"/>
                   </a:ext>
                 </a:extLst>
               </p:cNvPr>
@@ -28497,7 +28693,7 @@
               <p:cNvPr id="47" name="TextBox 46">
                 <a:extLst>
                   <a:ext uri="{FF2B5EF4-FFF2-40B4-BE49-F238E27FC236}">
-                    <a16:creationId xmlns:a16="http://schemas.microsoft.com/office/drawing/2014/main" xmlns="" id="{222D7E88-8744-4298-AB65-66D1802C446A}"/>
+                    <a16:creationId xmlns="" xmlns:a16="http://schemas.microsoft.com/office/drawing/2014/main" id="{222D7E88-8744-4298-AB65-66D1802C446A}"/>
                   </a:ext>
                 </a:extLst>
               </p:cNvPr>
@@ -28541,7 +28737,7 @@
             <p:cNvPr id="50" name="TextBox 49">
               <a:extLst>
                 <a:ext uri="{FF2B5EF4-FFF2-40B4-BE49-F238E27FC236}">
-                  <a16:creationId xmlns:a16="http://schemas.microsoft.com/office/drawing/2014/main" xmlns="" id="{0FD4CFE0-333E-4BDA-B155-05698DAD0B70}"/>
+                  <a16:creationId xmlns="" xmlns:a16="http://schemas.microsoft.com/office/drawing/2014/main" id="{0FD4CFE0-333E-4BDA-B155-05698DAD0B70}"/>
                 </a:ext>
               </a:extLst>
             </p:cNvPr>
@@ -28584,7 +28780,7 @@
             <p:cNvPr id="66" name="Rectangle 2">
               <a:extLst>
                 <a:ext uri="{FF2B5EF4-FFF2-40B4-BE49-F238E27FC236}">
-                  <a16:creationId xmlns:a16="http://schemas.microsoft.com/office/drawing/2014/main" xmlns="" id="{525E0D96-8099-4601-80D1-0E4DF7CAD69B}"/>
+                  <a16:creationId xmlns="" xmlns:a16="http://schemas.microsoft.com/office/drawing/2014/main" id="{525E0D96-8099-4601-80D1-0E4DF7CAD69B}"/>
                 </a:ext>
               </a:extLst>
             </p:cNvPr>
@@ -28661,7 +28857,7 @@
             <p:cNvPr id="68" name="Rectangle 3">
               <a:extLst>
                 <a:ext uri="{FF2B5EF4-FFF2-40B4-BE49-F238E27FC236}">
-                  <a16:creationId xmlns:a16="http://schemas.microsoft.com/office/drawing/2014/main" xmlns="" id="{46ADB3CD-EA06-4C85-A4CE-E0A5AA5A8DFC}"/>
+                  <a16:creationId xmlns="" xmlns:a16="http://schemas.microsoft.com/office/drawing/2014/main" id="{46ADB3CD-EA06-4C85-A4CE-E0A5AA5A8DFC}"/>
                 </a:ext>
               </a:extLst>
             </p:cNvPr>
@@ -28854,7 +29050,7 @@
               <p:cNvPr id="53" name="TextBox 52">
                 <a:extLst>
                   <a:ext uri="{FF2B5EF4-FFF2-40B4-BE49-F238E27FC236}">
-                    <a16:creationId xmlns:a16="http://schemas.microsoft.com/office/drawing/2014/main" xmlns="" id="{EDB442F5-34D7-4300-BA18-4B5BC98BC3D4}"/>
+                    <a16:creationId xmlns="" xmlns:a16="http://schemas.microsoft.com/office/drawing/2014/main" id="{EDB442F5-34D7-4300-BA18-4B5BC98BC3D4}"/>
                   </a:ext>
                 </a:extLst>
               </p:cNvPr>
@@ -28907,7 +29103,7 @@
               <p:cNvPr id="54" name="TextBox 53">
                 <a:extLst>
                   <a:ext uri="{FF2B5EF4-FFF2-40B4-BE49-F238E27FC236}">
-                    <a16:creationId xmlns:a16="http://schemas.microsoft.com/office/drawing/2014/main" xmlns="" id="{1126D985-4D01-49AD-AAA0-F753E895E063}"/>
+                    <a16:creationId xmlns="" xmlns:a16="http://schemas.microsoft.com/office/drawing/2014/main" id="{1126D985-4D01-49AD-AAA0-F753E895E063}"/>
                   </a:ext>
                 </a:extLst>
               </p:cNvPr>
@@ -28953,7 +29149,7 @@
               <p:cNvPr id="55" name="TextBox 54">
                 <a:extLst>
                   <a:ext uri="{FF2B5EF4-FFF2-40B4-BE49-F238E27FC236}">
-                    <a16:creationId xmlns:a16="http://schemas.microsoft.com/office/drawing/2014/main" xmlns="" id="{2F327C8B-A760-45E6-AF3F-CC4F1AE1E652}"/>
+                    <a16:creationId xmlns="" xmlns:a16="http://schemas.microsoft.com/office/drawing/2014/main" id="{2F327C8B-A760-45E6-AF3F-CC4F1AE1E652}"/>
                   </a:ext>
                 </a:extLst>
               </p:cNvPr>
@@ -28999,7 +29195,7 @@
               <p:cNvPr id="56" name="TextBox 55">
                 <a:extLst>
                   <a:ext uri="{FF2B5EF4-FFF2-40B4-BE49-F238E27FC236}">
-                    <a16:creationId xmlns:a16="http://schemas.microsoft.com/office/drawing/2014/main" xmlns="" id="{839ACAD9-74C5-4CC6-8034-5AFF1C74CC80}"/>
+                    <a16:creationId xmlns="" xmlns:a16="http://schemas.microsoft.com/office/drawing/2014/main" id="{839ACAD9-74C5-4CC6-8034-5AFF1C74CC80}"/>
                   </a:ext>
                 </a:extLst>
               </p:cNvPr>
@@ -29043,7 +29239,7 @@
               <p:cNvPr id="57" name="TextBox 56">
                 <a:extLst>
                   <a:ext uri="{FF2B5EF4-FFF2-40B4-BE49-F238E27FC236}">
-                    <a16:creationId xmlns:a16="http://schemas.microsoft.com/office/drawing/2014/main" xmlns="" id="{222D7E88-8744-4298-AB65-66D1802C446A}"/>
+                    <a16:creationId xmlns="" xmlns:a16="http://schemas.microsoft.com/office/drawing/2014/main" id="{222D7E88-8744-4298-AB65-66D1802C446A}"/>
                   </a:ext>
                 </a:extLst>
               </p:cNvPr>
@@ -29087,7 +29283,7 @@
             <p:cNvPr id="59" name="Rectangle 2">
               <a:extLst>
                 <a:ext uri="{FF2B5EF4-FFF2-40B4-BE49-F238E27FC236}">
-                  <a16:creationId xmlns:a16="http://schemas.microsoft.com/office/drawing/2014/main" xmlns="" id="{525E0D96-8099-4601-80D1-0E4DF7CAD69B}"/>
+                  <a16:creationId xmlns="" xmlns:a16="http://schemas.microsoft.com/office/drawing/2014/main" id="{525E0D96-8099-4601-80D1-0E4DF7CAD69B}"/>
                 </a:ext>
               </a:extLst>
             </p:cNvPr>
@@ -29163,7 +29359,7 @@
             <p:cNvPr id="60" name="TextBox 59">
               <a:extLst>
                 <a:ext uri="{FF2B5EF4-FFF2-40B4-BE49-F238E27FC236}">
-                  <a16:creationId xmlns:a16="http://schemas.microsoft.com/office/drawing/2014/main" xmlns="" id="{0FD4CFE0-333E-4BDA-B155-05698DAD0B70}"/>
+                  <a16:creationId xmlns="" xmlns:a16="http://schemas.microsoft.com/office/drawing/2014/main" id="{0FD4CFE0-333E-4BDA-B155-05698DAD0B70}"/>
                 </a:ext>
               </a:extLst>
             </p:cNvPr>
@@ -29206,7 +29402,7 @@
             <p:cNvPr id="69" name="Rectangle 3">
               <a:extLst>
                 <a:ext uri="{FF2B5EF4-FFF2-40B4-BE49-F238E27FC236}">
-                  <a16:creationId xmlns:a16="http://schemas.microsoft.com/office/drawing/2014/main" xmlns="" id="{46ADB3CD-EA06-4C85-A4CE-E0A5AA5A8DFC}"/>
+                  <a16:creationId xmlns="" xmlns:a16="http://schemas.microsoft.com/office/drawing/2014/main" id="{46ADB3CD-EA06-4C85-A4CE-E0A5AA5A8DFC}"/>
                 </a:ext>
               </a:extLst>
             </p:cNvPr>
@@ -29318,7 +29514,7 @@
           <p:cNvPr id="73" name="TextBox 72">
             <a:extLst>
               <a:ext uri="{FF2B5EF4-FFF2-40B4-BE49-F238E27FC236}">
-                <a16:creationId xmlns:a16="http://schemas.microsoft.com/office/drawing/2014/main" xmlns="" id="{9DFCBF7F-F24C-4F4A-8434-94B315F04673}"/>
+                <a16:creationId xmlns="" xmlns:a16="http://schemas.microsoft.com/office/drawing/2014/main" id="{9DFCBF7F-F24C-4F4A-8434-94B315F04673}"/>
               </a:ext>
             </a:extLst>
           </p:cNvPr>
@@ -29624,7 +29820,7 @@
           <p:cNvPr id="14" name="TextBox 13">
             <a:extLst>
               <a:ext uri="{FF2B5EF4-FFF2-40B4-BE49-F238E27FC236}">
-                <a16:creationId xmlns:a16="http://schemas.microsoft.com/office/drawing/2014/main" xmlns="" id="{FDE44C33-EA15-4D14-8324-71F27282442F}"/>
+                <a16:creationId xmlns="" xmlns:a16="http://schemas.microsoft.com/office/drawing/2014/main" id="{FDE44C33-EA15-4D14-8324-71F27282442F}"/>
               </a:ext>
             </a:extLst>
           </p:cNvPr>
@@ -29681,7 +29877,7 @@
           <p:cNvPr id="4" name="TextBox 3">
             <a:extLst>
               <a:ext uri="{FF2B5EF4-FFF2-40B4-BE49-F238E27FC236}">
-                <a16:creationId xmlns:a16="http://schemas.microsoft.com/office/drawing/2014/main" xmlns="" id="{438442CF-1B82-4A10-87A1-614331CA498E}"/>
+                <a16:creationId xmlns="" xmlns:a16="http://schemas.microsoft.com/office/drawing/2014/main" id="{438442CF-1B82-4A10-87A1-614331CA498E}"/>
               </a:ext>
             </a:extLst>
           </p:cNvPr>
@@ -29781,7 +29977,7 @@
           <p:cNvPr id="6" name="TextBox 5">
             <a:extLst>
               <a:ext uri="{FF2B5EF4-FFF2-40B4-BE49-F238E27FC236}">
-                <a16:creationId xmlns:a16="http://schemas.microsoft.com/office/drawing/2014/main" xmlns="" id="{438442CF-1B82-4A10-87A1-614331CA498E}"/>
+                <a16:creationId xmlns="" xmlns:a16="http://schemas.microsoft.com/office/drawing/2014/main" id="{438442CF-1B82-4A10-87A1-614331CA498E}"/>
               </a:ext>
             </a:extLst>
           </p:cNvPr>
@@ -29916,7 +30112,7 @@
           <p:cNvPr id="7" name="TextBox 6">
             <a:extLst>
               <a:ext uri="{FF2B5EF4-FFF2-40B4-BE49-F238E27FC236}">
-                <a16:creationId xmlns:a16="http://schemas.microsoft.com/office/drawing/2014/main" xmlns="" id="{438442CF-1B82-4A10-87A1-614331CA498E}"/>
+                <a16:creationId xmlns="" xmlns:a16="http://schemas.microsoft.com/office/drawing/2014/main" id="{438442CF-1B82-4A10-87A1-614331CA498E}"/>
               </a:ext>
             </a:extLst>
           </p:cNvPr>
@@ -30135,7 +30331,7 @@
           <p:cNvPr id="10" name="TextBox 9">
             <a:extLst>
               <a:ext uri="{FF2B5EF4-FFF2-40B4-BE49-F238E27FC236}">
-                <a16:creationId xmlns:a16="http://schemas.microsoft.com/office/drawing/2014/main" xmlns="" id="{438442CF-1B82-4A10-87A1-614331CA498E}"/>
+                <a16:creationId xmlns="" xmlns:a16="http://schemas.microsoft.com/office/drawing/2014/main" id="{438442CF-1B82-4A10-87A1-614331CA498E}"/>
               </a:ext>
             </a:extLst>
           </p:cNvPr>
@@ -30236,7 +30432,7 @@
           <p:cNvPr id="11" name="TextBox 10">
             <a:extLst>
               <a:ext uri="{FF2B5EF4-FFF2-40B4-BE49-F238E27FC236}">
-                <a16:creationId xmlns:a16="http://schemas.microsoft.com/office/drawing/2014/main" xmlns="" id="{438442CF-1B82-4A10-87A1-614331CA498E}"/>
+                <a16:creationId xmlns="" xmlns:a16="http://schemas.microsoft.com/office/drawing/2014/main" id="{438442CF-1B82-4A10-87A1-614331CA498E}"/>
               </a:ext>
             </a:extLst>
           </p:cNvPr>
@@ -30344,7 +30540,7 @@
           <p:cNvPr id="12" name="TextBox 11">
             <a:extLst>
               <a:ext uri="{FF2B5EF4-FFF2-40B4-BE49-F238E27FC236}">
-                <a16:creationId xmlns:a16="http://schemas.microsoft.com/office/drawing/2014/main" xmlns="" id="{438442CF-1B82-4A10-87A1-614331CA498E}"/>
+                <a16:creationId xmlns="" xmlns:a16="http://schemas.microsoft.com/office/drawing/2014/main" id="{438442CF-1B82-4A10-87A1-614331CA498E}"/>
               </a:ext>
             </a:extLst>
           </p:cNvPr>
@@ -30403,7 +30599,7 @@
           <p:cNvPr id="15" name="TextBox 14">
             <a:extLst>
               <a:ext uri="{FF2B5EF4-FFF2-40B4-BE49-F238E27FC236}">
-                <a16:creationId xmlns:a16="http://schemas.microsoft.com/office/drawing/2014/main" xmlns="" id="{E43AF4C5-CF5B-4E7E-B438-83CD70BE1265}"/>
+                <a16:creationId xmlns="" xmlns:a16="http://schemas.microsoft.com/office/drawing/2014/main" id="{E43AF4C5-CF5B-4E7E-B438-83CD70BE1265}"/>
               </a:ext>
             </a:extLst>
           </p:cNvPr>
@@ -31373,7 +31569,7 @@
   <a:extraClrSchemeLst/>
   <a:extLst>
     <a:ext uri="{05A4C25C-085E-4340-85A3-A5531E510DB2}">
-      <thm15:themeFamily xmlns:thm15="http://schemas.microsoft.com/office/thememl/2012/main" xmlns="" name="Office Theme" id="{62F939B6-93AF-4DB8-9C6B-D6C7DFDC589F}" vid="{4A3C46E8-61CC-4603-A589-7422A47A8E4A}"/>
+      <thm15:themeFamily xmlns="" xmlns:thm15="http://schemas.microsoft.com/office/thememl/2012/main" name="Office Theme" id="{62F939B6-93AF-4DB8-9C6B-D6C7DFDC589F}" vid="{4A3C46E8-61CC-4603-A589-7422A47A8E4A}"/>
     </a:ext>
   </a:extLst>
 </a:theme>

</xml_diff>

<commit_message>
Add origin of P tp FASTQ pptx
 Changes to be committed:
	modified:   Flip Presentations/NGS_Intro/00-FASTA_FASTQ_PHRED_ASCII/00-FASTQ_PHRED_ASCII.pptx
	modified:   Presentations/Presentations-Oeiras 2017a_Good_Enough_for_now/multalign.ppt
</commit_message>
<xml_diff>
--- a/Flip Presentations/NGS_Intro/00-FASTA_FASTQ_PHRED_ASCII/00-FASTQ_PHRED_ASCII.pptx
+++ b/Flip Presentations/NGS_Intro/00-FASTA_FASTQ_PHRED_ASCII/00-FASTQ_PHRED_ASCII.pptx
@@ -5,7 +5,7 @@
     <p:sldMasterId id="2147483648" r:id="rId1"/>
   </p:sldMasterIdLst>
   <p:notesMasterIdLst>
-    <p:notesMasterId r:id="rId19"/>
+    <p:notesMasterId r:id="rId21"/>
   </p:notesMasterIdLst>
   <p:sldIdLst>
     <p:sldId id="290" r:id="rId2"/>
@@ -16,15 +16,17 @@
     <p:sldId id="278" r:id="rId7"/>
     <p:sldId id="281" r:id="rId8"/>
     <p:sldId id="287" r:id="rId9"/>
-    <p:sldId id="286" r:id="rId10"/>
-    <p:sldId id="283" r:id="rId11"/>
-    <p:sldId id="288" r:id="rId12"/>
-    <p:sldId id="279" r:id="rId13"/>
-    <p:sldId id="280" r:id="rId14"/>
-    <p:sldId id="282" r:id="rId15"/>
-    <p:sldId id="284" r:id="rId16"/>
-    <p:sldId id="285" r:id="rId17"/>
-    <p:sldId id="289" r:id="rId18"/>
+    <p:sldId id="291" r:id="rId10"/>
+    <p:sldId id="286" r:id="rId11"/>
+    <p:sldId id="292" r:id="rId12"/>
+    <p:sldId id="283" r:id="rId13"/>
+    <p:sldId id="288" r:id="rId14"/>
+    <p:sldId id="279" r:id="rId15"/>
+    <p:sldId id="280" r:id="rId16"/>
+    <p:sldId id="282" r:id="rId17"/>
+    <p:sldId id="284" r:id="rId18"/>
+    <p:sldId id="285" r:id="rId19"/>
+    <p:sldId id="289" r:id="rId20"/>
   </p:sldIdLst>
   <p:sldSz cx="12192000" cy="6858000"/>
   <p:notesSz cx="6858000" cy="9144000"/>
@@ -217,7 +219,7 @@
           <a:p>
             <a:fld id="{A1A0514D-38CC-49F5-A912-2794DAAF3AC3}" type="datetimeFigureOut">
               <a:rPr lang="en-GB" smtClean="0"/>
-              <a:t>2018-02-20</a:t>
+              <a:t>2018-02-22</a:t>
             </a:fld>
             <a:endParaRPr lang="en-GB"/>
           </a:p>
@@ -1533,7 +1535,7 @@
           <a:p>
             <a:fld id="{783B116A-7CF9-49FA-B73A-46949A776ECC}" type="slidenum">
               <a:rPr lang="en-GB" smtClean="0"/>
-              <a:t>15</a:t>
+              <a:t>17</a:t>
             </a:fld>
             <a:endParaRPr lang="en-GB"/>
           </a:p>
@@ -1701,7 +1703,7 @@
           <a:p>
             <a:fld id="{AEC09C50-853A-420B-8C26-7439C86401C0}" type="datetimeFigureOut">
               <a:rPr lang="en-GB" smtClean="0"/>
-              <a:t>2018-02-20</a:t>
+              <a:t>2018-02-22</a:t>
             </a:fld>
             <a:endParaRPr lang="en-GB"/>
           </a:p>
@@ -1901,7 +1903,7 @@
           <a:p>
             <a:fld id="{AEC09C50-853A-420B-8C26-7439C86401C0}" type="datetimeFigureOut">
               <a:rPr lang="en-GB" smtClean="0"/>
-              <a:t>2018-02-20</a:t>
+              <a:t>2018-02-22</a:t>
             </a:fld>
             <a:endParaRPr lang="en-GB"/>
           </a:p>
@@ -2111,7 +2113,7 @@
           <a:p>
             <a:fld id="{AEC09C50-853A-420B-8C26-7439C86401C0}" type="datetimeFigureOut">
               <a:rPr lang="en-GB" smtClean="0"/>
-              <a:t>2018-02-20</a:t>
+              <a:t>2018-02-22</a:t>
             </a:fld>
             <a:endParaRPr lang="en-GB"/>
           </a:p>
@@ -2311,7 +2313,7 @@
           <a:p>
             <a:fld id="{AEC09C50-853A-420B-8C26-7439C86401C0}" type="datetimeFigureOut">
               <a:rPr lang="en-GB" smtClean="0"/>
-              <a:t>2018-02-20</a:t>
+              <a:t>2018-02-22</a:t>
             </a:fld>
             <a:endParaRPr lang="en-GB"/>
           </a:p>
@@ -2587,7 +2589,7 @@
           <a:p>
             <a:fld id="{AEC09C50-853A-420B-8C26-7439C86401C0}" type="datetimeFigureOut">
               <a:rPr lang="en-GB" smtClean="0"/>
-              <a:t>2018-02-20</a:t>
+              <a:t>2018-02-22</a:t>
             </a:fld>
             <a:endParaRPr lang="en-GB"/>
           </a:p>
@@ -2855,7 +2857,7 @@
           <a:p>
             <a:fld id="{AEC09C50-853A-420B-8C26-7439C86401C0}" type="datetimeFigureOut">
               <a:rPr lang="en-GB" smtClean="0"/>
-              <a:t>2018-02-20</a:t>
+              <a:t>2018-02-22</a:t>
             </a:fld>
             <a:endParaRPr lang="en-GB"/>
           </a:p>
@@ -3270,7 +3272,7 @@
           <a:p>
             <a:fld id="{AEC09C50-853A-420B-8C26-7439C86401C0}" type="datetimeFigureOut">
               <a:rPr lang="en-GB" smtClean="0"/>
-              <a:t>2018-02-20</a:t>
+              <a:t>2018-02-22</a:t>
             </a:fld>
             <a:endParaRPr lang="en-GB"/>
           </a:p>
@@ -3412,7 +3414,7 @@
           <a:p>
             <a:fld id="{AEC09C50-853A-420B-8C26-7439C86401C0}" type="datetimeFigureOut">
               <a:rPr lang="en-GB" smtClean="0"/>
-              <a:t>2018-02-20</a:t>
+              <a:t>2018-02-22</a:t>
             </a:fld>
             <a:endParaRPr lang="en-GB"/>
           </a:p>
@@ -3525,7 +3527,7 @@
           <a:p>
             <a:fld id="{AEC09C50-853A-420B-8C26-7439C86401C0}" type="datetimeFigureOut">
               <a:rPr lang="en-GB" smtClean="0"/>
-              <a:t>2018-02-20</a:t>
+              <a:t>2018-02-22</a:t>
             </a:fld>
             <a:endParaRPr lang="en-GB"/>
           </a:p>
@@ -3838,7 +3840,7 @@
           <a:p>
             <a:fld id="{AEC09C50-853A-420B-8C26-7439C86401C0}" type="datetimeFigureOut">
               <a:rPr lang="en-GB" smtClean="0"/>
-              <a:t>2018-02-20</a:t>
+              <a:t>2018-02-22</a:t>
             </a:fld>
             <a:endParaRPr lang="en-GB"/>
           </a:p>
@@ -4127,7 +4129,7 @@
           <a:p>
             <a:fld id="{AEC09C50-853A-420B-8C26-7439C86401C0}" type="datetimeFigureOut">
               <a:rPr lang="en-GB" smtClean="0"/>
-              <a:t>2018-02-20</a:t>
+              <a:t>2018-02-22</a:t>
             </a:fld>
             <a:endParaRPr lang="en-GB"/>
           </a:p>
@@ -4370,7 +4372,7 @@
           <a:p>
             <a:fld id="{AEC09C50-853A-420B-8C26-7439C86401C0}" type="datetimeFigureOut">
               <a:rPr lang="en-GB" smtClean="0"/>
-              <a:t>2018-02-20</a:t>
+              <a:t>2018-02-22</a:t>
             </a:fld>
             <a:endParaRPr lang="en-GB"/>
           </a:p>
@@ -4861,6 +4863,1838 @@
 </file>
 
 <file path=ppt/slides/slide10.xml><?xml version="1.0" encoding="utf-8"?>
+<p:sld xmlns:a="http://schemas.openxmlformats.org/drawingml/2006/main" xmlns:r="http://schemas.openxmlformats.org/officeDocument/2006/relationships" xmlns:p="http://schemas.openxmlformats.org/presentationml/2006/main">
+  <p:cSld>
+    <p:spTree>
+      <p:nvGrpSpPr>
+        <p:cNvPr id="1" name=""/>
+        <p:cNvGrpSpPr/>
+        <p:nvPr/>
+      </p:nvGrpSpPr>
+      <p:grpSpPr>
+        <a:xfrm>
+          <a:off x="0" y="0"/>
+          <a:ext cx="0" cy="0"/>
+          <a:chOff x="0" y="0"/>
+          <a:chExt cx="0" cy="0"/>
+        </a:xfrm>
+      </p:grpSpPr>
+      <p:sp>
+        <p:nvSpPr>
+          <p:cNvPr id="3" name="AutoShape 2" descr="Q=-10\ \log _{{10}}P"/>
+          <p:cNvSpPr>
+            <a:spLocks noChangeAspect="1" noChangeArrowheads="1"/>
+          </p:cNvSpPr>
+          <p:nvPr/>
+        </p:nvSpPr>
+        <p:spPr bwMode="auto">
+          <a:xfrm>
+            <a:off x="6313955" y="-144463"/>
+            <a:ext cx="304800" cy="304801"/>
+          </a:xfrm>
+          <a:prstGeom prst="rect">
+            <a:avLst/>
+          </a:prstGeom>
+          <a:noFill/>
+          <a:extLst>
+            <a:ext uri="{909E8E84-426E-40DD-AFC4-6F175D3DCCD1}">
+              <a14:hiddenFill xmlns:a14="http://schemas.microsoft.com/office/drawing/2010/main">
+                <a:solidFill>
+                  <a:srgbClr val="FFFFFF"/>
+                </a:solidFill>
+              </a14:hiddenFill>
+            </a:ext>
+          </a:extLst>
+        </p:spPr>
+        <p:txBody>
+          <a:bodyPr vert="horz" wrap="square" lIns="91440" tIns="45720" rIns="91440" bIns="45720" numCol="1" anchor="t" anchorCtr="0" compatLnSpc="1">
+            <a:prstTxWarp prst="textNoShape">
+              <a:avLst/>
+            </a:prstTxWarp>
+          </a:bodyPr>
+          <a:lstStyle/>
+          <a:p>
+            <a:endParaRPr lang="en-GB"/>
+          </a:p>
+        </p:txBody>
+      </p:sp>
+      <p:sp>
+        <p:nvSpPr>
+          <p:cNvPr id="9" name="AutoShape 4" descr="Q=-10\ \log _{{10}}P"/>
+          <p:cNvSpPr>
+            <a:spLocks noChangeAspect="1" noChangeArrowheads="1"/>
+          </p:cNvSpPr>
+          <p:nvPr/>
+        </p:nvSpPr>
+        <p:spPr bwMode="auto">
+          <a:xfrm>
+            <a:off x="6313955" y="7937"/>
+            <a:ext cx="304800" cy="304801"/>
+          </a:xfrm>
+          <a:prstGeom prst="rect">
+            <a:avLst/>
+          </a:prstGeom>
+          <a:noFill/>
+          <a:extLst>
+            <a:ext uri="{909E8E84-426E-40DD-AFC4-6F175D3DCCD1}">
+              <a14:hiddenFill xmlns:a14="http://schemas.microsoft.com/office/drawing/2010/main">
+                <a:solidFill>
+                  <a:srgbClr val="FFFFFF"/>
+                </a:solidFill>
+              </a14:hiddenFill>
+            </a:ext>
+          </a:extLst>
+        </p:spPr>
+        <p:txBody>
+          <a:bodyPr vert="horz" wrap="square" lIns="91440" tIns="45720" rIns="91440" bIns="45720" numCol="1" anchor="t" anchorCtr="0" compatLnSpc="1">
+            <a:prstTxWarp prst="textNoShape">
+              <a:avLst/>
+            </a:prstTxWarp>
+          </a:bodyPr>
+          <a:lstStyle/>
+          <a:p>
+            <a:endParaRPr lang="en-GB"/>
+          </a:p>
+        </p:txBody>
+      </p:sp>
+      <p:sp>
+        <p:nvSpPr>
+          <p:cNvPr id="13" name="TextBox 12">
+            <a:extLst>
+              <a:ext uri="{FF2B5EF4-FFF2-40B4-BE49-F238E27FC236}">
+                <a16:creationId xmlns="" xmlns:a16="http://schemas.microsoft.com/office/drawing/2014/main" id="{E43AF4C5-CF5B-4E7E-B438-83CD70BE1265}"/>
+              </a:ext>
+            </a:extLst>
+          </p:cNvPr>
+          <p:cNvSpPr txBox="1"/>
+          <p:nvPr/>
+        </p:nvSpPr>
+        <p:spPr>
+          <a:xfrm>
+            <a:off x="2008528" y="0"/>
+            <a:ext cx="8174945" cy="729430"/>
+          </a:xfrm>
+          <a:prstGeom prst="rect">
+            <a:avLst/>
+          </a:prstGeom>
+          <a:solidFill>
+            <a:srgbClr val="FF0000"/>
+          </a:solidFill>
+        </p:spPr>
+        <p:txBody>
+          <a:bodyPr wrap="square" rtlCol="0" anchor="ctr">
+            <a:spAutoFit/>
+          </a:bodyPr>
+          <a:lstStyle/>
+          <a:p>
+            <a:pPr algn="ctr">
+              <a:lnSpc>
+                <a:spcPct val="115000"/>
+              </a:lnSpc>
+              <a:spcAft>
+                <a:spcPts val="1000"/>
+              </a:spcAft>
+            </a:pPr>
+            <a:r>
+              <a:rPr lang="en-GB" sz="3600" b="1" u="sng" dirty="0">
+                <a:solidFill>
+                  <a:srgbClr val="EEECE1"/>
+                </a:solidFill>
+                <a:highlight>
+                  <a:srgbClr val="FF0000"/>
+                </a:highlight>
+                <a:latin typeface="Courier New" pitchFamily="49" charset="0"/>
+                <a:ea typeface="Calibri"/>
+                <a:cs typeface="Courier New" pitchFamily="49" charset="0"/>
+              </a:rPr>
+              <a:t>Base </a:t>
+            </a:r>
+            <a:r>
+              <a:rPr lang="en-GB" sz="3600" b="1" u="sng" dirty="0" smtClean="0">
+                <a:solidFill>
+                  <a:schemeClr val="bg2"/>
+                </a:solidFill>
+                <a:highlight>
+                  <a:srgbClr val="FF0000"/>
+                </a:highlight>
+                <a:latin typeface="Courier New" pitchFamily="49" charset="0"/>
+                <a:ea typeface="Calibri"/>
+                <a:cs typeface="Courier New" pitchFamily="49" charset="0"/>
+              </a:rPr>
+              <a:t>Quality (</a:t>
+            </a:r>
+            <a:r>
+              <a:rPr lang="en-GB" sz="3600" dirty="0" smtClean="0">
+                <a:solidFill>
+                  <a:schemeClr val="bg2"/>
+                </a:solidFill>
+                <a:latin typeface="Times New Roman" panose="02020603050405020304" pitchFamily="18" charset="0"/>
+                <a:cs typeface="Times New Roman" panose="02020603050405020304" pitchFamily="18" charset="0"/>
+              </a:rPr>
+              <a:t> </a:t>
+            </a:r>
+            <a:r>
+              <a:rPr lang="en-GB" sz="3600" b="1" dirty="0" smtClean="0">
+                <a:solidFill>
+                  <a:schemeClr val="bg2"/>
+                </a:solidFill>
+                <a:latin typeface="Times New Roman" panose="02020603050405020304" pitchFamily="18" charset="0"/>
+                <a:cs typeface="Times New Roman" panose="02020603050405020304" pitchFamily="18" charset="0"/>
+                <a:hlinkClick r:id="rId2"/>
+              </a:rPr>
+              <a:t>PHRED</a:t>
+            </a:r>
+            <a:r>
+              <a:rPr lang="en-GB" sz="3600" b="1" dirty="0" smtClean="0">
+                <a:solidFill>
+                  <a:schemeClr val="bg2"/>
+                </a:solidFill>
+                <a:latin typeface="Times New Roman" panose="02020603050405020304" pitchFamily="18" charset="0"/>
+                <a:cs typeface="Times New Roman" panose="02020603050405020304" pitchFamily="18" charset="0"/>
+              </a:rPr>
+              <a:t>)</a:t>
+            </a:r>
+            <a:r>
+              <a:rPr lang="en-GB" sz="3600" dirty="0" smtClean="0">
+                <a:solidFill>
+                  <a:schemeClr val="bg2"/>
+                </a:solidFill>
+                <a:latin typeface="Times New Roman" panose="02020603050405020304" pitchFamily="18" charset="0"/>
+                <a:cs typeface="Times New Roman" panose="02020603050405020304" pitchFamily="18" charset="0"/>
+              </a:rPr>
+              <a:t> </a:t>
+            </a:r>
+            <a:r>
+              <a:rPr lang="en-GB" sz="3600" b="1" u="sng" dirty="0" smtClean="0">
+                <a:solidFill>
+                  <a:schemeClr val="bg2"/>
+                </a:solidFill>
+                <a:highlight>
+                  <a:srgbClr val="FF0000"/>
+                </a:highlight>
+                <a:latin typeface="Courier New" pitchFamily="49" charset="0"/>
+                <a:ea typeface="Calibri"/>
+                <a:cs typeface="Courier New" pitchFamily="49" charset="0"/>
+              </a:rPr>
+              <a:t> </a:t>
+            </a:r>
+            <a:r>
+              <a:rPr lang="en-GB" sz="3600" b="1" u="sng" dirty="0">
+                <a:solidFill>
+                  <a:schemeClr val="bg2"/>
+                </a:solidFill>
+                <a:highlight>
+                  <a:srgbClr val="FF0000"/>
+                </a:highlight>
+                <a:latin typeface="Courier New" pitchFamily="49" charset="0"/>
+                <a:ea typeface="Calibri"/>
+                <a:cs typeface="Courier New" pitchFamily="49" charset="0"/>
+              </a:rPr>
+              <a:t>Scores</a:t>
+            </a:r>
+            <a:endParaRPr lang="en-GB" sz="3600" dirty="0">
+              <a:solidFill>
+                <a:schemeClr val="bg2"/>
+              </a:solidFill>
+              <a:latin typeface="Courier New" pitchFamily="49" charset="0"/>
+              <a:ea typeface="Calibri"/>
+              <a:cs typeface="Courier New" pitchFamily="49" charset="0"/>
+            </a:endParaRPr>
+          </a:p>
+        </p:txBody>
+      </p:sp>
+      <p:cxnSp>
+        <p:nvCxnSpPr>
+          <p:cNvPr id="5" name="Straight Arrow Connector 4"/>
+          <p:cNvCxnSpPr/>
+          <p:nvPr/>
+        </p:nvCxnSpPr>
+        <p:spPr>
+          <a:xfrm>
+            <a:off x="422031" y="5598942"/>
+            <a:ext cx="11254154" cy="0"/>
+          </a:xfrm>
+          <a:prstGeom prst="straightConnector1">
+            <a:avLst/>
+          </a:prstGeom>
+          <a:ln w="28575">
+            <a:solidFill>
+              <a:schemeClr val="tx1"/>
+            </a:solidFill>
+            <a:tailEnd type="arrow"/>
+          </a:ln>
+        </p:spPr>
+        <p:style>
+          <a:lnRef idx="1">
+            <a:schemeClr val="accent1"/>
+          </a:lnRef>
+          <a:fillRef idx="0">
+            <a:schemeClr val="accent1"/>
+          </a:fillRef>
+          <a:effectRef idx="0">
+            <a:schemeClr val="accent1"/>
+          </a:effectRef>
+          <a:fontRef idx="minor">
+            <a:schemeClr val="tx1"/>
+          </a:fontRef>
+        </p:style>
+      </p:cxnSp>
+      <p:cxnSp>
+        <p:nvCxnSpPr>
+          <p:cNvPr id="16" name="Straight Arrow Connector 15"/>
+          <p:cNvCxnSpPr/>
+          <p:nvPr/>
+        </p:nvCxnSpPr>
+        <p:spPr>
+          <a:xfrm rot="16200000" flipV="1">
+            <a:off x="1418396" y="3655325"/>
+            <a:ext cx="5796000" cy="0"/>
+          </a:xfrm>
+          <a:prstGeom prst="straightConnector1">
+            <a:avLst/>
+          </a:prstGeom>
+          <a:ln w="28575">
+            <a:solidFill>
+              <a:schemeClr val="tx1"/>
+            </a:solidFill>
+            <a:tailEnd type="arrow"/>
+          </a:ln>
+        </p:spPr>
+        <p:style>
+          <a:lnRef idx="1">
+            <a:schemeClr val="accent1"/>
+          </a:lnRef>
+          <a:fillRef idx="0">
+            <a:schemeClr val="accent1"/>
+          </a:fillRef>
+          <a:effectRef idx="0">
+            <a:schemeClr val="accent1"/>
+          </a:effectRef>
+          <a:fontRef idx="minor">
+            <a:schemeClr val="tx1"/>
+          </a:fontRef>
+        </p:style>
+      </p:cxnSp>
+      <p:sp>
+        <p:nvSpPr>
+          <p:cNvPr id="25" name="Freeform 24"/>
+          <p:cNvSpPr/>
+          <p:nvPr/>
+        </p:nvSpPr>
+        <p:spPr>
+          <a:xfrm>
+            <a:off x="4304714" y="731520"/>
+            <a:ext cx="4431323" cy="4867422"/>
+          </a:xfrm>
+          <a:custGeom>
+            <a:avLst/>
+            <a:gdLst>
+              <a:gd name="connsiteX0" fmla="*/ 0 w 3249637"/>
+              <a:gd name="connsiteY0" fmla="*/ 4867422 h 4867422"/>
+              <a:gd name="connsiteX1" fmla="*/ 998806 w 3249637"/>
+              <a:gd name="connsiteY1" fmla="*/ 4586068 h 4867422"/>
+              <a:gd name="connsiteX2" fmla="*/ 1744394 w 3249637"/>
+              <a:gd name="connsiteY2" fmla="*/ 4093698 h 4867422"/>
+              <a:gd name="connsiteX3" fmla="*/ 2307101 w 3249637"/>
+              <a:gd name="connsiteY3" fmla="*/ 3319975 h 4867422"/>
+              <a:gd name="connsiteX4" fmla="*/ 2771335 w 3249637"/>
+              <a:gd name="connsiteY4" fmla="*/ 2166425 h 4867422"/>
+              <a:gd name="connsiteX5" fmla="*/ 3151163 w 3249637"/>
+              <a:gd name="connsiteY5" fmla="*/ 675249 h 4867422"/>
+              <a:gd name="connsiteX6" fmla="*/ 3249637 w 3249637"/>
+              <a:gd name="connsiteY6" fmla="*/ 0 h 4867422"/>
+            </a:gdLst>
+            <a:ahLst/>
+            <a:cxnLst>
+              <a:cxn ang="0">
+                <a:pos x="connsiteX0" y="connsiteY0"/>
+              </a:cxn>
+              <a:cxn ang="0">
+                <a:pos x="connsiteX1" y="connsiteY1"/>
+              </a:cxn>
+              <a:cxn ang="0">
+                <a:pos x="connsiteX2" y="connsiteY2"/>
+              </a:cxn>
+              <a:cxn ang="0">
+                <a:pos x="connsiteX3" y="connsiteY3"/>
+              </a:cxn>
+              <a:cxn ang="0">
+                <a:pos x="connsiteX4" y="connsiteY4"/>
+              </a:cxn>
+              <a:cxn ang="0">
+                <a:pos x="connsiteX5" y="connsiteY5"/>
+              </a:cxn>
+              <a:cxn ang="0">
+                <a:pos x="connsiteX6" y="connsiteY6"/>
+              </a:cxn>
+            </a:cxnLst>
+            <a:rect l="l" t="t" r="r" b="b"/>
+            <a:pathLst>
+              <a:path w="3249637" h="4867422">
+                <a:moveTo>
+                  <a:pt x="0" y="4867422"/>
+                </a:moveTo>
+                <a:cubicBezTo>
+                  <a:pt x="354037" y="4791222"/>
+                  <a:pt x="708074" y="4715022"/>
+                  <a:pt x="998806" y="4586068"/>
+                </a:cubicBezTo>
+                <a:cubicBezTo>
+                  <a:pt x="1289538" y="4457114"/>
+                  <a:pt x="1526345" y="4304714"/>
+                  <a:pt x="1744394" y="4093698"/>
+                </a:cubicBezTo>
+                <a:cubicBezTo>
+                  <a:pt x="1962443" y="3882682"/>
+                  <a:pt x="2135944" y="3641187"/>
+                  <a:pt x="2307101" y="3319975"/>
+                </a:cubicBezTo>
+                <a:cubicBezTo>
+                  <a:pt x="2478258" y="2998763"/>
+                  <a:pt x="2630658" y="2607213"/>
+                  <a:pt x="2771335" y="2166425"/>
+                </a:cubicBezTo>
+                <a:cubicBezTo>
+                  <a:pt x="2912012" y="1725637"/>
+                  <a:pt x="3071446" y="1036320"/>
+                  <a:pt x="3151163" y="675249"/>
+                </a:cubicBezTo>
+                <a:cubicBezTo>
+                  <a:pt x="3230880" y="314178"/>
+                  <a:pt x="3240258" y="157089"/>
+                  <a:pt x="3249637" y="0"/>
+                </a:cubicBezTo>
+              </a:path>
+            </a:pathLst>
+          </a:custGeom>
+          <a:noFill/>
+        </p:spPr>
+        <p:style>
+          <a:lnRef idx="2">
+            <a:schemeClr val="accent1">
+              <a:shade val="50000"/>
+            </a:schemeClr>
+          </a:lnRef>
+          <a:fillRef idx="1">
+            <a:schemeClr val="accent1"/>
+          </a:fillRef>
+          <a:effectRef idx="0">
+            <a:schemeClr val="accent1"/>
+          </a:effectRef>
+          <a:fontRef idx="minor">
+            <a:schemeClr val="lt1"/>
+          </a:fontRef>
+        </p:style>
+        <p:txBody>
+          <a:bodyPr rtlCol="0" anchor="ctr"/>
+          <a:lstStyle/>
+          <a:p>
+            <a:pPr algn="ctr"/>
+            <a:endParaRPr lang="en-GB"/>
+          </a:p>
+        </p:txBody>
+      </p:sp>
+      <p:cxnSp>
+        <p:nvCxnSpPr>
+          <p:cNvPr id="28" name="Straight Arrow Connector 27"/>
+          <p:cNvCxnSpPr/>
+          <p:nvPr/>
+        </p:nvCxnSpPr>
+        <p:spPr>
+          <a:xfrm rot="16200000" flipV="1">
+            <a:off x="6241372" y="2710421"/>
+            <a:ext cx="5796000" cy="0"/>
+          </a:xfrm>
+          <a:prstGeom prst="straightConnector1">
+            <a:avLst/>
+          </a:prstGeom>
+          <a:ln w="28575">
+            <a:solidFill>
+              <a:schemeClr val="tx1"/>
+            </a:solidFill>
+            <a:tailEnd type="arrow"/>
+          </a:ln>
+        </p:spPr>
+        <p:style>
+          <a:lnRef idx="1">
+            <a:schemeClr val="accent1"/>
+          </a:lnRef>
+          <a:fillRef idx="0">
+            <a:schemeClr val="accent1"/>
+          </a:fillRef>
+          <a:effectRef idx="0">
+            <a:schemeClr val="accent1"/>
+          </a:effectRef>
+          <a:fontRef idx="minor">
+            <a:schemeClr val="tx1"/>
+          </a:fontRef>
+        </p:style>
+      </p:cxnSp>
+    </p:spTree>
+    <p:extLst>
+      <p:ext uri="{BB962C8B-B14F-4D97-AF65-F5344CB8AC3E}">
+        <p14:creationId xmlns:p14="http://schemas.microsoft.com/office/powerpoint/2010/main" val="2463972691"/>
+      </p:ext>
+    </p:extLst>
+  </p:cSld>
+  <p:clrMapOvr>
+    <a:masterClrMapping/>
+  </p:clrMapOvr>
+  <p:timing>
+    <p:tnLst>
+      <p:par>
+        <p:cTn id="1" dur="indefinite" restart="never" nodeType="tmRoot"/>
+      </p:par>
+    </p:tnLst>
+  </p:timing>
+</p:sld>
+</file>
+
+<file path=ppt/slides/slide11.xml><?xml version="1.0" encoding="utf-8"?>
+<p:sld xmlns:a="http://schemas.openxmlformats.org/drawingml/2006/main" xmlns:r="http://schemas.openxmlformats.org/officeDocument/2006/relationships" xmlns:p="http://schemas.openxmlformats.org/presentationml/2006/main">
+  <p:cSld>
+    <p:spTree>
+      <p:nvGrpSpPr>
+        <p:cNvPr id="1" name=""/>
+        <p:cNvGrpSpPr/>
+        <p:nvPr/>
+      </p:nvGrpSpPr>
+      <p:grpSpPr>
+        <a:xfrm>
+          <a:off x="0" y="0"/>
+          <a:ext cx="0" cy="0"/>
+          <a:chOff x="0" y="0"/>
+          <a:chExt cx="0" cy="0"/>
+        </a:xfrm>
+      </p:grpSpPr>
+      <p:sp>
+        <p:nvSpPr>
+          <p:cNvPr id="4" name="TextBox 3">
+            <a:extLst>
+              <a:ext uri="{FF2B5EF4-FFF2-40B4-BE49-F238E27FC236}">
+                <a16:creationId xmlns="" xmlns:a16="http://schemas.microsoft.com/office/drawing/2014/main" id="{438442CF-1B82-4A10-87A1-614331CA498E}"/>
+              </a:ext>
+            </a:extLst>
+          </p:cNvPr>
+          <p:cNvSpPr txBox="1"/>
+          <p:nvPr/>
+        </p:nvSpPr>
+        <p:spPr>
+          <a:xfrm>
+            <a:off x="1019114" y="1291702"/>
+            <a:ext cx="10153772" cy="400110"/>
+          </a:xfrm>
+          <a:prstGeom prst="rect">
+            <a:avLst/>
+          </a:prstGeom>
+          <a:solidFill>
+            <a:schemeClr val="accent2">
+              <a:lumMod val="40000"/>
+              <a:lumOff val="60000"/>
+            </a:schemeClr>
+          </a:solidFill>
+        </p:spPr>
+        <p:txBody>
+          <a:bodyPr wrap="square" rtlCol="0">
+            <a:spAutoFit/>
+          </a:bodyPr>
+          <a:lstStyle/>
+          <a:p>
+            <a:r>
+              <a:rPr lang="en-GB" sz="2000" dirty="0" smtClean="0">
+                <a:latin typeface="Times New Roman" panose="02020603050405020304" pitchFamily="18" charset="0"/>
+                <a:cs typeface="Times New Roman" panose="02020603050405020304" pitchFamily="18" charset="0"/>
+              </a:rPr>
+              <a:t>The </a:t>
+            </a:r>
+            <a:r>
+              <a:rPr lang="en-GB" sz="2000" b="1" dirty="0" smtClean="0">
+                <a:latin typeface="Times New Roman" panose="02020603050405020304" pitchFamily="18" charset="0"/>
+                <a:cs typeface="Times New Roman" panose="02020603050405020304" pitchFamily="18" charset="0"/>
+              </a:rPr>
+              <a:t>Base Quality Scores </a:t>
+            </a:r>
+            <a:r>
+              <a:rPr lang="en-GB" sz="2000" dirty="0" smtClean="0">
+                <a:latin typeface="Times New Roman" panose="02020603050405020304" pitchFamily="18" charset="0"/>
+                <a:cs typeface="Times New Roman" panose="02020603050405020304" pitchFamily="18" charset="0"/>
+              </a:rPr>
+              <a:t>in </a:t>
+            </a:r>
+            <a:r>
+              <a:rPr lang="en-GB" sz="2000" b="1" dirty="0" smtClean="0">
+                <a:latin typeface="Times New Roman" panose="02020603050405020304" pitchFamily="18" charset="0"/>
+                <a:cs typeface="Times New Roman" panose="02020603050405020304" pitchFamily="18" charset="0"/>
+              </a:rPr>
+              <a:t>FASTQ</a:t>
+            </a:r>
+            <a:r>
+              <a:rPr lang="en-GB" sz="2000" dirty="0" smtClean="0">
+                <a:latin typeface="Times New Roman" panose="02020603050405020304" pitchFamily="18" charset="0"/>
+                <a:cs typeface="Times New Roman" panose="02020603050405020304" pitchFamily="18" charset="0"/>
+              </a:rPr>
+              <a:t> files are </a:t>
+            </a:r>
+            <a:r>
+              <a:rPr lang="en-GB" sz="2000" b="1" dirty="0" smtClean="0">
+                <a:latin typeface="Times New Roman" panose="02020603050405020304" pitchFamily="18" charset="0"/>
+                <a:cs typeface="Times New Roman" panose="02020603050405020304" pitchFamily="18" charset="0"/>
+              </a:rPr>
+              <a:t>PHRED</a:t>
+            </a:r>
+            <a:r>
+              <a:rPr lang="en-GB" sz="2000" dirty="0" smtClean="0">
+                <a:latin typeface="Times New Roman" panose="02020603050405020304" pitchFamily="18" charset="0"/>
+                <a:cs typeface="Times New Roman" panose="02020603050405020304" pitchFamily="18" charset="0"/>
+              </a:rPr>
+              <a:t> </a:t>
+            </a:r>
+            <a:r>
+              <a:rPr lang="en-GB" sz="2000" b="1" dirty="0" smtClean="0">
+                <a:latin typeface="Times New Roman" panose="02020603050405020304" pitchFamily="18" charset="0"/>
+                <a:cs typeface="Times New Roman" panose="02020603050405020304" pitchFamily="18" charset="0"/>
+              </a:rPr>
+              <a:t>Scores</a:t>
+            </a:r>
+            <a:r>
+              <a:rPr lang="en-GB" sz="2000" dirty="0" smtClean="0">
+                <a:latin typeface="Times New Roman" panose="02020603050405020304" pitchFamily="18" charset="0"/>
+                <a:cs typeface="Times New Roman" panose="02020603050405020304" pitchFamily="18" charset="0"/>
+              </a:rPr>
+              <a:t>.</a:t>
+            </a:r>
+            <a:endParaRPr lang="en-GB" sz="2000" dirty="0"/>
+          </a:p>
+        </p:txBody>
+      </p:sp>
+      <p:sp>
+        <p:nvSpPr>
+          <p:cNvPr id="6" name="TextBox 5">
+            <a:extLst>
+              <a:ext uri="{FF2B5EF4-FFF2-40B4-BE49-F238E27FC236}">
+                <a16:creationId xmlns="" xmlns:a16="http://schemas.microsoft.com/office/drawing/2014/main" id="{438442CF-1B82-4A10-87A1-614331CA498E}"/>
+              </a:ext>
+            </a:extLst>
+          </p:cNvPr>
+          <p:cNvSpPr txBox="1"/>
+          <p:nvPr/>
+        </p:nvSpPr>
+        <p:spPr>
+          <a:xfrm>
+            <a:off x="1019114" y="2023991"/>
+            <a:ext cx="10153772" cy="707886"/>
+          </a:xfrm>
+          <a:prstGeom prst="rect">
+            <a:avLst/>
+          </a:prstGeom>
+          <a:solidFill>
+            <a:schemeClr val="accent2">
+              <a:lumMod val="40000"/>
+              <a:lumOff val="60000"/>
+            </a:schemeClr>
+          </a:solidFill>
+        </p:spPr>
+        <p:txBody>
+          <a:bodyPr wrap="square" rtlCol="0">
+            <a:spAutoFit/>
+          </a:bodyPr>
+          <a:lstStyle/>
+          <a:p>
+            <a:r>
+              <a:rPr lang="en-GB" sz="2000" dirty="0" smtClean="0">
+                <a:latin typeface="Times New Roman" panose="02020603050405020304" pitchFamily="18" charset="0"/>
+                <a:cs typeface="Times New Roman" panose="02020603050405020304" pitchFamily="18" charset="0"/>
+              </a:rPr>
+              <a:t>The </a:t>
+            </a:r>
+            <a:r>
+              <a:rPr lang="en-GB" sz="2000" b="1" dirty="0">
+                <a:latin typeface="Times New Roman" panose="02020603050405020304" pitchFamily="18" charset="0"/>
+                <a:cs typeface="Times New Roman" panose="02020603050405020304" pitchFamily="18" charset="0"/>
+              </a:rPr>
+              <a:t>PHRED</a:t>
+            </a:r>
+            <a:r>
+              <a:rPr lang="en-GB" sz="2000" dirty="0">
+                <a:latin typeface="Times New Roman" panose="02020603050405020304" pitchFamily="18" charset="0"/>
+                <a:cs typeface="Times New Roman" panose="02020603050405020304" pitchFamily="18" charset="0"/>
+              </a:rPr>
+              <a:t> </a:t>
+            </a:r>
+            <a:r>
+              <a:rPr lang="en-GB" sz="2000" b="1" dirty="0" smtClean="0">
+                <a:latin typeface="Times New Roman" panose="02020603050405020304" pitchFamily="18" charset="0"/>
+                <a:cs typeface="Times New Roman" panose="02020603050405020304" pitchFamily="18" charset="0"/>
+              </a:rPr>
+              <a:t>Score</a:t>
+            </a:r>
+            <a:r>
+              <a:rPr lang="en-GB" sz="2000" dirty="0" smtClean="0">
+                <a:latin typeface="Times New Roman" panose="02020603050405020304" pitchFamily="18" charset="0"/>
+                <a:cs typeface="Times New Roman" panose="02020603050405020304" pitchFamily="18" charset="0"/>
+              </a:rPr>
+              <a:t> for a given </a:t>
+            </a:r>
+            <a:r>
+              <a:rPr lang="en-GB" sz="2000" b="1" dirty="0" smtClean="0">
+                <a:latin typeface="Times New Roman" panose="02020603050405020304" pitchFamily="18" charset="0"/>
+                <a:cs typeface="Times New Roman" panose="02020603050405020304" pitchFamily="18" charset="0"/>
+              </a:rPr>
+              <a:t>Base Call </a:t>
+            </a:r>
+            <a:r>
+              <a:rPr lang="en-GB" sz="2000" dirty="0" smtClean="0">
+                <a:latin typeface="Times New Roman" panose="02020603050405020304" pitchFamily="18" charset="0"/>
+                <a:cs typeface="Times New Roman" panose="02020603050405020304" pitchFamily="18" charset="0"/>
+              </a:rPr>
+              <a:t>is derived from an estimate of the </a:t>
+            </a:r>
+            <a:r>
+              <a:rPr lang="en-GB" sz="2000" b="1" dirty="0" smtClean="0">
+                <a:latin typeface="Times New Roman" panose="02020603050405020304" pitchFamily="18" charset="0"/>
+                <a:cs typeface="Times New Roman" panose="02020603050405020304" pitchFamily="18" charset="0"/>
+              </a:rPr>
+              <a:t>Probability</a:t>
+            </a:r>
+            <a:r>
+              <a:rPr lang="en-GB" sz="2000" dirty="0" smtClean="0">
+                <a:latin typeface="Times New Roman" panose="02020603050405020304" pitchFamily="18" charset="0"/>
+                <a:cs typeface="Times New Roman" panose="02020603050405020304" pitchFamily="18" charset="0"/>
+              </a:rPr>
+              <a:t> of that </a:t>
+            </a:r>
+            <a:r>
+              <a:rPr lang="en-GB" sz="2000" b="1" dirty="0">
+                <a:latin typeface="Times New Roman" panose="02020603050405020304" pitchFamily="18" charset="0"/>
+                <a:cs typeface="Times New Roman" panose="02020603050405020304" pitchFamily="18" charset="0"/>
+              </a:rPr>
+              <a:t>B</a:t>
+            </a:r>
+            <a:r>
+              <a:rPr lang="en-GB" sz="2000" b="1" dirty="0" smtClean="0">
+                <a:latin typeface="Times New Roman" panose="02020603050405020304" pitchFamily="18" charset="0"/>
+                <a:cs typeface="Times New Roman" panose="02020603050405020304" pitchFamily="18" charset="0"/>
+              </a:rPr>
+              <a:t>ase</a:t>
+            </a:r>
+            <a:r>
+              <a:rPr lang="en-GB" sz="2000" dirty="0" smtClean="0">
+                <a:latin typeface="Times New Roman" panose="02020603050405020304" pitchFamily="18" charset="0"/>
+                <a:cs typeface="Times New Roman" panose="02020603050405020304" pitchFamily="18" charset="0"/>
+              </a:rPr>
+              <a:t> being </a:t>
+            </a:r>
+            <a:r>
+              <a:rPr lang="en-GB" sz="2000" b="1" dirty="0" smtClean="0">
+                <a:latin typeface="Times New Roman" panose="02020603050405020304" pitchFamily="18" charset="0"/>
+                <a:cs typeface="Times New Roman" panose="02020603050405020304" pitchFamily="18" charset="0"/>
+              </a:rPr>
+              <a:t>Called</a:t>
+            </a:r>
+            <a:r>
+              <a:rPr lang="en-GB" sz="2000" dirty="0" smtClean="0">
+                <a:latin typeface="Times New Roman" panose="02020603050405020304" pitchFamily="18" charset="0"/>
+                <a:cs typeface="Times New Roman" panose="02020603050405020304" pitchFamily="18" charset="0"/>
+              </a:rPr>
+              <a:t> incorrectly</a:t>
+            </a:r>
+            <a:endParaRPr lang="en-GB" sz="2000" dirty="0"/>
+          </a:p>
+        </p:txBody>
+      </p:sp>
+      <p:sp>
+        <p:nvSpPr>
+          <p:cNvPr id="7" name="TextBox 6">
+            <a:extLst>
+              <a:ext uri="{FF2B5EF4-FFF2-40B4-BE49-F238E27FC236}">
+                <a16:creationId xmlns="" xmlns:a16="http://schemas.microsoft.com/office/drawing/2014/main" id="{438442CF-1B82-4A10-87A1-614331CA498E}"/>
+              </a:ext>
+            </a:extLst>
+          </p:cNvPr>
+          <p:cNvSpPr txBox="1"/>
+          <p:nvPr/>
+        </p:nvSpPr>
+        <p:spPr>
+          <a:xfrm>
+            <a:off x="1019114" y="3064056"/>
+            <a:ext cx="10153772" cy="707886"/>
+          </a:xfrm>
+          <a:prstGeom prst="rect">
+            <a:avLst/>
+          </a:prstGeom>
+          <a:solidFill>
+            <a:schemeClr val="accent2">
+              <a:lumMod val="40000"/>
+              <a:lumOff val="60000"/>
+            </a:schemeClr>
+          </a:solidFill>
+        </p:spPr>
+        <p:txBody>
+          <a:bodyPr wrap="square" rtlCol="0">
+            <a:spAutoFit/>
+          </a:bodyPr>
+          <a:lstStyle/>
+          <a:p>
+            <a:r>
+              <a:rPr lang="en-GB" sz="2000" dirty="0" smtClean="0">
+                <a:latin typeface="Times New Roman" panose="02020603050405020304" pitchFamily="18" charset="0"/>
+                <a:cs typeface="Times New Roman" panose="02020603050405020304" pitchFamily="18" charset="0"/>
+              </a:rPr>
+              <a:t>Where</a:t>
+            </a:r>
+            <a:r>
+              <a:rPr lang="en-GB" sz="2000" b="1" dirty="0" smtClean="0">
+                <a:latin typeface="Times New Roman" panose="02020603050405020304" pitchFamily="18" charset="0"/>
+                <a:cs typeface="Times New Roman" panose="02020603050405020304" pitchFamily="18" charset="0"/>
+              </a:rPr>
+              <a:t> Q</a:t>
+            </a:r>
+            <a:r>
+              <a:rPr lang="en-GB" sz="2000" dirty="0" smtClean="0">
+                <a:latin typeface="Times New Roman" panose="02020603050405020304" pitchFamily="18" charset="0"/>
+                <a:cs typeface="Times New Roman" panose="02020603050405020304" pitchFamily="18" charset="0"/>
+              </a:rPr>
+              <a:t> is the </a:t>
+            </a:r>
+            <a:r>
+              <a:rPr lang="en-GB" sz="2000" b="1" dirty="0">
+                <a:latin typeface="Times New Roman" panose="02020603050405020304" pitchFamily="18" charset="0"/>
+                <a:cs typeface="Times New Roman" panose="02020603050405020304" pitchFamily="18" charset="0"/>
+              </a:rPr>
+              <a:t>PHRED</a:t>
+            </a:r>
+            <a:r>
+              <a:rPr lang="en-GB" sz="2000" dirty="0">
+                <a:latin typeface="Times New Roman" panose="02020603050405020304" pitchFamily="18" charset="0"/>
+                <a:cs typeface="Times New Roman" panose="02020603050405020304" pitchFamily="18" charset="0"/>
+              </a:rPr>
+              <a:t> </a:t>
+            </a:r>
+            <a:r>
+              <a:rPr lang="en-GB" sz="2000" b="1" dirty="0" smtClean="0">
+                <a:latin typeface="Times New Roman" panose="02020603050405020304" pitchFamily="18" charset="0"/>
+                <a:cs typeface="Times New Roman" panose="02020603050405020304" pitchFamily="18" charset="0"/>
+              </a:rPr>
+              <a:t>Score </a:t>
+            </a:r>
+            <a:r>
+              <a:rPr lang="en-GB" sz="2000" dirty="0" smtClean="0">
+                <a:latin typeface="Times New Roman" panose="02020603050405020304" pitchFamily="18" charset="0"/>
+                <a:cs typeface="Times New Roman" panose="02020603050405020304" pitchFamily="18" charset="0"/>
+              </a:rPr>
+              <a:t>for a given </a:t>
+            </a:r>
+            <a:r>
+              <a:rPr lang="en-GB" sz="2000" b="1" dirty="0" smtClean="0">
+                <a:latin typeface="Times New Roman" panose="02020603050405020304" pitchFamily="18" charset="0"/>
+                <a:cs typeface="Times New Roman" panose="02020603050405020304" pitchFamily="18" charset="0"/>
+              </a:rPr>
+              <a:t>Base Call </a:t>
+            </a:r>
+            <a:r>
+              <a:rPr lang="en-GB" sz="2000" dirty="0" smtClean="0">
+                <a:latin typeface="Times New Roman" panose="02020603050405020304" pitchFamily="18" charset="0"/>
+                <a:cs typeface="Times New Roman" panose="02020603050405020304" pitchFamily="18" charset="0"/>
+              </a:rPr>
+              <a:t>and </a:t>
+            </a:r>
+            <a:r>
+              <a:rPr lang="en-GB" sz="2000" b="1" dirty="0" smtClean="0">
+                <a:latin typeface="Times New Roman" panose="02020603050405020304" pitchFamily="18" charset="0"/>
+                <a:cs typeface="Times New Roman" panose="02020603050405020304" pitchFamily="18" charset="0"/>
+              </a:rPr>
+              <a:t>P </a:t>
+            </a:r>
+            <a:r>
+              <a:rPr lang="en-GB" sz="2000" dirty="0" smtClean="0">
+                <a:latin typeface="Times New Roman" panose="02020603050405020304" pitchFamily="18" charset="0"/>
+                <a:cs typeface="Times New Roman" panose="02020603050405020304" pitchFamily="18" charset="0"/>
+              </a:rPr>
+              <a:t>is the estimated </a:t>
+            </a:r>
+            <a:r>
+              <a:rPr lang="en-GB" sz="2000" b="1" dirty="0" smtClean="0">
+                <a:latin typeface="Times New Roman" panose="02020603050405020304" pitchFamily="18" charset="0"/>
+                <a:cs typeface="Times New Roman" panose="02020603050405020304" pitchFamily="18" charset="0"/>
+              </a:rPr>
+              <a:t>Probability of Error </a:t>
+            </a:r>
+            <a:r>
+              <a:rPr lang="en-GB" sz="2000" dirty="0" smtClean="0">
+                <a:latin typeface="Times New Roman" panose="02020603050405020304" pitchFamily="18" charset="0"/>
+                <a:cs typeface="Times New Roman" panose="02020603050405020304" pitchFamily="18" charset="0"/>
+              </a:rPr>
+              <a:t>for that </a:t>
+            </a:r>
+            <a:r>
+              <a:rPr lang="en-GB" sz="2000" b="1" dirty="0" smtClean="0">
+                <a:latin typeface="Times New Roman" panose="02020603050405020304" pitchFamily="18" charset="0"/>
+                <a:cs typeface="Times New Roman" panose="02020603050405020304" pitchFamily="18" charset="0"/>
+              </a:rPr>
+              <a:t>Base Call</a:t>
+            </a:r>
+            <a:r>
+              <a:rPr lang="en-GB" sz="2000" dirty="0" smtClean="0">
+                <a:latin typeface="Times New Roman" panose="02020603050405020304" pitchFamily="18" charset="0"/>
+                <a:cs typeface="Times New Roman" panose="02020603050405020304" pitchFamily="18" charset="0"/>
+              </a:rPr>
+              <a:t>, the following formula applies:</a:t>
+            </a:r>
+          </a:p>
+        </p:txBody>
+      </p:sp>
+      <p:sp>
+        <p:nvSpPr>
+          <p:cNvPr id="3" name="AutoShape 2" descr="Q=-10\ \log _{{10}}P"/>
+          <p:cNvSpPr>
+            <a:spLocks noChangeAspect="1" noChangeArrowheads="1"/>
+          </p:cNvSpPr>
+          <p:nvPr/>
+        </p:nvSpPr>
+        <p:spPr bwMode="auto">
+          <a:xfrm>
+            <a:off x="6313955" y="-144463"/>
+            <a:ext cx="304800" cy="304801"/>
+          </a:xfrm>
+          <a:prstGeom prst="rect">
+            <a:avLst/>
+          </a:prstGeom>
+          <a:noFill/>
+          <a:extLst>
+            <a:ext uri="{909E8E84-426E-40DD-AFC4-6F175D3DCCD1}">
+              <a14:hiddenFill xmlns:a14="http://schemas.microsoft.com/office/drawing/2010/main">
+                <a:solidFill>
+                  <a:srgbClr val="FFFFFF"/>
+                </a:solidFill>
+              </a14:hiddenFill>
+            </a:ext>
+          </a:extLst>
+        </p:spPr>
+        <p:txBody>
+          <a:bodyPr vert="horz" wrap="square" lIns="91440" tIns="45720" rIns="91440" bIns="45720" numCol="1" anchor="t" anchorCtr="0" compatLnSpc="1">
+            <a:prstTxWarp prst="textNoShape">
+              <a:avLst/>
+            </a:prstTxWarp>
+          </a:bodyPr>
+          <a:lstStyle/>
+          <a:p>
+            <a:endParaRPr lang="en-GB"/>
+          </a:p>
+        </p:txBody>
+      </p:sp>
+      <p:sp>
+        <p:nvSpPr>
+          <p:cNvPr id="9" name="AutoShape 4" descr="Q=-10\ \log _{{10}}P"/>
+          <p:cNvSpPr>
+            <a:spLocks noChangeAspect="1" noChangeArrowheads="1"/>
+          </p:cNvSpPr>
+          <p:nvPr/>
+        </p:nvSpPr>
+        <p:spPr bwMode="auto">
+          <a:xfrm>
+            <a:off x="6313955" y="7937"/>
+            <a:ext cx="304800" cy="304801"/>
+          </a:xfrm>
+          <a:prstGeom prst="rect">
+            <a:avLst/>
+          </a:prstGeom>
+          <a:noFill/>
+          <a:extLst>
+            <a:ext uri="{909E8E84-426E-40DD-AFC4-6F175D3DCCD1}">
+              <a14:hiddenFill xmlns:a14="http://schemas.microsoft.com/office/drawing/2010/main">
+                <a:solidFill>
+                  <a:srgbClr val="FFFFFF"/>
+                </a:solidFill>
+              </a14:hiddenFill>
+            </a:ext>
+          </a:extLst>
+        </p:spPr>
+        <p:txBody>
+          <a:bodyPr vert="horz" wrap="square" lIns="91440" tIns="45720" rIns="91440" bIns="45720" numCol="1" anchor="t" anchorCtr="0" compatLnSpc="1">
+            <a:prstTxWarp prst="textNoShape">
+              <a:avLst/>
+            </a:prstTxWarp>
+          </a:bodyPr>
+          <a:lstStyle/>
+          <a:p>
+            <a:endParaRPr lang="en-GB"/>
+          </a:p>
+        </p:txBody>
+      </p:sp>
+      <p:sp>
+        <p:nvSpPr>
+          <p:cNvPr id="10" name="TextBox 9">
+            <a:extLst>
+              <a:ext uri="{FF2B5EF4-FFF2-40B4-BE49-F238E27FC236}">
+                <a16:creationId xmlns="" xmlns:a16="http://schemas.microsoft.com/office/drawing/2014/main" id="{438442CF-1B82-4A10-87A1-614331CA498E}"/>
+              </a:ext>
+            </a:extLst>
+          </p:cNvPr>
+          <p:cNvSpPr txBox="1"/>
+          <p:nvPr/>
+        </p:nvSpPr>
+        <p:spPr>
+          <a:xfrm>
+            <a:off x="1808073" y="5451963"/>
+            <a:ext cx="5599641" cy="400110"/>
+          </a:xfrm>
+          <a:prstGeom prst="rect">
+            <a:avLst/>
+          </a:prstGeom>
+          <a:solidFill>
+            <a:schemeClr val="accent6">
+              <a:lumMod val="20000"/>
+              <a:lumOff val="80000"/>
+            </a:schemeClr>
+          </a:solidFill>
+        </p:spPr>
+        <p:txBody>
+          <a:bodyPr wrap="square" rtlCol="0">
+            <a:spAutoFit/>
+          </a:bodyPr>
+          <a:lstStyle/>
+          <a:p>
+            <a:r>
+              <a:rPr lang="en-GB" sz="2000" b="1" dirty="0" smtClean="0">
+                <a:latin typeface="Times New Roman" panose="02020603050405020304" pitchFamily="18" charset="0"/>
+                <a:cs typeface="Times New Roman" panose="02020603050405020304" pitchFamily="18" charset="0"/>
+              </a:rPr>
+              <a:t>P</a:t>
+            </a:r>
+            <a:r>
+              <a:rPr lang="en-GB" sz="2000" dirty="0" smtClean="0">
+                <a:latin typeface="Times New Roman" panose="02020603050405020304" pitchFamily="18" charset="0"/>
+                <a:cs typeface="Times New Roman" panose="02020603050405020304" pitchFamily="18" charset="0"/>
+              </a:rPr>
+              <a:t> is a </a:t>
+            </a:r>
+            <a:r>
+              <a:rPr lang="en-GB" sz="2000" b="1" dirty="0" smtClean="0">
+                <a:latin typeface="Times New Roman" panose="02020603050405020304" pitchFamily="18" charset="0"/>
+                <a:cs typeface="Times New Roman" panose="02020603050405020304" pitchFamily="18" charset="0"/>
+              </a:rPr>
+              <a:t>Probability</a:t>
+            </a:r>
+            <a:r>
+              <a:rPr lang="en-GB" sz="2000" dirty="0" smtClean="0">
+                <a:latin typeface="Times New Roman" panose="02020603050405020304" pitchFamily="18" charset="0"/>
+                <a:cs typeface="Times New Roman" panose="02020603050405020304" pitchFamily="18" charset="0"/>
+              </a:rPr>
+              <a:t> and so has </a:t>
+            </a:r>
+            <a:r>
+              <a:rPr lang="en-GB" sz="2000" b="1" dirty="0" smtClean="0">
+                <a:latin typeface="Times New Roman" panose="02020603050405020304" pitchFamily="18" charset="0"/>
+                <a:cs typeface="Times New Roman" panose="02020603050405020304" pitchFamily="18" charset="0"/>
+              </a:rPr>
+              <a:t>Range</a:t>
+            </a:r>
+            <a:r>
+              <a:rPr lang="en-GB" sz="2000" dirty="0" smtClean="0">
+                <a:latin typeface="Times New Roman" panose="02020603050405020304" pitchFamily="18" charset="0"/>
+                <a:cs typeface="Times New Roman" panose="02020603050405020304" pitchFamily="18" charset="0"/>
+              </a:rPr>
+              <a:t> </a:t>
+            </a:r>
+            <a:r>
+              <a:rPr lang="en-GB" sz="2000" b="1" dirty="0" smtClean="0">
+                <a:latin typeface="Times New Roman" panose="02020603050405020304" pitchFamily="18" charset="0"/>
+                <a:cs typeface="Times New Roman" panose="02020603050405020304" pitchFamily="18" charset="0"/>
+              </a:rPr>
+              <a:t>0 </a:t>
+            </a:r>
+            <a:r>
+              <a:rPr lang="en-GB" sz="2000" b="1" dirty="0" smtClean="0">
+                <a:latin typeface="Times New Roman" panose="02020603050405020304" pitchFamily="18" charset="0"/>
+                <a:cs typeface="Times New Roman" panose="02020603050405020304" pitchFamily="18" charset="0"/>
+                <a:sym typeface="Wingdings" panose="05000000000000000000" pitchFamily="2" charset="2"/>
+              </a:rPr>
+              <a:t></a:t>
+            </a:r>
+            <a:r>
+              <a:rPr lang="en-GB" sz="2000" b="1" dirty="0" smtClean="0">
+                <a:latin typeface="Times New Roman" panose="02020603050405020304" pitchFamily="18" charset="0"/>
+                <a:cs typeface="Times New Roman" panose="02020603050405020304" pitchFamily="18" charset="0"/>
+              </a:rPr>
+              <a:t> 1</a:t>
+            </a:r>
+            <a:endParaRPr lang="en-GB" sz="2000" b="1" dirty="0"/>
+          </a:p>
+        </p:txBody>
+      </p:sp>
+      <p:sp>
+        <p:nvSpPr>
+          <p:cNvPr id="11" name="TextBox 10">
+            <a:extLst>
+              <a:ext uri="{FF2B5EF4-FFF2-40B4-BE49-F238E27FC236}">
+                <a16:creationId xmlns="" xmlns:a16="http://schemas.microsoft.com/office/drawing/2014/main" id="{438442CF-1B82-4A10-87A1-614331CA498E}"/>
+              </a:ext>
+            </a:extLst>
+          </p:cNvPr>
+          <p:cNvSpPr txBox="1"/>
+          <p:nvPr/>
+        </p:nvSpPr>
+        <p:spPr>
+          <a:xfrm>
+            <a:off x="1797404" y="6184253"/>
+            <a:ext cx="5620978" cy="400110"/>
+          </a:xfrm>
+          <a:prstGeom prst="rect">
+            <a:avLst/>
+          </a:prstGeom>
+          <a:solidFill>
+            <a:schemeClr val="accent6">
+              <a:lumMod val="20000"/>
+              <a:lumOff val="80000"/>
+            </a:schemeClr>
+          </a:solidFill>
+        </p:spPr>
+        <p:txBody>
+          <a:bodyPr wrap="square" rtlCol="0">
+            <a:spAutoFit/>
+          </a:bodyPr>
+          <a:lstStyle/>
+          <a:p>
+            <a:r>
+              <a:rPr lang="en-GB" sz="2000" b="1" dirty="0">
+                <a:latin typeface="Times New Roman" panose="02020603050405020304" pitchFamily="18" charset="0"/>
+                <a:cs typeface="Times New Roman" panose="02020603050405020304" pitchFamily="18" charset="0"/>
+              </a:rPr>
+              <a:t>Q</a:t>
+            </a:r>
+            <a:r>
+              <a:rPr lang="en-GB" sz="2000" dirty="0" smtClean="0">
+                <a:latin typeface="Times New Roman" panose="02020603050405020304" pitchFamily="18" charset="0"/>
+                <a:cs typeface="Times New Roman" panose="02020603050405020304" pitchFamily="18" charset="0"/>
+              </a:rPr>
+              <a:t> is a function of </a:t>
+            </a:r>
+            <a:r>
+              <a:rPr lang="en-GB" sz="2000" b="1" dirty="0" smtClean="0">
+                <a:latin typeface="Times New Roman" panose="02020603050405020304" pitchFamily="18" charset="0"/>
+                <a:cs typeface="Times New Roman" panose="02020603050405020304" pitchFamily="18" charset="0"/>
+              </a:rPr>
+              <a:t>P</a:t>
+            </a:r>
+            <a:r>
+              <a:rPr lang="en-GB" sz="2000" dirty="0" smtClean="0">
+                <a:latin typeface="Times New Roman" panose="02020603050405020304" pitchFamily="18" charset="0"/>
+                <a:cs typeface="Times New Roman" panose="02020603050405020304" pitchFamily="18" charset="0"/>
+              </a:rPr>
+              <a:t> that has </a:t>
+            </a:r>
+            <a:r>
+              <a:rPr lang="en-GB" sz="2000" b="1" dirty="0" smtClean="0">
+                <a:latin typeface="Times New Roman" panose="02020603050405020304" pitchFamily="18" charset="0"/>
+                <a:cs typeface="Times New Roman" panose="02020603050405020304" pitchFamily="18" charset="0"/>
+              </a:rPr>
+              <a:t>Range</a:t>
+            </a:r>
+            <a:r>
+              <a:rPr lang="en-GB" sz="2000" dirty="0" smtClean="0">
+                <a:latin typeface="Times New Roman" panose="02020603050405020304" pitchFamily="18" charset="0"/>
+                <a:cs typeface="Times New Roman" panose="02020603050405020304" pitchFamily="18" charset="0"/>
+              </a:rPr>
+              <a:t> </a:t>
+            </a:r>
+            <a:r>
+              <a:rPr lang="en-GB" sz="2000" b="1" dirty="0" smtClean="0">
+                <a:latin typeface="Times New Roman" panose="02020603050405020304" pitchFamily="18" charset="0"/>
+                <a:cs typeface="Times New Roman" panose="02020603050405020304" pitchFamily="18" charset="0"/>
+              </a:rPr>
+              <a:t> 0 </a:t>
+            </a:r>
+            <a:r>
+              <a:rPr lang="en-GB" sz="2000" b="1" dirty="0" smtClean="0">
+                <a:latin typeface="Times New Roman" panose="02020603050405020304" pitchFamily="18" charset="0"/>
+                <a:cs typeface="Times New Roman" panose="02020603050405020304" pitchFamily="18" charset="0"/>
+                <a:sym typeface="Wingdings" panose="05000000000000000000" pitchFamily="2" charset="2"/>
+              </a:rPr>
+              <a:t></a:t>
+            </a:r>
+            <a:r>
+              <a:rPr lang="en-GB" sz="2000" b="1" dirty="0" smtClean="0">
+                <a:latin typeface="Times New Roman" panose="02020603050405020304" pitchFamily="18" charset="0"/>
+                <a:cs typeface="Times New Roman" panose="02020603050405020304" pitchFamily="18" charset="0"/>
+              </a:rPr>
+              <a:t> infinity</a:t>
+            </a:r>
+            <a:r>
+              <a:rPr lang="en-GB" sz="2000" dirty="0" smtClean="0">
+                <a:latin typeface="Times New Roman" panose="02020603050405020304" pitchFamily="18" charset="0"/>
+                <a:cs typeface="Times New Roman" panose="02020603050405020304" pitchFamily="18" charset="0"/>
+              </a:rPr>
+              <a:t>.</a:t>
+            </a:r>
+            <a:endParaRPr lang="en-GB" sz="2000" dirty="0"/>
+          </a:p>
+        </p:txBody>
+      </p:sp>
+      <p:sp>
+        <p:nvSpPr>
+          <p:cNvPr id="12" name="TextBox 11">
+            <a:extLst>
+              <a:ext uri="{FF2B5EF4-FFF2-40B4-BE49-F238E27FC236}">
+                <a16:creationId xmlns="" xmlns:a16="http://schemas.microsoft.com/office/drawing/2014/main" id="{438442CF-1B82-4A10-87A1-614331CA498E}"/>
+              </a:ext>
+            </a:extLst>
+          </p:cNvPr>
+          <p:cNvSpPr txBox="1"/>
+          <p:nvPr/>
+        </p:nvSpPr>
+        <p:spPr>
+          <a:xfrm>
+            <a:off x="1765004" y="4104121"/>
+            <a:ext cx="8661992" cy="1015663"/>
+          </a:xfrm>
+          <a:prstGeom prst="rect">
+            <a:avLst/>
+          </a:prstGeom>
+          <a:solidFill>
+            <a:srgbClr val="FFFF00"/>
+          </a:solidFill>
+        </p:spPr>
+        <p:txBody>
+          <a:bodyPr wrap="square" rtlCol="0">
+            <a:spAutoFit/>
+          </a:bodyPr>
+          <a:lstStyle/>
+          <a:p>
+            <a:pPr algn="ctr"/>
+            <a:r>
+              <a:rPr lang="en-GB" sz="6000" b="1" dirty="0" smtClean="0">
+                <a:latin typeface="Courier New" panose="02070309020205020404" pitchFamily="49" charset="0"/>
+                <a:cs typeface="Courier New" panose="02070309020205020404" pitchFamily="49" charset="0"/>
+              </a:rPr>
+              <a:t>Q =  -10 * log</a:t>
+            </a:r>
+            <a:r>
+              <a:rPr lang="en-GB" sz="6000" b="1" baseline="-25000" dirty="0" smtClean="0">
+                <a:latin typeface="Courier New" panose="02070309020205020404" pitchFamily="49" charset="0"/>
+                <a:cs typeface="Courier New" panose="02070309020205020404" pitchFamily="49" charset="0"/>
+              </a:rPr>
+              <a:t>10</a:t>
+            </a:r>
+            <a:r>
+              <a:rPr lang="en-GB" sz="6000" b="1" dirty="0" smtClean="0">
+                <a:latin typeface="Courier New" panose="02070309020205020404" pitchFamily="49" charset="0"/>
+                <a:cs typeface="Courier New" panose="02070309020205020404" pitchFamily="49" charset="0"/>
+              </a:rPr>
+              <a:t>(P)</a:t>
+            </a:r>
+            <a:endParaRPr lang="en-GB" sz="6000" b="1" dirty="0">
+              <a:latin typeface="Courier New" panose="02070309020205020404" pitchFamily="49" charset="0"/>
+              <a:cs typeface="Courier New" panose="02070309020205020404" pitchFamily="49" charset="0"/>
+            </a:endParaRPr>
+          </a:p>
+        </p:txBody>
+      </p:sp>
+      <p:sp>
+        <p:nvSpPr>
+          <p:cNvPr id="13" name="TextBox 12">
+            <a:extLst>
+              <a:ext uri="{FF2B5EF4-FFF2-40B4-BE49-F238E27FC236}">
+                <a16:creationId xmlns="" xmlns:a16="http://schemas.microsoft.com/office/drawing/2014/main" id="{E43AF4C5-CF5B-4E7E-B438-83CD70BE1265}"/>
+              </a:ext>
+            </a:extLst>
+          </p:cNvPr>
+          <p:cNvSpPr txBox="1"/>
+          <p:nvPr/>
+        </p:nvSpPr>
+        <p:spPr>
+          <a:xfrm>
+            <a:off x="2008528" y="0"/>
+            <a:ext cx="8174945" cy="729430"/>
+          </a:xfrm>
+          <a:prstGeom prst="rect">
+            <a:avLst/>
+          </a:prstGeom>
+          <a:solidFill>
+            <a:srgbClr val="FF0000"/>
+          </a:solidFill>
+        </p:spPr>
+        <p:txBody>
+          <a:bodyPr wrap="square" rtlCol="0" anchor="ctr">
+            <a:spAutoFit/>
+          </a:bodyPr>
+          <a:lstStyle/>
+          <a:p>
+            <a:pPr algn="ctr">
+              <a:lnSpc>
+                <a:spcPct val="115000"/>
+              </a:lnSpc>
+              <a:spcAft>
+                <a:spcPts val="1000"/>
+              </a:spcAft>
+            </a:pPr>
+            <a:r>
+              <a:rPr lang="en-GB" sz="3600" b="1" u="sng" dirty="0">
+                <a:solidFill>
+                  <a:srgbClr val="EEECE1"/>
+                </a:solidFill>
+                <a:highlight>
+                  <a:srgbClr val="FF0000"/>
+                </a:highlight>
+                <a:latin typeface="Courier New" pitchFamily="49" charset="0"/>
+                <a:ea typeface="Calibri"/>
+                <a:cs typeface="Courier New" pitchFamily="49" charset="0"/>
+              </a:rPr>
+              <a:t>Base </a:t>
+            </a:r>
+            <a:r>
+              <a:rPr lang="en-GB" sz="3600" b="1" u="sng" dirty="0" smtClean="0">
+                <a:solidFill>
+                  <a:schemeClr val="bg2"/>
+                </a:solidFill>
+                <a:highlight>
+                  <a:srgbClr val="FF0000"/>
+                </a:highlight>
+                <a:latin typeface="Courier New" pitchFamily="49" charset="0"/>
+                <a:ea typeface="Calibri"/>
+                <a:cs typeface="Courier New" pitchFamily="49" charset="0"/>
+              </a:rPr>
+              <a:t>Quality (</a:t>
+            </a:r>
+            <a:r>
+              <a:rPr lang="en-GB" sz="3600" dirty="0" smtClean="0">
+                <a:solidFill>
+                  <a:schemeClr val="bg2"/>
+                </a:solidFill>
+                <a:latin typeface="Times New Roman" panose="02020603050405020304" pitchFamily="18" charset="0"/>
+                <a:cs typeface="Times New Roman" panose="02020603050405020304" pitchFamily="18" charset="0"/>
+              </a:rPr>
+              <a:t> </a:t>
+            </a:r>
+            <a:r>
+              <a:rPr lang="en-GB" sz="3600" b="1" dirty="0" smtClean="0">
+                <a:solidFill>
+                  <a:schemeClr val="bg2"/>
+                </a:solidFill>
+                <a:latin typeface="Times New Roman" panose="02020603050405020304" pitchFamily="18" charset="0"/>
+                <a:cs typeface="Times New Roman" panose="02020603050405020304" pitchFamily="18" charset="0"/>
+                <a:hlinkClick r:id="rId2"/>
+              </a:rPr>
+              <a:t>PHRED</a:t>
+            </a:r>
+            <a:r>
+              <a:rPr lang="en-GB" sz="3600" b="1" dirty="0" smtClean="0">
+                <a:solidFill>
+                  <a:schemeClr val="bg2"/>
+                </a:solidFill>
+                <a:latin typeface="Times New Roman" panose="02020603050405020304" pitchFamily="18" charset="0"/>
+                <a:cs typeface="Times New Roman" panose="02020603050405020304" pitchFamily="18" charset="0"/>
+              </a:rPr>
+              <a:t>)</a:t>
+            </a:r>
+            <a:r>
+              <a:rPr lang="en-GB" sz="3600" dirty="0" smtClean="0">
+                <a:solidFill>
+                  <a:schemeClr val="bg2"/>
+                </a:solidFill>
+                <a:latin typeface="Times New Roman" panose="02020603050405020304" pitchFamily="18" charset="0"/>
+                <a:cs typeface="Times New Roman" panose="02020603050405020304" pitchFamily="18" charset="0"/>
+              </a:rPr>
+              <a:t> </a:t>
+            </a:r>
+            <a:r>
+              <a:rPr lang="en-GB" sz="3600" b="1" u="sng" dirty="0" smtClean="0">
+                <a:solidFill>
+                  <a:schemeClr val="bg2"/>
+                </a:solidFill>
+                <a:highlight>
+                  <a:srgbClr val="FF0000"/>
+                </a:highlight>
+                <a:latin typeface="Courier New" pitchFamily="49" charset="0"/>
+                <a:ea typeface="Calibri"/>
+                <a:cs typeface="Courier New" pitchFamily="49" charset="0"/>
+              </a:rPr>
+              <a:t> </a:t>
+            </a:r>
+            <a:r>
+              <a:rPr lang="en-GB" sz="3600" b="1" u="sng" dirty="0">
+                <a:solidFill>
+                  <a:schemeClr val="bg2"/>
+                </a:solidFill>
+                <a:highlight>
+                  <a:srgbClr val="FF0000"/>
+                </a:highlight>
+                <a:latin typeface="Courier New" pitchFamily="49" charset="0"/>
+                <a:ea typeface="Calibri"/>
+                <a:cs typeface="Courier New" pitchFamily="49" charset="0"/>
+              </a:rPr>
+              <a:t>Scores</a:t>
+            </a:r>
+            <a:endParaRPr lang="en-GB" sz="3600" dirty="0">
+              <a:solidFill>
+                <a:schemeClr val="bg2"/>
+              </a:solidFill>
+              <a:latin typeface="Courier New" pitchFamily="49" charset="0"/>
+              <a:ea typeface="Calibri"/>
+              <a:cs typeface="Courier New" pitchFamily="49" charset="0"/>
+            </a:endParaRPr>
+          </a:p>
+        </p:txBody>
+      </p:sp>
+    </p:spTree>
+    <p:extLst>
+      <p:ext uri="{BB962C8B-B14F-4D97-AF65-F5344CB8AC3E}">
+        <p14:creationId xmlns:p14="http://schemas.microsoft.com/office/powerpoint/2010/main" val="48111093"/>
+      </p:ext>
+    </p:extLst>
+  </p:cSld>
+  <p:clrMapOvr>
+    <a:masterClrMapping/>
+  </p:clrMapOvr>
+  <p:timing>
+    <p:tnLst>
+      <p:par>
+        <p:cTn id="1" dur="indefinite" restart="never" nodeType="tmRoot">
+          <p:childTnLst>
+            <p:seq concurrent="1" nextAc="seek">
+              <p:cTn id="2" dur="indefinite" nodeType="mainSeq">
+                <p:childTnLst>
+                  <p:par>
+                    <p:cTn id="3" fill="hold">
+                      <p:stCondLst>
+                        <p:cond delay="indefinite"/>
+                        <p:cond evt="onBegin" delay="0">
+                          <p:tn val="2"/>
+                        </p:cond>
+                      </p:stCondLst>
+                      <p:childTnLst>
+                        <p:par>
+                          <p:cTn id="4" fill="hold">
+                            <p:stCondLst>
+                              <p:cond delay="0"/>
+                            </p:stCondLst>
+                            <p:childTnLst>
+                              <p:par>
+                                <p:cTn id="5" presetID="22" presetClass="entr" presetSubtype="8" fill="hold" grpId="1" nodeType="afterEffect">
+                                  <p:stCondLst>
+                                    <p:cond delay="0"/>
+                                  </p:stCondLst>
+                                  <p:childTnLst>
+                                    <p:set>
+                                      <p:cBhvr>
+                                        <p:cTn id="6" dur="1" fill="hold">
+                                          <p:stCondLst>
+                                            <p:cond delay="0"/>
+                                          </p:stCondLst>
+                                        </p:cTn>
+                                        <p:tgtEl>
+                                          <p:spTgt spid="4"/>
+                                        </p:tgtEl>
+                                        <p:attrNameLst>
+                                          <p:attrName>style.visibility</p:attrName>
+                                        </p:attrNameLst>
+                                      </p:cBhvr>
+                                      <p:to>
+                                        <p:strVal val="visible"/>
+                                      </p:to>
+                                    </p:set>
+                                    <p:animEffect transition="in" filter="wipe(left)">
+                                      <p:cBhvr>
+                                        <p:cTn id="7" dur="2300"/>
+                                        <p:tgtEl>
+                                          <p:spTgt spid="4"/>
+                                        </p:tgtEl>
+                                      </p:cBhvr>
+                                    </p:animEffect>
+                                  </p:childTnLst>
+                                </p:cTn>
+                              </p:par>
+                            </p:childTnLst>
+                          </p:cTn>
+                        </p:par>
+                      </p:childTnLst>
+                    </p:cTn>
+                  </p:par>
+                  <p:par>
+                    <p:cTn id="8" fill="hold">
+                      <p:stCondLst>
+                        <p:cond delay="indefinite"/>
+                      </p:stCondLst>
+                      <p:childTnLst>
+                        <p:par>
+                          <p:cTn id="9" fill="hold">
+                            <p:stCondLst>
+                              <p:cond delay="0"/>
+                            </p:stCondLst>
+                            <p:childTnLst>
+                              <p:par>
+                                <p:cTn id="10" presetID="22" presetClass="entr" presetSubtype="8" fill="hold" grpId="1" nodeType="clickEffect">
+                                  <p:stCondLst>
+                                    <p:cond delay="0"/>
+                                  </p:stCondLst>
+                                  <p:childTnLst>
+                                    <p:set>
+                                      <p:cBhvr>
+                                        <p:cTn id="11" dur="1" fill="hold">
+                                          <p:stCondLst>
+                                            <p:cond delay="0"/>
+                                          </p:stCondLst>
+                                        </p:cTn>
+                                        <p:tgtEl>
+                                          <p:spTgt spid="6"/>
+                                        </p:tgtEl>
+                                        <p:attrNameLst>
+                                          <p:attrName>style.visibility</p:attrName>
+                                        </p:attrNameLst>
+                                      </p:cBhvr>
+                                      <p:to>
+                                        <p:strVal val="visible"/>
+                                      </p:to>
+                                    </p:set>
+                                    <p:animEffect transition="in" filter="wipe(left)">
+                                      <p:cBhvr>
+                                        <p:cTn id="12" dur="2000"/>
+                                        <p:tgtEl>
+                                          <p:spTgt spid="6"/>
+                                        </p:tgtEl>
+                                      </p:cBhvr>
+                                    </p:animEffect>
+                                  </p:childTnLst>
+                                </p:cTn>
+                              </p:par>
+                              <p:par>
+                                <p:cTn id="13" presetID="9" presetClass="emph" presetSubtype="0" grpId="0" nodeType="withEffect">
+                                  <p:stCondLst>
+                                    <p:cond delay="0"/>
+                                  </p:stCondLst>
+                                  <p:childTnLst>
+                                    <p:set>
+                                      <p:cBhvr rctx="PPT">
+                                        <p:cTn id="14" dur="indefinite"/>
+                                        <p:tgtEl>
+                                          <p:spTgt spid="4"/>
+                                        </p:tgtEl>
+                                        <p:attrNameLst>
+                                          <p:attrName>style.opacity</p:attrName>
+                                        </p:attrNameLst>
+                                      </p:cBhvr>
+                                      <p:to>
+                                        <p:strVal val="0.25"/>
+                                      </p:to>
+                                    </p:set>
+                                    <p:animEffect filter="image" prLst="opacity: 0.25">
+                                      <p:cBhvr rctx="IE">
+                                        <p:cTn id="15" dur="indefinite"/>
+                                        <p:tgtEl>
+                                          <p:spTgt spid="4"/>
+                                        </p:tgtEl>
+                                      </p:cBhvr>
+                                    </p:animEffect>
+                                  </p:childTnLst>
+                                </p:cTn>
+                              </p:par>
+                            </p:childTnLst>
+                          </p:cTn>
+                        </p:par>
+                      </p:childTnLst>
+                    </p:cTn>
+                  </p:par>
+                  <p:par>
+                    <p:cTn id="16" fill="hold">
+                      <p:stCondLst>
+                        <p:cond delay="indefinite"/>
+                      </p:stCondLst>
+                      <p:childTnLst>
+                        <p:par>
+                          <p:cTn id="17" fill="hold">
+                            <p:stCondLst>
+                              <p:cond delay="0"/>
+                            </p:stCondLst>
+                            <p:childTnLst>
+                              <p:par>
+                                <p:cTn id="18" presetID="22" presetClass="entr" presetSubtype="8" fill="hold" grpId="1" nodeType="clickEffect">
+                                  <p:stCondLst>
+                                    <p:cond delay="0"/>
+                                  </p:stCondLst>
+                                  <p:childTnLst>
+                                    <p:set>
+                                      <p:cBhvr>
+                                        <p:cTn id="19" dur="1" fill="hold">
+                                          <p:stCondLst>
+                                            <p:cond delay="0"/>
+                                          </p:stCondLst>
+                                        </p:cTn>
+                                        <p:tgtEl>
+                                          <p:spTgt spid="7"/>
+                                        </p:tgtEl>
+                                        <p:attrNameLst>
+                                          <p:attrName>style.visibility</p:attrName>
+                                        </p:attrNameLst>
+                                      </p:cBhvr>
+                                      <p:to>
+                                        <p:strVal val="visible"/>
+                                      </p:to>
+                                    </p:set>
+                                    <p:animEffect transition="in" filter="wipe(left)">
+                                      <p:cBhvr>
+                                        <p:cTn id="20" dur="2000"/>
+                                        <p:tgtEl>
+                                          <p:spTgt spid="7"/>
+                                        </p:tgtEl>
+                                      </p:cBhvr>
+                                    </p:animEffect>
+                                  </p:childTnLst>
+                                </p:cTn>
+                              </p:par>
+                              <p:par>
+                                <p:cTn id="21" presetID="9" presetClass="emph" presetSubtype="0" grpId="0" nodeType="withEffect">
+                                  <p:stCondLst>
+                                    <p:cond delay="0"/>
+                                  </p:stCondLst>
+                                  <p:childTnLst>
+                                    <p:set>
+                                      <p:cBhvr rctx="PPT">
+                                        <p:cTn id="22" dur="indefinite"/>
+                                        <p:tgtEl>
+                                          <p:spTgt spid="6"/>
+                                        </p:tgtEl>
+                                        <p:attrNameLst>
+                                          <p:attrName>style.opacity</p:attrName>
+                                        </p:attrNameLst>
+                                      </p:cBhvr>
+                                      <p:to>
+                                        <p:strVal val="0.25"/>
+                                      </p:to>
+                                    </p:set>
+                                    <p:animEffect filter="image" prLst="opacity: 0.25">
+                                      <p:cBhvr rctx="IE">
+                                        <p:cTn id="23" dur="indefinite"/>
+                                        <p:tgtEl>
+                                          <p:spTgt spid="6"/>
+                                        </p:tgtEl>
+                                      </p:cBhvr>
+                                    </p:animEffect>
+                                  </p:childTnLst>
+                                </p:cTn>
+                              </p:par>
+                            </p:childTnLst>
+                          </p:cTn>
+                        </p:par>
+                        <p:par>
+                          <p:cTn id="24" fill="hold">
+                            <p:stCondLst>
+                              <p:cond delay="2000"/>
+                            </p:stCondLst>
+                            <p:childTnLst>
+                              <p:par>
+                                <p:cTn id="25" presetID="22" presetClass="entr" presetSubtype="8" fill="hold" grpId="0" nodeType="afterEffect">
+                                  <p:stCondLst>
+                                    <p:cond delay="0"/>
+                                  </p:stCondLst>
+                                  <p:childTnLst>
+                                    <p:set>
+                                      <p:cBhvr>
+                                        <p:cTn id="26" dur="1" fill="hold">
+                                          <p:stCondLst>
+                                            <p:cond delay="0"/>
+                                          </p:stCondLst>
+                                        </p:cTn>
+                                        <p:tgtEl>
+                                          <p:spTgt spid="12"/>
+                                        </p:tgtEl>
+                                        <p:attrNameLst>
+                                          <p:attrName>style.visibility</p:attrName>
+                                        </p:attrNameLst>
+                                      </p:cBhvr>
+                                      <p:to>
+                                        <p:strVal val="visible"/>
+                                      </p:to>
+                                    </p:set>
+                                    <p:animEffect transition="in" filter="wipe(left)">
+                                      <p:cBhvr>
+                                        <p:cTn id="27" dur="2000"/>
+                                        <p:tgtEl>
+                                          <p:spTgt spid="12"/>
+                                        </p:tgtEl>
+                                      </p:cBhvr>
+                                    </p:animEffect>
+                                  </p:childTnLst>
+                                </p:cTn>
+                              </p:par>
+                            </p:childTnLst>
+                          </p:cTn>
+                        </p:par>
+                      </p:childTnLst>
+                    </p:cTn>
+                  </p:par>
+                  <p:par>
+                    <p:cTn id="28" fill="hold">
+                      <p:stCondLst>
+                        <p:cond delay="indefinite"/>
+                      </p:stCondLst>
+                      <p:childTnLst>
+                        <p:par>
+                          <p:cTn id="29" fill="hold">
+                            <p:stCondLst>
+                              <p:cond delay="0"/>
+                            </p:stCondLst>
+                            <p:childTnLst>
+                              <p:par>
+                                <p:cTn id="30" presetID="22" presetClass="entr" presetSubtype="8" fill="hold" grpId="0" nodeType="clickEffect">
+                                  <p:stCondLst>
+                                    <p:cond delay="0"/>
+                                  </p:stCondLst>
+                                  <p:childTnLst>
+                                    <p:set>
+                                      <p:cBhvr>
+                                        <p:cTn id="31" dur="1" fill="hold">
+                                          <p:stCondLst>
+                                            <p:cond delay="0"/>
+                                          </p:stCondLst>
+                                        </p:cTn>
+                                        <p:tgtEl>
+                                          <p:spTgt spid="10"/>
+                                        </p:tgtEl>
+                                        <p:attrNameLst>
+                                          <p:attrName>style.visibility</p:attrName>
+                                        </p:attrNameLst>
+                                      </p:cBhvr>
+                                      <p:to>
+                                        <p:strVal val="visible"/>
+                                      </p:to>
+                                    </p:set>
+                                    <p:animEffect transition="in" filter="wipe(left)">
+                                      <p:cBhvr>
+                                        <p:cTn id="32" dur="2000"/>
+                                        <p:tgtEl>
+                                          <p:spTgt spid="10"/>
+                                        </p:tgtEl>
+                                      </p:cBhvr>
+                                    </p:animEffect>
+                                  </p:childTnLst>
+                                </p:cTn>
+                              </p:par>
+                              <p:par>
+                                <p:cTn id="33" presetID="9" presetClass="emph" presetSubtype="0" grpId="0" nodeType="withEffect">
+                                  <p:stCondLst>
+                                    <p:cond delay="0"/>
+                                  </p:stCondLst>
+                                  <p:childTnLst>
+                                    <p:set>
+                                      <p:cBhvr rctx="PPT">
+                                        <p:cTn id="34" dur="indefinite"/>
+                                        <p:tgtEl>
+                                          <p:spTgt spid="7"/>
+                                        </p:tgtEl>
+                                        <p:attrNameLst>
+                                          <p:attrName>style.opacity</p:attrName>
+                                        </p:attrNameLst>
+                                      </p:cBhvr>
+                                      <p:to>
+                                        <p:strVal val="0.25"/>
+                                      </p:to>
+                                    </p:set>
+                                    <p:animEffect filter="image" prLst="opacity: 0.25">
+                                      <p:cBhvr rctx="IE">
+                                        <p:cTn id="35" dur="indefinite"/>
+                                        <p:tgtEl>
+                                          <p:spTgt spid="7"/>
+                                        </p:tgtEl>
+                                      </p:cBhvr>
+                                    </p:animEffect>
+                                  </p:childTnLst>
+                                </p:cTn>
+                              </p:par>
+                            </p:childTnLst>
+                          </p:cTn>
+                        </p:par>
+                      </p:childTnLst>
+                    </p:cTn>
+                  </p:par>
+                  <p:par>
+                    <p:cTn id="36" fill="hold">
+                      <p:stCondLst>
+                        <p:cond delay="indefinite"/>
+                      </p:stCondLst>
+                      <p:childTnLst>
+                        <p:par>
+                          <p:cTn id="37" fill="hold">
+                            <p:stCondLst>
+                              <p:cond delay="0"/>
+                            </p:stCondLst>
+                            <p:childTnLst>
+                              <p:par>
+                                <p:cTn id="38" presetID="22" presetClass="entr" presetSubtype="8" fill="hold" grpId="0" nodeType="clickEffect">
+                                  <p:stCondLst>
+                                    <p:cond delay="0"/>
+                                  </p:stCondLst>
+                                  <p:childTnLst>
+                                    <p:set>
+                                      <p:cBhvr>
+                                        <p:cTn id="39" dur="1" fill="hold">
+                                          <p:stCondLst>
+                                            <p:cond delay="0"/>
+                                          </p:stCondLst>
+                                        </p:cTn>
+                                        <p:tgtEl>
+                                          <p:spTgt spid="11"/>
+                                        </p:tgtEl>
+                                        <p:attrNameLst>
+                                          <p:attrName>style.visibility</p:attrName>
+                                        </p:attrNameLst>
+                                      </p:cBhvr>
+                                      <p:to>
+                                        <p:strVal val="visible"/>
+                                      </p:to>
+                                    </p:set>
+                                    <p:animEffect transition="in" filter="wipe(left)">
+                                      <p:cBhvr>
+                                        <p:cTn id="40" dur="2000"/>
+                                        <p:tgtEl>
+                                          <p:spTgt spid="11"/>
+                                        </p:tgtEl>
+                                      </p:cBhvr>
+                                    </p:animEffect>
+                                  </p:childTnLst>
+                                </p:cTn>
+                              </p:par>
+                            </p:childTnLst>
+                          </p:cTn>
+                        </p:par>
+                      </p:childTnLst>
+                    </p:cTn>
+                  </p:par>
+                </p:childTnLst>
+              </p:cTn>
+              <p:prevCondLst>
+                <p:cond evt="onPrev" delay="0">
+                  <p:tgtEl>
+                    <p:sldTgt/>
+                  </p:tgtEl>
+                </p:cond>
+              </p:prevCondLst>
+              <p:nextCondLst>
+                <p:cond evt="onNext" delay="0">
+                  <p:tgtEl>
+                    <p:sldTgt/>
+                  </p:tgtEl>
+                </p:cond>
+              </p:nextCondLst>
+            </p:seq>
+          </p:childTnLst>
+        </p:cTn>
+      </p:par>
+    </p:tnLst>
+    <p:bldLst>
+      <p:bldP spid="4" grpId="0" animBg="1"/>
+      <p:bldP spid="4" grpId="1" animBg="1"/>
+      <p:bldP spid="6" grpId="0" animBg="1"/>
+      <p:bldP spid="6" grpId="1" animBg="1"/>
+      <p:bldP spid="7" grpId="0" animBg="1"/>
+      <p:bldP spid="7" grpId="1" animBg="1"/>
+      <p:bldP spid="10" grpId="0" animBg="1"/>
+      <p:bldP spid="11" grpId="0" animBg="1"/>
+      <p:bldP spid="12" grpId="0" animBg="1"/>
+    </p:bldLst>
+  </p:timing>
+</p:sld>
+</file>
+
+<file path=ppt/slides/slide12.xml><?xml version="1.0" encoding="utf-8"?>
 <p:sld xmlns:a="http://schemas.openxmlformats.org/drawingml/2006/main" xmlns:r="http://schemas.openxmlformats.org/officeDocument/2006/relationships" xmlns:p="http://schemas.openxmlformats.org/presentationml/2006/main">
   <p:cSld>
     <p:spTree>
@@ -6823,7 +8657,7 @@
 </p:sld>
 </file>
 
-<file path=ppt/slides/slide11.xml><?xml version="1.0" encoding="utf-8"?>
+<file path=ppt/slides/slide13.xml><?xml version="1.0" encoding="utf-8"?>
 <p:sld xmlns:a="http://schemas.openxmlformats.org/drawingml/2006/main" xmlns:r="http://schemas.openxmlformats.org/officeDocument/2006/relationships" xmlns:p="http://schemas.openxmlformats.org/presentationml/2006/main">
   <p:cSld>
     <p:spTree>
@@ -8271,7 +10105,7 @@
 </p:sld>
 </file>
 
-<file path=ppt/slides/slide12.xml><?xml version="1.0" encoding="utf-8"?>
+<file path=ppt/slides/slide14.xml><?xml version="1.0" encoding="utf-8"?>
 <p:sld xmlns:a="http://schemas.openxmlformats.org/drawingml/2006/main" xmlns:r="http://schemas.openxmlformats.org/officeDocument/2006/relationships" xmlns:p="http://schemas.openxmlformats.org/presentationml/2006/main">
   <p:cSld>
     <p:spTree>
@@ -10112,7 +11946,7 @@
 </p:sld>
 </file>
 
-<file path=ppt/slides/slide13.xml><?xml version="1.0" encoding="utf-8"?>
+<file path=ppt/slides/slide15.xml><?xml version="1.0" encoding="utf-8"?>
 <p:sld xmlns:a="http://schemas.openxmlformats.org/drawingml/2006/main" xmlns:r="http://schemas.openxmlformats.org/officeDocument/2006/relationships" xmlns:p="http://schemas.openxmlformats.org/presentationml/2006/main">
   <p:cSld>
     <p:spTree>
@@ -11465,7 +13299,7 @@
 </p:sld>
 </file>
 
-<file path=ppt/slides/slide14.xml><?xml version="1.0" encoding="utf-8"?>
+<file path=ppt/slides/slide16.xml><?xml version="1.0" encoding="utf-8"?>
 <p:sld xmlns:a="http://schemas.openxmlformats.org/drawingml/2006/main" xmlns:r="http://schemas.openxmlformats.org/officeDocument/2006/relationships" xmlns:p="http://schemas.openxmlformats.org/presentationml/2006/main">
   <p:cSld>
     <p:spTree>
@@ -12990,7 +14824,7 @@
 </p:sld>
 </file>
 
-<file path=ppt/slides/slide15.xml><?xml version="1.0" encoding="utf-8"?>
+<file path=ppt/slides/slide17.xml><?xml version="1.0" encoding="utf-8"?>
 <p:sld xmlns:a="http://schemas.openxmlformats.org/drawingml/2006/main" xmlns:r="http://schemas.openxmlformats.org/officeDocument/2006/relationships" xmlns:p="http://schemas.openxmlformats.org/presentationml/2006/main">
   <p:cSld>
     <p:spTree>
@@ -13828,14 +15662,7 @@
                 <a:latin typeface="Times New Roman" panose="02020603050405020304" pitchFamily="18" charset="0"/>
                 <a:cs typeface="Times New Roman" panose="02020603050405020304" pitchFamily="18" charset="0"/>
               </a:rPr>
-              <a:t>SUBTRACT </a:t>
-            </a:r>
-            <a:r>
-              <a:rPr lang="en-GB" sz="2000" b="1" i="1" u="sng" dirty="0" smtClean="0">
-                <a:latin typeface="Times New Roman" panose="02020603050405020304" pitchFamily="18" charset="0"/>
-                <a:cs typeface="Times New Roman" panose="02020603050405020304" pitchFamily="18" charset="0"/>
-              </a:rPr>
-              <a:t>33</a:t>
+              <a:t>SUBTRACT 33</a:t>
             </a:r>
             <a:r>
               <a:rPr lang="en-GB" sz="2000" dirty="0" smtClean="0">
@@ -14979,7 +16806,7 @@
 </p:sld>
 </file>
 
-<file path=ppt/slides/slide16.xml><?xml version="1.0" encoding="utf-8"?>
+<file path=ppt/slides/slide18.xml><?xml version="1.0" encoding="utf-8"?>
 <p:sld xmlns:a="http://schemas.openxmlformats.org/drawingml/2006/main" xmlns:r="http://schemas.openxmlformats.org/officeDocument/2006/relationships" xmlns:p="http://schemas.openxmlformats.org/presentationml/2006/main">
   <p:cSld>
     <p:spTree>
@@ -15216,21 +17043,7 @@
                 <a:latin typeface="Times New Roman" panose="02020603050405020304" pitchFamily="18" charset="0"/>
                 <a:cs typeface="Times New Roman" panose="02020603050405020304" pitchFamily="18" charset="0"/>
               </a:rPr>
-              <a:t>Long ago … </a:t>
-            </a:r>
-            <a:r>
-              <a:rPr lang="en-GB" dirty="0" smtClean="0">
-                <a:latin typeface="Times New Roman" panose="02020603050405020304" pitchFamily="18" charset="0"/>
-                <a:cs typeface="Times New Roman" panose="02020603050405020304" pitchFamily="18" charset="0"/>
-              </a:rPr>
-              <a:t>the </a:t>
-            </a:r>
-            <a:r>
-              <a:rPr lang="en-GB" dirty="0" smtClean="0">
-                <a:latin typeface="Times New Roman" panose="02020603050405020304" pitchFamily="18" charset="0"/>
-                <a:cs typeface="Times New Roman" panose="02020603050405020304" pitchFamily="18" charset="0"/>
-              </a:rPr>
-              <a:t>Sanger Centre coded </a:t>
+              <a:t>Long ago … the Sanger Centre coded </a:t>
             </a:r>
             <a:r>
               <a:rPr lang="en-GB" b="1" dirty="0" smtClean="0">
@@ -15328,35 +17141,21 @@
                 <a:latin typeface="Times New Roman" panose="02020603050405020304" pitchFamily="18" charset="0"/>
                 <a:cs typeface="Times New Roman" panose="02020603050405020304" pitchFamily="18" charset="0"/>
               </a:rPr>
-              <a:t> </a:t>
+              <a:t> instead of </a:t>
+            </a:r>
+            <a:r>
+              <a:rPr lang="en-GB" b="1" dirty="0" smtClean="0">
+                <a:latin typeface="Times New Roman" panose="02020603050405020304" pitchFamily="18" charset="0"/>
+                <a:cs typeface="Times New Roman" panose="02020603050405020304" pitchFamily="18" charset="0"/>
+              </a:rPr>
+              <a:t>33</a:t>
             </a:r>
             <a:r>
               <a:rPr lang="en-GB" dirty="0" smtClean="0">
                 <a:latin typeface="Times New Roman" panose="02020603050405020304" pitchFamily="18" charset="0"/>
                 <a:cs typeface="Times New Roman" panose="02020603050405020304" pitchFamily="18" charset="0"/>
               </a:rPr>
-              <a:t>instead of </a:t>
-            </a:r>
-            <a:r>
-              <a:rPr lang="en-GB" b="1" dirty="0" smtClean="0">
-                <a:latin typeface="Times New Roman" panose="02020603050405020304" pitchFamily="18" charset="0"/>
-                <a:cs typeface="Times New Roman" panose="02020603050405020304" pitchFamily="18" charset="0"/>
-              </a:rPr>
-              <a:t>33</a:t>
-            </a:r>
-            <a:r>
-              <a:rPr lang="en-GB" dirty="0" smtClean="0">
-                <a:latin typeface="Times New Roman" panose="02020603050405020304" pitchFamily="18" charset="0"/>
-                <a:cs typeface="Times New Roman" panose="02020603050405020304" pitchFamily="18" charset="0"/>
-              </a:rPr>
-              <a:t> </a:t>
-            </a:r>
-            <a:r>
-              <a:rPr lang="en-GB" dirty="0" smtClean="0">
-                <a:latin typeface="Times New Roman" panose="02020603050405020304" pitchFamily="18" charset="0"/>
-                <a:cs typeface="Times New Roman" panose="02020603050405020304" pitchFamily="18" charset="0"/>
-              </a:rPr>
-              <a:t>in order to compute the </a:t>
+              <a:t> in order to compute the </a:t>
             </a:r>
             <a:r>
               <a:rPr lang="en-GB" b="1" dirty="0" smtClean="0">
@@ -15878,7 +17677,7 @@
 </p:sld>
 </file>
 
-<file path=ppt/slides/slide17.xml><?xml version="1.0" encoding="utf-8"?>
+<file path=ppt/slides/slide19.xml><?xml version="1.0" encoding="utf-8"?>
 <p:sld xmlns:a="http://schemas.openxmlformats.org/drawingml/2006/main" xmlns:r="http://schemas.openxmlformats.org/officeDocument/2006/relationships" xmlns:p="http://schemas.openxmlformats.org/presentationml/2006/main">
   <p:cSld>
     <p:spTree>
@@ -16014,14 +17813,7 @@
                 <a:latin typeface="Courier New" panose="02070309020205020404" pitchFamily="49" charset="0"/>
                 <a:cs typeface="Courier New" panose="02070309020205020404" pitchFamily="49" charset="0"/>
               </a:rPr>
-              <a:t>Add </a:t>
-            </a:r>
-            <a:r>
-              <a:rPr lang="en-GB" sz="2400" b="1" dirty="0" smtClean="0">
-                <a:latin typeface="Courier New" panose="02070309020205020404" pitchFamily="49" charset="0"/>
-                <a:cs typeface="Courier New" panose="02070309020205020404" pitchFamily="49" charset="0"/>
-              </a:rPr>
-              <a:t>more Notes</a:t>
+              <a:t>Add more Notes</a:t>
             </a:r>
           </a:p>
           <a:p>
@@ -29815,9 +31607,645 @@
           <a:chExt cx="0" cy="0"/>
         </a:xfrm>
       </p:grpSpPr>
+      <p:pic>
+        <p:nvPicPr>
+          <p:cNvPr id="1026" name="Picture 2"/>
+          <p:cNvPicPr>
+            <a:picLocks noChangeAspect="1" noChangeArrowheads="1"/>
+          </p:cNvPicPr>
+          <p:nvPr/>
+        </p:nvPicPr>
+        <p:blipFill rotWithShape="1">
+          <a:blip r:embed="rId2">
+            <a:extLst>
+              <a:ext uri="{28A0092B-C50C-407E-A947-70E740481C1C}">
+                <a14:useLocalDpi xmlns:a14="http://schemas.microsoft.com/office/drawing/2010/main" val="0"/>
+              </a:ext>
+            </a:extLst>
+          </a:blip>
+          <a:srcRect r="638" b="1316"/>
+          <a:stretch/>
+        </p:blipFill>
+        <p:spPr bwMode="auto">
+          <a:xfrm>
+            <a:off x="1748112" y="3839944"/>
+            <a:ext cx="8892000" cy="2700000"/>
+          </a:xfrm>
+          <a:prstGeom prst="rect">
+            <a:avLst/>
+          </a:prstGeom>
+          <a:noFill/>
+          <a:ln>
+            <a:noFill/>
+          </a:ln>
+          <a:extLst>
+            <a:ext uri="{909E8E84-426E-40DD-AFC4-6F175D3DCCD1}">
+              <a14:hiddenFill xmlns:a14="http://schemas.microsoft.com/office/drawing/2010/main">
+                <a:solidFill>
+                  <a:schemeClr val="accent1"/>
+                </a:solidFill>
+              </a14:hiddenFill>
+            </a:ext>
+            <a:ext uri="{91240B29-F687-4F45-9708-019B960494DF}">
+              <a14:hiddenLine xmlns:a14="http://schemas.microsoft.com/office/drawing/2010/main" w="9525">
+                <a:solidFill>
+                  <a:schemeClr val="tx1"/>
+                </a:solidFill>
+                <a:miter lim="800000"/>
+                <a:headEnd/>
+                <a:tailEnd/>
+              </a14:hiddenLine>
+            </a:ext>
+          </a:extLst>
+        </p:spPr>
+      </p:pic>
       <p:sp>
         <p:nvSpPr>
-          <p:cNvPr id="14" name="TextBox 13">
+          <p:cNvPr id="6" name="TextBox 5">
+            <a:extLst>
+              <a:ext uri="{FF2B5EF4-FFF2-40B4-BE49-F238E27FC236}">
+                <a16:creationId xmlns="" xmlns:a16="http://schemas.microsoft.com/office/drawing/2014/main" id="{438442CF-1B82-4A10-87A1-614331CA498E}"/>
+              </a:ext>
+            </a:extLst>
+          </p:cNvPr>
+          <p:cNvSpPr txBox="1"/>
+          <p:nvPr/>
+        </p:nvSpPr>
+        <p:spPr>
+          <a:xfrm>
+            <a:off x="497592" y="891592"/>
+            <a:ext cx="7953436" cy="400110"/>
+          </a:xfrm>
+          <a:prstGeom prst="rect">
+            <a:avLst/>
+          </a:prstGeom>
+          <a:solidFill>
+            <a:schemeClr val="accent2">
+              <a:lumMod val="40000"/>
+              <a:lumOff val="60000"/>
+            </a:schemeClr>
+          </a:solidFill>
+        </p:spPr>
+        <p:txBody>
+          <a:bodyPr wrap="square" rtlCol="0">
+            <a:spAutoFit/>
+          </a:bodyPr>
+          <a:lstStyle/>
+          <a:p>
+            <a:r>
+              <a:rPr lang="en-GB" sz="2000" dirty="0" smtClean="0">
+                <a:latin typeface="Times New Roman" panose="02020603050405020304" pitchFamily="18" charset="0"/>
+                <a:cs typeface="Times New Roman" panose="02020603050405020304" pitchFamily="18" charset="0"/>
+              </a:rPr>
+              <a:t>With every </a:t>
+            </a:r>
+            <a:r>
+              <a:rPr lang="en-GB" sz="2000" b="1" dirty="0" smtClean="0">
+                <a:latin typeface="Times New Roman" panose="02020603050405020304" pitchFamily="18" charset="0"/>
+                <a:cs typeface="Times New Roman" panose="02020603050405020304" pitchFamily="18" charset="0"/>
+              </a:rPr>
+              <a:t>Base Call</a:t>
+            </a:r>
+            <a:r>
+              <a:rPr lang="en-GB" sz="2000" dirty="0" smtClean="0">
+                <a:latin typeface="Times New Roman" panose="02020603050405020304" pitchFamily="18" charset="0"/>
+                <a:cs typeface="Times New Roman" panose="02020603050405020304" pitchFamily="18" charset="0"/>
+              </a:rPr>
+              <a:t>, sequencing hardware generates a quality estimate (</a:t>
+            </a:r>
+            <a:r>
+              <a:rPr lang="en-GB" sz="2000" b="1" dirty="0" smtClean="0">
+                <a:latin typeface="Times New Roman" panose="02020603050405020304" pitchFamily="18" charset="0"/>
+                <a:cs typeface="Times New Roman" panose="02020603050405020304" pitchFamily="18" charset="0"/>
+              </a:rPr>
+              <a:t>P</a:t>
+            </a:r>
+            <a:r>
+              <a:rPr lang="en-GB" sz="2000" dirty="0" smtClean="0">
+                <a:latin typeface="Times New Roman" panose="02020603050405020304" pitchFamily="18" charset="0"/>
+                <a:cs typeface="Times New Roman" panose="02020603050405020304" pitchFamily="18" charset="0"/>
+              </a:rPr>
+              <a:t>)</a:t>
+            </a:r>
+            <a:endParaRPr lang="en-GB" sz="2000" dirty="0"/>
+          </a:p>
+        </p:txBody>
+      </p:sp>
+      <p:sp>
+        <p:nvSpPr>
+          <p:cNvPr id="7" name="TextBox 6">
+            <a:extLst>
+              <a:ext uri="{FF2B5EF4-FFF2-40B4-BE49-F238E27FC236}">
+                <a16:creationId xmlns="" xmlns:a16="http://schemas.microsoft.com/office/drawing/2014/main" id="{438442CF-1B82-4A10-87A1-614331CA498E}"/>
+              </a:ext>
+            </a:extLst>
+          </p:cNvPr>
+          <p:cNvSpPr txBox="1"/>
+          <p:nvPr/>
+        </p:nvSpPr>
+        <p:spPr>
+          <a:xfrm>
+            <a:off x="497592" y="1647229"/>
+            <a:ext cx="6481824" cy="400110"/>
+          </a:xfrm>
+          <a:prstGeom prst="rect">
+            <a:avLst/>
+          </a:prstGeom>
+          <a:solidFill>
+            <a:schemeClr val="accent2">
+              <a:lumMod val="40000"/>
+              <a:lumOff val="60000"/>
+            </a:schemeClr>
+          </a:solidFill>
+        </p:spPr>
+        <p:txBody>
+          <a:bodyPr wrap="square" rtlCol="0">
+            <a:spAutoFit/>
+          </a:bodyPr>
+          <a:lstStyle/>
+          <a:p>
+            <a:r>
+              <a:rPr lang="en-GB" sz="2000" b="1" dirty="0" smtClean="0">
+                <a:latin typeface="Times New Roman" panose="02020603050405020304" pitchFamily="18" charset="0"/>
+                <a:cs typeface="Times New Roman" panose="02020603050405020304" pitchFamily="18" charset="0"/>
+              </a:rPr>
+              <a:t>P</a:t>
+            </a:r>
+            <a:r>
+              <a:rPr lang="en-GB" sz="2000" dirty="0" smtClean="0">
+                <a:latin typeface="Times New Roman" panose="02020603050405020304" pitchFamily="18" charset="0"/>
+                <a:cs typeface="Times New Roman" panose="02020603050405020304" pitchFamily="18" charset="0"/>
+              </a:rPr>
+              <a:t> represents the </a:t>
+            </a:r>
+            <a:r>
+              <a:rPr lang="en-GB" sz="2000" b="1" dirty="0" smtClean="0">
+                <a:latin typeface="Times New Roman" panose="02020603050405020304" pitchFamily="18" charset="0"/>
+                <a:cs typeface="Times New Roman" panose="02020603050405020304" pitchFamily="18" charset="0"/>
+              </a:rPr>
+              <a:t>P</a:t>
+            </a:r>
+            <a:r>
+              <a:rPr lang="en-GB" sz="2000" dirty="0" smtClean="0">
+                <a:latin typeface="Times New Roman" panose="02020603050405020304" pitchFamily="18" charset="0"/>
+                <a:cs typeface="Times New Roman" panose="02020603050405020304" pitchFamily="18" charset="0"/>
+              </a:rPr>
+              <a:t>robability of the </a:t>
+            </a:r>
+            <a:r>
+              <a:rPr lang="en-GB" sz="2000" b="1" dirty="0" smtClean="0">
+                <a:latin typeface="Times New Roman" panose="02020603050405020304" pitchFamily="18" charset="0"/>
+                <a:cs typeface="Times New Roman" panose="02020603050405020304" pitchFamily="18" charset="0"/>
+              </a:rPr>
+              <a:t>Base Call </a:t>
+            </a:r>
+            <a:r>
+              <a:rPr lang="en-GB" sz="2000" dirty="0" smtClean="0">
+                <a:latin typeface="Times New Roman" panose="02020603050405020304" pitchFamily="18" charset="0"/>
+                <a:cs typeface="Times New Roman" panose="02020603050405020304" pitchFamily="18" charset="0"/>
+              </a:rPr>
+              <a:t>being incorrect </a:t>
+            </a:r>
+            <a:endParaRPr lang="en-GB" sz="2000" dirty="0"/>
+          </a:p>
+        </p:txBody>
+      </p:sp>
+      <p:sp>
+        <p:nvSpPr>
+          <p:cNvPr id="8" name="TextBox 7">
+            <a:extLst>
+              <a:ext uri="{FF2B5EF4-FFF2-40B4-BE49-F238E27FC236}">
+                <a16:creationId xmlns="" xmlns:a16="http://schemas.microsoft.com/office/drawing/2014/main" id="{438442CF-1B82-4A10-87A1-614331CA498E}"/>
+              </a:ext>
+            </a:extLst>
+          </p:cNvPr>
+          <p:cNvSpPr txBox="1"/>
+          <p:nvPr/>
+        </p:nvSpPr>
+        <p:spPr>
+          <a:xfrm>
+            <a:off x="497592" y="2402866"/>
+            <a:ext cx="10700291" cy="400110"/>
+          </a:xfrm>
+          <a:prstGeom prst="rect">
+            <a:avLst/>
+          </a:prstGeom>
+          <a:solidFill>
+            <a:schemeClr val="accent2">
+              <a:lumMod val="40000"/>
+              <a:lumOff val="60000"/>
+            </a:schemeClr>
+          </a:solidFill>
+        </p:spPr>
+        <p:txBody>
+          <a:bodyPr wrap="square" rtlCol="0">
+            <a:spAutoFit/>
+          </a:bodyPr>
+          <a:lstStyle/>
+          <a:p>
+            <a:r>
+              <a:rPr lang="en-GB" sz="2000" dirty="0" smtClean="0">
+                <a:latin typeface="Times New Roman" panose="02020603050405020304" pitchFamily="18" charset="0"/>
+                <a:cs typeface="Times New Roman" panose="02020603050405020304" pitchFamily="18" charset="0"/>
+              </a:rPr>
+              <a:t>For each </a:t>
+            </a:r>
+            <a:r>
+              <a:rPr lang="en-GB" sz="2000" b="1" dirty="0">
+                <a:latin typeface="Times New Roman" panose="02020603050405020304" pitchFamily="18" charset="0"/>
+                <a:cs typeface="Times New Roman" panose="02020603050405020304" pitchFamily="18" charset="0"/>
+              </a:rPr>
+              <a:t>Base Call </a:t>
+            </a:r>
+            <a:r>
+              <a:rPr lang="en-GB" sz="2000" dirty="0" smtClean="0">
+                <a:latin typeface="Times New Roman" panose="02020603050405020304" pitchFamily="18" charset="0"/>
+                <a:cs typeface="Times New Roman" panose="02020603050405020304" pitchFamily="18" charset="0"/>
+              </a:rPr>
+              <a:t>, </a:t>
+            </a:r>
+            <a:r>
+              <a:rPr lang="en-GB" sz="2000" b="1" dirty="0" smtClean="0">
+                <a:latin typeface="Times New Roman" panose="02020603050405020304" pitchFamily="18" charset="0"/>
+                <a:cs typeface="Times New Roman" panose="02020603050405020304" pitchFamily="18" charset="0"/>
+              </a:rPr>
+              <a:t>4</a:t>
+            </a:r>
+            <a:r>
+              <a:rPr lang="en-GB" sz="2000" dirty="0" smtClean="0">
+                <a:latin typeface="Times New Roman" panose="02020603050405020304" pitchFamily="18" charset="0"/>
+                <a:cs typeface="Times New Roman" panose="02020603050405020304" pitchFamily="18" charset="0"/>
+              </a:rPr>
+              <a:t> signals representing the possibilities of each possible </a:t>
+            </a:r>
+            <a:r>
+              <a:rPr lang="en-GB" sz="2000" b="1" dirty="0">
+                <a:latin typeface="Times New Roman" panose="02020603050405020304" pitchFamily="18" charset="0"/>
+                <a:cs typeface="Times New Roman" panose="02020603050405020304" pitchFamily="18" charset="0"/>
+              </a:rPr>
+              <a:t>Base </a:t>
+            </a:r>
+            <a:r>
+              <a:rPr lang="en-GB" sz="2000" b="1" dirty="0" smtClean="0">
+                <a:latin typeface="Times New Roman" panose="02020603050405020304" pitchFamily="18" charset="0"/>
+                <a:cs typeface="Times New Roman" panose="02020603050405020304" pitchFamily="18" charset="0"/>
+              </a:rPr>
+              <a:t>Value </a:t>
+            </a:r>
+            <a:r>
+              <a:rPr lang="en-GB" sz="2000" dirty="0" smtClean="0">
+                <a:latin typeface="Times New Roman" panose="02020603050405020304" pitchFamily="18" charset="0"/>
+                <a:cs typeface="Times New Roman" panose="02020603050405020304" pitchFamily="18" charset="0"/>
+              </a:rPr>
+              <a:t>are generated</a:t>
+            </a:r>
+          </a:p>
+        </p:txBody>
+      </p:sp>
+      <p:sp>
+        <p:nvSpPr>
+          <p:cNvPr id="9" name="TextBox 8">
+            <a:extLst>
+              <a:ext uri="{FF2B5EF4-FFF2-40B4-BE49-F238E27FC236}">
+                <a16:creationId xmlns="" xmlns:a16="http://schemas.microsoft.com/office/drawing/2014/main" id="{438442CF-1B82-4A10-87A1-614331CA498E}"/>
+              </a:ext>
+            </a:extLst>
+          </p:cNvPr>
+          <p:cNvSpPr txBox="1"/>
+          <p:nvPr/>
+        </p:nvSpPr>
+        <p:spPr>
+          <a:xfrm>
+            <a:off x="497592" y="3158502"/>
+            <a:ext cx="8082041" cy="400110"/>
+          </a:xfrm>
+          <a:prstGeom prst="rect">
+            <a:avLst/>
+          </a:prstGeom>
+          <a:solidFill>
+            <a:schemeClr val="accent2">
+              <a:lumMod val="40000"/>
+              <a:lumOff val="60000"/>
+            </a:schemeClr>
+          </a:solidFill>
+        </p:spPr>
+        <p:txBody>
+          <a:bodyPr wrap="square" rtlCol="0">
+            <a:spAutoFit/>
+          </a:bodyPr>
+          <a:lstStyle/>
+          <a:p>
+            <a:r>
+              <a:rPr lang="en-GB" sz="2000" dirty="0" smtClean="0">
+                <a:latin typeface="Times New Roman" panose="02020603050405020304" pitchFamily="18" charset="0"/>
+                <a:cs typeface="Times New Roman" panose="02020603050405020304" pitchFamily="18" charset="0"/>
+              </a:rPr>
+              <a:t>The value of </a:t>
+            </a:r>
+            <a:r>
+              <a:rPr lang="en-GB" sz="2000" b="1" dirty="0" smtClean="0">
+                <a:latin typeface="Times New Roman" panose="02020603050405020304" pitchFamily="18" charset="0"/>
+                <a:cs typeface="Times New Roman" panose="02020603050405020304" pitchFamily="18" charset="0"/>
+              </a:rPr>
+              <a:t>P</a:t>
+            </a:r>
+            <a:r>
+              <a:rPr lang="en-GB" sz="2000" dirty="0" smtClean="0">
+                <a:latin typeface="Times New Roman" panose="02020603050405020304" pitchFamily="18" charset="0"/>
+                <a:cs typeface="Times New Roman" panose="02020603050405020304" pitchFamily="18" charset="0"/>
+              </a:rPr>
+              <a:t> for a given </a:t>
+            </a:r>
+            <a:r>
+              <a:rPr lang="en-GB" sz="2000" b="1" dirty="0" smtClean="0">
+                <a:latin typeface="Times New Roman" panose="02020603050405020304" pitchFamily="18" charset="0"/>
+                <a:cs typeface="Times New Roman" panose="02020603050405020304" pitchFamily="18" charset="0"/>
+              </a:rPr>
+              <a:t>Base Call </a:t>
+            </a:r>
+            <a:r>
+              <a:rPr lang="en-GB" sz="2000" dirty="0" smtClean="0">
+                <a:latin typeface="Times New Roman" panose="02020603050405020304" pitchFamily="18" charset="0"/>
+                <a:cs typeface="Times New Roman" panose="02020603050405020304" pitchFamily="18" charset="0"/>
+              </a:rPr>
+              <a:t>reflects the clarity of associated signals </a:t>
+            </a:r>
+          </a:p>
+        </p:txBody>
+      </p:sp>
+      <p:sp>
+        <p:nvSpPr>
+          <p:cNvPr id="4" name="Rectangle 3"/>
+          <p:cNvSpPr/>
+          <p:nvPr/>
+        </p:nvSpPr>
+        <p:spPr>
+          <a:xfrm>
+            <a:off x="7241769" y="3839944"/>
+            <a:ext cx="2271718" cy="2700000"/>
+          </a:xfrm>
+          <a:prstGeom prst="rect">
+            <a:avLst/>
+          </a:prstGeom>
+          <a:solidFill>
+            <a:schemeClr val="accent2">
+              <a:lumMod val="75000"/>
+              <a:alpha val="15000"/>
+            </a:schemeClr>
+          </a:solidFill>
+        </p:spPr>
+        <p:style>
+          <a:lnRef idx="2">
+            <a:schemeClr val="accent1">
+              <a:shade val="50000"/>
+            </a:schemeClr>
+          </a:lnRef>
+          <a:fillRef idx="1">
+            <a:schemeClr val="accent1"/>
+          </a:fillRef>
+          <a:effectRef idx="0">
+            <a:schemeClr val="accent1"/>
+          </a:effectRef>
+          <a:fontRef idx="minor">
+            <a:schemeClr val="lt1"/>
+          </a:fontRef>
+        </p:style>
+        <p:txBody>
+          <a:bodyPr rtlCol="0" anchor="ctr"/>
+          <a:lstStyle/>
+          <a:p>
+            <a:pPr algn="ctr"/>
+            <a:endParaRPr lang="en-GB"/>
+          </a:p>
+        </p:txBody>
+      </p:sp>
+      <p:sp>
+        <p:nvSpPr>
+          <p:cNvPr id="12" name="Rectangle 11"/>
+          <p:cNvSpPr/>
+          <p:nvPr/>
+        </p:nvSpPr>
+        <p:spPr>
+          <a:xfrm>
+            <a:off x="3579406" y="3839944"/>
+            <a:ext cx="2700306" cy="2700000"/>
+          </a:xfrm>
+          <a:prstGeom prst="rect">
+            <a:avLst/>
+          </a:prstGeom>
+          <a:solidFill>
+            <a:schemeClr val="accent2">
+              <a:lumMod val="75000"/>
+              <a:alpha val="15000"/>
+            </a:schemeClr>
+          </a:solidFill>
+        </p:spPr>
+        <p:style>
+          <a:lnRef idx="2">
+            <a:schemeClr val="accent1">
+              <a:shade val="50000"/>
+            </a:schemeClr>
+          </a:lnRef>
+          <a:fillRef idx="1">
+            <a:schemeClr val="accent1"/>
+          </a:fillRef>
+          <a:effectRef idx="0">
+            <a:schemeClr val="accent1"/>
+          </a:effectRef>
+          <a:fontRef idx="minor">
+            <a:schemeClr val="lt1"/>
+          </a:fontRef>
+        </p:style>
+        <p:txBody>
+          <a:bodyPr rtlCol="0" anchor="ctr"/>
+          <a:lstStyle/>
+          <a:p>
+            <a:pPr algn="ctr"/>
+            <a:endParaRPr lang="en-GB"/>
+          </a:p>
+        </p:txBody>
+      </p:sp>
+      <p:sp>
+        <p:nvSpPr>
+          <p:cNvPr id="11" name="TextBox 10"/>
+          <p:cNvSpPr txBox="1"/>
+          <p:nvPr/>
+        </p:nvSpPr>
+        <p:spPr>
+          <a:xfrm>
+            <a:off x="10640840" y="4857041"/>
+            <a:ext cx="1457226" cy="646331"/>
+          </a:xfrm>
+          <a:prstGeom prst="rect">
+            <a:avLst/>
+          </a:prstGeom>
+          <a:solidFill>
+            <a:schemeClr val="accent4">
+              <a:lumMod val="60000"/>
+              <a:lumOff val="40000"/>
+            </a:schemeClr>
+          </a:solidFill>
+          <a:ln w="3175">
+            <a:solidFill>
+              <a:schemeClr val="tx1"/>
+            </a:solidFill>
+          </a:ln>
+        </p:spPr>
+        <p:txBody>
+          <a:bodyPr wrap="square" rtlCol="0">
+            <a:spAutoFit/>
+          </a:bodyPr>
+          <a:lstStyle/>
+          <a:p>
+            <a:r>
+              <a:rPr lang="en-GB" dirty="0" smtClean="0"/>
+              <a:t>Clear signal</a:t>
+            </a:r>
+          </a:p>
+          <a:p>
+            <a:r>
+              <a:rPr lang="en-GB" dirty="0" smtClean="0"/>
+              <a:t>Low </a:t>
+            </a:r>
+            <a:r>
+              <a:rPr lang="en-GB" b="1" dirty="0" smtClean="0"/>
+              <a:t>P</a:t>
+            </a:r>
+            <a:r>
+              <a:rPr lang="en-GB" dirty="0"/>
+              <a:t> values </a:t>
+            </a:r>
+          </a:p>
+        </p:txBody>
+      </p:sp>
+      <p:cxnSp>
+        <p:nvCxnSpPr>
+          <p:cNvPr id="14" name="Straight Arrow Connector 13"/>
+          <p:cNvCxnSpPr>
+            <a:stCxn id="11" idx="1"/>
+            <a:endCxn id="4" idx="3"/>
+          </p:cNvCxnSpPr>
+          <p:nvPr/>
+        </p:nvCxnSpPr>
+        <p:spPr>
+          <a:xfrm flipH="1">
+            <a:off x="9513487" y="5180207"/>
+            <a:ext cx="1127353" cy="9737"/>
+          </a:xfrm>
+          <a:prstGeom prst="straightConnector1">
+            <a:avLst/>
+          </a:prstGeom>
+          <a:ln w="28575">
+            <a:tailEnd type="arrow"/>
+          </a:ln>
+        </p:spPr>
+        <p:style>
+          <a:lnRef idx="1">
+            <a:schemeClr val="accent1"/>
+          </a:lnRef>
+          <a:fillRef idx="0">
+            <a:schemeClr val="accent1"/>
+          </a:fillRef>
+          <a:effectRef idx="0">
+            <a:schemeClr val="accent1"/>
+          </a:effectRef>
+          <a:fontRef idx="minor">
+            <a:schemeClr val="tx1"/>
+          </a:fontRef>
+        </p:style>
+      </p:cxnSp>
+      <p:sp>
+        <p:nvSpPr>
+          <p:cNvPr id="22" name="TextBox 21"/>
+          <p:cNvSpPr txBox="1"/>
+          <p:nvPr/>
+        </p:nvSpPr>
+        <p:spPr>
+          <a:xfrm>
+            <a:off x="126612" y="4857041"/>
+            <a:ext cx="1621500" cy="646331"/>
+          </a:xfrm>
+          <a:prstGeom prst="rect">
+            <a:avLst/>
+          </a:prstGeom>
+          <a:solidFill>
+            <a:schemeClr val="accent4">
+              <a:lumMod val="60000"/>
+              <a:lumOff val="40000"/>
+            </a:schemeClr>
+          </a:solidFill>
+          <a:ln w="3175">
+            <a:solidFill>
+              <a:schemeClr val="tx1"/>
+            </a:solidFill>
+          </a:ln>
+        </p:spPr>
+        <p:txBody>
+          <a:bodyPr wrap="square" rtlCol="0">
+            <a:spAutoFit/>
+          </a:bodyPr>
+          <a:lstStyle/>
+          <a:p>
+            <a:r>
+              <a:rPr lang="en-GB" dirty="0" smtClean="0"/>
+              <a:t>Unclear signal</a:t>
+            </a:r>
+          </a:p>
+          <a:p>
+            <a:r>
+              <a:rPr lang="en-GB" dirty="0" smtClean="0"/>
+              <a:t>High </a:t>
+            </a:r>
+            <a:r>
+              <a:rPr lang="en-GB" b="1" dirty="0" smtClean="0"/>
+              <a:t>P</a:t>
+            </a:r>
+            <a:r>
+              <a:rPr lang="en-GB" dirty="0"/>
+              <a:t> values </a:t>
+            </a:r>
+          </a:p>
+        </p:txBody>
+      </p:sp>
+      <p:cxnSp>
+        <p:nvCxnSpPr>
+          <p:cNvPr id="23" name="Straight Arrow Connector 22"/>
+          <p:cNvCxnSpPr>
+            <a:stCxn id="1026" idx="1"/>
+            <a:endCxn id="12" idx="1"/>
+          </p:cNvCxnSpPr>
+          <p:nvPr/>
+        </p:nvCxnSpPr>
+        <p:spPr>
+          <a:xfrm>
+            <a:off x="1748112" y="5189944"/>
+            <a:ext cx="1831294" cy="0"/>
+          </a:xfrm>
+          <a:prstGeom prst="straightConnector1">
+            <a:avLst/>
+          </a:prstGeom>
+          <a:ln w="28575">
+            <a:tailEnd type="arrow"/>
+          </a:ln>
+        </p:spPr>
+        <p:style>
+          <a:lnRef idx="1">
+            <a:schemeClr val="accent1"/>
+          </a:lnRef>
+          <a:fillRef idx="0">
+            <a:schemeClr val="accent1"/>
+          </a:fillRef>
+          <a:effectRef idx="0">
+            <a:schemeClr val="accent1"/>
+          </a:effectRef>
+          <a:fontRef idx="minor">
+            <a:schemeClr val="tx1"/>
+          </a:fontRef>
+        </p:style>
+      </p:cxnSp>
+      <p:sp>
+        <p:nvSpPr>
+          <p:cNvPr id="29" name="TextBox 28">
             <a:extLst>
               <a:ext uri="{FF2B5EF4-FFF2-40B4-BE49-F238E27FC236}">
                 <a16:creationId xmlns="" xmlns:a16="http://schemas.microsoft.com/office/drawing/2014/main" id="{FDE44C33-EA15-4D14-8324-71F27282442F}"/>
@@ -29855,7 +32283,7 @@
                 </a:highlight>
                 <a:latin typeface="Courier New" panose="02070309020205020404" pitchFamily="49" charset="0"/>
                 <a:cs typeface="Courier New" panose="02070309020205020404" pitchFamily="49" charset="0"/>
-                <a:hlinkClick r:id="rId2"/>
+                <a:hlinkClick r:id="rId3"/>
               </a:rPr>
               <a:t>FASTQ Sequence format</a:t>
             </a:r>
@@ -29874,422 +32302,7 @@
       </p:sp>
       <p:sp>
         <p:nvSpPr>
-          <p:cNvPr id="4" name="TextBox 3">
-            <a:extLst>
-              <a:ext uri="{FF2B5EF4-FFF2-40B4-BE49-F238E27FC236}">
-                <a16:creationId xmlns="" xmlns:a16="http://schemas.microsoft.com/office/drawing/2014/main" id="{438442CF-1B82-4A10-87A1-614331CA498E}"/>
-              </a:ext>
-            </a:extLst>
-          </p:cNvPr>
-          <p:cNvSpPr txBox="1"/>
-          <p:nvPr/>
-        </p:nvSpPr>
-        <p:spPr>
-          <a:xfrm>
-            <a:off x="1019114" y="1291702"/>
-            <a:ext cx="10153772" cy="400110"/>
-          </a:xfrm>
-          <a:prstGeom prst="rect">
-            <a:avLst/>
-          </a:prstGeom>
-          <a:solidFill>
-            <a:schemeClr val="accent2">
-              <a:lumMod val="40000"/>
-              <a:lumOff val="60000"/>
-            </a:schemeClr>
-          </a:solidFill>
-        </p:spPr>
-        <p:txBody>
-          <a:bodyPr wrap="square" rtlCol="0">
-            <a:spAutoFit/>
-          </a:bodyPr>
-          <a:lstStyle/>
-          <a:p>
-            <a:r>
-              <a:rPr lang="en-GB" sz="2000" dirty="0" smtClean="0">
-                <a:latin typeface="Times New Roman" panose="02020603050405020304" pitchFamily="18" charset="0"/>
-                <a:cs typeface="Times New Roman" panose="02020603050405020304" pitchFamily="18" charset="0"/>
-              </a:rPr>
-              <a:t>The </a:t>
-            </a:r>
-            <a:r>
-              <a:rPr lang="en-GB" sz="2000" b="1" dirty="0" smtClean="0">
-                <a:latin typeface="Times New Roman" panose="02020603050405020304" pitchFamily="18" charset="0"/>
-                <a:cs typeface="Times New Roman" panose="02020603050405020304" pitchFamily="18" charset="0"/>
-              </a:rPr>
-              <a:t>Base Quality Scores </a:t>
-            </a:r>
-            <a:r>
-              <a:rPr lang="en-GB" sz="2000" dirty="0" smtClean="0">
-                <a:latin typeface="Times New Roman" panose="02020603050405020304" pitchFamily="18" charset="0"/>
-                <a:cs typeface="Times New Roman" panose="02020603050405020304" pitchFamily="18" charset="0"/>
-              </a:rPr>
-              <a:t>in </a:t>
-            </a:r>
-            <a:r>
-              <a:rPr lang="en-GB" sz="2000" b="1" dirty="0" smtClean="0">
-                <a:latin typeface="Times New Roman" panose="02020603050405020304" pitchFamily="18" charset="0"/>
-                <a:cs typeface="Times New Roman" panose="02020603050405020304" pitchFamily="18" charset="0"/>
-              </a:rPr>
-              <a:t>FASTQ</a:t>
-            </a:r>
-            <a:r>
-              <a:rPr lang="en-GB" sz="2000" dirty="0" smtClean="0">
-                <a:latin typeface="Times New Roman" panose="02020603050405020304" pitchFamily="18" charset="0"/>
-                <a:cs typeface="Times New Roman" panose="02020603050405020304" pitchFamily="18" charset="0"/>
-              </a:rPr>
-              <a:t> files are </a:t>
-            </a:r>
-            <a:r>
-              <a:rPr lang="en-GB" sz="2000" b="1" dirty="0" smtClean="0">
-                <a:latin typeface="Times New Roman" panose="02020603050405020304" pitchFamily="18" charset="0"/>
-                <a:cs typeface="Times New Roman" panose="02020603050405020304" pitchFamily="18" charset="0"/>
-              </a:rPr>
-              <a:t>PHRED</a:t>
-            </a:r>
-            <a:r>
-              <a:rPr lang="en-GB" sz="2000" dirty="0" smtClean="0">
-                <a:latin typeface="Times New Roman" panose="02020603050405020304" pitchFamily="18" charset="0"/>
-                <a:cs typeface="Times New Roman" panose="02020603050405020304" pitchFamily="18" charset="0"/>
-              </a:rPr>
-              <a:t> </a:t>
-            </a:r>
-            <a:r>
-              <a:rPr lang="en-GB" sz="2000" b="1" dirty="0" smtClean="0">
-                <a:latin typeface="Times New Roman" panose="02020603050405020304" pitchFamily="18" charset="0"/>
-                <a:cs typeface="Times New Roman" panose="02020603050405020304" pitchFamily="18" charset="0"/>
-              </a:rPr>
-              <a:t>Scores</a:t>
-            </a:r>
-            <a:r>
-              <a:rPr lang="en-GB" sz="2000" dirty="0" smtClean="0">
-                <a:latin typeface="Times New Roman" panose="02020603050405020304" pitchFamily="18" charset="0"/>
-                <a:cs typeface="Times New Roman" panose="02020603050405020304" pitchFamily="18" charset="0"/>
-              </a:rPr>
-              <a:t>.</a:t>
-            </a:r>
-            <a:endParaRPr lang="en-GB" sz="2000" dirty="0"/>
-          </a:p>
-        </p:txBody>
-      </p:sp>
-      <p:sp>
-        <p:nvSpPr>
-          <p:cNvPr id="6" name="TextBox 5">
-            <a:extLst>
-              <a:ext uri="{FF2B5EF4-FFF2-40B4-BE49-F238E27FC236}">
-                <a16:creationId xmlns="" xmlns:a16="http://schemas.microsoft.com/office/drawing/2014/main" id="{438442CF-1B82-4A10-87A1-614331CA498E}"/>
-              </a:ext>
-            </a:extLst>
-          </p:cNvPr>
-          <p:cNvSpPr txBox="1"/>
-          <p:nvPr/>
-        </p:nvSpPr>
-        <p:spPr>
-          <a:xfrm>
-            <a:off x="1019114" y="2023991"/>
-            <a:ext cx="10153772" cy="707886"/>
-          </a:xfrm>
-          <a:prstGeom prst="rect">
-            <a:avLst/>
-          </a:prstGeom>
-          <a:solidFill>
-            <a:schemeClr val="accent2">
-              <a:lumMod val="40000"/>
-              <a:lumOff val="60000"/>
-            </a:schemeClr>
-          </a:solidFill>
-        </p:spPr>
-        <p:txBody>
-          <a:bodyPr wrap="square" rtlCol="0">
-            <a:spAutoFit/>
-          </a:bodyPr>
-          <a:lstStyle/>
-          <a:p>
-            <a:r>
-              <a:rPr lang="en-GB" sz="2000" dirty="0" smtClean="0">
-                <a:latin typeface="Times New Roman" panose="02020603050405020304" pitchFamily="18" charset="0"/>
-                <a:cs typeface="Times New Roman" panose="02020603050405020304" pitchFamily="18" charset="0"/>
-              </a:rPr>
-              <a:t>The </a:t>
-            </a:r>
-            <a:r>
-              <a:rPr lang="en-GB" sz="2000" b="1" dirty="0">
-                <a:latin typeface="Times New Roman" panose="02020603050405020304" pitchFamily="18" charset="0"/>
-                <a:cs typeface="Times New Roman" panose="02020603050405020304" pitchFamily="18" charset="0"/>
-              </a:rPr>
-              <a:t>PHRED</a:t>
-            </a:r>
-            <a:r>
-              <a:rPr lang="en-GB" sz="2000" dirty="0">
-                <a:latin typeface="Times New Roman" panose="02020603050405020304" pitchFamily="18" charset="0"/>
-                <a:cs typeface="Times New Roman" panose="02020603050405020304" pitchFamily="18" charset="0"/>
-              </a:rPr>
-              <a:t> </a:t>
-            </a:r>
-            <a:r>
-              <a:rPr lang="en-GB" sz="2000" b="1" dirty="0" smtClean="0">
-                <a:latin typeface="Times New Roman" panose="02020603050405020304" pitchFamily="18" charset="0"/>
-                <a:cs typeface="Times New Roman" panose="02020603050405020304" pitchFamily="18" charset="0"/>
-              </a:rPr>
-              <a:t>Score</a:t>
-            </a:r>
-            <a:r>
-              <a:rPr lang="en-GB" sz="2000" dirty="0" smtClean="0">
-                <a:latin typeface="Times New Roman" panose="02020603050405020304" pitchFamily="18" charset="0"/>
-                <a:cs typeface="Times New Roman" panose="02020603050405020304" pitchFamily="18" charset="0"/>
-              </a:rPr>
-              <a:t> for a given </a:t>
-            </a:r>
-            <a:r>
-              <a:rPr lang="en-GB" sz="2000" b="1" dirty="0" smtClean="0">
-                <a:latin typeface="Times New Roman" panose="02020603050405020304" pitchFamily="18" charset="0"/>
-                <a:cs typeface="Times New Roman" panose="02020603050405020304" pitchFamily="18" charset="0"/>
-              </a:rPr>
-              <a:t>Base Call </a:t>
-            </a:r>
-            <a:r>
-              <a:rPr lang="en-GB" sz="2000" dirty="0" smtClean="0">
-                <a:latin typeface="Times New Roman" panose="02020603050405020304" pitchFamily="18" charset="0"/>
-                <a:cs typeface="Times New Roman" panose="02020603050405020304" pitchFamily="18" charset="0"/>
-              </a:rPr>
-              <a:t>is derived from an estimate of the </a:t>
-            </a:r>
-            <a:r>
-              <a:rPr lang="en-GB" sz="2000" b="1" dirty="0" smtClean="0">
-                <a:latin typeface="Times New Roman" panose="02020603050405020304" pitchFamily="18" charset="0"/>
-                <a:cs typeface="Times New Roman" panose="02020603050405020304" pitchFamily="18" charset="0"/>
-              </a:rPr>
-              <a:t>Probability</a:t>
-            </a:r>
-            <a:r>
-              <a:rPr lang="en-GB" sz="2000" dirty="0" smtClean="0">
-                <a:latin typeface="Times New Roman" panose="02020603050405020304" pitchFamily="18" charset="0"/>
-                <a:cs typeface="Times New Roman" panose="02020603050405020304" pitchFamily="18" charset="0"/>
-              </a:rPr>
-              <a:t> of that </a:t>
-            </a:r>
-            <a:r>
-              <a:rPr lang="en-GB" sz="2000" b="1" dirty="0">
-                <a:latin typeface="Times New Roman" panose="02020603050405020304" pitchFamily="18" charset="0"/>
-                <a:cs typeface="Times New Roman" panose="02020603050405020304" pitchFamily="18" charset="0"/>
-              </a:rPr>
-              <a:t>B</a:t>
-            </a:r>
-            <a:r>
-              <a:rPr lang="en-GB" sz="2000" b="1" dirty="0" smtClean="0">
-                <a:latin typeface="Times New Roman" panose="02020603050405020304" pitchFamily="18" charset="0"/>
-                <a:cs typeface="Times New Roman" panose="02020603050405020304" pitchFamily="18" charset="0"/>
-              </a:rPr>
-              <a:t>ase</a:t>
-            </a:r>
-            <a:r>
-              <a:rPr lang="en-GB" sz="2000" dirty="0" smtClean="0">
-                <a:latin typeface="Times New Roman" panose="02020603050405020304" pitchFamily="18" charset="0"/>
-                <a:cs typeface="Times New Roman" panose="02020603050405020304" pitchFamily="18" charset="0"/>
-              </a:rPr>
-              <a:t> being </a:t>
-            </a:r>
-            <a:r>
-              <a:rPr lang="en-GB" sz="2000" b="1" dirty="0" smtClean="0">
-                <a:latin typeface="Times New Roman" panose="02020603050405020304" pitchFamily="18" charset="0"/>
-                <a:cs typeface="Times New Roman" panose="02020603050405020304" pitchFamily="18" charset="0"/>
-              </a:rPr>
-              <a:t>Called</a:t>
-            </a:r>
-            <a:r>
-              <a:rPr lang="en-GB" sz="2000" dirty="0" smtClean="0">
-                <a:latin typeface="Times New Roman" panose="02020603050405020304" pitchFamily="18" charset="0"/>
-                <a:cs typeface="Times New Roman" panose="02020603050405020304" pitchFamily="18" charset="0"/>
-              </a:rPr>
-              <a:t> incorrectly</a:t>
-            </a:r>
-            <a:endParaRPr lang="en-GB" sz="2000" dirty="0"/>
-          </a:p>
-        </p:txBody>
-      </p:sp>
-      <p:sp>
-        <p:nvSpPr>
-          <p:cNvPr id="7" name="TextBox 6">
-            <a:extLst>
-              <a:ext uri="{FF2B5EF4-FFF2-40B4-BE49-F238E27FC236}">
-                <a16:creationId xmlns="" xmlns:a16="http://schemas.microsoft.com/office/drawing/2014/main" id="{438442CF-1B82-4A10-87A1-614331CA498E}"/>
-              </a:ext>
-            </a:extLst>
-          </p:cNvPr>
-          <p:cNvSpPr txBox="1"/>
-          <p:nvPr/>
-        </p:nvSpPr>
-        <p:spPr>
-          <a:xfrm>
-            <a:off x="1019114" y="3064056"/>
-            <a:ext cx="10153772" cy="707886"/>
-          </a:xfrm>
-          <a:prstGeom prst="rect">
-            <a:avLst/>
-          </a:prstGeom>
-          <a:solidFill>
-            <a:schemeClr val="accent2">
-              <a:lumMod val="40000"/>
-              <a:lumOff val="60000"/>
-            </a:schemeClr>
-          </a:solidFill>
-        </p:spPr>
-        <p:txBody>
-          <a:bodyPr wrap="square" rtlCol="0">
-            <a:spAutoFit/>
-          </a:bodyPr>
-          <a:lstStyle/>
-          <a:p>
-            <a:r>
-              <a:rPr lang="en-GB" sz="2000" dirty="0" smtClean="0">
-                <a:latin typeface="Times New Roman" panose="02020603050405020304" pitchFamily="18" charset="0"/>
-                <a:cs typeface="Times New Roman" panose="02020603050405020304" pitchFamily="18" charset="0"/>
-              </a:rPr>
-              <a:t>Where</a:t>
-            </a:r>
-            <a:r>
-              <a:rPr lang="en-GB" sz="2000" b="1" dirty="0" smtClean="0">
-                <a:latin typeface="Times New Roman" panose="02020603050405020304" pitchFamily="18" charset="0"/>
-                <a:cs typeface="Times New Roman" panose="02020603050405020304" pitchFamily="18" charset="0"/>
-              </a:rPr>
-              <a:t> Q</a:t>
-            </a:r>
-            <a:r>
-              <a:rPr lang="en-GB" sz="2000" dirty="0" smtClean="0">
-                <a:latin typeface="Times New Roman" panose="02020603050405020304" pitchFamily="18" charset="0"/>
-                <a:cs typeface="Times New Roman" panose="02020603050405020304" pitchFamily="18" charset="0"/>
-              </a:rPr>
-              <a:t> is the </a:t>
-            </a:r>
-            <a:r>
-              <a:rPr lang="en-GB" sz="2000" b="1" dirty="0">
-                <a:latin typeface="Times New Roman" panose="02020603050405020304" pitchFamily="18" charset="0"/>
-                <a:cs typeface="Times New Roman" panose="02020603050405020304" pitchFamily="18" charset="0"/>
-              </a:rPr>
-              <a:t>PHRED</a:t>
-            </a:r>
-            <a:r>
-              <a:rPr lang="en-GB" sz="2000" dirty="0">
-                <a:latin typeface="Times New Roman" panose="02020603050405020304" pitchFamily="18" charset="0"/>
-                <a:cs typeface="Times New Roman" panose="02020603050405020304" pitchFamily="18" charset="0"/>
-              </a:rPr>
-              <a:t> </a:t>
-            </a:r>
-            <a:r>
-              <a:rPr lang="en-GB" sz="2000" b="1" dirty="0" smtClean="0">
-                <a:latin typeface="Times New Roman" panose="02020603050405020304" pitchFamily="18" charset="0"/>
-                <a:cs typeface="Times New Roman" panose="02020603050405020304" pitchFamily="18" charset="0"/>
-              </a:rPr>
-              <a:t>Score </a:t>
-            </a:r>
-            <a:r>
-              <a:rPr lang="en-GB" sz="2000" dirty="0" smtClean="0">
-                <a:latin typeface="Times New Roman" panose="02020603050405020304" pitchFamily="18" charset="0"/>
-                <a:cs typeface="Times New Roman" panose="02020603050405020304" pitchFamily="18" charset="0"/>
-              </a:rPr>
-              <a:t>for a given </a:t>
-            </a:r>
-            <a:r>
-              <a:rPr lang="en-GB" sz="2000" b="1" dirty="0" smtClean="0">
-                <a:latin typeface="Times New Roman" panose="02020603050405020304" pitchFamily="18" charset="0"/>
-                <a:cs typeface="Times New Roman" panose="02020603050405020304" pitchFamily="18" charset="0"/>
-              </a:rPr>
-              <a:t>Base Call </a:t>
-            </a:r>
-            <a:r>
-              <a:rPr lang="en-GB" sz="2000" dirty="0" smtClean="0">
-                <a:latin typeface="Times New Roman" panose="02020603050405020304" pitchFamily="18" charset="0"/>
-                <a:cs typeface="Times New Roman" panose="02020603050405020304" pitchFamily="18" charset="0"/>
-              </a:rPr>
-              <a:t>and </a:t>
-            </a:r>
-            <a:r>
-              <a:rPr lang="en-GB" sz="2000" b="1" dirty="0" smtClean="0">
-                <a:latin typeface="Times New Roman" panose="02020603050405020304" pitchFamily="18" charset="0"/>
-                <a:cs typeface="Times New Roman" panose="02020603050405020304" pitchFamily="18" charset="0"/>
-              </a:rPr>
-              <a:t>P </a:t>
-            </a:r>
-            <a:r>
-              <a:rPr lang="en-GB" sz="2000" dirty="0" smtClean="0">
-                <a:latin typeface="Times New Roman" panose="02020603050405020304" pitchFamily="18" charset="0"/>
-                <a:cs typeface="Times New Roman" panose="02020603050405020304" pitchFamily="18" charset="0"/>
-              </a:rPr>
-              <a:t>is the estimated </a:t>
-            </a:r>
-            <a:r>
-              <a:rPr lang="en-GB" sz="2000" b="1" dirty="0" smtClean="0">
-                <a:latin typeface="Times New Roman" panose="02020603050405020304" pitchFamily="18" charset="0"/>
-                <a:cs typeface="Times New Roman" panose="02020603050405020304" pitchFamily="18" charset="0"/>
-              </a:rPr>
-              <a:t>Probability of Error </a:t>
-            </a:r>
-            <a:r>
-              <a:rPr lang="en-GB" sz="2000" dirty="0" smtClean="0">
-                <a:latin typeface="Times New Roman" panose="02020603050405020304" pitchFamily="18" charset="0"/>
-                <a:cs typeface="Times New Roman" panose="02020603050405020304" pitchFamily="18" charset="0"/>
-              </a:rPr>
-              <a:t>for that </a:t>
-            </a:r>
-            <a:r>
-              <a:rPr lang="en-GB" sz="2000" b="1" dirty="0" smtClean="0">
-                <a:latin typeface="Times New Roman" panose="02020603050405020304" pitchFamily="18" charset="0"/>
-                <a:cs typeface="Times New Roman" panose="02020603050405020304" pitchFamily="18" charset="0"/>
-              </a:rPr>
-              <a:t>Base Call</a:t>
-            </a:r>
-            <a:r>
-              <a:rPr lang="en-GB" sz="2000" dirty="0" smtClean="0">
-                <a:latin typeface="Times New Roman" panose="02020603050405020304" pitchFamily="18" charset="0"/>
-                <a:cs typeface="Times New Roman" panose="02020603050405020304" pitchFamily="18" charset="0"/>
-              </a:rPr>
-              <a:t>, the following formula applies:</a:t>
-            </a:r>
-          </a:p>
-        </p:txBody>
-      </p:sp>
-      <p:sp>
-        <p:nvSpPr>
-          <p:cNvPr id="3" name="AutoShape 2" descr="Q=-10\ \log _{{10}}P"/>
-          <p:cNvSpPr>
-            <a:spLocks noChangeAspect="1" noChangeArrowheads="1"/>
-          </p:cNvSpPr>
-          <p:nvPr/>
-        </p:nvSpPr>
-        <p:spPr bwMode="auto">
-          <a:xfrm>
-            <a:off x="6313955" y="-144463"/>
-            <a:ext cx="304800" cy="304801"/>
-          </a:xfrm>
-          <a:prstGeom prst="rect">
-            <a:avLst/>
-          </a:prstGeom>
-          <a:noFill/>
-          <a:extLst>
-            <a:ext uri="{909E8E84-426E-40DD-AFC4-6F175D3DCCD1}">
-              <a14:hiddenFill xmlns:a14="http://schemas.microsoft.com/office/drawing/2010/main">
-                <a:solidFill>
-                  <a:srgbClr val="FFFFFF"/>
-                </a:solidFill>
-              </a14:hiddenFill>
-            </a:ext>
-          </a:extLst>
-        </p:spPr>
-        <p:txBody>
-          <a:bodyPr vert="horz" wrap="square" lIns="91440" tIns="45720" rIns="91440" bIns="45720" numCol="1" anchor="t" anchorCtr="0" compatLnSpc="1">
-            <a:prstTxWarp prst="textNoShape">
-              <a:avLst/>
-            </a:prstTxWarp>
-          </a:bodyPr>
-          <a:lstStyle/>
-          <a:p>
-            <a:endParaRPr lang="en-GB"/>
-          </a:p>
-        </p:txBody>
-      </p:sp>
-      <p:sp>
-        <p:nvSpPr>
-          <p:cNvPr id="9" name="AutoShape 4" descr="Q=-10\ \log _{{10}}P"/>
+          <p:cNvPr id="31" name="AutoShape 4" descr="Q=-10\ \log _{{10}}P"/>
           <p:cNvSpPr>
             <a:spLocks noChangeAspect="1" noChangeArrowheads="1"/>
           </p:cNvSpPr>
@@ -30328,275 +32341,7 @@
       </p:sp>
       <p:sp>
         <p:nvSpPr>
-          <p:cNvPr id="10" name="TextBox 9">
-            <a:extLst>
-              <a:ext uri="{FF2B5EF4-FFF2-40B4-BE49-F238E27FC236}">
-                <a16:creationId xmlns="" xmlns:a16="http://schemas.microsoft.com/office/drawing/2014/main" id="{438442CF-1B82-4A10-87A1-614331CA498E}"/>
-              </a:ext>
-            </a:extLst>
-          </p:cNvPr>
-          <p:cNvSpPr txBox="1"/>
-          <p:nvPr/>
-        </p:nvSpPr>
-        <p:spPr>
-          <a:xfrm>
-            <a:off x="1808073" y="5451963"/>
-            <a:ext cx="5599641" cy="400110"/>
-          </a:xfrm>
-          <a:prstGeom prst="rect">
-            <a:avLst/>
-          </a:prstGeom>
-          <a:solidFill>
-            <a:schemeClr val="accent6">
-              <a:lumMod val="20000"/>
-              <a:lumOff val="80000"/>
-            </a:schemeClr>
-          </a:solidFill>
-        </p:spPr>
-        <p:txBody>
-          <a:bodyPr wrap="square" rtlCol="0">
-            <a:spAutoFit/>
-          </a:bodyPr>
-          <a:lstStyle/>
-          <a:p>
-            <a:r>
-              <a:rPr lang="en-GB" sz="2000" b="1" dirty="0" smtClean="0">
-                <a:latin typeface="Times New Roman" panose="02020603050405020304" pitchFamily="18" charset="0"/>
-                <a:cs typeface="Times New Roman" panose="02020603050405020304" pitchFamily="18" charset="0"/>
-              </a:rPr>
-              <a:t>P</a:t>
-            </a:r>
-            <a:r>
-              <a:rPr lang="en-GB" sz="2000" dirty="0" smtClean="0">
-                <a:latin typeface="Times New Roman" panose="02020603050405020304" pitchFamily="18" charset="0"/>
-                <a:cs typeface="Times New Roman" panose="02020603050405020304" pitchFamily="18" charset="0"/>
-              </a:rPr>
-              <a:t> is a </a:t>
-            </a:r>
-            <a:r>
-              <a:rPr lang="en-GB" sz="2000" b="1" dirty="0" smtClean="0">
-                <a:latin typeface="Times New Roman" panose="02020603050405020304" pitchFamily="18" charset="0"/>
-                <a:cs typeface="Times New Roman" panose="02020603050405020304" pitchFamily="18" charset="0"/>
-              </a:rPr>
-              <a:t>Probability</a:t>
-            </a:r>
-            <a:r>
-              <a:rPr lang="en-GB" sz="2000" dirty="0" smtClean="0">
-                <a:latin typeface="Times New Roman" panose="02020603050405020304" pitchFamily="18" charset="0"/>
-                <a:cs typeface="Times New Roman" panose="02020603050405020304" pitchFamily="18" charset="0"/>
-              </a:rPr>
-              <a:t> and so has </a:t>
-            </a:r>
-            <a:r>
-              <a:rPr lang="en-GB" sz="2000" b="1" dirty="0" smtClean="0">
-                <a:latin typeface="Times New Roman" panose="02020603050405020304" pitchFamily="18" charset="0"/>
-                <a:cs typeface="Times New Roman" panose="02020603050405020304" pitchFamily="18" charset="0"/>
-              </a:rPr>
-              <a:t>Range</a:t>
-            </a:r>
-            <a:r>
-              <a:rPr lang="en-GB" sz="2000" dirty="0" smtClean="0">
-                <a:latin typeface="Times New Roman" panose="02020603050405020304" pitchFamily="18" charset="0"/>
-                <a:cs typeface="Times New Roman" panose="02020603050405020304" pitchFamily="18" charset="0"/>
-              </a:rPr>
-              <a:t> </a:t>
-            </a:r>
-            <a:r>
-              <a:rPr lang="en-GB" sz="2000" b="1" dirty="0" smtClean="0">
-                <a:latin typeface="Times New Roman" panose="02020603050405020304" pitchFamily="18" charset="0"/>
-                <a:cs typeface="Times New Roman" panose="02020603050405020304" pitchFamily="18" charset="0"/>
-              </a:rPr>
-              <a:t>0 </a:t>
-            </a:r>
-            <a:r>
-              <a:rPr lang="en-GB" sz="2000" b="1" dirty="0" smtClean="0">
-                <a:latin typeface="Times New Roman" panose="02020603050405020304" pitchFamily="18" charset="0"/>
-                <a:cs typeface="Times New Roman" panose="02020603050405020304" pitchFamily="18" charset="0"/>
-                <a:sym typeface="Wingdings" panose="05000000000000000000" pitchFamily="2" charset="2"/>
-              </a:rPr>
-              <a:t></a:t>
-            </a:r>
-            <a:r>
-              <a:rPr lang="en-GB" sz="2000" b="1" dirty="0" smtClean="0">
-                <a:latin typeface="Times New Roman" panose="02020603050405020304" pitchFamily="18" charset="0"/>
-                <a:cs typeface="Times New Roman" panose="02020603050405020304" pitchFamily="18" charset="0"/>
-              </a:rPr>
-              <a:t> 1</a:t>
-            </a:r>
-            <a:endParaRPr lang="en-GB" sz="2000" b="1" dirty="0"/>
-          </a:p>
-        </p:txBody>
-      </p:sp>
-      <p:sp>
-        <p:nvSpPr>
-          <p:cNvPr id="11" name="TextBox 10">
-            <a:extLst>
-              <a:ext uri="{FF2B5EF4-FFF2-40B4-BE49-F238E27FC236}">
-                <a16:creationId xmlns="" xmlns:a16="http://schemas.microsoft.com/office/drawing/2014/main" id="{438442CF-1B82-4A10-87A1-614331CA498E}"/>
-              </a:ext>
-            </a:extLst>
-          </p:cNvPr>
-          <p:cNvSpPr txBox="1"/>
-          <p:nvPr/>
-        </p:nvSpPr>
-        <p:spPr>
-          <a:xfrm>
-            <a:off x="1797404" y="6184253"/>
-            <a:ext cx="5620978" cy="400110"/>
-          </a:xfrm>
-          <a:prstGeom prst="rect">
-            <a:avLst/>
-          </a:prstGeom>
-          <a:solidFill>
-            <a:schemeClr val="accent6">
-              <a:lumMod val="20000"/>
-              <a:lumOff val="80000"/>
-            </a:schemeClr>
-          </a:solidFill>
-        </p:spPr>
-        <p:txBody>
-          <a:bodyPr wrap="square" rtlCol="0">
-            <a:spAutoFit/>
-          </a:bodyPr>
-          <a:lstStyle/>
-          <a:p>
-            <a:r>
-              <a:rPr lang="en-GB" sz="2000" b="1" dirty="0">
-                <a:latin typeface="Times New Roman" panose="02020603050405020304" pitchFamily="18" charset="0"/>
-                <a:cs typeface="Times New Roman" panose="02020603050405020304" pitchFamily="18" charset="0"/>
-              </a:rPr>
-              <a:t>Q</a:t>
-            </a:r>
-            <a:r>
-              <a:rPr lang="en-GB" sz="2000" dirty="0" smtClean="0">
-                <a:latin typeface="Times New Roman" panose="02020603050405020304" pitchFamily="18" charset="0"/>
-                <a:cs typeface="Times New Roman" panose="02020603050405020304" pitchFamily="18" charset="0"/>
-              </a:rPr>
-              <a:t> is a function of </a:t>
-            </a:r>
-            <a:r>
-              <a:rPr lang="en-GB" sz="2000" b="1" dirty="0" smtClean="0">
-                <a:latin typeface="Times New Roman" panose="02020603050405020304" pitchFamily="18" charset="0"/>
-                <a:cs typeface="Times New Roman" panose="02020603050405020304" pitchFamily="18" charset="0"/>
-              </a:rPr>
-              <a:t>P</a:t>
-            </a:r>
-            <a:r>
-              <a:rPr lang="en-GB" sz="2000" dirty="0" smtClean="0">
-                <a:latin typeface="Times New Roman" panose="02020603050405020304" pitchFamily="18" charset="0"/>
-                <a:cs typeface="Times New Roman" panose="02020603050405020304" pitchFamily="18" charset="0"/>
-              </a:rPr>
-              <a:t> that has </a:t>
-            </a:r>
-            <a:r>
-              <a:rPr lang="en-GB" sz="2000" b="1" dirty="0" smtClean="0">
-                <a:latin typeface="Times New Roman" panose="02020603050405020304" pitchFamily="18" charset="0"/>
-                <a:cs typeface="Times New Roman" panose="02020603050405020304" pitchFamily="18" charset="0"/>
-              </a:rPr>
-              <a:t>Range</a:t>
-            </a:r>
-            <a:r>
-              <a:rPr lang="en-GB" sz="2000" dirty="0" smtClean="0">
-                <a:latin typeface="Times New Roman" panose="02020603050405020304" pitchFamily="18" charset="0"/>
-                <a:cs typeface="Times New Roman" panose="02020603050405020304" pitchFamily="18" charset="0"/>
-              </a:rPr>
-              <a:t> </a:t>
-            </a:r>
-            <a:r>
-              <a:rPr lang="en-GB" sz="2000" b="1" dirty="0" smtClean="0">
-                <a:latin typeface="Times New Roman" panose="02020603050405020304" pitchFamily="18" charset="0"/>
-                <a:cs typeface="Times New Roman" panose="02020603050405020304" pitchFamily="18" charset="0"/>
-              </a:rPr>
-              <a:t> 0 </a:t>
-            </a:r>
-            <a:r>
-              <a:rPr lang="en-GB" sz="2000" b="1" dirty="0" smtClean="0">
-                <a:latin typeface="Times New Roman" panose="02020603050405020304" pitchFamily="18" charset="0"/>
-                <a:cs typeface="Times New Roman" panose="02020603050405020304" pitchFamily="18" charset="0"/>
-                <a:sym typeface="Wingdings" panose="05000000000000000000" pitchFamily="2" charset="2"/>
-              </a:rPr>
-              <a:t></a:t>
-            </a:r>
-            <a:r>
-              <a:rPr lang="en-GB" sz="2000" b="1" dirty="0" smtClean="0">
-                <a:latin typeface="Times New Roman" panose="02020603050405020304" pitchFamily="18" charset="0"/>
-                <a:cs typeface="Times New Roman" panose="02020603050405020304" pitchFamily="18" charset="0"/>
-              </a:rPr>
-              <a:t> infinity</a:t>
-            </a:r>
-            <a:r>
-              <a:rPr lang="en-GB" sz="2000" dirty="0" smtClean="0">
-                <a:latin typeface="Times New Roman" panose="02020603050405020304" pitchFamily="18" charset="0"/>
-                <a:cs typeface="Times New Roman" panose="02020603050405020304" pitchFamily="18" charset="0"/>
-              </a:rPr>
-              <a:t>.</a:t>
-            </a:r>
-            <a:endParaRPr lang="en-GB" sz="2000" dirty="0"/>
-          </a:p>
-        </p:txBody>
-      </p:sp>
-      <p:sp>
-        <p:nvSpPr>
-          <p:cNvPr id="12" name="TextBox 11">
-            <a:extLst>
-              <a:ext uri="{FF2B5EF4-FFF2-40B4-BE49-F238E27FC236}">
-                <a16:creationId xmlns="" xmlns:a16="http://schemas.microsoft.com/office/drawing/2014/main" id="{438442CF-1B82-4A10-87A1-614331CA498E}"/>
-              </a:ext>
-            </a:extLst>
-          </p:cNvPr>
-          <p:cNvSpPr txBox="1"/>
-          <p:nvPr/>
-        </p:nvSpPr>
-        <p:spPr>
-          <a:xfrm>
-            <a:off x="1765004" y="4104121"/>
-            <a:ext cx="8661992" cy="1015663"/>
-          </a:xfrm>
-          <a:prstGeom prst="rect">
-            <a:avLst/>
-          </a:prstGeom>
-          <a:solidFill>
-            <a:srgbClr val="FFFF00"/>
-          </a:solidFill>
-        </p:spPr>
-        <p:txBody>
-          <a:bodyPr wrap="square" rtlCol="0">
-            <a:spAutoFit/>
-          </a:bodyPr>
-          <a:lstStyle/>
-          <a:p>
-            <a:pPr algn="ctr"/>
-            <a:r>
-              <a:rPr lang="en-GB" sz="6000" b="1" dirty="0" smtClean="0">
-                <a:latin typeface="Courier New" panose="02070309020205020404" pitchFamily="49" charset="0"/>
-                <a:cs typeface="Courier New" panose="02070309020205020404" pitchFamily="49" charset="0"/>
-              </a:rPr>
-              <a:t>Q =  -10 * log</a:t>
-            </a:r>
-            <a:r>
-              <a:rPr lang="en-GB" sz="6000" b="1" baseline="-25000" dirty="0" smtClean="0">
-                <a:latin typeface="Courier New" panose="02070309020205020404" pitchFamily="49" charset="0"/>
-                <a:cs typeface="Courier New" panose="02070309020205020404" pitchFamily="49" charset="0"/>
-              </a:rPr>
-              <a:t>10</a:t>
-            </a:r>
-            <a:r>
-              <a:rPr lang="en-GB" sz="6000" b="1" dirty="0" smtClean="0">
-                <a:latin typeface="Courier New" panose="02070309020205020404" pitchFamily="49" charset="0"/>
-                <a:cs typeface="Courier New" panose="02070309020205020404" pitchFamily="49" charset="0"/>
-              </a:rPr>
-              <a:t>(P)</a:t>
-            </a:r>
-            <a:endParaRPr lang="en-GB" sz="6000" b="1" dirty="0">
-              <a:latin typeface="Courier New" panose="02070309020205020404" pitchFamily="49" charset="0"/>
-              <a:cs typeface="Courier New" panose="02070309020205020404" pitchFamily="49" charset="0"/>
-            </a:endParaRPr>
-          </a:p>
-        </p:txBody>
-      </p:sp>
-      <p:sp>
-        <p:nvSpPr>
-          <p:cNvPr id="15" name="TextBox 14">
+          <p:cNvPr id="33" name="TextBox 32">
             <a:extLst>
               <a:ext uri="{FF2B5EF4-FFF2-40B4-BE49-F238E27FC236}">
                 <a16:creationId xmlns="" xmlns:a16="http://schemas.microsoft.com/office/drawing/2014/main" id="{E43AF4C5-CF5B-4E7E-B438-83CD70BE1265}"/>
@@ -30677,7 +32422,7 @@
                 </a:solidFill>
                 <a:latin typeface="Times New Roman" panose="02020603050405020304" pitchFamily="18" charset="0"/>
                 <a:cs typeface="Times New Roman" panose="02020603050405020304" pitchFamily="18" charset="0"/>
-                <a:hlinkClick r:id="rId3"/>
+                <a:hlinkClick r:id="rId4"/>
               </a:rPr>
               <a:t>PHRED</a:t>
             </a:r>
@@ -30743,7 +32488,7 @@
     </p:spTree>
     <p:extLst>
       <p:ext uri="{BB962C8B-B14F-4D97-AF65-F5344CB8AC3E}">
-        <p14:creationId xmlns:p14="http://schemas.microsoft.com/office/powerpoint/2010/main" val="2463972691"/>
+        <p14:creationId xmlns:p14="http://schemas.microsoft.com/office/powerpoint/2010/main" val="1461849939"/>
       </p:ext>
     </p:extLst>
   </p:cSld>
@@ -30781,9 +32526,9 @@
                                   <p:childTnLst>
                                     <p:animEffect transition="out" filter="fade">
                                       <p:cBhvr>
-                                        <p:cTn id="6" dur="1000"/>
+                                        <p:cTn id="6" dur="2000"/>
                                         <p:tgtEl>
-                                          <p:spTgt spid="14"/>
+                                          <p:spTgt spid="29"/>
                                         </p:tgtEl>
                                       </p:cBhvr>
                                     </p:animEffect>
@@ -30791,11 +32536,11 @@
                                       <p:cBhvr>
                                         <p:cTn id="7" dur="1" fill="hold">
                                           <p:stCondLst>
-                                            <p:cond delay="999"/>
+                                            <p:cond delay="1999"/>
                                           </p:stCondLst>
                                         </p:cTn>
                                         <p:tgtEl>
-                                          <p:spTgt spid="14"/>
+                                          <p:spTgt spid="29"/>
                                         </p:tgtEl>
                                         <p:attrNameLst>
                                           <p:attrName>style.visibility</p:attrName>
@@ -30822,7 +32567,7 @@
                                           </p:stCondLst>
                                         </p:cTn>
                                         <p:tgtEl>
-                                          <p:spTgt spid="15"/>
+                                          <p:spTgt spid="33"/>
                                         </p:tgtEl>
                                         <p:attrNameLst>
                                           <p:attrName>style.visibility</p:attrName>
@@ -30836,7 +32581,7 @@
                                       <p:cBhvr>
                                         <p:cTn id="10" dur="2000"/>
                                         <p:tgtEl>
-                                          <p:spTgt spid="15"/>
+                                          <p:spTgt spid="33"/>
                                         </p:tgtEl>
                                       </p:cBhvr>
                                     </p:animEffect>
@@ -30866,7 +32611,7 @@
                                           </p:stCondLst>
                                         </p:cTn>
                                         <p:tgtEl>
-                                          <p:spTgt spid="4"/>
+                                          <p:spTgt spid="6"/>
                                         </p:tgtEl>
                                         <p:attrNameLst>
                                           <p:attrName>style.visibility</p:attrName>
@@ -30878,9 +32623,9 @@
                                     </p:set>
                                     <p:animEffect transition="in" filter="wipe(left)">
                                       <p:cBhvr>
-                                        <p:cTn id="14" dur="2300"/>
+                                        <p:cTn id="14" dur="2000"/>
                                         <p:tgtEl>
-                                          <p:spTgt spid="4"/>
+                                          <p:spTgt spid="6"/>
                                         </p:tgtEl>
                                       </p:cBhvr>
                                     </p:animEffect>
@@ -30919,7 +32664,7 @@
                                           </p:stCondLst>
                                         </p:cTn>
                                         <p:tgtEl>
-                                          <p:spTgt spid="6"/>
+                                          <p:spTgt spid="7"/>
                                         </p:tgtEl>
                                         <p:attrNameLst>
                                           <p:attrName>style.visibility</p:attrName>
@@ -30933,7 +32678,7 @@
                                       <p:cBhvr>
                                         <p:cTn id="19" dur="2000"/>
                                         <p:tgtEl>
-                                          <p:spTgt spid="6"/>
+                                          <p:spTgt spid="7"/>
                                         </p:tgtEl>
                                       </p:cBhvr>
                                     </p:animEffect>
@@ -30950,7 +32695,7 @@
                                       <p:cBhvr rctx="PPT">
                                         <p:cTn id="21" dur="indefinite"/>
                                         <p:tgtEl>
-                                          <p:spTgt spid="4"/>
+                                          <p:spTgt spid="6"/>
                                         </p:tgtEl>
                                         <p:attrNameLst>
                                           <p:attrName>style.opacity</p:attrName>
@@ -30964,7 +32709,7 @@
                                       <p:cBhvr rctx="IE">
                                         <p:cTn id="22" dur="indefinite"/>
                                         <p:tgtEl>
-                                          <p:spTgt spid="4"/>
+                                          <p:spTgt spid="6"/>
                                         </p:tgtEl>
                                       </p:cBhvr>
                                     </p:animEffect>
@@ -31003,7 +32748,7 @@
                                           </p:stCondLst>
                                         </p:cTn>
                                         <p:tgtEl>
-                                          <p:spTgt spid="7"/>
+                                          <p:spTgt spid="8"/>
                                         </p:tgtEl>
                                         <p:attrNameLst>
                                           <p:attrName>style.visibility</p:attrName>
@@ -31017,7 +32762,7 @@
                                       <p:cBhvr>
                                         <p:cTn id="27" dur="2000"/>
                                         <p:tgtEl>
-                                          <p:spTgt spid="7"/>
+                                          <p:spTgt spid="8"/>
                                         </p:tgtEl>
                                       </p:cBhvr>
                                     </p:animEffect>
@@ -31034,7 +32779,7 @@
                                       <p:cBhvr rctx="PPT">
                                         <p:cTn id="29" dur="indefinite"/>
                                         <p:tgtEl>
-                                          <p:spTgt spid="6"/>
+                                          <p:spTgt spid="7"/>
                                         </p:tgtEl>
                                         <p:attrNameLst>
                                           <p:attrName>style.opacity</p:attrName>
@@ -31048,7 +32793,7 @@
                                       <p:cBhvr rctx="IE">
                                         <p:cTn id="30" dur="indefinite"/>
                                         <p:tgtEl>
-                                          <p:spTgt spid="6"/>
+                                          <p:spTgt spid="7"/>
                                         </p:tgtEl>
                                       </p:cBhvr>
                                     </p:animEffect>
@@ -31065,7 +32810,7 @@
                             </p:stCondLst>
                             <p:childTnLst>
                               <p:par>
-                                <p:cTn id="32" presetID="22" presetClass="entr" presetSubtype="8" fill="hold" grpId="1" nodeType="afterEffect">
+                                <p:cTn id="32" presetID="16" presetClass="entr" presetSubtype="21" fill="hold" nodeType="afterEffect">
                                   <p:stCondLst>
                                     <p:cond delay="0"/>
                                   </p:stCondLst>
@@ -31078,7 +32823,7 @@
                                           </p:stCondLst>
                                         </p:cTn>
                                         <p:tgtEl>
-                                          <p:spTgt spid="12"/>
+                                          <p:spTgt spid="1026"/>
                                         </p:tgtEl>
                                         <p:attrNameLst>
                                           <p:attrName>style.visibility</p:attrName>
@@ -31088,11 +32833,11 @@
                                         <p:strVal val="visible"/>
                                       </p:to>
                                     </p:set>
-                                    <p:animEffect transition="in" filter="wipe(left)">
+                                    <p:animEffect transition="in" filter="barn(inVertical)">
                                       <p:cBhvr>
                                         <p:cTn id="34" dur="2000"/>
                                         <p:tgtEl>
-                                          <p:spTgt spid="12"/>
+                                          <p:spTgt spid="1026"/>
                                         </p:tgtEl>
                                       </p:cBhvr>
                                     </p:animEffect>
@@ -31131,7 +32876,7 @@
                                           </p:stCondLst>
                                         </p:cTn>
                                         <p:tgtEl>
-                                          <p:spTgt spid="10"/>
+                                          <p:spTgt spid="9"/>
                                         </p:tgtEl>
                                         <p:attrNameLst>
                                           <p:attrName>style.visibility</p:attrName>
@@ -31145,7 +32890,7 @@
                                       <p:cBhvr>
                                         <p:cTn id="39" dur="2000"/>
                                         <p:tgtEl>
-                                          <p:spTgt spid="10"/>
+                                          <p:spTgt spid="9"/>
                                         </p:tgtEl>
                                       </p:cBhvr>
                                     </p:animEffect>
@@ -31162,7 +32907,7 @@
                                       <p:cBhvr rctx="PPT">
                                         <p:cTn id="41" dur="indefinite"/>
                                         <p:tgtEl>
-                                          <p:spTgt spid="7"/>
+                                          <p:spTgt spid="8"/>
                                         </p:tgtEl>
                                         <p:attrNameLst>
                                           <p:attrName>style.opacity</p:attrName>
@@ -31176,7 +32921,7 @@
                                       <p:cBhvr rctx="IE">
                                         <p:cTn id="42" dur="indefinite"/>
                                         <p:tgtEl>
-                                          <p:spTgt spid="7"/>
+                                          <p:spTgt spid="8"/>
                                         </p:tgtEl>
                                       </p:cBhvr>
                                     </p:animEffect>
@@ -31186,30 +32931,56 @@
                             </p:childTnLst>
                           </p:cTn>
                         </p:par>
-                      </p:childTnLst>
-                    </p:cTn>
-                  </p:par>
-                  <p:par>
-                    <p:cTn id="43" fill="hold">
-                      <p:stCondLst>
-                        <p:cond delay="indefinite"/>
-                      </p:stCondLst>
-                      <p:childTnLst>
                         <p:par>
-                          <p:cTn id="44" fill="hold">
+                          <p:cTn id="43" fill="hold">
                             <p:stCondLst>
-                              <p:cond delay="0"/>
+                              <p:cond delay="2000"/>
                             </p:stCondLst>
                             <p:childTnLst>
                               <p:par>
-                                <p:cTn id="45" presetID="22" presetClass="entr" presetSubtype="8" fill="hold" grpId="1" nodeType="clickEffect">
+                                <p:cTn id="44" presetID="22" presetClass="entr" presetSubtype="2" fill="hold" grpId="0" nodeType="afterEffect">
                                   <p:stCondLst>
                                     <p:cond delay="0"/>
                                   </p:stCondLst>
                                   <p:childTnLst>
                                     <p:set>
                                       <p:cBhvr>
-                                        <p:cTn id="46" dur="1" fill="hold">
+                                        <p:cTn id="45" dur="1" fill="hold">
+                                          <p:stCondLst>
+                                            <p:cond delay="0"/>
+                                          </p:stCondLst>
+                                        </p:cTn>
+                                        <p:tgtEl>
+                                          <p:spTgt spid="4"/>
+                                        </p:tgtEl>
+                                        <p:attrNameLst>
+                                          <p:attrName>style.visibility</p:attrName>
+                                        </p:attrNameLst>
+                                      </p:cBhvr>
+                                      <p:to>
+                                        <p:strVal val="visible"/>
+                                      </p:to>
+                                    </p:set>
+                                    <p:animEffect transition="in" filter="wipe(right)">
+                                      <p:cBhvr>
+                                        <p:cTn id="46" dur="1000"/>
+                                        <p:tgtEl>
+                                          <p:spTgt spid="4"/>
+                                        </p:tgtEl>
+                                      </p:cBhvr>
+                                    </p:animEffect>
+                                  </p:childTnLst>
+                                </p:cTn>
+                              </p:par>
+                              <p:par>
+                                <p:cTn id="47" presetID="22" presetClass="entr" presetSubtype="2" fill="hold" grpId="0" nodeType="withEffect">
+                                  <p:stCondLst>
+                                    <p:cond delay="0"/>
+                                  </p:stCondLst>
+                                  <p:childTnLst>
+                                    <p:set>
+                                      <p:cBhvr>
+                                        <p:cTn id="48" dur="1" fill="hold">
                                           <p:stCondLst>
                                             <p:cond delay="0"/>
                                           </p:stCondLst>
@@ -31225,11 +32996,169 @@
                                         <p:strVal val="visible"/>
                                       </p:to>
                                     </p:set>
+                                    <p:animEffect transition="in" filter="wipe(right)">
+                                      <p:cBhvr>
+                                        <p:cTn id="49" dur="1000"/>
+                                        <p:tgtEl>
+                                          <p:spTgt spid="11"/>
+                                        </p:tgtEl>
+                                      </p:cBhvr>
+                                    </p:animEffect>
+                                  </p:childTnLst>
+                                </p:cTn>
+                              </p:par>
+                            </p:childTnLst>
+                          </p:cTn>
+                        </p:par>
+                        <p:par>
+                          <p:cTn id="50" fill="hold">
+                            <p:stCondLst>
+                              <p:cond delay="3000"/>
+                            </p:stCondLst>
+                            <p:childTnLst>
+                              <p:par>
+                                <p:cTn id="51" presetID="22" presetClass="entr" presetSubtype="2" fill="hold" nodeType="afterEffect">
+                                  <p:stCondLst>
+                                    <p:cond delay="0"/>
+                                  </p:stCondLst>
+                                  <p:childTnLst>
+                                    <p:set>
+                                      <p:cBhvr>
+                                        <p:cTn id="52" dur="1" fill="hold">
+                                          <p:stCondLst>
+                                            <p:cond delay="0"/>
+                                          </p:stCondLst>
+                                        </p:cTn>
+                                        <p:tgtEl>
+                                          <p:spTgt spid="14"/>
+                                        </p:tgtEl>
+                                        <p:attrNameLst>
+                                          <p:attrName>style.visibility</p:attrName>
+                                        </p:attrNameLst>
+                                      </p:cBhvr>
+                                      <p:to>
+                                        <p:strVal val="visible"/>
+                                      </p:to>
+                                    </p:set>
+                                    <p:animEffect transition="in" filter="wipe(right)">
+                                      <p:cBhvr>
+                                        <p:cTn id="53" dur="1000"/>
+                                        <p:tgtEl>
+                                          <p:spTgt spid="14"/>
+                                        </p:tgtEl>
+                                      </p:cBhvr>
+                                    </p:animEffect>
+                                  </p:childTnLst>
+                                </p:cTn>
+                              </p:par>
+                              <p:par>
+                                <p:cTn id="54" presetID="22" presetClass="entr" presetSubtype="8" fill="hold" grpId="0" nodeType="withEffect">
+                                  <p:stCondLst>
+                                    <p:cond delay="0"/>
+                                  </p:stCondLst>
+                                  <p:childTnLst>
+                                    <p:set>
+                                      <p:cBhvr>
+                                        <p:cTn id="55" dur="1" fill="hold">
+                                          <p:stCondLst>
+                                            <p:cond delay="0"/>
+                                          </p:stCondLst>
+                                        </p:cTn>
+                                        <p:tgtEl>
+                                          <p:spTgt spid="12"/>
+                                        </p:tgtEl>
+                                        <p:attrNameLst>
+                                          <p:attrName>style.visibility</p:attrName>
+                                        </p:attrNameLst>
+                                      </p:cBhvr>
+                                      <p:to>
+                                        <p:strVal val="visible"/>
+                                      </p:to>
+                                    </p:set>
                                     <p:animEffect transition="in" filter="wipe(left)">
                                       <p:cBhvr>
-                                        <p:cTn id="47" dur="2000"/>
+                                        <p:cTn id="56" dur="1000"/>
                                         <p:tgtEl>
-                                          <p:spTgt spid="11"/>
+                                          <p:spTgt spid="12"/>
+                                        </p:tgtEl>
+                                      </p:cBhvr>
+                                    </p:animEffect>
+                                  </p:childTnLst>
+                                </p:cTn>
+                              </p:par>
+                              <p:par>
+                                <p:cTn id="57" presetID="22" presetClass="entr" presetSubtype="8" fill="hold" grpId="0" nodeType="withEffect">
+                                  <p:stCondLst>
+                                    <p:cond delay="0"/>
+                                  </p:stCondLst>
+                                  <p:childTnLst>
+                                    <p:set>
+                                      <p:cBhvr>
+                                        <p:cTn id="58" dur="1" fill="hold">
+                                          <p:stCondLst>
+                                            <p:cond delay="0"/>
+                                          </p:stCondLst>
+                                        </p:cTn>
+                                        <p:tgtEl>
+                                          <p:spTgt spid="22"/>
+                                        </p:tgtEl>
+                                        <p:attrNameLst>
+                                          <p:attrName>style.visibility</p:attrName>
+                                        </p:attrNameLst>
+                                      </p:cBhvr>
+                                      <p:to>
+                                        <p:strVal val="visible"/>
+                                      </p:to>
+                                    </p:set>
+                                    <p:animEffect transition="in" filter="wipe(left)">
+                                      <p:cBhvr>
+                                        <p:cTn id="59" dur="1000"/>
+                                        <p:tgtEl>
+                                          <p:spTgt spid="22"/>
+                                        </p:tgtEl>
+                                      </p:cBhvr>
+                                    </p:animEffect>
+                                  </p:childTnLst>
+                                </p:cTn>
+                              </p:par>
+                            </p:childTnLst>
+                          </p:cTn>
+                        </p:par>
+                        <p:par>
+                          <p:cTn id="60" fill="hold">
+                            <p:stCondLst>
+                              <p:cond delay="4000"/>
+                            </p:stCondLst>
+                            <p:childTnLst>
+                              <p:par>
+                                <p:cTn id="61" presetID="22" presetClass="entr" presetSubtype="8" fill="hold" nodeType="afterEffect">
+                                  <p:stCondLst>
+                                    <p:cond delay="0"/>
+                                  </p:stCondLst>
+                                  <p:childTnLst>
+                                    <p:set>
+                                      <p:cBhvr>
+                                        <p:cTn id="62" dur="1" fill="hold">
+                                          <p:stCondLst>
+                                            <p:cond delay="0"/>
+                                          </p:stCondLst>
+                                        </p:cTn>
+                                        <p:tgtEl>
+                                          <p:spTgt spid="23"/>
+                                        </p:tgtEl>
+                                        <p:attrNameLst>
+                                          <p:attrName>style.visibility</p:attrName>
+                                        </p:attrNameLst>
+                                      </p:cBhvr>
+                                      <p:to>
+                                        <p:strVal val="visible"/>
+                                      </p:to>
+                                    </p:set>
+                                    <p:animEffect transition="in" filter="wipe(left)">
+                                      <p:cBhvr>
+                                        <p:cTn id="63" dur="1000"/>
+                                        <p:tgtEl>
+                                          <p:spTgt spid="23"/>
                                         </p:tgtEl>
                                       </p:cBhvr>
                                     </p:animEffect>
@@ -31264,17 +33193,19 @@
       </p:par>
     </p:tnLst>
     <p:bldLst>
-      <p:bldP spid="14" grpId="0" animBg="1"/>
-      <p:bldP spid="4" grpId="0" animBg="1"/>
-      <p:bldP spid="4" grpId="1" animBg="1"/>
       <p:bldP spid="6" grpId="0" animBg="1"/>
       <p:bldP spid="6" grpId="1" animBg="1"/>
       <p:bldP spid="7" grpId="0" animBg="1"/>
       <p:bldP spid="7" grpId="1" animBg="1"/>
-      <p:bldP spid="10" grpId="1" animBg="1"/>
-      <p:bldP spid="11" grpId="1" animBg="1"/>
-      <p:bldP spid="12" grpId="1" animBg="1"/>
-      <p:bldP spid="15" grpId="0" animBg="1"/>
+      <p:bldP spid="8" grpId="0" animBg="1"/>
+      <p:bldP spid="8" grpId="1" animBg="1"/>
+      <p:bldP spid="9" grpId="1" animBg="1"/>
+      <p:bldP spid="4" grpId="0" animBg="1"/>
+      <p:bldP spid="12" grpId="0" animBg="1"/>
+      <p:bldP spid="11" grpId="0" animBg="1"/>
+      <p:bldP spid="22" grpId="0" animBg="1"/>
+      <p:bldP spid="29" grpId="0" animBg="1"/>
+      <p:bldP spid="33" grpId="0" animBg="1"/>
     </p:bldLst>
   </p:timing>
 </p:sld>

</xml_diff>

<commit_message>
Added graph to FASTQ
 Changes to be committed:
	modified:   Flip Presentations/NGS_Intro/00-FASTA_FASTQ_PHRED_ASCII/00-FASTQ_PHRED_ASCII.pptx
	new file:   Flip Presentations/NGS_Intro/00-FASTA_FASTQ_PHRED_ASCII/Materials/images.png
	new file:   Flip Presentations/NGS_Intro/00-FASTA_FASTQ_PHRED_ASCII/Materials/imagesedited.png
	deleted:    Flip Presentations/NGS_Intro/00-FASTA_FASTQ_PHRED_ASCII/~$00-FASTQ_PHRED_ASCII.pptx
</commit_message>
<xml_diff>
--- a/Flip Presentations/NGS_Intro/00-FASTA_FASTQ_PHRED_ASCII/00-FASTQ_PHRED_ASCII.pptx
+++ b/Flip Presentations/NGS_Intro/00-FASTA_FASTQ_PHRED_ASCII/00-FASTQ_PHRED_ASCII.pptx
@@ -128,7 +128,7 @@
   </p:defaultTextStyle>
   <p:extLst>
     <p:ext uri="{EFAFB233-063F-42B5-8137-9DF3F51BA10A}">
-      <p15:sldGuideLst xmlns="" xmlns:p15="http://schemas.microsoft.com/office/powerpoint/2012/main"/>
+      <p15:sldGuideLst xmlns:p15="http://schemas.microsoft.com/office/powerpoint/2012/main" xmlns=""/>
     </p:ext>
   </p:extLst>
 </p:presentation>
@@ -220,7 +220,7 @@
           <a:p>
             <a:fld id="{A1A0514D-38CC-49F5-A912-2794DAAF3AC3}" type="datetimeFigureOut">
               <a:rPr lang="en-GB" smtClean="0"/>
-              <a:t>2018-03-04</a:t>
+              <a:t>2018-03-15</a:t>
             </a:fld>
             <a:endParaRPr lang="en-GB"/>
           </a:p>
@@ -2193,7 +2193,6 @@
               <a:rPr lang="en-GB" b="1" baseline="0" dirty="0" smtClean="0"/>
               <a:t>(P)</a:t>
             </a:r>
-            <a:endParaRPr lang="en-GB" b="1" baseline="0" dirty="0" smtClean="0"/>
           </a:p>
         </p:txBody>
       </p:sp>
@@ -2339,7 +2338,7 @@
           <p:cNvPr id="2" name="Title 1">
             <a:extLst>
               <a:ext uri="{FF2B5EF4-FFF2-40B4-BE49-F238E27FC236}">
-                <a16:creationId xmlns="" xmlns:a16="http://schemas.microsoft.com/office/drawing/2014/main" id="{032A3615-1B4F-418D-B0BB-CBD54E1C819E}"/>
+                <a16:creationId xmlns:a16="http://schemas.microsoft.com/office/drawing/2014/main" xmlns="" id="{032A3615-1B4F-418D-B0BB-CBD54E1C819E}"/>
               </a:ext>
             </a:extLst>
           </p:cNvPr>
@@ -2377,7 +2376,7 @@
           <p:cNvPr id="3" name="Subtitle 2">
             <a:extLst>
               <a:ext uri="{FF2B5EF4-FFF2-40B4-BE49-F238E27FC236}">
-                <a16:creationId xmlns="" xmlns:a16="http://schemas.microsoft.com/office/drawing/2014/main" id="{5178CFA0-D280-4CD5-A213-7111D5B1C049}"/>
+                <a16:creationId xmlns:a16="http://schemas.microsoft.com/office/drawing/2014/main" xmlns="" id="{5178CFA0-D280-4CD5-A213-7111D5B1C049}"/>
               </a:ext>
             </a:extLst>
           </p:cNvPr>
@@ -2448,7 +2447,7 @@
           <p:cNvPr id="4" name="Date Placeholder 3">
             <a:extLst>
               <a:ext uri="{FF2B5EF4-FFF2-40B4-BE49-F238E27FC236}">
-                <a16:creationId xmlns="" xmlns:a16="http://schemas.microsoft.com/office/drawing/2014/main" id="{6437010A-E880-4C2E-8F4F-2C9DE975306A}"/>
+                <a16:creationId xmlns:a16="http://schemas.microsoft.com/office/drawing/2014/main" xmlns="" id="{6437010A-E880-4C2E-8F4F-2C9DE975306A}"/>
               </a:ext>
             </a:extLst>
           </p:cNvPr>
@@ -2466,7 +2465,7 @@
           <a:p>
             <a:fld id="{AEC09C50-853A-420B-8C26-7439C86401C0}" type="datetimeFigureOut">
               <a:rPr lang="en-GB" smtClean="0"/>
-              <a:t>2018-03-04</a:t>
+              <a:t>2018-03-15</a:t>
             </a:fld>
             <a:endParaRPr lang="en-GB"/>
           </a:p>
@@ -2477,7 +2476,7 @@
           <p:cNvPr id="5" name="Footer Placeholder 4">
             <a:extLst>
               <a:ext uri="{FF2B5EF4-FFF2-40B4-BE49-F238E27FC236}">
-                <a16:creationId xmlns="" xmlns:a16="http://schemas.microsoft.com/office/drawing/2014/main" id="{9F643F16-915B-4F04-8319-7D1C8C69C781}"/>
+                <a16:creationId xmlns:a16="http://schemas.microsoft.com/office/drawing/2014/main" xmlns="" id="{9F643F16-915B-4F04-8319-7D1C8C69C781}"/>
               </a:ext>
             </a:extLst>
           </p:cNvPr>
@@ -2502,7 +2501,7 @@
           <p:cNvPr id="6" name="Slide Number Placeholder 5">
             <a:extLst>
               <a:ext uri="{FF2B5EF4-FFF2-40B4-BE49-F238E27FC236}">
-                <a16:creationId xmlns="" xmlns:a16="http://schemas.microsoft.com/office/drawing/2014/main" id="{A5A1F72C-9F07-4EFA-8E45-090190D59EFA}"/>
+                <a16:creationId xmlns:a16="http://schemas.microsoft.com/office/drawing/2014/main" xmlns="" id="{A5A1F72C-9F07-4EFA-8E45-090190D59EFA}"/>
               </a:ext>
             </a:extLst>
           </p:cNvPr>
@@ -2561,7 +2560,7 @@
           <p:cNvPr id="2" name="Title 1">
             <a:extLst>
               <a:ext uri="{FF2B5EF4-FFF2-40B4-BE49-F238E27FC236}">
-                <a16:creationId xmlns="" xmlns:a16="http://schemas.microsoft.com/office/drawing/2014/main" id="{DF0ADA25-4CDF-4246-9CC9-8AE3380619F1}"/>
+                <a16:creationId xmlns:a16="http://schemas.microsoft.com/office/drawing/2014/main" xmlns="" id="{DF0ADA25-4CDF-4246-9CC9-8AE3380619F1}"/>
               </a:ext>
             </a:extLst>
           </p:cNvPr>
@@ -2590,7 +2589,7 @@
           <p:cNvPr id="3" name="Vertical Text Placeholder 2">
             <a:extLst>
               <a:ext uri="{FF2B5EF4-FFF2-40B4-BE49-F238E27FC236}">
-                <a16:creationId xmlns="" xmlns:a16="http://schemas.microsoft.com/office/drawing/2014/main" id="{A73B0C6F-4850-4D10-91DC-61668DE50E5A}"/>
+                <a16:creationId xmlns:a16="http://schemas.microsoft.com/office/drawing/2014/main" xmlns="" id="{A73B0C6F-4850-4D10-91DC-61668DE50E5A}"/>
               </a:ext>
             </a:extLst>
           </p:cNvPr>
@@ -2648,7 +2647,7 @@
           <p:cNvPr id="4" name="Date Placeholder 3">
             <a:extLst>
               <a:ext uri="{FF2B5EF4-FFF2-40B4-BE49-F238E27FC236}">
-                <a16:creationId xmlns="" xmlns:a16="http://schemas.microsoft.com/office/drawing/2014/main" id="{28816B05-7093-4142-B374-DFA2171DFDA7}"/>
+                <a16:creationId xmlns:a16="http://schemas.microsoft.com/office/drawing/2014/main" xmlns="" id="{28816B05-7093-4142-B374-DFA2171DFDA7}"/>
               </a:ext>
             </a:extLst>
           </p:cNvPr>
@@ -2666,7 +2665,7 @@
           <a:p>
             <a:fld id="{AEC09C50-853A-420B-8C26-7439C86401C0}" type="datetimeFigureOut">
               <a:rPr lang="en-GB" smtClean="0"/>
-              <a:t>2018-03-04</a:t>
+              <a:t>2018-03-15</a:t>
             </a:fld>
             <a:endParaRPr lang="en-GB"/>
           </a:p>
@@ -2677,7 +2676,7 @@
           <p:cNvPr id="5" name="Footer Placeholder 4">
             <a:extLst>
               <a:ext uri="{FF2B5EF4-FFF2-40B4-BE49-F238E27FC236}">
-                <a16:creationId xmlns="" xmlns:a16="http://schemas.microsoft.com/office/drawing/2014/main" id="{F8D052D6-AC53-4967-A0E2-E4E4AB61FF09}"/>
+                <a16:creationId xmlns:a16="http://schemas.microsoft.com/office/drawing/2014/main" xmlns="" id="{F8D052D6-AC53-4967-A0E2-E4E4AB61FF09}"/>
               </a:ext>
             </a:extLst>
           </p:cNvPr>
@@ -2702,7 +2701,7 @@
           <p:cNvPr id="6" name="Slide Number Placeholder 5">
             <a:extLst>
               <a:ext uri="{FF2B5EF4-FFF2-40B4-BE49-F238E27FC236}">
-                <a16:creationId xmlns="" xmlns:a16="http://schemas.microsoft.com/office/drawing/2014/main" id="{209C7226-9CDD-405A-B9DA-D5ED9561A32C}"/>
+                <a16:creationId xmlns:a16="http://schemas.microsoft.com/office/drawing/2014/main" xmlns="" id="{209C7226-9CDD-405A-B9DA-D5ED9561A32C}"/>
               </a:ext>
             </a:extLst>
           </p:cNvPr>
@@ -2761,7 +2760,7 @@
           <p:cNvPr id="2" name="Vertical Title 1">
             <a:extLst>
               <a:ext uri="{FF2B5EF4-FFF2-40B4-BE49-F238E27FC236}">
-                <a16:creationId xmlns="" xmlns:a16="http://schemas.microsoft.com/office/drawing/2014/main" id="{AC8F15DC-2850-4805-BE66-C8A705279A00}"/>
+                <a16:creationId xmlns:a16="http://schemas.microsoft.com/office/drawing/2014/main" xmlns="" id="{AC8F15DC-2850-4805-BE66-C8A705279A00}"/>
               </a:ext>
             </a:extLst>
           </p:cNvPr>
@@ -2795,7 +2794,7 @@
           <p:cNvPr id="3" name="Vertical Text Placeholder 2">
             <a:extLst>
               <a:ext uri="{FF2B5EF4-FFF2-40B4-BE49-F238E27FC236}">
-                <a16:creationId xmlns="" xmlns:a16="http://schemas.microsoft.com/office/drawing/2014/main" id="{C357DFB2-B690-4D71-9FB8-516ED75975FD}"/>
+                <a16:creationId xmlns:a16="http://schemas.microsoft.com/office/drawing/2014/main" xmlns="" id="{C357DFB2-B690-4D71-9FB8-516ED75975FD}"/>
               </a:ext>
             </a:extLst>
           </p:cNvPr>
@@ -2858,7 +2857,7 @@
           <p:cNvPr id="4" name="Date Placeholder 3">
             <a:extLst>
               <a:ext uri="{FF2B5EF4-FFF2-40B4-BE49-F238E27FC236}">
-                <a16:creationId xmlns="" xmlns:a16="http://schemas.microsoft.com/office/drawing/2014/main" id="{6CA1D11A-42DD-417D-AC4D-52096BB89234}"/>
+                <a16:creationId xmlns:a16="http://schemas.microsoft.com/office/drawing/2014/main" xmlns="" id="{6CA1D11A-42DD-417D-AC4D-52096BB89234}"/>
               </a:ext>
             </a:extLst>
           </p:cNvPr>
@@ -2876,7 +2875,7 @@
           <a:p>
             <a:fld id="{AEC09C50-853A-420B-8C26-7439C86401C0}" type="datetimeFigureOut">
               <a:rPr lang="en-GB" smtClean="0"/>
-              <a:t>2018-03-04</a:t>
+              <a:t>2018-03-15</a:t>
             </a:fld>
             <a:endParaRPr lang="en-GB"/>
           </a:p>
@@ -2887,7 +2886,7 @@
           <p:cNvPr id="5" name="Footer Placeholder 4">
             <a:extLst>
               <a:ext uri="{FF2B5EF4-FFF2-40B4-BE49-F238E27FC236}">
-                <a16:creationId xmlns="" xmlns:a16="http://schemas.microsoft.com/office/drawing/2014/main" id="{24E0F641-8F99-48B8-8C2B-0535E04FC772}"/>
+                <a16:creationId xmlns:a16="http://schemas.microsoft.com/office/drawing/2014/main" xmlns="" id="{24E0F641-8F99-48B8-8C2B-0535E04FC772}"/>
               </a:ext>
             </a:extLst>
           </p:cNvPr>
@@ -2912,7 +2911,7 @@
           <p:cNvPr id="6" name="Slide Number Placeholder 5">
             <a:extLst>
               <a:ext uri="{FF2B5EF4-FFF2-40B4-BE49-F238E27FC236}">
-                <a16:creationId xmlns="" xmlns:a16="http://schemas.microsoft.com/office/drawing/2014/main" id="{F5D90570-5593-43EA-ADD8-E7B87D770333}"/>
+                <a16:creationId xmlns:a16="http://schemas.microsoft.com/office/drawing/2014/main" xmlns="" id="{F5D90570-5593-43EA-ADD8-E7B87D770333}"/>
               </a:ext>
             </a:extLst>
           </p:cNvPr>
@@ -2971,7 +2970,7 @@
           <p:cNvPr id="2" name="Title 1">
             <a:extLst>
               <a:ext uri="{FF2B5EF4-FFF2-40B4-BE49-F238E27FC236}">
-                <a16:creationId xmlns="" xmlns:a16="http://schemas.microsoft.com/office/drawing/2014/main" id="{B98979EE-87BC-427F-94CA-2C281566B09A}"/>
+                <a16:creationId xmlns:a16="http://schemas.microsoft.com/office/drawing/2014/main" xmlns="" id="{B98979EE-87BC-427F-94CA-2C281566B09A}"/>
               </a:ext>
             </a:extLst>
           </p:cNvPr>
@@ -3000,7 +2999,7 @@
           <p:cNvPr id="3" name="Content Placeholder 2">
             <a:extLst>
               <a:ext uri="{FF2B5EF4-FFF2-40B4-BE49-F238E27FC236}">
-                <a16:creationId xmlns="" xmlns:a16="http://schemas.microsoft.com/office/drawing/2014/main" id="{08E844DF-4E79-432A-89FF-B27AE73F8DFC}"/>
+                <a16:creationId xmlns:a16="http://schemas.microsoft.com/office/drawing/2014/main" xmlns="" id="{08E844DF-4E79-432A-89FF-B27AE73F8DFC}"/>
               </a:ext>
             </a:extLst>
           </p:cNvPr>
@@ -3058,7 +3057,7 @@
           <p:cNvPr id="4" name="Date Placeholder 3">
             <a:extLst>
               <a:ext uri="{FF2B5EF4-FFF2-40B4-BE49-F238E27FC236}">
-                <a16:creationId xmlns="" xmlns:a16="http://schemas.microsoft.com/office/drawing/2014/main" id="{8B91852C-926C-48F7-8D30-64C8DA09313F}"/>
+                <a16:creationId xmlns:a16="http://schemas.microsoft.com/office/drawing/2014/main" xmlns="" id="{8B91852C-926C-48F7-8D30-64C8DA09313F}"/>
               </a:ext>
             </a:extLst>
           </p:cNvPr>
@@ -3076,7 +3075,7 @@
           <a:p>
             <a:fld id="{AEC09C50-853A-420B-8C26-7439C86401C0}" type="datetimeFigureOut">
               <a:rPr lang="en-GB" smtClean="0"/>
-              <a:t>2018-03-04</a:t>
+              <a:t>2018-03-15</a:t>
             </a:fld>
             <a:endParaRPr lang="en-GB"/>
           </a:p>
@@ -3087,7 +3086,7 @@
           <p:cNvPr id="5" name="Footer Placeholder 4">
             <a:extLst>
               <a:ext uri="{FF2B5EF4-FFF2-40B4-BE49-F238E27FC236}">
-                <a16:creationId xmlns="" xmlns:a16="http://schemas.microsoft.com/office/drawing/2014/main" id="{546A3794-73BB-4394-B312-0810CC8D282B}"/>
+                <a16:creationId xmlns:a16="http://schemas.microsoft.com/office/drawing/2014/main" xmlns="" id="{546A3794-73BB-4394-B312-0810CC8D282B}"/>
               </a:ext>
             </a:extLst>
           </p:cNvPr>
@@ -3112,7 +3111,7 @@
           <p:cNvPr id="6" name="Slide Number Placeholder 5">
             <a:extLst>
               <a:ext uri="{FF2B5EF4-FFF2-40B4-BE49-F238E27FC236}">
-                <a16:creationId xmlns="" xmlns:a16="http://schemas.microsoft.com/office/drawing/2014/main" id="{07786F77-2E2A-4620-93A8-BA28C7D5968E}"/>
+                <a16:creationId xmlns:a16="http://schemas.microsoft.com/office/drawing/2014/main" xmlns="" id="{07786F77-2E2A-4620-93A8-BA28C7D5968E}"/>
               </a:ext>
             </a:extLst>
           </p:cNvPr>
@@ -3171,7 +3170,7 @@
           <p:cNvPr id="2" name="Title 1">
             <a:extLst>
               <a:ext uri="{FF2B5EF4-FFF2-40B4-BE49-F238E27FC236}">
-                <a16:creationId xmlns="" xmlns:a16="http://schemas.microsoft.com/office/drawing/2014/main" id="{AAAC300C-DDCD-4815-A851-D27410C002C4}"/>
+                <a16:creationId xmlns:a16="http://schemas.microsoft.com/office/drawing/2014/main" xmlns="" id="{AAAC300C-DDCD-4815-A851-D27410C002C4}"/>
               </a:ext>
             </a:extLst>
           </p:cNvPr>
@@ -3209,7 +3208,7 @@
           <p:cNvPr id="3" name="Text Placeholder 2">
             <a:extLst>
               <a:ext uri="{FF2B5EF4-FFF2-40B4-BE49-F238E27FC236}">
-                <a16:creationId xmlns="" xmlns:a16="http://schemas.microsoft.com/office/drawing/2014/main" id="{71D70F57-38B3-443C-8310-1B6EF0186E83}"/>
+                <a16:creationId xmlns:a16="http://schemas.microsoft.com/office/drawing/2014/main" xmlns="" id="{71D70F57-38B3-443C-8310-1B6EF0186E83}"/>
               </a:ext>
             </a:extLst>
           </p:cNvPr>
@@ -3334,7 +3333,7 @@
           <p:cNvPr id="4" name="Date Placeholder 3">
             <a:extLst>
               <a:ext uri="{FF2B5EF4-FFF2-40B4-BE49-F238E27FC236}">
-                <a16:creationId xmlns="" xmlns:a16="http://schemas.microsoft.com/office/drawing/2014/main" id="{CEE46B92-1656-4AB0-B92C-41936E9B09B4}"/>
+                <a16:creationId xmlns:a16="http://schemas.microsoft.com/office/drawing/2014/main" xmlns="" id="{CEE46B92-1656-4AB0-B92C-41936E9B09B4}"/>
               </a:ext>
             </a:extLst>
           </p:cNvPr>
@@ -3352,7 +3351,7 @@
           <a:p>
             <a:fld id="{AEC09C50-853A-420B-8C26-7439C86401C0}" type="datetimeFigureOut">
               <a:rPr lang="en-GB" smtClean="0"/>
-              <a:t>2018-03-04</a:t>
+              <a:t>2018-03-15</a:t>
             </a:fld>
             <a:endParaRPr lang="en-GB"/>
           </a:p>
@@ -3363,7 +3362,7 @@
           <p:cNvPr id="5" name="Footer Placeholder 4">
             <a:extLst>
               <a:ext uri="{FF2B5EF4-FFF2-40B4-BE49-F238E27FC236}">
-                <a16:creationId xmlns="" xmlns:a16="http://schemas.microsoft.com/office/drawing/2014/main" id="{7DC8305A-64D0-4AFB-8642-6845BCEBBD8E}"/>
+                <a16:creationId xmlns:a16="http://schemas.microsoft.com/office/drawing/2014/main" xmlns="" id="{7DC8305A-64D0-4AFB-8642-6845BCEBBD8E}"/>
               </a:ext>
             </a:extLst>
           </p:cNvPr>
@@ -3388,7 +3387,7 @@
           <p:cNvPr id="6" name="Slide Number Placeholder 5">
             <a:extLst>
               <a:ext uri="{FF2B5EF4-FFF2-40B4-BE49-F238E27FC236}">
-                <a16:creationId xmlns="" xmlns:a16="http://schemas.microsoft.com/office/drawing/2014/main" id="{5CD65ACC-878F-4FFE-8CA3-4D11A4DF969D}"/>
+                <a16:creationId xmlns:a16="http://schemas.microsoft.com/office/drawing/2014/main" xmlns="" id="{5CD65ACC-878F-4FFE-8CA3-4D11A4DF969D}"/>
               </a:ext>
             </a:extLst>
           </p:cNvPr>
@@ -3447,7 +3446,7 @@
           <p:cNvPr id="2" name="Title 1">
             <a:extLst>
               <a:ext uri="{FF2B5EF4-FFF2-40B4-BE49-F238E27FC236}">
-                <a16:creationId xmlns="" xmlns:a16="http://schemas.microsoft.com/office/drawing/2014/main" id="{C22E1C61-B0A3-4D79-87F0-D3FE72B442EC}"/>
+                <a16:creationId xmlns:a16="http://schemas.microsoft.com/office/drawing/2014/main" xmlns="" id="{C22E1C61-B0A3-4D79-87F0-D3FE72B442EC}"/>
               </a:ext>
             </a:extLst>
           </p:cNvPr>
@@ -3476,7 +3475,7 @@
           <p:cNvPr id="3" name="Content Placeholder 2">
             <a:extLst>
               <a:ext uri="{FF2B5EF4-FFF2-40B4-BE49-F238E27FC236}">
-                <a16:creationId xmlns="" xmlns:a16="http://schemas.microsoft.com/office/drawing/2014/main" id="{8CF6C057-BBB5-4F28-A87E-105844231C32}"/>
+                <a16:creationId xmlns:a16="http://schemas.microsoft.com/office/drawing/2014/main" xmlns="" id="{8CF6C057-BBB5-4F28-A87E-105844231C32}"/>
               </a:ext>
             </a:extLst>
           </p:cNvPr>
@@ -3539,7 +3538,7 @@
           <p:cNvPr id="4" name="Content Placeholder 3">
             <a:extLst>
               <a:ext uri="{FF2B5EF4-FFF2-40B4-BE49-F238E27FC236}">
-                <a16:creationId xmlns="" xmlns:a16="http://schemas.microsoft.com/office/drawing/2014/main" id="{8C9AE18C-33A9-443E-928F-81EC04DF5738}"/>
+                <a16:creationId xmlns:a16="http://schemas.microsoft.com/office/drawing/2014/main" xmlns="" id="{8C9AE18C-33A9-443E-928F-81EC04DF5738}"/>
               </a:ext>
             </a:extLst>
           </p:cNvPr>
@@ -3602,7 +3601,7 @@
           <p:cNvPr id="5" name="Date Placeholder 4">
             <a:extLst>
               <a:ext uri="{FF2B5EF4-FFF2-40B4-BE49-F238E27FC236}">
-                <a16:creationId xmlns="" xmlns:a16="http://schemas.microsoft.com/office/drawing/2014/main" id="{41107389-B4BB-487C-995E-6E58CFAF6E9D}"/>
+                <a16:creationId xmlns:a16="http://schemas.microsoft.com/office/drawing/2014/main" xmlns="" id="{41107389-B4BB-487C-995E-6E58CFAF6E9D}"/>
               </a:ext>
             </a:extLst>
           </p:cNvPr>
@@ -3620,7 +3619,7 @@
           <a:p>
             <a:fld id="{AEC09C50-853A-420B-8C26-7439C86401C0}" type="datetimeFigureOut">
               <a:rPr lang="en-GB" smtClean="0"/>
-              <a:t>2018-03-04</a:t>
+              <a:t>2018-03-15</a:t>
             </a:fld>
             <a:endParaRPr lang="en-GB"/>
           </a:p>
@@ -3631,7 +3630,7 @@
           <p:cNvPr id="6" name="Footer Placeholder 5">
             <a:extLst>
               <a:ext uri="{FF2B5EF4-FFF2-40B4-BE49-F238E27FC236}">
-                <a16:creationId xmlns="" xmlns:a16="http://schemas.microsoft.com/office/drawing/2014/main" id="{3E9CD8BB-3986-4FA9-834F-317E88D998F2}"/>
+                <a16:creationId xmlns:a16="http://schemas.microsoft.com/office/drawing/2014/main" xmlns="" id="{3E9CD8BB-3986-4FA9-834F-317E88D998F2}"/>
               </a:ext>
             </a:extLst>
           </p:cNvPr>
@@ -3656,7 +3655,7 @@
           <p:cNvPr id="7" name="Slide Number Placeholder 6">
             <a:extLst>
               <a:ext uri="{FF2B5EF4-FFF2-40B4-BE49-F238E27FC236}">
-                <a16:creationId xmlns="" xmlns:a16="http://schemas.microsoft.com/office/drawing/2014/main" id="{8D5B0155-25C5-4F31-B914-54F60CD5DEBF}"/>
+                <a16:creationId xmlns:a16="http://schemas.microsoft.com/office/drawing/2014/main" xmlns="" id="{8D5B0155-25C5-4F31-B914-54F60CD5DEBF}"/>
               </a:ext>
             </a:extLst>
           </p:cNvPr>
@@ -3715,7 +3714,7 @@
           <p:cNvPr id="2" name="Title 1">
             <a:extLst>
               <a:ext uri="{FF2B5EF4-FFF2-40B4-BE49-F238E27FC236}">
-                <a16:creationId xmlns="" xmlns:a16="http://schemas.microsoft.com/office/drawing/2014/main" id="{2661A003-2765-44CA-9145-AB1528F4C2E9}"/>
+                <a16:creationId xmlns:a16="http://schemas.microsoft.com/office/drawing/2014/main" xmlns="" id="{2661A003-2765-44CA-9145-AB1528F4C2E9}"/>
               </a:ext>
             </a:extLst>
           </p:cNvPr>
@@ -3749,7 +3748,7 @@
           <p:cNvPr id="3" name="Text Placeholder 2">
             <a:extLst>
               <a:ext uri="{FF2B5EF4-FFF2-40B4-BE49-F238E27FC236}">
-                <a16:creationId xmlns="" xmlns:a16="http://schemas.microsoft.com/office/drawing/2014/main" id="{E9329458-CFA5-4FC5-83BF-8DEED1663F67}"/>
+                <a16:creationId xmlns:a16="http://schemas.microsoft.com/office/drawing/2014/main" xmlns="" id="{E9329458-CFA5-4FC5-83BF-8DEED1663F67}"/>
               </a:ext>
             </a:extLst>
           </p:cNvPr>
@@ -3820,7 +3819,7 @@
           <p:cNvPr id="4" name="Content Placeholder 3">
             <a:extLst>
               <a:ext uri="{FF2B5EF4-FFF2-40B4-BE49-F238E27FC236}">
-                <a16:creationId xmlns="" xmlns:a16="http://schemas.microsoft.com/office/drawing/2014/main" id="{00973E35-5790-4541-A9E9-6EAD8746298F}"/>
+                <a16:creationId xmlns:a16="http://schemas.microsoft.com/office/drawing/2014/main" xmlns="" id="{00973E35-5790-4541-A9E9-6EAD8746298F}"/>
               </a:ext>
             </a:extLst>
           </p:cNvPr>
@@ -3883,7 +3882,7 @@
           <p:cNvPr id="5" name="Text Placeholder 4">
             <a:extLst>
               <a:ext uri="{FF2B5EF4-FFF2-40B4-BE49-F238E27FC236}">
-                <a16:creationId xmlns="" xmlns:a16="http://schemas.microsoft.com/office/drawing/2014/main" id="{A79D0B04-D124-4DE1-8DDA-4298E11D9543}"/>
+                <a16:creationId xmlns:a16="http://schemas.microsoft.com/office/drawing/2014/main" xmlns="" id="{A79D0B04-D124-4DE1-8DDA-4298E11D9543}"/>
               </a:ext>
             </a:extLst>
           </p:cNvPr>
@@ -3954,7 +3953,7 @@
           <p:cNvPr id="6" name="Content Placeholder 5">
             <a:extLst>
               <a:ext uri="{FF2B5EF4-FFF2-40B4-BE49-F238E27FC236}">
-                <a16:creationId xmlns="" xmlns:a16="http://schemas.microsoft.com/office/drawing/2014/main" id="{B6A6F19A-1257-47E9-B4A0-44A2F7E94FF1}"/>
+                <a16:creationId xmlns:a16="http://schemas.microsoft.com/office/drawing/2014/main" xmlns="" id="{B6A6F19A-1257-47E9-B4A0-44A2F7E94FF1}"/>
               </a:ext>
             </a:extLst>
           </p:cNvPr>
@@ -4017,7 +4016,7 @@
           <p:cNvPr id="7" name="Date Placeholder 6">
             <a:extLst>
               <a:ext uri="{FF2B5EF4-FFF2-40B4-BE49-F238E27FC236}">
-                <a16:creationId xmlns="" xmlns:a16="http://schemas.microsoft.com/office/drawing/2014/main" id="{72AE3A17-5374-467D-86C2-C645B787C384}"/>
+                <a16:creationId xmlns:a16="http://schemas.microsoft.com/office/drawing/2014/main" xmlns="" id="{72AE3A17-5374-467D-86C2-C645B787C384}"/>
               </a:ext>
             </a:extLst>
           </p:cNvPr>
@@ -4035,7 +4034,7 @@
           <a:p>
             <a:fld id="{AEC09C50-853A-420B-8C26-7439C86401C0}" type="datetimeFigureOut">
               <a:rPr lang="en-GB" smtClean="0"/>
-              <a:t>2018-03-04</a:t>
+              <a:t>2018-03-15</a:t>
             </a:fld>
             <a:endParaRPr lang="en-GB"/>
           </a:p>
@@ -4046,7 +4045,7 @@
           <p:cNvPr id="8" name="Footer Placeholder 7">
             <a:extLst>
               <a:ext uri="{FF2B5EF4-FFF2-40B4-BE49-F238E27FC236}">
-                <a16:creationId xmlns="" xmlns:a16="http://schemas.microsoft.com/office/drawing/2014/main" id="{5283F0D5-8638-49FD-89DB-01F6EE922328}"/>
+                <a16:creationId xmlns:a16="http://schemas.microsoft.com/office/drawing/2014/main" xmlns="" id="{5283F0D5-8638-49FD-89DB-01F6EE922328}"/>
               </a:ext>
             </a:extLst>
           </p:cNvPr>
@@ -4071,7 +4070,7 @@
           <p:cNvPr id="9" name="Slide Number Placeholder 8">
             <a:extLst>
               <a:ext uri="{FF2B5EF4-FFF2-40B4-BE49-F238E27FC236}">
-                <a16:creationId xmlns="" xmlns:a16="http://schemas.microsoft.com/office/drawing/2014/main" id="{C0267428-4293-4A71-9B75-D565941979E2}"/>
+                <a16:creationId xmlns:a16="http://schemas.microsoft.com/office/drawing/2014/main" xmlns="" id="{C0267428-4293-4A71-9B75-D565941979E2}"/>
               </a:ext>
             </a:extLst>
           </p:cNvPr>
@@ -4130,7 +4129,7 @@
           <p:cNvPr id="2" name="Title 1">
             <a:extLst>
               <a:ext uri="{FF2B5EF4-FFF2-40B4-BE49-F238E27FC236}">
-                <a16:creationId xmlns="" xmlns:a16="http://schemas.microsoft.com/office/drawing/2014/main" id="{83526E88-76D3-4410-8E61-DDEF66B15330}"/>
+                <a16:creationId xmlns:a16="http://schemas.microsoft.com/office/drawing/2014/main" xmlns="" id="{83526E88-76D3-4410-8E61-DDEF66B15330}"/>
               </a:ext>
             </a:extLst>
           </p:cNvPr>
@@ -4159,7 +4158,7 @@
           <p:cNvPr id="3" name="Date Placeholder 2">
             <a:extLst>
               <a:ext uri="{FF2B5EF4-FFF2-40B4-BE49-F238E27FC236}">
-                <a16:creationId xmlns="" xmlns:a16="http://schemas.microsoft.com/office/drawing/2014/main" id="{EB4D1369-8B85-4E73-89D6-76C188B98E13}"/>
+                <a16:creationId xmlns:a16="http://schemas.microsoft.com/office/drawing/2014/main" xmlns="" id="{EB4D1369-8B85-4E73-89D6-76C188B98E13}"/>
               </a:ext>
             </a:extLst>
           </p:cNvPr>
@@ -4177,7 +4176,7 @@
           <a:p>
             <a:fld id="{AEC09C50-853A-420B-8C26-7439C86401C0}" type="datetimeFigureOut">
               <a:rPr lang="en-GB" smtClean="0"/>
-              <a:t>2018-03-04</a:t>
+              <a:t>2018-03-15</a:t>
             </a:fld>
             <a:endParaRPr lang="en-GB"/>
           </a:p>
@@ -4188,7 +4187,7 @@
           <p:cNvPr id="4" name="Footer Placeholder 3">
             <a:extLst>
               <a:ext uri="{FF2B5EF4-FFF2-40B4-BE49-F238E27FC236}">
-                <a16:creationId xmlns="" xmlns:a16="http://schemas.microsoft.com/office/drawing/2014/main" id="{489D4C4A-EE05-4344-A36C-6C671EE5E049}"/>
+                <a16:creationId xmlns:a16="http://schemas.microsoft.com/office/drawing/2014/main" xmlns="" id="{489D4C4A-EE05-4344-A36C-6C671EE5E049}"/>
               </a:ext>
             </a:extLst>
           </p:cNvPr>
@@ -4213,7 +4212,7 @@
           <p:cNvPr id="5" name="Slide Number Placeholder 4">
             <a:extLst>
               <a:ext uri="{FF2B5EF4-FFF2-40B4-BE49-F238E27FC236}">
-                <a16:creationId xmlns="" xmlns:a16="http://schemas.microsoft.com/office/drawing/2014/main" id="{DD1109B2-CB6D-4218-9B3E-14BAEEE90F3E}"/>
+                <a16:creationId xmlns:a16="http://schemas.microsoft.com/office/drawing/2014/main" xmlns="" id="{DD1109B2-CB6D-4218-9B3E-14BAEEE90F3E}"/>
               </a:ext>
             </a:extLst>
           </p:cNvPr>
@@ -4272,7 +4271,7 @@
           <p:cNvPr id="2" name="Date Placeholder 1">
             <a:extLst>
               <a:ext uri="{FF2B5EF4-FFF2-40B4-BE49-F238E27FC236}">
-                <a16:creationId xmlns="" xmlns:a16="http://schemas.microsoft.com/office/drawing/2014/main" id="{F2235B87-6899-48A6-999A-BC97C2BBB929}"/>
+                <a16:creationId xmlns:a16="http://schemas.microsoft.com/office/drawing/2014/main" xmlns="" id="{F2235B87-6899-48A6-999A-BC97C2BBB929}"/>
               </a:ext>
             </a:extLst>
           </p:cNvPr>
@@ -4290,7 +4289,7 @@
           <a:p>
             <a:fld id="{AEC09C50-853A-420B-8C26-7439C86401C0}" type="datetimeFigureOut">
               <a:rPr lang="en-GB" smtClean="0"/>
-              <a:t>2018-03-04</a:t>
+              <a:t>2018-03-15</a:t>
             </a:fld>
             <a:endParaRPr lang="en-GB"/>
           </a:p>
@@ -4301,7 +4300,7 @@
           <p:cNvPr id="3" name="Footer Placeholder 2">
             <a:extLst>
               <a:ext uri="{FF2B5EF4-FFF2-40B4-BE49-F238E27FC236}">
-                <a16:creationId xmlns="" xmlns:a16="http://schemas.microsoft.com/office/drawing/2014/main" id="{C8769E30-B6BB-4F0A-B22F-C95BF219412D}"/>
+                <a16:creationId xmlns:a16="http://schemas.microsoft.com/office/drawing/2014/main" xmlns="" id="{C8769E30-B6BB-4F0A-B22F-C95BF219412D}"/>
               </a:ext>
             </a:extLst>
           </p:cNvPr>
@@ -4326,7 +4325,7 @@
           <p:cNvPr id="4" name="Slide Number Placeholder 3">
             <a:extLst>
               <a:ext uri="{FF2B5EF4-FFF2-40B4-BE49-F238E27FC236}">
-                <a16:creationId xmlns="" xmlns:a16="http://schemas.microsoft.com/office/drawing/2014/main" id="{BC7650B4-2968-4449-A4B1-2C77F10005BB}"/>
+                <a16:creationId xmlns:a16="http://schemas.microsoft.com/office/drawing/2014/main" xmlns="" id="{BC7650B4-2968-4449-A4B1-2C77F10005BB}"/>
               </a:ext>
             </a:extLst>
           </p:cNvPr>
@@ -4385,7 +4384,7 @@
           <p:cNvPr id="2" name="Title 1">
             <a:extLst>
               <a:ext uri="{FF2B5EF4-FFF2-40B4-BE49-F238E27FC236}">
-                <a16:creationId xmlns="" xmlns:a16="http://schemas.microsoft.com/office/drawing/2014/main" id="{8E1ECCE6-D223-4A9C-AE1D-E9A2DFF0FC8E}"/>
+                <a16:creationId xmlns:a16="http://schemas.microsoft.com/office/drawing/2014/main" xmlns="" id="{8E1ECCE6-D223-4A9C-AE1D-E9A2DFF0FC8E}"/>
               </a:ext>
             </a:extLst>
           </p:cNvPr>
@@ -4423,7 +4422,7 @@
           <p:cNvPr id="3" name="Content Placeholder 2">
             <a:extLst>
               <a:ext uri="{FF2B5EF4-FFF2-40B4-BE49-F238E27FC236}">
-                <a16:creationId xmlns="" xmlns:a16="http://schemas.microsoft.com/office/drawing/2014/main" id="{B82EC1F7-6D9E-4A6E-83FA-3A28DA42147B}"/>
+                <a16:creationId xmlns:a16="http://schemas.microsoft.com/office/drawing/2014/main" xmlns="" id="{B82EC1F7-6D9E-4A6E-83FA-3A28DA42147B}"/>
               </a:ext>
             </a:extLst>
           </p:cNvPr>
@@ -4514,7 +4513,7 @@
           <p:cNvPr id="4" name="Text Placeholder 3">
             <a:extLst>
               <a:ext uri="{FF2B5EF4-FFF2-40B4-BE49-F238E27FC236}">
-                <a16:creationId xmlns="" xmlns:a16="http://schemas.microsoft.com/office/drawing/2014/main" id="{AF898F10-245A-48D3-9CBC-6CC749D412AA}"/>
+                <a16:creationId xmlns:a16="http://schemas.microsoft.com/office/drawing/2014/main" xmlns="" id="{AF898F10-245A-48D3-9CBC-6CC749D412AA}"/>
               </a:ext>
             </a:extLst>
           </p:cNvPr>
@@ -4585,7 +4584,7 @@
           <p:cNvPr id="5" name="Date Placeholder 4">
             <a:extLst>
               <a:ext uri="{FF2B5EF4-FFF2-40B4-BE49-F238E27FC236}">
-                <a16:creationId xmlns="" xmlns:a16="http://schemas.microsoft.com/office/drawing/2014/main" id="{32036AB4-92DA-44C3-87E4-1649313632B1}"/>
+                <a16:creationId xmlns:a16="http://schemas.microsoft.com/office/drawing/2014/main" xmlns="" id="{32036AB4-92DA-44C3-87E4-1649313632B1}"/>
               </a:ext>
             </a:extLst>
           </p:cNvPr>
@@ -4603,7 +4602,7 @@
           <a:p>
             <a:fld id="{AEC09C50-853A-420B-8C26-7439C86401C0}" type="datetimeFigureOut">
               <a:rPr lang="en-GB" smtClean="0"/>
-              <a:t>2018-03-04</a:t>
+              <a:t>2018-03-15</a:t>
             </a:fld>
             <a:endParaRPr lang="en-GB"/>
           </a:p>
@@ -4614,7 +4613,7 @@
           <p:cNvPr id="6" name="Footer Placeholder 5">
             <a:extLst>
               <a:ext uri="{FF2B5EF4-FFF2-40B4-BE49-F238E27FC236}">
-                <a16:creationId xmlns="" xmlns:a16="http://schemas.microsoft.com/office/drawing/2014/main" id="{1337DAE8-487C-4D6E-803D-F8F4FA67CA44}"/>
+                <a16:creationId xmlns:a16="http://schemas.microsoft.com/office/drawing/2014/main" xmlns="" id="{1337DAE8-487C-4D6E-803D-F8F4FA67CA44}"/>
               </a:ext>
             </a:extLst>
           </p:cNvPr>
@@ -4639,7 +4638,7 @@
           <p:cNvPr id="7" name="Slide Number Placeholder 6">
             <a:extLst>
               <a:ext uri="{FF2B5EF4-FFF2-40B4-BE49-F238E27FC236}">
-                <a16:creationId xmlns="" xmlns:a16="http://schemas.microsoft.com/office/drawing/2014/main" id="{CC449275-2FF4-4C64-ABAB-142D3BF60EAE}"/>
+                <a16:creationId xmlns:a16="http://schemas.microsoft.com/office/drawing/2014/main" xmlns="" id="{CC449275-2FF4-4C64-ABAB-142D3BF60EAE}"/>
               </a:ext>
             </a:extLst>
           </p:cNvPr>
@@ -4698,7 +4697,7 @@
           <p:cNvPr id="2" name="Title 1">
             <a:extLst>
               <a:ext uri="{FF2B5EF4-FFF2-40B4-BE49-F238E27FC236}">
-                <a16:creationId xmlns="" xmlns:a16="http://schemas.microsoft.com/office/drawing/2014/main" id="{D071AB62-177C-4054-8052-BBE8490E7381}"/>
+                <a16:creationId xmlns:a16="http://schemas.microsoft.com/office/drawing/2014/main" xmlns="" id="{D071AB62-177C-4054-8052-BBE8490E7381}"/>
               </a:ext>
             </a:extLst>
           </p:cNvPr>
@@ -4736,7 +4735,7 @@
           <p:cNvPr id="3" name="Picture Placeholder 2">
             <a:extLst>
               <a:ext uri="{FF2B5EF4-FFF2-40B4-BE49-F238E27FC236}">
-                <a16:creationId xmlns="" xmlns:a16="http://schemas.microsoft.com/office/drawing/2014/main" id="{A0D50678-0335-4865-AE73-1BCBF41E616A}"/>
+                <a16:creationId xmlns:a16="http://schemas.microsoft.com/office/drawing/2014/main" xmlns="" id="{A0D50678-0335-4865-AE73-1BCBF41E616A}"/>
               </a:ext>
             </a:extLst>
           </p:cNvPr>
@@ -4803,7 +4802,7 @@
           <p:cNvPr id="4" name="Text Placeholder 3">
             <a:extLst>
               <a:ext uri="{FF2B5EF4-FFF2-40B4-BE49-F238E27FC236}">
-                <a16:creationId xmlns="" xmlns:a16="http://schemas.microsoft.com/office/drawing/2014/main" id="{73ED4DA1-0F6A-4A5D-B369-9469EF35B96D}"/>
+                <a16:creationId xmlns:a16="http://schemas.microsoft.com/office/drawing/2014/main" xmlns="" id="{73ED4DA1-0F6A-4A5D-B369-9469EF35B96D}"/>
               </a:ext>
             </a:extLst>
           </p:cNvPr>
@@ -4874,7 +4873,7 @@
           <p:cNvPr id="5" name="Date Placeholder 4">
             <a:extLst>
               <a:ext uri="{FF2B5EF4-FFF2-40B4-BE49-F238E27FC236}">
-                <a16:creationId xmlns="" xmlns:a16="http://schemas.microsoft.com/office/drawing/2014/main" id="{092FC3AE-ADA3-4288-A99B-E5F02A2E42C8}"/>
+                <a16:creationId xmlns:a16="http://schemas.microsoft.com/office/drawing/2014/main" xmlns="" id="{092FC3AE-ADA3-4288-A99B-E5F02A2E42C8}"/>
               </a:ext>
             </a:extLst>
           </p:cNvPr>
@@ -4892,7 +4891,7 @@
           <a:p>
             <a:fld id="{AEC09C50-853A-420B-8C26-7439C86401C0}" type="datetimeFigureOut">
               <a:rPr lang="en-GB" smtClean="0"/>
-              <a:t>2018-03-04</a:t>
+              <a:t>2018-03-15</a:t>
             </a:fld>
             <a:endParaRPr lang="en-GB"/>
           </a:p>
@@ -4903,7 +4902,7 @@
           <p:cNvPr id="6" name="Footer Placeholder 5">
             <a:extLst>
               <a:ext uri="{FF2B5EF4-FFF2-40B4-BE49-F238E27FC236}">
-                <a16:creationId xmlns="" xmlns:a16="http://schemas.microsoft.com/office/drawing/2014/main" id="{2893494B-FAB4-440E-AAEB-FFBDB092E663}"/>
+                <a16:creationId xmlns:a16="http://schemas.microsoft.com/office/drawing/2014/main" xmlns="" id="{2893494B-FAB4-440E-AAEB-FFBDB092E663}"/>
               </a:ext>
             </a:extLst>
           </p:cNvPr>
@@ -4928,7 +4927,7 @@
           <p:cNvPr id="7" name="Slide Number Placeholder 6">
             <a:extLst>
               <a:ext uri="{FF2B5EF4-FFF2-40B4-BE49-F238E27FC236}">
-                <a16:creationId xmlns="" xmlns:a16="http://schemas.microsoft.com/office/drawing/2014/main" id="{073F7F22-A5C8-498A-800E-37E463DFAE16}"/>
+                <a16:creationId xmlns:a16="http://schemas.microsoft.com/office/drawing/2014/main" xmlns="" id="{073F7F22-A5C8-498A-800E-37E463DFAE16}"/>
               </a:ext>
             </a:extLst>
           </p:cNvPr>
@@ -4992,7 +4991,7 @@
           <p:cNvPr id="2" name="Title Placeholder 1">
             <a:extLst>
               <a:ext uri="{FF2B5EF4-FFF2-40B4-BE49-F238E27FC236}">
-                <a16:creationId xmlns="" xmlns:a16="http://schemas.microsoft.com/office/drawing/2014/main" id="{F0BB2809-085E-4223-9992-2BB5FBC08E6E}"/>
+                <a16:creationId xmlns:a16="http://schemas.microsoft.com/office/drawing/2014/main" xmlns="" id="{F0BB2809-085E-4223-9992-2BB5FBC08E6E}"/>
               </a:ext>
             </a:extLst>
           </p:cNvPr>
@@ -5031,7 +5030,7 @@
           <p:cNvPr id="3" name="Text Placeholder 2">
             <a:extLst>
               <a:ext uri="{FF2B5EF4-FFF2-40B4-BE49-F238E27FC236}">
-                <a16:creationId xmlns="" xmlns:a16="http://schemas.microsoft.com/office/drawing/2014/main" id="{FEC23C1B-CC61-40EA-905D-95DABCC0D1B8}"/>
+                <a16:creationId xmlns:a16="http://schemas.microsoft.com/office/drawing/2014/main" xmlns="" id="{FEC23C1B-CC61-40EA-905D-95DABCC0D1B8}"/>
               </a:ext>
             </a:extLst>
           </p:cNvPr>
@@ -5099,7 +5098,7 @@
           <p:cNvPr id="4" name="Date Placeholder 3">
             <a:extLst>
               <a:ext uri="{FF2B5EF4-FFF2-40B4-BE49-F238E27FC236}">
-                <a16:creationId xmlns="" xmlns:a16="http://schemas.microsoft.com/office/drawing/2014/main" id="{129CB7B1-CB51-4ACA-B179-C824284E8378}"/>
+                <a16:creationId xmlns:a16="http://schemas.microsoft.com/office/drawing/2014/main" xmlns="" id="{129CB7B1-CB51-4ACA-B179-C824284E8378}"/>
               </a:ext>
             </a:extLst>
           </p:cNvPr>
@@ -5135,7 +5134,7 @@
           <a:p>
             <a:fld id="{AEC09C50-853A-420B-8C26-7439C86401C0}" type="datetimeFigureOut">
               <a:rPr lang="en-GB" smtClean="0"/>
-              <a:t>2018-03-04</a:t>
+              <a:t>2018-03-15</a:t>
             </a:fld>
             <a:endParaRPr lang="en-GB"/>
           </a:p>
@@ -5146,7 +5145,7 @@
           <p:cNvPr id="5" name="Footer Placeholder 4">
             <a:extLst>
               <a:ext uri="{FF2B5EF4-FFF2-40B4-BE49-F238E27FC236}">
-                <a16:creationId xmlns="" xmlns:a16="http://schemas.microsoft.com/office/drawing/2014/main" id="{06C0286E-4114-4920-A399-1E3F7F913343}"/>
+                <a16:creationId xmlns:a16="http://schemas.microsoft.com/office/drawing/2014/main" xmlns="" id="{06C0286E-4114-4920-A399-1E3F7F913343}"/>
               </a:ext>
             </a:extLst>
           </p:cNvPr>
@@ -5189,7 +5188,7 @@
           <p:cNvPr id="6" name="Slide Number Placeholder 5">
             <a:extLst>
               <a:ext uri="{FF2B5EF4-FFF2-40B4-BE49-F238E27FC236}">
-                <a16:creationId xmlns="" xmlns:a16="http://schemas.microsoft.com/office/drawing/2014/main" id="{496FAA64-61A7-4E2F-B9B4-DB069A6171DB}"/>
+                <a16:creationId xmlns:a16="http://schemas.microsoft.com/office/drawing/2014/main" xmlns="" id="{496FAA64-61A7-4E2F-B9B4-DB069A6171DB}"/>
               </a:ext>
             </a:extLst>
           </p:cNvPr>
@@ -5647,7 +5646,7 @@
           <p:cNvPr id="4" name="TextBox 3">
             <a:extLst>
               <a:ext uri="{FF2B5EF4-FFF2-40B4-BE49-F238E27FC236}">
-                <a16:creationId xmlns="" xmlns:a16="http://schemas.microsoft.com/office/drawing/2014/main" id="{E43AF4C5-CF5B-4E7E-B438-83CD70BE1265}"/>
+                <a16:creationId xmlns:a16="http://schemas.microsoft.com/office/drawing/2014/main" xmlns="" id="{E43AF4C5-CF5B-4E7E-B438-83CD70BE1265}"/>
               </a:ext>
             </a:extLst>
           </p:cNvPr>
@@ -5848,6 +5847,44 @@
           <a:chExt cx="0" cy="0"/>
         </a:xfrm>
       </p:grpSpPr>
+      <p:pic>
+        <p:nvPicPr>
+          <p:cNvPr id="10" name="Picture 9"/>
+          <p:cNvPicPr>
+            <a:picLocks noChangeAspect="1"/>
+          </p:cNvPicPr>
+          <p:nvPr/>
+        </p:nvPicPr>
+        <p:blipFill rotWithShape="1">
+          <a:blip r:embed="rId2">
+            <a:extLst>
+              <a:ext uri="{BEBA8EAE-BF5A-486C-A8C5-ECC9F3942E4B}">
+                <a14:imgProps xmlns:a14="http://schemas.microsoft.com/office/drawing/2010/main">
+                  <a14:imgLayer r:embed="rId3">
+                    <a14:imgEffect>
+                      <a14:sharpenSoften amount="100000"/>
+                    </a14:imgEffect>
+                  </a14:imgLayer>
+                </a14:imgProps>
+              </a:ext>
+              <a:ext uri="{28A0092B-C50C-407E-A947-70E740481C1C}">
+                <a14:useLocalDpi xmlns:a14="http://schemas.microsoft.com/office/drawing/2010/main" val="0"/>
+              </a:ext>
+            </a:extLst>
+          </a:blip>
+          <a:srcRect l="1489" t="2354" r="73223" b="54710"/>
+          <a:stretch/>
+        </p:blipFill>
+        <p:spPr>
+          <a:xfrm>
+            <a:off x="2349728" y="1111619"/>
+            <a:ext cx="7463029" cy="4712250"/>
+          </a:xfrm>
+          <a:prstGeom prst="rect">
+            <a:avLst/>
+          </a:prstGeom>
+        </p:spPr>
+      </p:pic>
       <p:sp>
         <p:nvSpPr>
           <p:cNvPr id="3" name="AutoShape 2" descr="Q=-10\ \log _{{10}}P"/>
@@ -5931,7 +5968,7 @@
           <p:cNvPr id="13" name="TextBox 12">
             <a:extLst>
               <a:ext uri="{FF2B5EF4-FFF2-40B4-BE49-F238E27FC236}">
-                <a16:creationId xmlns="" xmlns:a16="http://schemas.microsoft.com/office/drawing/2014/main" id="{E43AF4C5-CF5B-4E7E-B438-83CD70BE1265}"/>
+                <a16:creationId xmlns:a16="http://schemas.microsoft.com/office/drawing/2014/main" xmlns="" id="{E43AF4C5-CF5B-4E7E-B438-83CD70BE1265}"/>
               </a:ext>
             </a:extLst>
           </p:cNvPr>
@@ -6009,7 +6046,7 @@
                 </a:solidFill>
                 <a:latin typeface="Times New Roman" panose="02020603050405020304" pitchFamily="18" charset="0"/>
                 <a:cs typeface="Times New Roman" panose="02020603050405020304" pitchFamily="18" charset="0"/>
-                <a:hlinkClick r:id="rId2"/>
+                <a:hlinkClick r:id="rId4"/>
               </a:rPr>
               <a:t>PHRED</a:t>
             </a:r>
@@ -6080,8 +6117,8 @@
         </p:nvCxnSpPr>
         <p:spPr>
           <a:xfrm>
-            <a:off x="422031" y="5598942"/>
-            <a:ext cx="11254154" cy="0"/>
+            <a:off x="662549" y="5718002"/>
+            <a:ext cx="10132836" cy="0"/>
           </a:xfrm>
           <a:prstGeom prst="straightConnector1">
             <a:avLst/>
@@ -6116,7 +6153,7 @@
         </p:nvCxnSpPr>
         <p:spPr>
           <a:xfrm rot="16200000" flipV="1">
-            <a:off x="1418396" y="3655325"/>
+            <a:off x="-535820" y="3770160"/>
             <a:ext cx="5796000" cy="0"/>
           </a:xfrm>
           <a:prstGeom prst="straightConnector1">
@@ -6146,97 +6183,601 @@
       </p:cxnSp>
       <p:sp>
         <p:nvSpPr>
-          <p:cNvPr id="25" name="Freeform 24"/>
+          <p:cNvPr id="4" name="TextBox 3"/>
+          <p:cNvSpPr txBox="1"/>
+          <p:nvPr/>
+        </p:nvSpPr>
+        <p:spPr>
+          <a:xfrm>
+            <a:off x="2130142" y="5501764"/>
+            <a:ext cx="476412" cy="553998"/>
+          </a:xfrm>
+          <a:prstGeom prst="rect">
+            <a:avLst/>
+          </a:prstGeom>
+          <a:solidFill>
+            <a:schemeClr val="bg1">
+              <a:alpha val="65000"/>
+            </a:schemeClr>
+          </a:solidFill>
+        </p:spPr>
+        <p:txBody>
+          <a:bodyPr wrap="none" rtlCol="0">
+            <a:spAutoFit/>
+          </a:bodyPr>
+          <a:lstStyle/>
+          <a:p>
+            <a:pPr algn="ctr"/>
+            <a:r>
+              <a:rPr lang="en-GB" sz="1200" b="1" dirty="0" smtClean="0"/>
+              <a:t>|</a:t>
+            </a:r>
+          </a:p>
+          <a:p>
+            <a:pPr algn="ctr"/>
+            <a:r>
+              <a:rPr lang="en-GB" b="1" dirty="0" smtClean="0"/>
+              <a:t>0.0</a:t>
+            </a:r>
+            <a:endParaRPr lang="en-GB" b="1" dirty="0"/>
+          </a:p>
+        </p:txBody>
+      </p:sp>
+      <p:sp>
+        <p:nvSpPr>
+          <p:cNvPr id="11" name="TextBox 10"/>
+          <p:cNvSpPr txBox="1"/>
+          <p:nvPr/>
+        </p:nvSpPr>
+        <p:spPr>
+          <a:xfrm>
+            <a:off x="3619024" y="5501764"/>
+            <a:ext cx="476412" cy="553998"/>
+          </a:xfrm>
+          <a:prstGeom prst="rect">
+            <a:avLst/>
+          </a:prstGeom>
+          <a:solidFill>
+            <a:schemeClr val="bg1">
+              <a:alpha val="65000"/>
+            </a:schemeClr>
+          </a:solidFill>
+        </p:spPr>
+        <p:txBody>
+          <a:bodyPr wrap="none" rtlCol="0">
+            <a:spAutoFit/>
+          </a:bodyPr>
+          <a:lstStyle/>
+          <a:p>
+            <a:pPr algn="ctr"/>
+            <a:r>
+              <a:rPr lang="en-GB" sz="1200" b="1" dirty="0" smtClean="0"/>
+              <a:t>|</a:t>
+            </a:r>
+          </a:p>
+          <a:p>
+            <a:pPr algn="ctr"/>
+            <a:r>
+              <a:rPr lang="en-GB" b="1" dirty="0" smtClean="0"/>
+              <a:t>0.2</a:t>
+            </a:r>
+            <a:endParaRPr lang="en-GB" b="1" dirty="0"/>
+          </a:p>
+        </p:txBody>
+      </p:sp>
+      <p:sp>
+        <p:nvSpPr>
+          <p:cNvPr id="12" name="TextBox 11"/>
+          <p:cNvSpPr txBox="1"/>
+          <p:nvPr/>
+        </p:nvSpPr>
+        <p:spPr>
+          <a:xfrm>
+            <a:off x="5852347" y="5501764"/>
+            <a:ext cx="476412" cy="553998"/>
+          </a:xfrm>
+          <a:prstGeom prst="rect">
+            <a:avLst/>
+          </a:prstGeom>
+          <a:solidFill>
+            <a:schemeClr val="bg1">
+              <a:alpha val="65000"/>
+            </a:schemeClr>
+          </a:solidFill>
+        </p:spPr>
+        <p:txBody>
+          <a:bodyPr wrap="none" rtlCol="0">
+            <a:spAutoFit/>
+          </a:bodyPr>
+          <a:lstStyle/>
+          <a:p>
+            <a:pPr algn="ctr"/>
+            <a:r>
+              <a:rPr lang="en-GB" sz="1200" b="1" dirty="0" smtClean="0"/>
+              <a:t>|</a:t>
+            </a:r>
+          </a:p>
+          <a:p>
+            <a:pPr algn="ctr"/>
+            <a:r>
+              <a:rPr lang="en-GB" b="1" dirty="0" smtClean="0"/>
+              <a:t>0.5</a:t>
+            </a:r>
+            <a:endParaRPr lang="en-GB" b="1" dirty="0"/>
+          </a:p>
+        </p:txBody>
+      </p:sp>
+      <p:sp>
+        <p:nvSpPr>
+          <p:cNvPr id="14" name="TextBox 13"/>
+          <p:cNvSpPr txBox="1"/>
+          <p:nvPr/>
+        </p:nvSpPr>
+        <p:spPr>
+          <a:xfrm>
+            <a:off x="7341229" y="5501764"/>
+            <a:ext cx="476412" cy="553998"/>
+          </a:xfrm>
+          <a:prstGeom prst="rect">
+            <a:avLst/>
+          </a:prstGeom>
+          <a:solidFill>
+            <a:schemeClr val="bg1">
+              <a:alpha val="65000"/>
+            </a:schemeClr>
+          </a:solidFill>
+        </p:spPr>
+        <p:txBody>
+          <a:bodyPr wrap="none" rtlCol="0">
+            <a:spAutoFit/>
+          </a:bodyPr>
+          <a:lstStyle/>
+          <a:p>
+            <a:pPr algn="ctr"/>
+            <a:r>
+              <a:rPr lang="en-GB" sz="1200" b="1" dirty="0" smtClean="0"/>
+              <a:t>|</a:t>
+            </a:r>
+          </a:p>
+          <a:p>
+            <a:pPr algn="ctr"/>
+            <a:r>
+              <a:rPr lang="en-GB" b="1" dirty="0" smtClean="0"/>
+              <a:t>0.7</a:t>
+            </a:r>
+            <a:endParaRPr lang="en-GB" b="1" dirty="0"/>
+          </a:p>
+        </p:txBody>
+      </p:sp>
+      <p:sp>
+        <p:nvSpPr>
+          <p:cNvPr id="15" name="TextBox 14"/>
+          <p:cNvSpPr txBox="1"/>
+          <p:nvPr/>
+        </p:nvSpPr>
+        <p:spPr>
+          <a:xfrm>
+            <a:off x="9574551" y="5501764"/>
+            <a:ext cx="476412" cy="553998"/>
+          </a:xfrm>
+          <a:prstGeom prst="rect">
+            <a:avLst/>
+          </a:prstGeom>
+          <a:solidFill>
+            <a:schemeClr val="bg1">
+              <a:alpha val="65000"/>
+            </a:schemeClr>
+          </a:solidFill>
+        </p:spPr>
+        <p:txBody>
+          <a:bodyPr wrap="none" rtlCol="0">
+            <a:spAutoFit/>
+          </a:bodyPr>
+          <a:lstStyle/>
+          <a:p>
+            <a:pPr algn="ctr"/>
+            <a:r>
+              <a:rPr lang="en-GB" sz="1200" b="1" dirty="0" smtClean="0"/>
+              <a:t>|</a:t>
+            </a:r>
+          </a:p>
+          <a:p>
+            <a:pPr algn="ctr"/>
+            <a:r>
+              <a:rPr lang="en-GB" b="1" dirty="0" smtClean="0"/>
+              <a:t>1.0</a:t>
+            </a:r>
+            <a:endParaRPr lang="en-GB" b="1" dirty="0"/>
+          </a:p>
+        </p:txBody>
+      </p:sp>
+      <p:sp>
+        <p:nvSpPr>
+          <p:cNvPr id="17" name="TextBox 16"/>
+          <p:cNvSpPr txBox="1"/>
+          <p:nvPr/>
+        </p:nvSpPr>
+        <p:spPr>
+          <a:xfrm>
+            <a:off x="8085670" y="5501764"/>
+            <a:ext cx="476412" cy="553998"/>
+          </a:xfrm>
+          <a:prstGeom prst="rect">
+            <a:avLst/>
+          </a:prstGeom>
+          <a:solidFill>
+            <a:schemeClr val="bg1">
+              <a:alpha val="65000"/>
+            </a:schemeClr>
+          </a:solidFill>
+        </p:spPr>
+        <p:txBody>
+          <a:bodyPr wrap="none" rtlCol="0">
+            <a:spAutoFit/>
+          </a:bodyPr>
+          <a:lstStyle/>
+          <a:p>
+            <a:pPr algn="ctr"/>
+            <a:r>
+              <a:rPr lang="en-GB" sz="1200" b="1" dirty="0" smtClean="0"/>
+              <a:t>|</a:t>
+            </a:r>
+          </a:p>
+          <a:p>
+            <a:pPr algn="ctr"/>
+            <a:r>
+              <a:rPr lang="en-GB" b="1" dirty="0" smtClean="0"/>
+              <a:t>0.8</a:t>
+            </a:r>
+            <a:endParaRPr lang="en-GB" b="1" dirty="0"/>
+          </a:p>
+        </p:txBody>
+      </p:sp>
+      <p:sp>
+        <p:nvSpPr>
+          <p:cNvPr id="18" name="TextBox 17"/>
+          <p:cNvSpPr txBox="1"/>
+          <p:nvPr/>
+        </p:nvSpPr>
+        <p:spPr>
+          <a:xfrm>
+            <a:off x="8830111" y="5501764"/>
+            <a:ext cx="476412" cy="553998"/>
+          </a:xfrm>
+          <a:prstGeom prst="rect">
+            <a:avLst/>
+          </a:prstGeom>
+          <a:solidFill>
+            <a:schemeClr val="bg1">
+              <a:alpha val="65000"/>
+            </a:schemeClr>
+          </a:solidFill>
+        </p:spPr>
+        <p:txBody>
+          <a:bodyPr wrap="none" rtlCol="0">
+            <a:spAutoFit/>
+          </a:bodyPr>
+          <a:lstStyle/>
+          <a:p>
+            <a:pPr algn="ctr"/>
+            <a:r>
+              <a:rPr lang="en-GB" sz="1200" b="1" dirty="0" smtClean="0"/>
+              <a:t>|</a:t>
+            </a:r>
+          </a:p>
+          <a:p>
+            <a:pPr algn="ctr"/>
+            <a:r>
+              <a:rPr lang="en-GB" b="1" dirty="0" smtClean="0"/>
+              <a:t>0.9</a:t>
+            </a:r>
+            <a:endParaRPr lang="en-GB" b="1" dirty="0"/>
+          </a:p>
+        </p:txBody>
+      </p:sp>
+      <p:sp>
+        <p:nvSpPr>
+          <p:cNvPr id="19" name="TextBox 18"/>
+          <p:cNvSpPr txBox="1"/>
+          <p:nvPr/>
+        </p:nvSpPr>
+        <p:spPr>
+          <a:xfrm>
+            <a:off x="2874583" y="5501764"/>
+            <a:ext cx="476412" cy="553998"/>
+          </a:xfrm>
+          <a:prstGeom prst="rect">
+            <a:avLst/>
+          </a:prstGeom>
+          <a:solidFill>
+            <a:schemeClr val="bg1">
+              <a:alpha val="65000"/>
+            </a:schemeClr>
+          </a:solidFill>
+        </p:spPr>
+        <p:txBody>
+          <a:bodyPr wrap="none" rtlCol="0">
+            <a:spAutoFit/>
+          </a:bodyPr>
+          <a:lstStyle/>
+          <a:p>
+            <a:pPr algn="ctr"/>
+            <a:r>
+              <a:rPr lang="en-GB" sz="1200" b="1" dirty="0" smtClean="0"/>
+              <a:t>|</a:t>
+            </a:r>
+          </a:p>
+          <a:p>
+            <a:pPr algn="ctr"/>
+            <a:r>
+              <a:rPr lang="en-GB" b="1" dirty="0" smtClean="0"/>
+              <a:t>0.1</a:t>
+            </a:r>
+            <a:endParaRPr lang="en-GB" b="1" dirty="0"/>
+          </a:p>
+        </p:txBody>
+      </p:sp>
+      <p:sp>
+        <p:nvSpPr>
+          <p:cNvPr id="20" name="TextBox 19"/>
+          <p:cNvSpPr txBox="1"/>
+          <p:nvPr/>
+        </p:nvSpPr>
+        <p:spPr>
+          <a:xfrm>
+            <a:off x="4363465" y="5501764"/>
+            <a:ext cx="476412" cy="553998"/>
+          </a:xfrm>
+          <a:prstGeom prst="rect">
+            <a:avLst/>
+          </a:prstGeom>
+          <a:solidFill>
+            <a:schemeClr val="bg1">
+              <a:alpha val="65000"/>
+            </a:schemeClr>
+          </a:solidFill>
+        </p:spPr>
+        <p:txBody>
+          <a:bodyPr wrap="none" rtlCol="0">
+            <a:spAutoFit/>
+          </a:bodyPr>
+          <a:lstStyle/>
+          <a:p>
+            <a:pPr algn="ctr"/>
+            <a:r>
+              <a:rPr lang="en-GB" sz="1200" b="1" dirty="0" smtClean="0"/>
+              <a:t>|</a:t>
+            </a:r>
+          </a:p>
+          <a:p>
+            <a:pPr algn="ctr"/>
+            <a:r>
+              <a:rPr lang="en-GB" b="1" dirty="0" smtClean="0"/>
+              <a:t>0.3</a:t>
+            </a:r>
+            <a:endParaRPr lang="en-GB" b="1" dirty="0"/>
+          </a:p>
+        </p:txBody>
+      </p:sp>
+      <p:sp>
+        <p:nvSpPr>
+          <p:cNvPr id="21" name="TextBox 20"/>
+          <p:cNvSpPr txBox="1"/>
+          <p:nvPr/>
+        </p:nvSpPr>
+        <p:spPr>
+          <a:xfrm>
+            <a:off x="5107906" y="5501764"/>
+            <a:ext cx="476412" cy="553998"/>
+          </a:xfrm>
+          <a:prstGeom prst="rect">
+            <a:avLst/>
+          </a:prstGeom>
+          <a:solidFill>
+            <a:schemeClr val="bg1">
+              <a:alpha val="65000"/>
+            </a:schemeClr>
+          </a:solidFill>
+        </p:spPr>
+        <p:txBody>
+          <a:bodyPr wrap="none" rtlCol="0">
+            <a:spAutoFit/>
+          </a:bodyPr>
+          <a:lstStyle/>
+          <a:p>
+            <a:pPr algn="ctr"/>
+            <a:r>
+              <a:rPr lang="en-GB" sz="1200" b="1" dirty="0" smtClean="0"/>
+              <a:t>|</a:t>
+            </a:r>
+          </a:p>
+          <a:p>
+            <a:pPr algn="ctr"/>
+            <a:r>
+              <a:rPr lang="en-GB" b="1" dirty="0" smtClean="0"/>
+              <a:t>0.4</a:t>
+            </a:r>
+            <a:endParaRPr lang="en-GB" b="1" dirty="0"/>
+          </a:p>
+        </p:txBody>
+      </p:sp>
+      <p:sp>
+        <p:nvSpPr>
+          <p:cNvPr id="22" name="TextBox 21"/>
+          <p:cNvSpPr txBox="1"/>
+          <p:nvPr/>
+        </p:nvSpPr>
+        <p:spPr>
+          <a:xfrm>
+            <a:off x="6596788" y="5501764"/>
+            <a:ext cx="476412" cy="553998"/>
+          </a:xfrm>
+          <a:prstGeom prst="rect">
+            <a:avLst/>
+          </a:prstGeom>
+          <a:solidFill>
+            <a:schemeClr val="bg1">
+              <a:alpha val="65000"/>
+            </a:schemeClr>
+          </a:solidFill>
+        </p:spPr>
+        <p:txBody>
+          <a:bodyPr wrap="none" rtlCol="0">
+            <a:spAutoFit/>
+          </a:bodyPr>
+          <a:lstStyle/>
+          <a:p>
+            <a:pPr algn="ctr"/>
+            <a:r>
+              <a:rPr lang="en-GB" sz="1200" b="1" dirty="0" smtClean="0"/>
+              <a:t>|</a:t>
+            </a:r>
+          </a:p>
+          <a:p>
+            <a:pPr algn="ctr"/>
+            <a:r>
+              <a:rPr lang="en-GB" b="1" dirty="0" smtClean="0"/>
+              <a:t>0.6</a:t>
+            </a:r>
+            <a:endParaRPr lang="en-GB" b="1" dirty="0"/>
+          </a:p>
+        </p:txBody>
+      </p:sp>
+      <p:sp>
+        <p:nvSpPr>
+          <p:cNvPr id="31" name="TextBox 30"/>
+          <p:cNvSpPr txBox="1"/>
+          <p:nvPr/>
+        </p:nvSpPr>
+        <p:spPr>
+          <a:xfrm>
+            <a:off x="1663965" y="926953"/>
+            <a:ext cx="840295" cy="369332"/>
+          </a:xfrm>
+          <a:prstGeom prst="rect">
+            <a:avLst/>
+          </a:prstGeom>
+          <a:noFill/>
+        </p:spPr>
+        <p:txBody>
+          <a:bodyPr wrap="none" rtlCol="0">
+            <a:spAutoFit/>
+          </a:bodyPr>
+          <a:lstStyle/>
+          <a:p>
+            <a:r>
+              <a:rPr lang="en-GB" b="1" dirty="0" smtClean="0"/>
+              <a:t>1 in 1--</a:t>
+            </a:r>
+            <a:endParaRPr lang="en-GB" b="1" dirty="0"/>
+          </a:p>
+        </p:txBody>
+      </p:sp>
+      <p:sp>
+        <p:nvSpPr>
+          <p:cNvPr id="32" name="TextBox 31"/>
+          <p:cNvSpPr txBox="1"/>
+          <p:nvPr/>
+        </p:nvSpPr>
+        <p:spPr>
+          <a:xfrm>
+            <a:off x="1546947" y="2398208"/>
+            <a:ext cx="957313" cy="369332"/>
+          </a:xfrm>
+          <a:prstGeom prst="rect">
+            <a:avLst/>
+          </a:prstGeom>
+          <a:noFill/>
+        </p:spPr>
+        <p:txBody>
+          <a:bodyPr wrap="none" rtlCol="0">
+            <a:spAutoFit/>
+          </a:bodyPr>
+          <a:lstStyle/>
+          <a:p>
+            <a:r>
+              <a:rPr lang="en-GB" b="1" dirty="0" smtClean="0"/>
+              <a:t>1 in 10--</a:t>
+            </a:r>
+            <a:endParaRPr lang="en-GB" b="1" dirty="0"/>
+          </a:p>
+        </p:txBody>
+      </p:sp>
+      <p:sp>
+        <p:nvSpPr>
+          <p:cNvPr id="33" name="TextBox 32"/>
+          <p:cNvSpPr txBox="1"/>
+          <p:nvPr/>
+        </p:nvSpPr>
+        <p:spPr>
+          <a:xfrm>
+            <a:off x="1429927" y="3869463"/>
+            <a:ext cx="1074333" cy="369332"/>
+          </a:xfrm>
+          <a:prstGeom prst="rect">
+            <a:avLst/>
+          </a:prstGeom>
+          <a:noFill/>
+        </p:spPr>
+        <p:txBody>
+          <a:bodyPr wrap="none" rtlCol="0">
+            <a:spAutoFit/>
+          </a:bodyPr>
+          <a:lstStyle/>
+          <a:p>
+            <a:r>
+              <a:rPr lang="en-GB" b="1" dirty="0" smtClean="0"/>
+              <a:t>1 in 100--</a:t>
+            </a:r>
+            <a:endParaRPr lang="en-GB" b="1" dirty="0"/>
+          </a:p>
+        </p:txBody>
+      </p:sp>
+      <p:sp>
+        <p:nvSpPr>
+          <p:cNvPr id="34" name="TextBox 33"/>
+          <p:cNvSpPr txBox="1"/>
+          <p:nvPr/>
+        </p:nvSpPr>
+        <p:spPr>
+          <a:xfrm>
+            <a:off x="1255200" y="5340718"/>
+            <a:ext cx="1249060" cy="369332"/>
+          </a:xfrm>
+          <a:prstGeom prst="rect">
+            <a:avLst/>
+          </a:prstGeom>
+          <a:noFill/>
+        </p:spPr>
+        <p:txBody>
+          <a:bodyPr wrap="none" rtlCol="0">
+            <a:spAutoFit/>
+          </a:bodyPr>
+          <a:lstStyle/>
+          <a:p>
+            <a:r>
+              <a:rPr lang="en-GB" b="1" dirty="0" smtClean="0"/>
+              <a:t>1 in 1,000--</a:t>
+            </a:r>
+            <a:endParaRPr lang="en-GB" b="1" dirty="0"/>
+          </a:p>
+        </p:txBody>
+      </p:sp>
+      <p:sp>
+        <p:nvSpPr>
+          <p:cNvPr id="23" name="Multiply 22"/>
           <p:cNvSpPr/>
           <p:nvPr/>
         </p:nvSpPr>
         <p:spPr>
           <a:xfrm>
-            <a:off x="4304714" y="731520"/>
-            <a:ext cx="4431323" cy="4867422"/>
+            <a:off x="9678425" y="1002435"/>
+            <a:ext cx="288000" cy="288000"/>
           </a:xfrm>
-          <a:custGeom>
+          <a:prstGeom prst="mathMultiply">
             <a:avLst/>
-            <a:gdLst>
-              <a:gd name="connsiteX0" fmla="*/ 0 w 3249637"/>
-              <a:gd name="connsiteY0" fmla="*/ 4867422 h 4867422"/>
-              <a:gd name="connsiteX1" fmla="*/ 998806 w 3249637"/>
-              <a:gd name="connsiteY1" fmla="*/ 4586068 h 4867422"/>
-              <a:gd name="connsiteX2" fmla="*/ 1744394 w 3249637"/>
-              <a:gd name="connsiteY2" fmla="*/ 4093698 h 4867422"/>
-              <a:gd name="connsiteX3" fmla="*/ 2307101 w 3249637"/>
-              <a:gd name="connsiteY3" fmla="*/ 3319975 h 4867422"/>
-              <a:gd name="connsiteX4" fmla="*/ 2771335 w 3249637"/>
-              <a:gd name="connsiteY4" fmla="*/ 2166425 h 4867422"/>
-              <a:gd name="connsiteX5" fmla="*/ 3151163 w 3249637"/>
-              <a:gd name="connsiteY5" fmla="*/ 675249 h 4867422"/>
-              <a:gd name="connsiteX6" fmla="*/ 3249637 w 3249637"/>
-              <a:gd name="connsiteY6" fmla="*/ 0 h 4867422"/>
-            </a:gdLst>
-            <a:ahLst/>
-            <a:cxnLst>
-              <a:cxn ang="0">
-                <a:pos x="connsiteX0" y="connsiteY0"/>
-              </a:cxn>
-              <a:cxn ang="0">
-                <a:pos x="connsiteX1" y="connsiteY1"/>
-              </a:cxn>
-              <a:cxn ang="0">
-                <a:pos x="connsiteX2" y="connsiteY2"/>
-              </a:cxn>
-              <a:cxn ang="0">
-                <a:pos x="connsiteX3" y="connsiteY3"/>
-              </a:cxn>
-              <a:cxn ang="0">
-                <a:pos x="connsiteX4" y="connsiteY4"/>
-              </a:cxn>
-              <a:cxn ang="0">
-                <a:pos x="connsiteX5" y="connsiteY5"/>
-              </a:cxn>
-              <a:cxn ang="0">
-                <a:pos x="connsiteX6" y="connsiteY6"/>
-              </a:cxn>
-            </a:cxnLst>
-            <a:rect l="l" t="t" r="r" b="b"/>
-            <a:pathLst>
-              <a:path w="3249637" h="4867422">
-                <a:moveTo>
-                  <a:pt x="0" y="4867422"/>
-                </a:moveTo>
-                <a:cubicBezTo>
-                  <a:pt x="354037" y="4791222"/>
-                  <a:pt x="708074" y="4715022"/>
-                  <a:pt x="998806" y="4586068"/>
-                </a:cubicBezTo>
-                <a:cubicBezTo>
-                  <a:pt x="1289538" y="4457114"/>
-                  <a:pt x="1526345" y="4304714"/>
-                  <a:pt x="1744394" y="4093698"/>
-                </a:cubicBezTo>
-                <a:cubicBezTo>
-                  <a:pt x="1962443" y="3882682"/>
-                  <a:pt x="2135944" y="3641187"/>
-                  <a:pt x="2307101" y="3319975"/>
-                </a:cubicBezTo>
-                <a:cubicBezTo>
-                  <a:pt x="2478258" y="2998763"/>
-                  <a:pt x="2630658" y="2607213"/>
-                  <a:pt x="2771335" y="2166425"/>
-                </a:cubicBezTo>
-                <a:cubicBezTo>
-                  <a:pt x="2912012" y="1725637"/>
-                  <a:pt x="3071446" y="1036320"/>
-                  <a:pt x="3151163" y="675249"/>
-                </a:cubicBezTo>
-                <a:cubicBezTo>
-                  <a:pt x="3230880" y="314178"/>
-                  <a:pt x="3240258" y="157089"/>
-                  <a:pt x="3249637" y="0"/>
-                </a:cubicBezTo>
-              </a:path>
-            </a:pathLst>
-          </a:custGeom>
-          <a:noFill/>
+          </a:prstGeom>
+          <a:ln w="1270"/>
         </p:spPr>
         <p:style>
           <a:lnRef idx="2">
@@ -6263,87 +6804,148 @@
           </a:p>
         </p:txBody>
       </p:sp>
-      <p:cxnSp>
-        <p:nvCxnSpPr>
-          <p:cNvPr id="28" name="Straight Arrow Connector 27"/>
-          <p:cNvCxnSpPr/>
+      <p:sp>
+        <p:nvSpPr>
+          <p:cNvPr id="39" name="Multiply 38"/>
+          <p:cNvSpPr/>
           <p:nvPr/>
-        </p:nvCxnSpPr>
+        </p:nvSpPr>
         <p:spPr>
-          <a:xfrm rot="16200000" flipV="1">
-            <a:off x="6241372" y="2710421"/>
-            <a:ext cx="5796000" cy="0"/>
+          <a:xfrm>
+            <a:off x="2927845" y="2458816"/>
+            <a:ext cx="288000" cy="288000"/>
           </a:xfrm>
-          <a:prstGeom prst="straightConnector1">
+          <a:prstGeom prst="mathMultiply">
             <a:avLst/>
           </a:prstGeom>
-          <a:ln w="28575">
-            <a:solidFill>
-              <a:schemeClr val="tx1"/>
-            </a:solidFill>
-            <a:tailEnd type="arrow"/>
-          </a:ln>
+          <a:ln w="1270"/>
         </p:spPr>
         <p:style>
-          <a:lnRef idx="1">
-            <a:schemeClr val="accent1"/>
+          <a:lnRef idx="2">
+            <a:schemeClr val="accent1">
+              <a:shade val="50000"/>
+            </a:schemeClr>
           </a:lnRef>
-          <a:fillRef idx="0">
+          <a:fillRef idx="1">
             <a:schemeClr val="accent1"/>
           </a:fillRef>
           <a:effectRef idx="0">
             <a:schemeClr val="accent1"/>
           </a:effectRef>
           <a:fontRef idx="minor">
-            <a:schemeClr val="tx1"/>
+            <a:schemeClr val="lt1"/>
           </a:fontRef>
         </p:style>
-      </p:cxnSp>
-      <p:pic>
-        <p:nvPicPr>
-          <p:cNvPr id="2" name="Picture 1"/>
-          <p:cNvPicPr>
-            <a:picLocks noChangeAspect="1"/>
-          </p:cNvPicPr>
+        <p:txBody>
+          <a:bodyPr rtlCol="0" anchor="ctr"/>
+          <a:lstStyle/>
+          <a:p>
+            <a:pPr algn="ctr"/>
+            <a:endParaRPr lang="en-GB"/>
+          </a:p>
+        </p:txBody>
+      </p:sp>
+      <p:sp>
+        <p:nvSpPr>
+          <p:cNvPr id="40" name="Multiply 39"/>
+          <p:cNvSpPr/>
           <p:nvPr/>
-        </p:nvPicPr>
-        <p:blipFill>
-          <a:blip r:embed="rId3">
-            <a:extLst>
-              <a:ext uri="{28A0092B-C50C-407E-A947-70E740481C1C}">
-                <a14:useLocalDpi xmlns:a14="http://schemas.microsoft.com/office/drawing/2010/main" val="0"/>
-              </a:ext>
-            </a:extLst>
-          </a:blip>
-          <a:stretch>
-            <a:fillRect/>
-          </a:stretch>
-        </p:blipFill>
+        </p:nvSpPr>
         <p:spPr>
           <a:xfrm>
-            <a:off x="9586912" y="2710421"/>
-            <a:ext cx="5210175" cy="2286000"/>
+            <a:off x="2521711" y="3910129"/>
+            <a:ext cx="288000" cy="288000"/>
           </a:xfrm>
-          <a:prstGeom prst="rect">
+          <a:prstGeom prst="mathMultiply">
             <a:avLst/>
           </a:prstGeom>
+          <a:ln w="1270"/>
         </p:spPr>
-      </p:pic>
+        <p:style>
+          <a:lnRef idx="2">
+            <a:schemeClr val="accent1">
+              <a:shade val="50000"/>
+            </a:schemeClr>
+          </a:lnRef>
+          <a:fillRef idx="1">
+            <a:schemeClr val="accent1"/>
+          </a:fillRef>
+          <a:effectRef idx="0">
+            <a:schemeClr val="accent1"/>
+          </a:effectRef>
+          <a:fontRef idx="minor">
+            <a:schemeClr val="lt1"/>
+          </a:fontRef>
+        </p:style>
+        <p:txBody>
+          <a:bodyPr rtlCol="0" anchor="ctr"/>
+          <a:lstStyle/>
+          <a:p>
+            <a:pPr algn="ctr"/>
+            <a:endParaRPr lang="en-GB"/>
+          </a:p>
+        </p:txBody>
+      </p:sp>
       <p:sp>
         <p:nvSpPr>
-          <p:cNvPr id="4" name="TextBox 3"/>
+          <p:cNvPr id="41" name="Multiply 40"/>
+          <p:cNvSpPr/>
+          <p:nvPr/>
+        </p:nvSpPr>
+        <p:spPr>
+          <a:xfrm>
+            <a:off x="2288303" y="5381384"/>
+            <a:ext cx="288000" cy="288000"/>
+          </a:xfrm>
+          <a:prstGeom prst="mathMultiply">
+            <a:avLst/>
+          </a:prstGeom>
+          <a:ln w="1270"/>
+        </p:spPr>
+        <p:style>
+          <a:lnRef idx="2">
+            <a:schemeClr val="accent1">
+              <a:shade val="50000"/>
+            </a:schemeClr>
+          </a:lnRef>
+          <a:fillRef idx="1">
+            <a:schemeClr val="accent1"/>
+          </a:fillRef>
+          <a:effectRef idx="0">
+            <a:schemeClr val="accent1"/>
+          </a:effectRef>
+          <a:fontRef idx="minor">
+            <a:schemeClr val="lt1"/>
+          </a:fontRef>
+        </p:style>
+        <p:txBody>
+          <a:bodyPr rtlCol="0" anchor="ctr"/>
+          <a:lstStyle/>
+          <a:p>
+            <a:pPr algn="ctr"/>
+            <a:endParaRPr lang="en-GB"/>
+          </a:p>
+        </p:txBody>
+      </p:sp>
+      <p:sp>
+        <p:nvSpPr>
+          <p:cNvPr id="26" name="TextBox 25"/>
           <p:cNvSpPr txBox="1"/>
           <p:nvPr/>
         </p:nvSpPr>
         <p:spPr>
           <a:xfrm>
-            <a:off x="4083531" y="5598942"/>
-            <a:ext cx="476412" cy="369332"/>
+            <a:off x="4851680" y="6058766"/>
+            <a:ext cx="3606949" cy="369332"/>
           </a:xfrm>
           <a:prstGeom prst="rect">
             <a:avLst/>
           </a:prstGeom>
-          <a:noFill/>
+          <a:solidFill>
+            <a:schemeClr val="bg1">
+              <a:lumMod val="95000"/>
+            </a:schemeClr>
+          </a:solidFill>
         </p:spPr>
         <p:txBody>
           <a:bodyPr wrap="none" rtlCol="0">
@@ -6352,28 +6954,40 @@
           <a:lstStyle/>
           <a:p>
             <a:r>
-              <a:rPr lang="en-GB" dirty="0" smtClean="0"/>
-              <a:t>0.0</a:t>
-            </a:r>
-            <a:endParaRPr lang="en-GB" dirty="0"/>
+              <a:rPr lang="en-GB" b="1" dirty="0" smtClean="0">
+                <a:solidFill>
+                  <a:srgbClr val="4472C4"/>
+                </a:solidFill>
+              </a:rPr>
+              <a:t>Probability of incorrect Base Call (P)</a:t>
+            </a:r>
+            <a:endParaRPr lang="en-GB" b="1" dirty="0">
+              <a:solidFill>
+                <a:srgbClr val="4472C4"/>
+              </a:solidFill>
+            </a:endParaRPr>
           </a:p>
         </p:txBody>
       </p:sp>
       <p:sp>
         <p:nvSpPr>
-          <p:cNvPr id="11" name="TextBox 10"/>
+          <p:cNvPr id="42" name="TextBox 41"/>
           <p:cNvSpPr txBox="1"/>
           <p:nvPr/>
         </p:nvSpPr>
         <p:spPr>
-          <a:xfrm>
-            <a:off x="5047649" y="5598942"/>
-            <a:ext cx="476412" cy="369332"/>
+          <a:xfrm rot="16200000">
+            <a:off x="82221" y="2976647"/>
+            <a:ext cx="2054024" cy="369332"/>
           </a:xfrm>
           <a:prstGeom prst="rect">
             <a:avLst/>
           </a:prstGeom>
-          <a:noFill/>
+          <a:solidFill>
+            <a:schemeClr val="bg1">
+              <a:lumMod val="95000"/>
+            </a:schemeClr>
+          </a:solidFill>
         </p:spPr>
         <p:txBody>
           <a:bodyPr wrap="none" rtlCol="0">
@@ -6382,460 +6996,18 @@
           <a:lstStyle/>
           <a:p>
             <a:r>
-              <a:rPr lang="en-GB" dirty="0" smtClean="0"/>
-              <a:t>0.2</a:t>
-            </a:r>
-            <a:endParaRPr lang="en-GB" dirty="0"/>
-          </a:p>
-        </p:txBody>
-      </p:sp>
-      <p:sp>
-        <p:nvSpPr>
-          <p:cNvPr id="12" name="TextBox 11"/>
-          <p:cNvSpPr txBox="1"/>
-          <p:nvPr/>
-        </p:nvSpPr>
-        <p:spPr>
-          <a:xfrm>
-            <a:off x="6493826" y="5598942"/>
-            <a:ext cx="476412" cy="369332"/>
-          </a:xfrm>
-          <a:prstGeom prst="rect">
-            <a:avLst/>
-          </a:prstGeom>
-          <a:noFill/>
-        </p:spPr>
-        <p:txBody>
-          <a:bodyPr wrap="none" rtlCol="0">
-            <a:spAutoFit/>
-          </a:bodyPr>
-          <a:lstStyle/>
-          <a:p>
-            <a:r>
-              <a:rPr lang="en-GB" dirty="0" smtClean="0"/>
-              <a:t>0.5</a:t>
-            </a:r>
-            <a:endParaRPr lang="en-GB" dirty="0"/>
-          </a:p>
-        </p:txBody>
-      </p:sp>
-      <p:sp>
-        <p:nvSpPr>
-          <p:cNvPr id="14" name="TextBox 13"/>
-          <p:cNvSpPr txBox="1"/>
-          <p:nvPr/>
-        </p:nvSpPr>
-        <p:spPr>
-          <a:xfrm>
-            <a:off x="7457944" y="5598942"/>
-            <a:ext cx="476412" cy="369332"/>
-          </a:xfrm>
-          <a:prstGeom prst="rect">
-            <a:avLst/>
-          </a:prstGeom>
-          <a:noFill/>
-        </p:spPr>
-        <p:txBody>
-          <a:bodyPr wrap="none" rtlCol="0">
-            <a:spAutoFit/>
-          </a:bodyPr>
-          <a:lstStyle/>
-          <a:p>
-            <a:r>
-              <a:rPr lang="en-GB" dirty="0" smtClean="0"/>
-              <a:t>0.7</a:t>
-            </a:r>
-            <a:endParaRPr lang="en-GB" dirty="0"/>
-          </a:p>
-        </p:txBody>
-      </p:sp>
-      <p:sp>
-        <p:nvSpPr>
-          <p:cNvPr id="15" name="TextBox 14"/>
-          <p:cNvSpPr txBox="1"/>
-          <p:nvPr/>
-        </p:nvSpPr>
-        <p:spPr>
-          <a:xfrm>
-            <a:off x="8904121" y="5598942"/>
-            <a:ext cx="476412" cy="369332"/>
-          </a:xfrm>
-          <a:prstGeom prst="rect">
-            <a:avLst/>
-          </a:prstGeom>
-          <a:noFill/>
-        </p:spPr>
-        <p:txBody>
-          <a:bodyPr wrap="none" rtlCol="0">
-            <a:spAutoFit/>
-          </a:bodyPr>
-          <a:lstStyle/>
-          <a:p>
-            <a:r>
-              <a:rPr lang="en-GB" dirty="0" smtClean="0"/>
-              <a:t>1.0</a:t>
-            </a:r>
-            <a:endParaRPr lang="en-GB" dirty="0"/>
-          </a:p>
-        </p:txBody>
-      </p:sp>
-      <p:sp>
-        <p:nvSpPr>
-          <p:cNvPr id="17" name="TextBox 16"/>
-          <p:cNvSpPr txBox="1"/>
-          <p:nvPr/>
-        </p:nvSpPr>
-        <p:spPr>
-          <a:xfrm>
-            <a:off x="7940003" y="5598942"/>
-            <a:ext cx="476412" cy="369332"/>
-          </a:xfrm>
-          <a:prstGeom prst="rect">
-            <a:avLst/>
-          </a:prstGeom>
-          <a:noFill/>
-        </p:spPr>
-        <p:txBody>
-          <a:bodyPr wrap="none" rtlCol="0">
-            <a:spAutoFit/>
-          </a:bodyPr>
-          <a:lstStyle/>
-          <a:p>
-            <a:r>
-              <a:rPr lang="en-GB" dirty="0" smtClean="0"/>
-              <a:t>0.8</a:t>
-            </a:r>
-            <a:endParaRPr lang="en-GB" dirty="0"/>
-          </a:p>
-        </p:txBody>
-      </p:sp>
-      <p:sp>
-        <p:nvSpPr>
-          <p:cNvPr id="18" name="TextBox 17"/>
-          <p:cNvSpPr txBox="1"/>
-          <p:nvPr/>
-        </p:nvSpPr>
-        <p:spPr>
-          <a:xfrm>
-            <a:off x="8422062" y="5598942"/>
-            <a:ext cx="476412" cy="369332"/>
-          </a:xfrm>
-          <a:prstGeom prst="rect">
-            <a:avLst/>
-          </a:prstGeom>
-          <a:noFill/>
-        </p:spPr>
-        <p:txBody>
-          <a:bodyPr wrap="none" rtlCol="0">
-            <a:spAutoFit/>
-          </a:bodyPr>
-          <a:lstStyle/>
-          <a:p>
-            <a:r>
-              <a:rPr lang="en-GB" dirty="0" smtClean="0"/>
-              <a:t>0.9</a:t>
-            </a:r>
-            <a:endParaRPr lang="en-GB" dirty="0"/>
-          </a:p>
-        </p:txBody>
-      </p:sp>
-      <p:sp>
-        <p:nvSpPr>
-          <p:cNvPr id="19" name="TextBox 18"/>
-          <p:cNvSpPr txBox="1"/>
-          <p:nvPr/>
-        </p:nvSpPr>
-        <p:spPr>
-          <a:xfrm>
-            <a:off x="4565590" y="5598942"/>
-            <a:ext cx="476412" cy="369332"/>
-          </a:xfrm>
-          <a:prstGeom prst="rect">
-            <a:avLst/>
-          </a:prstGeom>
-          <a:noFill/>
-        </p:spPr>
-        <p:txBody>
-          <a:bodyPr wrap="none" rtlCol="0">
-            <a:spAutoFit/>
-          </a:bodyPr>
-          <a:lstStyle/>
-          <a:p>
-            <a:r>
-              <a:rPr lang="en-GB" dirty="0" smtClean="0"/>
-              <a:t>0.1</a:t>
-            </a:r>
-            <a:endParaRPr lang="en-GB" dirty="0"/>
-          </a:p>
-        </p:txBody>
-      </p:sp>
-      <p:sp>
-        <p:nvSpPr>
-          <p:cNvPr id="20" name="TextBox 19"/>
-          <p:cNvSpPr txBox="1"/>
-          <p:nvPr/>
-        </p:nvSpPr>
-        <p:spPr>
-          <a:xfrm>
-            <a:off x="5529708" y="5598942"/>
-            <a:ext cx="476412" cy="369332"/>
-          </a:xfrm>
-          <a:prstGeom prst="rect">
-            <a:avLst/>
-          </a:prstGeom>
-          <a:noFill/>
-        </p:spPr>
-        <p:txBody>
-          <a:bodyPr wrap="none" rtlCol="0">
-            <a:spAutoFit/>
-          </a:bodyPr>
-          <a:lstStyle/>
-          <a:p>
-            <a:r>
-              <a:rPr lang="en-GB" dirty="0" smtClean="0"/>
-              <a:t>0.3</a:t>
-            </a:r>
-            <a:endParaRPr lang="en-GB" dirty="0"/>
-          </a:p>
-        </p:txBody>
-      </p:sp>
-      <p:sp>
-        <p:nvSpPr>
-          <p:cNvPr id="21" name="TextBox 20"/>
-          <p:cNvSpPr txBox="1"/>
-          <p:nvPr/>
-        </p:nvSpPr>
-        <p:spPr>
-          <a:xfrm>
-            <a:off x="6011767" y="5598942"/>
-            <a:ext cx="476412" cy="369332"/>
-          </a:xfrm>
-          <a:prstGeom prst="rect">
-            <a:avLst/>
-          </a:prstGeom>
-          <a:noFill/>
-        </p:spPr>
-        <p:txBody>
-          <a:bodyPr wrap="none" rtlCol="0">
-            <a:spAutoFit/>
-          </a:bodyPr>
-          <a:lstStyle/>
-          <a:p>
-            <a:r>
-              <a:rPr lang="en-GB" dirty="0" smtClean="0"/>
-              <a:t>0.4</a:t>
-            </a:r>
-            <a:endParaRPr lang="en-GB" dirty="0"/>
-          </a:p>
-        </p:txBody>
-      </p:sp>
-      <p:sp>
-        <p:nvSpPr>
-          <p:cNvPr id="22" name="TextBox 21"/>
-          <p:cNvSpPr txBox="1"/>
-          <p:nvPr/>
-        </p:nvSpPr>
-        <p:spPr>
-          <a:xfrm>
-            <a:off x="6975885" y="5598942"/>
-            <a:ext cx="476412" cy="369332"/>
-          </a:xfrm>
-          <a:prstGeom prst="rect">
-            <a:avLst/>
-          </a:prstGeom>
-          <a:noFill/>
-        </p:spPr>
-        <p:txBody>
-          <a:bodyPr wrap="none" rtlCol="0">
-            <a:spAutoFit/>
-          </a:bodyPr>
-          <a:lstStyle/>
-          <a:p>
-            <a:r>
-              <a:rPr lang="en-GB" dirty="0" smtClean="0"/>
-              <a:t>0.6</a:t>
-            </a:r>
-            <a:endParaRPr lang="en-GB" dirty="0"/>
-          </a:p>
-        </p:txBody>
-      </p:sp>
-      <p:sp>
-        <p:nvSpPr>
-          <p:cNvPr id="23" name="TextBox 22"/>
-          <p:cNvSpPr txBox="1"/>
-          <p:nvPr/>
-        </p:nvSpPr>
-        <p:spPr>
-          <a:xfrm>
-            <a:off x="3482942" y="5414276"/>
-            <a:ext cx="911147" cy="369332"/>
-          </a:xfrm>
-          <a:prstGeom prst="rect">
-            <a:avLst/>
-          </a:prstGeom>
-          <a:noFill/>
-        </p:spPr>
-        <p:txBody>
-          <a:bodyPr wrap="none" rtlCol="0">
-            <a:spAutoFit/>
-          </a:bodyPr>
-          <a:lstStyle/>
-          <a:p>
-            <a:r>
-              <a:rPr lang="en-GB" dirty="0" smtClean="0"/>
-              <a:t>0 Errors</a:t>
-            </a:r>
-            <a:endParaRPr lang="en-GB" dirty="0"/>
-          </a:p>
-        </p:txBody>
-      </p:sp>
-      <p:sp>
-        <p:nvSpPr>
-          <p:cNvPr id="31" name="TextBox 30"/>
-          <p:cNvSpPr txBox="1"/>
-          <p:nvPr/>
-        </p:nvSpPr>
-        <p:spPr>
-          <a:xfrm>
-            <a:off x="3694859" y="811452"/>
-            <a:ext cx="699230" cy="369332"/>
-          </a:xfrm>
-          <a:prstGeom prst="rect">
-            <a:avLst/>
-          </a:prstGeom>
-          <a:noFill/>
-        </p:spPr>
-        <p:txBody>
-          <a:bodyPr wrap="none" rtlCol="0">
-            <a:spAutoFit/>
-          </a:bodyPr>
-          <a:lstStyle/>
-          <a:p>
-            <a:r>
-              <a:rPr lang="en-GB" dirty="0" smtClean="0"/>
-              <a:t>1 in 1</a:t>
-            </a:r>
-            <a:endParaRPr lang="en-GB" dirty="0"/>
-          </a:p>
-        </p:txBody>
-      </p:sp>
-      <p:sp>
-        <p:nvSpPr>
-          <p:cNvPr id="32" name="TextBox 31"/>
-          <p:cNvSpPr txBox="1"/>
-          <p:nvPr/>
-        </p:nvSpPr>
-        <p:spPr>
-          <a:xfrm>
-            <a:off x="3577840" y="1732017"/>
-            <a:ext cx="816249" cy="369332"/>
-          </a:xfrm>
-          <a:prstGeom prst="rect">
-            <a:avLst/>
-          </a:prstGeom>
-          <a:noFill/>
-        </p:spPr>
-        <p:txBody>
-          <a:bodyPr wrap="none" rtlCol="0">
-            <a:spAutoFit/>
-          </a:bodyPr>
-          <a:lstStyle/>
-          <a:p>
-            <a:r>
-              <a:rPr lang="en-GB" dirty="0" smtClean="0"/>
-              <a:t>1 in 10</a:t>
-            </a:r>
-            <a:endParaRPr lang="en-GB" dirty="0"/>
-          </a:p>
-        </p:txBody>
-      </p:sp>
-      <p:sp>
-        <p:nvSpPr>
-          <p:cNvPr id="33" name="TextBox 32"/>
-          <p:cNvSpPr txBox="1"/>
-          <p:nvPr/>
-        </p:nvSpPr>
-        <p:spPr>
-          <a:xfrm>
-            <a:off x="3460820" y="2652582"/>
-            <a:ext cx="933269" cy="369332"/>
-          </a:xfrm>
-          <a:prstGeom prst="rect">
-            <a:avLst/>
-          </a:prstGeom>
-          <a:noFill/>
-        </p:spPr>
-        <p:txBody>
-          <a:bodyPr wrap="none" rtlCol="0">
-            <a:spAutoFit/>
-          </a:bodyPr>
-          <a:lstStyle/>
-          <a:p>
-            <a:r>
-              <a:rPr lang="en-GB" dirty="0" smtClean="0"/>
-              <a:t>1 in 100</a:t>
-            </a:r>
-            <a:endParaRPr lang="en-GB" dirty="0"/>
-          </a:p>
-        </p:txBody>
-      </p:sp>
-      <p:sp>
-        <p:nvSpPr>
-          <p:cNvPr id="34" name="TextBox 33"/>
-          <p:cNvSpPr txBox="1"/>
-          <p:nvPr/>
-        </p:nvSpPr>
-        <p:spPr>
-          <a:xfrm>
-            <a:off x="3286093" y="3573147"/>
-            <a:ext cx="1107996" cy="369332"/>
-          </a:xfrm>
-          <a:prstGeom prst="rect">
-            <a:avLst/>
-          </a:prstGeom>
-          <a:noFill/>
-        </p:spPr>
-        <p:txBody>
-          <a:bodyPr wrap="none" rtlCol="0">
-            <a:spAutoFit/>
-          </a:bodyPr>
-          <a:lstStyle/>
-          <a:p>
-            <a:r>
-              <a:rPr lang="en-GB" dirty="0" smtClean="0"/>
-              <a:t>1 in 1,000</a:t>
-            </a:r>
-            <a:endParaRPr lang="en-GB" dirty="0"/>
-          </a:p>
-        </p:txBody>
-      </p:sp>
-      <p:sp>
-        <p:nvSpPr>
-          <p:cNvPr id="35" name="TextBox 34"/>
-          <p:cNvSpPr txBox="1"/>
-          <p:nvPr/>
-        </p:nvSpPr>
-        <p:spPr>
-          <a:xfrm>
-            <a:off x="3221973" y="4493712"/>
-            <a:ext cx="1172116" cy="369332"/>
-          </a:xfrm>
-          <a:prstGeom prst="rect">
-            <a:avLst/>
-          </a:prstGeom>
-          <a:noFill/>
-        </p:spPr>
-        <p:txBody>
-          <a:bodyPr wrap="none" rtlCol="0">
-            <a:spAutoFit/>
-          </a:bodyPr>
-          <a:lstStyle/>
-          <a:p>
-            <a:r>
-              <a:rPr lang="en-GB" dirty="0" smtClean="0"/>
-              <a:t>1 in10,000</a:t>
-            </a:r>
-            <a:endParaRPr lang="en-GB" dirty="0"/>
+              <a:rPr lang="en-GB" b="1" dirty="0" smtClean="0">
+                <a:solidFill>
+                  <a:srgbClr val="4472C4"/>
+                </a:solidFill>
+              </a:rPr>
+              <a:t>Base Call Error Rate</a:t>
+            </a:r>
+            <a:endParaRPr lang="en-GB" b="1" dirty="0">
+              <a:solidFill>
+                <a:srgbClr val="4472C4"/>
+              </a:solidFill>
+            </a:endParaRPr>
           </a:p>
         </p:txBody>
       </p:sp>
@@ -6881,7 +7053,7 @@
           <p:cNvPr id="4" name="TextBox 3">
             <a:extLst>
               <a:ext uri="{FF2B5EF4-FFF2-40B4-BE49-F238E27FC236}">
-                <a16:creationId xmlns="" xmlns:a16="http://schemas.microsoft.com/office/drawing/2014/main" id="{438442CF-1B82-4A10-87A1-614331CA498E}"/>
+                <a16:creationId xmlns:a16="http://schemas.microsoft.com/office/drawing/2014/main" xmlns="" id="{438442CF-1B82-4A10-87A1-614331CA498E}"/>
               </a:ext>
             </a:extLst>
           </p:cNvPr>
@@ -6981,7 +7153,7 @@
           <p:cNvPr id="6" name="TextBox 5">
             <a:extLst>
               <a:ext uri="{FF2B5EF4-FFF2-40B4-BE49-F238E27FC236}">
-                <a16:creationId xmlns="" xmlns:a16="http://schemas.microsoft.com/office/drawing/2014/main" id="{438442CF-1B82-4A10-87A1-614331CA498E}"/>
+                <a16:creationId xmlns:a16="http://schemas.microsoft.com/office/drawing/2014/main" xmlns="" id="{438442CF-1B82-4A10-87A1-614331CA498E}"/>
               </a:ext>
             </a:extLst>
           </p:cNvPr>
@@ -7116,7 +7288,7 @@
           <p:cNvPr id="7" name="TextBox 6">
             <a:extLst>
               <a:ext uri="{FF2B5EF4-FFF2-40B4-BE49-F238E27FC236}">
-                <a16:creationId xmlns="" xmlns:a16="http://schemas.microsoft.com/office/drawing/2014/main" id="{438442CF-1B82-4A10-87A1-614331CA498E}"/>
+                <a16:creationId xmlns:a16="http://schemas.microsoft.com/office/drawing/2014/main" xmlns="" id="{438442CF-1B82-4A10-87A1-614331CA498E}"/>
               </a:ext>
             </a:extLst>
           </p:cNvPr>
@@ -7335,7 +7507,7 @@
           <p:cNvPr id="10" name="TextBox 9">
             <a:extLst>
               <a:ext uri="{FF2B5EF4-FFF2-40B4-BE49-F238E27FC236}">
-                <a16:creationId xmlns="" xmlns:a16="http://schemas.microsoft.com/office/drawing/2014/main" id="{438442CF-1B82-4A10-87A1-614331CA498E}"/>
+                <a16:creationId xmlns:a16="http://schemas.microsoft.com/office/drawing/2014/main" xmlns="" id="{438442CF-1B82-4A10-87A1-614331CA498E}"/>
               </a:ext>
             </a:extLst>
           </p:cNvPr>
@@ -7436,7 +7608,7 @@
           <p:cNvPr id="11" name="TextBox 10">
             <a:extLst>
               <a:ext uri="{FF2B5EF4-FFF2-40B4-BE49-F238E27FC236}">
-                <a16:creationId xmlns="" xmlns:a16="http://schemas.microsoft.com/office/drawing/2014/main" id="{438442CF-1B82-4A10-87A1-614331CA498E}"/>
+                <a16:creationId xmlns:a16="http://schemas.microsoft.com/office/drawing/2014/main" xmlns="" id="{438442CF-1B82-4A10-87A1-614331CA498E}"/>
               </a:ext>
             </a:extLst>
           </p:cNvPr>
@@ -7544,7 +7716,7 @@
           <p:cNvPr id="12" name="TextBox 11">
             <a:extLst>
               <a:ext uri="{FF2B5EF4-FFF2-40B4-BE49-F238E27FC236}">
-                <a16:creationId xmlns="" xmlns:a16="http://schemas.microsoft.com/office/drawing/2014/main" id="{438442CF-1B82-4A10-87A1-614331CA498E}"/>
+                <a16:creationId xmlns:a16="http://schemas.microsoft.com/office/drawing/2014/main" xmlns="" id="{438442CF-1B82-4A10-87A1-614331CA498E}"/>
               </a:ext>
             </a:extLst>
           </p:cNvPr>
@@ -7603,7 +7775,7 @@
           <p:cNvPr id="13" name="TextBox 12">
             <a:extLst>
               <a:ext uri="{FF2B5EF4-FFF2-40B4-BE49-F238E27FC236}">
-                <a16:creationId xmlns="" xmlns:a16="http://schemas.microsoft.com/office/drawing/2014/main" id="{E43AF4C5-CF5B-4E7E-B438-83CD70BE1265}"/>
+                <a16:creationId xmlns:a16="http://schemas.microsoft.com/office/drawing/2014/main" xmlns="" id="{E43AF4C5-CF5B-4E7E-B438-83CD70BE1265}"/>
               </a:ext>
             </a:extLst>
           </p:cNvPr>
@@ -8408,7 +8580,7 @@
           <p:cNvPr id="2" name="TextBox 1">
             <a:extLst>
               <a:ext uri="{FF2B5EF4-FFF2-40B4-BE49-F238E27FC236}">
-                <a16:creationId xmlns="" xmlns:a16="http://schemas.microsoft.com/office/drawing/2014/main" id="{E43AF4C5-CF5B-4E7E-B438-83CD70BE1265}"/>
+                <a16:creationId xmlns:a16="http://schemas.microsoft.com/office/drawing/2014/main" xmlns="" id="{E43AF4C5-CF5B-4E7E-B438-83CD70BE1265}"/>
               </a:ext>
             </a:extLst>
           </p:cNvPr>
@@ -8554,7 +8726,7 @@
           <p:cNvPr id="10" name="TextBox 9">
             <a:extLst>
               <a:ext uri="{FF2B5EF4-FFF2-40B4-BE49-F238E27FC236}">
-                <a16:creationId xmlns="" xmlns:a16="http://schemas.microsoft.com/office/drawing/2014/main" id="{438442CF-1B82-4A10-87A1-614331CA498E}"/>
+                <a16:creationId xmlns:a16="http://schemas.microsoft.com/office/drawing/2014/main" xmlns="" id="{438442CF-1B82-4A10-87A1-614331CA498E}"/>
               </a:ext>
             </a:extLst>
           </p:cNvPr>
@@ -11015,7 +11187,7 @@
           <p:cNvPr id="20" name="TextBox 19">
             <a:extLst>
               <a:ext uri="{FF2B5EF4-FFF2-40B4-BE49-F238E27FC236}">
-                <a16:creationId xmlns="" xmlns:a16="http://schemas.microsoft.com/office/drawing/2014/main" id="{E43AF4C5-CF5B-4E7E-B438-83CD70BE1265}"/>
+                <a16:creationId xmlns:a16="http://schemas.microsoft.com/office/drawing/2014/main" xmlns="" id="{E43AF4C5-CF5B-4E7E-B438-83CD70BE1265}"/>
               </a:ext>
             </a:extLst>
           </p:cNvPr>
@@ -11640,7 +11812,7 @@
           <p:cNvPr id="2" name="TextBox 1">
             <a:extLst>
               <a:ext uri="{FF2B5EF4-FFF2-40B4-BE49-F238E27FC236}">
-                <a16:creationId xmlns="" xmlns:a16="http://schemas.microsoft.com/office/drawing/2014/main" id="{E43AF4C5-CF5B-4E7E-B438-83CD70BE1265}"/>
+                <a16:creationId xmlns:a16="http://schemas.microsoft.com/office/drawing/2014/main" xmlns="" id="{E43AF4C5-CF5B-4E7E-B438-83CD70BE1265}"/>
               </a:ext>
             </a:extLst>
           </p:cNvPr>
@@ -11814,7 +11986,7 @@
               <p:cNvPr id="8" name="TextBox 7">
                 <a:extLst>
                   <a:ext uri="{FF2B5EF4-FFF2-40B4-BE49-F238E27FC236}">
-                    <a16:creationId xmlns="" xmlns:a16="http://schemas.microsoft.com/office/drawing/2014/main" id="{EDB442F5-34D7-4300-BA18-4B5BC98BC3D4}"/>
+                    <a16:creationId xmlns:a16="http://schemas.microsoft.com/office/drawing/2014/main" xmlns="" id="{EDB442F5-34D7-4300-BA18-4B5BC98BC3D4}"/>
                   </a:ext>
                 </a:extLst>
               </p:cNvPr>
@@ -11860,7 +12032,7 @@
               <p:cNvPr id="9" name="TextBox 8">
                 <a:extLst>
                   <a:ext uri="{FF2B5EF4-FFF2-40B4-BE49-F238E27FC236}">
-                    <a16:creationId xmlns="" xmlns:a16="http://schemas.microsoft.com/office/drawing/2014/main" id="{1126D985-4D01-49AD-AAA0-F753E895E063}"/>
+                    <a16:creationId xmlns:a16="http://schemas.microsoft.com/office/drawing/2014/main" xmlns="" id="{1126D985-4D01-49AD-AAA0-F753E895E063}"/>
                   </a:ext>
                 </a:extLst>
               </p:cNvPr>
@@ -11906,7 +12078,7 @@
               <p:cNvPr id="10" name="TextBox 9">
                 <a:extLst>
                   <a:ext uri="{FF2B5EF4-FFF2-40B4-BE49-F238E27FC236}">
-                    <a16:creationId xmlns="" xmlns:a16="http://schemas.microsoft.com/office/drawing/2014/main" id="{2F327C8B-A760-45E6-AF3F-CC4F1AE1E652}"/>
+                    <a16:creationId xmlns:a16="http://schemas.microsoft.com/office/drawing/2014/main" xmlns="" id="{2F327C8B-A760-45E6-AF3F-CC4F1AE1E652}"/>
                   </a:ext>
                 </a:extLst>
               </p:cNvPr>
@@ -11952,7 +12124,7 @@
               <p:cNvPr id="11" name="TextBox 10">
                 <a:extLst>
                   <a:ext uri="{FF2B5EF4-FFF2-40B4-BE49-F238E27FC236}">
-                    <a16:creationId xmlns="" xmlns:a16="http://schemas.microsoft.com/office/drawing/2014/main" id="{839ACAD9-74C5-4CC6-8034-5AFF1C74CC80}"/>
+                    <a16:creationId xmlns:a16="http://schemas.microsoft.com/office/drawing/2014/main" xmlns="" id="{839ACAD9-74C5-4CC6-8034-5AFF1C74CC80}"/>
                   </a:ext>
                 </a:extLst>
               </p:cNvPr>
@@ -11996,7 +12168,7 @@
               <p:cNvPr id="12" name="TextBox 11">
                 <a:extLst>
                   <a:ext uri="{FF2B5EF4-FFF2-40B4-BE49-F238E27FC236}">
-                    <a16:creationId xmlns="" xmlns:a16="http://schemas.microsoft.com/office/drawing/2014/main" id="{222D7E88-8744-4298-AB65-66D1802C446A}"/>
+                    <a16:creationId xmlns:a16="http://schemas.microsoft.com/office/drawing/2014/main" xmlns="" id="{222D7E88-8744-4298-AB65-66D1802C446A}"/>
                   </a:ext>
                 </a:extLst>
               </p:cNvPr>
@@ -12040,7 +12212,7 @@
             <p:cNvPr id="5" name="Rectangle 2">
               <a:extLst>
                 <a:ext uri="{FF2B5EF4-FFF2-40B4-BE49-F238E27FC236}">
-                  <a16:creationId xmlns="" xmlns:a16="http://schemas.microsoft.com/office/drawing/2014/main" id="{525E0D96-8099-4601-80D1-0E4DF7CAD69B}"/>
+                  <a16:creationId xmlns:a16="http://schemas.microsoft.com/office/drawing/2014/main" xmlns="" id="{525E0D96-8099-4601-80D1-0E4DF7CAD69B}"/>
                 </a:ext>
               </a:extLst>
             </p:cNvPr>
@@ -12117,7 +12289,7 @@
             <p:cNvPr id="6" name="TextBox 5">
               <a:extLst>
                 <a:ext uri="{FF2B5EF4-FFF2-40B4-BE49-F238E27FC236}">
-                  <a16:creationId xmlns="" xmlns:a16="http://schemas.microsoft.com/office/drawing/2014/main" id="{0FD4CFE0-333E-4BDA-B155-05698DAD0B70}"/>
+                  <a16:creationId xmlns:a16="http://schemas.microsoft.com/office/drawing/2014/main" xmlns="" id="{0FD4CFE0-333E-4BDA-B155-05698DAD0B70}"/>
                 </a:ext>
               </a:extLst>
             </p:cNvPr>
@@ -12160,7 +12332,7 @@
             <p:cNvPr id="7" name="Rectangle 3">
               <a:extLst>
                 <a:ext uri="{FF2B5EF4-FFF2-40B4-BE49-F238E27FC236}">
-                  <a16:creationId xmlns="" xmlns:a16="http://schemas.microsoft.com/office/drawing/2014/main" id="{46ADB3CD-EA06-4C85-A4CE-E0A5AA5A8DFC}"/>
+                  <a16:creationId xmlns:a16="http://schemas.microsoft.com/office/drawing/2014/main" xmlns="" id="{46ADB3CD-EA06-4C85-A4CE-E0A5AA5A8DFC}"/>
                 </a:ext>
               </a:extLst>
             </p:cNvPr>
@@ -13481,7 +13653,7 @@
           <p:cNvPr id="2" name="TextBox 1">
             <a:extLst>
               <a:ext uri="{FF2B5EF4-FFF2-40B4-BE49-F238E27FC236}">
-                <a16:creationId xmlns="" xmlns:a16="http://schemas.microsoft.com/office/drawing/2014/main" id="{E43AF4C5-CF5B-4E7E-B438-83CD70BE1265}"/>
+                <a16:creationId xmlns:a16="http://schemas.microsoft.com/office/drawing/2014/main" xmlns="" id="{E43AF4C5-CF5B-4E7E-B438-83CD70BE1265}"/>
               </a:ext>
             </a:extLst>
           </p:cNvPr>
@@ -13655,7 +13827,7 @@
               <p:cNvPr id="8" name="TextBox 7">
                 <a:extLst>
                   <a:ext uri="{FF2B5EF4-FFF2-40B4-BE49-F238E27FC236}">
-                    <a16:creationId xmlns="" xmlns:a16="http://schemas.microsoft.com/office/drawing/2014/main" id="{EDB442F5-34D7-4300-BA18-4B5BC98BC3D4}"/>
+                    <a16:creationId xmlns:a16="http://schemas.microsoft.com/office/drawing/2014/main" xmlns="" id="{EDB442F5-34D7-4300-BA18-4B5BC98BC3D4}"/>
                   </a:ext>
                 </a:extLst>
               </p:cNvPr>
@@ -13701,7 +13873,7 @@
               <p:cNvPr id="9" name="TextBox 8">
                 <a:extLst>
                   <a:ext uri="{FF2B5EF4-FFF2-40B4-BE49-F238E27FC236}">
-                    <a16:creationId xmlns="" xmlns:a16="http://schemas.microsoft.com/office/drawing/2014/main" id="{1126D985-4D01-49AD-AAA0-F753E895E063}"/>
+                    <a16:creationId xmlns:a16="http://schemas.microsoft.com/office/drawing/2014/main" xmlns="" id="{1126D985-4D01-49AD-AAA0-F753E895E063}"/>
                   </a:ext>
                 </a:extLst>
               </p:cNvPr>
@@ -13747,7 +13919,7 @@
               <p:cNvPr id="10" name="TextBox 9">
                 <a:extLst>
                   <a:ext uri="{FF2B5EF4-FFF2-40B4-BE49-F238E27FC236}">
-                    <a16:creationId xmlns="" xmlns:a16="http://schemas.microsoft.com/office/drawing/2014/main" id="{2F327C8B-A760-45E6-AF3F-CC4F1AE1E652}"/>
+                    <a16:creationId xmlns:a16="http://schemas.microsoft.com/office/drawing/2014/main" xmlns="" id="{2F327C8B-A760-45E6-AF3F-CC4F1AE1E652}"/>
                   </a:ext>
                 </a:extLst>
               </p:cNvPr>
@@ -13793,7 +13965,7 @@
               <p:cNvPr id="11" name="TextBox 10">
                 <a:extLst>
                   <a:ext uri="{FF2B5EF4-FFF2-40B4-BE49-F238E27FC236}">
-                    <a16:creationId xmlns="" xmlns:a16="http://schemas.microsoft.com/office/drawing/2014/main" id="{839ACAD9-74C5-4CC6-8034-5AFF1C74CC80}"/>
+                    <a16:creationId xmlns:a16="http://schemas.microsoft.com/office/drawing/2014/main" xmlns="" id="{839ACAD9-74C5-4CC6-8034-5AFF1C74CC80}"/>
                   </a:ext>
                 </a:extLst>
               </p:cNvPr>
@@ -13837,7 +14009,7 @@
               <p:cNvPr id="12" name="TextBox 11">
                 <a:extLst>
                   <a:ext uri="{FF2B5EF4-FFF2-40B4-BE49-F238E27FC236}">
-                    <a16:creationId xmlns="" xmlns:a16="http://schemas.microsoft.com/office/drawing/2014/main" id="{222D7E88-8744-4298-AB65-66D1802C446A}"/>
+                    <a16:creationId xmlns:a16="http://schemas.microsoft.com/office/drawing/2014/main" xmlns="" id="{222D7E88-8744-4298-AB65-66D1802C446A}"/>
                   </a:ext>
                 </a:extLst>
               </p:cNvPr>
@@ -13881,7 +14053,7 @@
             <p:cNvPr id="5" name="Rectangle 2">
               <a:extLst>
                 <a:ext uri="{FF2B5EF4-FFF2-40B4-BE49-F238E27FC236}">
-                  <a16:creationId xmlns="" xmlns:a16="http://schemas.microsoft.com/office/drawing/2014/main" id="{525E0D96-8099-4601-80D1-0E4DF7CAD69B}"/>
+                  <a16:creationId xmlns:a16="http://schemas.microsoft.com/office/drawing/2014/main" xmlns="" id="{525E0D96-8099-4601-80D1-0E4DF7CAD69B}"/>
                 </a:ext>
               </a:extLst>
             </p:cNvPr>
@@ -13958,7 +14130,7 @@
             <p:cNvPr id="6" name="TextBox 5">
               <a:extLst>
                 <a:ext uri="{FF2B5EF4-FFF2-40B4-BE49-F238E27FC236}">
-                  <a16:creationId xmlns="" xmlns:a16="http://schemas.microsoft.com/office/drawing/2014/main" id="{0FD4CFE0-333E-4BDA-B155-05698DAD0B70}"/>
+                  <a16:creationId xmlns:a16="http://schemas.microsoft.com/office/drawing/2014/main" xmlns="" id="{0FD4CFE0-333E-4BDA-B155-05698DAD0B70}"/>
                 </a:ext>
               </a:extLst>
             </p:cNvPr>
@@ -14001,7 +14173,7 @@
             <p:cNvPr id="7" name="Rectangle 3">
               <a:extLst>
                 <a:ext uri="{FF2B5EF4-FFF2-40B4-BE49-F238E27FC236}">
-                  <a16:creationId xmlns="" xmlns:a16="http://schemas.microsoft.com/office/drawing/2014/main" id="{46ADB3CD-EA06-4C85-A4CE-E0A5AA5A8DFC}"/>
+                  <a16:creationId xmlns:a16="http://schemas.microsoft.com/office/drawing/2014/main" xmlns="" id="{46ADB3CD-EA06-4C85-A4CE-E0A5AA5A8DFC}"/>
                 </a:ext>
               </a:extLst>
             </p:cNvPr>
@@ -14834,7 +15006,7 @@
           <p:cNvPr id="4" name="TextBox 3">
             <a:extLst>
               <a:ext uri="{FF2B5EF4-FFF2-40B4-BE49-F238E27FC236}">
-                <a16:creationId xmlns="" xmlns:a16="http://schemas.microsoft.com/office/drawing/2014/main" id="{E43AF4C5-CF5B-4E7E-B438-83CD70BE1265}"/>
+                <a16:creationId xmlns:a16="http://schemas.microsoft.com/office/drawing/2014/main" xmlns="" id="{E43AF4C5-CF5B-4E7E-B438-83CD70BE1265}"/>
               </a:ext>
             </a:extLst>
           </p:cNvPr>
@@ -16359,7 +16531,7 @@
           <p:cNvPr id="2" name="TextBox 1">
             <a:extLst>
               <a:ext uri="{FF2B5EF4-FFF2-40B4-BE49-F238E27FC236}">
-                <a16:creationId xmlns="" xmlns:a16="http://schemas.microsoft.com/office/drawing/2014/main" id="{E43AF4C5-CF5B-4E7E-B438-83CD70BE1265}"/>
+                <a16:creationId xmlns:a16="http://schemas.microsoft.com/office/drawing/2014/main" xmlns="" id="{E43AF4C5-CF5B-4E7E-B438-83CD70BE1265}"/>
               </a:ext>
             </a:extLst>
           </p:cNvPr>
@@ -16533,7 +16705,7 @@
               <p:cNvPr id="9" name="TextBox 8">
                 <a:extLst>
                   <a:ext uri="{FF2B5EF4-FFF2-40B4-BE49-F238E27FC236}">
-                    <a16:creationId xmlns="" xmlns:a16="http://schemas.microsoft.com/office/drawing/2014/main" id="{EDB442F5-34D7-4300-BA18-4B5BC98BC3D4}"/>
+                    <a16:creationId xmlns:a16="http://schemas.microsoft.com/office/drawing/2014/main" xmlns="" id="{EDB442F5-34D7-4300-BA18-4B5BC98BC3D4}"/>
                   </a:ext>
                 </a:extLst>
               </p:cNvPr>
@@ -16579,7 +16751,7 @@
               <p:cNvPr id="10" name="TextBox 9">
                 <a:extLst>
                   <a:ext uri="{FF2B5EF4-FFF2-40B4-BE49-F238E27FC236}">
-                    <a16:creationId xmlns="" xmlns:a16="http://schemas.microsoft.com/office/drawing/2014/main" id="{1126D985-4D01-49AD-AAA0-F753E895E063}"/>
+                    <a16:creationId xmlns:a16="http://schemas.microsoft.com/office/drawing/2014/main" xmlns="" id="{1126D985-4D01-49AD-AAA0-F753E895E063}"/>
                   </a:ext>
                 </a:extLst>
               </p:cNvPr>
@@ -16625,7 +16797,7 @@
               <p:cNvPr id="11" name="TextBox 10">
                 <a:extLst>
                   <a:ext uri="{FF2B5EF4-FFF2-40B4-BE49-F238E27FC236}">
-                    <a16:creationId xmlns="" xmlns:a16="http://schemas.microsoft.com/office/drawing/2014/main" id="{2F327C8B-A760-45E6-AF3F-CC4F1AE1E652}"/>
+                    <a16:creationId xmlns:a16="http://schemas.microsoft.com/office/drawing/2014/main" xmlns="" id="{2F327C8B-A760-45E6-AF3F-CC4F1AE1E652}"/>
                   </a:ext>
                 </a:extLst>
               </p:cNvPr>
@@ -16671,7 +16843,7 @@
               <p:cNvPr id="12" name="TextBox 11">
                 <a:extLst>
                   <a:ext uri="{FF2B5EF4-FFF2-40B4-BE49-F238E27FC236}">
-                    <a16:creationId xmlns="" xmlns:a16="http://schemas.microsoft.com/office/drawing/2014/main" id="{839ACAD9-74C5-4CC6-8034-5AFF1C74CC80}"/>
+                    <a16:creationId xmlns:a16="http://schemas.microsoft.com/office/drawing/2014/main" xmlns="" id="{839ACAD9-74C5-4CC6-8034-5AFF1C74CC80}"/>
                   </a:ext>
                 </a:extLst>
               </p:cNvPr>
@@ -16715,7 +16887,7 @@
               <p:cNvPr id="13" name="TextBox 12">
                 <a:extLst>
                   <a:ext uri="{FF2B5EF4-FFF2-40B4-BE49-F238E27FC236}">
-                    <a16:creationId xmlns="" xmlns:a16="http://schemas.microsoft.com/office/drawing/2014/main" id="{222D7E88-8744-4298-AB65-66D1802C446A}"/>
+                    <a16:creationId xmlns:a16="http://schemas.microsoft.com/office/drawing/2014/main" xmlns="" id="{222D7E88-8744-4298-AB65-66D1802C446A}"/>
                   </a:ext>
                 </a:extLst>
               </p:cNvPr>
@@ -16759,7 +16931,7 @@
             <p:cNvPr id="6" name="Rectangle 2">
               <a:extLst>
                 <a:ext uri="{FF2B5EF4-FFF2-40B4-BE49-F238E27FC236}">
-                  <a16:creationId xmlns="" xmlns:a16="http://schemas.microsoft.com/office/drawing/2014/main" id="{525E0D96-8099-4601-80D1-0E4DF7CAD69B}"/>
+                  <a16:creationId xmlns:a16="http://schemas.microsoft.com/office/drawing/2014/main" xmlns="" id="{525E0D96-8099-4601-80D1-0E4DF7CAD69B}"/>
                 </a:ext>
               </a:extLst>
             </p:cNvPr>
@@ -16836,7 +17008,7 @@
             <p:cNvPr id="7" name="TextBox 6">
               <a:extLst>
                 <a:ext uri="{FF2B5EF4-FFF2-40B4-BE49-F238E27FC236}">
-                  <a16:creationId xmlns="" xmlns:a16="http://schemas.microsoft.com/office/drawing/2014/main" id="{0FD4CFE0-333E-4BDA-B155-05698DAD0B70}"/>
+                  <a16:creationId xmlns:a16="http://schemas.microsoft.com/office/drawing/2014/main" xmlns="" id="{0FD4CFE0-333E-4BDA-B155-05698DAD0B70}"/>
                 </a:ext>
               </a:extLst>
             </p:cNvPr>
@@ -16879,7 +17051,7 @@
             <p:cNvPr id="8" name="Rectangle 3">
               <a:extLst>
                 <a:ext uri="{FF2B5EF4-FFF2-40B4-BE49-F238E27FC236}">
-                  <a16:creationId xmlns="" xmlns:a16="http://schemas.microsoft.com/office/drawing/2014/main" id="{46ADB3CD-EA06-4C85-A4CE-E0A5AA5A8DFC}"/>
+                  <a16:creationId xmlns:a16="http://schemas.microsoft.com/office/drawing/2014/main" xmlns="" id="{46ADB3CD-EA06-4C85-A4CE-E0A5AA5A8DFC}"/>
                 </a:ext>
               </a:extLst>
             </p:cNvPr>
@@ -18341,7 +18513,7 @@
           <p:cNvPr id="2" name="TextBox 1">
             <a:extLst>
               <a:ext uri="{FF2B5EF4-FFF2-40B4-BE49-F238E27FC236}">
-                <a16:creationId xmlns="" xmlns:a16="http://schemas.microsoft.com/office/drawing/2014/main" id="{E43AF4C5-CF5B-4E7E-B438-83CD70BE1265}"/>
+                <a16:creationId xmlns:a16="http://schemas.microsoft.com/office/drawing/2014/main" xmlns="" id="{E43AF4C5-CF5B-4E7E-B438-83CD70BE1265}"/>
               </a:ext>
             </a:extLst>
           </p:cNvPr>
@@ -19212,7 +19384,7 @@
           <p:cNvPr id="4" name="TextBox 3">
             <a:extLst>
               <a:ext uri="{FF2B5EF4-FFF2-40B4-BE49-F238E27FC236}">
-                <a16:creationId xmlns="" xmlns:a16="http://schemas.microsoft.com/office/drawing/2014/main" id="{6F77B270-35F1-4A5B-875A-9BFD13BC898E}"/>
+                <a16:creationId xmlns:a16="http://schemas.microsoft.com/office/drawing/2014/main" xmlns="" id="{6F77B270-35F1-4A5B-875A-9BFD13BC898E}"/>
               </a:ext>
             </a:extLst>
           </p:cNvPr>
@@ -19267,7 +19439,7 @@
           <p:cNvPr id="2" name="TextBox 1">
             <a:extLst>
               <a:ext uri="{FF2B5EF4-FFF2-40B4-BE49-F238E27FC236}">
-                <a16:creationId xmlns="" xmlns:a16="http://schemas.microsoft.com/office/drawing/2014/main" id="{FF6CBC01-8361-49E5-9581-0C1FE9620EC9}"/>
+                <a16:creationId xmlns:a16="http://schemas.microsoft.com/office/drawing/2014/main" xmlns="" id="{FF6CBC01-8361-49E5-9581-0C1FE9620EC9}"/>
               </a:ext>
             </a:extLst>
           </p:cNvPr>
@@ -19313,7 +19485,7 @@
           <p:cNvPr id="7" name="TextBox 6">
             <a:extLst>
               <a:ext uri="{FF2B5EF4-FFF2-40B4-BE49-F238E27FC236}">
-                <a16:creationId xmlns="" xmlns:a16="http://schemas.microsoft.com/office/drawing/2014/main" id="{E1CD5414-A932-4E07-97C5-AA66923DCEC6}"/>
+                <a16:creationId xmlns:a16="http://schemas.microsoft.com/office/drawing/2014/main" xmlns="" id="{E1CD5414-A932-4E07-97C5-AA66923DCEC6}"/>
               </a:ext>
             </a:extLst>
           </p:cNvPr>
@@ -19359,7 +19531,7 @@
           <p:cNvPr id="12" name="TextBox 11">
             <a:extLst>
               <a:ext uri="{FF2B5EF4-FFF2-40B4-BE49-F238E27FC236}">
-                <a16:creationId xmlns="" xmlns:a16="http://schemas.microsoft.com/office/drawing/2014/main" id="{BAF1D114-340B-40A7-B896-B7E9FF2342D4}"/>
+                <a16:creationId xmlns:a16="http://schemas.microsoft.com/office/drawing/2014/main" xmlns="" id="{BAF1D114-340B-40A7-B896-B7E9FF2342D4}"/>
               </a:ext>
             </a:extLst>
           </p:cNvPr>
@@ -19405,7 +19577,7 @@
           <p:cNvPr id="13" name="TextBox 12">
             <a:extLst>
               <a:ext uri="{FF2B5EF4-FFF2-40B4-BE49-F238E27FC236}">
-                <a16:creationId xmlns="" xmlns:a16="http://schemas.microsoft.com/office/drawing/2014/main" id="{3774D6C2-F684-4C1B-9AF0-CB59B2D6F726}"/>
+                <a16:creationId xmlns:a16="http://schemas.microsoft.com/office/drawing/2014/main" xmlns="" id="{3774D6C2-F684-4C1B-9AF0-CB59B2D6F726}"/>
               </a:ext>
             </a:extLst>
           </p:cNvPr>
@@ -19449,7 +19621,7 @@
           <p:cNvPr id="11" name="Rectangle 2">
             <a:extLst>
               <a:ext uri="{FF2B5EF4-FFF2-40B4-BE49-F238E27FC236}">
-                <a16:creationId xmlns="" xmlns:a16="http://schemas.microsoft.com/office/drawing/2014/main" id="{944DD051-DEF9-4988-A138-45BC09BB4EE1}"/>
+                <a16:creationId xmlns:a16="http://schemas.microsoft.com/office/drawing/2014/main" xmlns="" id="{944DD051-DEF9-4988-A138-45BC09BB4EE1}"/>
               </a:ext>
             </a:extLst>
           </p:cNvPr>
@@ -19547,7 +19719,7 @@
           <p:cNvPr id="33" name="Group 32">
             <a:extLst>
               <a:ext uri="{FF2B5EF4-FFF2-40B4-BE49-F238E27FC236}">
-                <a16:creationId xmlns="" xmlns:a16="http://schemas.microsoft.com/office/drawing/2014/main" id="{ACAC77A1-F6A6-43B9-8C12-056B2BAF5231}"/>
+                <a16:creationId xmlns:a16="http://schemas.microsoft.com/office/drawing/2014/main" xmlns="" id="{ACAC77A1-F6A6-43B9-8C12-056B2BAF5231}"/>
               </a:ext>
             </a:extLst>
           </p:cNvPr>
@@ -19567,7 +19739,7 @@
             <p:cNvPr id="22" name="TextBox 21">
               <a:extLst>
                 <a:ext uri="{FF2B5EF4-FFF2-40B4-BE49-F238E27FC236}">
-                  <a16:creationId xmlns="" xmlns:a16="http://schemas.microsoft.com/office/drawing/2014/main" id="{A90B819B-B576-4062-9E37-50E6B3385861}"/>
+                  <a16:creationId xmlns:a16="http://schemas.microsoft.com/office/drawing/2014/main" xmlns="" id="{A90B819B-B576-4062-9E37-50E6B3385861}"/>
                 </a:ext>
               </a:extLst>
             </p:cNvPr>
@@ -19613,7 +19785,7 @@
             <p:cNvPr id="23" name="TextBox 22">
               <a:extLst>
                 <a:ext uri="{FF2B5EF4-FFF2-40B4-BE49-F238E27FC236}">
-                  <a16:creationId xmlns="" xmlns:a16="http://schemas.microsoft.com/office/drawing/2014/main" id="{38459C3C-DAD7-4A41-9BE2-61F7F5AA117D}"/>
+                  <a16:creationId xmlns:a16="http://schemas.microsoft.com/office/drawing/2014/main" xmlns="" id="{38459C3C-DAD7-4A41-9BE2-61F7F5AA117D}"/>
                 </a:ext>
               </a:extLst>
             </p:cNvPr>
@@ -19659,7 +19831,7 @@
             <p:cNvPr id="24" name="TextBox 23">
               <a:extLst>
                 <a:ext uri="{FF2B5EF4-FFF2-40B4-BE49-F238E27FC236}">
-                  <a16:creationId xmlns="" xmlns:a16="http://schemas.microsoft.com/office/drawing/2014/main" id="{D88A6B0A-C817-495A-9EE2-12393AE7B97D}"/>
+                  <a16:creationId xmlns:a16="http://schemas.microsoft.com/office/drawing/2014/main" xmlns="" id="{D88A6B0A-C817-495A-9EE2-12393AE7B97D}"/>
                 </a:ext>
               </a:extLst>
             </p:cNvPr>
@@ -19705,7 +19877,7 @@
             <p:cNvPr id="25" name="TextBox 24">
               <a:extLst>
                 <a:ext uri="{FF2B5EF4-FFF2-40B4-BE49-F238E27FC236}">
-                  <a16:creationId xmlns="" xmlns:a16="http://schemas.microsoft.com/office/drawing/2014/main" id="{A24FF243-4EE3-4C98-B632-7E7F7BC11E7F}"/>
+                  <a16:creationId xmlns:a16="http://schemas.microsoft.com/office/drawing/2014/main" xmlns="" id="{A24FF243-4EE3-4C98-B632-7E7F7BC11E7F}"/>
                 </a:ext>
               </a:extLst>
             </p:cNvPr>
@@ -19749,7 +19921,7 @@
             <p:cNvPr id="26" name="Rectangle 2">
               <a:extLst>
                 <a:ext uri="{FF2B5EF4-FFF2-40B4-BE49-F238E27FC236}">
-                  <a16:creationId xmlns="" xmlns:a16="http://schemas.microsoft.com/office/drawing/2014/main" id="{BA4FE94C-D898-4962-8131-E4888B1FB3FD}"/>
+                  <a16:creationId xmlns:a16="http://schemas.microsoft.com/office/drawing/2014/main" xmlns="" id="{BA4FE94C-D898-4962-8131-E4888B1FB3FD}"/>
                 </a:ext>
               </a:extLst>
             </p:cNvPr>
@@ -19837,7 +20009,7 @@
           <p:cNvPr id="44" name="Group 43">
             <a:extLst>
               <a:ext uri="{FF2B5EF4-FFF2-40B4-BE49-F238E27FC236}">
-                <a16:creationId xmlns="" xmlns:a16="http://schemas.microsoft.com/office/drawing/2014/main" id="{8B6EC073-FC2C-4D56-BBFD-BAA996D284AC}"/>
+                <a16:creationId xmlns:a16="http://schemas.microsoft.com/office/drawing/2014/main" xmlns="" id="{8B6EC073-FC2C-4D56-BBFD-BAA996D284AC}"/>
               </a:ext>
             </a:extLst>
           </p:cNvPr>
@@ -19857,7 +20029,7 @@
             <p:cNvPr id="35" name="TextBox 34">
               <a:extLst>
                 <a:ext uri="{FF2B5EF4-FFF2-40B4-BE49-F238E27FC236}">
-                  <a16:creationId xmlns="" xmlns:a16="http://schemas.microsoft.com/office/drawing/2014/main" id="{E92E909F-8CEF-4A1B-9E9E-057D4F711B66}"/>
+                  <a16:creationId xmlns:a16="http://schemas.microsoft.com/office/drawing/2014/main" xmlns="" id="{E92E909F-8CEF-4A1B-9E9E-057D4F711B66}"/>
                 </a:ext>
               </a:extLst>
             </p:cNvPr>
@@ -19903,7 +20075,7 @@
             <p:cNvPr id="36" name="TextBox 35">
               <a:extLst>
                 <a:ext uri="{FF2B5EF4-FFF2-40B4-BE49-F238E27FC236}">
-                  <a16:creationId xmlns="" xmlns:a16="http://schemas.microsoft.com/office/drawing/2014/main" id="{EDAAA188-3F7F-4561-A7F9-3DA7D1AA8B67}"/>
+                  <a16:creationId xmlns:a16="http://schemas.microsoft.com/office/drawing/2014/main" xmlns="" id="{EDAAA188-3F7F-4561-A7F9-3DA7D1AA8B67}"/>
                 </a:ext>
               </a:extLst>
             </p:cNvPr>
@@ -19949,7 +20121,7 @@
             <p:cNvPr id="37" name="TextBox 36">
               <a:extLst>
                 <a:ext uri="{FF2B5EF4-FFF2-40B4-BE49-F238E27FC236}">
-                  <a16:creationId xmlns="" xmlns:a16="http://schemas.microsoft.com/office/drawing/2014/main" id="{B3406560-2692-43BD-B3EF-B079A771F89C}"/>
+                  <a16:creationId xmlns:a16="http://schemas.microsoft.com/office/drawing/2014/main" xmlns="" id="{B3406560-2692-43BD-B3EF-B079A771F89C}"/>
                 </a:ext>
               </a:extLst>
             </p:cNvPr>
@@ -19995,7 +20167,7 @@
             <p:cNvPr id="38" name="TextBox 37">
               <a:extLst>
                 <a:ext uri="{FF2B5EF4-FFF2-40B4-BE49-F238E27FC236}">
-                  <a16:creationId xmlns="" xmlns:a16="http://schemas.microsoft.com/office/drawing/2014/main" id="{FB51184F-8749-48B4-AD07-636877C65807}"/>
+                  <a16:creationId xmlns:a16="http://schemas.microsoft.com/office/drawing/2014/main" xmlns="" id="{FB51184F-8749-48B4-AD07-636877C65807}"/>
                 </a:ext>
               </a:extLst>
             </p:cNvPr>
@@ -20039,7 +20211,7 @@
             <p:cNvPr id="39" name="Rectangle 2">
               <a:extLst>
                 <a:ext uri="{FF2B5EF4-FFF2-40B4-BE49-F238E27FC236}">
-                  <a16:creationId xmlns="" xmlns:a16="http://schemas.microsoft.com/office/drawing/2014/main" id="{EF8F38E6-3381-4254-AB6F-D9AC1C9269CE}"/>
+                  <a16:creationId xmlns:a16="http://schemas.microsoft.com/office/drawing/2014/main" xmlns="" id="{EF8F38E6-3381-4254-AB6F-D9AC1C9269CE}"/>
                 </a:ext>
               </a:extLst>
             </p:cNvPr>
@@ -20191,7 +20363,7 @@
           <p:cNvPr id="52" name="Group 51">
             <a:extLst>
               <a:ext uri="{FF2B5EF4-FFF2-40B4-BE49-F238E27FC236}">
-                <a16:creationId xmlns="" xmlns:a16="http://schemas.microsoft.com/office/drawing/2014/main" id="{B010521C-F2F6-4DFD-9F7F-D1CDDE352F4B}"/>
+                <a16:creationId xmlns:a16="http://schemas.microsoft.com/office/drawing/2014/main" xmlns="" id="{B010521C-F2F6-4DFD-9F7F-D1CDDE352F4B}"/>
               </a:ext>
             </a:extLst>
           </p:cNvPr>
@@ -20211,7 +20383,7 @@
             <p:cNvPr id="45" name="TextBox 44">
               <a:extLst>
                 <a:ext uri="{FF2B5EF4-FFF2-40B4-BE49-F238E27FC236}">
-                  <a16:creationId xmlns="" xmlns:a16="http://schemas.microsoft.com/office/drawing/2014/main" id="{3A945157-1FA0-4494-9DF7-E38C4A3E4C3C}"/>
+                  <a16:creationId xmlns:a16="http://schemas.microsoft.com/office/drawing/2014/main" xmlns="" id="{3A945157-1FA0-4494-9DF7-E38C4A3E4C3C}"/>
                 </a:ext>
               </a:extLst>
             </p:cNvPr>
@@ -20264,7 +20436,7 @@
             <p:cNvPr id="47" name="Straight Arrow Connector 46">
               <a:extLst>
                 <a:ext uri="{FF2B5EF4-FFF2-40B4-BE49-F238E27FC236}">
-                  <a16:creationId xmlns="" xmlns:a16="http://schemas.microsoft.com/office/drawing/2014/main" id="{AE58F8BA-228E-4E46-B9EE-FCD07B04AB67}"/>
+                  <a16:creationId xmlns:a16="http://schemas.microsoft.com/office/drawing/2014/main" xmlns="" id="{AE58F8BA-228E-4E46-B9EE-FCD07B04AB67}"/>
                 </a:ext>
               </a:extLst>
             </p:cNvPr>
@@ -21163,7 +21335,7 @@
           <p:cNvPr id="5" name="Picture 4">
             <a:extLst>
               <a:ext uri="{FF2B5EF4-FFF2-40B4-BE49-F238E27FC236}">
-                <a16:creationId xmlns="" xmlns:a16="http://schemas.microsoft.com/office/drawing/2014/main" id="{59AF7D31-2782-4922-8B1C-2A00717E2EF7}"/>
+                <a16:creationId xmlns:a16="http://schemas.microsoft.com/office/drawing/2014/main" xmlns="" id="{59AF7D31-2782-4922-8B1C-2A00717E2EF7}"/>
               </a:ext>
             </a:extLst>
           </p:cNvPr>
@@ -21199,7 +21371,7 @@
           <p:cNvPr id="6" name="Picture 5">
             <a:extLst>
               <a:ext uri="{FF2B5EF4-FFF2-40B4-BE49-F238E27FC236}">
-                <a16:creationId xmlns="" xmlns:a16="http://schemas.microsoft.com/office/drawing/2014/main" id="{0C3D18F3-6970-429A-A025-B63232EE4A09}"/>
+                <a16:creationId xmlns:a16="http://schemas.microsoft.com/office/drawing/2014/main" xmlns="" id="{0C3D18F3-6970-429A-A025-B63232EE4A09}"/>
               </a:ext>
             </a:extLst>
           </p:cNvPr>
@@ -21235,7 +21407,7 @@
           <p:cNvPr id="7" name="Picture 6">
             <a:extLst>
               <a:ext uri="{FF2B5EF4-FFF2-40B4-BE49-F238E27FC236}">
-                <a16:creationId xmlns="" xmlns:a16="http://schemas.microsoft.com/office/drawing/2014/main" id="{0B0629E2-2DA3-4F63-BB3E-641AEA04EAC8}"/>
+                <a16:creationId xmlns:a16="http://schemas.microsoft.com/office/drawing/2014/main" xmlns="" id="{0B0629E2-2DA3-4F63-BB3E-641AEA04EAC8}"/>
               </a:ext>
             </a:extLst>
           </p:cNvPr>
@@ -21271,7 +21443,7 @@
           <p:cNvPr id="52" name="Group 51">
             <a:extLst>
               <a:ext uri="{FF2B5EF4-FFF2-40B4-BE49-F238E27FC236}">
-                <a16:creationId xmlns="" xmlns:a16="http://schemas.microsoft.com/office/drawing/2014/main" id="{107757F1-EED8-4438-B609-40224D9820D5}"/>
+                <a16:creationId xmlns:a16="http://schemas.microsoft.com/office/drawing/2014/main" xmlns="" id="{107757F1-EED8-4438-B609-40224D9820D5}"/>
               </a:ext>
             </a:extLst>
           </p:cNvPr>
@@ -21291,7 +21463,7 @@
             <p:cNvPr id="32" name="TextBox 31">
               <a:extLst>
                 <a:ext uri="{FF2B5EF4-FFF2-40B4-BE49-F238E27FC236}">
-                  <a16:creationId xmlns="" xmlns:a16="http://schemas.microsoft.com/office/drawing/2014/main" id="{6A10D917-EAF5-4C2E-952E-E1B3C0071E1E}"/>
+                  <a16:creationId xmlns:a16="http://schemas.microsoft.com/office/drawing/2014/main" xmlns="" id="{6A10D917-EAF5-4C2E-952E-E1B3C0071E1E}"/>
                 </a:ext>
               </a:extLst>
             </p:cNvPr>
@@ -21337,7 +21509,7 @@
             <p:cNvPr id="33" name="TextBox 32">
               <a:extLst>
                 <a:ext uri="{FF2B5EF4-FFF2-40B4-BE49-F238E27FC236}">
-                  <a16:creationId xmlns="" xmlns:a16="http://schemas.microsoft.com/office/drawing/2014/main" id="{99E78B0A-2A1B-4BFC-A266-0BA95F7599C6}"/>
+                  <a16:creationId xmlns:a16="http://schemas.microsoft.com/office/drawing/2014/main" xmlns="" id="{99E78B0A-2A1B-4BFC-A266-0BA95F7599C6}"/>
                 </a:ext>
               </a:extLst>
             </p:cNvPr>
@@ -21383,7 +21555,7 @@
             <p:cNvPr id="34" name="TextBox 33">
               <a:extLst>
                 <a:ext uri="{FF2B5EF4-FFF2-40B4-BE49-F238E27FC236}">
-                  <a16:creationId xmlns="" xmlns:a16="http://schemas.microsoft.com/office/drawing/2014/main" id="{84C50921-5325-4D09-9C2E-91D84ED4BB07}"/>
+                  <a16:creationId xmlns:a16="http://schemas.microsoft.com/office/drawing/2014/main" xmlns="" id="{84C50921-5325-4D09-9C2E-91D84ED4BB07}"/>
                 </a:ext>
               </a:extLst>
             </p:cNvPr>
@@ -21429,7 +21601,7 @@
             <p:cNvPr id="35" name="TextBox 34">
               <a:extLst>
                 <a:ext uri="{FF2B5EF4-FFF2-40B4-BE49-F238E27FC236}">
-                  <a16:creationId xmlns="" xmlns:a16="http://schemas.microsoft.com/office/drawing/2014/main" id="{FF57C241-9797-4767-82FA-7A49EC79B87F}"/>
+                  <a16:creationId xmlns:a16="http://schemas.microsoft.com/office/drawing/2014/main" xmlns="" id="{FF57C241-9797-4767-82FA-7A49EC79B87F}"/>
                 </a:ext>
               </a:extLst>
             </p:cNvPr>
@@ -21473,7 +21645,7 @@
             <p:cNvPr id="36" name="Rectangle 2">
               <a:extLst>
                 <a:ext uri="{FF2B5EF4-FFF2-40B4-BE49-F238E27FC236}">
-                  <a16:creationId xmlns="" xmlns:a16="http://schemas.microsoft.com/office/drawing/2014/main" id="{48C12E22-BF9A-41DF-9994-EF347B6CCEF3}"/>
+                  <a16:creationId xmlns:a16="http://schemas.microsoft.com/office/drawing/2014/main" xmlns="" id="{48C12E22-BF9A-41DF-9994-EF347B6CCEF3}"/>
                 </a:ext>
               </a:extLst>
             </p:cNvPr>
@@ -21572,7 +21744,7 @@
           <p:cNvPr id="53" name="Group 52">
             <a:extLst>
               <a:ext uri="{FF2B5EF4-FFF2-40B4-BE49-F238E27FC236}">
-                <a16:creationId xmlns="" xmlns:a16="http://schemas.microsoft.com/office/drawing/2014/main" id="{2AF0B01A-621C-4CDE-AA9F-8326F7E3BE19}"/>
+                <a16:creationId xmlns:a16="http://schemas.microsoft.com/office/drawing/2014/main" xmlns="" id="{2AF0B01A-621C-4CDE-AA9F-8326F7E3BE19}"/>
               </a:ext>
             </a:extLst>
           </p:cNvPr>
@@ -21592,7 +21764,7 @@
             <p:cNvPr id="37" name="Group 36">
               <a:extLst>
                 <a:ext uri="{FF2B5EF4-FFF2-40B4-BE49-F238E27FC236}">
-                  <a16:creationId xmlns="" xmlns:a16="http://schemas.microsoft.com/office/drawing/2014/main" id="{A9E14DE8-E76B-4EF3-999F-348EC84EE312}"/>
+                  <a16:creationId xmlns:a16="http://schemas.microsoft.com/office/drawing/2014/main" xmlns="" id="{A9E14DE8-E76B-4EF3-999F-348EC84EE312}"/>
                 </a:ext>
               </a:extLst>
             </p:cNvPr>
@@ -21612,7 +21784,7 @@
               <p:cNvPr id="38" name="TextBox 37">
                 <a:extLst>
                   <a:ext uri="{FF2B5EF4-FFF2-40B4-BE49-F238E27FC236}">
-                    <a16:creationId xmlns="" xmlns:a16="http://schemas.microsoft.com/office/drawing/2014/main" id="{1DD282C7-A99A-435C-8220-DE2FA11BC47F}"/>
+                    <a16:creationId xmlns:a16="http://schemas.microsoft.com/office/drawing/2014/main" xmlns="" id="{1DD282C7-A99A-435C-8220-DE2FA11BC47F}"/>
                   </a:ext>
                 </a:extLst>
               </p:cNvPr>
@@ -21658,7 +21830,7 @@
               <p:cNvPr id="39" name="TextBox 38">
                 <a:extLst>
                   <a:ext uri="{FF2B5EF4-FFF2-40B4-BE49-F238E27FC236}">
-                    <a16:creationId xmlns="" xmlns:a16="http://schemas.microsoft.com/office/drawing/2014/main" id="{AA9423A4-90EF-4168-8D1B-133225A02BEA}"/>
+                    <a16:creationId xmlns:a16="http://schemas.microsoft.com/office/drawing/2014/main" xmlns="" id="{AA9423A4-90EF-4168-8D1B-133225A02BEA}"/>
                   </a:ext>
                 </a:extLst>
               </p:cNvPr>
@@ -21704,7 +21876,7 @@
               <p:cNvPr id="40" name="TextBox 39">
                 <a:extLst>
                   <a:ext uri="{FF2B5EF4-FFF2-40B4-BE49-F238E27FC236}">
-                    <a16:creationId xmlns="" xmlns:a16="http://schemas.microsoft.com/office/drawing/2014/main" id="{C2870B03-65D0-4BCF-9160-632D7651B00D}"/>
+                    <a16:creationId xmlns:a16="http://schemas.microsoft.com/office/drawing/2014/main" xmlns="" id="{C2870B03-65D0-4BCF-9160-632D7651B00D}"/>
                   </a:ext>
                 </a:extLst>
               </p:cNvPr>
@@ -21750,7 +21922,7 @@
               <p:cNvPr id="41" name="TextBox 40">
                 <a:extLst>
                   <a:ext uri="{FF2B5EF4-FFF2-40B4-BE49-F238E27FC236}">
-                    <a16:creationId xmlns="" xmlns:a16="http://schemas.microsoft.com/office/drawing/2014/main" id="{53C0E7CA-7116-42E2-BCAA-0B8B8A38BCFF}"/>
+                    <a16:creationId xmlns:a16="http://schemas.microsoft.com/office/drawing/2014/main" xmlns="" id="{53C0E7CA-7116-42E2-BCAA-0B8B8A38BCFF}"/>
                   </a:ext>
                 </a:extLst>
               </p:cNvPr>
@@ -21794,7 +21966,7 @@
               <p:cNvPr id="42" name="Rectangle 2">
                 <a:extLst>
                   <a:ext uri="{FF2B5EF4-FFF2-40B4-BE49-F238E27FC236}">
-                    <a16:creationId xmlns="" xmlns:a16="http://schemas.microsoft.com/office/drawing/2014/main" id="{18898162-8309-41CC-961B-671BA65997AB}"/>
+                    <a16:creationId xmlns:a16="http://schemas.microsoft.com/office/drawing/2014/main" xmlns="" id="{18898162-8309-41CC-961B-671BA65997AB}"/>
                   </a:ext>
                 </a:extLst>
               </p:cNvPr>
@@ -21882,7 +22054,7 @@
             <p:cNvPr id="43" name="Group 42">
               <a:extLst>
                 <a:ext uri="{FF2B5EF4-FFF2-40B4-BE49-F238E27FC236}">
-                  <a16:creationId xmlns="" xmlns:a16="http://schemas.microsoft.com/office/drawing/2014/main" id="{DBC531E7-693B-4E33-874E-0C6EE5E64C88}"/>
+                  <a16:creationId xmlns:a16="http://schemas.microsoft.com/office/drawing/2014/main" xmlns="" id="{DBC531E7-693B-4E33-874E-0C6EE5E64C88}"/>
                 </a:ext>
               </a:extLst>
             </p:cNvPr>
@@ -21902,7 +22074,7 @@
               <p:cNvPr id="44" name="TextBox 43">
                 <a:extLst>
                   <a:ext uri="{FF2B5EF4-FFF2-40B4-BE49-F238E27FC236}">
-                    <a16:creationId xmlns="" xmlns:a16="http://schemas.microsoft.com/office/drawing/2014/main" id="{8707F2BD-6B65-47EE-AB1B-D3F43448F244}"/>
+                    <a16:creationId xmlns:a16="http://schemas.microsoft.com/office/drawing/2014/main" xmlns="" id="{8707F2BD-6B65-47EE-AB1B-D3F43448F244}"/>
                   </a:ext>
                 </a:extLst>
               </p:cNvPr>
@@ -21948,7 +22120,7 @@
               <p:cNvPr id="45" name="TextBox 44">
                 <a:extLst>
                   <a:ext uri="{FF2B5EF4-FFF2-40B4-BE49-F238E27FC236}">
-                    <a16:creationId xmlns="" xmlns:a16="http://schemas.microsoft.com/office/drawing/2014/main" id="{2F59D818-BF4B-48ED-8342-8BB769CA01AF}"/>
+                    <a16:creationId xmlns:a16="http://schemas.microsoft.com/office/drawing/2014/main" xmlns="" id="{2F59D818-BF4B-48ED-8342-8BB769CA01AF}"/>
                   </a:ext>
                 </a:extLst>
               </p:cNvPr>
@@ -21994,7 +22166,7 @@
               <p:cNvPr id="46" name="TextBox 45">
                 <a:extLst>
                   <a:ext uri="{FF2B5EF4-FFF2-40B4-BE49-F238E27FC236}">
-                    <a16:creationId xmlns="" xmlns:a16="http://schemas.microsoft.com/office/drawing/2014/main" id="{CABF1A39-DFCB-4F66-B61F-8CFDC4A6B7FA}"/>
+                    <a16:creationId xmlns:a16="http://schemas.microsoft.com/office/drawing/2014/main" xmlns="" id="{CABF1A39-DFCB-4F66-B61F-8CFDC4A6B7FA}"/>
                   </a:ext>
                 </a:extLst>
               </p:cNvPr>
@@ -22040,7 +22212,7 @@
               <p:cNvPr id="47" name="TextBox 46">
                 <a:extLst>
                   <a:ext uri="{FF2B5EF4-FFF2-40B4-BE49-F238E27FC236}">
-                    <a16:creationId xmlns="" xmlns:a16="http://schemas.microsoft.com/office/drawing/2014/main" id="{1BC8499D-0BCB-47C3-8005-D0E944DAD3E9}"/>
+                    <a16:creationId xmlns:a16="http://schemas.microsoft.com/office/drawing/2014/main" xmlns="" id="{1BC8499D-0BCB-47C3-8005-D0E944DAD3E9}"/>
                   </a:ext>
                 </a:extLst>
               </p:cNvPr>
@@ -22084,7 +22256,7 @@
               <p:cNvPr id="48" name="Rectangle 2">
                 <a:extLst>
                   <a:ext uri="{FF2B5EF4-FFF2-40B4-BE49-F238E27FC236}">
-                    <a16:creationId xmlns="" xmlns:a16="http://schemas.microsoft.com/office/drawing/2014/main" id="{81019032-0120-43C0-B7BA-BC37EC738C5E}"/>
+                    <a16:creationId xmlns:a16="http://schemas.microsoft.com/office/drawing/2014/main" xmlns="" id="{81019032-0120-43C0-B7BA-BC37EC738C5E}"/>
                   </a:ext>
                 </a:extLst>
               </p:cNvPr>
@@ -22237,7 +22409,7 @@
           <p:cNvPr id="26" name="TextBox 25">
             <a:extLst>
               <a:ext uri="{FF2B5EF4-FFF2-40B4-BE49-F238E27FC236}">
-                <a16:creationId xmlns="" xmlns:a16="http://schemas.microsoft.com/office/drawing/2014/main" id="{E2A25439-4120-4E2D-9032-5CB1B1727334}"/>
+                <a16:creationId xmlns:a16="http://schemas.microsoft.com/office/drawing/2014/main" xmlns="" id="{E2A25439-4120-4E2D-9032-5CB1B1727334}"/>
               </a:ext>
             </a:extLst>
           </p:cNvPr>
@@ -22922,7 +23094,7 @@
           <p:cNvPr id="39" name="TextBox 38">
             <a:extLst>
               <a:ext uri="{FF2B5EF4-FFF2-40B4-BE49-F238E27FC236}">
-                <a16:creationId xmlns="" xmlns:a16="http://schemas.microsoft.com/office/drawing/2014/main" id="{E2A25439-4120-4E2D-9032-5CB1B1727334}"/>
+                <a16:creationId xmlns:a16="http://schemas.microsoft.com/office/drawing/2014/main" xmlns="" id="{E2A25439-4120-4E2D-9032-5CB1B1727334}"/>
               </a:ext>
             </a:extLst>
           </p:cNvPr>
@@ -22977,7 +23149,7 @@
           <p:cNvPr id="2" name="TextBox 1">
             <a:extLst>
               <a:ext uri="{FF2B5EF4-FFF2-40B4-BE49-F238E27FC236}">
-                <a16:creationId xmlns="" xmlns:a16="http://schemas.microsoft.com/office/drawing/2014/main" id="{E2A25439-4120-4E2D-9032-5CB1B1727334}"/>
+                <a16:creationId xmlns:a16="http://schemas.microsoft.com/office/drawing/2014/main" xmlns="" id="{E2A25439-4120-4E2D-9032-5CB1B1727334}"/>
               </a:ext>
             </a:extLst>
           </p:cNvPr>
@@ -23032,7 +23204,7 @@
           <p:cNvPr id="3" name="TextBox 2">
             <a:extLst>
               <a:ext uri="{FF2B5EF4-FFF2-40B4-BE49-F238E27FC236}">
-                <a16:creationId xmlns="" xmlns:a16="http://schemas.microsoft.com/office/drawing/2014/main" id="{9D2172C1-1223-4E50-B7DC-CB37A5D8E7E8}"/>
+                <a16:creationId xmlns:a16="http://schemas.microsoft.com/office/drawing/2014/main" xmlns="" id="{9D2172C1-1223-4E50-B7DC-CB37A5D8E7E8}"/>
               </a:ext>
             </a:extLst>
           </p:cNvPr>
@@ -23087,7 +23259,7 @@
           <p:cNvPr id="4" name="Group 3">
             <a:extLst>
               <a:ext uri="{FF2B5EF4-FFF2-40B4-BE49-F238E27FC236}">
-                <a16:creationId xmlns="" xmlns:a16="http://schemas.microsoft.com/office/drawing/2014/main" id="{990991E8-A6DD-4EBE-BD29-497FD796F56A}"/>
+                <a16:creationId xmlns:a16="http://schemas.microsoft.com/office/drawing/2014/main" xmlns="" id="{990991E8-A6DD-4EBE-BD29-497FD796F56A}"/>
               </a:ext>
             </a:extLst>
           </p:cNvPr>
@@ -23107,7 +23279,7 @@
             <p:cNvPr id="5" name="Group 4">
               <a:extLst>
                 <a:ext uri="{FF2B5EF4-FFF2-40B4-BE49-F238E27FC236}">
-                  <a16:creationId xmlns="" xmlns:a16="http://schemas.microsoft.com/office/drawing/2014/main" id="{44B773F0-BFA8-42CF-913F-8DA6F27B3316}"/>
+                  <a16:creationId xmlns:a16="http://schemas.microsoft.com/office/drawing/2014/main" xmlns="" id="{44B773F0-BFA8-42CF-913F-8DA6F27B3316}"/>
                 </a:ext>
               </a:extLst>
             </p:cNvPr>
@@ -23127,7 +23299,7 @@
               <p:cNvPr id="12" name="TextBox 11">
                 <a:extLst>
                   <a:ext uri="{FF2B5EF4-FFF2-40B4-BE49-F238E27FC236}">
-                    <a16:creationId xmlns="" xmlns:a16="http://schemas.microsoft.com/office/drawing/2014/main" id="{5E7EECD0-7CF5-47EA-8460-5C7C92155E9D}"/>
+                    <a16:creationId xmlns:a16="http://schemas.microsoft.com/office/drawing/2014/main" xmlns="" id="{5E7EECD0-7CF5-47EA-8460-5C7C92155E9D}"/>
                   </a:ext>
                 </a:extLst>
               </p:cNvPr>
@@ -23173,7 +23345,7 @@
               <p:cNvPr id="13" name="TextBox 12">
                 <a:extLst>
                   <a:ext uri="{FF2B5EF4-FFF2-40B4-BE49-F238E27FC236}">
-                    <a16:creationId xmlns="" xmlns:a16="http://schemas.microsoft.com/office/drawing/2014/main" id="{B105CB38-D6FD-4376-AD71-F1C724460C31}"/>
+                    <a16:creationId xmlns:a16="http://schemas.microsoft.com/office/drawing/2014/main" xmlns="" id="{B105CB38-D6FD-4376-AD71-F1C724460C31}"/>
                   </a:ext>
                 </a:extLst>
               </p:cNvPr>
@@ -23219,7 +23391,7 @@
               <p:cNvPr id="14" name="TextBox 13">
                 <a:extLst>
                   <a:ext uri="{FF2B5EF4-FFF2-40B4-BE49-F238E27FC236}">
-                    <a16:creationId xmlns="" xmlns:a16="http://schemas.microsoft.com/office/drawing/2014/main" id="{50C864DB-B022-453A-B48C-346240FB6030}"/>
+                    <a16:creationId xmlns:a16="http://schemas.microsoft.com/office/drawing/2014/main" xmlns="" id="{50C864DB-B022-453A-B48C-346240FB6030}"/>
                   </a:ext>
                 </a:extLst>
               </p:cNvPr>
@@ -23265,7 +23437,7 @@
               <p:cNvPr id="15" name="TextBox 14">
                 <a:extLst>
                   <a:ext uri="{FF2B5EF4-FFF2-40B4-BE49-F238E27FC236}">
-                    <a16:creationId xmlns="" xmlns:a16="http://schemas.microsoft.com/office/drawing/2014/main" id="{DA673339-7248-4DFC-9FFE-48DED464AF25}"/>
+                    <a16:creationId xmlns:a16="http://schemas.microsoft.com/office/drawing/2014/main" xmlns="" id="{DA673339-7248-4DFC-9FFE-48DED464AF25}"/>
                   </a:ext>
                 </a:extLst>
               </p:cNvPr>
@@ -23309,7 +23481,7 @@
               <p:cNvPr id="16" name="Rectangle 2">
                 <a:extLst>
                   <a:ext uri="{FF2B5EF4-FFF2-40B4-BE49-F238E27FC236}">
-                    <a16:creationId xmlns="" xmlns:a16="http://schemas.microsoft.com/office/drawing/2014/main" id="{BDDAD86E-250E-4F2E-94EA-F444784CEEEA}"/>
+                    <a16:creationId xmlns:a16="http://schemas.microsoft.com/office/drawing/2014/main" xmlns="" id="{BDDAD86E-250E-4F2E-94EA-F444784CEEEA}"/>
                   </a:ext>
                 </a:extLst>
               </p:cNvPr>
@@ -23397,7 +23569,7 @@
             <p:cNvPr id="6" name="Group 5">
               <a:extLst>
                 <a:ext uri="{FF2B5EF4-FFF2-40B4-BE49-F238E27FC236}">
-                  <a16:creationId xmlns="" xmlns:a16="http://schemas.microsoft.com/office/drawing/2014/main" id="{FE1924EC-566E-42D3-AF71-64C227DF571F}"/>
+                  <a16:creationId xmlns:a16="http://schemas.microsoft.com/office/drawing/2014/main" xmlns="" id="{FE1924EC-566E-42D3-AF71-64C227DF571F}"/>
                 </a:ext>
               </a:extLst>
             </p:cNvPr>
@@ -23417,7 +23589,7 @@
               <p:cNvPr id="7" name="TextBox 6">
                 <a:extLst>
                   <a:ext uri="{FF2B5EF4-FFF2-40B4-BE49-F238E27FC236}">
-                    <a16:creationId xmlns="" xmlns:a16="http://schemas.microsoft.com/office/drawing/2014/main" id="{17D034B1-AC8C-4A53-AD2E-E1CABA922EF4}"/>
+                    <a16:creationId xmlns:a16="http://schemas.microsoft.com/office/drawing/2014/main" xmlns="" id="{17D034B1-AC8C-4A53-AD2E-E1CABA922EF4}"/>
                   </a:ext>
                 </a:extLst>
               </p:cNvPr>
@@ -23463,7 +23635,7 @@
               <p:cNvPr id="8" name="TextBox 7">
                 <a:extLst>
                   <a:ext uri="{FF2B5EF4-FFF2-40B4-BE49-F238E27FC236}">
-                    <a16:creationId xmlns="" xmlns:a16="http://schemas.microsoft.com/office/drawing/2014/main" id="{00E40E18-CC50-4FD4-8555-68C90A0CA79D}"/>
+                    <a16:creationId xmlns:a16="http://schemas.microsoft.com/office/drawing/2014/main" xmlns="" id="{00E40E18-CC50-4FD4-8555-68C90A0CA79D}"/>
                   </a:ext>
                 </a:extLst>
               </p:cNvPr>
@@ -23509,7 +23681,7 @@
               <p:cNvPr id="9" name="TextBox 8">
                 <a:extLst>
                   <a:ext uri="{FF2B5EF4-FFF2-40B4-BE49-F238E27FC236}">
-                    <a16:creationId xmlns="" xmlns:a16="http://schemas.microsoft.com/office/drawing/2014/main" id="{95D17C04-5968-4A45-B25E-E129440683AC}"/>
+                    <a16:creationId xmlns:a16="http://schemas.microsoft.com/office/drawing/2014/main" xmlns="" id="{95D17C04-5968-4A45-B25E-E129440683AC}"/>
                   </a:ext>
                 </a:extLst>
               </p:cNvPr>
@@ -23555,7 +23727,7 @@
               <p:cNvPr id="10" name="TextBox 9">
                 <a:extLst>
                   <a:ext uri="{FF2B5EF4-FFF2-40B4-BE49-F238E27FC236}">
-                    <a16:creationId xmlns="" xmlns:a16="http://schemas.microsoft.com/office/drawing/2014/main" id="{60E02FDD-C9EF-4072-854D-965CAF2D3D16}"/>
+                    <a16:creationId xmlns:a16="http://schemas.microsoft.com/office/drawing/2014/main" xmlns="" id="{60E02FDD-C9EF-4072-854D-965CAF2D3D16}"/>
                   </a:ext>
                 </a:extLst>
               </p:cNvPr>
@@ -23599,7 +23771,7 @@
               <p:cNvPr id="11" name="Rectangle 2">
                 <a:extLst>
                   <a:ext uri="{FF2B5EF4-FFF2-40B4-BE49-F238E27FC236}">
-                    <a16:creationId xmlns="" xmlns:a16="http://schemas.microsoft.com/office/drawing/2014/main" id="{747FA38B-603B-41F1-8376-D02155CE211C}"/>
+                    <a16:creationId xmlns:a16="http://schemas.microsoft.com/office/drawing/2014/main" xmlns="" id="{747FA38B-603B-41F1-8376-D02155CE211C}"/>
                   </a:ext>
                 </a:extLst>
               </p:cNvPr>
@@ -23752,7 +23924,7 @@
           <p:cNvPr id="17" name="TextBox 16">
             <a:extLst>
               <a:ext uri="{FF2B5EF4-FFF2-40B4-BE49-F238E27FC236}">
-                <a16:creationId xmlns="" xmlns:a16="http://schemas.microsoft.com/office/drawing/2014/main" id="{D0ECDC15-34F5-44FE-8154-DC11077BCB09}"/>
+                <a16:creationId xmlns:a16="http://schemas.microsoft.com/office/drawing/2014/main" xmlns="" id="{D0ECDC15-34F5-44FE-8154-DC11077BCB09}"/>
               </a:ext>
             </a:extLst>
           </p:cNvPr>
@@ -23917,7 +24089,7 @@
           <p:cNvPr id="18" name="Rectangle 2">
             <a:extLst>
               <a:ext uri="{FF2B5EF4-FFF2-40B4-BE49-F238E27FC236}">
-                <a16:creationId xmlns="" xmlns:a16="http://schemas.microsoft.com/office/drawing/2014/main" id="{ACDC168F-4D82-47FD-B69E-72E7A1600102}"/>
+                <a16:creationId xmlns:a16="http://schemas.microsoft.com/office/drawing/2014/main" xmlns="" id="{ACDC168F-4D82-47FD-B69E-72E7A1600102}"/>
               </a:ext>
             </a:extLst>
           </p:cNvPr>
@@ -24015,7 +24187,7 @@
           <p:cNvPr id="20" name="TextBox 19">
             <a:extLst>
               <a:ext uri="{FF2B5EF4-FFF2-40B4-BE49-F238E27FC236}">
-                <a16:creationId xmlns="" xmlns:a16="http://schemas.microsoft.com/office/drawing/2014/main" id="{EDB442F5-34D7-4300-BA18-4B5BC98BC3D4}"/>
+                <a16:creationId xmlns:a16="http://schemas.microsoft.com/office/drawing/2014/main" xmlns="" id="{EDB442F5-34D7-4300-BA18-4B5BC98BC3D4}"/>
               </a:ext>
             </a:extLst>
           </p:cNvPr>
@@ -24061,7 +24233,7 @@
           <p:cNvPr id="21" name="TextBox 20">
             <a:extLst>
               <a:ext uri="{FF2B5EF4-FFF2-40B4-BE49-F238E27FC236}">
-                <a16:creationId xmlns="" xmlns:a16="http://schemas.microsoft.com/office/drawing/2014/main" id="{1126D985-4D01-49AD-AAA0-F753E895E063}"/>
+                <a16:creationId xmlns:a16="http://schemas.microsoft.com/office/drawing/2014/main" xmlns="" id="{1126D985-4D01-49AD-AAA0-F753E895E063}"/>
               </a:ext>
             </a:extLst>
           </p:cNvPr>
@@ -24107,7 +24279,7 @@
           <p:cNvPr id="22" name="TextBox 21">
             <a:extLst>
               <a:ext uri="{FF2B5EF4-FFF2-40B4-BE49-F238E27FC236}">
-                <a16:creationId xmlns="" xmlns:a16="http://schemas.microsoft.com/office/drawing/2014/main" id="{2F327C8B-A760-45E6-AF3F-CC4F1AE1E652}"/>
+                <a16:creationId xmlns:a16="http://schemas.microsoft.com/office/drawing/2014/main" xmlns="" id="{2F327C8B-A760-45E6-AF3F-CC4F1AE1E652}"/>
               </a:ext>
             </a:extLst>
           </p:cNvPr>
@@ -24153,7 +24325,7 @@
           <p:cNvPr id="23" name="TextBox 22">
             <a:extLst>
               <a:ext uri="{FF2B5EF4-FFF2-40B4-BE49-F238E27FC236}">
-                <a16:creationId xmlns="" xmlns:a16="http://schemas.microsoft.com/office/drawing/2014/main" id="{839ACAD9-74C5-4CC6-8034-5AFF1C74CC80}"/>
+                <a16:creationId xmlns:a16="http://schemas.microsoft.com/office/drawing/2014/main" xmlns="" id="{839ACAD9-74C5-4CC6-8034-5AFF1C74CC80}"/>
               </a:ext>
             </a:extLst>
           </p:cNvPr>
@@ -24197,7 +24369,7 @@
           <p:cNvPr id="29" name="TextBox 28">
             <a:extLst>
               <a:ext uri="{FF2B5EF4-FFF2-40B4-BE49-F238E27FC236}">
-                <a16:creationId xmlns="" xmlns:a16="http://schemas.microsoft.com/office/drawing/2014/main" id="{19B7E9EC-DE33-4DEF-A467-B033A05751C7}"/>
+                <a16:creationId xmlns:a16="http://schemas.microsoft.com/office/drawing/2014/main" xmlns="" id="{19B7E9EC-DE33-4DEF-A467-B033A05751C7}"/>
               </a:ext>
             </a:extLst>
           </p:cNvPr>
@@ -24283,7 +24455,7 @@
           <p:cNvPr id="33" name="TextBox 32">
             <a:extLst>
               <a:ext uri="{FF2B5EF4-FFF2-40B4-BE49-F238E27FC236}">
-                <a16:creationId xmlns="" xmlns:a16="http://schemas.microsoft.com/office/drawing/2014/main" id="{C75C1FD0-583B-4E96-BD9A-3DACD2D5A3BF}"/>
+                <a16:creationId xmlns:a16="http://schemas.microsoft.com/office/drawing/2014/main" xmlns="" id="{C75C1FD0-583B-4E96-BD9A-3DACD2D5A3BF}"/>
               </a:ext>
             </a:extLst>
           </p:cNvPr>
@@ -24410,7 +24582,7 @@
           <p:cNvPr id="35" name="TextBox 34">
             <a:extLst>
               <a:ext uri="{FF2B5EF4-FFF2-40B4-BE49-F238E27FC236}">
-                <a16:creationId xmlns="" xmlns:a16="http://schemas.microsoft.com/office/drawing/2014/main" id="{C75C1FD0-583B-4E96-BD9A-3DACD2D5A3BF}"/>
+                <a16:creationId xmlns:a16="http://schemas.microsoft.com/office/drawing/2014/main" xmlns="" id="{C75C1FD0-583B-4E96-BD9A-3DACD2D5A3BF}"/>
               </a:ext>
             </a:extLst>
           </p:cNvPr>
@@ -24476,7 +24648,7 @@
           <p:cNvPr id="36" name="TextBox 35">
             <a:extLst>
               <a:ext uri="{FF2B5EF4-FFF2-40B4-BE49-F238E27FC236}">
-                <a16:creationId xmlns="" xmlns:a16="http://schemas.microsoft.com/office/drawing/2014/main" id="{F11C7FC8-DC9E-479E-A35D-664C720391E0}"/>
+                <a16:creationId xmlns:a16="http://schemas.microsoft.com/office/drawing/2014/main" xmlns="" id="{F11C7FC8-DC9E-479E-A35D-664C720391E0}"/>
               </a:ext>
             </a:extLst>
           </p:cNvPr>
@@ -24570,7 +24742,7 @@
           <p:cNvPr id="37" name="TextBox 36">
             <a:extLst>
               <a:ext uri="{FF2B5EF4-FFF2-40B4-BE49-F238E27FC236}">
-                <a16:creationId xmlns="" xmlns:a16="http://schemas.microsoft.com/office/drawing/2014/main" id="{E0F0A57F-BE52-4D85-8ACC-9FC4EC34E2C8}"/>
+                <a16:creationId xmlns:a16="http://schemas.microsoft.com/office/drawing/2014/main" xmlns="" id="{E0F0A57F-BE52-4D85-8ACC-9FC4EC34E2C8}"/>
               </a:ext>
             </a:extLst>
           </p:cNvPr>
@@ -24684,7 +24856,7 @@
           <p:cNvPr id="38" name="Rectangle 2">
             <a:extLst>
               <a:ext uri="{FF2B5EF4-FFF2-40B4-BE49-F238E27FC236}">
-                <a16:creationId xmlns="" xmlns:a16="http://schemas.microsoft.com/office/drawing/2014/main" id="{E32F358A-5B64-4928-90C5-86786C7C1A50}"/>
+                <a16:creationId xmlns:a16="http://schemas.microsoft.com/office/drawing/2014/main" xmlns="" id="{E32F358A-5B64-4928-90C5-86786C7C1A50}"/>
               </a:ext>
             </a:extLst>
           </p:cNvPr>
@@ -24884,7 +25056,7 @@
           <p:cNvPr id="31" name="TextBox 30">
             <a:extLst>
               <a:ext uri="{FF2B5EF4-FFF2-40B4-BE49-F238E27FC236}">
-                <a16:creationId xmlns="" xmlns:a16="http://schemas.microsoft.com/office/drawing/2014/main" id="{FDE44C33-EA15-4D14-8324-71F27282442F}"/>
+                <a16:creationId xmlns:a16="http://schemas.microsoft.com/office/drawing/2014/main" xmlns="" id="{FDE44C33-EA15-4D14-8324-71F27282442F}"/>
               </a:ext>
             </a:extLst>
           </p:cNvPr>
@@ -25457,7 +25629,7 @@
           <p:cNvPr id="40" name="TextBox 39">
             <a:extLst>
               <a:ext uri="{FF2B5EF4-FFF2-40B4-BE49-F238E27FC236}">
-                <a16:creationId xmlns="" xmlns:a16="http://schemas.microsoft.com/office/drawing/2014/main" id="{FDE44C33-EA15-4D14-8324-71F27282442F}"/>
+                <a16:creationId xmlns:a16="http://schemas.microsoft.com/office/drawing/2014/main" xmlns="" id="{FDE44C33-EA15-4D14-8324-71F27282442F}"/>
               </a:ext>
             </a:extLst>
           </p:cNvPr>
@@ -25514,7 +25686,7 @@
           <p:cNvPr id="5" name="TextBox 4">
             <a:extLst>
               <a:ext uri="{FF2B5EF4-FFF2-40B4-BE49-F238E27FC236}">
-                <a16:creationId xmlns="" xmlns:a16="http://schemas.microsoft.com/office/drawing/2014/main" id="{EDB442F5-34D7-4300-BA18-4B5BC98BC3D4}"/>
+                <a16:creationId xmlns:a16="http://schemas.microsoft.com/office/drawing/2014/main" xmlns="" id="{EDB442F5-34D7-4300-BA18-4B5BC98BC3D4}"/>
               </a:ext>
             </a:extLst>
           </p:cNvPr>
@@ -25560,7 +25732,7 @@
           <p:cNvPr id="6" name="TextBox 5">
             <a:extLst>
               <a:ext uri="{FF2B5EF4-FFF2-40B4-BE49-F238E27FC236}">
-                <a16:creationId xmlns="" xmlns:a16="http://schemas.microsoft.com/office/drawing/2014/main" id="{1126D985-4D01-49AD-AAA0-F753E895E063}"/>
+                <a16:creationId xmlns:a16="http://schemas.microsoft.com/office/drawing/2014/main" xmlns="" id="{1126D985-4D01-49AD-AAA0-F753E895E063}"/>
               </a:ext>
             </a:extLst>
           </p:cNvPr>
@@ -25606,7 +25778,7 @@
           <p:cNvPr id="7" name="TextBox 6">
             <a:extLst>
               <a:ext uri="{FF2B5EF4-FFF2-40B4-BE49-F238E27FC236}">
-                <a16:creationId xmlns="" xmlns:a16="http://schemas.microsoft.com/office/drawing/2014/main" id="{2F327C8B-A760-45E6-AF3F-CC4F1AE1E652}"/>
+                <a16:creationId xmlns:a16="http://schemas.microsoft.com/office/drawing/2014/main" xmlns="" id="{2F327C8B-A760-45E6-AF3F-CC4F1AE1E652}"/>
               </a:ext>
             </a:extLst>
           </p:cNvPr>
@@ -25652,7 +25824,7 @@
           <p:cNvPr id="8" name="TextBox 7">
             <a:extLst>
               <a:ext uri="{FF2B5EF4-FFF2-40B4-BE49-F238E27FC236}">
-                <a16:creationId xmlns="" xmlns:a16="http://schemas.microsoft.com/office/drawing/2014/main" id="{839ACAD9-74C5-4CC6-8034-5AFF1C74CC80}"/>
+                <a16:creationId xmlns:a16="http://schemas.microsoft.com/office/drawing/2014/main" xmlns="" id="{839ACAD9-74C5-4CC6-8034-5AFF1C74CC80}"/>
               </a:ext>
             </a:extLst>
           </p:cNvPr>
@@ -25696,7 +25868,7 @@
           <p:cNvPr id="32" name="TextBox 31">
             <a:extLst>
               <a:ext uri="{FF2B5EF4-FFF2-40B4-BE49-F238E27FC236}">
-                <a16:creationId xmlns="" xmlns:a16="http://schemas.microsoft.com/office/drawing/2014/main" id="{DD7FCEB6-AC10-4AFD-9AFB-406D96C12559}"/>
+                <a16:creationId xmlns:a16="http://schemas.microsoft.com/office/drawing/2014/main" xmlns="" id="{DD7FCEB6-AC10-4AFD-9AFB-406D96C12559}"/>
               </a:ext>
             </a:extLst>
           </p:cNvPr>
@@ -25767,7 +25939,7 @@
           <p:cNvPr id="33" name="TextBox 32">
             <a:extLst>
               <a:ext uri="{FF2B5EF4-FFF2-40B4-BE49-F238E27FC236}">
-                <a16:creationId xmlns="" xmlns:a16="http://schemas.microsoft.com/office/drawing/2014/main" id="{2C7CBAC8-A5FA-45FC-A0EF-4C4308FA0E04}"/>
+                <a16:creationId xmlns:a16="http://schemas.microsoft.com/office/drawing/2014/main" xmlns="" id="{2C7CBAC8-A5FA-45FC-A0EF-4C4308FA0E04}"/>
               </a:ext>
             </a:extLst>
           </p:cNvPr>
@@ -25838,7 +26010,7 @@
           <p:cNvPr id="35" name="TextBox 34">
             <a:extLst>
               <a:ext uri="{FF2B5EF4-FFF2-40B4-BE49-F238E27FC236}">
-                <a16:creationId xmlns="" xmlns:a16="http://schemas.microsoft.com/office/drawing/2014/main" id="{D87C4589-E0F6-4654-9607-5869B2D4C8EE}"/>
+                <a16:creationId xmlns:a16="http://schemas.microsoft.com/office/drawing/2014/main" xmlns="" id="{D87C4589-E0F6-4654-9607-5869B2D4C8EE}"/>
               </a:ext>
             </a:extLst>
           </p:cNvPr>
@@ -25895,7 +26067,7 @@
           <p:cNvPr id="12" name="TextBox 11">
             <a:extLst>
               <a:ext uri="{FF2B5EF4-FFF2-40B4-BE49-F238E27FC236}">
-                <a16:creationId xmlns="" xmlns:a16="http://schemas.microsoft.com/office/drawing/2014/main" id="{222D7E88-8744-4298-AB65-66D1802C446A}"/>
+                <a16:creationId xmlns:a16="http://schemas.microsoft.com/office/drawing/2014/main" xmlns="" id="{222D7E88-8744-4298-AB65-66D1802C446A}"/>
               </a:ext>
             </a:extLst>
           </p:cNvPr>
@@ -25938,7 +26110,7 @@
           <p:cNvPr id="14" name="TextBox 13">
             <a:extLst>
               <a:ext uri="{FF2B5EF4-FFF2-40B4-BE49-F238E27FC236}">
-                <a16:creationId xmlns="" xmlns:a16="http://schemas.microsoft.com/office/drawing/2014/main" id="{ED953CD0-2D4C-4BDF-BC9C-B63030F8BA50}"/>
+                <a16:creationId xmlns:a16="http://schemas.microsoft.com/office/drawing/2014/main" xmlns="" id="{ED953CD0-2D4C-4BDF-BC9C-B63030F8BA50}"/>
               </a:ext>
             </a:extLst>
           </p:cNvPr>
@@ -25988,7 +26160,7 @@
           <p:cNvPr id="19" name="TextBox 18">
             <a:extLst>
               <a:ext uri="{FF2B5EF4-FFF2-40B4-BE49-F238E27FC236}">
-                <a16:creationId xmlns="" xmlns:a16="http://schemas.microsoft.com/office/drawing/2014/main" id="{968E1B19-EEE5-4FDD-8B70-135C6EF31A5C}"/>
+                <a16:creationId xmlns:a16="http://schemas.microsoft.com/office/drawing/2014/main" xmlns="" id="{968E1B19-EEE5-4FDD-8B70-135C6EF31A5C}"/>
               </a:ext>
             </a:extLst>
           </p:cNvPr>
@@ -26030,7 +26202,7 @@
           <p:cNvPr id="41" name="Rectangle 2">
             <a:extLst>
               <a:ext uri="{FF2B5EF4-FFF2-40B4-BE49-F238E27FC236}">
-                <a16:creationId xmlns="" xmlns:a16="http://schemas.microsoft.com/office/drawing/2014/main" id="{E32F358A-5B64-4928-90C5-86786C7C1A50}"/>
+                <a16:creationId xmlns:a16="http://schemas.microsoft.com/office/drawing/2014/main" xmlns="" id="{E32F358A-5B64-4928-90C5-86786C7C1A50}"/>
               </a:ext>
             </a:extLst>
           </p:cNvPr>
@@ -26230,7 +26402,7 @@
           <p:cNvPr id="42" name="Rectangle 2">
             <a:extLst>
               <a:ext uri="{FF2B5EF4-FFF2-40B4-BE49-F238E27FC236}">
-                <a16:creationId xmlns="" xmlns:a16="http://schemas.microsoft.com/office/drawing/2014/main" id="{525E0D96-8099-4601-80D1-0E4DF7CAD69B}"/>
+                <a16:creationId xmlns:a16="http://schemas.microsoft.com/office/drawing/2014/main" xmlns="" id="{525E0D96-8099-4601-80D1-0E4DF7CAD69B}"/>
               </a:ext>
             </a:extLst>
           </p:cNvPr>
@@ -26362,7 +26534,7 @@
           <p:cNvPr id="43" name="TextBox 42">
             <a:extLst>
               <a:ext uri="{FF2B5EF4-FFF2-40B4-BE49-F238E27FC236}">
-                <a16:creationId xmlns="" xmlns:a16="http://schemas.microsoft.com/office/drawing/2014/main" id="{376B4891-E642-468B-9860-2426713A114A}"/>
+                <a16:creationId xmlns:a16="http://schemas.microsoft.com/office/drawing/2014/main" xmlns="" id="{376B4891-E642-468B-9860-2426713A114A}"/>
               </a:ext>
             </a:extLst>
           </p:cNvPr>
@@ -26433,7 +26605,7 @@
           <p:cNvPr id="46" name="TextBox 45">
             <a:extLst>
               <a:ext uri="{FF2B5EF4-FFF2-40B4-BE49-F238E27FC236}">
-                <a16:creationId xmlns="" xmlns:a16="http://schemas.microsoft.com/office/drawing/2014/main" id="{0FD4CFE0-333E-4BDA-B155-05698DAD0B70}"/>
+                <a16:creationId xmlns:a16="http://schemas.microsoft.com/office/drawing/2014/main" xmlns="" id="{0FD4CFE0-333E-4BDA-B155-05698DAD0B70}"/>
               </a:ext>
             </a:extLst>
           </p:cNvPr>
@@ -27296,7 +27468,7 @@
           <p:cNvPr id="15" name="TextBox 14">
             <a:extLst>
               <a:ext uri="{FF2B5EF4-FFF2-40B4-BE49-F238E27FC236}">
-                <a16:creationId xmlns="" xmlns:a16="http://schemas.microsoft.com/office/drawing/2014/main" id="{438442CF-1B82-4A10-87A1-614331CA498E}"/>
+                <a16:creationId xmlns:a16="http://schemas.microsoft.com/office/drawing/2014/main" xmlns="" id="{438442CF-1B82-4A10-87A1-614331CA498E}"/>
               </a:ext>
             </a:extLst>
           </p:cNvPr>
@@ -27424,7 +27596,7 @@
           <p:cNvPr id="18" name="TextBox 17">
             <a:extLst>
               <a:ext uri="{FF2B5EF4-FFF2-40B4-BE49-F238E27FC236}">
-                <a16:creationId xmlns="" xmlns:a16="http://schemas.microsoft.com/office/drawing/2014/main" id="{9DFCBF7F-F24C-4F4A-8434-94B315F04673}"/>
+                <a16:creationId xmlns:a16="http://schemas.microsoft.com/office/drawing/2014/main" xmlns="" id="{9DFCBF7F-F24C-4F4A-8434-94B315F04673}"/>
               </a:ext>
             </a:extLst>
           </p:cNvPr>
@@ -27530,7 +27702,7 @@
           <p:cNvPr id="19" name="Rectangle 3">
             <a:extLst>
               <a:ext uri="{FF2B5EF4-FFF2-40B4-BE49-F238E27FC236}">
-                <a16:creationId xmlns="" xmlns:a16="http://schemas.microsoft.com/office/drawing/2014/main" id="{46ADB3CD-EA06-4C85-A4CE-E0A5AA5A8DFC}"/>
+                <a16:creationId xmlns:a16="http://schemas.microsoft.com/office/drawing/2014/main" xmlns="" id="{46ADB3CD-EA06-4C85-A4CE-E0A5AA5A8DFC}"/>
               </a:ext>
             </a:extLst>
           </p:cNvPr>
@@ -27628,7 +27800,7 @@
           <p:cNvPr id="20" name="TextBox 19">
             <a:extLst>
               <a:ext uri="{FF2B5EF4-FFF2-40B4-BE49-F238E27FC236}">
-                <a16:creationId xmlns="" xmlns:a16="http://schemas.microsoft.com/office/drawing/2014/main" id="{EDB442F5-34D7-4300-BA18-4B5BC98BC3D4}"/>
+                <a16:creationId xmlns:a16="http://schemas.microsoft.com/office/drawing/2014/main" xmlns="" id="{EDB442F5-34D7-4300-BA18-4B5BC98BC3D4}"/>
               </a:ext>
             </a:extLst>
           </p:cNvPr>
@@ -27674,7 +27846,7 @@
           <p:cNvPr id="23" name="TextBox 22">
             <a:extLst>
               <a:ext uri="{FF2B5EF4-FFF2-40B4-BE49-F238E27FC236}">
-                <a16:creationId xmlns="" xmlns:a16="http://schemas.microsoft.com/office/drawing/2014/main" id="{1126D985-4D01-49AD-AAA0-F753E895E063}"/>
+                <a16:creationId xmlns:a16="http://schemas.microsoft.com/office/drawing/2014/main" xmlns="" id="{1126D985-4D01-49AD-AAA0-F753E895E063}"/>
               </a:ext>
             </a:extLst>
           </p:cNvPr>
@@ -27720,7 +27892,7 @@
           <p:cNvPr id="24" name="TextBox 23">
             <a:extLst>
               <a:ext uri="{FF2B5EF4-FFF2-40B4-BE49-F238E27FC236}">
-                <a16:creationId xmlns="" xmlns:a16="http://schemas.microsoft.com/office/drawing/2014/main" id="{2F327C8B-A760-45E6-AF3F-CC4F1AE1E652}"/>
+                <a16:creationId xmlns:a16="http://schemas.microsoft.com/office/drawing/2014/main" xmlns="" id="{2F327C8B-A760-45E6-AF3F-CC4F1AE1E652}"/>
               </a:ext>
             </a:extLst>
           </p:cNvPr>
@@ -27766,7 +27938,7 @@
           <p:cNvPr id="25" name="TextBox 24">
             <a:extLst>
               <a:ext uri="{FF2B5EF4-FFF2-40B4-BE49-F238E27FC236}">
-                <a16:creationId xmlns="" xmlns:a16="http://schemas.microsoft.com/office/drawing/2014/main" id="{839ACAD9-74C5-4CC6-8034-5AFF1C74CC80}"/>
+                <a16:creationId xmlns:a16="http://schemas.microsoft.com/office/drawing/2014/main" xmlns="" id="{839ACAD9-74C5-4CC6-8034-5AFF1C74CC80}"/>
               </a:ext>
             </a:extLst>
           </p:cNvPr>
@@ -27810,7 +27982,7 @@
           <p:cNvPr id="26" name="TextBox 25">
             <a:extLst>
               <a:ext uri="{FF2B5EF4-FFF2-40B4-BE49-F238E27FC236}">
-                <a16:creationId xmlns="" xmlns:a16="http://schemas.microsoft.com/office/drawing/2014/main" id="{222D7E88-8744-4298-AB65-66D1802C446A}"/>
+                <a16:creationId xmlns:a16="http://schemas.microsoft.com/office/drawing/2014/main" xmlns="" id="{222D7E88-8744-4298-AB65-66D1802C446A}"/>
               </a:ext>
             </a:extLst>
           </p:cNvPr>
@@ -27853,7 +28025,7 @@
           <p:cNvPr id="28" name="Rectangle 2">
             <a:extLst>
               <a:ext uri="{FF2B5EF4-FFF2-40B4-BE49-F238E27FC236}">
-                <a16:creationId xmlns="" xmlns:a16="http://schemas.microsoft.com/office/drawing/2014/main" id="{E32F358A-5B64-4928-90C5-86786C7C1A50}"/>
+                <a16:creationId xmlns:a16="http://schemas.microsoft.com/office/drawing/2014/main" xmlns="" id="{E32F358A-5B64-4928-90C5-86786C7C1A50}"/>
               </a:ext>
             </a:extLst>
           </p:cNvPr>
@@ -28053,7 +28225,7 @@
           <p:cNvPr id="29" name="Rectangle 2">
             <a:extLst>
               <a:ext uri="{FF2B5EF4-FFF2-40B4-BE49-F238E27FC236}">
-                <a16:creationId xmlns="" xmlns:a16="http://schemas.microsoft.com/office/drawing/2014/main" id="{525E0D96-8099-4601-80D1-0E4DF7CAD69B}"/>
+                <a16:creationId xmlns:a16="http://schemas.microsoft.com/office/drawing/2014/main" xmlns="" id="{525E0D96-8099-4601-80D1-0E4DF7CAD69B}"/>
               </a:ext>
             </a:extLst>
           </p:cNvPr>
@@ -28185,7 +28357,7 @@
           <p:cNvPr id="30" name="TextBox 29">
             <a:extLst>
               <a:ext uri="{FF2B5EF4-FFF2-40B4-BE49-F238E27FC236}">
-                <a16:creationId xmlns="" xmlns:a16="http://schemas.microsoft.com/office/drawing/2014/main" id="{0FD4CFE0-333E-4BDA-B155-05698DAD0B70}"/>
+                <a16:creationId xmlns:a16="http://schemas.microsoft.com/office/drawing/2014/main" xmlns="" id="{0FD4CFE0-333E-4BDA-B155-05698DAD0B70}"/>
               </a:ext>
             </a:extLst>
           </p:cNvPr>
@@ -28228,7 +28400,7 @@
           <p:cNvPr id="32" name="TextBox 31">
             <a:extLst>
               <a:ext uri="{FF2B5EF4-FFF2-40B4-BE49-F238E27FC236}">
-                <a16:creationId xmlns="" xmlns:a16="http://schemas.microsoft.com/office/drawing/2014/main" id="{FDE44C33-EA15-4D14-8324-71F27282442F}"/>
+                <a16:creationId xmlns:a16="http://schemas.microsoft.com/office/drawing/2014/main" xmlns="" id="{FDE44C33-EA15-4D14-8324-71F27282442F}"/>
               </a:ext>
             </a:extLst>
           </p:cNvPr>
@@ -28285,7 +28457,7 @@
           <p:cNvPr id="35" name="Rectangle 3">
             <a:extLst>
               <a:ext uri="{FF2B5EF4-FFF2-40B4-BE49-F238E27FC236}">
-                <a16:creationId xmlns="" xmlns:a16="http://schemas.microsoft.com/office/drawing/2014/main" id="{46ADB3CD-EA06-4C85-A4CE-E0A5AA5A8DFC}"/>
+                <a16:creationId xmlns:a16="http://schemas.microsoft.com/office/drawing/2014/main" xmlns="" id="{46ADB3CD-EA06-4C85-A4CE-E0A5AA5A8DFC}"/>
               </a:ext>
             </a:extLst>
           </p:cNvPr>
@@ -28633,7 +28805,7 @@
           <p:cNvPr id="48" name="Rectangle 3">
             <a:extLst>
               <a:ext uri="{FF2B5EF4-FFF2-40B4-BE49-F238E27FC236}">
-                <a16:creationId xmlns="" xmlns:a16="http://schemas.microsoft.com/office/drawing/2014/main" id="{46ADB3CD-EA06-4C85-A4CE-E0A5AA5A8DFC}"/>
+                <a16:creationId xmlns:a16="http://schemas.microsoft.com/office/drawing/2014/main" xmlns="" id="{46ADB3CD-EA06-4C85-A4CE-E0A5AA5A8DFC}"/>
               </a:ext>
             </a:extLst>
           </p:cNvPr>
@@ -28731,7 +28903,7 @@
           <p:cNvPr id="16" name="TextBox 15">
             <a:extLst>
               <a:ext uri="{FF2B5EF4-FFF2-40B4-BE49-F238E27FC236}">
-                <a16:creationId xmlns="" xmlns:a16="http://schemas.microsoft.com/office/drawing/2014/main" id="{9DFCBF7F-F24C-4F4A-8434-94B315F04673}"/>
+                <a16:creationId xmlns:a16="http://schemas.microsoft.com/office/drawing/2014/main" xmlns="" id="{9DFCBF7F-F24C-4F4A-8434-94B315F04673}"/>
               </a:ext>
             </a:extLst>
           </p:cNvPr>
@@ -28824,7 +28996,7 @@
           <p:cNvPr id="25" name="TextBox 24">
             <a:extLst>
               <a:ext uri="{FF2B5EF4-FFF2-40B4-BE49-F238E27FC236}">
-                <a16:creationId xmlns="" xmlns:a16="http://schemas.microsoft.com/office/drawing/2014/main" id="{9DFCBF7F-F24C-4F4A-8434-94B315F04673}"/>
+                <a16:creationId xmlns:a16="http://schemas.microsoft.com/office/drawing/2014/main" xmlns="" id="{9DFCBF7F-F24C-4F4A-8434-94B315F04673}"/>
               </a:ext>
             </a:extLst>
           </p:cNvPr>
@@ -28957,7 +29129,7 @@
           <p:cNvPr id="26" name="TextBox 25">
             <a:extLst>
               <a:ext uri="{FF2B5EF4-FFF2-40B4-BE49-F238E27FC236}">
-                <a16:creationId xmlns="" xmlns:a16="http://schemas.microsoft.com/office/drawing/2014/main" id="{438442CF-1B82-4A10-87A1-614331CA498E}"/>
+                <a16:creationId xmlns:a16="http://schemas.microsoft.com/office/drawing/2014/main" xmlns="" id="{438442CF-1B82-4A10-87A1-614331CA498E}"/>
               </a:ext>
             </a:extLst>
           </p:cNvPr>
@@ -29116,7 +29288,7 @@
               <p:cNvPr id="11" name="TextBox 10">
                 <a:extLst>
                   <a:ext uri="{FF2B5EF4-FFF2-40B4-BE49-F238E27FC236}">
-                    <a16:creationId xmlns="" xmlns:a16="http://schemas.microsoft.com/office/drawing/2014/main" id="{9E395FCD-95B2-4749-9682-00A0C79CBA13}"/>
+                    <a16:creationId xmlns:a16="http://schemas.microsoft.com/office/drawing/2014/main" xmlns="" id="{9E395FCD-95B2-4749-9682-00A0C79CBA13}"/>
                   </a:ext>
                 </a:extLst>
               </p:cNvPr>
@@ -29162,7 +29334,7 @@
               <p:cNvPr id="12" name="TextBox 11">
                 <a:extLst>
                   <a:ext uri="{FF2B5EF4-FFF2-40B4-BE49-F238E27FC236}">
-                    <a16:creationId xmlns="" xmlns:a16="http://schemas.microsoft.com/office/drawing/2014/main" id="{12162968-8F0F-4D20-A2D5-07F59AA75E60}"/>
+                    <a16:creationId xmlns:a16="http://schemas.microsoft.com/office/drawing/2014/main" xmlns="" id="{12162968-8F0F-4D20-A2D5-07F59AA75E60}"/>
                   </a:ext>
                 </a:extLst>
               </p:cNvPr>
@@ -29208,7 +29380,7 @@
               <p:cNvPr id="13" name="TextBox 12">
                 <a:extLst>
                   <a:ext uri="{FF2B5EF4-FFF2-40B4-BE49-F238E27FC236}">
-                    <a16:creationId xmlns="" xmlns:a16="http://schemas.microsoft.com/office/drawing/2014/main" id="{A1762713-59AE-44F1-84D1-5DACDE124103}"/>
+                    <a16:creationId xmlns:a16="http://schemas.microsoft.com/office/drawing/2014/main" xmlns="" id="{A1762713-59AE-44F1-84D1-5DACDE124103}"/>
                   </a:ext>
                 </a:extLst>
               </p:cNvPr>
@@ -29254,7 +29426,7 @@
               <p:cNvPr id="14" name="TextBox 13">
                 <a:extLst>
                   <a:ext uri="{FF2B5EF4-FFF2-40B4-BE49-F238E27FC236}">
-                    <a16:creationId xmlns="" xmlns:a16="http://schemas.microsoft.com/office/drawing/2014/main" id="{B2F95DB7-0D24-4791-910F-3A95AF58A4B6}"/>
+                    <a16:creationId xmlns:a16="http://schemas.microsoft.com/office/drawing/2014/main" xmlns="" id="{B2F95DB7-0D24-4791-910F-3A95AF58A4B6}"/>
                   </a:ext>
                 </a:extLst>
               </p:cNvPr>
@@ -29301,7 +29473,7 @@
               <p:cNvPr id="15" name="TextBox 14">
                 <a:extLst>
                   <a:ext uri="{FF2B5EF4-FFF2-40B4-BE49-F238E27FC236}">
-                    <a16:creationId xmlns="" xmlns:a16="http://schemas.microsoft.com/office/drawing/2014/main" id="{0A113BEB-51E8-42EE-AF79-D74F55774972}"/>
+                    <a16:creationId xmlns:a16="http://schemas.microsoft.com/office/drawing/2014/main" xmlns="" id="{0A113BEB-51E8-42EE-AF79-D74F55774972}"/>
                   </a:ext>
                 </a:extLst>
               </p:cNvPr>
@@ -29345,7 +29517,7 @@
             <p:cNvPr id="10" name="TextBox 9">
               <a:extLst>
                 <a:ext uri="{FF2B5EF4-FFF2-40B4-BE49-F238E27FC236}">
-                  <a16:creationId xmlns="" xmlns:a16="http://schemas.microsoft.com/office/drawing/2014/main" id="{E43AF4C5-CF5B-4E7E-B438-83CD70BE1265}"/>
+                  <a16:creationId xmlns:a16="http://schemas.microsoft.com/office/drawing/2014/main" xmlns="" id="{E43AF4C5-CF5B-4E7E-B438-83CD70BE1265}"/>
                 </a:ext>
               </a:extLst>
             </p:cNvPr>
@@ -29420,7 +29592,7 @@
             <p:cNvPr id="81" name="Rectangle 2">
               <a:extLst>
                 <a:ext uri="{FF2B5EF4-FFF2-40B4-BE49-F238E27FC236}">
-                  <a16:creationId xmlns="" xmlns:a16="http://schemas.microsoft.com/office/drawing/2014/main" id="{03DC0A66-1F24-4836-83E7-0736D601F324}"/>
+                  <a16:creationId xmlns:a16="http://schemas.microsoft.com/office/drawing/2014/main" xmlns="" id="{03DC0A66-1F24-4836-83E7-0736D601F324}"/>
                 </a:ext>
               </a:extLst>
             </p:cNvPr>
@@ -29481,7 +29653,7 @@
             <p:cNvPr id="82" name="TextBox 81">
               <a:extLst>
                 <a:ext uri="{FF2B5EF4-FFF2-40B4-BE49-F238E27FC236}">
-                  <a16:creationId xmlns="" xmlns:a16="http://schemas.microsoft.com/office/drawing/2014/main" id="{9B5A79D0-5E77-49FE-9E1A-18A741E1FAD1}"/>
+                  <a16:creationId xmlns:a16="http://schemas.microsoft.com/office/drawing/2014/main" xmlns="" id="{9B5A79D0-5E77-49FE-9E1A-18A741E1FAD1}"/>
                 </a:ext>
               </a:extLst>
             </p:cNvPr>
@@ -29996,7 +30168,7 @@
             <p:cNvPr id="106" name="TextBox 105">
               <a:extLst>
                 <a:ext uri="{FF2B5EF4-FFF2-40B4-BE49-F238E27FC236}">
-                  <a16:creationId xmlns="" xmlns:a16="http://schemas.microsoft.com/office/drawing/2014/main" id="{0FD4CFE0-333E-4BDA-B155-05698DAD0B70}"/>
+                  <a16:creationId xmlns:a16="http://schemas.microsoft.com/office/drawing/2014/main" xmlns="" id="{0FD4CFE0-333E-4BDA-B155-05698DAD0B70}"/>
                 </a:ext>
               </a:extLst>
             </p:cNvPr>
@@ -30053,7 +30225,7 @@
               <p:cNvPr id="110" name="Rectangle 109">
                 <a:extLst>
                   <a:ext uri="{FF2B5EF4-FFF2-40B4-BE49-F238E27FC236}">
-                    <a16:creationId xmlns="" xmlns:a16="http://schemas.microsoft.com/office/drawing/2014/main" id="{03DC0A66-1F24-4836-83E7-0736D601F324}"/>
+                    <a16:creationId xmlns:a16="http://schemas.microsoft.com/office/drawing/2014/main" xmlns="" id="{03DC0A66-1F24-4836-83E7-0736D601F324}"/>
                   </a:ext>
                 </a:extLst>
               </p:cNvPr>
@@ -30112,7 +30284,7 @@
               <p:cNvPr id="111" name="Rectangle 110">
                 <a:extLst>
                   <a:ext uri="{FF2B5EF4-FFF2-40B4-BE49-F238E27FC236}">
-                    <a16:creationId xmlns="" xmlns:a16="http://schemas.microsoft.com/office/drawing/2014/main" id="{03DC0A66-1F24-4836-83E7-0736D601F324}"/>
+                    <a16:creationId xmlns:a16="http://schemas.microsoft.com/office/drawing/2014/main" xmlns="" id="{03DC0A66-1F24-4836-83E7-0736D601F324}"/>
                   </a:ext>
                 </a:extLst>
               </p:cNvPr>
@@ -30222,7 +30394,7 @@
           <p:cNvPr id="112" name="Rectangle 3">
             <a:extLst>
               <a:ext uri="{FF2B5EF4-FFF2-40B4-BE49-F238E27FC236}">
-                <a16:creationId xmlns="" xmlns:a16="http://schemas.microsoft.com/office/drawing/2014/main" id="{46ADB3CD-EA06-4C85-A4CE-E0A5AA5A8DFC}"/>
+                <a16:creationId xmlns:a16="http://schemas.microsoft.com/office/drawing/2014/main" xmlns="" id="{46ADB3CD-EA06-4C85-A4CE-E0A5AA5A8DFC}"/>
               </a:ext>
             </a:extLst>
           </p:cNvPr>
@@ -30461,7 +30633,7 @@
           <p:cNvPr id="113" name="TextBox 112">
             <a:extLst>
               <a:ext uri="{FF2B5EF4-FFF2-40B4-BE49-F238E27FC236}">
-                <a16:creationId xmlns="" xmlns:a16="http://schemas.microsoft.com/office/drawing/2014/main" id="{9DFCBF7F-F24C-4F4A-8434-94B315F04673}"/>
+                <a16:creationId xmlns:a16="http://schemas.microsoft.com/office/drawing/2014/main" xmlns="" id="{9DFCBF7F-F24C-4F4A-8434-94B315F04673}"/>
               </a:ext>
             </a:extLst>
           </p:cNvPr>
@@ -31191,7 +31363,7 @@
           <p:cNvPr id="24" name="TextBox 23">
             <a:extLst>
               <a:ext uri="{FF2B5EF4-FFF2-40B4-BE49-F238E27FC236}">
-                <a16:creationId xmlns="" xmlns:a16="http://schemas.microsoft.com/office/drawing/2014/main" id="{FDE44C33-EA15-4D14-8324-71F27282442F}"/>
+                <a16:creationId xmlns:a16="http://schemas.microsoft.com/office/drawing/2014/main" xmlns="" id="{FDE44C33-EA15-4D14-8324-71F27282442F}"/>
               </a:ext>
             </a:extLst>
           </p:cNvPr>
@@ -31276,7 +31448,7 @@
               <p:cNvPr id="16" name="TextBox 15">
                 <a:extLst>
                   <a:ext uri="{FF2B5EF4-FFF2-40B4-BE49-F238E27FC236}">
-                    <a16:creationId xmlns="" xmlns:a16="http://schemas.microsoft.com/office/drawing/2014/main" id="{EDB442F5-34D7-4300-BA18-4B5BC98BC3D4}"/>
+                    <a16:creationId xmlns:a16="http://schemas.microsoft.com/office/drawing/2014/main" xmlns="" id="{EDB442F5-34D7-4300-BA18-4B5BC98BC3D4}"/>
                   </a:ext>
                 </a:extLst>
               </p:cNvPr>
@@ -31322,7 +31494,7 @@
               <p:cNvPr id="17" name="TextBox 16">
                 <a:extLst>
                   <a:ext uri="{FF2B5EF4-FFF2-40B4-BE49-F238E27FC236}">
-                    <a16:creationId xmlns="" xmlns:a16="http://schemas.microsoft.com/office/drawing/2014/main" id="{1126D985-4D01-49AD-AAA0-F753E895E063}"/>
+                    <a16:creationId xmlns:a16="http://schemas.microsoft.com/office/drawing/2014/main" xmlns="" id="{1126D985-4D01-49AD-AAA0-F753E895E063}"/>
                   </a:ext>
                 </a:extLst>
               </p:cNvPr>
@@ -31368,7 +31540,7 @@
               <p:cNvPr id="18" name="TextBox 17">
                 <a:extLst>
                   <a:ext uri="{FF2B5EF4-FFF2-40B4-BE49-F238E27FC236}">
-                    <a16:creationId xmlns="" xmlns:a16="http://schemas.microsoft.com/office/drawing/2014/main" id="{2F327C8B-A760-45E6-AF3F-CC4F1AE1E652}"/>
+                    <a16:creationId xmlns:a16="http://schemas.microsoft.com/office/drawing/2014/main" xmlns="" id="{2F327C8B-A760-45E6-AF3F-CC4F1AE1E652}"/>
                   </a:ext>
                 </a:extLst>
               </p:cNvPr>
@@ -31414,7 +31586,7 @@
               <p:cNvPr id="19" name="TextBox 18">
                 <a:extLst>
                   <a:ext uri="{FF2B5EF4-FFF2-40B4-BE49-F238E27FC236}">
-                    <a16:creationId xmlns="" xmlns:a16="http://schemas.microsoft.com/office/drawing/2014/main" id="{839ACAD9-74C5-4CC6-8034-5AFF1C74CC80}"/>
+                    <a16:creationId xmlns:a16="http://schemas.microsoft.com/office/drawing/2014/main" xmlns="" id="{839ACAD9-74C5-4CC6-8034-5AFF1C74CC80}"/>
                   </a:ext>
                 </a:extLst>
               </p:cNvPr>
@@ -31458,7 +31630,7 @@
               <p:cNvPr id="20" name="TextBox 19">
                 <a:extLst>
                   <a:ext uri="{FF2B5EF4-FFF2-40B4-BE49-F238E27FC236}">
-                    <a16:creationId xmlns="" xmlns:a16="http://schemas.microsoft.com/office/drawing/2014/main" id="{222D7E88-8744-4298-AB65-66D1802C446A}"/>
+                    <a16:creationId xmlns:a16="http://schemas.microsoft.com/office/drawing/2014/main" xmlns="" id="{222D7E88-8744-4298-AB65-66D1802C446A}"/>
                   </a:ext>
                 </a:extLst>
               </p:cNvPr>
@@ -31502,7 +31674,7 @@
             <p:cNvPr id="22" name="Rectangle 2">
               <a:extLst>
                 <a:ext uri="{FF2B5EF4-FFF2-40B4-BE49-F238E27FC236}">
-                  <a16:creationId xmlns="" xmlns:a16="http://schemas.microsoft.com/office/drawing/2014/main" id="{525E0D96-8099-4601-80D1-0E4DF7CAD69B}"/>
+                  <a16:creationId xmlns:a16="http://schemas.microsoft.com/office/drawing/2014/main" xmlns="" id="{525E0D96-8099-4601-80D1-0E4DF7CAD69B}"/>
                 </a:ext>
               </a:extLst>
             </p:cNvPr>
@@ -31579,7 +31751,7 @@
             <p:cNvPr id="23" name="TextBox 22">
               <a:extLst>
                 <a:ext uri="{FF2B5EF4-FFF2-40B4-BE49-F238E27FC236}">
-                  <a16:creationId xmlns="" xmlns:a16="http://schemas.microsoft.com/office/drawing/2014/main" id="{0FD4CFE0-333E-4BDA-B155-05698DAD0B70}"/>
+                  <a16:creationId xmlns:a16="http://schemas.microsoft.com/office/drawing/2014/main" xmlns="" id="{0FD4CFE0-333E-4BDA-B155-05698DAD0B70}"/>
                 </a:ext>
               </a:extLst>
             </p:cNvPr>
@@ -31622,7 +31794,7 @@
             <p:cNvPr id="67" name="Rectangle 3">
               <a:extLst>
                 <a:ext uri="{FF2B5EF4-FFF2-40B4-BE49-F238E27FC236}">
-                  <a16:creationId xmlns="" xmlns:a16="http://schemas.microsoft.com/office/drawing/2014/main" id="{46ADB3CD-EA06-4C85-A4CE-E0A5AA5A8DFC}"/>
+                  <a16:creationId xmlns:a16="http://schemas.microsoft.com/office/drawing/2014/main" xmlns="" id="{46ADB3CD-EA06-4C85-A4CE-E0A5AA5A8DFC}"/>
                 </a:ext>
               </a:extLst>
             </p:cNvPr>
@@ -31777,7 +31949,7 @@
               <p:cNvPr id="43" name="TextBox 42">
                 <a:extLst>
                   <a:ext uri="{FF2B5EF4-FFF2-40B4-BE49-F238E27FC236}">
-                    <a16:creationId xmlns="" xmlns:a16="http://schemas.microsoft.com/office/drawing/2014/main" id="{EDB442F5-34D7-4300-BA18-4B5BC98BC3D4}"/>
+                    <a16:creationId xmlns:a16="http://schemas.microsoft.com/office/drawing/2014/main" xmlns="" id="{EDB442F5-34D7-4300-BA18-4B5BC98BC3D4}"/>
                   </a:ext>
                 </a:extLst>
               </p:cNvPr>
@@ -31830,7 +32002,7 @@
               <p:cNvPr id="44" name="TextBox 43">
                 <a:extLst>
                   <a:ext uri="{FF2B5EF4-FFF2-40B4-BE49-F238E27FC236}">
-                    <a16:creationId xmlns="" xmlns:a16="http://schemas.microsoft.com/office/drawing/2014/main" id="{1126D985-4D01-49AD-AAA0-F753E895E063}"/>
+                    <a16:creationId xmlns:a16="http://schemas.microsoft.com/office/drawing/2014/main" xmlns="" id="{1126D985-4D01-49AD-AAA0-F753E895E063}"/>
                   </a:ext>
                 </a:extLst>
               </p:cNvPr>
@@ -31876,7 +32048,7 @@
               <p:cNvPr id="45" name="TextBox 44">
                 <a:extLst>
                   <a:ext uri="{FF2B5EF4-FFF2-40B4-BE49-F238E27FC236}">
-                    <a16:creationId xmlns="" xmlns:a16="http://schemas.microsoft.com/office/drawing/2014/main" id="{2F327C8B-A760-45E6-AF3F-CC4F1AE1E652}"/>
+                    <a16:creationId xmlns:a16="http://schemas.microsoft.com/office/drawing/2014/main" xmlns="" id="{2F327C8B-A760-45E6-AF3F-CC4F1AE1E652}"/>
                   </a:ext>
                 </a:extLst>
               </p:cNvPr>
@@ -31922,7 +32094,7 @@
               <p:cNvPr id="46" name="TextBox 45">
                 <a:extLst>
                   <a:ext uri="{FF2B5EF4-FFF2-40B4-BE49-F238E27FC236}">
-                    <a16:creationId xmlns="" xmlns:a16="http://schemas.microsoft.com/office/drawing/2014/main" id="{839ACAD9-74C5-4CC6-8034-5AFF1C74CC80}"/>
+                    <a16:creationId xmlns:a16="http://schemas.microsoft.com/office/drawing/2014/main" xmlns="" id="{839ACAD9-74C5-4CC6-8034-5AFF1C74CC80}"/>
                   </a:ext>
                 </a:extLst>
               </p:cNvPr>
@@ -31966,7 +32138,7 @@
               <p:cNvPr id="47" name="TextBox 46">
                 <a:extLst>
                   <a:ext uri="{FF2B5EF4-FFF2-40B4-BE49-F238E27FC236}">
-                    <a16:creationId xmlns="" xmlns:a16="http://schemas.microsoft.com/office/drawing/2014/main" id="{222D7E88-8744-4298-AB65-66D1802C446A}"/>
+                    <a16:creationId xmlns:a16="http://schemas.microsoft.com/office/drawing/2014/main" xmlns="" id="{222D7E88-8744-4298-AB65-66D1802C446A}"/>
                   </a:ext>
                 </a:extLst>
               </p:cNvPr>
@@ -32010,7 +32182,7 @@
             <p:cNvPr id="50" name="TextBox 49">
               <a:extLst>
                 <a:ext uri="{FF2B5EF4-FFF2-40B4-BE49-F238E27FC236}">
-                  <a16:creationId xmlns="" xmlns:a16="http://schemas.microsoft.com/office/drawing/2014/main" id="{0FD4CFE0-333E-4BDA-B155-05698DAD0B70}"/>
+                  <a16:creationId xmlns:a16="http://schemas.microsoft.com/office/drawing/2014/main" xmlns="" id="{0FD4CFE0-333E-4BDA-B155-05698DAD0B70}"/>
                 </a:ext>
               </a:extLst>
             </p:cNvPr>
@@ -32053,7 +32225,7 @@
             <p:cNvPr id="66" name="Rectangle 2">
               <a:extLst>
                 <a:ext uri="{FF2B5EF4-FFF2-40B4-BE49-F238E27FC236}">
-                  <a16:creationId xmlns="" xmlns:a16="http://schemas.microsoft.com/office/drawing/2014/main" id="{525E0D96-8099-4601-80D1-0E4DF7CAD69B}"/>
+                  <a16:creationId xmlns:a16="http://schemas.microsoft.com/office/drawing/2014/main" xmlns="" id="{525E0D96-8099-4601-80D1-0E4DF7CAD69B}"/>
                 </a:ext>
               </a:extLst>
             </p:cNvPr>
@@ -32130,7 +32302,7 @@
             <p:cNvPr id="68" name="Rectangle 3">
               <a:extLst>
                 <a:ext uri="{FF2B5EF4-FFF2-40B4-BE49-F238E27FC236}">
-                  <a16:creationId xmlns="" xmlns:a16="http://schemas.microsoft.com/office/drawing/2014/main" id="{46ADB3CD-EA06-4C85-A4CE-E0A5AA5A8DFC}"/>
+                  <a16:creationId xmlns:a16="http://schemas.microsoft.com/office/drawing/2014/main" xmlns="" id="{46ADB3CD-EA06-4C85-A4CE-E0A5AA5A8DFC}"/>
                 </a:ext>
               </a:extLst>
             </p:cNvPr>
@@ -32323,7 +32495,7 @@
               <p:cNvPr id="53" name="TextBox 52">
                 <a:extLst>
                   <a:ext uri="{FF2B5EF4-FFF2-40B4-BE49-F238E27FC236}">
-                    <a16:creationId xmlns="" xmlns:a16="http://schemas.microsoft.com/office/drawing/2014/main" id="{EDB442F5-34D7-4300-BA18-4B5BC98BC3D4}"/>
+                    <a16:creationId xmlns:a16="http://schemas.microsoft.com/office/drawing/2014/main" xmlns="" id="{EDB442F5-34D7-4300-BA18-4B5BC98BC3D4}"/>
                   </a:ext>
                 </a:extLst>
               </p:cNvPr>
@@ -32376,7 +32548,7 @@
               <p:cNvPr id="54" name="TextBox 53">
                 <a:extLst>
                   <a:ext uri="{FF2B5EF4-FFF2-40B4-BE49-F238E27FC236}">
-                    <a16:creationId xmlns="" xmlns:a16="http://schemas.microsoft.com/office/drawing/2014/main" id="{1126D985-4D01-49AD-AAA0-F753E895E063}"/>
+                    <a16:creationId xmlns:a16="http://schemas.microsoft.com/office/drawing/2014/main" xmlns="" id="{1126D985-4D01-49AD-AAA0-F753E895E063}"/>
                   </a:ext>
                 </a:extLst>
               </p:cNvPr>
@@ -32422,7 +32594,7 @@
               <p:cNvPr id="55" name="TextBox 54">
                 <a:extLst>
                   <a:ext uri="{FF2B5EF4-FFF2-40B4-BE49-F238E27FC236}">
-                    <a16:creationId xmlns="" xmlns:a16="http://schemas.microsoft.com/office/drawing/2014/main" id="{2F327C8B-A760-45E6-AF3F-CC4F1AE1E652}"/>
+                    <a16:creationId xmlns:a16="http://schemas.microsoft.com/office/drawing/2014/main" xmlns="" id="{2F327C8B-A760-45E6-AF3F-CC4F1AE1E652}"/>
                   </a:ext>
                 </a:extLst>
               </p:cNvPr>
@@ -32468,7 +32640,7 @@
               <p:cNvPr id="56" name="TextBox 55">
                 <a:extLst>
                   <a:ext uri="{FF2B5EF4-FFF2-40B4-BE49-F238E27FC236}">
-                    <a16:creationId xmlns="" xmlns:a16="http://schemas.microsoft.com/office/drawing/2014/main" id="{839ACAD9-74C5-4CC6-8034-5AFF1C74CC80}"/>
+                    <a16:creationId xmlns:a16="http://schemas.microsoft.com/office/drawing/2014/main" xmlns="" id="{839ACAD9-74C5-4CC6-8034-5AFF1C74CC80}"/>
                   </a:ext>
                 </a:extLst>
               </p:cNvPr>
@@ -32512,7 +32684,7 @@
               <p:cNvPr id="57" name="TextBox 56">
                 <a:extLst>
                   <a:ext uri="{FF2B5EF4-FFF2-40B4-BE49-F238E27FC236}">
-                    <a16:creationId xmlns="" xmlns:a16="http://schemas.microsoft.com/office/drawing/2014/main" id="{222D7E88-8744-4298-AB65-66D1802C446A}"/>
+                    <a16:creationId xmlns:a16="http://schemas.microsoft.com/office/drawing/2014/main" xmlns="" id="{222D7E88-8744-4298-AB65-66D1802C446A}"/>
                   </a:ext>
                 </a:extLst>
               </p:cNvPr>
@@ -32556,7 +32728,7 @@
             <p:cNvPr id="59" name="Rectangle 2">
               <a:extLst>
                 <a:ext uri="{FF2B5EF4-FFF2-40B4-BE49-F238E27FC236}">
-                  <a16:creationId xmlns="" xmlns:a16="http://schemas.microsoft.com/office/drawing/2014/main" id="{525E0D96-8099-4601-80D1-0E4DF7CAD69B}"/>
+                  <a16:creationId xmlns:a16="http://schemas.microsoft.com/office/drawing/2014/main" xmlns="" id="{525E0D96-8099-4601-80D1-0E4DF7CAD69B}"/>
                 </a:ext>
               </a:extLst>
             </p:cNvPr>
@@ -32632,7 +32804,7 @@
             <p:cNvPr id="60" name="TextBox 59">
               <a:extLst>
                 <a:ext uri="{FF2B5EF4-FFF2-40B4-BE49-F238E27FC236}">
-                  <a16:creationId xmlns="" xmlns:a16="http://schemas.microsoft.com/office/drawing/2014/main" id="{0FD4CFE0-333E-4BDA-B155-05698DAD0B70}"/>
+                  <a16:creationId xmlns:a16="http://schemas.microsoft.com/office/drawing/2014/main" xmlns="" id="{0FD4CFE0-333E-4BDA-B155-05698DAD0B70}"/>
                 </a:ext>
               </a:extLst>
             </p:cNvPr>
@@ -32675,7 +32847,7 @@
             <p:cNvPr id="69" name="Rectangle 3">
               <a:extLst>
                 <a:ext uri="{FF2B5EF4-FFF2-40B4-BE49-F238E27FC236}">
-                  <a16:creationId xmlns="" xmlns:a16="http://schemas.microsoft.com/office/drawing/2014/main" id="{46ADB3CD-EA06-4C85-A4CE-E0A5AA5A8DFC}"/>
+                  <a16:creationId xmlns:a16="http://schemas.microsoft.com/office/drawing/2014/main" xmlns="" id="{46ADB3CD-EA06-4C85-A4CE-E0A5AA5A8DFC}"/>
                 </a:ext>
               </a:extLst>
             </p:cNvPr>
@@ -32787,7 +32959,7 @@
           <p:cNvPr id="73" name="TextBox 72">
             <a:extLst>
               <a:ext uri="{FF2B5EF4-FFF2-40B4-BE49-F238E27FC236}">
-                <a16:creationId xmlns="" xmlns:a16="http://schemas.microsoft.com/office/drawing/2014/main" id="{9DFCBF7F-F24C-4F4A-8434-94B315F04673}"/>
+                <a16:creationId xmlns:a16="http://schemas.microsoft.com/office/drawing/2014/main" xmlns="" id="{9DFCBF7F-F24C-4F4A-8434-94B315F04673}"/>
               </a:ext>
             </a:extLst>
           </p:cNvPr>
@@ -33145,7 +33317,7 @@
           <p:cNvPr id="6" name="TextBox 5">
             <a:extLst>
               <a:ext uri="{FF2B5EF4-FFF2-40B4-BE49-F238E27FC236}">
-                <a16:creationId xmlns="" xmlns:a16="http://schemas.microsoft.com/office/drawing/2014/main" id="{438442CF-1B82-4A10-87A1-614331CA498E}"/>
+                <a16:creationId xmlns:a16="http://schemas.microsoft.com/office/drawing/2014/main" xmlns="" id="{438442CF-1B82-4A10-87A1-614331CA498E}"/>
               </a:ext>
             </a:extLst>
           </p:cNvPr>
@@ -33217,7 +33389,7 @@
           <p:cNvPr id="7" name="TextBox 6">
             <a:extLst>
               <a:ext uri="{FF2B5EF4-FFF2-40B4-BE49-F238E27FC236}">
-                <a16:creationId xmlns="" xmlns:a16="http://schemas.microsoft.com/office/drawing/2014/main" id="{438442CF-1B82-4A10-87A1-614331CA498E}"/>
+                <a16:creationId xmlns:a16="http://schemas.microsoft.com/office/drawing/2014/main" xmlns="" id="{438442CF-1B82-4A10-87A1-614331CA498E}"/>
               </a:ext>
             </a:extLst>
           </p:cNvPr>
@@ -33296,7 +33468,7 @@
           <p:cNvPr id="8" name="TextBox 7">
             <a:extLst>
               <a:ext uri="{FF2B5EF4-FFF2-40B4-BE49-F238E27FC236}">
-                <a16:creationId xmlns="" xmlns:a16="http://schemas.microsoft.com/office/drawing/2014/main" id="{438442CF-1B82-4A10-87A1-614331CA498E}"/>
+                <a16:creationId xmlns:a16="http://schemas.microsoft.com/office/drawing/2014/main" xmlns="" id="{438442CF-1B82-4A10-87A1-614331CA498E}"/>
               </a:ext>
             </a:extLst>
           </p:cNvPr>
@@ -33388,7 +33560,7 @@
           <p:cNvPr id="9" name="TextBox 8">
             <a:extLst>
               <a:ext uri="{FF2B5EF4-FFF2-40B4-BE49-F238E27FC236}">
-                <a16:creationId xmlns="" xmlns:a16="http://schemas.microsoft.com/office/drawing/2014/main" id="{438442CF-1B82-4A10-87A1-614331CA498E}"/>
+                <a16:creationId xmlns:a16="http://schemas.microsoft.com/office/drawing/2014/main" xmlns="" id="{438442CF-1B82-4A10-87A1-614331CA498E}"/>
               </a:ext>
             </a:extLst>
           </p:cNvPr>
@@ -33729,7 +33901,7 @@
           <p:cNvPr id="29" name="TextBox 28">
             <a:extLst>
               <a:ext uri="{FF2B5EF4-FFF2-40B4-BE49-F238E27FC236}">
-                <a16:creationId xmlns="" xmlns:a16="http://schemas.microsoft.com/office/drawing/2014/main" id="{FDE44C33-EA15-4D14-8324-71F27282442F}"/>
+                <a16:creationId xmlns:a16="http://schemas.microsoft.com/office/drawing/2014/main" xmlns="" id="{FDE44C33-EA15-4D14-8324-71F27282442F}"/>
               </a:ext>
             </a:extLst>
           </p:cNvPr>
@@ -33825,7 +33997,7 @@
           <p:cNvPr id="33" name="TextBox 32">
             <a:extLst>
               <a:ext uri="{FF2B5EF4-FFF2-40B4-BE49-F238E27FC236}">
-                <a16:creationId xmlns="" xmlns:a16="http://schemas.microsoft.com/office/drawing/2014/main" id="{E43AF4C5-CF5B-4E7E-B438-83CD70BE1265}"/>
+                <a16:creationId xmlns:a16="http://schemas.microsoft.com/office/drawing/2014/main" xmlns="" id="{E43AF4C5-CF5B-4E7E-B438-83CD70BE1265}"/>
               </a:ext>
             </a:extLst>
           </p:cNvPr>
@@ -34981,7 +35153,7 @@
   <a:extraClrSchemeLst/>
   <a:extLst>
     <a:ext uri="{05A4C25C-085E-4340-85A3-A5531E510DB2}">
-      <thm15:themeFamily xmlns="" xmlns:thm15="http://schemas.microsoft.com/office/thememl/2012/main" name="Office Theme" id="{62F939B6-93AF-4DB8-9C6B-D6C7DFDC589F}" vid="{4A3C46E8-61CC-4603-A589-7422A47A8E4A}"/>
+      <thm15:themeFamily xmlns:thm15="http://schemas.microsoft.com/office/thememl/2012/main" xmlns="" name="Office Theme" id="{62F939B6-93AF-4DB8-9C6B-D6C7DFDC589F}" vid="{4A3C46E8-61CC-4603-A589-7422A47A8E4A}"/>
     </a:ext>
   </a:extLst>
 </a:theme>

</xml_diff>

<commit_message>
bit of windows stuff
 Changes to be committed:
	modified:   Flip Presentations/NGS_Intro/00-FASTA_FASTQ_PHRED_ASCII/00-FASTQ_PHRED_ASCII.pptx
</commit_message>
<xml_diff>
--- a/Flip Presentations/NGS_Intro/00-FASTA_FASTQ_PHRED_ASCII/00-FASTQ_PHRED_ASCII.pptx
+++ b/Flip Presentations/NGS_Intro/00-FASTA_FASTQ_PHRED_ASCII/00-FASTQ_PHRED_ASCII.pptx
@@ -128,7 +128,7 @@
   </p:defaultTextStyle>
   <p:extLst>
     <p:ext uri="{EFAFB233-063F-42B5-8137-9DF3F51BA10A}">
-      <p15:sldGuideLst xmlns:p15="http://schemas.microsoft.com/office/powerpoint/2012/main" xmlns=""/>
+      <p15:sldGuideLst xmlns="" xmlns:p15="http://schemas.microsoft.com/office/powerpoint/2012/main"/>
     </p:ext>
   </p:extLst>
 </p:presentation>
@@ -220,7 +220,7 @@
           <a:p>
             <a:fld id="{A1A0514D-38CC-49F5-A912-2794DAAF3AC3}" type="datetimeFigureOut">
               <a:rPr lang="en-GB" smtClean="0"/>
-              <a:t>2018-03-15</a:t>
+              <a:t>2018-04-10</a:t>
             </a:fld>
             <a:endParaRPr lang="en-GB"/>
           </a:p>
@@ -2338,7 +2338,7 @@
           <p:cNvPr id="2" name="Title 1">
             <a:extLst>
               <a:ext uri="{FF2B5EF4-FFF2-40B4-BE49-F238E27FC236}">
-                <a16:creationId xmlns:a16="http://schemas.microsoft.com/office/drawing/2014/main" xmlns="" id="{032A3615-1B4F-418D-B0BB-CBD54E1C819E}"/>
+                <a16:creationId xmlns="" xmlns:a16="http://schemas.microsoft.com/office/drawing/2014/main" id="{032A3615-1B4F-418D-B0BB-CBD54E1C819E}"/>
               </a:ext>
             </a:extLst>
           </p:cNvPr>
@@ -2376,7 +2376,7 @@
           <p:cNvPr id="3" name="Subtitle 2">
             <a:extLst>
               <a:ext uri="{FF2B5EF4-FFF2-40B4-BE49-F238E27FC236}">
-                <a16:creationId xmlns:a16="http://schemas.microsoft.com/office/drawing/2014/main" xmlns="" id="{5178CFA0-D280-4CD5-A213-7111D5B1C049}"/>
+                <a16:creationId xmlns="" xmlns:a16="http://schemas.microsoft.com/office/drawing/2014/main" id="{5178CFA0-D280-4CD5-A213-7111D5B1C049}"/>
               </a:ext>
             </a:extLst>
           </p:cNvPr>
@@ -2447,7 +2447,7 @@
           <p:cNvPr id="4" name="Date Placeholder 3">
             <a:extLst>
               <a:ext uri="{FF2B5EF4-FFF2-40B4-BE49-F238E27FC236}">
-                <a16:creationId xmlns:a16="http://schemas.microsoft.com/office/drawing/2014/main" xmlns="" id="{6437010A-E880-4C2E-8F4F-2C9DE975306A}"/>
+                <a16:creationId xmlns="" xmlns:a16="http://schemas.microsoft.com/office/drawing/2014/main" id="{6437010A-E880-4C2E-8F4F-2C9DE975306A}"/>
               </a:ext>
             </a:extLst>
           </p:cNvPr>
@@ -2465,7 +2465,7 @@
           <a:p>
             <a:fld id="{AEC09C50-853A-420B-8C26-7439C86401C0}" type="datetimeFigureOut">
               <a:rPr lang="en-GB" smtClean="0"/>
-              <a:t>2018-03-15</a:t>
+              <a:t>2018-04-10</a:t>
             </a:fld>
             <a:endParaRPr lang="en-GB"/>
           </a:p>
@@ -2476,7 +2476,7 @@
           <p:cNvPr id="5" name="Footer Placeholder 4">
             <a:extLst>
               <a:ext uri="{FF2B5EF4-FFF2-40B4-BE49-F238E27FC236}">
-                <a16:creationId xmlns:a16="http://schemas.microsoft.com/office/drawing/2014/main" xmlns="" id="{9F643F16-915B-4F04-8319-7D1C8C69C781}"/>
+                <a16:creationId xmlns="" xmlns:a16="http://schemas.microsoft.com/office/drawing/2014/main" id="{9F643F16-915B-4F04-8319-7D1C8C69C781}"/>
               </a:ext>
             </a:extLst>
           </p:cNvPr>
@@ -2501,7 +2501,7 @@
           <p:cNvPr id="6" name="Slide Number Placeholder 5">
             <a:extLst>
               <a:ext uri="{FF2B5EF4-FFF2-40B4-BE49-F238E27FC236}">
-                <a16:creationId xmlns:a16="http://schemas.microsoft.com/office/drawing/2014/main" xmlns="" id="{A5A1F72C-9F07-4EFA-8E45-090190D59EFA}"/>
+                <a16:creationId xmlns="" xmlns:a16="http://schemas.microsoft.com/office/drawing/2014/main" id="{A5A1F72C-9F07-4EFA-8E45-090190D59EFA}"/>
               </a:ext>
             </a:extLst>
           </p:cNvPr>
@@ -2560,7 +2560,7 @@
           <p:cNvPr id="2" name="Title 1">
             <a:extLst>
               <a:ext uri="{FF2B5EF4-FFF2-40B4-BE49-F238E27FC236}">
-                <a16:creationId xmlns:a16="http://schemas.microsoft.com/office/drawing/2014/main" xmlns="" id="{DF0ADA25-4CDF-4246-9CC9-8AE3380619F1}"/>
+                <a16:creationId xmlns="" xmlns:a16="http://schemas.microsoft.com/office/drawing/2014/main" id="{DF0ADA25-4CDF-4246-9CC9-8AE3380619F1}"/>
               </a:ext>
             </a:extLst>
           </p:cNvPr>
@@ -2589,7 +2589,7 @@
           <p:cNvPr id="3" name="Vertical Text Placeholder 2">
             <a:extLst>
               <a:ext uri="{FF2B5EF4-FFF2-40B4-BE49-F238E27FC236}">
-                <a16:creationId xmlns:a16="http://schemas.microsoft.com/office/drawing/2014/main" xmlns="" id="{A73B0C6F-4850-4D10-91DC-61668DE50E5A}"/>
+                <a16:creationId xmlns="" xmlns:a16="http://schemas.microsoft.com/office/drawing/2014/main" id="{A73B0C6F-4850-4D10-91DC-61668DE50E5A}"/>
               </a:ext>
             </a:extLst>
           </p:cNvPr>
@@ -2647,7 +2647,7 @@
           <p:cNvPr id="4" name="Date Placeholder 3">
             <a:extLst>
               <a:ext uri="{FF2B5EF4-FFF2-40B4-BE49-F238E27FC236}">
-                <a16:creationId xmlns:a16="http://schemas.microsoft.com/office/drawing/2014/main" xmlns="" id="{28816B05-7093-4142-B374-DFA2171DFDA7}"/>
+                <a16:creationId xmlns="" xmlns:a16="http://schemas.microsoft.com/office/drawing/2014/main" id="{28816B05-7093-4142-B374-DFA2171DFDA7}"/>
               </a:ext>
             </a:extLst>
           </p:cNvPr>
@@ -2665,7 +2665,7 @@
           <a:p>
             <a:fld id="{AEC09C50-853A-420B-8C26-7439C86401C0}" type="datetimeFigureOut">
               <a:rPr lang="en-GB" smtClean="0"/>
-              <a:t>2018-03-15</a:t>
+              <a:t>2018-04-10</a:t>
             </a:fld>
             <a:endParaRPr lang="en-GB"/>
           </a:p>
@@ -2676,7 +2676,7 @@
           <p:cNvPr id="5" name="Footer Placeholder 4">
             <a:extLst>
               <a:ext uri="{FF2B5EF4-FFF2-40B4-BE49-F238E27FC236}">
-                <a16:creationId xmlns:a16="http://schemas.microsoft.com/office/drawing/2014/main" xmlns="" id="{F8D052D6-AC53-4967-A0E2-E4E4AB61FF09}"/>
+                <a16:creationId xmlns="" xmlns:a16="http://schemas.microsoft.com/office/drawing/2014/main" id="{F8D052D6-AC53-4967-A0E2-E4E4AB61FF09}"/>
               </a:ext>
             </a:extLst>
           </p:cNvPr>
@@ -2701,7 +2701,7 @@
           <p:cNvPr id="6" name="Slide Number Placeholder 5">
             <a:extLst>
               <a:ext uri="{FF2B5EF4-FFF2-40B4-BE49-F238E27FC236}">
-                <a16:creationId xmlns:a16="http://schemas.microsoft.com/office/drawing/2014/main" xmlns="" id="{209C7226-9CDD-405A-B9DA-D5ED9561A32C}"/>
+                <a16:creationId xmlns="" xmlns:a16="http://schemas.microsoft.com/office/drawing/2014/main" id="{209C7226-9CDD-405A-B9DA-D5ED9561A32C}"/>
               </a:ext>
             </a:extLst>
           </p:cNvPr>
@@ -2760,7 +2760,7 @@
           <p:cNvPr id="2" name="Vertical Title 1">
             <a:extLst>
               <a:ext uri="{FF2B5EF4-FFF2-40B4-BE49-F238E27FC236}">
-                <a16:creationId xmlns:a16="http://schemas.microsoft.com/office/drawing/2014/main" xmlns="" id="{AC8F15DC-2850-4805-BE66-C8A705279A00}"/>
+                <a16:creationId xmlns="" xmlns:a16="http://schemas.microsoft.com/office/drawing/2014/main" id="{AC8F15DC-2850-4805-BE66-C8A705279A00}"/>
               </a:ext>
             </a:extLst>
           </p:cNvPr>
@@ -2794,7 +2794,7 @@
           <p:cNvPr id="3" name="Vertical Text Placeholder 2">
             <a:extLst>
               <a:ext uri="{FF2B5EF4-FFF2-40B4-BE49-F238E27FC236}">
-                <a16:creationId xmlns:a16="http://schemas.microsoft.com/office/drawing/2014/main" xmlns="" id="{C357DFB2-B690-4D71-9FB8-516ED75975FD}"/>
+                <a16:creationId xmlns="" xmlns:a16="http://schemas.microsoft.com/office/drawing/2014/main" id="{C357DFB2-B690-4D71-9FB8-516ED75975FD}"/>
               </a:ext>
             </a:extLst>
           </p:cNvPr>
@@ -2857,7 +2857,7 @@
           <p:cNvPr id="4" name="Date Placeholder 3">
             <a:extLst>
               <a:ext uri="{FF2B5EF4-FFF2-40B4-BE49-F238E27FC236}">
-                <a16:creationId xmlns:a16="http://schemas.microsoft.com/office/drawing/2014/main" xmlns="" id="{6CA1D11A-42DD-417D-AC4D-52096BB89234}"/>
+                <a16:creationId xmlns="" xmlns:a16="http://schemas.microsoft.com/office/drawing/2014/main" id="{6CA1D11A-42DD-417D-AC4D-52096BB89234}"/>
               </a:ext>
             </a:extLst>
           </p:cNvPr>
@@ -2875,7 +2875,7 @@
           <a:p>
             <a:fld id="{AEC09C50-853A-420B-8C26-7439C86401C0}" type="datetimeFigureOut">
               <a:rPr lang="en-GB" smtClean="0"/>
-              <a:t>2018-03-15</a:t>
+              <a:t>2018-04-10</a:t>
             </a:fld>
             <a:endParaRPr lang="en-GB"/>
           </a:p>
@@ -2886,7 +2886,7 @@
           <p:cNvPr id="5" name="Footer Placeholder 4">
             <a:extLst>
               <a:ext uri="{FF2B5EF4-FFF2-40B4-BE49-F238E27FC236}">
-                <a16:creationId xmlns:a16="http://schemas.microsoft.com/office/drawing/2014/main" xmlns="" id="{24E0F641-8F99-48B8-8C2B-0535E04FC772}"/>
+                <a16:creationId xmlns="" xmlns:a16="http://schemas.microsoft.com/office/drawing/2014/main" id="{24E0F641-8F99-48B8-8C2B-0535E04FC772}"/>
               </a:ext>
             </a:extLst>
           </p:cNvPr>
@@ -2911,7 +2911,7 @@
           <p:cNvPr id="6" name="Slide Number Placeholder 5">
             <a:extLst>
               <a:ext uri="{FF2B5EF4-FFF2-40B4-BE49-F238E27FC236}">
-                <a16:creationId xmlns:a16="http://schemas.microsoft.com/office/drawing/2014/main" xmlns="" id="{F5D90570-5593-43EA-ADD8-E7B87D770333}"/>
+                <a16:creationId xmlns="" xmlns:a16="http://schemas.microsoft.com/office/drawing/2014/main" id="{F5D90570-5593-43EA-ADD8-E7B87D770333}"/>
               </a:ext>
             </a:extLst>
           </p:cNvPr>
@@ -2970,7 +2970,7 @@
           <p:cNvPr id="2" name="Title 1">
             <a:extLst>
               <a:ext uri="{FF2B5EF4-FFF2-40B4-BE49-F238E27FC236}">
-                <a16:creationId xmlns:a16="http://schemas.microsoft.com/office/drawing/2014/main" xmlns="" id="{B98979EE-87BC-427F-94CA-2C281566B09A}"/>
+                <a16:creationId xmlns="" xmlns:a16="http://schemas.microsoft.com/office/drawing/2014/main" id="{B98979EE-87BC-427F-94CA-2C281566B09A}"/>
               </a:ext>
             </a:extLst>
           </p:cNvPr>
@@ -2999,7 +2999,7 @@
           <p:cNvPr id="3" name="Content Placeholder 2">
             <a:extLst>
               <a:ext uri="{FF2B5EF4-FFF2-40B4-BE49-F238E27FC236}">
-                <a16:creationId xmlns:a16="http://schemas.microsoft.com/office/drawing/2014/main" xmlns="" id="{08E844DF-4E79-432A-89FF-B27AE73F8DFC}"/>
+                <a16:creationId xmlns="" xmlns:a16="http://schemas.microsoft.com/office/drawing/2014/main" id="{08E844DF-4E79-432A-89FF-B27AE73F8DFC}"/>
               </a:ext>
             </a:extLst>
           </p:cNvPr>
@@ -3057,7 +3057,7 @@
           <p:cNvPr id="4" name="Date Placeholder 3">
             <a:extLst>
               <a:ext uri="{FF2B5EF4-FFF2-40B4-BE49-F238E27FC236}">
-                <a16:creationId xmlns:a16="http://schemas.microsoft.com/office/drawing/2014/main" xmlns="" id="{8B91852C-926C-48F7-8D30-64C8DA09313F}"/>
+                <a16:creationId xmlns="" xmlns:a16="http://schemas.microsoft.com/office/drawing/2014/main" id="{8B91852C-926C-48F7-8D30-64C8DA09313F}"/>
               </a:ext>
             </a:extLst>
           </p:cNvPr>
@@ -3075,7 +3075,7 @@
           <a:p>
             <a:fld id="{AEC09C50-853A-420B-8C26-7439C86401C0}" type="datetimeFigureOut">
               <a:rPr lang="en-GB" smtClean="0"/>
-              <a:t>2018-03-15</a:t>
+              <a:t>2018-04-10</a:t>
             </a:fld>
             <a:endParaRPr lang="en-GB"/>
           </a:p>
@@ -3086,7 +3086,7 @@
           <p:cNvPr id="5" name="Footer Placeholder 4">
             <a:extLst>
               <a:ext uri="{FF2B5EF4-FFF2-40B4-BE49-F238E27FC236}">
-                <a16:creationId xmlns:a16="http://schemas.microsoft.com/office/drawing/2014/main" xmlns="" id="{546A3794-73BB-4394-B312-0810CC8D282B}"/>
+                <a16:creationId xmlns="" xmlns:a16="http://schemas.microsoft.com/office/drawing/2014/main" id="{546A3794-73BB-4394-B312-0810CC8D282B}"/>
               </a:ext>
             </a:extLst>
           </p:cNvPr>
@@ -3111,7 +3111,7 @@
           <p:cNvPr id="6" name="Slide Number Placeholder 5">
             <a:extLst>
               <a:ext uri="{FF2B5EF4-FFF2-40B4-BE49-F238E27FC236}">
-                <a16:creationId xmlns:a16="http://schemas.microsoft.com/office/drawing/2014/main" xmlns="" id="{07786F77-2E2A-4620-93A8-BA28C7D5968E}"/>
+                <a16:creationId xmlns="" xmlns:a16="http://schemas.microsoft.com/office/drawing/2014/main" id="{07786F77-2E2A-4620-93A8-BA28C7D5968E}"/>
               </a:ext>
             </a:extLst>
           </p:cNvPr>
@@ -3170,7 +3170,7 @@
           <p:cNvPr id="2" name="Title 1">
             <a:extLst>
               <a:ext uri="{FF2B5EF4-FFF2-40B4-BE49-F238E27FC236}">
-                <a16:creationId xmlns:a16="http://schemas.microsoft.com/office/drawing/2014/main" xmlns="" id="{AAAC300C-DDCD-4815-A851-D27410C002C4}"/>
+                <a16:creationId xmlns="" xmlns:a16="http://schemas.microsoft.com/office/drawing/2014/main" id="{AAAC300C-DDCD-4815-A851-D27410C002C4}"/>
               </a:ext>
             </a:extLst>
           </p:cNvPr>
@@ -3208,7 +3208,7 @@
           <p:cNvPr id="3" name="Text Placeholder 2">
             <a:extLst>
               <a:ext uri="{FF2B5EF4-FFF2-40B4-BE49-F238E27FC236}">
-                <a16:creationId xmlns:a16="http://schemas.microsoft.com/office/drawing/2014/main" xmlns="" id="{71D70F57-38B3-443C-8310-1B6EF0186E83}"/>
+                <a16:creationId xmlns="" xmlns:a16="http://schemas.microsoft.com/office/drawing/2014/main" id="{71D70F57-38B3-443C-8310-1B6EF0186E83}"/>
               </a:ext>
             </a:extLst>
           </p:cNvPr>
@@ -3333,7 +3333,7 @@
           <p:cNvPr id="4" name="Date Placeholder 3">
             <a:extLst>
               <a:ext uri="{FF2B5EF4-FFF2-40B4-BE49-F238E27FC236}">
-                <a16:creationId xmlns:a16="http://schemas.microsoft.com/office/drawing/2014/main" xmlns="" id="{CEE46B92-1656-4AB0-B92C-41936E9B09B4}"/>
+                <a16:creationId xmlns="" xmlns:a16="http://schemas.microsoft.com/office/drawing/2014/main" id="{CEE46B92-1656-4AB0-B92C-41936E9B09B4}"/>
               </a:ext>
             </a:extLst>
           </p:cNvPr>
@@ -3351,7 +3351,7 @@
           <a:p>
             <a:fld id="{AEC09C50-853A-420B-8C26-7439C86401C0}" type="datetimeFigureOut">
               <a:rPr lang="en-GB" smtClean="0"/>
-              <a:t>2018-03-15</a:t>
+              <a:t>2018-04-10</a:t>
             </a:fld>
             <a:endParaRPr lang="en-GB"/>
           </a:p>
@@ -3362,7 +3362,7 @@
           <p:cNvPr id="5" name="Footer Placeholder 4">
             <a:extLst>
               <a:ext uri="{FF2B5EF4-FFF2-40B4-BE49-F238E27FC236}">
-                <a16:creationId xmlns:a16="http://schemas.microsoft.com/office/drawing/2014/main" xmlns="" id="{7DC8305A-64D0-4AFB-8642-6845BCEBBD8E}"/>
+                <a16:creationId xmlns="" xmlns:a16="http://schemas.microsoft.com/office/drawing/2014/main" id="{7DC8305A-64D0-4AFB-8642-6845BCEBBD8E}"/>
               </a:ext>
             </a:extLst>
           </p:cNvPr>
@@ -3387,7 +3387,7 @@
           <p:cNvPr id="6" name="Slide Number Placeholder 5">
             <a:extLst>
               <a:ext uri="{FF2B5EF4-FFF2-40B4-BE49-F238E27FC236}">
-                <a16:creationId xmlns:a16="http://schemas.microsoft.com/office/drawing/2014/main" xmlns="" id="{5CD65ACC-878F-4FFE-8CA3-4D11A4DF969D}"/>
+                <a16:creationId xmlns="" xmlns:a16="http://schemas.microsoft.com/office/drawing/2014/main" id="{5CD65ACC-878F-4FFE-8CA3-4D11A4DF969D}"/>
               </a:ext>
             </a:extLst>
           </p:cNvPr>
@@ -3446,7 +3446,7 @@
           <p:cNvPr id="2" name="Title 1">
             <a:extLst>
               <a:ext uri="{FF2B5EF4-FFF2-40B4-BE49-F238E27FC236}">
-                <a16:creationId xmlns:a16="http://schemas.microsoft.com/office/drawing/2014/main" xmlns="" id="{C22E1C61-B0A3-4D79-87F0-D3FE72B442EC}"/>
+                <a16:creationId xmlns="" xmlns:a16="http://schemas.microsoft.com/office/drawing/2014/main" id="{C22E1C61-B0A3-4D79-87F0-D3FE72B442EC}"/>
               </a:ext>
             </a:extLst>
           </p:cNvPr>
@@ -3475,7 +3475,7 @@
           <p:cNvPr id="3" name="Content Placeholder 2">
             <a:extLst>
               <a:ext uri="{FF2B5EF4-FFF2-40B4-BE49-F238E27FC236}">
-                <a16:creationId xmlns:a16="http://schemas.microsoft.com/office/drawing/2014/main" xmlns="" id="{8CF6C057-BBB5-4F28-A87E-105844231C32}"/>
+                <a16:creationId xmlns="" xmlns:a16="http://schemas.microsoft.com/office/drawing/2014/main" id="{8CF6C057-BBB5-4F28-A87E-105844231C32}"/>
               </a:ext>
             </a:extLst>
           </p:cNvPr>
@@ -3538,7 +3538,7 @@
           <p:cNvPr id="4" name="Content Placeholder 3">
             <a:extLst>
               <a:ext uri="{FF2B5EF4-FFF2-40B4-BE49-F238E27FC236}">
-                <a16:creationId xmlns:a16="http://schemas.microsoft.com/office/drawing/2014/main" xmlns="" id="{8C9AE18C-33A9-443E-928F-81EC04DF5738}"/>
+                <a16:creationId xmlns="" xmlns:a16="http://schemas.microsoft.com/office/drawing/2014/main" id="{8C9AE18C-33A9-443E-928F-81EC04DF5738}"/>
               </a:ext>
             </a:extLst>
           </p:cNvPr>
@@ -3601,7 +3601,7 @@
           <p:cNvPr id="5" name="Date Placeholder 4">
             <a:extLst>
               <a:ext uri="{FF2B5EF4-FFF2-40B4-BE49-F238E27FC236}">
-                <a16:creationId xmlns:a16="http://schemas.microsoft.com/office/drawing/2014/main" xmlns="" id="{41107389-B4BB-487C-995E-6E58CFAF6E9D}"/>
+                <a16:creationId xmlns="" xmlns:a16="http://schemas.microsoft.com/office/drawing/2014/main" id="{41107389-B4BB-487C-995E-6E58CFAF6E9D}"/>
               </a:ext>
             </a:extLst>
           </p:cNvPr>
@@ -3619,7 +3619,7 @@
           <a:p>
             <a:fld id="{AEC09C50-853A-420B-8C26-7439C86401C0}" type="datetimeFigureOut">
               <a:rPr lang="en-GB" smtClean="0"/>
-              <a:t>2018-03-15</a:t>
+              <a:t>2018-04-10</a:t>
             </a:fld>
             <a:endParaRPr lang="en-GB"/>
           </a:p>
@@ -3630,7 +3630,7 @@
           <p:cNvPr id="6" name="Footer Placeholder 5">
             <a:extLst>
               <a:ext uri="{FF2B5EF4-FFF2-40B4-BE49-F238E27FC236}">
-                <a16:creationId xmlns:a16="http://schemas.microsoft.com/office/drawing/2014/main" xmlns="" id="{3E9CD8BB-3986-4FA9-834F-317E88D998F2}"/>
+                <a16:creationId xmlns="" xmlns:a16="http://schemas.microsoft.com/office/drawing/2014/main" id="{3E9CD8BB-3986-4FA9-834F-317E88D998F2}"/>
               </a:ext>
             </a:extLst>
           </p:cNvPr>
@@ -3655,7 +3655,7 @@
           <p:cNvPr id="7" name="Slide Number Placeholder 6">
             <a:extLst>
               <a:ext uri="{FF2B5EF4-FFF2-40B4-BE49-F238E27FC236}">
-                <a16:creationId xmlns:a16="http://schemas.microsoft.com/office/drawing/2014/main" xmlns="" id="{8D5B0155-25C5-4F31-B914-54F60CD5DEBF}"/>
+                <a16:creationId xmlns="" xmlns:a16="http://schemas.microsoft.com/office/drawing/2014/main" id="{8D5B0155-25C5-4F31-B914-54F60CD5DEBF}"/>
               </a:ext>
             </a:extLst>
           </p:cNvPr>
@@ -3714,7 +3714,7 @@
           <p:cNvPr id="2" name="Title 1">
             <a:extLst>
               <a:ext uri="{FF2B5EF4-FFF2-40B4-BE49-F238E27FC236}">
-                <a16:creationId xmlns:a16="http://schemas.microsoft.com/office/drawing/2014/main" xmlns="" id="{2661A003-2765-44CA-9145-AB1528F4C2E9}"/>
+                <a16:creationId xmlns="" xmlns:a16="http://schemas.microsoft.com/office/drawing/2014/main" id="{2661A003-2765-44CA-9145-AB1528F4C2E9}"/>
               </a:ext>
             </a:extLst>
           </p:cNvPr>
@@ -3748,7 +3748,7 @@
           <p:cNvPr id="3" name="Text Placeholder 2">
             <a:extLst>
               <a:ext uri="{FF2B5EF4-FFF2-40B4-BE49-F238E27FC236}">
-                <a16:creationId xmlns:a16="http://schemas.microsoft.com/office/drawing/2014/main" xmlns="" id="{E9329458-CFA5-4FC5-83BF-8DEED1663F67}"/>
+                <a16:creationId xmlns="" xmlns:a16="http://schemas.microsoft.com/office/drawing/2014/main" id="{E9329458-CFA5-4FC5-83BF-8DEED1663F67}"/>
               </a:ext>
             </a:extLst>
           </p:cNvPr>
@@ -3819,7 +3819,7 @@
           <p:cNvPr id="4" name="Content Placeholder 3">
             <a:extLst>
               <a:ext uri="{FF2B5EF4-FFF2-40B4-BE49-F238E27FC236}">
-                <a16:creationId xmlns:a16="http://schemas.microsoft.com/office/drawing/2014/main" xmlns="" id="{00973E35-5790-4541-A9E9-6EAD8746298F}"/>
+                <a16:creationId xmlns="" xmlns:a16="http://schemas.microsoft.com/office/drawing/2014/main" id="{00973E35-5790-4541-A9E9-6EAD8746298F}"/>
               </a:ext>
             </a:extLst>
           </p:cNvPr>
@@ -3882,7 +3882,7 @@
           <p:cNvPr id="5" name="Text Placeholder 4">
             <a:extLst>
               <a:ext uri="{FF2B5EF4-FFF2-40B4-BE49-F238E27FC236}">
-                <a16:creationId xmlns:a16="http://schemas.microsoft.com/office/drawing/2014/main" xmlns="" id="{A79D0B04-D124-4DE1-8DDA-4298E11D9543}"/>
+                <a16:creationId xmlns="" xmlns:a16="http://schemas.microsoft.com/office/drawing/2014/main" id="{A79D0B04-D124-4DE1-8DDA-4298E11D9543}"/>
               </a:ext>
             </a:extLst>
           </p:cNvPr>
@@ -3953,7 +3953,7 @@
           <p:cNvPr id="6" name="Content Placeholder 5">
             <a:extLst>
               <a:ext uri="{FF2B5EF4-FFF2-40B4-BE49-F238E27FC236}">
-                <a16:creationId xmlns:a16="http://schemas.microsoft.com/office/drawing/2014/main" xmlns="" id="{B6A6F19A-1257-47E9-B4A0-44A2F7E94FF1}"/>
+                <a16:creationId xmlns="" xmlns:a16="http://schemas.microsoft.com/office/drawing/2014/main" id="{B6A6F19A-1257-47E9-B4A0-44A2F7E94FF1}"/>
               </a:ext>
             </a:extLst>
           </p:cNvPr>
@@ -4016,7 +4016,7 @@
           <p:cNvPr id="7" name="Date Placeholder 6">
             <a:extLst>
               <a:ext uri="{FF2B5EF4-FFF2-40B4-BE49-F238E27FC236}">
-                <a16:creationId xmlns:a16="http://schemas.microsoft.com/office/drawing/2014/main" xmlns="" id="{72AE3A17-5374-467D-86C2-C645B787C384}"/>
+                <a16:creationId xmlns="" xmlns:a16="http://schemas.microsoft.com/office/drawing/2014/main" id="{72AE3A17-5374-467D-86C2-C645B787C384}"/>
               </a:ext>
             </a:extLst>
           </p:cNvPr>
@@ -4034,7 +4034,7 @@
           <a:p>
             <a:fld id="{AEC09C50-853A-420B-8C26-7439C86401C0}" type="datetimeFigureOut">
               <a:rPr lang="en-GB" smtClean="0"/>
-              <a:t>2018-03-15</a:t>
+              <a:t>2018-04-10</a:t>
             </a:fld>
             <a:endParaRPr lang="en-GB"/>
           </a:p>
@@ -4045,7 +4045,7 @@
           <p:cNvPr id="8" name="Footer Placeholder 7">
             <a:extLst>
               <a:ext uri="{FF2B5EF4-FFF2-40B4-BE49-F238E27FC236}">
-                <a16:creationId xmlns:a16="http://schemas.microsoft.com/office/drawing/2014/main" xmlns="" id="{5283F0D5-8638-49FD-89DB-01F6EE922328}"/>
+                <a16:creationId xmlns="" xmlns:a16="http://schemas.microsoft.com/office/drawing/2014/main" id="{5283F0D5-8638-49FD-89DB-01F6EE922328}"/>
               </a:ext>
             </a:extLst>
           </p:cNvPr>
@@ -4070,7 +4070,7 @@
           <p:cNvPr id="9" name="Slide Number Placeholder 8">
             <a:extLst>
               <a:ext uri="{FF2B5EF4-FFF2-40B4-BE49-F238E27FC236}">
-                <a16:creationId xmlns:a16="http://schemas.microsoft.com/office/drawing/2014/main" xmlns="" id="{C0267428-4293-4A71-9B75-D565941979E2}"/>
+                <a16:creationId xmlns="" xmlns:a16="http://schemas.microsoft.com/office/drawing/2014/main" id="{C0267428-4293-4A71-9B75-D565941979E2}"/>
               </a:ext>
             </a:extLst>
           </p:cNvPr>
@@ -4129,7 +4129,7 @@
           <p:cNvPr id="2" name="Title 1">
             <a:extLst>
               <a:ext uri="{FF2B5EF4-FFF2-40B4-BE49-F238E27FC236}">
-                <a16:creationId xmlns:a16="http://schemas.microsoft.com/office/drawing/2014/main" xmlns="" id="{83526E88-76D3-4410-8E61-DDEF66B15330}"/>
+                <a16:creationId xmlns="" xmlns:a16="http://schemas.microsoft.com/office/drawing/2014/main" id="{83526E88-76D3-4410-8E61-DDEF66B15330}"/>
               </a:ext>
             </a:extLst>
           </p:cNvPr>
@@ -4158,7 +4158,7 @@
           <p:cNvPr id="3" name="Date Placeholder 2">
             <a:extLst>
               <a:ext uri="{FF2B5EF4-FFF2-40B4-BE49-F238E27FC236}">
-                <a16:creationId xmlns:a16="http://schemas.microsoft.com/office/drawing/2014/main" xmlns="" id="{EB4D1369-8B85-4E73-89D6-76C188B98E13}"/>
+                <a16:creationId xmlns="" xmlns:a16="http://schemas.microsoft.com/office/drawing/2014/main" id="{EB4D1369-8B85-4E73-89D6-76C188B98E13}"/>
               </a:ext>
             </a:extLst>
           </p:cNvPr>
@@ -4176,7 +4176,7 @@
           <a:p>
             <a:fld id="{AEC09C50-853A-420B-8C26-7439C86401C0}" type="datetimeFigureOut">
               <a:rPr lang="en-GB" smtClean="0"/>
-              <a:t>2018-03-15</a:t>
+              <a:t>2018-04-10</a:t>
             </a:fld>
             <a:endParaRPr lang="en-GB"/>
           </a:p>
@@ -4187,7 +4187,7 @@
           <p:cNvPr id="4" name="Footer Placeholder 3">
             <a:extLst>
               <a:ext uri="{FF2B5EF4-FFF2-40B4-BE49-F238E27FC236}">
-                <a16:creationId xmlns:a16="http://schemas.microsoft.com/office/drawing/2014/main" xmlns="" id="{489D4C4A-EE05-4344-A36C-6C671EE5E049}"/>
+                <a16:creationId xmlns="" xmlns:a16="http://schemas.microsoft.com/office/drawing/2014/main" id="{489D4C4A-EE05-4344-A36C-6C671EE5E049}"/>
               </a:ext>
             </a:extLst>
           </p:cNvPr>
@@ -4212,7 +4212,7 @@
           <p:cNvPr id="5" name="Slide Number Placeholder 4">
             <a:extLst>
               <a:ext uri="{FF2B5EF4-FFF2-40B4-BE49-F238E27FC236}">
-                <a16:creationId xmlns:a16="http://schemas.microsoft.com/office/drawing/2014/main" xmlns="" id="{DD1109B2-CB6D-4218-9B3E-14BAEEE90F3E}"/>
+                <a16:creationId xmlns="" xmlns:a16="http://schemas.microsoft.com/office/drawing/2014/main" id="{DD1109B2-CB6D-4218-9B3E-14BAEEE90F3E}"/>
               </a:ext>
             </a:extLst>
           </p:cNvPr>
@@ -4271,7 +4271,7 @@
           <p:cNvPr id="2" name="Date Placeholder 1">
             <a:extLst>
               <a:ext uri="{FF2B5EF4-FFF2-40B4-BE49-F238E27FC236}">
-                <a16:creationId xmlns:a16="http://schemas.microsoft.com/office/drawing/2014/main" xmlns="" id="{F2235B87-6899-48A6-999A-BC97C2BBB929}"/>
+                <a16:creationId xmlns="" xmlns:a16="http://schemas.microsoft.com/office/drawing/2014/main" id="{F2235B87-6899-48A6-999A-BC97C2BBB929}"/>
               </a:ext>
             </a:extLst>
           </p:cNvPr>
@@ -4289,7 +4289,7 @@
           <a:p>
             <a:fld id="{AEC09C50-853A-420B-8C26-7439C86401C0}" type="datetimeFigureOut">
               <a:rPr lang="en-GB" smtClean="0"/>
-              <a:t>2018-03-15</a:t>
+              <a:t>2018-04-10</a:t>
             </a:fld>
             <a:endParaRPr lang="en-GB"/>
           </a:p>
@@ -4300,7 +4300,7 @@
           <p:cNvPr id="3" name="Footer Placeholder 2">
             <a:extLst>
               <a:ext uri="{FF2B5EF4-FFF2-40B4-BE49-F238E27FC236}">
-                <a16:creationId xmlns:a16="http://schemas.microsoft.com/office/drawing/2014/main" xmlns="" id="{C8769E30-B6BB-4F0A-B22F-C95BF219412D}"/>
+                <a16:creationId xmlns="" xmlns:a16="http://schemas.microsoft.com/office/drawing/2014/main" id="{C8769E30-B6BB-4F0A-B22F-C95BF219412D}"/>
               </a:ext>
             </a:extLst>
           </p:cNvPr>
@@ -4325,7 +4325,7 @@
           <p:cNvPr id="4" name="Slide Number Placeholder 3">
             <a:extLst>
               <a:ext uri="{FF2B5EF4-FFF2-40B4-BE49-F238E27FC236}">
-                <a16:creationId xmlns:a16="http://schemas.microsoft.com/office/drawing/2014/main" xmlns="" id="{BC7650B4-2968-4449-A4B1-2C77F10005BB}"/>
+                <a16:creationId xmlns="" xmlns:a16="http://schemas.microsoft.com/office/drawing/2014/main" id="{BC7650B4-2968-4449-A4B1-2C77F10005BB}"/>
               </a:ext>
             </a:extLst>
           </p:cNvPr>
@@ -4384,7 +4384,7 @@
           <p:cNvPr id="2" name="Title 1">
             <a:extLst>
               <a:ext uri="{FF2B5EF4-FFF2-40B4-BE49-F238E27FC236}">
-                <a16:creationId xmlns:a16="http://schemas.microsoft.com/office/drawing/2014/main" xmlns="" id="{8E1ECCE6-D223-4A9C-AE1D-E9A2DFF0FC8E}"/>
+                <a16:creationId xmlns="" xmlns:a16="http://schemas.microsoft.com/office/drawing/2014/main" id="{8E1ECCE6-D223-4A9C-AE1D-E9A2DFF0FC8E}"/>
               </a:ext>
             </a:extLst>
           </p:cNvPr>
@@ -4422,7 +4422,7 @@
           <p:cNvPr id="3" name="Content Placeholder 2">
             <a:extLst>
               <a:ext uri="{FF2B5EF4-FFF2-40B4-BE49-F238E27FC236}">
-                <a16:creationId xmlns:a16="http://schemas.microsoft.com/office/drawing/2014/main" xmlns="" id="{B82EC1F7-6D9E-4A6E-83FA-3A28DA42147B}"/>
+                <a16:creationId xmlns="" xmlns:a16="http://schemas.microsoft.com/office/drawing/2014/main" id="{B82EC1F7-6D9E-4A6E-83FA-3A28DA42147B}"/>
               </a:ext>
             </a:extLst>
           </p:cNvPr>
@@ -4513,7 +4513,7 @@
           <p:cNvPr id="4" name="Text Placeholder 3">
             <a:extLst>
               <a:ext uri="{FF2B5EF4-FFF2-40B4-BE49-F238E27FC236}">
-                <a16:creationId xmlns:a16="http://schemas.microsoft.com/office/drawing/2014/main" xmlns="" id="{AF898F10-245A-48D3-9CBC-6CC749D412AA}"/>
+                <a16:creationId xmlns="" xmlns:a16="http://schemas.microsoft.com/office/drawing/2014/main" id="{AF898F10-245A-48D3-9CBC-6CC749D412AA}"/>
               </a:ext>
             </a:extLst>
           </p:cNvPr>
@@ -4584,7 +4584,7 @@
           <p:cNvPr id="5" name="Date Placeholder 4">
             <a:extLst>
               <a:ext uri="{FF2B5EF4-FFF2-40B4-BE49-F238E27FC236}">
-                <a16:creationId xmlns:a16="http://schemas.microsoft.com/office/drawing/2014/main" xmlns="" id="{32036AB4-92DA-44C3-87E4-1649313632B1}"/>
+                <a16:creationId xmlns="" xmlns:a16="http://schemas.microsoft.com/office/drawing/2014/main" id="{32036AB4-92DA-44C3-87E4-1649313632B1}"/>
               </a:ext>
             </a:extLst>
           </p:cNvPr>
@@ -4602,7 +4602,7 @@
           <a:p>
             <a:fld id="{AEC09C50-853A-420B-8C26-7439C86401C0}" type="datetimeFigureOut">
               <a:rPr lang="en-GB" smtClean="0"/>
-              <a:t>2018-03-15</a:t>
+              <a:t>2018-04-10</a:t>
             </a:fld>
             <a:endParaRPr lang="en-GB"/>
           </a:p>
@@ -4613,7 +4613,7 @@
           <p:cNvPr id="6" name="Footer Placeholder 5">
             <a:extLst>
               <a:ext uri="{FF2B5EF4-FFF2-40B4-BE49-F238E27FC236}">
-                <a16:creationId xmlns:a16="http://schemas.microsoft.com/office/drawing/2014/main" xmlns="" id="{1337DAE8-487C-4D6E-803D-F8F4FA67CA44}"/>
+                <a16:creationId xmlns="" xmlns:a16="http://schemas.microsoft.com/office/drawing/2014/main" id="{1337DAE8-487C-4D6E-803D-F8F4FA67CA44}"/>
               </a:ext>
             </a:extLst>
           </p:cNvPr>
@@ -4638,7 +4638,7 @@
           <p:cNvPr id="7" name="Slide Number Placeholder 6">
             <a:extLst>
               <a:ext uri="{FF2B5EF4-FFF2-40B4-BE49-F238E27FC236}">
-                <a16:creationId xmlns:a16="http://schemas.microsoft.com/office/drawing/2014/main" xmlns="" id="{CC449275-2FF4-4C64-ABAB-142D3BF60EAE}"/>
+                <a16:creationId xmlns="" xmlns:a16="http://schemas.microsoft.com/office/drawing/2014/main" id="{CC449275-2FF4-4C64-ABAB-142D3BF60EAE}"/>
               </a:ext>
             </a:extLst>
           </p:cNvPr>
@@ -4697,7 +4697,7 @@
           <p:cNvPr id="2" name="Title 1">
             <a:extLst>
               <a:ext uri="{FF2B5EF4-FFF2-40B4-BE49-F238E27FC236}">
-                <a16:creationId xmlns:a16="http://schemas.microsoft.com/office/drawing/2014/main" xmlns="" id="{D071AB62-177C-4054-8052-BBE8490E7381}"/>
+                <a16:creationId xmlns="" xmlns:a16="http://schemas.microsoft.com/office/drawing/2014/main" id="{D071AB62-177C-4054-8052-BBE8490E7381}"/>
               </a:ext>
             </a:extLst>
           </p:cNvPr>
@@ -4735,7 +4735,7 @@
           <p:cNvPr id="3" name="Picture Placeholder 2">
             <a:extLst>
               <a:ext uri="{FF2B5EF4-FFF2-40B4-BE49-F238E27FC236}">
-                <a16:creationId xmlns:a16="http://schemas.microsoft.com/office/drawing/2014/main" xmlns="" id="{A0D50678-0335-4865-AE73-1BCBF41E616A}"/>
+                <a16:creationId xmlns="" xmlns:a16="http://schemas.microsoft.com/office/drawing/2014/main" id="{A0D50678-0335-4865-AE73-1BCBF41E616A}"/>
               </a:ext>
             </a:extLst>
           </p:cNvPr>
@@ -4802,7 +4802,7 @@
           <p:cNvPr id="4" name="Text Placeholder 3">
             <a:extLst>
               <a:ext uri="{FF2B5EF4-FFF2-40B4-BE49-F238E27FC236}">
-                <a16:creationId xmlns:a16="http://schemas.microsoft.com/office/drawing/2014/main" xmlns="" id="{73ED4DA1-0F6A-4A5D-B369-9469EF35B96D}"/>
+                <a16:creationId xmlns="" xmlns:a16="http://schemas.microsoft.com/office/drawing/2014/main" id="{73ED4DA1-0F6A-4A5D-B369-9469EF35B96D}"/>
               </a:ext>
             </a:extLst>
           </p:cNvPr>
@@ -4873,7 +4873,7 @@
           <p:cNvPr id="5" name="Date Placeholder 4">
             <a:extLst>
               <a:ext uri="{FF2B5EF4-FFF2-40B4-BE49-F238E27FC236}">
-                <a16:creationId xmlns:a16="http://schemas.microsoft.com/office/drawing/2014/main" xmlns="" id="{092FC3AE-ADA3-4288-A99B-E5F02A2E42C8}"/>
+                <a16:creationId xmlns="" xmlns:a16="http://schemas.microsoft.com/office/drawing/2014/main" id="{092FC3AE-ADA3-4288-A99B-E5F02A2E42C8}"/>
               </a:ext>
             </a:extLst>
           </p:cNvPr>
@@ -4891,7 +4891,7 @@
           <a:p>
             <a:fld id="{AEC09C50-853A-420B-8C26-7439C86401C0}" type="datetimeFigureOut">
               <a:rPr lang="en-GB" smtClean="0"/>
-              <a:t>2018-03-15</a:t>
+              <a:t>2018-04-10</a:t>
             </a:fld>
             <a:endParaRPr lang="en-GB"/>
           </a:p>
@@ -4902,7 +4902,7 @@
           <p:cNvPr id="6" name="Footer Placeholder 5">
             <a:extLst>
               <a:ext uri="{FF2B5EF4-FFF2-40B4-BE49-F238E27FC236}">
-                <a16:creationId xmlns:a16="http://schemas.microsoft.com/office/drawing/2014/main" xmlns="" id="{2893494B-FAB4-440E-AAEB-FFBDB092E663}"/>
+                <a16:creationId xmlns="" xmlns:a16="http://schemas.microsoft.com/office/drawing/2014/main" id="{2893494B-FAB4-440E-AAEB-FFBDB092E663}"/>
               </a:ext>
             </a:extLst>
           </p:cNvPr>
@@ -4927,7 +4927,7 @@
           <p:cNvPr id="7" name="Slide Number Placeholder 6">
             <a:extLst>
               <a:ext uri="{FF2B5EF4-FFF2-40B4-BE49-F238E27FC236}">
-                <a16:creationId xmlns:a16="http://schemas.microsoft.com/office/drawing/2014/main" xmlns="" id="{073F7F22-A5C8-498A-800E-37E463DFAE16}"/>
+                <a16:creationId xmlns="" xmlns:a16="http://schemas.microsoft.com/office/drawing/2014/main" id="{073F7F22-A5C8-498A-800E-37E463DFAE16}"/>
               </a:ext>
             </a:extLst>
           </p:cNvPr>
@@ -4991,7 +4991,7 @@
           <p:cNvPr id="2" name="Title Placeholder 1">
             <a:extLst>
               <a:ext uri="{FF2B5EF4-FFF2-40B4-BE49-F238E27FC236}">
-                <a16:creationId xmlns:a16="http://schemas.microsoft.com/office/drawing/2014/main" xmlns="" id="{F0BB2809-085E-4223-9992-2BB5FBC08E6E}"/>
+                <a16:creationId xmlns="" xmlns:a16="http://schemas.microsoft.com/office/drawing/2014/main" id="{F0BB2809-085E-4223-9992-2BB5FBC08E6E}"/>
               </a:ext>
             </a:extLst>
           </p:cNvPr>
@@ -5030,7 +5030,7 @@
           <p:cNvPr id="3" name="Text Placeholder 2">
             <a:extLst>
               <a:ext uri="{FF2B5EF4-FFF2-40B4-BE49-F238E27FC236}">
-                <a16:creationId xmlns:a16="http://schemas.microsoft.com/office/drawing/2014/main" xmlns="" id="{FEC23C1B-CC61-40EA-905D-95DABCC0D1B8}"/>
+                <a16:creationId xmlns="" xmlns:a16="http://schemas.microsoft.com/office/drawing/2014/main" id="{FEC23C1B-CC61-40EA-905D-95DABCC0D1B8}"/>
               </a:ext>
             </a:extLst>
           </p:cNvPr>
@@ -5098,7 +5098,7 @@
           <p:cNvPr id="4" name="Date Placeholder 3">
             <a:extLst>
               <a:ext uri="{FF2B5EF4-FFF2-40B4-BE49-F238E27FC236}">
-                <a16:creationId xmlns:a16="http://schemas.microsoft.com/office/drawing/2014/main" xmlns="" id="{129CB7B1-CB51-4ACA-B179-C824284E8378}"/>
+                <a16:creationId xmlns="" xmlns:a16="http://schemas.microsoft.com/office/drawing/2014/main" id="{129CB7B1-CB51-4ACA-B179-C824284E8378}"/>
               </a:ext>
             </a:extLst>
           </p:cNvPr>
@@ -5134,7 +5134,7 @@
           <a:p>
             <a:fld id="{AEC09C50-853A-420B-8C26-7439C86401C0}" type="datetimeFigureOut">
               <a:rPr lang="en-GB" smtClean="0"/>
-              <a:t>2018-03-15</a:t>
+              <a:t>2018-04-10</a:t>
             </a:fld>
             <a:endParaRPr lang="en-GB"/>
           </a:p>
@@ -5145,7 +5145,7 @@
           <p:cNvPr id="5" name="Footer Placeholder 4">
             <a:extLst>
               <a:ext uri="{FF2B5EF4-FFF2-40B4-BE49-F238E27FC236}">
-                <a16:creationId xmlns:a16="http://schemas.microsoft.com/office/drawing/2014/main" xmlns="" id="{06C0286E-4114-4920-A399-1E3F7F913343}"/>
+                <a16:creationId xmlns="" xmlns:a16="http://schemas.microsoft.com/office/drawing/2014/main" id="{06C0286E-4114-4920-A399-1E3F7F913343}"/>
               </a:ext>
             </a:extLst>
           </p:cNvPr>
@@ -5188,7 +5188,7 @@
           <p:cNvPr id="6" name="Slide Number Placeholder 5">
             <a:extLst>
               <a:ext uri="{FF2B5EF4-FFF2-40B4-BE49-F238E27FC236}">
-                <a16:creationId xmlns:a16="http://schemas.microsoft.com/office/drawing/2014/main" xmlns="" id="{496FAA64-61A7-4E2F-B9B4-DB069A6171DB}"/>
+                <a16:creationId xmlns="" xmlns:a16="http://schemas.microsoft.com/office/drawing/2014/main" id="{496FAA64-61A7-4E2F-B9B4-DB069A6171DB}"/>
               </a:ext>
             </a:extLst>
           </p:cNvPr>
@@ -5646,7 +5646,7 @@
           <p:cNvPr id="4" name="TextBox 3">
             <a:extLst>
               <a:ext uri="{FF2B5EF4-FFF2-40B4-BE49-F238E27FC236}">
-                <a16:creationId xmlns:a16="http://schemas.microsoft.com/office/drawing/2014/main" xmlns="" id="{E43AF4C5-CF5B-4E7E-B438-83CD70BE1265}"/>
+                <a16:creationId xmlns="" xmlns:a16="http://schemas.microsoft.com/office/drawing/2014/main" id="{E43AF4C5-CF5B-4E7E-B438-83CD70BE1265}"/>
               </a:ext>
             </a:extLst>
           </p:cNvPr>
@@ -5827,6 +5827,13 @@
   <p:clrMapOvr>
     <a:masterClrMapping/>
   </p:clrMapOvr>
+  <p:timing>
+    <p:tnLst>
+      <p:par>
+        <p:cTn id="1" dur="indefinite" restart="never" nodeType="tmRoot"/>
+      </p:par>
+    </p:tnLst>
+  </p:timing>
 </p:sld>
 </file>
 
@@ -5968,7 +5975,7 @@
           <p:cNvPr id="13" name="TextBox 12">
             <a:extLst>
               <a:ext uri="{FF2B5EF4-FFF2-40B4-BE49-F238E27FC236}">
-                <a16:creationId xmlns:a16="http://schemas.microsoft.com/office/drawing/2014/main" xmlns="" id="{E43AF4C5-CF5B-4E7E-B438-83CD70BE1265}"/>
+                <a16:creationId xmlns="" xmlns:a16="http://schemas.microsoft.com/office/drawing/2014/main" id="{E43AF4C5-CF5B-4E7E-B438-83CD70BE1265}"/>
               </a:ext>
             </a:extLst>
           </p:cNvPr>
@@ -7053,7 +7060,7 @@
           <p:cNvPr id="4" name="TextBox 3">
             <a:extLst>
               <a:ext uri="{FF2B5EF4-FFF2-40B4-BE49-F238E27FC236}">
-                <a16:creationId xmlns:a16="http://schemas.microsoft.com/office/drawing/2014/main" xmlns="" id="{438442CF-1B82-4A10-87A1-614331CA498E}"/>
+                <a16:creationId xmlns="" xmlns:a16="http://schemas.microsoft.com/office/drawing/2014/main" id="{438442CF-1B82-4A10-87A1-614331CA498E}"/>
               </a:ext>
             </a:extLst>
           </p:cNvPr>
@@ -7153,7 +7160,7 @@
           <p:cNvPr id="6" name="TextBox 5">
             <a:extLst>
               <a:ext uri="{FF2B5EF4-FFF2-40B4-BE49-F238E27FC236}">
-                <a16:creationId xmlns:a16="http://schemas.microsoft.com/office/drawing/2014/main" xmlns="" id="{438442CF-1B82-4A10-87A1-614331CA498E}"/>
+                <a16:creationId xmlns="" xmlns:a16="http://schemas.microsoft.com/office/drawing/2014/main" id="{438442CF-1B82-4A10-87A1-614331CA498E}"/>
               </a:ext>
             </a:extLst>
           </p:cNvPr>
@@ -7288,7 +7295,7 @@
           <p:cNvPr id="7" name="TextBox 6">
             <a:extLst>
               <a:ext uri="{FF2B5EF4-FFF2-40B4-BE49-F238E27FC236}">
-                <a16:creationId xmlns:a16="http://schemas.microsoft.com/office/drawing/2014/main" xmlns="" id="{438442CF-1B82-4A10-87A1-614331CA498E}"/>
+                <a16:creationId xmlns="" xmlns:a16="http://schemas.microsoft.com/office/drawing/2014/main" id="{438442CF-1B82-4A10-87A1-614331CA498E}"/>
               </a:ext>
             </a:extLst>
           </p:cNvPr>
@@ -7507,7 +7514,7 @@
           <p:cNvPr id="10" name="TextBox 9">
             <a:extLst>
               <a:ext uri="{FF2B5EF4-FFF2-40B4-BE49-F238E27FC236}">
-                <a16:creationId xmlns:a16="http://schemas.microsoft.com/office/drawing/2014/main" xmlns="" id="{438442CF-1B82-4A10-87A1-614331CA498E}"/>
+                <a16:creationId xmlns="" xmlns:a16="http://schemas.microsoft.com/office/drawing/2014/main" id="{438442CF-1B82-4A10-87A1-614331CA498E}"/>
               </a:ext>
             </a:extLst>
           </p:cNvPr>
@@ -7608,7 +7615,7 @@
           <p:cNvPr id="11" name="TextBox 10">
             <a:extLst>
               <a:ext uri="{FF2B5EF4-FFF2-40B4-BE49-F238E27FC236}">
-                <a16:creationId xmlns:a16="http://schemas.microsoft.com/office/drawing/2014/main" xmlns="" id="{438442CF-1B82-4A10-87A1-614331CA498E}"/>
+                <a16:creationId xmlns="" xmlns:a16="http://schemas.microsoft.com/office/drawing/2014/main" id="{438442CF-1B82-4A10-87A1-614331CA498E}"/>
               </a:ext>
             </a:extLst>
           </p:cNvPr>
@@ -7716,7 +7723,7 @@
           <p:cNvPr id="12" name="TextBox 11">
             <a:extLst>
               <a:ext uri="{FF2B5EF4-FFF2-40B4-BE49-F238E27FC236}">
-                <a16:creationId xmlns:a16="http://schemas.microsoft.com/office/drawing/2014/main" xmlns="" id="{438442CF-1B82-4A10-87A1-614331CA498E}"/>
+                <a16:creationId xmlns="" xmlns:a16="http://schemas.microsoft.com/office/drawing/2014/main" id="{438442CF-1B82-4A10-87A1-614331CA498E}"/>
               </a:ext>
             </a:extLst>
           </p:cNvPr>
@@ -7775,7 +7782,7 @@
           <p:cNvPr id="13" name="TextBox 12">
             <a:extLst>
               <a:ext uri="{FF2B5EF4-FFF2-40B4-BE49-F238E27FC236}">
-                <a16:creationId xmlns:a16="http://schemas.microsoft.com/office/drawing/2014/main" xmlns="" id="{E43AF4C5-CF5B-4E7E-B438-83CD70BE1265}"/>
+                <a16:creationId xmlns="" xmlns:a16="http://schemas.microsoft.com/office/drawing/2014/main" id="{E43AF4C5-CF5B-4E7E-B438-83CD70BE1265}"/>
               </a:ext>
             </a:extLst>
           </p:cNvPr>
@@ -8580,7 +8587,7 @@
           <p:cNvPr id="2" name="TextBox 1">
             <a:extLst>
               <a:ext uri="{FF2B5EF4-FFF2-40B4-BE49-F238E27FC236}">
-                <a16:creationId xmlns:a16="http://schemas.microsoft.com/office/drawing/2014/main" xmlns="" id="{E43AF4C5-CF5B-4E7E-B438-83CD70BE1265}"/>
+                <a16:creationId xmlns="" xmlns:a16="http://schemas.microsoft.com/office/drawing/2014/main" id="{E43AF4C5-CF5B-4E7E-B438-83CD70BE1265}"/>
               </a:ext>
             </a:extLst>
           </p:cNvPr>
@@ -8726,7 +8733,7 @@
           <p:cNvPr id="10" name="TextBox 9">
             <a:extLst>
               <a:ext uri="{FF2B5EF4-FFF2-40B4-BE49-F238E27FC236}">
-                <a16:creationId xmlns:a16="http://schemas.microsoft.com/office/drawing/2014/main" xmlns="" id="{438442CF-1B82-4A10-87A1-614331CA498E}"/>
+                <a16:creationId xmlns="" xmlns:a16="http://schemas.microsoft.com/office/drawing/2014/main" id="{438442CF-1B82-4A10-87A1-614331CA498E}"/>
               </a:ext>
             </a:extLst>
           </p:cNvPr>
@@ -10838,53 +10845,6 @@
       </p:grpSp>
       <p:sp>
         <p:nvSpPr>
-          <p:cNvPr id="5" name="TextBox 4"/>
-          <p:cNvSpPr txBox="1"/>
-          <p:nvPr/>
-        </p:nvSpPr>
-        <p:spPr>
-          <a:xfrm>
-            <a:off x="7834292" y="1138446"/>
-            <a:ext cx="3422608" cy="923330"/>
-          </a:xfrm>
-          <a:prstGeom prst="rect">
-            <a:avLst/>
-          </a:prstGeom>
-          <a:solidFill>
-            <a:schemeClr val="accent4">
-              <a:lumMod val="20000"/>
-              <a:lumOff val="80000"/>
-            </a:schemeClr>
-          </a:solidFill>
-        </p:spPr>
-        <p:txBody>
-          <a:bodyPr wrap="square" rtlCol="0">
-            <a:spAutoFit/>
-          </a:bodyPr>
-          <a:lstStyle/>
-          <a:p>
-            <a:r>
-              <a:rPr lang="en-GB" b="1" dirty="0" smtClean="0"/>
-              <a:t>PHRED Scores </a:t>
-            </a:r>
-            <a:r>
-              <a:rPr lang="en-GB" dirty="0" smtClean="0"/>
-              <a:t>can be intuitively thought of as directly representing various </a:t>
-            </a:r>
-            <a:r>
-              <a:rPr lang="en-GB" b="1" dirty="0" smtClean="0"/>
-              <a:t>Error Rates</a:t>
-            </a:r>
-            <a:r>
-              <a:rPr lang="en-GB" dirty="0" smtClean="0"/>
-              <a:t>.</a:t>
-            </a:r>
-            <a:endParaRPr lang="en-GB" dirty="0"/>
-          </a:p>
-        </p:txBody>
-      </p:sp>
-      <p:sp>
-        <p:nvSpPr>
           <p:cNvPr id="21" name="TextBox 20"/>
           <p:cNvSpPr txBox="1"/>
           <p:nvPr/>
@@ -11187,7 +11147,7 @@
           <p:cNvPr id="20" name="TextBox 19">
             <a:extLst>
               <a:ext uri="{FF2B5EF4-FFF2-40B4-BE49-F238E27FC236}">
-                <a16:creationId xmlns:a16="http://schemas.microsoft.com/office/drawing/2014/main" xmlns="" id="{E43AF4C5-CF5B-4E7E-B438-83CD70BE1265}"/>
+                <a16:creationId xmlns="" xmlns:a16="http://schemas.microsoft.com/office/drawing/2014/main" id="{E43AF4C5-CF5B-4E7E-B438-83CD70BE1265}"/>
               </a:ext>
             </a:extLst>
           </p:cNvPr>
@@ -11373,6 +11333,53 @@
           <a:p>
             <a:pPr algn="ctr"/>
             <a:endParaRPr lang="en-GB"/>
+          </a:p>
+        </p:txBody>
+      </p:sp>
+      <p:sp>
+        <p:nvSpPr>
+          <p:cNvPr id="19" name="TextBox 18"/>
+          <p:cNvSpPr txBox="1"/>
+          <p:nvPr/>
+        </p:nvSpPr>
+        <p:spPr>
+          <a:xfrm>
+            <a:off x="7834292" y="1138446"/>
+            <a:ext cx="3422608" cy="923330"/>
+          </a:xfrm>
+          <a:prstGeom prst="rect">
+            <a:avLst/>
+          </a:prstGeom>
+          <a:solidFill>
+            <a:schemeClr val="accent4">
+              <a:lumMod val="20000"/>
+              <a:lumOff val="80000"/>
+            </a:schemeClr>
+          </a:solidFill>
+        </p:spPr>
+        <p:txBody>
+          <a:bodyPr wrap="square" rtlCol="0">
+            <a:spAutoFit/>
+          </a:bodyPr>
+          <a:lstStyle/>
+          <a:p>
+            <a:r>
+              <a:rPr lang="en-GB" b="1" dirty="0" smtClean="0"/>
+              <a:t>PHRED Scores </a:t>
+            </a:r>
+            <a:r>
+              <a:rPr lang="en-GB" dirty="0" smtClean="0"/>
+              <a:t>can be intuitively thought of as directly representing various </a:t>
+            </a:r>
+            <a:r>
+              <a:rPr lang="en-GB" b="1" dirty="0" smtClean="0"/>
+              <a:t>Error Rates</a:t>
+            </a:r>
+            <a:r>
+              <a:rPr lang="en-GB" dirty="0" smtClean="0"/>
+              <a:t>.</a:t>
+            </a:r>
+            <a:endParaRPr lang="en-GB" dirty="0"/>
           </a:p>
         </p:txBody>
       </p:sp>
@@ -11445,45 +11452,14 @@
                                 </p:cTn>
                               </p:par>
                               <p:par>
-                                <p:cTn id="8" presetID="9" presetClass="emph" presetSubtype="0" grpId="0" nodeType="withEffect">
-                                  <p:stCondLst>
-                                    <p:cond delay="0"/>
-                                  </p:stCondLst>
-                                  <p:childTnLst>
-                                    <p:set>
-                                      <p:cBhvr rctx="PPT">
-                                        <p:cTn id="9" dur="indefinite"/>
-                                        <p:tgtEl>
-                                          <p:spTgt spid="5"/>
-                                        </p:tgtEl>
-                                        <p:attrNameLst>
-                                          <p:attrName>style.opacity</p:attrName>
-                                        </p:attrNameLst>
-                                      </p:cBhvr>
-                                      <p:to>
-                                        <p:strVal val="0.25"/>
-                                      </p:to>
-                                    </p:set>
-                                    <p:animEffect filter="image" prLst="opacity: 0.25">
-                                      <p:cBhvr rctx="IE">
-                                        <p:cTn id="10" dur="indefinite"/>
-                                        <p:tgtEl>
-                                          <p:spTgt spid="5"/>
-                                        </p:tgtEl>
-                                      </p:cBhvr>
-                                    </p:animEffect>
-                                  </p:childTnLst>
-                                </p:cTn>
-                              </p:par>
-                              <p:par>
-                                <p:cTn id="11" presetID="22" presetClass="entr" presetSubtype="4" fill="hold" grpId="0" nodeType="withEffect">
+                                <p:cTn id="8" presetID="22" presetClass="entr" presetSubtype="4" fill="hold" grpId="0" nodeType="withEffect">
                                   <p:stCondLst>
                                     <p:cond delay="0"/>
                                   </p:stCondLst>
                                   <p:childTnLst>
                                     <p:set>
                                       <p:cBhvr>
-                                        <p:cTn id="12" dur="1" fill="hold">
+                                        <p:cTn id="9" dur="1" fill="hold">
                                           <p:stCondLst>
                                             <p:cond delay="0"/>
                                           </p:stCondLst>
@@ -11501,7 +11477,7 @@
                                     </p:set>
                                     <p:animEffect transition="in" filter="wipe(down)">
                                       <p:cBhvr>
-                                        <p:cTn id="13" dur="2000"/>
+                                        <p:cTn id="10" dur="2000"/>
                                         <p:tgtEl>
                                           <p:spTgt spid="26"/>
                                         </p:tgtEl>
@@ -11517,26 +11493,26 @@
                     </p:cTn>
                   </p:par>
                   <p:par>
-                    <p:cTn id="14" fill="hold">
+                    <p:cTn id="11" fill="hold">
                       <p:stCondLst>
                         <p:cond delay="indefinite"/>
                       </p:stCondLst>
                       <p:childTnLst>
                         <p:par>
-                          <p:cTn id="15" fill="hold">
+                          <p:cTn id="12" fill="hold">
                             <p:stCondLst>
                               <p:cond delay="0"/>
                             </p:stCondLst>
                             <p:childTnLst>
                               <p:par>
-                                <p:cTn id="16" presetID="22" presetClass="entr" presetSubtype="8" fill="hold" grpId="0" nodeType="clickEffect">
+                                <p:cTn id="13" presetID="22" presetClass="entr" presetSubtype="8" fill="hold" grpId="0" nodeType="clickEffect">
                                   <p:stCondLst>
                                     <p:cond delay="0"/>
                                   </p:stCondLst>
                                   <p:childTnLst>
                                     <p:set>
                                       <p:cBhvr>
-                                        <p:cTn id="17" dur="1" fill="hold">
+                                        <p:cTn id="14" dur="1" fill="hold">
                                           <p:stCondLst>
                                             <p:cond delay="0"/>
                                           </p:stCondLst>
@@ -11554,7 +11530,7 @@
                                     </p:set>
                                     <p:animEffect transition="in" filter="wipe(left)">
                                       <p:cBhvr>
-                                        <p:cTn id="18" dur="2000"/>
+                                        <p:cTn id="15" dur="2000"/>
                                         <p:tgtEl>
                                           <p:spTgt spid="23"/>
                                         </p:tgtEl>
@@ -11564,14 +11540,14 @@
                                 </p:cTn>
                               </p:par>
                               <p:par>
-                                <p:cTn id="19" presetID="9" presetClass="emph" presetSubtype="0" grpId="1" nodeType="withEffect">
+                                <p:cTn id="16" presetID="9" presetClass="emph" presetSubtype="0" grpId="1" nodeType="withEffect">
                                   <p:stCondLst>
                                     <p:cond delay="0"/>
                                   </p:stCondLst>
                                   <p:childTnLst>
                                     <p:set>
                                       <p:cBhvr rctx="PPT">
-                                        <p:cTn id="20" dur="indefinite"/>
+                                        <p:cTn id="17" dur="indefinite"/>
                                         <p:tgtEl>
                                           <p:spTgt spid="21"/>
                                         </p:tgtEl>
@@ -11585,7 +11561,7 @@
                                     </p:set>
                                     <p:animEffect filter="image" prLst="opacity: 0.25">
                                       <p:cBhvr rctx="IE">
-                                        <p:cTn id="21" dur="indefinite"/>
+                                        <p:cTn id="18" dur="indefinite"/>
                                         <p:tgtEl>
                                           <p:spTgt spid="21"/>
                                         </p:tgtEl>
@@ -11595,14 +11571,14 @@
                                 </p:cTn>
                               </p:par>
                               <p:par>
-                                <p:cTn id="22" presetID="22" presetClass="entr" presetSubtype="1" fill="hold" grpId="0" nodeType="withEffect">
+                                <p:cTn id="19" presetID="22" presetClass="entr" presetSubtype="1" fill="hold" grpId="0" nodeType="withEffect">
                                   <p:stCondLst>
                                     <p:cond delay="0"/>
                                   </p:stCondLst>
                                   <p:childTnLst>
                                     <p:set>
                                       <p:cBhvr>
-                                        <p:cTn id="23" dur="1" fill="hold">
+                                        <p:cTn id="20" dur="1" fill="hold">
                                           <p:stCondLst>
                                             <p:cond delay="0"/>
                                           </p:stCondLst>
@@ -11620,7 +11596,7 @@
                                     </p:set>
                                     <p:animEffect transition="in" filter="wipe(up)">
                                       <p:cBhvr>
-                                        <p:cTn id="24" dur="2000"/>
+                                        <p:cTn id="21" dur="2000"/>
                                         <p:tgtEl>
                                           <p:spTgt spid="27"/>
                                         </p:tgtEl>
@@ -11636,26 +11612,26 @@
                     </p:cTn>
                   </p:par>
                   <p:par>
-                    <p:cTn id="25" fill="hold">
+                    <p:cTn id="22" fill="hold">
                       <p:stCondLst>
                         <p:cond delay="indefinite"/>
                       </p:stCondLst>
                       <p:childTnLst>
                         <p:par>
-                          <p:cTn id="26" fill="hold">
+                          <p:cTn id="23" fill="hold">
                             <p:stCondLst>
                               <p:cond delay="0"/>
                             </p:stCondLst>
                             <p:childTnLst>
                               <p:par>
-                                <p:cTn id="27" presetID="22" presetClass="entr" presetSubtype="8" fill="hold" grpId="0" nodeType="clickEffect">
+                                <p:cTn id="24" presetID="22" presetClass="entr" presetSubtype="8" fill="hold" grpId="0" nodeType="clickEffect">
                                   <p:stCondLst>
                                     <p:cond delay="0"/>
                                   </p:stCondLst>
                                   <p:childTnLst>
                                     <p:set>
                                       <p:cBhvr>
-                                        <p:cTn id="28" dur="1" fill="hold">
+                                        <p:cTn id="25" dur="1" fill="hold">
                                           <p:stCondLst>
                                             <p:cond delay="0"/>
                                           </p:stCondLst>
@@ -11673,7 +11649,7 @@
                                     </p:set>
                                     <p:animEffect transition="in" filter="wipe(left)">
                                       <p:cBhvr>
-                                        <p:cTn id="29" dur="2000"/>
+                                        <p:cTn id="26" dur="2000"/>
                                         <p:tgtEl>
                                           <p:spTgt spid="24"/>
                                         </p:tgtEl>
@@ -11683,14 +11659,14 @@
                                 </p:cTn>
                               </p:par>
                               <p:par>
-                                <p:cTn id="30" presetID="9" presetClass="emph" presetSubtype="0" grpId="1" nodeType="withEffect">
+                                <p:cTn id="27" presetID="9" presetClass="emph" presetSubtype="0" grpId="1" nodeType="withEffect">
                                   <p:stCondLst>
                                     <p:cond delay="0"/>
                                   </p:stCondLst>
                                   <p:childTnLst>
                                     <p:set>
                                       <p:cBhvr rctx="PPT">
-                                        <p:cTn id="31" dur="indefinite"/>
+                                        <p:cTn id="28" dur="indefinite"/>
                                         <p:tgtEl>
                                           <p:spTgt spid="23"/>
                                         </p:tgtEl>
@@ -11704,7 +11680,7 @@
                                     </p:set>
                                     <p:animEffect filter="image" prLst="opacity: 0.25">
                                       <p:cBhvr rctx="IE">
-                                        <p:cTn id="32" dur="indefinite"/>
+                                        <p:cTn id="29" dur="indefinite"/>
                                         <p:tgtEl>
                                           <p:spTgt spid="23"/>
                                         </p:tgtEl>
@@ -11714,14 +11690,14 @@
                                 </p:cTn>
                               </p:par>
                               <p:par>
-                                <p:cTn id="33" presetID="22" presetClass="entr" presetSubtype="8" fill="hold" grpId="0" nodeType="withEffect">
+                                <p:cTn id="30" presetID="22" presetClass="entr" presetSubtype="8" fill="hold" grpId="0" nodeType="withEffect">
                                   <p:stCondLst>
                                     <p:cond delay="0"/>
                                   </p:stCondLst>
                                   <p:childTnLst>
                                     <p:set>
                                       <p:cBhvr>
-                                        <p:cTn id="34" dur="1" fill="hold">
+                                        <p:cTn id="31" dur="1" fill="hold">
                                           <p:stCondLst>
                                             <p:cond delay="0"/>
                                           </p:stCondLst>
@@ -11739,9 +11715,40 @@
                                     </p:set>
                                     <p:animEffect transition="in" filter="wipe(left)">
                                       <p:cBhvr>
-                                        <p:cTn id="35" dur="2000"/>
+                                        <p:cTn id="32" dur="2000"/>
                                         <p:tgtEl>
                                           <p:spTgt spid="25"/>
+                                        </p:tgtEl>
+                                      </p:cBhvr>
+                                    </p:animEffect>
+                                  </p:childTnLst>
+                                </p:cTn>
+                              </p:par>
+                              <p:par>
+                                <p:cTn id="33" presetID="9" presetClass="emph" presetSubtype="0" grpId="0" nodeType="withEffect">
+                                  <p:stCondLst>
+                                    <p:cond delay="0"/>
+                                  </p:stCondLst>
+                                  <p:childTnLst>
+                                    <p:set>
+                                      <p:cBhvr rctx="PPT">
+                                        <p:cTn id="34" dur="indefinite"/>
+                                        <p:tgtEl>
+                                          <p:spTgt spid="19"/>
+                                        </p:tgtEl>
+                                        <p:attrNameLst>
+                                          <p:attrName>style.opacity</p:attrName>
+                                        </p:attrNameLst>
+                                      </p:cBhvr>
+                                      <p:to>
+                                        <p:strVal val="0.25"/>
+                                      </p:to>
+                                    </p:set>
+                                    <p:animEffect filter="image" prLst="opacity: 0.25">
+                                      <p:cBhvr rctx="IE">
+                                        <p:cTn id="35" dur="indefinite"/>
+                                        <p:tgtEl>
+                                          <p:spTgt spid="19"/>
                                         </p:tgtEl>
                                       </p:cBhvr>
                                     </p:animEffect>
@@ -11776,7 +11783,6 @@
       </p:par>
     </p:tnLst>
     <p:bldLst>
-      <p:bldP spid="5" grpId="0" animBg="1"/>
       <p:bldP spid="21" grpId="0" animBg="1"/>
       <p:bldP spid="21" grpId="1" animBg="1"/>
       <p:bldP spid="23" grpId="0" animBg="1"/>
@@ -11785,6 +11791,7 @@
       <p:bldP spid="26" grpId="0" animBg="1"/>
       <p:bldP spid="27" grpId="0" animBg="1"/>
       <p:bldP spid="25" grpId="0" animBg="1"/>
+      <p:bldP spid="19" grpId="0" animBg="1"/>
     </p:bldLst>
   </p:timing>
 </p:sld>
@@ -11812,7 +11819,7 @@
           <p:cNvPr id="2" name="TextBox 1">
             <a:extLst>
               <a:ext uri="{FF2B5EF4-FFF2-40B4-BE49-F238E27FC236}">
-                <a16:creationId xmlns:a16="http://schemas.microsoft.com/office/drawing/2014/main" xmlns="" id="{E43AF4C5-CF5B-4E7E-B438-83CD70BE1265}"/>
+                <a16:creationId xmlns="" xmlns:a16="http://schemas.microsoft.com/office/drawing/2014/main" id="{E43AF4C5-CF5B-4E7E-B438-83CD70BE1265}"/>
               </a:ext>
             </a:extLst>
           </p:cNvPr>
@@ -11986,7 +11993,7 @@
               <p:cNvPr id="8" name="TextBox 7">
                 <a:extLst>
                   <a:ext uri="{FF2B5EF4-FFF2-40B4-BE49-F238E27FC236}">
-                    <a16:creationId xmlns:a16="http://schemas.microsoft.com/office/drawing/2014/main" xmlns="" id="{EDB442F5-34D7-4300-BA18-4B5BC98BC3D4}"/>
+                    <a16:creationId xmlns="" xmlns:a16="http://schemas.microsoft.com/office/drawing/2014/main" id="{EDB442F5-34D7-4300-BA18-4B5BC98BC3D4}"/>
                   </a:ext>
                 </a:extLst>
               </p:cNvPr>
@@ -12032,7 +12039,7 @@
               <p:cNvPr id="9" name="TextBox 8">
                 <a:extLst>
                   <a:ext uri="{FF2B5EF4-FFF2-40B4-BE49-F238E27FC236}">
-                    <a16:creationId xmlns:a16="http://schemas.microsoft.com/office/drawing/2014/main" xmlns="" id="{1126D985-4D01-49AD-AAA0-F753E895E063}"/>
+                    <a16:creationId xmlns="" xmlns:a16="http://schemas.microsoft.com/office/drawing/2014/main" id="{1126D985-4D01-49AD-AAA0-F753E895E063}"/>
                   </a:ext>
                 </a:extLst>
               </p:cNvPr>
@@ -12078,7 +12085,7 @@
               <p:cNvPr id="10" name="TextBox 9">
                 <a:extLst>
                   <a:ext uri="{FF2B5EF4-FFF2-40B4-BE49-F238E27FC236}">
-                    <a16:creationId xmlns:a16="http://schemas.microsoft.com/office/drawing/2014/main" xmlns="" id="{2F327C8B-A760-45E6-AF3F-CC4F1AE1E652}"/>
+                    <a16:creationId xmlns="" xmlns:a16="http://schemas.microsoft.com/office/drawing/2014/main" id="{2F327C8B-A760-45E6-AF3F-CC4F1AE1E652}"/>
                   </a:ext>
                 </a:extLst>
               </p:cNvPr>
@@ -12124,7 +12131,7 @@
               <p:cNvPr id="11" name="TextBox 10">
                 <a:extLst>
                   <a:ext uri="{FF2B5EF4-FFF2-40B4-BE49-F238E27FC236}">
-                    <a16:creationId xmlns:a16="http://schemas.microsoft.com/office/drawing/2014/main" xmlns="" id="{839ACAD9-74C5-4CC6-8034-5AFF1C74CC80}"/>
+                    <a16:creationId xmlns="" xmlns:a16="http://schemas.microsoft.com/office/drawing/2014/main" id="{839ACAD9-74C5-4CC6-8034-5AFF1C74CC80}"/>
                   </a:ext>
                 </a:extLst>
               </p:cNvPr>
@@ -12168,7 +12175,7 @@
               <p:cNvPr id="12" name="TextBox 11">
                 <a:extLst>
                   <a:ext uri="{FF2B5EF4-FFF2-40B4-BE49-F238E27FC236}">
-                    <a16:creationId xmlns:a16="http://schemas.microsoft.com/office/drawing/2014/main" xmlns="" id="{222D7E88-8744-4298-AB65-66D1802C446A}"/>
+                    <a16:creationId xmlns="" xmlns:a16="http://schemas.microsoft.com/office/drawing/2014/main" id="{222D7E88-8744-4298-AB65-66D1802C446A}"/>
                   </a:ext>
                 </a:extLst>
               </p:cNvPr>
@@ -12212,7 +12219,7 @@
             <p:cNvPr id="5" name="Rectangle 2">
               <a:extLst>
                 <a:ext uri="{FF2B5EF4-FFF2-40B4-BE49-F238E27FC236}">
-                  <a16:creationId xmlns:a16="http://schemas.microsoft.com/office/drawing/2014/main" xmlns="" id="{525E0D96-8099-4601-80D1-0E4DF7CAD69B}"/>
+                  <a16:creationId xmlns="" xmlns:a16="http://schemas.microsoft.com/office/drawing/2014/main" id="{525E0D96-8099-4601-80D1-0E4DF7CAD69B}"/>
                 </a:ext>
               </a:extLst>
             </p:cNvPr>
@@ -12289,7 +12296,7 @@
             <p:cNvPr id="6" name="TextBox 5">
               <a:extLst>
                 <a:ext uri="{FF2B5EF4-FFF2-40B4-BE49-F238E27FC236}">
-                  <a16:creationId xmlns:a16="http://schemas.microsoft.com/office/drawing/2014/main" xmlns="" id="{0FD4CFE0-333E-4BDA-B155-05698DAD0B70}"/>
+                  <a16:creationId xmlns="" xmlns:a16="http://schemas.microsoft.com/office/drawing/2014/main" id="{0FD4CFE0-333E-4BDA-B155-05698DAD0B70}"/>
                 </a:ext>
               </a:extLst>
             </p:cNvPr>
@@ -12332,7 +12339,7 @@
             <p:cNvPr id="7" name="Rectangle 3">
               <a:extLst>
                 <a:ext uri="{FF2B5EF4-FFF2-40B4-BE49-F238E27FC236}">
-                  <a16:creationId xmlns:a16="http://schemas.microsoft.com/office/drawing/2014/main" xmlns="" id="{46ADB3CD-EA06-4C85-A4CE-E0A5AA5A8DFC}"/>
+                  <a16:creationId xmlns="" xmlns:a16="http://schemas.microsoft.com/office/drawing/2014/main" id="{46ADB3CD-EA06-4C85-A4CE-E0A5AA5A8DFC}"/>
                 </a:ext>
               </a:extLst>
             </p:cNvPr>
@@ -13653,7 +13660,7 @@
           <p:cNvPr id="2" name="TextBox 1">
             <a:extLst>
               <a:ext uri="{FF2B5EF4-FFF2-40B4-BE49-F238E27FC236}">
-                <a16:creationId xmlns:a16="http://schemas.microsoft.com/office/drawing/2014/main" xmlns="" id="{E43AF4C5-CF5B-4E7E-B438-83CD70BE1265}"/>
+                <a16:creationId xmlns="" xmlns:a16="http://schemas.microsoft.com/office/drawing/2014/main" id="{E43AF4C5-CF5B-4E7E-B438-83CD70BE1265}"/>
               </a:ext>
             </a:extLst>
           </p:cNvPr>
@@ -13827,7 +13834,7 @@
               <p:cNvPr id="8" name="TextBox 7">
                 <a:extLst>
                   <a:ext uri="{FF2B5EF4-FFF2-40B4-BE49-F238E27FC236}">
-                    <a16:creationId xmlns:a16="http://schemas.microsoft.com/office/drawing/2014/main" xmlns="" id="{EDB442F5-34D7-4300-BA18-4B5BC98BC3D4}"/>
+                    <a16:creationId xmlns="" xmlns:a16="http://schemas.microsoft.com/office/drawing/2014/main" id="{EDB442F5-34D7-4300-BA18-4B5BC98BC3D4}"/>
                   </a:ext>
                 </a:extLst>
               </p:cNvPr>
@@ -13873,7 +13880,7 @@
               <p:cNvPr id="9" name="TextBox 8">
                 <a:extLst>
                   <a:ext uri="{FF2B5EF4-FFF2-40B4-BE49-F238E27FC236}">
-                    <a16:creationId xmlns:a16="http://schemas.microsoft.com/office/drawing/2014/main" xmlns="" id="{1126D985-4D01-49AD-AAA0-F753E895E063}"/>
+                    <a16:creationId xmlns="" xmlns:a16="http://schemas.microsoft.com/office/drawing/2014/main" id="{1126D985-4D01-49AD-AAA0-F753E895E063}"/>
                   </a:ext>
                 </a:extLst>
               </p:cNvPr>
@@ -13919,7 +13926,7 @@
               <p:cNvPr id="10" name="TextBox 9">
                 <a:extLst>
                   <a:ext uri="{FF2B5EF4-FFF2-40B4-BE49-F238E27FC236}">
-                    <a16:creationId xmlns:a16="http://schemas.microsoft.com/office/drawing/2014/main" xmlns="" id="{2F327C8B-A760-45E6-AF3F-CC4F1AE1E652}"/>
+                    <a16:creationId xmlns="" xmlns:a16="http://schemas.microsoft.com/office/drawing/2014/main" id="{2F327C8B-A760-45E6-AF3F-CC4F1AE1E652}"/>
                   </a:ext>
                 </a:extLst>
               </p:cNvPr>
@@ -13965,7 +13972,7 @@
               <p:cNvPr id="11" name="TextBox 10">
                 <a:extLst>
                   <a:ext uri="{FF2B5EF4-FFF2-40B4-BE49-F238E27FC236}">
-                    <a16:creationId xmlns:a16="http://schemas.microsoft.com/office/drawing/2014/main" xmlns="" id="{839ACAD9-74C5-4CC6-8034-5AFF1C74CC80}"/>
+                    <a16:creationId xmlns="" xmlns:a16="http://schemas.microsoft.com/office/drawing/2014/main" id="{839ACAD9-74C5-4CC6-8034-5AFF1C74CC80}"/>
                   </a:ext>
                 </a:extLst>
               </p:cNvPr>
@@ -14009,7 +14016,7 @@
               <p:cNvPr id="12" name="TextBox 11">
                 <a:extLst>
                   <a:ext uri="{FF2B5EF4-FFF2-40B4-BE49-F238E27FC236}">
-                    <a16:creationId xmlns:a16="http://schemas.microsoft.com/office/drawing/2014/main" xmlns="" id="{222D7E88-8744-4298-AB65-66D1802C446A}"/>
+                    <a16:creationId xmlns="" xmlns:a16="http://schemas.microsoft.com/office/drawing/2014/main" id="{222D7E88-8744-4298-AB65-66D1802C446A}"/>
                   </a:ext>
                 </a:extLst>
               </p:cNvPr>
@@ -14053,7 +14060,7 @@
             <p:cNvPr id="5" name="Rectangle 2">
               <a:extLst>
                 <a:ext uri="{FF2B5EF4-FFF2-40B4-BE49-F238E27FC236}">
-                  <a16:creationId xmlns:a16="http://schemas.microsoft.com/office/drawing/2014/main" xmlns="" id="{525E0D96-8099-4601-80D1-0E4DF7CAD69B}"/>
+                  <a16:creationId xmlns="" xmlns:a16="http://schemas.microsoft.com/office/drawing/2014/main" id="{525E0D96-8099-4601-80D1-0E4DF7CAD69B}"/>
                 </a:ext>
               </a:extLst>
             </p:cNvPr>
@@ -14130,7 +14137,7 @@
             <p:cNvPr id="6" name="TextBox 5">
               <a:extLst>
                 <a:ext uri="{FF2B5EF4-FFF2-40B4-BE49-F238E27FC236}">
-                  <a16:creationId xmlns:a16="http://schemas.microsoft.com/office/drawing/2014/main" xmlns="" id="{0FD4CFE0-333E-4BDA-B155-05698DAD0B70}"/>
+                  <a16:creationId xmlns="" xmlns:a16="http://schemas.microsoft.com/office/drawing/2014/main" id="{0FD4CFE0-333E-4BDA-B155-05698DAD0B70}"/>
                 </a:ext>
               </a:extLst>
             </p:cNvPr>
@@ -14173,7 +14180,7 @@
             <p:cNvPr id="7" name="Rectangle 3">
               <a:extLst>
                 <a:ext uri="{FF2B5EF4-FFF2-40B4-BE49-F238E27FC236}">
-                  <a16:creationId xmlns:a16="http://schemas.microsoft.com/office/drawing/2014/main" xmlns="" id="{46ADB3CD-EA06-4C85-A4CE-E0A5AA5A8DFC}"/>
+                  <a16:creationId xmlns="" xmlns:a16="http://schemas.microsoft.com/office/drawing/2014/main" id="{46ADB3CD-EA06-4C85-A4CE-E0A5AA5A8DFC}"/>
                 </a:ext>
               </a:extLst>
             </p:cNvPr>
@@ -15006,7 +15013,7 @@
           <p:cNvPr id="4" name="TextBox 3">
             <a:extLst>
               <a:ext uri="{FF2B5EF4-FFF2-40B4-BE49-F238E27FC236}">
-                <a16:creationId xmlns:a16="http://schemas.microsoft.com/office/drawing/2014/main" xmlns="" id="{E43AF4C5-CF5B-4E7E-B438-83CD70BE1265}"/>
+                <a16:creationId xmlns="" xmlns:a16="http://schemas.microsoft.com/office/drawing/2014/main" id="{E43AF4C5-CF5B-4E7E-B438-83CD70BE1265}"/>
               </a:ext>
             </a:extLst>
           </p:cNvPr>
@@ -16531,7 +16538,7 @@
           <p:cNvPr id="2" name="TextBox 1">
             <a:extLst>
               <a:ext uri="{FF2B5EF4-FFF2-40B4-BE49-F238E27FC236}">
-                <a16:creationId xmlns:a16="http://schemas.microsoft.com/office/drawing/2014/main" xmlns="" id="{E43AF4C5-CF5B-4E7E-B438-83CD70BE1265}"/>
+                <a16:creationId xmlns="" xmlns:a16="http://schemas.microsoft.com/office/drawing/2014/main" id="{E43AF4C5-CF5B-4E7E-B438-83CD70BE1265}"/>
               </a:ext>
             </a:extLst>
           </p:cNvPr>
@@ -16705,7 +16712,7 @@
               <p:cNvPr id="9" name="TextBox 8">
                 <a:extLst>
                   <a:ext uri="{FF2B5EF4-FFF2-40B4-BE49-F238E27FC236}">
-                    <a16:creationId xmlns:a16="http://schemas.microsoft.com/office/drawing/2014/main" xmlns="" id="{EDB442F5-34D7-4300-BA18-4B5BC98BC3D4}"/>
+                    <a16:creationId xmlns="" xmlns:a16="http://schemas.microsoft.com/office/drawing/2014/main" id="{EDB442F5-34D7-4300-BA18-4B5BC98BC3D4}"/>
                   </a:ext>
                 </a:extLst>
               </p:cNvPr>
@@ -16751,7 +16758,7 @@
               <p:cNvPr id="10" name="TextBox 9">
                 <a:extLst>
                   <a:ext uri="{FF2B5EF4-FFF2-40B4-BE49-F238E27FC236}">
-                    <a16:creationId xmlns:a16="http://schemas.microsoft.com/office/drawing/2014/main" xmlns="" id="{1126D985-4D01-49AD-AAA0-F753E895E063}"/>
+                    <a16:creationId xmlns="" xmlns:a16="http://schemas.microsoft.com/office/drawing/2014/main" id="{1126D985-4D01-49AD-AAA0-F753E895E063}"/>
                   </a:ext>
                 </a:extLst>
               </p:cNvPr>
@@ -16797,7 +16804,7 @@
               <p:cNvPr id="11" name="TextBox 10">
                 <a:extLst>
                   <a:ext uri="{FF2B5EF4-FFF2-40B4-BE49-F238E27FC236}">
-                    <a16:creationId xmlns:a16="http://schemas.microsoft.com/office/drawing/2014/main" xmlns="" id="{2F327C8B-A760-45E6-AF3F-CC4F1AE1E652}"/>
+                    <a16:creationId xmlns="" xmlns:a16="http://schemas.microsoft.com/office/drawing/2014/main" id="{2F327C8B-A760-45E6-AF3F-CC4F1AE1E652}"/>
                   </a:ext>
                 </a:extLst>
               </p:cNvPr>
@@ -16843,7 +16850,7 @@
               <p:cNvPr id="12" name="TextBox 11">
                 <a:extLst>
                   <a:ext uri="{FF2B5EF4-FFF2-40B4-BE49-F238E27FC236}">
-                    <a16:creationId xmlns:a16="http://schemas.microsoft.com/office/drawing/2014/main" xmlns="" id="{839ACAD9-74C5-4CC6-8034-5AFF1C74CC80}"/>
+                    <a16:creationId xmlns="" xmlns:a16="http://schemas.microsoft.com/office/drawing/2014/main" id="{839ACAD9-74C5-4CC6-8034-5AFF1C74CC80}"/>
                   </a:ext>
                 </a:extLst>
               </p:cNvPr>
@@ -16887,7 +16894,7 @@
               <p:cNvPr id="13" name="TextBox 12">
                 <a:extLst>
                   <a:ext uri="{FF2B5EF4-FFF2-40B4-BE49-F238E27FC236}">
-                    <a16:creationId xmlns:a16="http://schemas.microsoft.com/office/drawing/2014/main" xmlns="" id="{222D7E88-8744-4298-AB65-66D1802C446A}"/>
+                    <a16:creationId xmlns="" xmlns:a16="http://schemas.microsoft.com/office/drawing/2014/main" id="{222D7E88-8744-4298-AB65-66D1802C446A}"/>
                   </a:ext>
                 </a:extLst>
               </p:cNvPr>
@@ -16931,7 +16938,7 @@
             <p:cNvPr id="6" name="Rectangle 2">
               <a:extLst>
                 <a:ext uri="{FF2B5EF4-FFF2-40B4-BE49-F238E27FC236}">
-                  <a16:creationId xmlns:a16="http://schemas.microsoft.com/office/drawing/2014/main" xmlns="" id="{525E0D96-8099-4601-80D1-0E4DF7CAD69B}"/>
+                  <a16:creationId xmlns="" xmlns:a16="http://schemas.microsoft.com/office/drawing/2014/main" id="{525E0D96-8099-4601-80D1-0E4DF7CAD69B}"/>
                 </a:ext>
               </a:extLst>
             </p:cNvPr>
@@ -17008,7 +17015,7 @@
             <p:cNvPr id="7" name="TextBox 6">
               <a:extLst>
                 <a:ext uri="{FF2B5EF4-FFF2-40B4-BE49-F238E27FC236}">
-                  <a16:creationId xmlns:a16="http://schemas.microsoft.com/office/drawing/2014/main" xmlns="" id="{0FD4CFE0-333E-4BDA-B155-05698DAD0B70}"/>
+                  <a16:creationId xmlns="" xmlns:a16="http://schemas.microsoft.com/office/drawing/2014/main" id="{0FD4CFE0-333E-4BDA-B155-05698DAD0B70}"/>
                 </a:ext>
               </a:extLst>
             </p:cNvPr>
@@ -17051,7 +17058,7 @@
             <p:cNvPr id="8" name="Rectangle 3">
               <a:extLst>
                 <a:ext uri="{FF2B5EF4-FFF2-40B4-BE49-F238E27FC236}">
-                  <a16:creationId xmlns:a16="http://schemas.microsoft.com/office/drawing/2014/main" xmlns="" id="{46ADB3CD-EA06-4C85-A4CE-E0A5AA5A8DFC}"/>
+                  <a16:creationId xmlns="" xmlns:a16="http://schemas.microsoft.com/office/drawing/2014/main" id="{46ADB3CD-EA06-4C85-A4CE-E0A5AA5A8DFC}"/>
                 </a:ext>
               </a:extLst>
             </p:cNvPr>
@@ -18513,7 +18520,7 @@
           <p:cNvPr id="2" name="TextBox 1">
             <a:extLst>
               <a:ext uri="{FF2B5EF4-FFF2-40B4-BE49-F238E27FC236}">
-                <a16:creationId xmlns:a16="http://schemas.microsoft.com/office/drawing/2014/main" xmlns="" id="{E43AF4C5-CF5B-4E7E-B438-83CD70BE1265}"/>
+                <a16:creationId xmlns="" xmlns:a16="http://schemas.microsoft.com/office/drawing/2014/main" id="{E43AF4C5-CF5B-4E7E-B438-83CD70BE1265}"/>
               </a:ext>
             </a:extLst>
           </p:cNvPr>
@@ -19384,7 +19391,7 @@
           <p:cNvPr id="4" name="TextBox 3">
             <a:extLst>
               <a:ext uri="{FF2B5EF4-FFF2-40B4-BE49-F238E27FC236}">
-                <a16:creationId xmlns:a16="http://schemas.microsoft.com/office/drawing/2014/main" xmlns="" id="{6F77B270-35F1-4A5B-875A-9BFD13BC898E}"/>
+                <a16:creationId xmlns="" xmlns:a16="http://schemas.microsoft.com/office/drawing/2014/main" id="{6F77B270-35F1-4A5B-875A-9BFD13BC898E}"/>
               </a:ext>
             </a:extLst>
           </p:cNvPr>
@@ -19439,7 +19446,7 @@
           <p:cNvPr id="2" name="TextBox 1">
             <a:extLst>
               <a:ext uri="{FF2B5EF4-FFF2-40B4-BE49-F238E27FC236}">
-                <a16:creationId xmlns:a16="http://schemas.microsoft.com/office/drawing/2014/main" xmlns="" id="{FF6CBC01-8361-49E5-9581-0C1FE9620EC9}"/>
+                <a16:creationId xmlns="" xmlns:a16="http://schemas.microsoft.com/office/drawing/2014/main" id="{FF6CBC01-8361-49E5-9581-0C1FE9620EC9}"/>
               </a:ext>
             </a:extLst>
           </p:cNvPr>
@@ -19485,7 +19492,7 @@
           <p:cNvPr id="7" name="TextBox 6">
             <a:extLst>
               <a:ext uri="{FF2B5EF4-FFF2-40B4-BE49-F238E27FC236}">
-                <a16:creationId xmlns:a16="http://schemas.microsoft.com/office/drawing/2014/main" xmlns="" id="{E1CD5414-A932-4E07-97C5-AA66923DCEC6}"/>
+                <a16:creationId xmlns="" xmlns:a16="http://schemas.microsoft.com/office/drawing/2014/main" id="{E1CD5414-A932-4E07-97C5-AA66923DCEC6}"/>
               </a:ext>
             </a:extLst>
           </p:cNvPr>
@@ -19531,7 +19538,7 @@
           <p:cNvPr id="12" name="TextBox 11">
             <a:extLst>
               <a:ext uri="{FF2B5EF4-FFF2-40B4-BE49-F238E27FC236}">
-                <a16:creationId xmlns:a16="http://schemas.microsoft.com/office/drawing/2014/main" xmlns="" id="{BAF1D114-340B-40A7-B896-B7E9FF2342D4}"/>
+                <a16:creationId xmlns="" xmlns:a16="http://schemas.microsoft.com/office/drawing/2014/main" id="{BAF1D114-340B-40A7-B896-B7E9FF2342D4}"/>
               </a:ext>
             </a:extLst>
           </p:cNvPr>
@@ -19577,7 +19584,7 @@
           <p:cNvPr id="13" name="TextBox 12">
             <a:extLst>
               <a:ext uri="{FF2B5EF4-FFF2-40B4-BE49-F238E27FC236}">
-                <a16:creationId xmlns:a16="http://schemas.microsoft.com/office/drawing/2014/main" xmlns="" id="{3774D6C2-F684-4C1B-9AF0-CB59B2D6F726}"/>
+                <a16:creationId xmlns="" xmlns:a16="http://schemas.microsoft.com/office/drawing/2014/main" id="{3774D6C2-F684-4C1B-9AF0-CB59B2D6F726}"/>
               </a:ext>
             </a:extLst>
           </p:cNvPr>
@@ -19621,7 +19628,7 @@
           <p:cNvPr id="11" name="Rectangle 2">
             <a:extLst>
               <a:ext uri="{FF2B5EF4-FFF2-40B4-BE49-F238E27FC236}">
-                <a16:creationId xmlns:a16="http://schemas.microsoft.com/office/drawing/2014/main" xmlns="" id="{944DD051-DEF9-4988-A138-45BC09BB4EE1}"/>
+                <a16:creationId xmlns="" xmlns:a16="http://schemas.microsoft.com/office/drawing/2014/main" id="{944DD051-DEF9-4988-A138-45BC09BB4EE1}"/>
               </a:ext>
             </a:extLst>
           </p:cNvPr>
@@ -19719,7 +19726,7 @@
           <p:cNvPr id="33" name="Group 32">
             <a:extLst>
               <a:ext uri="{FF2B5EF4-FFF2-40B4-BE49-F238E27FC236}">
-                <a16:creationId xmlns:a16="http://schemas.microsoft.com/office/drawing/2014/main" xmlns="" id="{ACAC77A1-F6A6-43B9-8C12-056B2BAF5231}"/>
+                <a16:creationId xmlns="" xmlns:a16="http://schemas.microsoft.com/office/drawing/2014/main" id="{ACAC77A1-F6A6-43B9-8C12-056B2BAF5231}"/>
               </a:ext>
             </a:extLst>
           </p:cNvPr>
@@ -19739,7 +19746,7 @@
             <p:cNvPr id="22" name="TextBox 21">
               <a:extLst>
                 <a:ext uri="{FF2B5EF4-FFF2-40B4-BE49-F238E27FC236}">
-                  <a16:creationId xmlns:a16="http://schemas.microsoft.com/office/drawing/2014/main" xmlns="" id="{A90B819B-B576-4062-9E37-50E6B3385861}"/>
+                  <a16:creationId xmlns="" xmlns:a16="http://schemas.microsoft.com/office/drawing/2014/main" id="{A90B819B-B576-4062-9E37-50E6B3385861}"/>
                 </a:ext>
               </a:extLst>
             </p:cNvPr>
@@ -19785,7 +19792,7 @@
             <p:cNvPr id="23" name="TextBox 22">
               <a:extLst>
                 <a:ext uri="{FF2B5EF4-FFF2-40B4-BE49-F238E27FC236}">
-                  <a16:creationId xmlns:a16="http://schemas.microsoft.com/office/drawing/2014/main" xmlns="" id="{38459C3C-DAD7-4A41-9BE2-61F7F5AA117D}"/>
+                  <a16:creationId xmlns="" xmlns:a16="http://schemas.microsoft.com/office/drawing/2014/main" id="{38459C3C-DAD7-4A41-9BE2-61F7F5AA117D}"/>
                 </a:ext>
               </a:extLst>
             </p:cNvPr>
@@ -19831,7 +19838,7 @@
             <p:cNvPr id="24" name="TextBox 23">
               <a:extLst>
                 <a:ext uri="{FF2B5EF4-FFF2-40B4-BE49-F238E27FC236}">
-                  <a16:creationId xmlns:a16="http://schemas.microsoft.com/office/drawing/2014/main" xmlns="" id="{D88A6B0A-C817-495A-9EE2-12393AE7B97D}"/>
+                  <a16:creationId xmlns="" xmlns:a16="http://schemas.microsoft.com/office/drawing/2014/main" id="{D88A6B0A-C817-495A-9EE2-12393AE7B97D}"/>
                 </a:ext>
               </a:extLst>
             </p:cNvPr>
@@ -19877,7 +19884,7 @@
             <p:cNvPr id="25" name="TextBox 24">
               <a:extLst>
                 <a:ext uri="{FF2B5EF4-FFF2-40B4-BE49-F238E27FC236}">
-                  <a16:creationId xmlns:a16="http://schemas.microsoft.com/office/drawing/2014/main" xmlns="" id="{A24FF243-4EE3-4C98-B632-7E7F7BC11E7F}"/>
+                  <a16:creationId xmlns="" xmlns:a16="http://schemas.microsoft.com/office/drawing/2014/main" id="{A24FF243-4EE3-4C98-B632-7E7F7BC11E7F}"/>
                 </a:ext>
               </a:extLst>
             </p:cNvPr>
@@ -19921,7 +19928,7 @@
             <p:cNvPr id="26" name="Rectangle 2">
               <a:extLst>
                 <a:ext uri="{FF2B5EF4-FFF2-40B4-BE49-F238E27FC236}">
-                  <a16:creationId xmlns:a16="http://schemas.microsoft.com/office/drawing/2014/main" xmlns="" id="{BA4FE94C-D898-4962-8131-E4888B1FB3FD}"/>
+                  <a16:creationId xmlns="" xmlns:a16="http://schemas.microsoft.com/office/drawing/2014/main" id="{BA4FE94C-D898-4962-8131-E4888B1FB3FD}"/>
                 </a:ext>
               </a:extLst>
             </p:cNvPr>
@@ -20009,7 +20016,7 @@
           <p:cNvPr id="44" name="Group 43">
             <a:extLst>
               <a:ext uri="{FF2B5EF4-FFF2-40B4-BE49-F238E27FC236}">
-                <a16:creationId xmlns:a16="http://schemas.microsoft.com/office/drawing/2014/main" xmlns="" id="{8B6EC073-FC2C-4D56-BBFD-BAA996D284AC}"/>
+                <a16:creationId xmlns="" xmlns:a16="http://schemas.microsoft.com/office/drawing/2014/main" id="{8B6EC073-FC2C-4D56-BBFD-BAA996D284AC}"/>
               </a:ext>
             </a:extLst>
           </p:cNvPr>
@@ -20029,7 +20036,7 @@
             <p:cNvPr id="35" name="TextBox 34">
               <a:extLst>
                 <a:ext uri="{FF2B5EF4-FFF2-40B4-BE49-F238E27FC236}">
-                  <a16:creationId xmlns:a16="http://schemas.microsoft.com/office/drawing/2014/main" xmlns="" id="{E92E909F-8CEF-4A1B-9E9E-057D4F711B66}"/>
+                  <a16:creationId xmlns="" xmlns:a16="http://schemas.microsoft.com/office/drawing/2014/main" id="{E92E909F-8CEF-4A1B-9E9E-057D4F711B66}"/>
                 </a:ext>
               </a:extLst>
             </p:cNvPr>
@@ -20075,7 +20082,7 @@
             <p:cNvPr id="36" name="TextBox 35">
               <a:extLst>
                 <a:ext uri="{FF2B5EF4-FFF2-40B4-BE49-F238E27FC236}">
-                  <a16:creationId xmlns:a16="http://schemas.microsoft.com/office/drawing/2014/main" xmlns="" id="{EDAAA188-3F7F-4561-A7F9-3DA7D1AA8B67}"/>
+                  <a16:creationId xmlns="" xmlns:a16="http://schemas.microsoft.com/office/drawing/2014/main" id="{EDAAA188-3F7F-4561-A7F9-3DA7D1AA8B67}"/>
                 </a:ext>
               </a:extLst>
             </p:cNvPr>
@@ -20121,7 +20128,7 @@
             <p:cNvPr id="37" name="TextBox 36">
               <a:extLst>
                 <a:ext uri="{FF2B5EF4-FFF2-40B4-BE49-F238E27FC236}">
-                  <a16:creationId xmlns:a16="http://schemas.microsoft.com/office/drawing/2014/main" xmlns="" id="{B3406560-2692-43BD-B3EF-B079A771F89C}"/>
+                  <a16:creationId xmlns="" xmlns:a16="http://schemas.microsoft.com/office/drawing/2014/main" id="{B3406560-2692-43BD-B3EF-B079A771F89C}"/>
                 </a:ext>
               </a:extLst>
             </p:cNvPr>
@@ -20167,7 +20174,7 @@
             <p:cNvPr id="38" name="TextBox 37">
               <a:extLst>
                 <a:ext uri="{FF2B5EF4-FFF2-40B4-BE49-F238E27FC236}">
-                  <a16:creationId xmlns:a16="http://schemas.microsoft.com/office/drawing/2014/main" xmlns="" id="{FB51184F-8749-48B4-AD07-636877C65807}"/>
+                  <a16:creationId xmlns="" xmlns:a16="http://schemas.microsoft.com/office/drawing/2014/main" id="{FB51184F-8749-48B4-AD07-636877C65807}"/>
                 </a:ext>
               </a:extLst>
             </p:cNvPr>
@@ -20211,7 +20218,7 @@
             <p:cNvPr id="39" name="Rectangle 2">
               <a:extLst>
                 <a:ext uri="{FF2B5EF4-FFF2-40B4-BE49-F238E27FC236}">
-                  <a16:creationId xmlns:a16="http://schemas.microsoft.com/office/drawing/2014/main" xmlns="" id="{EF8F38E6-3381-4254-AB6F-D9AC1C9269CE}"/>
+                  <a16:creationId xmlns="" xmlns:a16="http://schemas.microsoft.com/office/drawing/2014/main" id="{EF8F38E6-3381-4254-AB6F-D9AC1C9269CE}"/>
                 </a:ext>
               </a:extLst>
             </p:cNvPr>
@@ -20363,7 +20370,7 @@
           <p:cNvPr id="52" name="Group 51">
             <a:extLst>
               <a:ext uri="{FF2B5EF4-FFF2-40B4-BE49-F238E27FC236}">
-                <a16:creationId xmlns:a16="http://schemas.microsoft.com/office/drawing/2014/main" xmlns="" id="{B010521C-F2F6-4DFD-9F7F-D1CDDE352F4B}"/>
+                <a16:creationId xmlns="" xmlns:a16="http://schemas.microsoft.com/office/drawing/2014/main" id="{B010521C-F2F6-4DFD-9F7F-D1CDDE352F4B}"/>
               </a:ext>
             </a:extLst>
           </p:cNvPr>
@@ -20383,7 +20390,7 @@
             <p:cNvPr id="45" name="TextBox 44">
               <a:extLst>
                 <a:ext uri="{FF2B5EF4-FFF2-40B4-BE49-F238E27FC236}">
-                  <a16:creationId xmlns:a16="http://schemas.microsoft.com/office/drawing/2014/main" xmlns="" id="{3A945157-1FA0-4494-9DF7-E38C4A3E4C3C}"/>
+                  <a16:creationId xmlns="" xmlns:a16="http://schemas.microsoft.com/office/drawing/2014/main" id="{3A945157-1FA0-4494-9DF7-E38C4A3E4C3C}"/>
                 </a:ext>
               </a:extLst>
             </p:cNvPr>
@@ -20436,7 +20443,7 @@
             <p:cNvPr id="47" name="Straight Arrow Connector 46">
               <a:extLst>
                 <a:ext uri="{FF2B5EF4-FFF2-40B4-BE49-F238E27FC236}">
-                  <a16:creationId xmlns:a16="http://schemas.microsoft.com/office/drawing/2014/main" xmlns="" id="{AE58F8BA-228E-4E46-B9EE-FCD07B04AB67}"/>
+                  <a16:creationId xmlns="" xmlns:a16="http://schemas.microsoft.com/office/drawing/2014/main" id="{AE58F8BA-228E-4E46-B9EE-FCD07B04AB67}"/>
                 </a:ext>
               </a:extLst>
             </p:cNvPr>
@@ -21335,7 +21342,7 @@
           <p:cNvPr id="5" name="Picture 4">
             <a:extLst>
               <a:ext uri="{FF2B5EF4-FFF2-40B4-BE49-F238E27FC236}">
-                <a16:creationId xmlns:a16="http://schemas.microsoft.com/office/drawing/2014/main" xmlns="" id="{59AF7D31-2782-4922-8B1C-2A00717E2EF7}"/>
+                <a16:creationId xmlns="" xmlns:a16="http://schemas.microsoft.com/office/drawing/2014/main" id="{59AF7D31-2782-4922-8B1C-2A00717E2EF7}"/>
               </a:ext>
             </a:extLst>
           </p:cNvPr>
@@ -21371,7 +21378,7 @@
           <p:cNvPr id="6" name="Picture 5">
             <a:extLst>
               <a:ext uri="{FF2B5EF4-FFF2-40B4-BE49-F238E27FC236}">
-                <a16:creationId xmlns:a16="http://schemas.microsoft.com/office/drawing/2014/main" xmlns="" id="{0C3D18F3-6970-429A-A025-B63232EE4A09}"/>
+                <a16:creationId xmlns="" xmlns:a16="http://schemas.microsoft.com/office/drawing/2014/main" id="{0C3D18F3-6970-429A-A025-B63232EE4A09}"/>
               </a:ext>
             </a:extLst>
           </p:cNvPr>
@@ -21407,7 +21414,7 @@
           <p:cNvPr id="7" name="Picture 6">
             <a:extLst>
               <a:ext uri="{FF2B5EF4-FFF2-40B4-BE49-F238E27FC236}">
-                <a16:creationId xmlns:a16="http://schemas.microsoft.com/office/drawing/2014/main" xmlns="" id="{0B0629E2-2DA3-4F63-BB3E-641AEA04EAC8}"/>
+                <a16:creationId xmlns="" xmlns:a16="http://schemas.microsoft.com/office/drawing/2014/main" id="{0B0629E2-2DA3-4F63-BB3E-641AEA04EAC8}"/>
               </a:ext>
             </a:extLst>
           </p:cNvPr>
@@ -21443,7 +21450,7 @@
           <p:cNvPr id="52" name="Group 51">
             <a:extLst>
               <a:ext uri="{FF2B5EF4-FFF2-40B4-BE49-F238E27FC236}">
-                <a16:creationId xmlns:a16="http://schemas.microsoft.com/office/drawing/2014/main" xmlns="" id="{107757F1-EED8-4438-B609-40224D9820D5}"/>
+                <a16:creationId xmlns="" xmlns:a16="http://schemas.microsoft.com/office/drawing/2014/main" id="{107757F1-EED8-4438-B609-40224D9820D5}"/>
               </a:ext>
             </a:extLst>
           </p:cNvPr>
@@ -21463,7 +21470,7 @@
             <p:cNvPr id="32" name="TextBox 31">
               <a:extLst>
                 <a:ext uri="{FF2B5EF4-FFF2-40B4-BE49-F238E27FC236}">
-                  <a16:creationId xmlns:a16="http://schemas.microsoft.com/office/drawing/2014/main" xmlns="" id="{6A10D917-EAF5-4C2E-952E-E1B3C0071E1E}"/>
+                  <a16:creationId xmlns="" xmlns:a16="http://schemas.microsoft.com/office/drawing/2014/main" id="{6A10D917-EAF5-4C2E-952E-E1B3C0071E1E}"/>
                 </a:ext>
               </a:extLst>
             </p:cNvPr>
@@ -21509,7 +21516,7 @@
             <p:cNvPr id="33" name="TextBox 32">
               <a:extLst>
                 <a:ext uri="{FF2B5EF4-FFF2-40B4-BE49-F238E27FC236}">
-                  <a16:creationId xmlns:a16="http://schemas.microsoft.com/office/drawing/2014/main" xmlns="" id="{99E78B0A-2A1B-4BFC-A266-0BA95F7599C6}"/>
+                  <a16:creationId xmlns="" xmlns:a16="http://schemas.microsoft.com/office/drawing/2014/main" id="{99E78B0A-2A1B-4BFC-A266-0BA95F7599C6}"/>
                 </a:ext>
               </a:extLst>
             </p:cNvPr>
@@ -21555,7 +21562,7 @@
             <p:cNvPr id="34" name="TextBox 33">
               <a:extLst>
                 <a:ext uri="{FF2B5EF4-FFF2-40B4-BE49-F238E27FC236}">
-                  <a16:creationId xmlns:a16="http://schemas.microsoft.com/office/drawing/2014/main" xmlns="" id="{84C50921-5325-4D09-9C2E-91D84ED4BB07}"/>
+                  <a16:creationId xmlns="" xmlns:a16="http://schemas.microsoft.com/office/drawing/2014/main" id="{84C50921-5325-4D09-9C2E-91D84ED4BB07}"/>
                 </a:ext>
               </a:extLst>
             </p:cNvPr>
@@ -21601,7 +21608,7 @@
             <p:cNvPr id="35" name="TextBox 34">
               <a:extLst>
                 <a:ext uri="{FF2B5EF4-FFF2-40B4-BE49-F238E27FC236}">
-                  <a16:creationId xmlns:a16="http://schemas.microsoft.com/office/drawing/2014/main" xmlns="" id="{FF57C241-9797-4767-82FA-7A49EC79B87F}"/>
+                  <a16:creationId xmlns="" xmlns:a16="http://schemas.microsoft.com/office/drawing/2014/main" id="{FF57C241-9797-4767-82FA-7A49EC79B87F}"/>
                 </a:ext>
               </a:extLst>
             </p:cNvPr>
@@ -21645,7 +21652,7 @@
             <p:cNvPr id="36" name="Rectangle 2">
               <a:extLst>
                 <a:ext uri="{FF2B5EF4-FFF2-40B4-BE49-F238E27FC236}">
-                  <a16:creationId xmlns:a16="http://schemas.microsoft.com/office/drawing/2014/main" xmlns="" id="{48C12E22-BF9A-41DF-9994-EF347B6CCEF3}"/>
+                  <a16:creationId xmlns="" xmlns:a16="http://schemas.microsoft.com/office/drawing/2014/main" id="{48C12E22-BF9A-41DF-9994-EF347B6CCEF3}"/>
                 </a:ext>
               </a:extLst>
             </p:cNvPr>
@@ -21744,7 +21751,7 @@
           <p:cNvPr id="53" name="Group 52">
             <a:extLst>
               <a:ext uri="{FF2B5EF4-FFF2-40B4-BE49-F238E27FC236}">
-                <a16:creationId xmlns:a16="http://schemas.microsoft.com/office/drawing/2014/main" xmlns="" id="{2AF0B01A-621C-4CDE-AA9F-8326F7E3BE19}"/>
+                <a16:creationId xmlns="" xmlns:a16="http://schemas.microsoft.com/office/drawing/2014/main" id="{2AF0B01A-621C-4CDE-AA9F-8326F7E3BE19}"/>
               </a:ext>
             </a:extLst>
           </p:cNvPr>
@@ -21764,7 +21771,7 @@
             <p:cNvPr id="37" name="Group 36">
               <a:extLst>
                 <a:ext uri="{FF2B5EF4-FFF2-40B4-BE49-F238E27FC236}">
-                  <a16:creationId xmlns:a16="http://schemas.microsoft.com/office/drawing/2014/main" xmlns="" id="{A9E14DE8-E76B-4EF3-999F-348EC84EE312}"/>
+                  <a16:creationId xmlns="" xmlns:a16="http://schemas.microsoft.com/office/drawing/2014/main" id="{A9E14DE8-E76B-4EF3-999F-348EC84EE312}"/>
                 </a:ext>
               </a:extLst>
             </p:cNvPr>
@@ -21784,7 +21791,7 @@
               <p:cNvPr id="38" name="TextBox 37">
                 <a:extLst>
                   <a:ext uri="{FF2B5EF4-FFF2-40B4-BE49-F238E27FC236}">
-                    <a16:creationId xmlns:a16="http://schemas.microsoft.com/office/drawing/2014/main" xmlns="" id="{1DD282C7-A99A-435C-8220-DE2FA11BC47F}"/>
+                    <a16:creationId xmlns="" xmlns:a16="http://schemas.microsoft.com/office/drawing/2014/main" id="{1DD282C7-A99A-435C-8220-DE2FA11BC47F}"/>
                   </a:ext>
                 </a:extLst>
               </p:cNvPr>
@@ -21830,7 +21837,7 @@
               <p:cNvPr id="39" name="TextBox 38">
                 <a:extLst>
                   <a:ext uri="{FF2B5EF4-FFF2-40B4-BE49-F238E27FC236}">
-                    <a16:creationId xmlns:a16="http://schemas.microsoft.com/office/drawing/2014/main" xmlns="" id="{AA9423A4-90EF-4168-8D1B-133225A02BEA}"/>
+                    <a16:creationId xmlns="" xmlns:a16="http://schemas.microsoft.com/office/drawing/2014/main" id="{AA9423A4-90EF-4168-8D1B-133225A02BEA}"/>
                   </a:ext>
                 </a:extLst>
               </p:cNvPr>
@@ -21876,7 +21883,7 @@
               <p:cNvPr id="40" name="TextBox 39">
                 <a:extLst>
                   <a:ext uri="{FF2B5EF4-FFF2-40B4-BE49-F238E27FC236}">
-                    <a16:creationId xmlns:a16="http://schemas.microsoft.com/office/drawing/2014/main" xmlns="" id="{C2870B03-65D0-4BCF-9160-632D7651B00D}"/>
+                    <a16:creationId xmlns="" xmlns:a16="http://schemas.microsoft.com/office/drawing/2014/main" id="{C2870B03-65D0-4BCF-9160-632D7651B00D}"/>
                   </a:ext>
                 </a:extLst>
               </p:cNvPr>
@@ -21922,7 +21929,7 @@
               <p:cNvPr id="41" name="TextBox 40">
                 <a:extLst>
                   <a:ext uri="{FF2B5EF4-FFF2-40B4-BE49-F238E27FC236}">
-                    <a16:creationId xmlns:a16="http://schemas.microsoft.com/office/drawing/2014/main" xmlns="" id="{53C0E7CA-7116-42E2-BCAA-0B8B8A38BCFF}"/>
+                    <a16:creationId xmlns="" xmlns:a16="http://schemas.microsoft.com/office/drawing/2014/main" id="{53C0E7CA-7116-42E2-BCAA-0B8B8A38BCFF}"/>
                   </a:ext>
                 </a:extLst>
               </p:cNvPr>
@@ -21966,7 +21973,7 @@
               <p:cNvPr id="42" name="Rectangle 2">
                 <a:extLst>
                   <a:ext uri="{FF2B5EF4-FFF2-40B4-BE49-F238E27FC236}">
-                    <a16:creationId xmlns:a16="http://schemas.microsoft.com/office/drawing/2014/main" xmlns="" id="{18898162-8309-41CC-961B-671BA65997AB}"/>
+                    <a16:creationId xmlns="" xmlns:a16="http://schemas.microsoft.com/office/drawing/2014/main" id="{18898162-8309-41CC-961B-671BA65997AB}"/>
                   </a:ext>
                 </a:extLst>
               </p:cNvPr>
@@ -22054,7 +22061,7 @@
             <p:cNvPr id="43" name="Group 42">
               <a:extLst>
                 <a:ext uri="{FF2B5EF4-FFF2-40B4-BE49-F238E27FC236}">
-                  <a16:creationId xmlns:a16="http://schemas.microsoft.com/office/drawing/2014/main" xmlns="" id="{DBC531E7-693B-4E33-874E-0C6EE5E64C88}"/>
+                  <a16:creationId xmlns="" xmlns:a16="http://schemas.microsoft.com/office/drawing/2014/main" id="{DBC531E7-693B-4E33-874E-0C6EE5E64C88}"/>
                 </a:ext>
               </a:extLst>
             </p:cNvPr>
@@ -22074,7 +22081,7 @@
               <p:cNvPr id="44" name="TextBox 43">
                 <a:extLst>
                   <a:ext uri="{FF2B5EF4-FFF2-40B4-BE49-F238E27FC236}">
-                    <a16:creationId xmlns:a16="http://schemas.microsoft.com/office/drawing/2014/main" xmlns="" id="{8707F2BD-6B65-47EE-AB1B-D3F43448F244}"/>
+                    <a16:creationId xmlns="" xmlns:a16="http://schemas.microsoft.com/office/drawing/2014/main" id="{8707F2BD-6B65-47EE-AB1B-D3F43448F244}"/>
                   </a:ext>
                 </a:extLst>
               </p:cNvPr>
@@ -22120,7 +22127,7 @@
               <p:cNvPr id="45" name="TextBox 44">
                 <a:extLst>
                   <a:ext uri="{FF2B5EF4-FFF2-40B4-BE49-F238E27FC236}">
-                    <a16:creationId xmlns:a16="http://schemas.microsoft.com/office/drawing/2014/main" xmlns="" id="{2F59D818-BF4B-48ED-8342-8BB769CA01AF}"/>
+                    <a16:creationId xmlns="" xmlns:a16="http://schemas.microsoft.com/office/drawing/2014/main" id="{2F59D818-BF4B-48ED-8342-8BB769CA01AF}"/>
                   </a:ext>
                 </a:extLst>
               </p:cNvPr>
@@ -22166,7 +22173,7 @@
               <p:cNvPr id="46" name="TextBox 45">
                 <a:extLst>
                   <a:ext uri="{FF2B5EF4-FFF2-40B4-BE49-F238E27FC236}">
-                    <a16:creationId xmlns:a16="http://schemas.microsoft.com/office/drawing/2014/main" xmlns="" id="{CABF1A39-DFCB-4F66-B61F-8CFDC4A6B7FA}"/>
+                    <a16:creationId xmlns="" xmlns:a16="http://schemas.microsoft.com/office/drawing/2014/main" id="{CABF1A39-DFCB-4F66-B61F-8CFDC4A6B7FA}"/>
                   </a:ext>
                 </a:extLst>
               </p:cNvPr>
@@ -22212,7 +22219,7 @@
               <p:cNvPr id="47" name="TextBox 46">
                 <a:extLst>
                   <a:ext uri="{FF2B5EF4-FFF2-40B4-BE49-F238E27FC236}">
-                    <a16:creationId xmlns:a16="http://schemas.microsoft.com/office/drawing/2014/main" xmlns="" id="{1BC8499D-0BCB-47C3-8005-D0E944DAD3E9}"/>
+                    <a16:creationId xmlns="" xmlns:a16="http://schemas.microsoft.com/office/drawing/2014/main" id="{1BC8499D-0BCB-47C3-8005-D0E944DAD3E9}"/>
                   </a:ext>
                 </a:extLst>
               </p:cNvPr>
@@ -22256,7 +22263,7 @@
               <p:cNvPr id="48" name="Rectangle 2">
                 <a:extLst>
                   <a:ext uri="{FF2B5EF4-FFF2-40B4-BE49-F238E27FC236}">
-                    <a16:creationId xmlns:a16="http://schemas.microsoft.com/office/drawing/2014/main" xmlns="" id="{81019032-0120-43C0-B7BA-BC37EC738C5E}"/>
+                    <a16:creationId xmlns="" xmlns:a16="http://schemas.microsoft.com/office/drawing/2014/main" id="{81019032-0120-43C0-B7BA-BC37EC738C5E}"/>
                   </a:ext>
                 </a:extLst>
               </p:cNvPr>
@@ -22409,7 +22416,7 @@
           <p:cNvPr id="26" name="TextBox 25">
             <a:extLst>
               <a:ext uri="{FF2B5EF4-FFF2-40B4-BE49-F238E27FC236}">
-                <a16:creationId xmlns:a16="http://schemas.microsoft.com/office/drawing/2014/main" xmlns="" id="{E2A25439-4120-4E2D-9032-5CB1B1727334}"/>
+                <a16:creationId xmlns="" xmlns:a16="http://schemas.microsoft.com/office/drawing/2014/main" id="{E2A25439-4120-4E2D-9032-5CB1B1727334}"/>
               </a:ext>
             </a:extLst>
           </p:cNvPr>
@@ -23094,7 +23101,7 @@
           <p:cNvPr id="39" name="TextBox 38">
             <a:extLst>
               <a:ext uri="{FF2B5EF4-FFF2-40B4-BE49-F238E27FC236}">
-                <a16:creationId xmlns:a16="http://schemas.microsoft.com/office/drawing/2014/main" xmlns="" id="{E2A25439-4120-4E2D-9032-5CB1B1727334}"/>
+                <a16:creationId xmlns="" xmlns:a16="http://schemas.microsoft.com/office/drawing/2014/main" id="{E2A25439-4120-4E2D-9032-5CB1B1727334}"/>
               </a:ext>
             </a:extLst>
           </p:cNvPr>
@@ -23149,7 +23156,7 @@
           <p:cNvPr id="2" name="TextBox 1">
             <a:extLst>
               <a:ext uri="{FF2B5EF4-FFF2-40B4-BE49-F238E27FC236}">
-                <a16:creationId xmlns:a16="http://schemas.microsoft.com/office/drawing/2014/main" xmlns="" id="{E2A25439-4120-4E2D-9032-5CB1B1727334}"/>
+                <a16:creationId xmlns="" xmlns:a16="http://schemas.microsoft.com/office/drawing/2014/main" id="{E2A25439-4120-4E2D-9032-5CB1B1727334}"/>
               </a:ext>
             </a:extLst>
           </p:cNvPr>
@@ -23204,7 +23211,7 @@
           <p:cNvPr id="3" name="TextBox 2">
             <a:extLst>
               <a:ext uri="{FF2B5EF4-FFF2-40B4-BE49-F238E27FC236}">
-                <a16:creationId xmlns:a16="http://schemas.microsoft.com/office/drawing/2014/main" xmlns="" id="{9D2172C1-1223-4E50-B7DC-CB37A5D8E7E8}"/>
+                <a16:creationId xmlns="" xmlns:a16="http://schemas.microsoft.com/office/drawing/2014/main" id="{9D2172C1-1223-4E50-B7DC-CB37A5D8E7E8}"/>
               </a:ext>
             </a:extLst>
           </p:cNvPr>
@@ -23213,7 +23220,7 @@
         </p:nvSpPr>
         <p:spPr>
           <a:xfrm>
-            <a:off x="3050362" y="-6111"/>
+            <a:off x="3036714" y="-6111"/>
             <a:ext cx="6059511" cy="644235"/>
           </a:xfrm>
           <a:prstGeom prst="rect">
@@ -23259,7 +23266,7 @@
           <p:cNvPr id="4" name="Group 3">
             <a:extLst>
               <a:ext uri="{FF2B5EF4-FFF2-40B4-BE49-F238E27FC236}">
-                <a16:creationId xmlns:a16="http://schemas.microsoft.com/office/drawing/2014/main" xmlns="" id="{990991E8-A6DD-4EBE-BD29-497FD796F56A}"/>
+                <a16:creationId xmlns="" xmlns:a16="http://schemas.microsoft.com/office/drawing/2014/main" id="{990991E8-A6DD-4EBE-BD29-497FD796F56A}"/>
               </a:ext>
             </a:extLst>
           </p:cNvPr>
@@ -23279,7 +23286,7 @@
             <p:cNvPr id="5" name="Group 4">
               <a:extLst>
                 <a:ext uri="{FF2B5EF4-FFF2-40B4-BE49-F238E27FC236}">
-                  <a16:creationId xmlns:a16="http://schemas.microsoft.com/office/drawing/2014/main" xmlns="" id="{44B773F0-BFA8-42CF-913F-8DA6F27B3316}"/>
+                  <a16:creationId xmlns="" xmlns:a16="http://schemas.microsoft.com/office/drawing/2014/main" id="{44B773F0-BFA8-42CF-913F-8DA6F27B3316}"/>
                 </a:ext>
               </a:extLst>
             </p:cNvPr>
@@ -23299,7 +23306,7 @@
               <p:cNvPr id="12" name="TextBox 11">
                 <a:extLst>
                   <a:ext uri="{FF2B5EF4-FFF2-40B4-BE49-F238E27FC236}">
-                    <a16:creationId xmlns:a16="http://schemas.microsoft.com/office/drawing/2014/main" xmlns="" id="{5E7EECD0-7CF5-47EA-8460-5C7C92155E9D}"/>
+                    <a16:creationId xmlns="" xmlns:a16="http://schemas.microsoft.com/office/drawing/2014/main" id="{5E7EECD0-7CF5-47EA-8460-5C7C92155E9D}"/>
                   </a:ext>
                 </a:extLst>
               </p:cNvPr>
@@ -23345,7 +23352,7 @@
               <p:cNvPr id="13" name="TextBox 12">
                 <a:extLst>
                   <a:ext uri="{FF2B5EF4-FFF2-40B4-BE49-F238E27FC236}">
-                    <a16:creationId xmlns:a16="http://schemas.microsoft.com/office/drawing/2014/main" xmlns="" id="{B105CB38-D6FD-4376-AD71-F1C724460C31}"/>
+                    <a16:creationId xmlns="" xmlns:a16="http://schemas.microsoft.com/office/drawing/2014/main" id="{B105CB38-D6FD-4376-AD71-F1C724460C31}"/>
                   </a:ext>
                 </a:extLst>
               </p:cNvPr>
@@ -23391,7 +23398,7 @@
               <p:cNvPr id="14" name="TextBox 13">
                 <a:extLst>
                   <a:ext uri="{FF2B5EF4-FFF2-40B4-BE49-F238E27FC236}">
-                    <a16:creationId xmlns:a16="http://schemas.microsoft.com/office/drawing/2014/main" xmlns="" id="{50C864DB-B022-453A-B48C-346240FB6030}"/>
+                    <a16:creationId xmlns="" xmlns:a16="http://schemas.microsoft.com/office/drawing/2014/main" id="{50C864DB-B022-453A-B48C-346240FB6030}"/>
                   </a:ext>
                 </a:extLst>
               </p:cNvPr>
@@ -23437,7 +23444,7 @@
               <p:cNvPr id="15" name="TextBox 14">
                 <a:extLst>
                   <a:ext uri="{FF2B5EF4-FFF2-40B4-BE49-F238E27FC236}">
-                    <a16:creationId xmlns:a16="http://schemas.microsoft.com/office/drawing/2014/main" xmlns="" id="{DA673339-7248-4DFC-9FFE-48DED464AF25}"/>
+                    <a16:creationId xmlns="" xmlns:a16="http://schemas.microsoft.com/office/drawing/2014/main" id="{DA673339-7248-4DFC-9FFE-48DED464AF25}"/>
                   </a:ext>
                 </a:extLst>
               </p:cNvPr>
@@ -23481,7 +23488,7 @@
               <p:cNvPr id="16" name="Rectangle 2">
                 <a:extLst>
                   <a:ext uri="{FF2B5EF4-FFF2-40B4-BE49-F238E27FC236}">
-                    <a16:creationId xmlns:a16="http://schemas.microsoft.com/office/drawing/2014/main" xmlns="" id="{BDDAD86E-250E-4F2E-94EA-F444784CEEEA}"/>
+                    <a16:creationId xmlns="" xmlns:a16="http://schemas.microsoft.com/office/drawing/2014/main" id="{BDDAD86E-250E-4F2E-94EA-F444784CEEEA}"/>
                   </a:ext>
                 </a:extLst>
               </p:cNvPr>
@@ -23569,7 +23576,7 @@
             <p:cNvPr id="6" name="Group 5">
               <a:extLst>
                 <a:ext uri="{FF2B5EF4-FFF2-40B4-BE49-F238E27FC236}">
-                  <a16:creationId xmlns:a16="http://schemas.microsoft.com/office/drawing/2014/main" xmlns="" id="{FE1924EC-566E-42D3-AF71-64C227DF571F}"/>
+                  <a16:creationId xmlns="" xmlns:a16="http://schemas.microsoft.com/office/drawing/2014/main" id="{FE1924EC-566E-42D3-AF71-64C227DF571F}"/>
                 </a:ext>
               </a:extLst>
             </p:cNvPr>
@@ -23589,7 +23596,7 @@
               <p:cNvPr id="7" name="TextBox 6">
                 <a:extLst>
                   <a:ext uri="{FF2B5EF4-FFF2-40B4-BE49-F238E27FC236}">
-                    <a16:creationId xmlns:a16="http://schemas.microsoft.com/office/drawing/2014/main" xmlns="" id="{17D034B1-AC8C-4A53-AD2E-E1CABA922EF4}"/>
+                    <a16:creationId xmlns="" xmlns:a16="http://schemas.microsoft.com/office/drawing/2014/main" id="{17D034B1-AC8C-4A53-AD2E-E1CABA922EF4}"/>
                   </a:ext>
                 </a:extLst>
               </p:cNvPr>
@@ -23635,7 +23642,7 @@
               <p:cNvPr id="8" name="TextBox 7">
                 <a:extLst>
                   <a:ext uri="{FF2B5EF4-FFF2-40B4-BE49-F238E27FC236}">
-                    <a16:creationId xmlns:a16="http://schemas.microsoft.com/office/drawing/2014/main" xmlns="" id="{00E40E18-CC50-4FD4-8555-68C90A0CA79D}"/>
+                    <a16:creationId xmlns="" xmlns:a16="http://schemas.microsoft.com/office/drawing/2014/main" id="{00E40E18-CC50-4FD4-8555-68C90A0CA79D}"/>
                   </a:ext>
                 </a:extLst>
               </p:cNvPr>
@@ -23681,7 +23688,7 @@
               <p:cNvPr id="9" name="TextBox 8">
                 <a:extLst>
                   <a:ext uri="{FF2B5EF4-FFF2-40B4-BE49-F238E27FC236}">
-                    <a16:creationId xmlns:a16="http://schemas.microsoft.com/office/drawing/2014/main" xmlns="" id="{95D17C04-5968-4A45-B25E-E129440683AC}"/>
+                    <a16:creationId xmlns="" xmlns:a16="http://schemas.microsoft.com/office/drawing/2014/main" id="{95D17C04-5968-4A45-B25E-E129440683AC}"/>
                   </a:ext>
                 </a:extLst>
               </p:cNvPr>
@@ -23727,7 +23734,7 @@
               <p:cNvPr id="10" name="TextBox 9">
                 <a:extLst>
                   <a:ext uri="{FF2B5EF4-FFF2-40B4-BE49-F238E27FC236}">
-                    <a16:creationId xmlns:a16="http://schemas.microsoft.com/office/drawing/2014/main" xmlns="" id="{60E02FDD-C9EF-4072-854D-965CAF2D3D16}"/>
+                    <a16:creationId xmlns="" xmlns:a16="http://schemas.microsoft.com/office/drawing/2014/main" id="{60E02FDD-C9EF-4072-854D-965CAF2D3D16}"/>
                   </a:ext>
                 </a:extLst>
               </p:cNvPr>
@@ -23771,7 +23778,7 @@
               <p:cNvPr id="11" name="Rectangle 2">
                 <a:extLst>
                   <a:ext uri="{FF2B5EF4-FFF2-40B4-BE49-F238E27FC236}">
-                    <a16:creationId xmlns:a16="http://schemas.microsoft.com/office/drawing/2014/main" xmlns="" id="{747FA38B-603B-41F1-8376-D02155CE211C}"/>
+                    <a16:creationId xmlns="" xmlns:a16="http://schemas.microsoft.com/office/drawing/2014/main" id="{747FA38B-603B-41F1-8376-D02155CE211C}"/>
                   </a:ext>
                 </a:extLst>
               </p:cNvPr>
@@ -23924,7 +23931,7 @@
           <p:cNvPr id="17" name="TextBox 16">
             <a:extLst>
               <a:ext uri="{FF2B5EF4-FFF2-40B4-BE49-F238E27FC236}">
-                <a16:creationId xmlns:a16="http://schemas.microsoft.com/office/drawing/2014/main" xmlns="" id="{D0ECDC15-34F5-44FE-8154-DC11077BCB09}"/>
+                <a16:creationId xmlns="" xmlns:a16="http://schemas.microsoft.com/office/drawing/2014/main" id="{D0ECDC15-34F5-44FE-8154-DC11077BCB09}"/>
               </a:ext>
             </a:extLst>
           </p:cNvPr>
@@ -24089,7 +24096,7 @@
           <p:cNvPr id="18" name="Rectangle 2">
             <a:extLst>
               <a:ext uri="{FF2B5EF4-FFF2-40B4-BE49-F238E27FC236}">
-                <a16:creationId xmlns:a16="http://schemas.microsoft.com/office/drawing/2014/main" xmlns="" id="{ACDC168F-4D82-47FD-B69E-72E7A1600102}"/>
+                <a16:creationId xmlns="" xmlns:a16="http://schemas.microsoft.com/office/drawing/2014/main" id="{ACDC168F-4D82-47FD-B69E-72E7A1600102}"/>
               </a:ext>
             </a:extLst>
           </p:cNvPr>
@@ -24187,7 +24194,7 @@
           <p:cNvPr id="20" name="TextBox 19">
             <a:extLst>
               <a:ext uri="{FF2B5EF4-FFF2-40B4-BE49-F238E27FC236}">
-                <a16:creationId xmlns:a16="http://schemas.microsoft.com/office/drawing/2014/main" xmlns="" id="{EDB442F5-34D7-4300-BA18-4B5BC98BC3D4}"/>
+                <a16:creationId xmlns="" xmlns:a16="http://schemas.microsoft.com/office/drawing/2014/main" id="{EDB442F5-34D7-4300-BA18-4B5BC98BC3D4}"/>
               </a:ext>
             </a:extLst>
           </p:cNvPr>
@@ -24233,7 +24240,7 @@
           <p:cNvPr id="21" name="TextBox 20">
             <a:extLst>
               <a:ext uri="{FF2B5EF4-FFF2-40B4-BE49-F238E27FC236}">
-                <a16:creationId xmlns:a16="http://schemas.microsoft.com/office/drawing/2014/main" xmlns="" id="{1126D985-4D01-49AD-AAA0-F753E895E063}"/>
+                <a16:creationId xmlns="" xmlns:a16="http://schemas.microsoft.com/office/drawing/2014/main" id="{1126D985-4D01-49AD-AAA0-F753E895E063}"/>
               </a:ext>
             </a:extLst>
           </p:cNvPr>
@@ -24279,7 +24286,7 @@
           <p:cNvPr id="22" name="TextBox 21">
             <a:extLst>
               <a:ext uri="{FF2B5EF4-FFF2-40B4-BE49-F238E27FC236}">
-                <a16:creationId xmlns:a16="http://schemas.microsoft.com/office/drawing/2014/main" xmlns="" id="{2F327C8B-A760-45E6-AF3F-CC4F1AE1E652}"/>
+                <a16:creationId xmlns="" xmlns:a16="http://schemas.microsoft.com/office/drawing/2014/main" id="{2F327C8B-A760-45E6-AF3F-CC4F1AE1E652}"/>
               </a:ext>
             </a:extLst>
           </p:cNvPr>
@@ -24325,7 +24332,7 @@
           <p:cNvPr id="23" name="TextBox 22">
             <a:extLst>
               <a:ext uri="{FF2B5EF4-FFF2-40B4-BE49-F238E27FC236}">
-                <a16:creationId xmlns:a16="http://schemas.microsoft.com/office/drawing/2014/main" xmlns="" id="{839ACAD9-74C5-4CC6-8034-5AFF1C74CC80}"/>
+                <a16:creationId xmlns="" xmlns:a16="http://schemas.microsoft.com/office/drawing/2014/main" id="{839ACAD9-74C5-4CC6-8034-5AFF1C74CC80}"/>
               </a:ext>
             </a:extLst>
           </p:cNvPr>
@@ -24369,7 +24376,7 @@
           <p:cNvPr id="29" name="TextBox 28">
             <a:extLst>
               <a:ext uri="{FF2B5EF4-FFF2-40B4-BE49-F238E27FC236}">
-                <a16:creationId xmlns:a16="http://schemas.microsoft.com/office/drawing/2014/main" xmlns="" id="{19B7E9EC-DE33-4DEF-A467-B033A05751C7}"/>
+                <a16:creationId xmlns="" xmlns:a16="http://schemas.microsoft.com/office/drawing/2014/main" id="{19B7E9EC-DE33-4DEF-A467-B033A05751C7}"/>
               </a:ext>
             </a:extLst>
           </p:cNvPr>
@@ -24455,7 +24462,7 @@
           <p:cNvPr id="33" name="TextBox 32">
             <a:extLst>
               <a:ext uri="{FF2B5EF4-FFF2-40B4-BE49-F238E27FC236}">
-                <a16:creationId xmlns:a16="http://schemas.microsoft.com/office/drawing/2014/main" xmlns="" id="{C75C1FD0-583B-4E96-BD9A-3DACD2D5A3BF}"/>
+                <a16:creationId xmlns="" xmlns:a16="http://schemas.microsoft.com/office/drawing/2014/main" id="{C75C1FD0-583B-4E96-BD9A-3DACD2D5A3BF}"/>
               </a:ext>
             </a:extLst>
           </p:cNvPr>
@@ -24582,7 +24589,7 @@
           <p:cNvPr id="35" name="TextBox 34">
             <a:extLst>
               <a:ext uri="{FF2B5EF4-FFF2-40B4-BE49-F238E27FC236}">
-                <a16:creationId xmlns:a16="http://schemas.microsoft.com/office/drawing/2014/main" xmlns="" id="{C75C1FD0-583B-4E96-BD9A-3DACD2D5A3BF}"/>
+                <a16:creationId xmlns="" xmlns:a16="http://schemas.microsoft.com/office/drawing/2014/main" id="{C75C1FD0-583B-4E96-BD9A-3DACD2D5A3BF}"/>
               </a:ext>
             </a:extLst>
           </p:cNvPr>
@@ -24648,7 +24655,7 @@
           <p:cNvPr id="36" name="TextBox 35">
             <a:extLst>
               <a:ext uri="{FF2B5EF4-FFF2-40B4-BE49-F238E27FC236}">
-                <a16:creationId xmlns:a16="http://schemas.microsoft.com/office/drawing/2014/main" xmlns="" id="{F11C7FC8-DC9E-479E-A35D-664C720391E0}"/>
+                <a16:creationId xmlns="" xmlns:a16="http://schemas.microsoft.com/office/drawing/2014/main" id="{F11C7FC8-DC9E-479E-A35D-664C720391E0}"/>
               </a:ext>
             </a:extLst>
           </p:cNvPr>
@@ -24742,7 +24749,7 @@
           <p:cNvPr id="37" name="TextBox 36">
             <a:extLst>
               <a:ext uri="{FF2B5EF4-FFF2-40B4-BE49-F238E27FC236}">
-                <a16:creationId xmlns:a16="http://schemas.microsoft.com/office/drawing/2014/main" xmlns="" id="{E0F0A57F-BE52-4D85-8ACC-9FC4EC34E2C8}"/>
+                <a16:creationId xmlns="" xmlns:a16="http://schemas.microsoft.com/office/drawing/2014/main" id="{E0F0A57F-BE52-4D85-8ACC-9FC4EC34E2C8}"/>
               </a:ext>
             </a:extLst>
           </p:cNvPr>
@@ -24856,7 +24863,7 @@
           <p:cNvPr id="38" name="Rectangle 2">
             <a:extLst>
               <a:ext uri="{FF2B5EF4-FFF2-40B4-BE49-F238E27FC236}">
-                <a16:creationId xmlns:a16="http://schemas.microsoft.com/office/drawing/2014/main" xmlns="" id="{E32F358A-5B64-4928-90C5-86786C7C1A50}"/>
+                <a16:creationId xmlns="" xmlns:a16="http://schemas.microsoft.com/office/drawing/2014/main" id="{E32F358A-5B64-4928-90C5-86786C7C1A50}"/>
               </a:ext>
             </a:extLst>
           </p:cNvPr>
@@ -25053,10 +25060,10 @@
       </p:sp>
       <p:sp>
         <p:nvSpPr>
-          <p:cNvPr id="31" name="TextBox 30">
+          <p:cNvPr id="32" name="TextBox 31">
             <a:extLst>
               <a:ext uri="{FF2B5EF4-FFF2-40B4-BE49-F238E27FC236}">
-                <a16:creationId xmlns:a16="http://schemas.microsoft.com/office/drawing/2014/main" xmlns="" id="{FDE44C33-EA15-4D14-8324-71F27282442F}"/>
+                <a16:creationId xmlns="" xmlns:a16="http://schemas.microsoft.com/office/drawing/2014/main" id="{FDE44C33-EA15-4D14-8324-71F27282442F}"/>
               </a:ext>
             </a:extLst>
           </p:cNvPr>
@@ -25441,41 +25448,6 @@
                                   </p:childTnLst>
                                 </p:cTn>
                               </p:par>
-                              <p:par>
-                                <p:cTn id="33" presetID="22" presetClass="entr" presetSubtype="2" fill="hold" grpId="0" nodeType="withEffect">
-                                  <p:stCondLst>
-                                    <p:cond delay="0"/>
-                                  </p:stCondLst>
-                                  <p:childTnLst>
-                                    <p:set>
-                                      <p:cBhvr>
-                                        <p:cTn id="34" dur="1" fill="hold">
-                                          <p:stCondLst>
-                                            <p:cond delay="0"/>
-                                          </p:stCondLst>
-                                        </p:cTn>
-                                        <p:tgtEl>
-                                          <p:spTgt spid="31"/>
-                                        </p:tgtEl>
-                                        <p:attrNameLst>
-                                          <p:attrName>style.visibility</p:attrName>
-                                        </p:attrNameLst>
-                                      </p:cBhvr>
-                                      <p:to>
-                                        <p:strVal val="visible"/>
-                                      </p:to>
-                                    </p:set>
-                                    <p:animEffect transition="in" filter="wipe(right)">
-                                      <p:cBhvr>
-                                        <p:cTn id="35" dur="2000"/>
-                                        <p:tgtEl>
-                                          <p:spTgt spid="31"/>
-                                        </p:tgtEl>
-                                      </p:cBhvr>
-                                    </p:animEffect>
-                                  </p:childTnLst>
-                                </p:cTn>
-                              </p:par>
                             </p:childTnLst>
                           </p:cTn>
                         </p:par>
@@ -25483,26 +25455,26 @@
                     </p:cTn>
                   </p:par>
                   <p:par>
-                    <p:cTn id="36" fill="hold">
+                    <p:cTn id="33" fill="hold">
                       <p:stCondLst>
                         <p:cond delay="indefinite"/>
                       </p:stCondLst>
                       <p:childTnLst>
                         <p:par>
-                          <p:cTn id="37" fill="hold">
+                          <p:cTn id="34" fill="hold">
                             <p:stCondLst>
                               <p:cond delay="0"/>
                             </p:stCondLst>
                             <p:childTnLst>
                               <p:par>
-                                <p:cTn id="38" presetID="22" presetClass="entr" presetSubtype="8" fill="hold" grpId="0" nodeType="clickEffect">
+                                <p:cTn id="35" presetID="22" presetClass="entr" presetSubtype="8" fill="hold" grpId="0" nodeType="clickEffect">
                                   <p:stCondLst>
                                     <p:cond delay="0"/>
                                   </p:stCondLst>
                                   <p:childTnLst>
                                     <p:set>
                                       <p:cBhvr>
-                                        <p:cTn id="39" dur="1" fill="hold">
+                                        <p:cTn id="36" dur="1" fill="hold">
                                           <p:stCondLst>
                                             <p:cond delay="0"/>
                                           </p:stCondLst>
@@ -25520,7 +25492,7 @@
                                     </p:set>
                                     <p:animEffect transition="in" filter="wipe(left)">
                                       <p:cBhvr>
-                                        <p:cTn id="40" dur="1000"/>
+                                        <p:cTn id="37" dur="1000"/>
                                         <p:tgtEl>
                                           <p:spTgt spid="36"/>
                                         </p:tgtEl>
@@ -25530,14 +25502,14 @@
                                 </p:cTn>
                               </p:par>
                               <p:par>
-                                <p:cTn id="41" presetID="22" presetClass="entr" presetSubtype="8" fill="hold" grpId="0" nodeType="withEffect">
+                                <p:cTn id="38" presetID="22" presetClass="entr" presetSubtype="8" fill="hold" grpId="0" nodeType="withEffect">
                                   <p:stCondLst>
                                     <p:cond delay="0"/>
                                   </p:stCondLst>
                                   <p:childTnLst>
                                     <p:set>
                                       <p:cBhvr>
-                                        <p:cTn id="42" dur="1" fill="hold">
+                                        <p:cTn id="39" dur="1" fill="hold">
                                           <p:stCondLst>
                                             <p:cond delay="0"/>
                                           </p:stCondLst>
@@ -25555,9 +25527,44 @@
                                     </p:set>
                                     <p:animEffect transition="in" filter="wipe(left)">
                                       <p:cBhvr>
-                                        <p:cTn id="43" dur="3000"/>
+                                        <p:cTn id="40" dur="3000"/>
                                         <p:tgtEl>
                                           <p:spTgt spid="38"/>
+                                        </p:tgtEl>
+                                      </p:cBhvr>
+                                    </p:animEffect>
+                                  </p:childTnLst>
+                                </p:cTn>
+                              </p:par>
+                              <p:par>
+                                <p:cTn id="41" presetID="22" presetClass="entr" presetSubtype="2" fill="hold" grpId="0" nodeType="withEffect">
+                                  <p:stCondLst>
+                                    <p:cond delay="0"/>
+                                  </p:stCondLst>
+                                  <p:childTnLst>
+                                    <p:set>
+                                      <p:cBhvr>
+                                        <p:cTn id="42" dur="1" fill="hold">
+                                          <p:stCondLst>
+                                            <p:cond delay="0"/>
+                                          </p:stCondLst>
+                                        </p:cTn>
+                                        <p:tgtEl>
+                                          <p:spTgt spid="32"/>
+                                        </p:tgtEl>
+                                        <p:attrNameLst>
+                                          <p:attrName>style.visibility</p:attrName>
+                                        </p:attrNameLst>
+                                      </p:cBhvr>
+                                      <p:to>
+                                        <p:strVal val="visible"/>
+                                      </p:to>
+                                    </p:set>
+                                    <p:animEffect transition="in" filter="wipe(right)">
+                                      <p:cBhvr>
+                                        <p:cTn id="43" dur="2000"/>
+                                        <p:tgtEl>
+                                          <p:spTgt spid="32"/>
                                         </p:tgtEl>
                                       </p:cBhvr>
                                     </p:animEffect>
@@ -25601,7 +25608,7 @@
       <p:bldP spid="36" grpId="0" animBg="1"/>
       <p:bldP spid="37" grpId="0" animBg="1"/>
       <p:bldP spid="38" grpId="0" animBg="1"/>
-      <p:bldP spid="31" grpId="0" animBg="1"/>
+      <p:bldP spid="32" grpId="0" animBg="1"/>
     </p:bldLst>
   </p:timing>
 </p:sld>
@@ -25629,7 +25636,7 @@
           <p:cNvPr id="40" name="TextBox 39">
             <a:extLst>
               <a:ext uri="{FF2B5EF4-FFF2-40B4-BE49-F238E27FC236}">
-                <a16:creationId xmlns:a16="http://schemas.microsoft.com/office/drawing/2014/main" xmlns="" id="{FDE44C33-EA15-4D14-8324-71F27282442F}"/>
+                <a16:creationId xmlns="" xmlns:a16="http://schemas.microsoft.com/office/drawing/2014/main" id="{FDE44C33-EA15-4D14-8324-71F27282442F}"/>
               </a:ext>
             </a:extLst>
           </p:cNvPr>
@@ -25686,7 +25693,7 @@
           <p:cNvPr id="5" name="TextBox 4">
             <a:extLst>
               <a:ext uri="{FF2B5EF4-FFF2-40B4-BE49-F238E27FC236}">
-                <a16:creationId xmlns:a16="http://schemas.microsoft.com/office/drawing/2014/main" xmlns="" id="{EDB442F5-34D7-4300-BA18-4B5BC98BC3D4}"/>
+                <a16:creationId xmlns="" xmlns:a16="http://schemas.microsoft.com/office/drawing/2014/main" id="{EDB442F5-34D7-4300-BA18-4B5BC98BC3D4}"/>
               </a:ext>
             </a:extLst>
           </p:cNvPr>
@@ -25732,7 +25739,7 @@
           <p:cNvPr id="6" name="TextBox 5">
             <a:extLst>
               <a:ext uri="{FF2B5EF4-FFF2-40B4-BE49-F238E27FC236}">
-                <a16:creationId xmlns:a16="http://schemas.microsoft.com/office/drawing/2014/main" xmlns="" id="{1126D985-4D01-49AD-AAA0-F753E895E063}"/>
+                <a16:creationId xmlns="" xmlns:a16="http://schemas.microsoft.com/office/drawing/2014/main" id="{1126D985-4D01-49AD-AAA0-F753E895E063}"/>
               </a:ext>
             </a:extLst>
           </p:cNvPr>
@@ -25778,7 +25785,7 @@
           <p:cNvPr id="7" name="TextBox 6">
             <a:extLst>
               <a:ext uri="{FF2B5EF4-FFF2-40B4-BE49-F238E27FC236}">
-                <a16:creationId xmlns:a16="http://schemas.microsoft.com/office/drawing/2014/main" xmlns="" id="{2F327C8B-A760-45E6-AF3F-CC4F1AE1E652}"/>
+                <a16:creationId xmlns="" xmlns:a16="http://schemas.microsoft.com/office/drawing/2014/main" id="{2F327C8B-A760-45E6-AF3F-CC4F1AE1E652}"/>
               </a:ext>
             </a:extLst>
           </p:cNvPr>
@@ -25824,7 +25831,7 @@
           <p:cNvPr id="8" name="TextBox 7">
             <a:extLst>
               <a:ext uri="{FF2B5EF4-FFF2-40B4-BE49-F238E27FC236}">
-                <a16:creationId xmlns:a16="http://schemas.microsoft.com/office/drawing/2014/main" xmlns="" id="{839ACAD9-74C5-4CC6-8034-5AFF1C74CC80}"/>
+                <a16:creationId xmlns="" xmlns:a16="http://schemas.microsoft.com/office/drawing/2014/main" id="{839ACAD9-74C5-4CC6-8034-5AFF1C74CC80}"/>
               </a:ext>
             </a:extLst>
           </p:cNvPr>
@@ -25868,7 +25875,7 @@
           <p:cNvPr id="32" name="TextBox 31">
             <a:extLst>
               <a:ext uri="{FF2B5EF4-FFF2-40B4-BE49-F238E27FC236}">
-                <a16:creationId xmlns:a16="http://schemas.microsoft.com/office/drawing/2014/main" xmlns="" id="{DD7FCEB6-AC10-4AFD-9AFB-406D96C12559}"/>
+                <a16:creationId xmlns="" xmlns:a16="http://schemas.microsoft.com/office/drawing/2014/main" id="{DD7FCEB6-AC10-4AFD-9AFB-406D96C12559}"/>
               </a:ext>
             </a:extLst>
           </p:cNvPr>
@@ -25939,7 +25946,7 @@
           <p:cNvPr id="33" name="TextBox 32">
             <a:extLst>
               <a:ext uri="{FF2B5EF4-FFF2-40B4-BE49-F238E27FC236}">
-                <a16:creationId xmlns:a16="http://schemas.microsoft.com/office/drawing/2014/main" xmlns="" id="{2C7CBAC8-A5FA-45FC-A0EF-4C4308FA0E04}"/>
+                <a16:creationId xmlns="" xmlns:a16="http://schemas.microsoft.com/office/drawing/2014/main" id="{2C7CBAC8-A5FA-45FC-A0EF-4C4308FA0E04}"/>
               </a:ext>
             </a:extLst>
           </p:cNvPr>
@@ -26010,7 +26017,7 @@
           <p:cNvPr id="35" name="TextBox 34">
             <a:extLst>
               <a:ext uri="{FF2B5EF4-FFF2-40B4-BE49-F238E27FC236}">
-                <a16:creationId xmlns:a16="http://schemas.microsoft.com/office/drawing/2014/main" xmlns="" id="{D87C4589-E0F6-4654-9607-5869B2D4C8EE}"/>
+                <a16:creationId xmlns="" xmlns:a16="http://schemas.microsoft.com/office/drawing/2014/main" id="{D87C4589-E0F6-4654-9607-5869B2D4C8EE}"/>
               </a:ext>
             </a:extLst>
           </p:cNvPr>
@@ -26067,7 +26074,7 @@
           <p:cNvPr id="12" name="TextBox 11">
             <a:extLst>
               <a:ext uri="{FF2B5EF4-FFF2-40B4-BE49-F238E27FC236}">
-                <a16:creationId xmlns:a16="http://schemas.microsoft.com/office/drawing/2014/main" xmlns="" id="{222D7E88-8744-4298-AB65-66D1802C446A}"/>
+                <a16:creationId xmlns="" xmlns:a16="http://schemas.microsoft.com/office/drawing/2014/main" id="{222D7E88-8744-4298-AB65-66D1802C446A}"/>
               </a:ext>
             </a:extLst>
           </p:cNvPr>
@@ -26110,7 +26117,7 @@
           <p:cNvPr id="14" name="TextBox 13">
             <a:extLst>
               <a:ext uri="{FF2B5EF4-FFF2-40B4-BE49-F238E27FC236}">
-                <a16:creationId xmlns:a16="http://schemas.microsoft.com/office/drawing/2014/main" xmlns="" id="{ED953CD0-2D4C-4BDF-BC9C-B63030F8BA50}"/>
+                <a16:creationId xmlns="" xmlns:a16="http://schemas.microsoft.com/office/drawing/2014/main" id="{ED953CD0-2D4C-4BDF-BC9C-B63030F8BA50}"/>
               </a:ext>
             </a:extLst>
           </p:cNvPr>
@@ -26160,7 +26167,7 @@
           <p:cNvPr id="19" name="TextBox 18">
             <a:extLst>
               <a:ext uri="{FF2B5EF4-FFF2-40B4-BE49-F238E27FC236}">
-                <a16:creationId xmlns:a16="http://schemas.microsoft.com/office/drawing/2014/main" xmlns="" id="{968E1B19-EEE5-4FDD-8B70-135C6EF31A5C}"/>
+                <a16:creationId xmlns="" xmlns:a16="http://schemas.microsoft.com/office/drawing/2014/main" id="{968E1B19-EEE5-4FDD-8B70-135C6EF31A5C}"/>
               </a:ext>
             </a:extLst>
           </p:cNvPr>
@@ -26202,7 +26209,7 @@
           <p:cNvPr id="41" name="Rectangle 2">
             <a:extLst>
               <a:ext uri="{FF2B5EF4-FFF2-40B4-BE49-F238E27FC236}">
-                <a16:creationId xmlns:a16="http://schemas.microsoft.com/office/drawing/2014/main" xmlns="" id="{E32F358A-5B64-4928-90C5-86786C7C1A50}"/>
+                <a16:creationId xmlns="" xmlns:a16="http://schemas.microsoft.com/office/drawing/2014/main" id="{E32F358A-5B64-4928-90C5-86786C7C1A50}"/>
               </a:ext>
             </a:extLst>
           </p:cNvPr>
@@ -26402,7 +26409,7 @@
           <p:cNvPr id="42" name="Rectangle 2">
             <a:extLst>
               <a:ext uri="{FF2B5EF4-FFF2-40B4-BE49-F238E27FC236}">
-                <a16:creationId xmlns:a16="http://schemas.microsoft.com/office/drawing/2014/main" xmlns="" id="{525E0D96-8099-4601-80D1-0E4DF7CAD69B}"/>
+                <a16:creationId xmlns="" xmlns:a16="http://schemas.microsoft.com/office/drawing/2014/main" id="{525E0D96-8099-4601-80D1-0E4DF7CAD69B}"/>
               </a:ext>
             </a:extLst>
           </p:cNvPr>
@@ -26534,7 +26541,7 @@
           <p:cNvPr id="43" name="TextBox 42">
             <a:extLst>
               <a:ext uri="{FF2B5EF4-FFF2-40B4-BE49-F238E27FC236}">
-                <a16:creationId xmlns:a16="http://schemas.microsoft.com/office/drawing/2014/main" xmlns="" id="{376B4891-E642-468B-9860-2426713A114A}"/>
+                <a16:creationId xmlns="" xmlns:a16="http://schemas.microsoft.com/office/drawing/2014/main" id="{376B4891-E642-468B-9860-2426713A114A}"/>
               </a:ext>
             </a:extLst>
           </p:cNvPr>
@@ -26605,7 +26612,7 @@
           <p:cNvPr id="46" name="TextBox 45">
             <a:extLst>
               <a:ext uri="{FF2B5EF4-FFF2-40B4-BE49-F238E27FC236}">
-                <a16:creationId xmlns:a16="http://schemas.microsoft.com/office/drawing/2014/main" xmlns="" id="{0FD4CFE0-333E-4BDA-B155-05698DAD0B70}"/>
+                <a16:creationId xmlns="" xmlns:a16="http://schemas.microsoft.com/office/drawing/2014/main" id="{0FD4CFE0-333E-4BDA-B155-05698DAD0B70}"/>
               </a:ext>
             </a:extLst>
           </p:cNvPr>
@@ -27468,7 +27475,7 @@
           <p:cNvPr id="15" name="TextBox 14">
             <a:extLst>
               <a:ext uri="{FF2B5EF4-FFF2-40B4-BE49-F238E27FC236}">
-                <a16:creationId xmlns:a16="http://schemas.microsoft.com/office/drawing/2014/main" xmlns="" id="{438442CF-1B82-4A10-87A1-614331CA498E}"/>
+                <a16:creationId xmlns="" xmlns:a16="http://schemas.microsoft.com/office/drawing/2014/main" id="{438442CF-1B82-4A10-87A1-614331CA498E}"/>
               </a:ext>
             </a:extLst>
           </p:cNvPr>
@@ -27596,7 +27603,7 @@
           <p:cNvPr id="18" name="TextBox 17">
             <a:extLst>
               <a:ext uri="{FF2B5EF4-FFF2-40B4-BE49-F238E27FC236}">
-                <a16:creationId xmlns:a16="http://schemas.microsoft.com/office/drawing/2014/main" xmlns="" id="{9DFCBF7F-F24C-4F4A-8434-94B315F04673}"/>
+                <a16:creationId xmlns="" xmlns:a16="http://schemas.microsoft.com/office/drawing/2014/main" id="{9DFCBF7F-F24C-4F4A-8434-94B315F04673}"/>
               </a:ext>
             </a:extLst>
           </p:cNvPr>
@@ -27702,7 +27709,7 @@
           <p:cNvPr id="19" name="Rectangle 3">
             <a:extLst>
               <a:ext uri="{FF2B5EF4-FFF2-40B4-BE49-F238E27FC236}">
-                <a16:creationId xmlns:a16="http://schemas.microsoft.com/office/drawing/2014/main" xmlns="" id="{46ADB3CD-EA06-4C85-A4CE-E0A5AA5A8DFC}"/>
+                <a16:creationId xmlns="" xmlns:a16="http://schemas.microsoft.com/office/drawing/2014/main" id="{46ADB3CD-EA06-4C85-A4CE-E0A5AA5A8DFC}"/>
               </a:ext>
             </a:extLst>
           </p:cNvPr>
@@ -27800,7 +27807,7 @@
           <p:cNvPr id="20" name="TextBox 19">
             <a:extLst>
               <a:ext uri="{FF2B5EF4-FFF2-40B4-BE49-F238E27FC236}">
-                <a16:creationId xmlns:a16="http://schemas.microsoft.com/office/drawing/2014/main" xmlns="" id="{EDB442F5-34D7-4300-BA18-4B5BC98BC3D4}"/>
+                <a16:creationId xmlns="" xmlns:a16="http://schemas.microsoft.com/office/drawing/2014/main" id="{EDB442F5-34D7-4300-BA18-4B5BC98BC3D4}"/>
               </a:ext>
             </a:extLst>
           </p:cNvPr>
@@ -27846,7 +27853,7 @@
           <p:cNvPr id="23" name="TextBox 22">
             <a:extLst>
               <a:ext uri="{FF2B5EF4-FFF2-40B4-BE49-F238E27FC236}">
-                <a16:creationId xmlns:a16="http://schemas.microsoft.com/office/drawing/2014/main" xmlns="" id="{1126D985-4D01-49AD-AAA0-F753E895E063}"/>
+                <a16:creationId xmlns="" xmlns:a16="http://schemas.microsoft.com/office/drawing/2014/main" id="{1126D985-4D01-49AD-AAA0-F753E895E063}"/>
               </a:ext>
             </a:extLst>
           </p:cNvPr>
@@ -27892,7 +27899,7 @@
           <p:cNvPr id="24" name="TextBox 23">
             <a:extLst>
               <a:ext uri="{FF2B5EF4-FFF2-40B4-BE49-F238E27FC236}">
-                <a16:creationId xmlns:a16="http://schemas.microsoft.com/office/drawing/2014/main" xmlns="" id="{2F327C8B-A760-45E6-AF3F-CC4F1AE1E652}"/>
+                <a16:creationId xmlns="" xmlns:a16="http://schemas.microsoft.com/office/drawing/2014/main" id="{2F327C8B-A760-45E6-AF3F-CC4F1AE1E652}"/>
               </a:ext>
             </a:extLst>
           </p:cNvPr>
@@ -27938,7 +27945,7 @@
           <p:cNvPr id="25" name="TextBox 24">
             <a:extLst>
               <a:ext uri="{FF2B5EF4-FFF2-40B4-BE49-F238E27FC236}">
-                <a16:creationId xmlns:a16="http://schemas.microsoft.com/office/drawing/2014/main" xmlns="" id="{839ACAD9-74C5-4CC6-8034-5AFF1C74CC80}"/>
+                <a16:creationId xmlns="" xmlns:a16="http://schemas.microsoft.com/office/drawing/2014/main" id="{839ACAD9-74C5-4CC6-8034-5AFF1C74CC80}"/>
               </a:ext>
             </a:extLst>
           </p:cNvPr>
@@ -27982,7 +27989,7 @@
           <p:cNvPr id="26" name="TextBox 25">
             <a:extLst>
               <a:ext uri="{FF2B5EF4-FFF2-40B4-BE49-F238E27FC236}">
-                <a16:creationId xmlns:a16="http://schemas.microsoft.com/office/drawing/2014/main" xmlns="" id="{222D7E88-8744-4298-AB65-66D1802C446A}"/>
+                <a16:creationId xmlns="" xmlns:a16="http://schemas.microsoft.com/office/drawing/2014/main" id="{222D7E88-8744-4298-AB65-66D1802C446A}"/>
               </a:ext>
             </a:extLst>
           </p:cNvPr>
@@ -28025,7 +28032,7 @@
           <p:cNvPr id="28" name="Rectangle 2">
             <a:extLst>
               <a:ext uri="{FF2B5EF4-FFF2-40B4-BE49-F238E27FC236}">
-                <a16:creationId xmlns:a16="http://schemas.microsoft.com/office/drawing/2014/main" xmlns="" id="{E32F358A-5B64-4928-90C5-86786C7C1A50}"/>
+                <a16:creationId xmlns="" xmlns:a16="http://schemas.microsoft.com/office/drawing/2014/main" id="{E32F358A-5B64-4928-90C5-86786C7C1A50}"/>
               </a:ext>
             </a:extLst>
           </p:cNvPr>
@@ -28225,7 +28232,7 @@
           <p:cNvPr id="29" name="Rectangle 2">
             <a:extLst>
               <a:ext uri="{FF2B5EF4-FFF2-40B4-BE49-F238E27FC236}">
-                <a16:creationId xmlns:a16="http://schemas.microsoft.com/office/drawing/2014/main" xmlns="" id="{525E0D96-8099-4601-80D1-0E4DF7CAD69B}"/>
+                <a16:creationId xmlns="" xmlns:a16="http://schemas.microsoft.com/office/drawing/2014/main" id="{525E0D96-8099-4601-80D1-0E4DF7CAD69B}"/>
               </a:ext>
             </a:extLst>
           </p:cNvPr>
@@ -28357,7 +28364,7 @@
           <p:cNvPr id="30" name="TextBox 29">
             <a:extLst>
               <a:ext uri="{FF2B5EF4-FFF2-40B4-BE49-F238E27FC236}">
-                <a16:creationId xmlns:a16="http://schemas.microsoft.com/office/drawing/2014/main" xmlns="" id="{0FD4CFE0-333E-4BDA-B155-05698DAD0B70}"/>
+                <a16:creationId xmlns="" xmlns:a16="http://schemas.microsoft.com/office/drawing/2014/main" id="{0FD4CFE0-333E-4BDA-B155-05698DAD0B70}"/>
               </a:ext>
             </a:extLst>
           </p:cNvPr>
@@ -28400,7 +28407,7 @@
           <p:cNvPr id="32" name="TextBox 31">
             <a:extLst>
               <a:ext uri="{FF2B5EF4-FFF2-40B4-BE49-F238E27FC236}">
-                <a16:creationId xmlns:a16="http://schemas.microsoft.com/office/drawing/2014/main" xmlns="" id="{FDE44C33-EA15-4D14-8324-71F27282442F}"/>
+                <a16:creationId xmlns="" xmlns:a16="http://schemas.microsoft.com/office/drawing/2014/main" id="{FDE44C33-EA15-4D14-8324-71F27282442F}"/>
               </a:ext>
             </a:extLst>
           </p:cNvPr>
@@ -28457,7 +28464,7 @@
           <p:cNvPr id="35" name="Rectangle 3">
             <a:extLst>
               <a:ext uri="{FF2B5EF4-FFF2-40B4-BE49-F238E27FC236}">
-                <a16:creationId xmlns:a16="http://schemas.microsoft.com/office/drawing/2014/main" xmlns="" id="{46ADB3CD-EA06-4C85-A4CE-E0A5AA5A8DFC}"/>
+                <a16:creationId xmlns="" xmlns:a16="http://schemas.microsoft.com/office/drawing/2014/main" id="{46ADB3CD-EA06-4C85-A4CE-E0A5AA5A8DFC}"/>
               </a:ext>
             </a:extLst>
           </p:cNvPr>
@@ -28805,7 +28812,7 @@
           <p:cNvPr id="48" name="Rectangle 3">
             <a:extLst>
               <a:ext uri="{FF2B5EF4-FFF2-40B4-BE49-F238E27FC236}">
-                <a16:creationId xmlns:a16="http://schemas.microsoft.com/office/drawing/2014/main" xmlns="" id="{46ADB3CD-EA06-4C85-A4CE-E0A5AA5A8DFC}"/>
+                <a16:creationId xmlns="" xmlns:a16="http://schemas.microsoft.com/office/drawing/2014/main" id="{46ADB3CD-EA06-4C85-A4CE-E0A5AA5A8DFC}"/>
               </a:ext>
             </a:extLst>
           </p:cNvPr>
@@ -28903,7 +28910,7 @@
           <p:cNvPr id="16" name="TextBox 15">
             <a:extLst>
               <a:ext uri="{FF2B5EF4-FFF2-40B4-BE49-F238E27FC236}">
-                <a16:creationId xmlns:a16="http://schemas.microsoft.com/office/drawing/2014/main" xmlns="" id="{9DFCBF7F-F24C-4F4A-8434-94B315F04673}"/>
+                <a16:creationId xmlns="" xmlns:a16="http://schemas.microsoft.com/office/drawing/2014/main" id="{9DFCBF7F-F24C-4F4A-8434-94B315F04673}"/>
               </a:ext>
             </a:extLst>
           </p:cNvPr>
@@ -28996,7 +29003,7 @@
           <p:cNvPr id="25" name="TextBox 24">
             <a:extLst>
               <a:ext uri="{FF2B5EF4-FFF2-40B4-BE49-F238E27FC236}">
-                <a16:creationId xmlns:a16="http://schemas.microsoft.com/office/drawing/2014/main" xmlns="" id="{9DFCBF7F-F24C-4F4A-8434-94B315F04673}"/>
+                <a16:creationId xmlns="" xmlns:a16="http://schemas.microsoft.com/office/drawing/2014/main" id="{9DFCBF7F-F24C-4F4A-8434-94B315F04673}"/>
               </a:ext>
             </a:extLst>
           </p:cNvPr>
@@ -29129,7 +29136,7 @@
           <p:cNvPr id="26" name="TextBox 25">
             <a:extLst>
               <a:ext uri="{FF2B5EF4-FFF2-40B4-BE49-F238E27FC236}">
-                <a16:creationId xmlns:a16="http://schemas.microsoft.com/office/drawing/2014/main" xmlns="" id="{438442CF-1B82-4A10-87A1-614331CA498E}"/>
+                <a16:creationId xmlns="" xmlns:a16="http://schemas.microsoft.com/office/drawing/2014/main" id="{438442CF-1B82-4A10-87A1-614331CA498E}"/>
               </a:ext>
             </a:extLst>
           </p:cNvPr>
@@ -29288,7 +29295,7 @@
               <p:cNvPr id="11" name="TextBox 10">
                 <a:extLst>
                   <a:ext uri="{FF2B5EF4-FFF2-40B4-BE49-F238E27FC236}">
-                    <a16:creationId xmlns:a16="http://schemas.microsoft.com/office/drawing/2014/main" xmlns="" id="{9E395FCD-95B2-4749-9682-00A0C79CBA13}"/>
+                    <a16:creationId xmlns="" xmlns:a16="http://schemas.microsoft.com/office/drawing/2014/main" id="{9E395FCD-95B2-4749-9682-00A0C79CBA13}"/>
                   </a:ext>
                 </a:extLst>
               </p:cNvPr>
@@ -29334,7 +29341,7 @@
               <p:cNvPr id="12" name="TextBox 11">
                 <a:extLst>
                   <a:ext uri="{FF2B5EF4-FFF2-40B4-BE49-F238E27FC236}">
-                    <a16:creationId xmlns:a16="http://schemas.microsoft.com/office/drawing/2014/main" xmlns="" id="{12162968-8F0F-4D20-A2D5-07F59AA75E60}"/>
+                    <a16:creationId xmlns="" xmlns:a16="http://schemas.microsoft.com/office/drawing/2014/main" id="{12162968-8F0F-4D20-A2D5-07F59AA75E60}"/>
                   </a:ext>
                 </a:extLst>
               </p:cNvPr>
@@ -29380,7 +29387,7 @@
               <p:cNvPr id="13" name="TextBox 12">
                 <a:extLst>
                   <a:ext uri="{FF2B5EF4-FFF2-40B4-BE49-F238E27FC236}">
-                    <a16:creationId xmlns:a16="http://schemas.microsoft.com/office/drawing/2014/main" xmlns="" id="{A1762713-59AE-44F1-84D1-5DACDE124103}"/>
+                    <a16:creationId xmlns="" xmlns:a16="http://schemas.microsoft.com/office/drawing/2014/main" id="{A1762713-59AE-44F1-84D1-5DACDE124103}"/>
                   </a:ext>
                 </a:extLst>
               </p:cNvPr>
@@ -29426,7 +29433,7 @@
               <p:cNvPr id="14" name="TextBox 13">
                 <a:extLst>
                   <a:ext uri="{FF2B5EF4-FFF2-40B4-BE49-F238E27FC236}">
-                    <a16:creationId xmlns:a16="http://schemas.microsoft.com/office/drawing/2014/main" xmlns="" id="{B2F95DB7-0D24-4791-910F-3A95AF58A4B6}"/>
+                    <a16:creationId xmlns="" xmlns:a16="http://schemas.microsoft.com/office/drawing/2014/main" id="{B2F95DB7-0D24-4791-910F-3A95AF58A4B6}"/>
                   </a:ext>
                 </a:extLst>
               </p:cNvPr>
@@ -29473,7 +29480,7 @@
               <p:cNvPr id="15" name="TextBox 14">
                 <a:extLst>
                   <a:ext uri="{FF2B5EF4-FFF2-40B4-BE49-F238E27FC236}">
-                    <a16:creationId xmlns:a16="http://schemas.microsoft.com/office/drawing/2014/main" xmlns="" id="{0A113BEB-51E8-42EE-AF79-D74F55774972}"/>
+                    <a16:creationId xmlns="" xmlns:a16="http://schemas.microsoft.com/office/drawing/2014/main" id="{0A113BEB-51E8-42EE-AF79-D74F55774972}"/>
                   </a:ext>
                 </a:extLst>
               </p:cNvPr>
@@ -29517,7 +29524,7 @@
             <p:cNvPr id="10" name="TextBox 9">
               <a:extLst>
                 <a:ext uri="{FF2B5EF4-FFF2-40B4-BE49-F238E27FC236}">
-                  <a16:creationId xmlns:a16="http://schemas.microsoft.com/office/drawing/2014/main" xmlns="" id="{E43AF4C5-CF5B-4E7E-B438-83CD70BE1265}"/>
+                  <a16:creationId xmlns="" xmlns:a16="http://schemas.microsoft.com/office/drawing/2014/main" id="{E43AF4C5-CF5B-4E7E-B438-83CD70BE1265}"/>
                 </a:ext>
               </a:extLst>
             </p:cNvPr>
@@ -29592,7 +29599,7 @@
             <p:cNvPr id="81" name="Rectangle 2">
               <a:extLst>
                 <a:ext uri="{FF2B5EF4-FFF2-40B4-BE49-F238E27FC236}">
-                  <a16:creationId xmlns:a16="http://schemas.microsoft.com/office/drawing/2014/main" xmlns="" id="{03DC0A66-1F24-4836-83E7-0736D601F324}"/>
+                  <a16:creationId xmlns="" xmlns:a16="http://schemas.microsoft.com/office/drawing/2014/main" id="{03DC0A66-1F24-4836-83E7-0736D601F324}"/>
                 </a:ext>
               </a:extLst>
             </p:cNvPr>
@@ -29653,7 +29660,7 @@
             <p:cNvPr id="82" name="TextBox 81">
               <a:extLst>
                 <a:ext uri="{FF2B5EF4-FFF2-40B4-BE49-F238E27FC236}">
-                  <a16:creationId xmlns:a16="http://schemas.microsoft.com/office/drawing/2014/main" xmlns="" id="{9B5A79D0-5E77-49FE-9E1A-18A741E1FAD1}"/>
+                  <a16:creationId xmlns="" xmlns:a16="http://schemas.microsoft.com/office/drawing/2014/main" id="{9B5A79D0-5E77-49FE-9E1A-18A741E1FAD1}"/>
                 </a:ext>
               </a:extLst>
             </p:cNvPr>
@@ -30168,7 +30175,7 @@
             <p:cNvPr id="106" name="TextBox 105">
               <a:extLst>
                 <a:ext uri="{FF2B5EF4-FFF2-40B4-BE49-F238E27FC236}">
-                  <a16:creationId xmlns:a16="http://schemas.microsoft.com/office/drawing/2014/main" xmlns="" id="{0FD4CFE0-333E-4BDA-B155-05698DAD0B70}"/>
+                  <a16:creationId xmlns="" xmlns:a16="http://schemas.microsoft.com/office/drawing/2014/main" id="{0FD4CFE0-333E-4BDA-B155-05698DAD0B70}"/>
                 </a:ext>
               </a:extLst>
             </p:cNvPr>
@@ -30225,7 +30232,7 @@
               <p:cNvPr id="110" name="Rectangle 109">
                 <a:extLst>
                   <a:ext uri="{FF2B5EF4-FFF2-40B4-BE49-F238E27FC236}">
-                    <a16:creationId xmlns:a16="http://schemas.microsoft.com/office/drawing/2014/main" xmlns="" id="{03DC0A66-1F24-4836-83E7-0736D601F324}"/>
+                    <a16:creationId xmlns="" xmlns:a16="http://schemas.microsoft.com/office/drawing/2014/main" id="{03DC0A66-1F24-4836-83E7-0736D601F324}"/>
                   </a:ext>
                 </a:extLst>
               </p:cNvPr>
@@ -30284,7 +30291,7 @@
               <p:cNvPr id="111" name="Rectangle 110">
                 <a:extLst>
                   <a:ext uri="{FF2B5EF4-FFF2-40B4-BE49-F238E27FC236}">
-                    <a16:creationId xmlns:a16="http://schemas.microsoft.com/office/drawing/2014/main" xmlns="" id="{03DC0A66-1F24-4836-83E7-0736D601F324}"/>
+                    <a16:creationId xmlns="" xmlns:a16="http://schemas.microsoft.com/office/drawing/2014/main" id="{03DC0A66-1F24-4836-83E7-0736D601F324}"/>
                   </a:ext>
                 </a:extLst>
               </p:cNvPr>
@@ -30394,7 +30401,7 @@
           <p:cNvPr id="112" name="Rectangle 3">
             <a:extLst>
               <a:ext uri="{FF2B5EF4-FFF2-40B4-BE49-F238E27FC236}">
-                <a16:creationId xmlns:a16="http://schemas.microsoft.com/office/drawing/2014/main" xmlns="" id="{46ADB3CD-EA06-4C85-A4CE-E0A5AA5A8DFC}"/>
+                <a16:creationId xmlns="" xmlns:a16="http://schemas.microsoft.com/office/drawing/2014/main" id="{46ADB3CD-EA06-4C85-A4CE-E0A5AA5A8DFC}"/>
               </a:ext>
             </a:extLst>
           </p:cNvPr>
@@ -30633,7 +30640,7 @@
           <p:cNvPr id="113" name="TextBox 112">
             <a:extLst>
               <a:ext uri="{FF2B5EF4-FFF2-40B4-BE49-F238E27FC236}">
-                <a16:creationId xmlns:a16="http://schemas.microsoft.com/office/drawing/2014/main" xmlns="" id="{9DFCBF7F-F24C-4F4A-8434-94B315F04673}"/>
+                <a16:creationId xmlns="" xmlns:a16="http://schemas.microsoft.com/office/drawing/2014/main" id="{9DFCBF7F-F24C-4F4A-8434-94B315F04673}"/>
               </a:ext>
             </a:extLst>
           </p:cNvPr>
@@ -31363,7 +31370,7 @@
           <p:cNvPr id="24" name="TextBox 23">
             <a:extLst>
               <a:ext uri="{FF2B5EF4-FFF2-40B4-BE49-F238E27FC236}">
-                <a16:creationId xmlns:a16="http://schemas.microsoft.com/office/drawing/2014/main" xmlns="" id="{FDE44C33-EA15-4D14-8324-71F27282442F}"/>
+                <a16:creationId xmlns="" xmlns:a16="http://schemas.microsoft.com/office/drawing/2014/main" id="{FDE44C33-EA15-4D14-8324-71F27282442F}"/>
               </a:ext>
             </a:extLst>
           </p:cNvPr>
@@ -31448,7 +31455,7 @@
               <p:cNvPr id="16" name="TextBox 15">
                 <a:extLst>
                   <a:ext uri="{FF2B5EF4-FFF2-40B4-BE49-F238E27FC236}">
-                    <a16:creationId xmlns:a16="http://schemas.microsoft.com/office/drawing/2014/main" xmlns="" id="{EDB442F5-34D7-4300-BA18-4B5BC98BC3D4}"/>
+                    <a16:creationId xmlns="" xmlns:a16="http://schemas.microsoft.com/office/drawing/2014/main" id="{EDB442F5-34D7-4300-BA18-4B5BC98BC3D4}"/>
                   </a:ext>
                 </a:extLst>
               </p:cNvPr>
@@ -31494,7 +31501,7 @@
               <p:cNvPr id="17" name="TextBox 16">
                 <a:extLst>
                   <a:ext uri="{FF2B5EF4-FFF2-40B4-BE49-F238E27FC236}">
-                    <a16:creationId xmlns:a16="http://schemas.microsoft.com/office/drawing/2014/main" xmlns="" id="{1126D985-4D01-49AD-AAA0-F753E895E063}"/>
+                    <a16:creationId xmlns="" xmlns:a16="http://schemas.microsoft.com/office/drawing/2014/main" id="{1126D985-4D01-49AD-AAA0-F753E895E063}"/>
                   </a:ext>
                 </a:extLst>
               </p:cNvPr>
@@ -31540,7 +31547,7 @@
               <p:cNvPr id="18" name="TextBox 17">
                 <a:extLst>
                   <a:ext uri="{FF2B5EF4-FFF2-40B4-BE49-F238E27FC236}">
-                    <a16:creationId xmlns:a16="http://schemas.microsoft.com/office/drawing/2014/main" xmlns="" id="{2F327C8B-A760-45E6-AF3F-CC4F1AE1E652}"/>
+                    <a16:creationId xmlns="" xmlns:a16="http://schemas.microsoft.com/office/drawing/2014/main" id="{2F327C8B-A760-45E6-AF3F-CC4F1AE1E652}"/>
                   </a:ext>
                 </a:extLst>
               </p:cNvPr>
@@ -31586,7 +31593,7 @@
               <p:cNvPr id="19" name="TextBox 18">
                 <a:extLst>
                   <a:ext uri="{FF2B5EF4-FFF2-40B4-BE49-F238E27FC236}">
-                    <a16:creationId xmlns:a16="http://schemas.microsoft.com/office/drawing/2014/main" xmlns="" id="{839ACAD9-74C5-4CC6-8034-5AFF1C74CC80}"/>
+                    <a16:creationId xmlns="" xmlns:a16="http://schemas.microsoft.com/office/drawing/2014/main" id="{839ACAD9-74C5-4CC6-8034-5AFF1C74CC80}"/>
                   </a:ext>
                 </a:extLst>
               </p:cNvPr>
@@ -31630,7 +31637,7 @@
               <p:cNvPr id="20" name="TextBox 19">
                 <a:extLst>
                   <a:ext uri="{FF2B5EF4-FFF2-40B4-BE49-F238E27FC236}">
-                    <a16:creationId xmlns:a16="http://schemas.microsoft.com/office/drawing/2014/main" xmlns="" id="{222D7E88-8744-4298-AB65-66D1802C446A}"/>
+                    <a16:creationId xmlns="" xmlns:a16="http://schemas.microsoft.com/office/drawing/2014/main" id="{222D7E88-8744-4298-AB65-66D1802C446A}"/>
                   </a:ext>
                 </a:extLst>
               </p:cNvPr>
@@ -31674,7 +31681,7 @@
             <p:cNvPr id="22" name="Rectangle 2">
               <a:extLst>
                 <a:ext uri="{FF2B5EF4-FFF2-40B4-BE49-F238E27FC236}">
-                  <a16:creationId xmlns:a16="http://schemas.microsoft.com/office/drawing/2014/main" xmlns="" id="{525E0D96-8099-4601-80D1-0E4DF7CAD69B}"/>
+                  <a16:creationId xmlns="" xmlns:a16="http://schemas.microsoft.com/office/drawing/2014/main" id="{525E0D96-8099-4601-80D1-0E4DF7CAD69B}"/>
                 </a:ext>
               </a:extLst>
             </p:cNvPr>
@@ -31751,7 +31758,7 @@
             <p:cNvPr id="23" name="TextBox 22">
               <a:extLst>
                 <a:ext uri="{FF2B5EF4-FFF2-40B4-BE49-F238E27FC236}">
-                  <a16:creationId xmlns:a16="http://schemas.microsoft.com/office/drawing/2014/main" xmlns="" id="{0FD4CFE0-333E-4BDA-B155-05698DAD0B70}"/>
+                  <a16:creationId xmlns="" xmlns:a16="http://schemas.microsoft.com/office/drawing/2014/main" id="{0FD4CFE0-333E-4BDA-B155-05698DAD0B70}"/>
                 </a:ext>
               </a:extLst>
             </p:cNvPr>
@@ -31794,7 +31801,7 @@
             <p:cNvPr id="67" name="Rectangle 3">
               <a:extLst>
                 <a:ext uri="{FF2B5EF4-FFF2-40B4-BE49-F238E27FC236}">
-                  <a16:creationId xmlns:a16="http://schemas.microsoft.com/office/drawing/2014/main" xmlns="" id="{46ADB3CD-EA06-4C85-A4CE-E0A5AA5A8DFC}"/>
+                  <a16:creationId xmlns="" xmlns:a16="http://schemas.microsoft.com/office/drawing/2014/main" id="{46ADB3CD-EA06-4C85-A4CE-E0A5AA5A8DFC}"/>
                 </a:ext>
               </a:extLst>
             </p:cNvPr>
@@ -31949,7 +31956,7 @@
               <p:cNvPr id="43" name="TextBox 42">
                 <a:extLst>
                   <a:ext uri="{FF2B5EF4-FFF2-40B4-BE49-F238E27FC236}">
-                    <a16:creationId xmlns:a16="http://schemas.microsoft.com/office/drawing/2014/main" xmlns="" id="{EDB442F5-34D7-4300-BA18-4B5BC98BC3D4}"/>
+                    <a16:creationId xmlns="" xmlns:a16="http://schemas.microsoft.com/office/drawing/2014/main" id="{EDB442F5-34D7-4300-BA18-4B5BC98BC3D4}"/>
                   </a:ext>
                 </a:extLst>
               </p:cNvPr>
@@ -32002,7 +32009,7 @@
               <p:cNvPr id="44" name="TextBox 43">
                 <a:extLst>
                   <a:ext uri="{FF2B5EF4-FFF2-40B4-BE49-F238E27FC236}">
-                    <a16:creationId xmlns:a16="http://schemas.microsoft.com/office/drawing/2014/main" xmlns="" id="{1126D985-4D01-49AD-AAA0-F753E895E063}"/>
+                    <a16:creationId xmlns="" xmlns:a16="http://schemas.microsoft.com/office/drawing/2014/main" id="{1126D985-4D01-49AD-AAA0-F753E895E063}"/>
                   </a:ext>
                 </a:extLst>
               </p:cNvPr>
@@ -32048,7 +32055,7 @@
               <p:cNvPr id="45" name="TextBox 44">
                 <a:extLst>
                   <a:ext uri="{FF2B5EF4-FFF2-40B4-BE49-F238E27FC236}">
-                    <a16:creationId xmlns:a16="http://schemas.microsoft.com/office/drawing/2014/main" xmlns="" id="{2F327C8B-A760-45E6-AF3F-CC4F1AE1E652}"/>
+                    <a16:creationId xmlns="" xmlns:a16="http://schemas.microsoft.com/office/drawing/2014/main" id="{2F327C8B-A760-45E6-AF3F-CC4F1AE1E652}"/>
                   </a:ext>
                 </a:extLst>
               </p:cNvPr>
@@ -32094,7 +32101,7 @@
               <p:cNvPr id="46" name="TextBox 45">
                 <a:extLst>
                   <a:ext uri="{FF2B5EF4-FFF2-40B4-BE49-F238E27FC236}">
-                    <a16:creationId xmlns:a16="http://schemas.microsoft.com/office/drawing/2014/main" xmlns="" id="{839ACAD9-74C5-4CC6-8034-5AFF1C74CC80}"/>
+                    <a16:creationId xmlns="" xmlns:a16="http://schemas.microsoft.com/office/drawing/2014/main" id="{839ACAD9-74C5-4CC6-8034-5AFF1C74CC80}"/>
                   </a:ext>
                 </a:extLst>
               </p:cNvPr>
@@ -32138,7 +32145,7 @@
               <p:cNvPr id="47" name="TextBox 46">
                 <a:extLst>
                   <a:ext uri="{FF2B5EF4-FFF2-40B4-BE49-F238E27FC236}">
-                    <a16:creationId xmlns:a16="http://schemas.microsoft.com/office/drawing/2014/main" xmlns="" id="{222D7E88-8744-4298-AB65-66D1802C446A}"/>
+                    <a16:creationId xmlns="" xmlns:a16="http://schemas.microsoft.com/office/drawing/2014/main" id="{222D7E88-8744-4298-AB65-66D1802C446A}"/>
                   </a:ext>
                 </a:extLst>
               </p:cNvPr>
@@ -32182,7 +32189,7 @@
             <p:cNvPr id="50" name="TextBox 49">
               <a:extLst>
                 <a:ext uri="{FF2B5EF4-FFF2-40B4-BE49-F238E27FC236}">
-                  <a16:creationId xmlns:a16="http://schemas.microsoft.com/office/drawing/2014/main" xmlns="" id="{0FD4CFE0-333E-4BDA-B155-05698DAD0B70}"/>
+                  <a16:creationId xmlns="" xmlns:a16="http://schemas.microsoft.com/office/drawing/2014/main" id="{0FD4CFE0-333E-4BDA-B155-05698DAD0B70}"/>
                 </a:ext>
               </a:extLst>
             </p:cNvPr>
@@ -32225,7 +32232,7 @@
             <p:cNvPr id="66" name="Rectangle 2">
               <a:extLst>
                 <a:ext uri="{FF2B5EF4-FFF2-40B4-BE49-F238E27FC236}">
-                  <a16:creationId xmlns:a16="http://schemas.microsoft.com/office/drawing/2014/main" xmlns="" id="{525E0D96-8099-4601-80D1-0E4DF7CAD69B}"/>
+                  <a16:creationId xmlns="" xmlns:a16="http://schemas.microsoft.com/office/drawing/2014/main" id="{525E0D96-8099-4601-80D1-0E4DF7CAD69B}"/>
                 </a:ext>
               </a:extLst>
             </p:cNvPr>
@@ -32302,7 +32309,7 @@
             <p:cNvPr id="68" name="Rectangle 3">
               <a:extLst>
                 <a:ext uri="{FF2B5EF4-FFF2-40B4-BE49-F238E27FC236}">
-                  <a16:creationId xmlns:a16="http://schemas.microsoft.com/office/drawing/2014/main" xmlns="" id="{46ADB3CD-EA06-4C85-A4CE-E0A5AA5A8DFC}"/>
+                  <a16:creationId xmlns="" xmlns:a16="http://schemas.microsoft.com/office/drawing/2014/main" id="{46ADB3CD-EA06-4C85-A4CE-E0A5AA5A8DFC}"/>
                 </a:ext>
               </a:extLst>
             </p:cNvPr>
@@ -32495,7 +32502,7 @@
               <p:cNvPr id="53" name="TextBox 52">
                 <a:extLst>
                   <a:ext uri="{FF2B5EF4-FFF2-40B4-BE49-F238E27FC236}">
-                    <a16:creationId xmlns:a16="http://schemas.microsoft.com/office/drawing/2014/main" xmlns="" id="{EDB442F5-34D7-4300-BA18-4B5BC98BC3D4}"/>
+                    <a16:creationId xmlns="" xmlns:a16="http://schemas.microsoft.com/office/drawing/2014/main" id="{EDB442F5-34D7-4300-BA18-4B5BC98BC3D4}"/>
                   </a:ext>
                 </a:extLst>
               </p:cNvPr>
@@ -32548,7 +32555,7 @@
               <p:cNvPr id="54" name="TextBox 53">
                 <a:extLst>
                   <a:ext uri="{FF2B5EF4-FFF2-40B4-BE49-F238E27FC236}">
-                    <a16:creationId xmlns:a16="http://schemas.microsoft.com/office/drawing/2014/main" xmlns="" id="{1126D985-4D01-49AD-AAA0-F753E895E063}"/>
+                    <a16:creationId xmlns="" xmlns:a16="http://schemas.microsoft.com/office/drawing/2014/main" id="{1126D985-4D01-49AD-AAA0-F753E895E063}"/>
                   </a:ext>
                 </a:extLst>
               </p:cNvPr>
@@ -32594,7 +32601,7 @@
               <p:cNvPr id="55" name="TextBox 54">
                 <a:extLst>
                   <a:ext uri="{FF2B5EF4-FFF2-40B4-BE49-F238E27FC236}">
-                    <a16:creationId xmlns:a16="http://schemas.microsoft.com/office/drawing/2014/main" xmlns="" id="{2F327C8B-A760-45E6-AF3F-CC4F1AE1E652}"/>
+                    <a16:creationId xmlns="" xmlns:a16="http://schemas.microsoft.com/office/drawing/2014/main" id="{2F327C8B-A760-45E6-AF3F-CC4F1AE1E652}"/>
                   </a:ext>
                 </a:extLst>
               </p:cNvPr>
@@ -32640,7 +32647,7 @@
               <p:cNvPr id="56" name="TextBox 55">
                 <a:extLst>
                   <a:ext uri="{FF2B5EF4-FFF2-40B4-BE49-F238E27FC236}">
-                    <a16:creationId xmlns:a16="http://schemas.microsoft.com/office/drawing/2014/main" xmlns="" id="{839ACAD9-74C5-4CC6-8034-5AFF1C74CC80}"/>
+                    <a16:creationId xmlns="" xmlns:a16="http://schemas.microsoft.com/office/drawing/2014/main" id="{839ACAD9-74C5-4CC6-8034-5AFF1C74CC80}"/>
                   </a:ext>
                 </a:extLst>
               </p:cNvPr>
@@ -32684,7 +32691,7 @@
               <p:cNvPr id="57" name="TextBox 56">
                 <a:extLst>
                   <a:ext uri="{FF2B5EF4-FFF2-40B4-BE49-F238E27FC236}">
-                    <a16:creationId xmlns:a16="http://schemas.microsoft.com/office/drawing/2014/main" xmlns="" id="{222D7E88-8744-4298-AB65-66D1802C446A}"/>
+                    <a16:creationId xmlns="" xmlns:a16="http://schemas.microsoft.com/office/drawing/2014/main" id="{222D7E88-8744-4298-AB65-66D1802C446A}"/>
                   </a:ext>
                 </a:extLst>
               </p:cNvPr>
@@ -32728,7 +32735,7 @@
             <p:cNvPr id="59" name="Rectangle 2">
               <a:extLst>
                 <a:ext uri="{FF2B5EF4-FFF2-40B4-BE49-F238E27FC236}">
-                  <a16:creationId xmlns:a16="http://schemas.microsoft.com/office/drawing/2014/main" xmlns="" id="{525E0D96-8099-4601-80D1-0E4DF7CAD69B}"/>
+                  <a16:creationId xmlns="" xmlns:a16="http://schemas.microsoft.com/office/drawing/2014/main" id="{525E0D96-8099-4601-80D1-0E4DF7CAD69B}"/>
                 </a:ext>
               </a:extLst>
             </p:cNvPr>
@@ -32804,7 +32811,7 @@
             <p:cNvPr id="60" name="TextBox 59">
               <a:extLst>
                 <a:ext uri="{FF2B5EF4-FFF2-40B4-BE49-F238E27FC236}">
-                  <a16:creationId xmlns:a16="http://schemas.microsoft.com/office/drawing/2014/main" xmlns="" id="{0FD4CFE0-333E-4BDA-B155-05698DAD0B70}"/>
+                  <a16:creationId xmlns="" xmlns:a16="http://schemas.microsoft.com/office/drawing/2014/main" id="{0FD4CFE0-333E-4BDA-B155-05698DAD0B70}"/>
                 </a:ext>
               </a:extLst>
             </p:cNvPr>
@@ -32847,7 +32854,7 @@
             <p:cNvPr id="69" name="Rectangle 3">
               <a:extLst>
                 <a:ext uri="{FF2B5EF4-FFF2-40B4-BE49-F238E27FC236}">
-                  <a16:creationId xmlns:a16="http://schemas.microsoft.com/office/drawing/2014/main" xmlns="" id="{46ADB3CD-EA06-4C85-A4CE-E0A5AA5A8DFC}"/>
+                  <a16:creationId xmlns="" xmlns:a16="http://schemas.microsoft.com/office/drawing/2014/main" id="{46ADB3CD-EA06-4C85-A4CE-E0A5AA5A8DFC}"/>
                 </a:ext>
               </a:extLst>
             </p:cNvPr>
@@ -32959,7 +32966,7 @@
           <p:cNvPr id="73" name="TextBox 72">
             <a:extLst>
               <a:ext uri="{FF2B5EF4-FFF2-40B4-BE49-F238E27FC236}">
-                <a16:creationId xmlns:a16="http://schemas.microsoft.com/office/drawing/2014/main" xmlns="" id="{9DFCBF7F-F24C-4F4A-8434-94B315F04673}"/>
+                <a16:creationId xmlns="" xmlns:a16="http://schemas.microsoft.com/office/drawing/2014/main" id="{9DFCBF7F-F24C-4F4A-8434-94B315F04673}"/>
               </a:ext>
             </a:extLst>
           </p:cNvPr>
@@ -33317,7 +33324,7 @@
           <p:cNvPr id="6" name="TextBox 5">
             <a:extLst>
               <a:ext uri="{FF2B5EF4-FFF2-40B4-BE49-F238E27FC236}">
-                <a16:creationId xmlns:a16="http://schemas.microsoft.com/office/drawing/2014/main" xmlns="" id="{438442CF-1B82-4A10-87A1-614331CA498E}"/>
+                <a16:creationId xmlns="" xmlns:a16="http://schemas.microsoft.com/office/drawing/2014/main" id="{438442CF-1B82-4A10-87A1-614331CA498E}"/>
               </a:ext>
             </a:extLst>
           </p:cNvPr>
@@ -33389,7 +33396,7 @@
           <p:cNvPr id="7" name="TextBox 6">
             <a:extLst>
               <a:ext uri="{FF2B5EF4-FFF2-40B4-BE49-F238E27FC236}">
-                <a16:creationId xmlns:a16="http://schemas.microsoft.com/office/drawing/2014/main" xmlns="" id="{438442CF-1B82-4A10-87A1-614331CA498E}"/>
+                <a16:creationId xmlns="" xmlns:a16="http://schemas.microsoft.com/office/drawing/2014/main" id="{438442CF-1B82-4A10-87A1-614331CA498E}"/>
               </a:ext>
             </a:extLst>
           </p:cNvPr>
@@ -33468,7 +33475,7 @@
           <p:cNvPr id="8" name="TextBox 7">
             <a:extLst>
               <a:ext uri="{FF2B5EF4-FFF2-40B4-BE49-F238E27FC236}">
-                <a16:creationId xmlns:a16="http://schemas.microsoft.com/office/drawing/2014/main" xmlns="" id="{438442CF-1B82-4A10-87A1-614331CA498E}"/>
+                <a16:creationId xmlns="" xmlns:a16="http://schemas.microsoft.com/office/drawing/2014/main" id="{438442CF-1B82-4A10-87A1-614331CA498E}"/>
               </a:ext>
             </a:extLst>
           </p:cNvPr>
@@ -33560,7 +33567,7 @@
           <p:cNvPr id="9" name="TextBox 8">
             <a:extLst>
               <a:ext uri="{FF2B5EF4-FFF2-40B4-BE49-F238E27FC236}">
-                <a16:creationId xmlns:a16="http://schemas.microsoft.com/office/drawing/2014/main" xmlns="" id="{438442CF-1B82-4A10-87A1-614331CA498E}"/>
+                <a16:creationId xmlns="" xmlns:a16="http://schemas.microsoft.com/office/drawing/2014/main" id="{438442CF-1B82-4A10-87A1-614331CA498E}"/>
               </a:ext>
             </a:extLst>
           </p:cNvPr>
@@ -33901,7 +33908,7 @@
           <p:cNvPr id="29" name="TextBox 28">
             <a:extLst>
               <a:ext uri="{FF2B5EF4-FFF2-40B4-BE49-F238E27FC236}">
-                <a16:creationId xmlns:a16="http://schemas.microsoft.com/office/drawing/2014/main" xmlns="" id="{FDE44C33-EA15-4D14-8324-71F27282442F}"/>
+                <a16:creationId xmlns="" xmlns:a16="http://schemas.microsoft.com/office/drawing/2014/main" id="{FDE44C33-EA15-4D14-8324-71F27282442F}"/>
               </a:ext>
             </a:extLst>
           </p:cNvPr>
@@ -33997,7 +34004,7 @@
           <p:cNvPr id="33" name="TextBox 32">
             <a:extLst>
               <a:ext uri="{FF2B5EF4-FFF2-40B4-BE49-F238E27FC236}">
-                <a16:creationId xmlns:a16="http://schemas.microsoft.com/office/drawing/2014/main" xmlns="" id="{E43AF4C5-CF5B-4E7E-B438-83CD70BE1265}"/>
+                <a16:creationId xmlns="" xmlns:a16="http://schemas.microsoft.com/office/drawing/2014/main" id="{E43AF4C5-CF5B-4E7E-B438-83CD70BE1265}"/>
               </a:ext>
             </a:extLst>
           </p:cNvPr>
@@ -35153,7 +35160,7 @@
   <a:extraClrSchemeLst/>
   <a:extLst>
     <a:ext uri="{05A4C25C-085E-4340-85A3-A5531E510DB2}">
-      <thm15:themeFamily xmlns:thm15="http://schemas.microsoft.com/office/thememl/2012/main" xmlns="" name="Office Theme" id="{62F939B6-93AF-4DB8-9C6B-D6C7DFDC589F}" vid="{4A3C46E8-61CC-4603-A589-7422A47A8E4A}"/>
+      <thm15:themeFamily xmlns="" xmlns:thm15="http://schemas.microsoft.com/office/thememl/2012/main" name="Office Theme" id="{62F939B6-93AF-4DB8-9C6B-D6C7DFDC589F}" vid="{4A3C46E8-61CC-4603-A589-7422A47A8E4A}"/>
     </a:ext>
   </a:extLst>
 </a:theme>

</xml_diff>